<commit_message>
* Add Solve Problem in ADC chapter for Project summary * Update Use Remark in ptt * Updte templete in Data structure
</commit_message>
<xml_diff>
--- a/Project_Summary_pdf/Project_Summary.pptx
+++ b/Project_Summary_pdf/Project_Summary.pptx
@@ -5,7 +5,7 @@
     <p:sldMasterId id="2147483648" r:id="rId1"/>
   </p:sldMasterIdLst>
   <p:notesMasterIdLst>
-    <p:notesMasterId r:id="rId22"/>
+    <p:notesMasterId r:id="rId24"/>
   </p:notesMasterIdLst>
   <p:sldIdLst>
     <p:sldId id="256" r:id="rId2"/>
@@ -18,16 +18,18 @@
     <p:sldId id="259" r:id="rId9"/>
     <p:sldId id="265" r:id="rId10"/>
     <p:sldId id="266" r:id="rId11"/>
-    <p:sldId id="267" r:id="rId12"/>
-    <p:sldId id="268" r:id="rId13"/>
-    <p:sldId id="269" r:id="rId14"/>
-    <p:sldId id="270" r:id="rId15"/>
-    <p:sldId id="271" r:id="rId16"/>
-    <p:sldId id="272" r:id="rId17"/>
-    <p:sldId id="273" r:id="rId18"/>
-    <p:sldId id="274" r:id="rId19"/>
-    <p:sldId id="275" r:id="rId20"/>
-    <p:sldId id="276" r:id="rId21"/>
+    <p:sldId id="278" r:id="rId12"/>
+    <p:sldId id="267" r:id="rId13"/>
+    <p:sldId id="268" r:id="rId14"/>
+    <p:sldId id="269" r:id="rId15"/>
+    <p:sldId id="270" r:id="rId16"/>
+    <p:sldId id="271" r:id="rId17"/>
+    <p:sldId id="272" r:id="rId18"/>
+    <p:sldId id="273" r:id="rId19"/>
+    <p:sldId id="274" r:id="rId20"/>
+    <p:sldId id="275" r:id="rId21"/>
+    <p:sldId id="276" r:id="rId22"/>
+    <p:sldId id="277" r:id="rId23"/>
   </p:sldIdLst>
   <p:sldSz cx="12192000" cy="6858000"/>
   <p:notesSz cx="6858000" cy="9144000"/>
@@ -156,6 +158,7 @@
         <p14:section name="ADC 數位架構" id="{D6BA5F9B-D591-47FA-8B94-6F7DFFB3FDE6}">
           <p14:sldIdLst>
             <p14:sldId id="266"/>
+            <p14:sldId id="278"/>
             <p14:sldId id="267"/>
             <p14:sldId id="268"/>
             <p14:sldId id="269"/>
@@ -166,6 +169,7 @@
             <p14:sldId id="274"/>
             <p14:sldId id="275"/>
             <p14:sldId id="276"/>
+            <p14:sldId id="277"/>
           </p14:sldIdLst>
         </p14:section>
         <p14:section name="AGC flow" id="{D4987742-1940-4315-8C24-0E7FB243CB3A}">
@@ -197,20 +201,6 @@
 
 <file path=ppt/comments/comment1.xml><?xml version="1.0" encoding="utf-8"?>
 <p:cmLst xmlns:a="http://schemas.openxmlformats.org/drawingml/2006/main" xmlns:r="http://schemas.openxmlformats.org/officeDocument/2006/relationships" xmlns:p="http://schemas.openxmlformats.org/presentationml/2006/main">
-  <p:cm authorId="1" dt="2022-12-30T15:14:23.316" idx="1">
-    <p:pos x="3300" y="1832"/>
-    <p:text>由於筆只使用UART TX來印出相關資訊、並沒有使用RX來接收其他Sensor的information</p:text>
-    <p:extLst>
-      <p:ext uri="{C676402C-5697-4E1C-873F-D02D1690AC5C}">
-        <p15:threadingInfo xmlns:p15="http://schemas.microsoft.com/office/powerpoint/2012/main" timeZoneBias="-480"/>
-      </p:ext>
-    </p:extLst>
-  </p:cm>
-</p:cmLst>
-</file>
-
-<file path=ppt/comments/comment2.xml><?xml version="1.0" encoding="utf-8"?>
-<p:cmLst xmlns:a="http://schemas.openxmlformats.org/drawingml/2006/main" xmlns:r="http://schemas.openxmlformats.org/officeDocument/2006/relationships" xmlns:p="http://schemas.openxmlformats.org/presentationml/2006/main">
   <p:cm authorId="1" dt="2022-12-30T15:23:12.833" idx="2">
     <p:pos x="4385" y="1003"/>
     <p:text>讀取該regestier 代表POP功能</p:text>
@@ -232,7 +222,7 @@
 </p:cmLst>
 </file>
 
-<file path=ppt/comments/comment3.xml><?xml version="1.0" encoding="utf-8"?>
+<file path=ppt/comments/comment2.xml><?xml version="1.0" encoding="utf-8"?>
 <p:cmLst xmlns:a="http://schemas.openxmlformats.org/drawingml/2006/main" xmlns:r="http://schemas.openxmlformats.org/officeDocument/2006/relationships" xmlns:p="http://schemas.openxmlformats.org/presentationml/2006/main">
   <p:cm authorId="1" dt="2022-12-30T20:10:18.079" idx="5">
     <p:pos x="3297" y="1878"/>
@@ -255,7 +245,7 @@
 </p:cmLst>
 </file>
 
-<file path=ppt/comments/comment4.xml><?xml version="1.0" encoding="utf-8"?>
+<file path=ppt/comments/comment3.xml><?xml version="1.0" encoding="utf-8"?>
 <p:cmLst xmlns:a="http://schemas.openxmlformats.org/drawingml/2006/main" xmlns:r="http://schemas.openxmlformats.org/officeDocument/2006/relationships" xmlns:p="http://schemas.openxmlformats.org/presentationml/2006/main">
   <p:cm authorId="1" dt="2023-01-01T21:47:13.367" idx="7">
     <p:pos x="2745" y="2512"/>
@@ -269,7 +259,7 @@
 </p:cmLst>
 </file>
 
-<file path=ppt/comments/comment5.xml><?xml version="1.0" encoding="utf-8"?>
+<file path=ppt/comments/comment4.xml><?xml version="1.0" encoding="utf-8"?>
 <p:cmLst xmlns:a="http://schemas.openxmlformats.org/drawingml/2006/main" xmlns:r="http://schemas.openxmlformats.org/officeDocument/2006/relationships" xmlns:p="http://schemas.openxmlformats.org/presentationml/2006/main">
   <p:cm authorId="1" dt="2023-01-07T18:24:45.642" idx="9">
     <p:pos x="3858" y="1768"/>
@@ -283,39 +273,11 @@
 </p:cmLst>
 </file>
 
-<file path=ppt/comments/comment6.xml><?xml version="1.0" encoding="utf-8"?>
+<file path=ppt/comments/comment5.xml><?xml version="1.0" encoding="utf-8"?>
 <p:cmLst xmlns:a="http://schemas.openxmlformats.org/drawingml/2006/main" xmlns:r="http://schemas.openxmlformats.org/officeDocument/2006/relationships" xmlns:p="http://schemas.openxmlformats.org/presentationml/2006/main">
   <p:cm authorId="1" dt="2023-01-07T14:28:19.221" idx="8">
     <p:pos x="2476" y="1906"/>
     <p:text>ADC 過程是 SAR ADC</p:text>
-    <p:extLst>
-      <p:ext uri="{C676402C-5697-4E1C-873F-D02D1690AC5C}">
-        <p15:threadingInfo xmlns:p15="http://schemas.microsoft.com/office/powerpoint/2012/main" timeZoneBias="-480"/>
-      </p:ext>
-    </p:extLst>
-  </p:cm>
-</p:cmLst>
-</file>
-
-<file path=ppt/comments/comment7.xml><?xml version="1.0" encoding="utf-8"?>
-<p:cmLst xmlns:a="http://schemas.openxmlformats.org/drawingml/2006/main" xmlns:r="http://schemas.openxmlformats.org/officeDocument/2006/relationships" xmlns:p="http://schemas.openxmlformats.org/presentationml/2006/main">
-  <p:cm authorId="1" dt="2023-01-11T17:25:26.167" idx="10">
-    <p:pos x="5482" y="1119"/>
-    <p:text>透過開關對ADC內部電容充電，並藉此取樣</p:text>
-    <p:extLst>
-      <p:ext uri="{C676402C-5697-4E1C-873F-D02D1690AC5C}">
-        <p15:threadingInfo xmlns:p15="http://schemas.microsoft.com/office/powerpoint/2012/main" timeZoneBias="-480"/>
-      </p:ext>
-    </p:extLst>
-  </p:cm>
-</p:cmLst>
-</file>
-
-<file path=ppt/comments/comment8.xml><?xml version="1.0" encoding="utf-8"?>
-<p:cmLst xmlns:a="http://schemas.openxmlformats.org/drawingml/2006/main" xmlns:r="http://schemas.openxmlformats.org/officeDocument/2006/relationships" xmlns:p="http://schemas.openxmlformats.org/presentationml/2006/main">
-  <p:cm authorId="1" dt="2023-01-11T17:49:15.271" idx="11">
-    <p:pos x="2663" y="1573"/>
-    <p:text>與1/2ref比較在與1/4ref電容比較....</p:text>
     <p:extLst>
       <p:ext uri="{C676402C-5697-4E1C-873F-D02D1690AC5C}">
         <p15:threadingInfo xmlns:p15="http://schemas.microsoft.com/office/powerpoint/2012/main" timeZoneBias="-480"/>
@@ -407,7 +369,7 @@
           <a:p>
             <a:fld id="{C65320F2-F42B-45F1-AA86-96F1A2E46749}" type="datetimeFigureOut">
               <a:rPr lang="zh-TW" altLang="en-US" smtClean="0"/>
-              <a:t>2022/12/30</a:t>
+              <a:t>2023/1/14</a:t>
             </a:fld>
             <a:endParaRPr lang="zh-TW" altLang="en-US"/>
           </a:p>
@@ -758,6 +720,333 @@
 </p:notes>
 </file>
 
+<file path=ppt/notesSlides/notesSlide2.xml><?xml version="1.0" encoding="utf-8"?>
+<p:notes xmlns:a="http://schemas.openxmlformats.org/drawingml/2006/main" xmlns:r="http://schemas.openxmlformats.org/officeDocument/2006/relationships" xmlns:p="http://schemas.openxmlformats.org/presentationml/2006/main">
+  <p:cSld>
+    <p:spTree>
+      <p:nvGrpSpPr>
+        <p:cNvPr id="1" name=""/>
+        <p:cNvGrpSpPr/>
+        <p:nvPr/>
+      </p:nvGrpSpPr>
+      <p:grpSpPr>
+        <a:xfrm>
+          <a:off x="0" y="0"/>
+          <a:ext cx="0" cy="0"/>
+          <a:chOff x="0" y="0"/>
+          <a:chExt cx="0" cy="0"/>
+        </a:xfrm>
+      </p:grpSpPr>
+      <p:sp>
+        <p:nvSpPr>
+          <p:cNvPr id="2" name="投影片影像版面配置區 1"/>
+          <p:cNvSpPr>
+            <a:spLocks noGrp="1" noRot="1" noChangeAspect="1"/>
+          </p:cNvSpPr>
+          <p:nvPr>
+            <p:ph type="sldImg"/>
+          </p:nvPr>
+        </p:nvSpPr>
+        <p:spPr/>
+      </p:sp>
+      <p:sp>
+        <p:nvSpPr>
+          <p:cNvPr id="3" name="備忘稿版面配置區 2"/>
+          <p:cNvSpPr>
+            <a:spLocks noGrp="1"/>
+          </p:cNvSpPr>
+          <p:nvPr>
+            <p:ph type="body" idx="1"/>
+          </p:nvPr>
+        </p:nvSpPr>
+        <p:spPr/>
+        <p:txBody>
+          <a:bodyPr/>
+          <a:lstStyle/>
+          <a:p>
+            <a:endParaRPr lang="zh-TW" altLang="en-US"/>
+          </a:p>
+        </p:txBody>
+      </p:sp>
+      <p:sp>
+        <p:nvSpPr>
+          <p:cNvPr id="4" name="投影片編號版面配置區 3"/>
+          <p:cNvSpPr>
+            <a:spLocks noGrp="1"/>
+          </p:cNvSpPr>
+          <p:nvPr>
+            <p:ph type="sldNum" sz="quarter" idx="5"/>
+          </p:nvPr>
+        </p:nvSpPr>
+        <p:spPr/>
+        <p:txBody>
+          <a:bodyPr/>
+          <a:lstStyle/>
+          <a:p>
+            <a:fld id="{0116F853-F7F2-4239-A629-A213C1D67574}" type="slidenum">
+              <a:rPr lang="zh-TW" altLang="en-US" smtClean="0"/>
+              <a:t>3</a:t>
+            </a:fld>
+            <a:endParaRPr lang="zh-TW" altLang="en-US"/>
+          </a:p>
+        </p:txBody>
+      </p:sp>
+    </p:spTree>
+    <p:extLst>
+      <p:ext uri="{BB962C8B-B14F-4D97-AF65-F5344CB8AC3E}">
+        <p14:creationId xmlns:p14="http://schemas.microsoft.com/office/powerpoint/2010/main" val="2670570649"/>
+      </p:ext>
+    </p:extLst>
+  </p:cSld>
+  <p:clrMapOvr>
+    <a:masterClrMapping/>
+  </p:clrMapOvr>
+</p:notes>
+</file>
+
+<file path=ppt/notesSlides/notesSlide3.xml><?xml version="1.0" encoding="utf-8"?>
+<p:notes xmlns:a="http://schemas.openxmlformats.org/drawingml/2006/main" xmlns:r="http://schemas.openxmlformats.org/officeDocument/2006/relationships" xmlns:p="http://schemas.openxmlformats.org/presentationml/2006/main">
+  <p:cSld>
+    <p:spTree>
+      <p:nvGrpSpPr>
+        <p:cNvPr id="1" name=""/>
+        <p:cNvGrpSpPr/>
+        <p:nvPr/>
+      </p:nvGrpSpPr>
+      <p:grpSpPr>
+        <a:xfrm>
+          <a:off x="0" y="0"/>
+          <a:ext cx="0" cy="0"/>
+          <a:chOff x="0" y="0"/>
+          <a:chExt cx="0" cy="0"/>
+        </a:xfrm>
+      </p:grpSpPr>
+      <p:sp>
+        <p:nvSpPr>
+          <p:cNvPr id="2" name="投影片影像版面配置區 1"/>
+          <p:cNvSpPr>
+            <a:spLocks noGrp="1" noRot="1" noChangeAspect="1"/>
+          </p:cNvSpPr>
+          <p:nvPr>
+            <p:ph type="sldImg"/>
+          </p:nvPr>
+        </p:nvSpPr>
+        <p:spPr/>
+      </p:sp>
+      <p:sp>
+        <p:nvSpPr>
+          <p:cNvPr id="3" name="備忘稿版面配置區 2"/>
+          <p:cNvSpPr>
+            <a:spLocks noGrp="1"/>
+          </p:cNvSpPr>
+          <p:nvPr>
+            <p:ph type="body" idx="1"/>
+          </p:nvPr>
+        </p:nvSpPr>
+        <p:spPr/>
+        <p:txBody>
+          <a:bodyPr/>
+          <a:lstStyle/>
+          <a:p>
+            <a:pPr marL="228600" indent="-228600">
+              <a:buAutoNum type="arabicPeriod"/>
+            </a:pPr>
+            <a:r>
+              <a:rPr lang="zh-TW" altLang="en-US"/>
+              <a:t>由於筆只使用</a:t>
+            </a:r>
+            <a:r>
+              <a:rPr lang="en-US" altLang="zh-TW"/>
+              <a:t>UART TX</a:t>
+            </a:r>
+            <a:r>
+              <a:rPr lang="zh-TW" altLang="en-US"/>
+              <a:t>來印出相關資訊、並沒有使用</a:t>
+            </a:r>
+            <a:r>
+              <a:rPr lang="en-US" altLang="zh-TW"/>
+              <a:t>RX</a:t>
+            </a:r>
+            <a:r>
+              <a:rPr lang="zh-TW" altLang="en-US"/>
+              <a:t>來接收其他</a:t>
+            </a:r>
+            <a:r>
+              <a:rPr lang="en-US" altLang="zh-TW"/>
+              <a:t>Sensor</a:t>
+            </a:r>
+            <a:r>
+              <a:rPr lang="zh-TW" altLang="en-US"/>
+              <a:t>的</a:t>
+            </a:r>
+            <a:r>
+              <a:rPr lang="en-US" altLang="zh-TW"/>
+              <a:t>information</a:t>
+            </a:r>
+            <a:r>
+              <a:rPr lang="zh-TW" altLang="en-US"/>
+              <a:t>。</a:t>
+            </a:r>
+            <a:endParaRPr lang="en-US" altLang="zh-TW"/>
+          </a:p>
+          <a:p>
+            <a:pPr marL="0" indent="0">
+              <a:buNone/>
+            </a:pPr>
+            <a:r>
+              <a:rPr lang="zh-TW" altLang="en-US"/>
+              <a:t>       </a:t>
+            </a:r>
+            <a:r>
+              <a:rPr lang="en-US" altLang="zh-TW"/>
+              <a:t>1.1 UART</a:t>
+            </a:r>
+            <a:r>
+              <a:rPr lang="zh-TW" altLang="en-US"/>
+              <a:t> </a:t>
+            </a:r>
+            <a:r>
+              <a:rPr lang="en-US" altLang="zh-TW"/>
+              <a:t>RX Setting</a:t>
+            </a:r>
+            <a:r>
+              <a:rPr lang="zh-TW" altLang="en-US"/>
+              <a:t>建立</a:t>
+            </a:r>
+          </a:p>
+        </p:txBody>
+      </p:sp>
+      <p:sp>
+        <p:nvSpPr>
+          <p:cNvPr id="4" name="投影片編號版面配置區 3"/>
+          <p:cNvSpPr>
+            <a:spLocks noGrp="1"/>
+          </p:cNvSpPr>
+          <p:nvPr>
+            <p:ph type="sldNum" sz="quarter" idx="5"/>
+          </p:nvPr>
+        </p:nvSpPr>
+        <p:spPr/>
+        <p:txBody>
+          <a:bodyPr/>
+          <a:lstStyle/>
+          <a:p>
+            <a:fld id="{0116F853-F7F2-4239-A629-A213C1D67574}" type="slidenum">
+              <a:rPr lang="zh-TW" altLang="en-US" smtClean="0"/>
+              <a:t>4</a:t>
+            </a:fld>
+            <a:endParaRPr lang="zh-TW" altLang="en-US"/>
+          </a:p>
+        </p:txBody>
+      </p:sp>
+    </p:spTree>
+    <p:extLst>
+      <p:ext uri="{BB962C8B-B14F-4D97-AF65-F5344CB8AC3E}">
+        <p14:creationId xmlns:p14="http://schemas.microsoft.com/office/powerpoint/2010/main" val="978169652"/>
+      </p:ext>
+    </p:extLst>
+  </p:cSld>
+  <p:clrMapOvr>
+    <a:masterClrMapping/>
+  </p:clrMapOvr>
+</p:notes>
+</file>
+
+<file path=ppt/notesSlides/notesSlide4.xml><?xml version="1.0" encoding="utf-8"?>
+<p:notes xmlns:a="http://schemas.openxmlformats.org/drawingml/2006/main" xmlns:r="http://schemas.openxmlformats.org/officeDocument/2006/relationships" xmlns:p="http://schemas.openxmlformats.org/presentationml/2006/main">
+  <p:cSld>
+    <p:spTree>
+      <p:nvGrpSpPr>
+        <p:cNvPr id="1" name=""/>
+        <p:cNvGrpSpPr/>
+        <p:nvPr/>
+      </p:nvGrpSpPr>
+      <p:grpSpPr>
+        <a:xfrm>
+          <a:off x="0" y="0"/>
+          <a:ext cx="0" cy="0"/>
+          <a:chOff x="0" y="0"/>
+          <a:chExt cx="0" cy="0"/>
+        </a:xfrm>
+      </p:grpSpPr>
+      <p:sp>
+        <p:nvSpPr>
+          <p:cNvPr id="2" name="投影片影像版面配置區 1"/>
+          <p:cNvSpPr>
+            <a:spLocks noGrp="1" noRot="1" noChangeAspect="1"/>
+          </p:cNvSpPr>
+          <p:nvPr>
+            <p:ph type="sldImg"/>
+          </p:nvPr>
+        </p:nvSpPr>
+        <p:spPr/>
+      </p:sp>
+      <p:sp>
+        <p:nvSpPr>
+          <p:cNvPr id="3" name="備忘稿版面配置區 2"/>
+          <p:cNvSpPr>
+            <a:spLocks noGrp="1"/>
+          </p:cNvSpPr>
+          <p:nvPr>
+            <p:ph type="body" idx="1"/>
+          </p:nvPr>
+        </p:nvSpPr>
+        <p:spPr/>
+        <p:txBody>
+          <a:bodyPr/>
+          <a:lstStyle/>
+          <a:p>
+            <a:r>
+              <a:rPr lang="zh-TW" altLang="en-US"/>
+              <a:t>透過開關對</a:t>
+            </a:r>
+            <a:r>
+              <a:rPr lang="en-US" altLang="zh-TW"/>
+              <a:t>ADC</a:t>
+            </a:r>
+            <a:r>
+              <a:rPr lang="zh-TW" altLang="en-US"/>
+              <a:t>內部電容充電，並藉此取樣</a:t>
+            </a:r>
+          </a:p>
+        </p:txBody>
+      </p:sp>
+      <p:sp>
+        <p:nvSpPr>
+          <p:cNvPr id="4" name="投影片編號版面配置區 3"/>
+          <p:cNvSpPr>
+            <a:spLocks noGrp="1"/>
+          </p:cNvSpPr>
+          <p:nvPr>
+            <p:ph type="sldNum" sz="quarter" idx="5"/>
+          </p:nvPr>
+        </p:nvSpPr>
+        <p:spPr/>
+        <p:txBody>
+          <a:bodyPr/>
+          <a:lstStyle/>
+          <a:p>
+            <a:fld id="{0116F853-F7F2-4239-A629-A213C1D67574}" type="slidenum">
+              <a:rPr lang="zh-TW" altLang="en-US" smtClean="0"/>
+              <a:t>17</a:t>
+            </a:fld>
+            <a:endParaRPr lang="zh-TW" altLang="en-US"/>
+          </a:p>
+        </p:txBody>
+      </p:sp>
+    </p:spTree>
+    <p:extLst>
+      <p:ext uri="{BB962C8B-B14F-4D97-AF65-F5344CB8AC3E}">
+        <p14:creationId xmlns:p14="http://schemas.microsoft.com/office/powerpoint/2010/main" val="4287161391"/>
+      </p:ext>
+    </p:extLst>
+  </p:cSld>
+  <p:clrMapOvr>
+    <a:masterClrMapping/>
+  </p:clrMapOvr>
+</p:notes>
+</file>
+
 <file path=ppt/slideLayouts/slideLayout1.xml><?xml version="1.0" encoding="utf-8"?>
 <p:sldLayout xmlns:a="http://schemas.openxmlformats.org/drawingml/2006/main" xmlns:r="http://schemas.openxmlformats.org/officeDocument/2006/relationships" xmlns:p="http://schemas.openxmlformats.org/presentationml/2006/main" type="title" preserve="1">
   <p:cSld name="標題投影片">
@@ -905,7 +1194,7 @@
           <a:p>
             <a:fld id="{8A9F4CB5-1750-4E23-A13C-2C1F028F9724}" type="datetimeFigureOut">
               <a:rPr lang="zh-TW" altLang="en-US" smtClean="0"/>
-              <a:t>2022/12/30</a:t>
+              <a:t>2023/1/14</a:t>
             </a:fld>
             <a:endParaRPr lang="zh-TW" altLang="en-US"/>
           </a:p>
@@ -1103,7 +1392,7 @@
           <a:p>
             <a:fld id="{8A9F4CB5-1750-4E23-A13C-2C1F028F9724}" type="datetimeFigureOut">
               <a:rPr lang="zh-TW" altLang="en-US" smtClean="0"/>
-              <a:t>2022/12/30</a:t>
+              <a:t>2023/1/14</a:t>
             </a:fld>
             <a:endParaRPr lang="zh-TW" altLang="en-US"/>
           </a:p>
@@ -1311,7 +1600,7 @@
           <a:p>
             <a:fld id="{8A9F4CB5-1750-4E23-A13C-2C1F028F9724}" type="datetimeFigureOut">
               <a:rPr lang="zh-TW" altLang="en-US" smtClean="0"/>
-              <a:t>2022/12/30</a:t>
+              <a:t>2023/1/14</a:t>
             </a:fld>
             <a:endParaRPr lang="zh-TW" altLang="en-US"/>
           </a:p>
@@ -1509,7 +1798,7 @@
           <a:p>
             <a:fld id="{8A9F4CB5-1750-4E23-A13C-2C1F028F9724}" type="datetimeFigureOut">
               <a:rPr lang="zh-TW" altLang="en-US" smtClean="0"/>
-              <a:t>2022/12/30</a:t>
+              <a:t>2023/1/14</a:t>
             </a:fld>
             <a:endParaRPr lang="zh-TW" altLang="en-US"/>
           </a:p>
@@ -1784,7 +2073,7 @@
           <a:p>
             <a:fld id="{8A9F4CB5-1750-4E23-A13C-2C1F028F9724}" type="datetimeFigureOut">
               <a:rPr lang="zh-TW" altLang="en-US" smtClean="0"/>
-              <a:t>2022/12/30</a:t>
+              <a:t>2023/1/14</a:t>
             </a:fld>
             <a:endParaRPr lang="zh-TW" altLang="en-US"/>
           </a:p>
@@ -2049,7 +2338,7 @@
           <a:p>
             <a:fld id="{8A9F4CB5-1750-4E23-A13C-2C1F028F9724}" type="datetimeFigureOut">
               <a:rPr lang="zh-TW" altLang="en-US" smtClean="0"/>
-              <a:t>2022/12/30</a:t>
+              <a:t>2023/1/14</a:t>
             </a:fld>
             <a:endParaRPr lang="zh-TW" altLang="en-US"/>
           </a:p>
@@ -2461,7 +2750,7 @@
           <a:p>
             <a:fld id="{8A9F4CB5-1750-4E23-A13C-2C1F028F9724}" type="datetimeFigureOut">
               <a:rPr lang="zh-TW" altLang="en-US" smtClean="0"/>
-              <a:t>2022/12/30</a:t>
+              <a:t>2023/1/14</a:t>
             </a:fld>
             <a:endParaRPr lang="zh-TW" altLang="en-US"/>
           </a:p>
@@ -2602,7 +2891,7 @@
           <a:p>
             <a:fld id="{8A9F4CB5-1750-4E23-A13C-2C1F028F9724}" type="datetimeFigureOut">
               <a:rPr lang="zh-TW" altLang="en-US" smtClean="0"/>
-              <a:t>2022/12/30</a:t>
+              <a:t>2023/1/14</a:t>
             </a:fld>
             <a:endParaRPr lang="zh-TW" altLang="en-US"/>
           </a:p>
@@ -2715,7 +3004,7 @@
           <a:p>
             <a:fld id="{8A9F4CB5-1750-4E23-A13C-2C1F028F9724}" type="datetimeFigureOut">
               <a:rPr lang="zh-TW" altLang="en-US" smtClean="0"/>
-              <a:t>2022/12/30</a:t>
+              <a:t>2023/1/14</a:t>
             </a:fld>
             <a:endParaRPr lang="zh-TW" altLang="en-US"/>
           </a:p>
@@ -3026,7 +3315,7 @@
           <a:p>
             <a:fld id="{8A9F4CB5-1750-4E23-A13C-2C1F028F9724}" type="datetimeFigureOut">
               <a:rPr lang="zh-TW" altLang="en-US" smtClean="0"/>
-              <a:t>2022/12/30</a:t>
+              <a:t>2023/1/14</a:t>
             </a:fld>
             <a:endParaRPr lang="zh-TW" altLang="en-US"/>
           </a:p>
@@ -3314,7 +3603,7 @@
           <a:p>
             <a:fld id="{8A9F4CB5-1750-4E23-A13C-2C1F028F9724}" type="datetimeFigureOut">
               <a:rPr lang="zh-TW" altLang="en-US" smtClean="0"/>
-              <a:t>2022/12/30</a:t>
+              <a:t>2023/1/14</a:t>
             </a:fld>
             <a:endParaRPr lang="zh-TW" altLang="en-US"/>
           </a:p>
@@ -3555,7 +3844,7 @@
           <a:p>
             <a:fld id="{8A9F4CB5-1750-4E23-A13C-2C1F028F9724}" type="datetimeFigureOut">
               <a:rPr lang="zh-TW" altLang="en-US" smtClean="0"/>
-              <a:t>2022/12/30</a:t>
+              <a:t>2023/1/14</a:t>
             </a:fld>
             <a:endParaRPr lang="zh-TW" altLang="en-US"/>
           </a:p>
@@ -4029,7 +4318,7 @@
           <a:p>
             <a:r>
               <a:rPr lang="en-US" altLang="zh-TW"/>
-              <a:t>Weichen</a:t>
+              <a:t>Weichen - Tu</a:t>
             </a:r>
             <a:endParaRPr lang="zh-TW" altLang="en-US"/>
           </a:p>
@@ -4261,6 +4550,209 @@
           <p:cNvPr id="2" name="標題 1">
             <a:extLst>
               <a:ext uri="{FF2B5EF4-FFF2-40B4-BE49-F238E27FC236}">
+                <a16:creationId xmlns:a16="http://schemas.microsoft.com/office/drawing/2014/main" id="{BBB26775-9394-2453-68A3-4153CA5AB1DE}"/>
+              </a:ext>
+            </a:extLst>
+          </p:cNvPr>
+          <p:cNvSpPr>
+            <a:spLocks noGrp="1"/>
+          </p:cNvSpPr>
+          <p:nvPr>
+            <p:ph type="title"/>
+          </p:nvPr>
+        </p:nvSpPr>
+        <p:spPr/>
+        <p:txBody>
+          <a:bodyPr/>
+          <a:lstStyle/>
+          <a:p>
+            <a:pPr algn="ctr"/>
+            <a:r>
+              <a:rPr lang="en-US" altLang="zh-TW"/>
+              <a:t>ADC</a:t>
+            </a:r>
+            <a:r>
+              <a:rPr lang="zh-TW" altLang="en-US"/>
+              <a:t> 數位架構 </a:t>
+            </a:r>
+            <a:br>
+              <a:rPr lang="en-US" altLang="zh-TW"/>
+            </a:br>
+            <a:r>
+              <a:rPr lang="en-US" altLang="zh-TW"/>
+              <a:t>Solve Issue List</a:t>
+            </a:r>
+            <a:endParaRPr lang="zh-TW" altLang="en-US"/>
+          </a:p>
+        </p:txBody>
+      </p:sp>
+      <p:sp>
+        <p:nvSpPr>
+          <p:cNvPr id="3" name="內容版面配置區 2">
+            <a:extLst>
+              <a:ext uri="{FF2B5EF4-FFF2-40B4-BE49-F238E27FC236}">
+                <a16:creationId xmlns:a16="http://schemas.microsoft.com/office/drawing/2014/main" id="{E9CBEAFF-0249-DA81-8F0C-2F0068F87BB0}"/>
+              </a:ext>
+            </a:extLst>
+          </p:cNvPr>
+          <p:cNvSpPr>
+            <a:spLocks noGrp="1"/>
+          </p:cNvSpPr>
+          <p:nvPr>
+            <p:ph idx="1"/>
+          </p:nvPr>
+        </p:nvSpPr>
+        <p:spPr/>
+        <p:txBody>
+          <a:bodyPr/>
+          <a:lstStyle/>
+          <a:p>
+            <a:pPr marL="514350" indent="-514350">
+              <a:buAutoNum type="arabicPeriod"/>
+            </a:pPr>
+            <a:endParaRPr lang="en-US" altLang="zh-TW"/>
+          </a:p>
+          <a:p>
+            <a:pPr marL="514350" indent="-514350">
+              <a:buAutoNum type="arabicPeriod"/>
+            </a:pPr>
+            <a:r>
+              <a:rPr lang="zh-TW" altLang="en-US"/>
+              <a:t>協助調整數位電路的參數</a:t>
+            </a:r>
+            <a:endParaRPr lang="en-US" altLang="zh-TW"/>
+          </a:p>
+          <a:p>
+            <a:pPr marL="514350" indent="-514350">
+              <a:buAutoNum type="arabicPeriod"/>
+            </a:pPr>
+            <a:endParaRPr lang="en-US" altLang="zh-TW"/>
+          </a:p>
+          <a:p>
+            <a:pPr marL="514350" indent="-514350">
+              <a:buAutoNum type="arabicPeriod"/>
+            </a:pPr>
+            <a:r>
+              <a:rPr lang="en-US" altLang="zh-TW"/>
+              <a:t>USI2.0 Platform </a:t>
+            </a:r>
+            <a:r>
+              <a:rPr lang="zh-TW" altLang="en-US"/>
+              <a:t>漏打</a:t>
+            </a:r>
+            <a:r>
+              <a:rPr lang="en-US" altLang="zh-TW"/>
+              <a:t>1us</a:t>
+            </a:r>
+            <a:r>
+              <a:rPr lang="zh-TW" altLang="en-US"/>
+              <a:t>問題</a:t>
+            </a:r>
+            <a:endParaRPr lang="en-US" altLang="zh-TW"/>
+          </a:p>
+          <a:p>
+            <a:pPr marL="514350" indent="-514350">
+              <a:buAutoNum type="arabicPeriod"/>
+            </a:pPr>
+            <a:endParaRPr lang="en-US" altLang="zh-TW"/>
+          </a:p>
+          <a:p>
+            <a:pPr marL="514350" indent="-514350">
+              <a:buAutoNum type="arabicPeriod"/>
+            </a:pPr>
+            <a:r>
+              <a:rPr lang="zh-TW" altLang="en-US"/>
+              <a:t>模擬 </a:t>
+            </a:r>
+            <a:r>
+              <a:rPr lang="en-US" altLang="zh-TW"/>
+              <a:t>HPF</a:t>
+            </a:r>
+            <a:r>
+              <a:rPr lang="zh-TW" altLang="en-US"/>
+              <a:t> </a:t>
+            </a:r>
+            <a:r>
+              <a:rPr lang="en-US" altLang="zh-TW"/>
+              <a:t>filter + Schmitt triger</a:t>
+            </a:r>
+            <a:r>
+              <a:rPr lang="zh-TW" altLang="en-US"/>
+              <a:t>電路結果</a:t>
+            </a:r>
+            <a:endParaRPr lang="en-US" altLang="zh-TW"/>
+          </a:p>
+          <a:p>
+            <a:pPr marL="514350" indent="-514350">
+              <a:buAutoNum type="arabicPeriod"/>
+            </a:pPr>
+            <a:endParaRPr lang="en-US" altLang="zh-TW"/>
+          </a:p>
+          <a:p>
+            <a:pPr marL="514350" indent="-514350">
+              <a:buAutoNum type="arabicPeriod"/>
+            </a:pPr>
+            <a:r>
+              <a:rPr lang="en-US" altLang="zh-TW"/>
+              <a:t>AGC</a:t>
+            </a:r>
+            <a:r>
+              <a:rPr lang="zh-TW" altLang="en-US"/>
+              <a:t> </a:t>
+            </a:r>
+            <a:r>
+              <a:rPr lang="en-US" altLang="zh-TW"/>
+              <a:t>Flow </a:t>
+            </a:r>
+            <a:r>
+              <a:rPr lang="zh-TW" altLang="en-US"/>
+              <a:t>建構模擬</a:t>
+            </a:r>
+            <a:endParaRPr lang="en-US" altLang="zh-TW"/>
+          </a:p>
+          <a:p>
+            <a:pPr marL="514350" indent="-514350">
+              <a:buAutoNum type="arabicPeriod"/>
+            </a:pPr>
+            <a:endParaRPr lang="zh-TW" altLang="en-US"/>
+          </a:p>
+        </p:txBody>
+      </p:sp>
+    </p:spTree>
+    <p:extLst>
+      <p:ext uri="{BB962C8B-B14F-4D97-AF65-F5344CB8AC3E}">
+        <p14:creationId xmlns:p14="http://schemas.microsoft.com/office/powerpoint/2010/main" val="2435015946"/>
+      </p:ext>
+    </p:extLst>
+  </p:cSld>
+  <p:clrMapOvr>
+    <a:masterClrMapping/>
+  </p:clrMapOvr>
+</p:sld>
+</file>
+
+<file path=ppt/slides/slide12.xml><?xml version="1.0" encoding="utf-8"?>
+<p:sld xmlns:a="http://schemas.openxmlformats.org/drawingml/2006/main" xmlns:r="http://schemas.openxmlformats.org/officeDocument/2006/relationships" xmlns:p="http://schemas.openxmlformats.org/presentationml/2006/main">
+  <p:cSld>
+    <p:spTree>
+      <p:nvGrpSpPr>
+        <p:cNvPr id="1" name=""/>
+        <p:cNvGrpSpPr/>
+        <p:nvPr/>
+      </p:nvGrpSpPr>
+      <p:grpSpPr>
+        <a:xfrm>
+          <a:off x="0" y="0"/>
+          <a:ext cx="0" cy="0"/>
+          <a:chOff x="0" y="0"/>
+          <a:chExt cx="0" cy="0"/>
+        </a:xfrm>
+      </p:grpSpPr>
+      <p:sp>
+        <p:nvSpPr>
+          <p:cNvPr id="2" name="標題 1">
+            <a:extLst>
+              <a:ext uri="{FF2B5EF4-FFF2-40B4-BE49-F238E27FC236}">
                 <a16:creationId xmlns:a16="http://schemas.microsoft.com/office/drawing/2014/main" id="{65E8AE72-5A2D-7470-9FC9-171422D5E154}"/>
               </a:ext>
             </a:extLst>
@@ -4416,7 +4908,7 @@
 </p:sld>
 </file>
 
-<file path=ppt/slides/slide12.xml><?xml version="1.0" encoding="utf-8"?>
+<file path=ppt/slides/slide13.xml><?xml version="1.0" encoding="utf-8"?>
 <p:sld xmlns:a="http://schemas.openxmlformats.org/drawingml/2006/main" xmlns:r="http://schemas.openxmlformats.org/officeDocument/2006/relationships" xmlns:p="http://schemas.openxmlformats.org/presentationml/2006/main">
   <p:cSld>
     <p:spTree>
@@ -5174,144 +5666,6 @@
 </p:sld>
 </file>
 
-<file path=ppt/slides/slide13.xml><?xml version="1.0" encoding="utf-8"?>
-<p:sld xmlns:a="http://schemas.openxmlformats.org/drawingml/2006/main" xmlns:r="http://schemas.openxmlformats.org/officeDocument/2006/relationships" xmlns:p="http://schemas.openxmlformats.org/presentationml/2006/main">
-  <p:cSld>
-    <p:spTree>
-      <p:nvGrpSpPr>
-        <p:cNvPr id="1" name=""/>
-        <p:cNvGrpSpPr/>
-        <p:nvPr/>
-      </p:nvGrpSpPr>
-      <p:grpSpPr>
-        <a:xfrm>
-          <a:off x="0" y="0"/>
-          <a:ext cx="0" cy="0"/>
-          <a:chOff x="0" y="0"/>
-          <a:chExt cx="0" cy="0"/>
-        </a:xfrm>
-      </p:grpSpPr>
-      <p:sp>
-        <p:nvSpPr>
-          <p:cNvPr id="2" name="標題 1">
-            <a:extLst>
-              <a:ext uri="{FF2B5EF4-FFF2-40B4-BE49-F238E27FC236}">
-                <a16:creationId xmlns:a16="http://schemas.microsoft.com/office/drawing/2014/main" id="{402CBB76-248D-C404-D8A0-DBE927E58081}"/>
-              </a:ext>
-            </a:extLst>
-          </p:cNvPr>
-          <p:cNvSpPr>
-            <a:spLocks noGrp="1"/>
-          </p:cNvSpPr>
-          <p:nvPr>
-            <p:ph type="title"/>
-          </p:nvPr>
-        </p:nvSpPr>
-        <p:spPr/>
-        <p:txBody>
-          <a:bodyPr/>
-          <a:lstStyle/>
-          <a:p>
-            <a:pPr algn="ctr"/>
-            <a:r>
-              <a:rPr lang="en-US" altLang="zh-TW" dirty="0"/>
-              <a:t>Analog Circuit</a:t>
-            </a:r>
-            <a:endParaRPr lang="zh-TW" altLang="en-US" dirty="0"/>
-          </a:p>
-        </p:txBody>
-      </p:sp>
-      <p:sp>
-        <p:nvSpPr>
-          <p:cNvPr id="3" name="內容版面配置區 2">
-            <a:extLst>
-              <a:ext uri="{FF2B5EF4-FFF2-40B4-BE49-F238E27FC236}">
-                <a16:creationId xmlns:a16="http://schemas.microsoft.com/office/drawing/2014/main" id="{11F373A1-8B79-A1F0-6A6B-A94085369F31}"/>
-              </a:ext>
-            </a:extLst>
-          </p:cNvPr>
-          <p:cNvSpPr>
-            <a:spLocks noGrp="1"/>
-          </p:cNvSpPr>
-          <p:nvPr>
-            <p:ph idx="1"/>
-          </p:nvPr>
-        </p:nvSpPr>
-        <p:spPr/>
-        <p:txBody>
-          <a:bodyPr/>
-          <a:lstStyle/>
-          <a:p>
-            <a:pPr marL="0" indent="0">
-              <a:buNone/>
-            </a:pPr>
-            <a:endParaRPr lang="en-US" altLang="zh-TW" dirty="0"/>
-          </a:p>
-          <a:p>
-            <a:pPr marL="0" indent="0">
-              <a:buNone/>
-            </a:pPr>
-            <a:r>
-              <a:rPr lang="en-US" altLang="zh-TW" dirty="0"/>
-              <a:t>1. </a:t>
-            </a:r>
-            <a:r>
-              <a:rPr lang="zh-TW" altLang="en-US" dirty="0"/>
-              <a:t>透過前面的</a:t>
-            </a:r>
-            <a:r>
-              <a:rPr lang="en-US" altLang="zh-TW" dirty="0"/>
-              <a:t>RX_PGA</a:t>
-            </a:r>
-            <a:r>
-              <a:rPr lang="zh-TW" altLang="en-US" dirty="0"/>
-              <a:t> 將電壓放大再透過</a:t>
-            </a:r>
-            <a:r>
-              <a:rPr lang="en-US" altLang="zh-TW" dirty="0"/>
-              <a:t>ADC</a:t>
-            </a:r>
-            <a:r>
-              <a:rPr lang="zh-TW" altLang="en-US" dirty="0"/>
-              <a:t>內部的電容對電壓值進行</a:t>
-            </a:r>
-            <a:r>
-              <a:rPr lang="en-US" altLang="zh-TW" dirty="0"/>
-              <a:t>Sample</a:t>
-            </a:r>
-            <a:r>
-              <a:rPr lang="zh-TW" altLang="en-US" dirty="0"/>
-              <a:t>。</a:t>
-            </a:r>
-            <a:r>
-              <a:rPr lang="en-US" altLang="zh-TW" dirty="0"/>
-              <a:t>(ADC</a:t>
-            </a:r>
-            <a:r>
-              <a:rPr lang="zh-TW" altLang="en-US" dirty="0"/>
-              <a:t> </a:t>
-            </a:r>
-            <a:r>
-              <a:rPr lang="en-US" altLang="zh-TW" dirty="0"/>
-              <a:t>Voltage Range 2.8V ~ 0V)</a:t>
-            </a:r>
-            <a:endParaRPr lang="zh-TW" altLang="en-US" dirty="0"/>
-          </a:p>
-        </p:txBody>
-      </p:sp>
-    </p:spTree>
-    <p:extLst>
-      <p:ext uri="{BB962C8B-B14F-4D97-AF65-F5344CB8AC3E}">
-        <p14:creationId xmlns:p14="http://schemas.microsoft.com/office/powerpoint/2010/main" val="2474336951"/>
-      </p:ext>
-    </p:extLst>
-  </p:cSld>
-  <p:clrMapOvr>
-    <a:masterClrMapping/>
-  </p:clrMapOvr>
-</p:sld>
-</file>
-
 <file path=ppt/slides/slide14.xml><?xml version="1.0" encoding="utf-8"?>
 <p:sld xmlns:a="http://schemas.openxmlformats.org/drawingml/2006/main" xmlns:r="http://schemas.openxmlformats.org/officeDocument/2006/relationships" xmlns:p="http://schemas.openxmlformats.org/presentationml/2006/main">
   <p:cSld>
@@ -5334,7 +5688,7 @@
           <p:cNvPr id="2" name="標題 1">
             <a:extLst>
               <a:ext uri="{FF2B5EF4-FFF2-40B4-BE49-F238E27FC236}">
-                <a16:creationId xmlns:a16="http://schemas.microsoft.com/office/drawing/2014/main" id="{0445FA3F-9593-D51E-AC6B-272A9C3CCA14}"/>
+                <a16:creationId xmlns:a16="http://schemas.microsoft.com/office/drawing/2014/main" id="{402CBB76-248D-C404-D8A0-DBE927E58081}"/>
               </a:ext>
             </a:extLst>
           </p:cNvPr>
@@ -5353,7 +5707,7 @@
             <a:pPr algn="ctr"/>
             <a:r>
               <a:rPr lang="en-US" altLang="zh-TW" dirty="0"/>
-              <a:t>ADC Sample</a:t>
+              <a:t>Analog Circuit</a:t>
             </a:r>
             <a:endParaRPr lang="zh-TW" altLang="en-US" dirty="0"/>
           </a:p>
@@ -5364,7 +5718,7 @@
           <p:cNvPr id="3" name="內容版面配置區 2">
             <a:extLst>
               <a:ext uri="{FF2B5EF4-FFF2-40B4-BE49-F238E27FC236}">
-                <a16:creationId xmlns:a16="http://schemas.microsoft.com/office/drawing/2014/main" id="{1C6EF090-BA30-ED01-E543-714C9EA31F75}"/>
+                <a16:creationId xmlns:a16="http://schemas.microsoft.com/office/drawing/2014/main" id="{11F373A1-8B79-A1F0-6A6B-A94085369F31}"/>
               </a:ext>
             </a:extLst>
           </p:cNvPr>
@@ -5383,140 +5737,64 @@
             <a:pPr marL="0" indent="0">
               <a:buNone/>
             </a:pPr>
-            <a:r>
-              <a:rPr lang="zh-TW" altLang="en-US" dirty="0">
-                <a:solidFill>
-                  <a:srgbClr val="00B0F0"/>
-                </a:solidFill>
-              </a:rPr>
-              <a:t>問題</a:t>
-            </a:r>
-            <a:endParaRPr lang="en-US" altLang="zh-TW" dirty="0">
-              <a:solidFill>
-                <a:srgbClr val="00B0F0"/>
-              </a:solidFill>
-            </a:endParaRPr>
+            <a:endParaRPr lang="en-US" altLang="zh-TW" dirty="0"/>
           </a:p>
           <a:p>
             <a:pPr marL="0" indent="0">
               <a:buNone/>
             </a:pPr>
-            <a:endParaRPr lang="en-US" altLang="zh-TW" dirty="0">
-              <a:solidFill>
-                <a:srgbClr val="00B0F0"/>
-              </a:solidFill>
-            </a:endParaRPr>
-          </a:p>
-          <a:p>
-            <a:pPr marL="514350" indent="-514350">
-              <a:buAutoNum type="arabicPeriod"/>
-            </a:pPr>
-            <a:r>
-              <a:rPr lang="en-US" altLang="zh-TW" sz="2400" dirty="0"/>
-              <a:t>HW</a:t>
-            </a:r>
-            <a:r>
-              <a:rPr lang="zh-TW" altLang="en-US" sz="2400" dirty="0"/>
+            <a:r>
+              <a:rPr lang="en-US" altLang="zh-TW" dirty="0"/>
+              <a:t>1. </a:t>
+            </a:r>
+            <a:r>
+              <a:rPr lang="zh-TW" altLang="en-US" dirty="0"/>
+              <a:t>透過前面的</a:t>
+            </a:r>
+            <a:r>
+              <a:rPr lang="en-US" altLang="zh-TW" dirty="0"/>
+              <a:t>RX_PGA</a:t>
+            </a:r>
+            <a:r>
+              <a:rPr lang="zh-TW" altLang="en-US" dirty="0"/>
+              <a:t> 將電壓放大再透過</a:t>
+            </a:r>
+            <a:r>
+              <a:rPr lang="en-US" altLang="zh-TW" dirty="0"/>
+              <a:t>ADC</a:t>
+            </a:r>
+            <a:r>
+              <a:rPr lang="zh-TW" altLang="en-US" dirty="0"/>
+              <a:t>內部的電容對電壓值進行</a:t>
+            </a:r>
+            <a:r>
+              <a:rPr lang="en-US" altLang="zh-TW" dirty="0"/>
+              <a:t>Sample</a:t>
+            </a:r>
+            <a:r>
+              <a:rPr lang="zh-TW" altLang="en-US" dirty="0"/>
+              <a:t>。</a:t>
+            </a:r>
+            <a:r>
+              <a:rPr lang="en-US" altLang="zh-TW" dirty="0"/>
+              <a:t>(ADC</a:t>
+            </a:r>
+            <a:r>
+              <a:rPr lang="zh-TW" altLang="en-US" dirty="0"/>
               <a:t> </a:t>
             </a:r>
             <a:r>
-              <a:rPr lang="en-US" altLang="zh-TW" sz="2400" dirty="0" err="1"/>
-              <a:t>DebugPort</a:t>
-            </a:r>
-            <a:r>
-              <a:rPr lang="en-US" altLang="zh-TW" sz="2400" dirty="0"/>
-              <a:t> :</a:t>
-            </a:r>
-            <a:endParaRPr lang="en-US" altLang="zh-TW" sz="1600" dirty="0"/>
-          </a:p>
-          <a:p>
-            <a:pPr marL="0" indent="0">
-              <a:buNone/>
-            </a:pPr>
-            <a:r>
-              <a:rPr lang="en-US" altLang="zh-TW" sz="2400" dirty="0"/>
-              <a:t>	</a:t>
-            </a:r>
-            <a:r>
-              <a:rPr lang="en-US" altLang="zh-TW" sz="2000" dirty="0"/>
-              <a:t>1.</a:t>
-            </a:r>
-            <a:r>
-              <a:rPr lang="zh-TW" altLang="en-US" sz="2000" dirty="0"/>
-              <a:t> </a:t>
-            </a:r>
-            <a:r>
-              <a:rPr lang="en-US" altLang="zh-TW" sz="2000" dirty="0"/>
-              <a:t>SAR</a:t>
-            </a:r>
-            <a:r>
-              <a:rPr lang="zh-TW" altLang="en-US" sz="2000" dirty="0"/>
-              <a:t> </a:t>
-            </a:r>
-            <a:r>
-              <a:rPr lang="en-US" altLang="zh-TW" sz="2000" dirty="0"/>
-              <a:t>ADC</a:t>
-            </a:r>
-            <a:r>
-              <a:rPr lang="zh-TW" altLang="en-US" sz="2000" dirty="0"/>
-              <a:t>過程</a:t>
-            </a:r>
-            <a:r>
-              <a:rPr lang="en-US" altLang="zh-TW" sz="2000" dirty="0"/>
-              <a:t>(</a:t>
-            </a:r>
-            <a:r>
-              <a:rPr lang="zh-TW" altLang="en-US" sz="2000" dirty="0"/>
-              <a:t>詳細說明、並搭配</a:t>
-            </a:r>
-            <a:r>
-              <a:rPr lang="en-US" altLang="zh-TW" sz="2000" dirty="0"/>
-              <a:t>Logic Analysis</a:t>
-            </a:r>
-            <a:r>
-              <a:rPr lang="zh-TW" altLang="en-US" sz="2000" dirty="0"/>
-              <a:t>講解</a:t>
-            </a:r>
-            <a:r>
-              <a:rPr lang="en-US" altLang="zh-TW" sz="2000" dirty="0"/>
-              <a:t>)</a:t>
-            </a:r>
-          </a:p>
-          <a:p>
-            <a:pPr marL="0" indent="0">
-              <a:buNone/>
-            </a:pPr>
-            <a:endParaRPr lang="en-US" altLang="zh-TW" sz="2400" dirty="0"/>
-          </a:p>
-          <a:p>
-            <a:pPr marL="457200" indent="-457200">
-              <a:buAutoNum type="arabicPeriod" startAt="2"/>
-            </a:pPr>
-            <a:r>
-              <a:rPr lang="zh-TW" altLang="en-US" sz="2400" dirty="0"/>
-              <a:t>最接近顏色</a:t>
-            </a:r>
-            <a:r>
-              <a:rPr lang="en-US" altLang="zh-TW" sz="2400" dirty="0"/>
-              <a:t>:</a:t>
-            </a:r>
-          </a:p>
-          <a:p>
-            <a:pPr marL="0" indent="0">
-              <a:buNone/>
-            </a:pPr>
-            <a:endParaRPr lang="zh-TW" altLang="en-US" dirty="0">
-              <a:solidFill>
-                <a:srgbClr val="00B0F0"/>
-              </a:solidFill>
-            </a:endParaRPr>
+              <a:rPr lang="en-US" altLang="zh-TW" dirty="0"/>
+              <a:t>Voltage Range 2.8V ~ 0V)</a:t>
+            </a:r>
+            <a:endParaRPr lang="zh-TW" altLang="en-US" dirty="0"/>
           </a:p>
         </p:txBody>
       </p:sp>
     </p:spTree>
     <p:extLst>
       <p:ext uri="{BB962C8B-B14F-4D97-AF65-F5344CB8AC3E}">
-        <p14:creationId xmlns:p14="http://schemas.microsoft.com/office/powerpoint/2010/main" val="58858531"/>
+        <p14:creationId xmlns:p14="http://schemas.microsoft.com/office/powerpoint/2010/main" val="2474336951"/>
       </p:ext>
     </p:extLst>
   </p:cSld>
@@ -5548,6 +5826,220 @@
           <p:cNvPr id="2" name="標題 1">
             <a:extLst>
               <a:ext uri="{FF2B5EF4-FFF2-40B4-BE49-F238E27FC236}">
+                <a16:creationId xmlns:a16="http://schemas.microsoft.com/office/drawing/2014/main" id="{0445FA3F-9593-D51E-AC6B-272A9C3CCA14}"/>
+              </a:ext>
+            </a:extLst>
+          </p:cNvPr>
+          <p:cNvSpPr>
+            <a:spLocks noGrp="1"/>
+          </p:cNvSpPr>
+          <p:nvPr>
+            <p:ph type="title"/>
+          </p:nvPr>
+        </p:nvSpPr>
+        <p:spPr/>
+        <p:txBody>
+          <a:bodyPr/>
+          <a:lstStyle/>
+          <a:p>
+            <a:pPr algn="ctr"/>
+            <a:r>
+              <a:rPr lang="en-US" altLang="zh-TW" dirty="0"/>
+              <a:t>ADC Sample</a:t>
+            </a:r>
+            <a:endParaRPr lang="zh-TW" altLang="en-US" dirty="0"/>
+          </a:p>
+        </p:txBody>
+      </p:sp>
+      <p:sp>
+        <p:nvSpPr>
+          <p:cNvPr id="3" name="內容版面配置區 2">
+            <a:extLst>
+              <a:ext uri="{FF2B5EF4-FFF2-40B4-BE49-F238E27FC236}">
+                <a16:creationId xmlns:a16="http://schemas.microsoft.com/office/drawing/2014/main" id="{1C6EF090-BA30-ED01-E543-714C9EA31F75}"/>
+              </a:ext>
+            </a:extLst>
+          </p:cNvPr>
+          <p:cNvSpPr>
+            <a:spLocks noGrp="1"/>
+          </p:cNvSpPr>
+          <p:nvPr>
+            <p:ph idx="1"/>
+          </p:nvPr>
+        </p:nvSpPr>
+        <p:spPr/>
+        <p:txBody>
+          <a:bodyPr/>
+          <a:lstStyle/>
+          <a:p>
+            <a:pPr marL="0" indent="0">
+              <a:buNone/>
+            </a:pPr>
+            <a:r>
+              <a:rPr lang="zh-TW" altLang="en-US" dirty="0">
+                <a:solidFill>
+                  <a:srgbClr val="00B0F0"/>
+                </a:solidFill>
+              </a:rPr>
+              <a:t>問題</a:t>
+            </a:r>
+            <a:endParaRPr lang="en-US" altLang="zh-TW" dirty="0">
+              <a:solidFill>
+                <a:srgbClr val="00B0F0"/>
+              </a:solidFill>
+            </a:endParaRPr>
+          </a:p>
+          <a:p>
+            <a:pPr marL="0" indent="0">
+              <a:buNone/>
+            </a:pPr>
+            <a:endParaRPr lang="en-US" altLang="zh-TW" dirty="0">
+              <a:solidFill>
+                <a:srgbClr val="00B0F0"/>
+              </a:solidFill>
+            </a:endParaRPr>
+          </a:p>
+          <a:p>
+            <a:pPr marL="514350" indent="-514350">
+              <a:buAutoNum type="arabicPeriod"/>
+            </a:pPr>
+            <a:r>
+              <a:rPr lang="en-US" altLang="zh-TW" sz="2400" dirty="0"/>
+              <a:t>HW</a:t>
+            </a:r>
+            <a:r>
+              <a:rPr lang="zh-TW" altLang="en-US" sz="2400" dirty="0"/>
+              <a:t> </a:t>
+            </a:r>
+            <a:r>
+              <a:rPr lang="en-US" altLang="zh-TW" sz="2400" dirty="0" err="1"/>
+              <a:t>DebugPort</a:t>
+            </a:r>
+            <a:r>
+              <a:rPr lang="en-US" altLang="zh-TW" sz="2400" dirty="0"/>
+              <a:t> :</a:t>
+            </a:r>
+            <a:endParaRPr lang="en-US" altLang="zh-TW" sz="1600" dirty="0"/>
+          </a:p>
+          <a:p>
+            <a:pPr marL="0" indent="0">
+              <a:buNone/>
+            </a:pPr>
+            <a:r>
+              <a:rPr lang="en-US" altLang="zh-TW" sz="2400" dirty="0"/>
+              <a:t>	</a:t>
+            </a:r>
+            <a:r>
+              <a:rPr lang="en-US" altLang="zh-TW" sz="2000" dirty="0"/>
+              <a:t>1.</a:t>
+            </a:r>
+            <a:r>
+              <a:rPr lang="zh-TW" altLang="en-US" sz="2000" dirty="0"/>
+              <a:t> </a:t>
+            </a:r>
+            <a:r>
+              <a:rPr lang="en-US" altLang="zh-TW" sz="2000" dirty="0"/>
+              <a:t>SAR</a:t>
+            </a:r>
+            <a:r>
+              <a:rPr lang="zh-TW" altLang="en-US" sz="2000" dirty="0"/>
+              <a:t> </a:t>
+            </a:r>
+            <a:r>
+              <a:rPr lang="en-US" altLang="zh-TW" sz="2000" dirty="0"/>
+              <a:t>ADC</a:t>
+            </a:r>
+            <a:r>
+              <a:rPr lang="zh-TW" altLang="en-US" sz="2000" dirty="0"/>
+              <a:t>過程</a:t>
+            </a:r>
+            <a:r>
+              <a:rPr lang="en-US" altLang="zh-TW" sz="2000" dirty="0"/>
+              <a:t>(</a:t>
+            </a:r>
+            <a:r>
+              <a:rPr lang="zh-TW" altLang="en-US" sz="2000" dirty="0"/>
+              <a:t>詳細說明、並搭配</a:t>
+            </a:r>
+            <a:r>
+              <a:rPr lang="en-US" altLang="zh-TW" sz="2000" dirty="0"/>
+              <a:t>Logic Analysis</a:t>
+            </a:r>
+            <a:r>
+              <a:rPr lang="zh-TW" altLang="en-US" sz="2000" dirty="0"/>
+              <a:t>講解</a:t>
+            </a:r>
+            <a:r>
+              <a:rPr lang="en-US" altLang="zh-TW" sz="2000" dirty="0"/>
+              <a:t>)</a:t>
+            </a:r>
+          </a:p>
+          <a:p>
+            <a:pPr marL="0" indent="0">
+              <a:buNone/>
+            </a:pPr>
+            <a:endParaRPr lang="en-US" altLang="zh-TW" sz="2400" dirty="0"/>
+          </a:p>
+          <a:p>
+            <a:pPr marL="457200" indent="-457200">
+              <a:buAutoNum type="arabicPeriod" startAt="2"/>
+            </a:pPr>
+            <a:r>
+              <a:rPr lang="zh-TW" altLang="en-US" sz="2400" dirty="0"/>
+              <a:t>最接近顏色</a:t>
+            </a:r>
+            <a:r>
+              <a:rPr lang="en-US" altLang="zh-TW" sz="2400" dirty="0"/>
+              <a:t>:</a:t>
+            </a:r>
+          </a:p>
+          <a:p>
+            <a:pPr marL="0" indent="0">
+              <a:buNone/>
+            </a:pPr>
+            <a:endParaRPr lang="zh-TW" altLang="en-US" dirty="0">
+              <a:solidFill>
+                <a:srgbClr val="00B0F0"/>
+              </a:solidFill>
+            </a:endParaRPr>
+          </a:p>
+        </p:txBody>
+      </p:sp>
+    </p:spTree>
+    <p:extLst>
+      <p:ext uri="{BB962C8B-B14F-4D97-AF65-F5344CB8AC3E}">
+        <p14:creationId xmlns:p14="http://schemas.microsoft.com/office/powerpoint/2010/main" val="58858531"/>
+      </p:ext>
+    </p:extLst>
+  </p:cSld>
+  <p:clrMapOvr>
+    <a:masterClrMapping/>
+  </p:clrMapOvr>
+</p:sld>
+</file>
+
+<file path=ppt/slides/slide16.xml><?xml version="1.0" encoding="utf-8"?>
+<p:sld xmlns:a="http://schemas.openxmlformats.org/drawingml/2006/main" xmlns:r="http://schemas.openxmlformats.org/officeDocument/2006/relationships" xmlns:p="http://schemas.openxmlformats.org/presentationml/2006/main">
+  <p:cSld>
+    <p:spTree>
+      <p:nvGrpSpPr>
+        <p:cNvPr id="1" name=""/>
+        <p:cNvGrpSpPr/>
+        <p:nvPr/>
+      </p:nvGrpSpPr>
+      <p:grpSpPr>
+        <a:xfrm>
+          <a:off x="0" y="0"/>
+          <a:ext cx="0" cy="0"/>
+          <a:chOff x="0" y="0"/>
+          <a:chExt cx="0" cy="0"/>
+        </a:xfrm>
+      </p:grpSpPr>
+      <p:sp>
+        <p:nvSpPr>
+          <p:cNvPr id="2" name="標題 1">
+            <a:extLst>
+              <a:ext uri="{FF2B5EF4-FFF2-40B4-BE49-F238E27FC236}">
                 <a16:creationId xmlns:a16="http://schemas.microsoft.com/office/drawing/2014/main" id="{456990E9-0B2C-DDEE-C22A-B5EE484E006B}"/>
               </a:ext>
             </a:extLst>
@@ -5673,7 +6165,7 @@
 </p:sld>
 </file>
 
-<file path=ppt/slides/slide16.xml><?xml version="1.0" encoding="utf-8"?>
+<file path=ppt/slides/slide17.xml><?xml version="1.0" encoding="utf-8"?>
 <p:sld xmlns:a="http://schemas.openxmlformats.org/drawingml/2006/main" xmlns:r="http://schemas.openxmlformats.org/officeDocument/2006/relationships" xmlns:p="http://schemas.openxmlformats.org/presentationml/2006/main">
   <p:cSld>
     <p:spTree>
@@ -6532,7 +7024,7 @@
 </p:sld>
 </file>
 
-<file path=ppt/slides/slide17.xml><?xml version="1.0" encoding="utf-8"?>
+<file path=ppt/slides/slide18.xml><?xml version="1.0" encoding="utf-8"?>
 <p:sld xmlns:a="http://schemas.openxmlformats.org/drawingml/2006/main" xmlns:r="http://schemas.openxmlformats.org/officeDocument/2006/relationships" xmlns:p="http://schemas.openxmlformats.org/presentationml/2006/main">
   <p:cSld>
     <p:spTree>
@@ -6616,8 +7108,18 @@
             </a:r>
             <a:r>
               <a:rPr lang="zh-TW" altLang="en-US" dirty="0"/>
-              <a:t>訊號轉換成數位訊號。</a:t>
-            </a:r>
+              <a:t>訊號轉換成數位</a:t>
+            </a:r>
+            <a:r>
+              <a:rPr lang="zh-TW" altLang="en-US"/>
+              <a:t>訊號。</a:t>
+            </a:r>
+            <a:endParaRPr lang="en-US" altLang="zh-TW"/>
+          </a:p>
+          <a:p>
+            <a:pPr marL="514350" indent="-514350">
+              <a:buAutoNum type="arabicPeriod"/>
+            </a:pPr>
             <a:endParaRPr lang="en-US" altLang="zh-TW" dirty="0"/>
           </a:p>
           <a:p>
@@ -6724,7 +7226,7 @@
 </p:sld>
 </file>
 
-<file path=ppt/slides/slide18.xml><?xml version="1.0" encoding="utf-8"?>
+<file path=ppt/slides/slide19.xml><?xml version="1.0" encoding="utf-8"?>
 <p:sld xmlns:a="http://schemas.openxmlformats.org/drawingml/2006/main" xmlns:r="http://schemas.openxmlformats.org/officeDocument/2006/relationships" xmlns:p="http://schemas.openxmlformats.org/presentationml/2006/main">
   <p:cSld>
     <p:spTree>
@@ -6823,12 +7325,12 @@
               <a:buAutoNum type="arabicPeriod"/>
             </a:pPr>
             <a:r>
-              <a:rPr lang="zh-TW" altLang="en-US" dirty="0"/>
+              <a:rPr lang="zh-TW" altLang="en-US"/>
               <a:t>從</a:t>
             </a:r>
             <a:r>
-              <a:rPr lang="en-US" altLang="zh-TW" dirty="0"/>
-              <a:t>Port </a:t>
+              <a:rPr lang="en-US" altLang="zh-TW"/>
+              <a:t>DebugPort </a:t>
             </a:r>
             <a:r>
               <a:rPr lang="zh-TW" altLang="en-US" dirty="0"/>
@@ -6950,7 +7452,240 @@
 </p:sld>
 </file>
 
-<file path=ppt/slides/slide19.xml><?xml version="1.0" encoding="utf-8"?>
+<file path=ppt/slides/slide2.xml><?xml version="1.0" encoding="utf-8"?>
+<p:sld xmlns:a="http://schemas.openxmlformats.org/drawingml/2006/main" xmlns:r="http://schemas.openxmlformats.org/officeDocument/2006/relationships" xmlns:p="http://schemas.openxmlformats.org/presentationml/2006/main">
+  <p:cSld>
+    <p:spTree>
+      <p:nvGrpSpPr>
+        <p:cNvPr id="1" name=""/>
+        <p:cNvGrpSpPr/>
+        <p:nvPr/>
+      </p:nvGrpSpPr>
+      <p:grpSpPr>
+        <a:xfrm>
+          <a:off x="0" y="0"/>
+          <a:ext cx="0" cy="0"/>
+          <a:chOff x="0" y="0"/>
+          <a:chExt cx="0" cy="0"/>
+        </a:xfrm>
+      </p:grpSpPr>
+      <p:sp>
+        <p:nvSpPr>
+          <p:cNvPr id="2" name="標題 1">
+            <a:extLst>
+              <a:ext uri="{FF2B5EF4-FFF2-40B4-BE49-F238E27FC236}">
+                <a16:creationId xmlns:a16="http://schemas.microsoft.com/office/drawing/2014/main" id="{F88A4FC8-77BD-64B2-6092-5EC021BA3E2B}"/>
+              </a:ext>
+            </a:extLst>
+          </p:cNvPr>
+          <p:cNvSpPr>
+            <a:spLocks noGrp="1"/>
+          </p:cNvSpPr>
+          <p:nvPr>
+            <p:ph type="title"/>
+          </p:nvPr>
+        </p:nvSpPr>
+        <p:spPr/>
+        <p:txBody>
+          <a:bodyPr/>
+          <a:lstStyle/>
+          <a:p>
+            <a:pPr algn="ctr"/>
+            <a:r>
+              <a:rPr lang="en-US" altLang="zh-TW" dirty="0"/>
+              <a:t>Definition</a:t>
+            </a:r>
+            <a:endParaRPr lang="zh-TW" altLang="en-US" dirty="0"/>
+          </a:p>
+        </p:txBody>
+      </p:sp>
+      <p:sp>
+        <p:nvSpPr>
+          <p:cNvPr id="3" name="內容版面配置區 2">
+            <a:extLst>
+              <a:ext uri="{FF2B5EF4-FFF2-40B4-BE49-F238E27FC236}">
+                <a16:creationId xmlns:a16="http://schemas.microsoft.com/office/drawing/2014/main" id="{89C08FAC-BB23-3F15-1FDB-608201F54FC7}"/>
+              </a:ext>
+            </a:extLst>
+          </p:cNvPr>
+          <p:cNvSpPr>
+            <a:spLocks noGrp="1"/>
+          </p:cNvSpPr>
+          <p:nvPr>
+            <p:ph idx="1"/>
+          </p:nvPr>
+        </p:nvSpPr>
+        <p:spPr/>
+        <p:txBody>
+          <a:bodyPr/>
+          <a:lstStyle/>
+          <a:p>
+            <a:pPr marL="514350" indent="-514350">
+              <a:buAutoNum type="arabicPeriod"/>
+            </a:pPr>
+            <a:r>
+              <a:rPr lang="zh-TW" altLang="en-US" dirty="0"/>
+              <a:t>以下定義章節</a:t>
+            </a:r>
+            <a:r>
+              <a:rPr lang="en-US" altLang="zh-TW" dirty="0"/>
+              <a:t>Sequence</a:t>
+            </a:r>
+          </a:p>
+          <a:p>
+            <a:pPr marL="914400" lvl="1" indent="-457200">
+              <a:buAutoNum type="arabicPeriod"/>
+            </a:pPr>
+            <a:r>
+              <a:rPr lang="zh-TW" altLang="en-US" dirty="0"/>
+              <a:t>章節 目的</a:t>
+            </a:r>
+            <a:r>
+              <a:rPr lang="en-US" altLang="zh-TW" dirty="0"/>
+              <a:t>(</a:t>
+            </a:r>
+            <a:r>
+              <a:rPr lang="zh-TW" altLang="en-US" dirty="0"/>
+              <a:t>紅色</a:t>
+            </a:r>
+            <a:r>
+              <a:rPr lang="en-US" altLang="zh-TW" dirty="0"/>
+              <a:t>)</a:t>
+            </a:r>
+          </a:p>
+          <a:p>
+            <a:pPr marL="914400" lvl="1" indent="-457200">
+              <a:buAutoNum type="arabicPeriod"/>
+            </a:pPr>
+            <a:r>
+              <a:rPr lang="zh-TW" altLang="en-US" dirty="0"/>
+              <a:t>章節 架構</a:t>
+            </a:r>
+            <a:r>
+              <a:rPr lang="en-US" altLang="zh-TW" dirty="0"/>
+              <a:t>(</a:t>
+            </a:r>
+            <a:r>
+              <a:rPr lang="zh-TW" altLang="en-US" dirty="0"/>
+              <a:t>綠色</a:t>
+            </a:r>
+            <a:r>
+              <a:rPr lang="en-US" altLang="zh-TW" dirty="0"/>
+              <a:t>)</a:t>
+            </a:r>
+          </a:p>
+          <a:p>
+            <a:pPr marL="914400" lvl="1" indent="-457200">
+              <a:buAutoNum type="arabicPeriod"/>
+            </a:pPr>
+            <a:r>
+              <a:rPr lang="zh-TW" altLang="en-US" dirty="0"/>
+              <a:t>章節 問題</a:t>
+            </a:r>
+            <a:r>
+              <a:rPr lang="en-US" altLang="zh-TW" dirty="0"/>
+              <a:t>(</a:t>
+            </a:r>
+            <a:r>
+              <a:rPr lang="zh-TW" altLang="en-US" dirty="0"/>
+              <a:t>藍色</a:t>
+            </a:r>
+            <a:r>
+              <a:rPr lang="en-US" altLang="zh-TW" dirty="0"/>
+              <a:t>)</a:t>
+            </a:r>
+            <a:r>
+              <a:rPr lang="zh-TW" altLang="en-US" dirty="0"/>
+              <a:t>、問題的根本</a:t>
+            </a:r>
+            <a:r>
+              <a:rPr lang="en-US" altLang="zh-TW" dirty="0"/>
+              <a:t>(</a:t>
+            </a:r>
+            <a:r>
+              <a:rPr lang="zh-TW" altLang="en-US" dirty="0"/>
+              <a:t>紅色</a:t>
+            </a:r>
+            <a:r>
+              <a:rPr lang="en-US" altLang="zh-TW" dirty="0"/>
+              <a:t>)</a:t>
+            </a:r>
+          </a:p>
+          <a:p>
+            <a:pPr marL="914400" lvl="1" indent="-457200">
+              <a:buAutoNum type="arabicPeriod"/>
+            </a:pPr>
+            <a:r>
+              <a:rPr lang="zh-TW" altLang="en-US" dirty="0"/>
+              <a:t>解決辦法 </a:t>
+            </a:r>
+            <a:r>
+              <a:rPr lang="en-US" altLang="zh-TW" dirty="0"/>
+              <a:t>(</a:t>
+            </a:r>
+            <a:r>
+              <a:rPr lang="zh-TW" altLang="en-US" dirty="0"/>
+              <a:t>黑色</a:t>
+            </a:r>
+            <a:r>
+              <a:rPr lang="en-US" altLang="zh-TW" dirty="0"/>
+              <a:t>)</a:t>
+            </a:r>
+          </a:p>
+          <a:p>
+            <a:pPr marL="971550" lvl="1" indent="-514350">
+              <a:buAutoNum type="arabicPeriod"/>
+            </a:pPr>
+            <a:endParaRPr lang="en-US" altLang="zh-TW" dirty="0"/>
+          </a:p>
+          <a:p>
+            <a:pPr marL="514350" indent="-514350">
+              <a:buAutoNum type="arabicPeriod"/>
+            </a:pPr>
+            <a:r>
+              <a:rPr lang="zh-TW" altLang="en-US" dirty="0"/>
+              <a:t>字的大小由</a:t>
+            </a:r>
+            <a:r>
+              <a:rPr lang="en-US" altLang="zh-TW" dirty="0"/>
+              <a:t>28 </a:t>
+            </a:r>
+            <a:r>
+              <a:rPr lang="zh-TW" altLang="en-US" dirty="0"/>
+              <a:t>一路縮小 </a:t>
+            </a:r>
+            <a:r>
+              <a:rPr lang="en-US" altLang="zh-TW" dirty="0"/>
+              <a:t>28,24,20,… </a:t>
+            </a:r>
+            <a:r>
+              <a:rPr lang="zh-TW" altLang="en-US" dirty="0"/>
+              <a:t>依層級遞減</a:t>
+            </a:r>
+            <a:endParaRPr lang="en-US" altLang="zh-TW" dirty="0"/>
+          </a:p>
+          <a:p>
+            <a:pPr marL="457200" lvl="1" indent="0">
+              <a:buNone/>
+            </a:pPr>
+            <a:endParaRPr lang="en-US" altLang="zh-TW" dirty="0"/>
+          </a:p>
+        </p:txBody>
+      </p:sp>
+    </p:spTree>
+    <p:extLst>
+      <p:ext uri="{BB962C8B-B14F-4D97-AF65-F5344CB8AC3E}">
+        <p14:creationId xmlns:p14="http://schemas.microsoft.com/office/powerpoint/2010/main" val="3060344743"/>
+      </p:ext>
+    </p:extLst>
+  </p:cSld>
+  <p:clrMapOvr>
+    <a:masterClrMapping/>
+  </p:clrMapOvr>
+</p:sld>
+</file>
+
+<file path=ppt/slides/slide20.xml><?xml version="1.0" encoding="utf-8"?>
 <p:sld xmlns:a="http://schemas.openxmlformats.org/drawingml/2006/main" xmlns:r="http://schemas.openxmlformats.org/officeDocument/2006/relationships" xmlns:p="http://schemas.openxmlformats.org/presentationml/2006/main">
   <p:cSld>
     <p:spTree>
@@ -7179,7 +7914,7 @@
 </p:sld>
 </file>
 
-<file path=ppt/slides/slide2.xml><?xml version="1.0" encoding="utf-8"?>
+<file path=ppt/slides/slide21.xml><?xml version="1.0" encoding="utf-8"?>
 <p:sld xmlns:a="http://schemas.openxmlformats.org/drawingml/2006/main" xmlns:r="http://schemas.openxmlformats.org/officeDocument/2006/relationships" xmlns:p="http://schemas.openxmlformats.org/presentationml/2006/main">
   <p:cSld>
     <p:spTree>
@@ -7201,7 +7936,7 @@
           <p:cNvPr id="2" name="標題 1">
             <a:extLst>
               <a:ext uri="{FF2B5EF4-FFF2-40B4-BE49-F238E27FC236}">
-                <a16:creationId xmlns:a16="http://schemas.microsoft.com/office/drawing/2014/main" id="{F88A4FC8-77BD-64B2-6092-5EC021BA3E2B}"/>
+                <a16:creationId xmlns:a16="http://schemas.microsoft.com/office/drawing/2014/main" id="{034E9218-474B-B1DC-1CDA-394754C26DF2}"/>
               </a:ext>
             </a:extLst>
           </p:cNvPr>
@@ -7220,189 +7955,54 @@
             <a:pPr algn="ctr"/>
             <a:r>
               <a:rPr lang="en-US" altLang="zh-TW" dirty="0"/>
-              <a:t>Definition</a:t>
-            </a:r>
-            <a:endParaRPr lang="zh-TW" altLang="en-US" dirty="0"/>
-          </a:p>
-        </p:txBody>
-      </p:sp>
-      <p:sp>
-        <p:nvSpPr>
-          <p:cNvPr id="3" name="內容版面配置區 2">
-            <a:extLst>
-              <a:ext uri="{FF2B5EF4-FFF2-40B4-BE49-F238E27FC236}">
-                <a16:creationId xmlns:a16="http://schemas.microsoft.com/office/drawing/2014/main" id="{89C08FAC-BB23-3F15-1FDB-608201F54FC7}"/>
-              </a:ext>
-            </a:extLst>
-          </p:cNvPr>
-          <p:cNvSpPr>
-            <a:spLocks noGrp="1"/>
-          </p:cNvSpPr>
+              <a:t>SAR ADC</a:t>
+            </a:r>
+            <a:r>
+              <a:rPr lang="zh-TW" altLang="en-US" dirty="0"/>
+              <a:t> 實際狀況</a:t>
+            </a:r>
+          </a:p>
+        </p:txBody>
+      </p:sp>
+      <p:pic>
+        <p:nvPicPr>
+          <p:cNvPr id="13" name="內容版面配置區 12">
+            <a:extLst>
+              <a:ext uri="{FF2B5EF4-FFF2-40B4-BE49-F238E27FC236}">
+                <a16:creationId xmlns:a16="http://schemas.microsoft.com/office/drawing/2014/main" id="{D84AF8D7-3D22-35C4-83E0-599AE6B98FAB}"/>
+              </a:ext>
+            </a:extLst>
+          </p:cNvPr>
+          <p:cNvPicPr>
+            <a:picLocks noGrp="1" noChangeAspect="1"/>
+          </p:cNvPicPr>
           <p:nvPr>
             <p:ph idx="1"/>
           </p:nvPr>
-        </p:nvSpPr>
-        <p:spPr/>
-        <p:txBody>
-          <a:bodyPr/>
-          <a:lstStyle/>
-          <a:p>
-            <a:pPr marL="514350" indent="-514350">
-              <a:buAutoNum type="arabicPeriod"/>
-            </a:pPr>
-            <a:r>
-              <a:rPr lang="zh-TW" altLang="en-US" dirty="0"/>
-              <a:t>以下定義章節</a:t>
-            </a:r>
-            <a:r>
-              <a:rPr lang="en-US" altLang="zh-TW" dirty="0"/>
-              <a:t>Sequence</a:t>
-            </a:r>
-          </a:p>
-          <a:p>
-            <a:pPr marL="914400" lvl="1" indent="-457200">
-              <a:buAutoNum type="arabicPeriod"/>
-            </a:pPr>
-            <a:r>
-              <a:rPr lang="zh-TW" altLang="en-US" dirty="0"/>
-              <a:t>章節 目的</a:t>
-            </a:r>
-            <a:r>
-              <a:rPr lang="en-US" altLang="zh-TW" dirty="0"/>
-              <a:t>(</a:t>
-            </a:r>
-            <a:r>
-              <a:rPr lang="zh-TW" altLang="en-US" dirty="0"/>
-              <a:t>紅色</a:t>
-            </a:r>
-            <a:r>
-              <a:rPr lang="en-US" altLang="zh-TW" dirty="0"/>
-              <a:t>)</a:t>
-            </a:r>
-          </a:p>
-          <a:p>
-            <a:pPr marL="914400" lvl="1" indent="-457200">
-              <a:buAutoNum type="arabicPeriod"/>
-            </a:pPr>
-            <a:r>
-              <a:rPr lang="zh-TW" altLang="en-US" dirty="0"/>
-              <a:t>章節 架構</a:t>
-            </a:r>
-            <a:r>
-              <a:rPr lang="en-US" altLang="zh-TW" dirty="0"/>
-              <a:t>(</a:t>
-            </a:r>
-            <a:r>
-              <a:rPr lang="zh-TW" altLang="en-US" dirty="0"/>
-              <a:t>綠色</a:t>
-            </a:r>
-            <a:r>
-              <a:rPr lang="en-US" altLang="zh-TW" dirty="0"/>
-              <a:t>)</a:t>
-            </a:r>
-          </a:p>
-          <a:p>
-            <a:pPr marL="914400" lvl="1" indent="-457200">
-              <a:buAutoNum type="arabicPeriod"/>
-            </a:pPr>
-            <a:r>
-              <a:rPr lang="zh-TW" altLang="en-US" dirty="0"/>
-              <a:t>章節 問題</a:t>
-            </a:r>
-            <a:r>
-              <a:rPr lang="en-US" altLang="zh-TW" dirty="0"/>
-              <a:t>(</a:t>
-            </a:r>
-            <a:r>
-              <a:rPr lang="zh-TW" altLang="en-US" dirty="0"/>
-              <a:t>藍色</a:t>
-            </a:r>
-            <a:r>
-              <a:rPr lang="en-US" altLang="zh-TW" dirty="0"/>
-              <a:t>)</a:t>
-            </a:r>
-            <a:r>
-              <a:rPr lang="zh-TW" altLang="en-US" dirty="0"/>
-              <a:t>、問題的根本</a:t>
-            </a:r>
-            <a:r>
-              <a:rPr lang="en-US" altLang="zh-TW" dirty="0"/>
-              <a:t>(</a:t>
-            </a:r>
-            <a:r>
-              <a:rPr lang="zh-TW" altLang="en-US" dirty="0"/>
-              <a:t>紅色</a:t>
-            </a:r>
-            <a:r>
-              <a:rPr lang="en-US" altLang="zh-TW" dirty="0"/>
-              <a:t>)</a:t>
-            </a:r>
-          </a:p>
-          <a:p>
-            <a:pPr marL="914400" lvl="1" indent="-457200">
-              <a:buAutoNum type="arabicPeriod"/>
-            </a:pPr>
-            <a:r>
-              <a:rPr lang="zh-TW" altLang="en-US" dirty="0"/>
-              <a:t>解決辦法 </a:t>
-            </a:r>
-            <a:r>
-              <a:rPr lang="en-US" altLang="zh-TW" dirty="0"/>
-              <a:t>(</a:t>
-            </a:r>
-            <a:r>
-              <a:rPr lang="zh-TW" altLang="en-US" dirty="0"/>
-              <a:t>黑色</a:t>
-            </a:r>
-            <a:r>
-              <a:rPr lang="en-US" altLang="zh-TW" dirty="0"/>
-              <a:t>)</a:t>
-            </a:r>
-          </a:p>
-          <a:p>
-            <a:pPr marL="971550" lvl="1" indent="-514350">
-              <a:buAutoNum type="arabicPeriod"/>
-            </a:pPr>
-            <a:endParaRPr lang="en-US" altLang="zh-TW" dirty="0"/>
-          </a:p>
-          <a:p>
-            <a:pPr marL="514350" indent="-514350">
-              <a:buAutoNum type="arabicPeriod"/>
-            </a:pPr>
-            <a:r>
-              <a:rPr lang="zh-TW" altLang="en-US" dirty="0"/>
-              <a:t>字的大小由</a:t>
-            </a:r>
-            <a:r>
-              <a:rPr lang="en-US" altLang="zh-TW" dirty="0"/>
-              <a:t>28 </a:t>
-            </a:r>
-            <a:r>
-              <a:rPr lang="zh-TW" altLang="en-US" dirty="0"/>
-              <a:t>一路縮小 </a:t>
-            </a:r>
-            <a:r>
-              <a:rPr lang="en-US" altLang="zh-TW" dirty="0"/>
-              <a:t>28,24,20,… </a:t>
-            </a:r>
-            <a:r>
-              <a:rPr lang="zh-TW" altLang="en-US" dirty="0"/>
-              <a:t>依層級遞減</a:t>
-            </a:r>
-            <a:endParaRPr lang="en-US" altLang="zh-TW" dirty="0"/>
-          </a:p>
-          <a:p>
-            <a:pPr marL="457200" lvl="1" indent="0">
-              <a:buNone/>
-            </a:pPr>
-            <a:endParaRPr lang="en-US" altLang="zh-TW" dirty="0"/>
-          </a:p>
-        </p:txBody>
-      </p:sp>
+        </p:nvPicPr>
+        <p:blipFill>
+          <a:blip r:embed="rId2">
+            <a:extLst>
+              <a:ext uri="{28A0092B-C50C-407E-A947-70E740481C1C}">
+                <a14:useLocalDpi xmlns:a14="http://schemas.microsoft.com/office/drawing/2010/main" val="0"/>
+              </a:ext>
+            </a:extLst>
+          </a:blip>
+          <a:stretch>
+            <a:fillRect/>
+          </a:stretch>
+        </p:blipFill>
+        <p:spPr>
+          <a:xfrm>
+            <a:off x="838200" y="1736049"/>
+            <a:ext cx="10515600" cy="4756826"/>
+          </a:xfrm>
+        </p:spPr>
+      </p:pic>
     </p:spTree>
     <p:extLst>
       <p:ext uri="{BB962C8B-B14F-4D97-AF65-F5344CB8AC3E}">
-        <p14:creationId xmlns:p14="http://schemas.microsoft.com/office/powerpoint/2010/main" val="3060344743"/>
+        <p14:creationId xmlns:p14="http://schemas.microsoft.com/office/powerpoint/2010/main" val="2828768408"/>
       </p:ext>
     </p:extLst>
   </p:cSld>
@@ -7412,7 +8012,7 @@
 </p:sld>
 </file>
 
-<file path=ppt/slides/slide20.xml><?xml version="1.0" encoding="utf-8"?>
+<file path=ppt/slides/slide22.xml><?xml version="1.0" encoding="utf-8"?>
 <p:sld xmlns:a="http://schemas.openxmlformats.org/drawingml/2006/main" xmlns:r="http://schemas.openxmlformats.org/officeDocument/2006/relationships" xmlns:p="http://schemas.openxmlformats.org/presentationml/2006/main">
   <p:cSld>
     <p:spTree>
@@ -7434,7 +8034,7 @@
           <p:cNvPr id="2" name="標題 1">
             <a:extLst>
               <a:ext uri="{FF2B5EF4-FFF2-40B4-BE49-F238E27FC236}">
-                <a16:creationId xmlns:a16="http://schemas.microsoft.com/office/drawing/2014/main" id="{034E9218-474B-B1DC-1CDA-394754C26DF2}"/>
+                <a16:creationId xmlns:a16="http://schemas.microsoft.com/office/drawing/2014/main" id="{8BDD02B5-2588-F29D-85A0-F44E3198E6C5}"/>
               </a:ext>
             </a:extLst>
           </p:cNvPr>
@@ -7452,55 +8052,91 @@
           <a:p>
             <a:pPr algn="ctr"/>
             <a:r>
-              <a:rPr lang="en-US" altLang="zh-TW" dirty="0"/>
+              <a:rPr lang="en-US" altLang="zh-TW"/>
               <a:t>SAR ADC</a:t>
             </a:r>
-            <a:r>
-              <a:rPr lang="zh-TW" altLang="en-US" dirty="0"/>
-              <a:t> 實際狀況</a:t>
-            </a:r>
-          </a:p>
-        </p:txBody>
-      </p:sp>
-      <p:pic>
-        <p:nvPicPr>
-          <p:cNvPr id="13" name="內容版面配置區 12">
-            <a:extLst>
-              <a:ext uri="{FF2B5EF4-FFF2-40B4-BE49-F238E27FC236}">
-                <a16:creationId xmlns:a16="http://schemas.microsoft.com/office/drawing/2014/main" id="{D84AF8D7-3D22-35C4-83E0-599AE6B98FAB}"/>
-              </a:ext>
-            </a:extLst>
-          </p:cNvPr>
-          <p:cNvPicPr>
-            <a:picLocks noGrp="1" noChangeAspect="1"/>
-          </p:cNvPicPr>
+            <a:br>
+              <a:rPr lang="en-US" altLang="zh-TW"/>
+            </a:br>
+            <a:r>
+              <a:rPr lang="zh-TW" altLang="en-US"/>
+              <a:t>早期、目前做法</a:t>
+            </a:r>
+          </a:p>
+        </p:txBody>
+      </p:sp>
+      <p:sp>
+        <p:nvSpPr>
+          <p:cNvPr id="3" name="內容版面配置區 2">
+            <a:extLst>
+              <a:ext uri="{FF2B5EF4-FFF2-40B4-BE49-F238E27FC236}">
+                <a16:creationId xmlns:a16="http://schemas.microsoft.com/office/drawing/2014/main" id="{C312E12E-7FF0-635C-AB76-4F921EE1DE24}"/>
+              </a:ext>
+            </a:extLst>
+          </p:cNvPr>
+          <p:cNvSpPr>
+            <a:spLocks noGrp="1"/>
+          </p:cNvSpPr>
           <p:nvPr>
             <p:ph idx="1"/>
           </p:nvPr>
-        </p:nvPicPr>
-        <p:blipFill>
-          <a:blip r:embed="rId2">
-            <a:extLst>
-              <a:ext uri="{28A0092B-C50C-407E-A947-70E740481C1C}">
-                <a14:useLocalDpi xmlns:a14="http://schemas.microsoft.com/office/drawing/2010/main" val="0"/>
-              </a:ext>
-            </a:extLst>
-          </a:blip>
-          <a:stretch>
-            <a:fillRect/>
-          </a:stretch>
-        </p:blipFill>
-        <p:spPr>
-          <a:xfrm>
-            <a:off x="838200" y="1736049"/>
-            <a:ext cx="10515600" cy="4756826"/>
-          </a:xfrm>
-        </p:spPr>
-      </p:pic>
+        </p:nvSpPr>
+        <p:spPr/>
+        <p:txBody>
+          <a:bodyPr/>
+          <a:lstStyle/>
+          <a:p>
+            <a:pPr marL="0" indent="0">
+              <a:buNone/>
+            </a:pPr>
+            <a:r>
+              <a:rPr lang="en-US" altLang="zh-TW"/>
+              <a:t>1.</a:t>
+            </a:r>
+            <a:r>
+              <a:rPr lang="zh-TW" altLang="en-US"/>
+              <a:t> 學長提供</a:t>
+            </a:r>
+            <a:r>
+              <a:rPr lang="en-US" altLang="zh-TW"/>
+              <a:t>ADC</a:t>
+            </a:r>
+            <a:r>
+              <a:rPr lang="zh-TW" altLang="en-US"/>
+              <a:t> </a:t>
+            </a:r>
+            <a:r>
+              <a:rPr lang="en-US" altLang="zh-TW"/>
+              <a:t>CLK</a:t>
+            </a:r>
+            <a:r>
+              <a:rPr lang="zh-TW" altLang="en-US"/>
+              <a:t> ，</a:t>
+            </a:r>
+            <a:endParaRPr lang="en-US" altLang="zh-TW"/>
+          </a:p>
+          <a:p>
+            <a:pPr marL="0" indent="0">
+              <a:buNone/>
+            </a:pPr>
+            <a:endParaRPr lang="en-US" altLang="zh-TW"/>
+          </a:p>
+          <a:p>
+            <a:pPr marL="0" indent="0">
+              <a:buNone/>
+            </a:pPr>
+            <a:r>
+              <a:rPr lang="en-US" altLang="zh-TW"/>
+              <a:t>2. </a:t>
+            </a:r>
+            <a:endParaRPr lang="zh-TW" altLang="en-US"/>
+          </a:p>
+        </p:txBody>
+      </p:sp>
     </p:spTree>
     <p:extLst>
       <p:ext uri="{BB962C8B-B14F-4D97-AF65-F5344CB8AC3E}">
-        <p14:creationId xmlns:p14="http://schemas.microsoft.com/office/powerpoint/2010/main" val="2828768408"/>
+        <p14:creationId xmlns:p14="http://schemas.microsoft.com/office/powerpoint/2010/main" val="1751698985"/>
       </p:ext>
     </p:extLst>
   </p:cSld>
@@ -7759,7 +8395,7 @@
             </a:pPr>
             <a:r>
               <a:rPr lang="zh-TW" altLang="en-US" sz="2400" dirty="0">
-                <a:hlinkClick r:id="rId2" action="ppaction://hlinksldjump"/>
+                <a:hlinkClick r:id="rId3" action="ppaction://hlinksldjump"/>
               </a:rPr>
               <a:t>傳輸問題 </a:t>
             </a:r>
@@ -7823,7 +8459,7 @@
             </a:pPr>
             <a:r>
               <a:rPr lang="zh-TW" altLang="en-US" sz="2400" dirty="0">
-                <a:hlinkClick r:id="rId3" action="ppaction://hlinksldjump"/>
+                <a:hlinkClick r:id="rId4" action="ppaction://hlinksldjump"/>
               </a:rPr>
               <a:t>最接近顏色</a:t>
             </a:r>

</xml_diff>

<commit_message>
* Underline Something what you do in Project
</commit_message>
<xml_diff>
--- a/Project_Summary_pdf/Project_Summary.pptx
+++ b/Project_Summary_pdf/Project_Summary.pptx
@@ -5,7 +5,7 @@
     <p:sldMasterId id="2147483648" r:id="rId1"/>
   </p:sldMasterIdLst>
   <p:notesMasterIdLst>
-    <p:notesMasterId r:id="rId35"/>
+    <p:notesMasterId r:id="rId37"/>
   </p:notesMasterIdLst>
   <p:sldIdLst>
     <p:sldId id="256" r:id="rId2"/>
@@ -23,24 +23,26 @@
     <p:sldId id="275" r:id="rId14"/>
     <p:sldId id="276" r:id="rId15"/>
     <p:sldId id="277" r:id="rId16"/>
-    <p:sldId id="280" r:id="rId17"/>
-    <p:sldId id="279" r:id="rId18"/>
-    <p:sldId id="283" r:id="rId19"/>
-    <p:sldId id="284" r:id="rId20"/>
-    <p:sldId id="285" r:id="rId21"/>
-    <p:sldId id="286" r:id="rId22"/>
-    <p:sldId id="881" r:id="rId23"/>
-    <p:sldId id="751" r:id="rId24"/>
-    <p:sldId id="882" r:id="rId25"/>
-    <p:sldId id="281" r:id="rId26"/>
-    <p:sldId id="257" r:id="rId27"/>
-    <p:sldId id="258" r:id="rId28"/>
-    <p:sldId id="260" r:id="rId29"/>
-    <p:sldId id="263" r:id="rId30"/>
-    <p:sldId id="264" r:id="rId31"/>
-    <p:sldId id="259" r:id="rId32"/>
-    <p:sldId id="265" r:id="rId33"/>
-    <p:sldId id="282" r:id="rId34"/>
+    <p:sldId id="884" r:id="rId17"/>
+    <p:sldId id="280" r:id="rId18"/>
+    <p:sldId id="279" r:id="rId19"/>
+    <p:sldId id="283" r:id="rId20"/>
+    <p:sldId id="284" r:id="rId21"/>
+    <p:sldId id="285" r:id="rId22"/>
+    <p:sldId id="286" r:id="rId23"/>
+    <p:sldId id="881" r:id="rId24"/>
+    <p:sldId id="751" r:id="rId25"/>
+    <p:sldId id="882" r:id="rId26"/>
+    <p:sldId id="281" r:id="rId27"/>
+    <p:sldId id="257" r:id="rId28"/>
+    <p:sldId id="258" r:id="rId29"/>
+    <p:sldId id="260" r:id="rId30"/>
+    <p:sldId id="263" r:id="rId31"/>
+    <p:sldId id="264" r:id="rId32"/>
+    <p:sldId id="259" r:id="rId33"/>
+    <p:sldId id="265" r:id="rId34"/>
+    <p:sldId id="282" r:id="rId35"/>
+    <p:sldId id="885" r:id="rId36"/>
   </p:sldIdLst>
   <p:sldSz cx="12192000" cy="6858000"/>
   <p:notesSz cx="6858000" cy="9144000"/>
@@ -170,6 +172,7 @@
             <p14:sldId id="275"/>
             <p14:sldId id="276"/>
             <p14:sldId id="277"/>
+            <p14:sldId id="884"/>
             <p14:sldId id="280"/>
             <p14:sldId id="279"/>
             <p14:sldId id="283"/>
@@ -208,6 +211,7 @@
         <p14:section name="完成的重要任務" id="{FA68A893-A763-4D02-8571-DFC6F7755776}">
           <p14:sldIdLst>
             <p14:sldId id="282"/>
+            <p14:sldId id="885"/>
           </p14:sldIdLst>
         </p14:section>
       </p14:sectionLst>
@@ -376,7 +380,7 @@
           <a:p>
             <a:fld id="{C65320F2-F42B-45F1-AA86-96F1A2E46749}" type="datetimeFigureOut">
               <a:rPr lang="zh-TW" altLang="en-US" smtClean="0"/>
-              <a:t>2023/1/17</a:t>
+              <a:t>2023/1/18</a:t>
             </a:fld>
             <a:endParaRPr lang="zh-TW" altLang="en-US"/>
           </a:p>
@@ -792,7 +796,7 @@
           <a:p>
             <a:fld id="{0116F853-F7F2-4239-A629-A213C1D67574}" type="slidenum">
               <a:rPr lang="zh-TW" altLang="en-US" smtClean="0"/>
-              <a:t>26</a:t>
+              <a:t>27</a:t>
             </a:fld>
             <a:endParaRPr lang="zh-TW" altLang="en-US"/>
           </a:p>
@@ -940,7 +944,7 @@
           <a:p>
             <a:fld id="{0116F853-F7F2-4239-A629-A213C1D67574}" type="slidenum">
               <a:rPr lang="zh-TW" altLang="en-US" smtClean="0"/>
-              <a:t>27</a:t>
+              <a:t>28</a:t>
             </a:fld>
             <a:endParaRPr lang="zh-TW" altLang="en-US"/>
           </a:p>
@@ -1003,9 +1007,12 @@
           <a:bodyPr/>
           <a:lstStyle/>
           <a:p>
-            <a:r>
-              <a:rPr lang="en-US" altLang="zh-TW" dirty="0"/>
-              <a:t>1. HW </a:t>
+            <a:pPr marL="228600" indent="-228600">
+              <a:buAutoNum type="arabicPeriod"/>
+            </a:pPr>
+            <a:r>
+              <a:rPr lang="en-US" altLang="zh-TW" dirty="0"/>
+              <a:t>HW </a:t>
             </a:r>
             <a:r>
               <a:rPr lang="zh-TW" altLang="en-US" dirty="0"/>
@@ -1039,7 +1046,61 @@
               <a:rPr lang="en-US" altLang="zh-TW" dirty="0"/>
               <a:t>Port</a:t>
             </a:r>
-            <a:endParaRPr lang="zh-TW" altLang="en-US" dirty="0"/>
+            <a:r>
+              <a:rPr lang="zh-TW" altLang="en-US" dirty="0"/>
+              <a:t>，代表實際上</a:t>
+            </a:r>
+            <a:r>
+              <a:rPr lang="en-US" altLang="zh-TW" dirty="0"/>
+              <a:t>HW</a:t>
+            </a:r>
+            <a:r>
+              <a:rPr lang="zh-TW" altLang="en-US" dirty="0"/>
+              <a:t> </a:t>
+            </a:r>
+            <a:r>
+              <a:rPr lang="en-US" altLang="zh-TW" dirty="0"/>
+              <a:t>SAR ADC</a:t>
+            </a:r>
+            <a:r>
+              <a:rPr lang="zh-TW" altLang="en-US" dirty="0"/>
+              <a:t>的過程。</a:t>
+            </a:r>
+            <a:endParaRPr lang="en-US" altLang="zh-TW" dirty="0"/>
+          </a:p>
+          <a:p>
+            <a:pPr marL="228600" indent="-228600">
+              <a:buAutoNum type="arabicPeriod"/>
+            </a:pPr>
+            <a:r>
+              <a:rPr lang="zh-TW" altLang="en-US" dirty="0"/>
+              <a:t>讀</a:t>
+            </a:r>
+            <a:r>
+              <a:rPr lang="en-US" altLang="zh-TW" dirty="0"/>
+              <a:t>ADC Data</a:t>
+            </a:r>
+            <a:r>
+              <a:rPr lang="zh-TW" altLang="en-US" dirty="0"/>
+              <a:t>不需要像外部</a:t>
+            </a:r>
+            <a:r>
+              <a:rPr lang="en-US" altLang="zh-TW" dirty="0"/>
+              <a:t>Sensor</a:t>
+            </a:r>
+            <a:r>
+              <a:rPr lang="zh-TW" altLang="en-US" dirty="0"/>
+              <a:t>一樣，</a:t>
+            </a:r>
+            <a:r>
+              <a:rPr lang="en-US" altLang="zh-TW" dirty="0" err="1"/>
+              <a:t>SampleRate</a:t>
+            </a:r>
+            <a:r>
+              <a:rPr lang="zh-TW" altLang="en-US" dirty="0"/>
+              <a:t>過於慢</a:t>
+            </a:r>
+            <a:endParaRPr lang="en-US" altLang="zh-TW" dirty="0"/>
           </a:p>
         </p:txBody>
       </p:sp>
@@ -1805,7 +1866,7 @@
           <a:p>
             <a:fld id="{0116F853-F7F2-4239-A629-A213C1D67574}" type="slidenum">
               <a:rPr lang="zh-TW" altLang="en-US" smtClean="0"/>
-              <a:t>17</a:t>
+              <a:t>18</a:t>
             </a:fld>
             <a:endParaRPr lang="zh-TW" altLang="en-US"/>
           </a:p>
@@ -1908,7 +1969,7 @@
           <a:p>
             <a:fld id="{0116F853-F7F2-4239-A629-A213C1D67574}" type="slidenum">
               <a:rPr lang="zh-TW" altLang="en-US" smtClean="0"/>
-              <a:t>19</a:t>
+              <a:t>20</a:t>
             </a:fld>
             <a:endParaRPr lang="zh-TW" altLang="en-US"/>
           </a:p>
@@ -2074,7 +2135,7 @@
           <a:p>
             <a:fld id="{8A9F4CB5-1750-4E23-A13C-2C1F028F9724}" type="datetimeFigureOut">
               <a:rPr lang="zh-TW" altLang="en-US" smtClean="0"/>
-              <a:t>2023/1/17</a:t>
+              <a:t>2023/1/18</a:t>
             </a:fld>
             <a:endParaRPr lang="zh-TW" altLang="en-US"/>
           </a:p>
@@ -2272,7 +2333,7 @@
           <a:p>
             <a:fld id="{8A9F4CB5-1750-4E23-A13C-2C1F028F9724}" type="datetimeFigureOut">
               <a:rPr lang="zh-TW" altLang="en-US" smtClean="0"/>
-              <a:t>2023/1/17</a:t>
+              <a:t>2023/1/18</a:t>
             </a:fld>
             <a:endParaRPr lang="zh-TW" altLang="en-US"/>
           </a:p>
@@ -2480,7 +2541,7 @@
           <a:p>
             <a:fld id="{8A9F4CB5-1750-4E23-A13C-2C1F028F9724}" type="datetimeFigureOut">
               <a:rPr lang="zh-TW" altLang="en-US" smtClean="0"/>
-              <a:t>2023/1/17</a:t>
+              <a:t>2023/1/18</a:t>
             </a:fld>
             <a:endParaRPr lang="zh-TW" altLang="en-US"/>
           </a:p>
@@ -2678,7 +2739,7 @@
           <a:p>
             <a:fld id="{8A9F4CB5-1750-4E23-A13C-2C1F028F9724}" type="datetimeFigureOut">
               <a:rPr lang="zh-TW" altLang="en-US" smtClean="0"/>
-              <a:t>2023/1/17</a:t>
+              <a:t>2023/1/18</a:t>
             </a:fld>
             <a:endParaRPr lang="zh-TW" altLang="en-US"/>
           </a:p>
@@ -2953,7 +3014,7 @@
           <a:p>
             <a:fld id="{8A9F4CB5-1750-4E23-A13C-2C1F028F9724}" type="datetimeFigureOut">
               <a:rPr lang="zh-TW" altLang="en-US" smtClean="0"/>
-              <a:t>2023/1/17</a:t>
+              <a:t>2023/1/18</a:t>
             </a:fld>
             <a:endParaRPr lang="zh-TW" altLang="en-US"/>
           </a:p>
@@ -3218,7 +3279,7 @@
           <a:p>
             <a:fld id="{8A9F4CB5-1750-4E23-A13C-2C1F028F9724}" type="datetimeFigureOut">
               <a:rPr lang="zh-TW" altLang="en-US" smtClean="0"/>
-              <a:t>2023/1/17</a:t>
+              <a:t>2023/1/18</a:t>
             </a:fld>
             <a:endParaRPr lang="zh-TW" altLang="en-US"/>
           </a:p>
@@ -3630,7 +3691,7 @@
           <a:p>
             <a:fld id="{8A9F4CB5-1750-4E23-A13C-2C1F028F9724}" type="datetimeFigureOut">
               <a:rPr lang="zh-TW" altLang="en-US" smtClean="0"/>
-              <a:t>2023/1/17</a:t>
+              <a:t>2023/1/18</a:t>
             </a:fld>
             <a:endParaRPr lang="zh-TW" altLang="en-US"/>
           </a:p>
@@ -3771,7 +3832,7 @@
           <a:p>
             <a:fld id="{8A9F4CB5-1750-4E23-A13C-2C1F028F9724}" type="datetimeFigureOut">
               <a:rPr lang="zh-TW" altLang="en-US" smtClean="0"/>
-              <a:t>2023/1/17</a:t>
+              <a:t>2023/1/18</a:t>
             </a:fld>
             <a:endParaRPr lang="zh-TW" altLang="en-US"/>
           </a:p>
@@ -3884,7 +3945,7 @@
           <a:p>
             <a:fld id="{8A9F4CB5-1750-4E23-A13C-2C1F028F9724}" type="datetimeFigureOut">
               <a:rPr lang="zh-TW" altLang="en-US" smtClean="0"/>
-              <a:t>2023/1/17</a:t>
+              <a:t>2023/1/18</a:t>
             </a:fld>
             <a:endParaRPr lang="zh-TW" altLang="en-US"/>
           </a:p>
@@ -4195,7 +4256,7 @@
           <a:p>
             <a:fld id="{8A9F4CB5-1750-4E23-A13C-2C1F028F9724}" type="datetimeFigureOut">
               <a:rPr lang="zh-TW" altLang="en-US" smtClean="0"/>
-              <a:t>2023/1/17</a:t>
+              <a:t>2023/1/18</a:t>
             </a:fld>
             <a:endParaRPr lang="zh-TW" altLang="en-US"/>
           </a:p>
@@ -4483,7 +4544,7 @@
           <a:p>
             <a:fld id="{8A9F4CB5-1750-4E23-A13C-2C1F028F9724}" type="datetimeFigureOut">
               <a:rPr lang="zh-TW" altLang="en-US" smtClean="0"/>
-              <a:t>2023/1/17</a:t>
+              <a:t>2023/1/18</a:t>
             </a:fld>
             <a:endParaRPr lang="zh-TW" altLang="en-US"/>
           </a:p>
@@ -4724,7 +4785,7 @@
           <a:p>
             <a:fld id="{8A9F4CB5-1750-4E23-A13C-2C1F028F9724}" type="datetimeFigureOut">
               <a:rPr lang="zh-TW" altLang="en-US" smtClean="0"/>
-              <a:t>2023/1/17</a:t>
+              <a:t>2023/1/18</a:t>
             </a:fld>
             <a:endParaRPr lang="zh-TW" altLang="en-US"/>
           </a:p>
@@ -7049,7 +7110,7 @@
           <p:cNvPr id="2" name="標題 1">
             <a:extLst>
               <a:ext uri="{FF2B5EF4-FFF2-40B4-BE49-F238E27FC236}">
-                <a16:creationId xmlns:a16="http://schemas.microsoft.com/office/drawing/2014/main" id="{8D4240B2-F578-CF62-D512-1EAAFE6C0D75}"/>
+                <a16:creationId xmlns:a16="http://schemas.microsoft.com/office/drawing/2014/main" id="{27D7CE05-4B46-09E5-60E9-515EECCDEDCC}"/>
               </a:ext>
             </a:extLst>
           </p:cNvPr>
@@ -7067,511 +7128,57 @@
           <a:p>
             <a:pPr algn="ctr"/>
             <a:r>
-              <a:rPr lang="en-US" altLang="zh-TW" dirty="0"/>
-              <a:t>Data Group</a:t>
-            </a:r>
+              <a:rPr lang="zh-TW" altLang="en-US" dirty="0"/>
+              <a:t>早期</a:t>
+            </a:r>
+            <a:r>
+              <a:rPr lang="en-US" altLang="zh-TW" dirty="0"/>
+              <a:t>SAR</a:t>
+            </a:r>
+            <a:r>
+              <a:rPr lang="zh-TW" altLang="en-US" dirty="0"/>
+              <a:t> </a:t>
+            </a:r>
+            <a:r>
+              <a:rPr lang="en-US" altLang="zh-TW" dirty="0"/>
+              <a:t>ADC</a:t>
+            </a:r>
+            <a:r>
+              <a:rPr lang="zh-TW" altLang="en-US" dirty="0"/>
+              <a:t>作法</a:t>
+            </a:r>
+          </a:p>
+        </p:txBody>
+      </p:sp>
+      <p:sp>
+        <p:nvSpPr>
+          <p:cNvPr id="3" name="內容版面配置區 2">
+            <a:extLst>
+              <a:ext uri="{FF2B5EF4-FFF2-40B4-BE49-F238E27FC236}">
+                <a16:creationId xmlns:a16="http://schemas.microsoft.com/office/drawing/2014/main" id="{E5D31E34-A6F4-3658-40C7-6563EC600493}"/>
+              </a:ext>
+            </a:extLst>
+          </p:cNvPr>
+          <p:cNvSpPr>
+            <a:spLocks noGrp="1"/>
+          </p:cNvSpPr>
+          <p:nvPr>
+            <p:ph idx="1"/>
+          </p:nvPr>
+        </p:nvSpPr>
+        <p:spPr/>
+        <p:txBody>
+          <a:bodyPr/>
+          <a:lstStyle/>
+          <a:p>
             <a:endParaRPr lang="zh-TW" altLang="en-US" dirty="0"/>
-          </a:p>
-        </p:txBody>
-      </p:sp>
-      <p:pic>
-        <p:nvPicPr>
-          <p:cNvPr id="5" name="內容版面配置區 4">
-            <a:extLst>
-              <a:ext uri="{FF2B5EF4-FFF2-40B4-BE49-F238E27FC236}">
-                <a16:creationId xmlns:a16="http://schemas.microsoft.com/office/drawing/2014/main" id="{B4BE2AF3-3935-2060-EE77-9DE7C59D5FCD}"/>
-              </a:ext>
-            </a:extLst>
-          </p:cNvPr>
-          <p:cNvPicPr>
-            <a:picLocks noGrp="1" noChangeAspect="1"/>
-          </p:cNvPicPr>
-          <p:nvPr>
-            <p:ph idx="1"/>
-          </p:nvPr>
-        </p:nvPicPr>
-        <p:blipFill>
-          <a:blip r:embed="rId2">
-            <a:extLst>
-              <a:ext uri="{28A0092B-C50C-407E-A947-70E740481C1C}">
-                <a14:useLocalDpi xmlns:a14="http://schemas.microsoft.com/office/drawing/2010/main" val="0"/>
-              </a:ext>
-            </a:extLst>
-          </a:blip>
-          <a:stretch>
-            <a:fillRect/>
-          </a:stretch>
-        </p:blipFill>
-        <p:spPr>
-          <a:xfrm>
-            <a:off x="838200" y="1789889"/>
-            <a:ext cx="10515600" cy="4581728"/>
-          </a:xfrm>
-        </p:spPr>
-      </p:pic>
-      <p:sp>
-        <p:nvSpPr>
-          <p:cNvPr id="6" name="矩形 5">
-            <a:extLst>
-              <a:ext uri="{FF2B5EF4-FFF2-40B4-BE49-F238E27FC236}">
-                <a16:creationId xmlns:a16="http://schemas.microsoft.com/office/drawing/2014/main" id="{7E3972CA-9895-D02B-B2B2-25E0CA83774F}"/>
-              </a:ext>
-            </a:extLst>
-          </p:cNvPr>
-          <p:cNvSpPr/>
-          <p:nvPr/>
-        </p:nvSpPr>
-        <p:spPr>
-          <a:xfrm>
-            <a:off x="3540868" y="1957184"/>
-            <a:ext cx="486383" cy="4513634"/>
-          </a:xfrm>
-          <a:prstGeom prst="rect">
-            <a:avLst/>
-          </a:prstGeom>
-          <a:noFill/>
-          <a:ln w="57150">
-            <a:solidFill>
-              <a:srgbClr val="FF0000"/>
-            </a:solidFill>
-            <a:prstDash val="sysDot"/>
-          </a:ln>
-        </p:spPr>
-        <p:style>
-          <a:lnRef idx="2">
-            <a:schemeClr val="accent1">
-              <a:shade val="50000"/>
-            </a:schemeClr>
-          </a:lnRef>
-          <a:fillRef idx="1">
-            <a:schemeClr val="accent1"/>
-          </a:fillRef>
-          <a:effectRef idx="0">
-            <a:schemeClr val="accent1"/>
-          </a:effectRef>
-          <a:fontRef idx="minor">
-            <a:schemeClr val="lt1"/>
-          </a:fontRef>
-        </p:style>
-        <p:txBody>
-          <a:bodyPr rtlCol="0" anchor="ctr"/>
-          <a:lstStyle/>
-          <a:p>
-            <a:pPr algn="ctr"/>
-            <a:endParaRPr lang="zh-TW" altLang="en-US" dirty="0"/>
-          </a:p>
-        </p:txBody>
-      </p:sp>
-      <p:sp>
-        <p:nvSpPr>
-          <p:cNvPr id="7" name="矩形 6">
-            <a:extLst>
-              <a:ext uri="{FF2B5EF4-FFF2-40B4-BE49-F238E27FC236}">
-                <a16:creationId xmlns:a16="http://schemas.microsoft.com/office/drawing/2014/main" id="{4A6AF674-F91B-80F0-B5D3-71347C318DC1}"/>
-              </a:ext>
-            </a:extLst>
-          </p:cNvPr>
-          <p:cNvSpPr/>
-          <p:nvPr/>
-        </p:nvSpPr>
-        <p:spPr>
-          <a:xfrm>
-            <a:off x="4928680" y="1957184"/>
-            <a:ext cx="486383" cy="4513634"/>
-          </a:xfrm>
-          <a:prstGeom prst="rect">
-            <a:avLst/>
-          </a:prstGeom>
-          <a:noFill/>
-          <a:ln w="57150">
-            <a:solidFill>
-              <a:srgbClr val="FF0000"/>
-            </a:solidFill>
-            <a:prstDash val="sysDot"/>
-          </a:ln>
-        </p:spPr>
-        <p:style>
-          <a:lnRef idx="2">
-            <a:schemeClr val="accent1">
-              <a:shade val="50000"/>
-            </a:schemeClr>
-          </a:lnRef>
-          <a:fillRef idx="1">
-            <a:schemeClr val="accent1"/>
-          </a:fillRef>
-          <a:effectRef idx="0">
-            <a:schemeClr val="accent1"/>
-          </a:effectRef>
-          <a:fontRef idx="minor">
-            <a:schemeClr val="lt1"/>
-          </a:fontRef>
-        </p:style>
-        <p:txBody>
-          <a:bodyPr rtlCol="0" anchor="ctr"/>
-          <a:lstStyle/>
-          <a:p>
-            <a:pPr algn="ctr"/>
-            <a:endParaRPr lang="zh-TW" altLang="en-US" dirty="0"/>
-          </a:p>
-        </p:txBody>
-      </p:sp>
-      <p:sp>
-        <p:nvSpPr>
-          <p:cNvPr id="8" name="矩形 7">
-            <a:extLst>
-              <a:ext uri="{FF2B5EF4-FFF2-40B4-BE49-F238E27FC236}">
-                <a16:creationId xmlns:a16="http://schemas.microsoft.com/office/drawing/2014/main" id="{844E6CE4-65C5-7B55-EB1C-52F550648F31}"/>
-              </a:ext>
-            </a:extLst>
-          </p:cNvPr>
-          <p:cNvSpPr/>
-          <p:nvPr/>
-        </p:nvSpPr>
-        <p:spPr>
-          <a:xfrm>
-            <a:off x="6384587" y="1957184"/>
-            <a:ext cx="486383" cy="4513634"/>
-          </a:xfrm>
-          <a:prstGeom prst="rect">
-            <a:avLst/>
-          </a:prstGeom>
-          <a:noFill/>
-          <a:ln w="57150">
-            <a:solidFill>
-              <a:srgbClr val="FF0000"/>
-            </a:solidFill>
-            <a:prstDash val="sysDot"/>
-          </a:ln>
-        </p:spPr>
-        <p:style>
-          <a:lnRef idx="2">
-            <a:schemeClr val="accent1">
-              <a:shade val="50000"/>
-            </a:schemeClr>
-          </a:lnRef>
-          <a:fillRef idx="1">
-            <a:schemeClr val="accent1"/>
-          </a:fillRef>
-          <a:effectRef idx="0">
-            <a:schemeClr val="accent1"/>
-          </a:effectRef>
-          <a:fontRef idx="minor">
-            <a:schemeClr val="lt1"/>
-          </a:fontRef>
-        </p:style>
-        <p:txBody>
-          <a:bodyPr rtlCol="0" anchor="ctr"/>
-          <a:lstStyle/>
-          <a:p>
-            <a:pPr algn="ctr"/>
-            <a:endParaRPr lang="zh-TW" altLang="en-US" dirty="0"/>
-          </a:p>
-        </p:txBody>
-      </p:sp>
-      <p:sp>
-        <p:nvSpPr>
-          <p:cNvPr id="9" name="矩形 8">
-            <a:extLst>
-              <a:ext uri="{FF2B5EF4-FFF2-40B4-BE49-F238E27FC236}">
-                <a16:creationId xmlns:a16="http://schemas.microsoft.com/office/drawing/2014/main" id="{0F4F6726-83EB-B2D0-B6B2-2AA7056627E4}"/>
-              </a:ext>
-            </a:extLst>
-          </p:cNvPr>
-          <p:cNvSpPr/>
-          <p:nvPr/>
-        </p:nvSpPr>
-        <p:spPr>
-          <a:xfrm>
-            <a:off x="7678368" y="1957184"/>
-            <a:ext cx="486383" cy="4513634"/>
-          </a:xfrm>
-          <a:prstGeom prst="rect">
-            <a:avLst/>
-          </a:prstGeom>
-          <a:noFill/>
-          <a:ln w="57150">
-            <a:solidFill>
-              <a:srgbClr val="FF0000"/>
-            </a:solidFill>
-            <a:prstDash val="sysDot"/>
-          </a:ln>
-        </p:spPr>
-        <p:style>
-          <a:lnRef idx="2">
-            <a:schemeClr val="accent1">
-              <a:shade val="50000"/>
-            </a:schemeClr>
-          </a:lnRef>
-          <a:fillRef idx="1">
-            <a:schemeClr val="accent1"/>
-          </a:fillRef>
-          <a:effectRef idx="0">
-            <a:schemeClr val="accent1"/>
-          </a:effectRef>
-          <a:fontRef idx="minor">
-            <a:schemeClr val="lt1"/>
-          </a:fontRef>
-        </p:style>
-        <p:txBody>
-          <a:bodyPr rtlCol="0" anchor="ctr"/>
-          <a:lstStyle/>
-          <a:p>
-            <a:pPr algn="ctr"/>
-            <a:endParaRPr lang="zh-TW" altLang="en-US" dirty="0"/>
-          </a:p>
-        </p:txBody>
-      </p:sp>
-      <p:sp>
-        <p:nvSpPr>
-          <p:cNvPr id="10" name="矩形 9">
-            <a:extLst>
-              <a:ext uri="{FF2B5EF4-FFF2-40B4-BE49-F238E27FC236}">
-                <a16:creationId xmlns:a16="http://schemas.microsoft.com/office/drawing/2014/main" id="{645EA756-DF06-9EFD-21F4-44D8FFAB2877}"/>
-              </a:ext>
-            </a:extLst>
-          </p:cNvPr>
-          <p:cNvSpPr/>
-          <p:nvPr/>
-        </p:nvSpPr>
-        <p:spPr>
-          <a:xfrm>
-            <a:off x="9153729" y="1957184"/>
-            <a:ext cx="486383" cy="4513634"/>
-          </a:xfrm>
-          <a:prstGeom prst="rect">
-            <a:avLst/>
-          </a:prstGeom>
-          <a:noFill/>
-          <a:ln w="57150">
-            <a:solidFill>
-              <a:srgbClr val="FF0000"/>
-            </a:solidFill>
-            <a:prstDash val="sysDot"/>
-          </a:ln>
-        </p:spPr>
-        <p:style>
-          <a:lnRef idx="2">
-            <a:schemeClr val="accent1">
-              <a:shade val="50000"/>
-            </a:schemeClr>
-          </a:lnRef>
-          <a:fillRef idx="1">
-            <a:schemeClr val="accent1"/>
-          </a:fillRef>
-          <a:effectRef idx="0">
-            <a:schemeClr val="accent1"/>
-          </a:effectRef>
-          <a:fontRef idx="minor">
-            <a:schemeClr val="lt1"/>
-          </a:fontRef>
-        </p:style>
-        <p:txBody>
-          <a:bodyPr rtlCol="0" anchor="ctr"/>
-          <a:lstStyle/>
-          <a:p>
-            <a:pPr algn="ctr"/>
-            <a:endParaRPr lang="zh-TW" altLang="en-US" dirty="0"/>
-          </a:p>
-        </p:txBody>
-      </p:sp>
-      <p:sp>
-        <p:nvSpPr>
-          <p:cNvPr id="11" name="矩形 10">
-            <a:extLst>
-              <a:ext uri="{FF2B5EF4-FFF2-40B4-BE49-F238E27FC236}">
-                <a16:creationId xmlns:a16="http://schemas.microsoft.com/office/drawing/2014/main" id="{5B61E8B6-479A-05C7-05EF-A64D6F5AFC92}"/>
-              </a:ext>
-            </a:extLst>
-          </p:cNvPr>
-          <p:cNvSpPr/>
-          <p:nvPr/>
-        </p:nvSpPr>
-        <p:spPr>
-          <a:xfrm>
-            <a:off x="10473448" y="1957184"/>
-            <a:ext cx="486383" cy="4513634"/>
-          </a:xfrm>
-          <a:prstGeom prst="rect">
-            <a:avLst/>
-          </a:prstGeom>
-          <a:noFill/>
-          <a:ln w="57150">
-            <a:solidFill>
-              <a:srgbClr val="FF0000"/>
-            </a:solidFill>
-            <a:prstDash val="sysDot"/>
-          </a:ln>
-        </p:spPr>
-        <p:style>
-          <a:lnRef idx="2">
-            <a:schemeClr val="accent1">
-              <a:shade val="50000"/>
-            </a:schemeClr>
-          </a:lnRef>
-          <a:fillRef idx="1">
-            <a:schemeClr val="accent1"/>
-          </a:fillRef>
-          <a:effectRef idx="0">
-            <a:schemeClr val="accent1"/>
-          </a:effectRef>
-          <a:fontRef idx="minor">
-            <a:schemeClr val="lt1"/>
-          </a:fontRef>
-        </p:style>
-        <p:txBody>
-          <a:bodyPr rtlCol="0" anchor="ctr"/>
-          <a:lstStyle/>
-          <a:p>
-            <a:pPr algn="ctr"/>
-            <a:endParaRPr lang="zh-TW" altLang="en-US" dirty="0"/>
-          </a:p>
-        </p:txBody>
-      </p:sp>
-      <p:sp>
-        <p:nvSpPr>
-          <p:cNvPr id="12" name="矩形 11">
-            <a:extLst>
-              <a:ext uri="{FF2B5EF4-FFF2-40B4-BE49-F238E27FC236}">
-                <a16:creationId xmlns:a16="http://schemas.microsoft.com/office/drawing/2014/main" id="{94D97ABF-9CFA-9133-411C-86970864CAC8}"/>
-              </a:ext>
-            </a:extLst>
-          </p:cNvPr>
-          <p:cNvSpPr/>
-          <p:nvPr/>
-        </p:nvSpPr>
-        <p:spPr>
-          <a:xfrm>
-            <a:off x="2247087" y="1979241"/>
-            <a:ext cx="486383" cy="4513634"/>
-          </a:xfrm>
-          <a:prstGeom prst="rect">
-            <a:avLst/>
-          </a:prstGeom>
-          <a:noFill/>
-          <a:ln w="57150">
-            <a:solidFill>
-              <a:srgbClr val="FF0000"/>
-            </a:solidFill>
-            <a:prstDash val="sysDot"/>
-          </a:ln>
-        </p:spPr>
-        <p:style>
-          <a:lnRef idx="2">
-            <a:schemeClr val="accent1">
-              <a:shade val="50000"/>
-            </a:schemeClr>
-          </a:lnRef>
-          <a:fillRef idx="1">
-            <a:schemeClr val="accent1"/>
-          </a:fillRef>
-          <a:effectRef idx="0">
-            <a:schemeClr val="accent1"/>
-          </a:effectRef>
-          <a:fontRef idx="minor">
-            <a:schemeClr val="lt1"/>
-          </a:fontRef>
-        </p:style>
-        <p:txBody>
-          <a:bodyPr rtlCol="0" anchor="ctr"/>
-          <a:lstStyle/>
-          <a:p>
-            <a:pPr algn="ctr"/>
-            <a:endParaRPr lang="zh-TW" altLang="en-US" dirty="0"/>
-          </a:p>
-        </p:txBody>
-      </p:sp>
-      <p:sp>
-        <p:nvSpPr>
-          <p:cNvPr id="13" name="文字方塊 12">
-            <a:extLst>
-              <a:ext uri="{FF2B5EF4-FFF2-40B4-BE49-F238E27FC236}">
-                <a16:creationId xmlns:a16="http://schemas.microsoft.com/office/drawing/2014/main" id="{8DA45A5D-DFA9-1B64-7640-236C27475B4C}"/>
-              </a:ext>
-            </a:extLst>
-          </p:cNvPr>
-          <p:cNvSpPr txBox="1"/>
-          <p:nvPr/>
-        </p:nvSpPr>
-        <p:spPr>
-          <a:xfrm>
-            <a:off x="2081717" y="1299299"/>
-            <a:ext cx="1459151" cy="369332"/>
-          </a:xfrm>
-          <a:prstGeom prst="rect">
-            <a:avLst/>
-          </a:prstGeom>
-          <a:noFill/>
-        </p:spPr>
-        <p:txBody>
-          <a:bodyPr wrap="square" rtlCol="0">
-            <a:spAutoFit/>
-          </a:bodyPr>
-          <a:lstStyle/>
-          <a:p>
-            <a:r>
-              <a:rPr lang="en-US" altLang="zh-TW" dirty="0">
-                <a:solidFill>
-                  <a:srgbClr val="FF0000"/>
-                </a:solidFill>
-              </a:rPr>
-              <a:t>Group1</a:t>
-            </a:r>
-            <a:endParaRPr lang="zh-TW" altLang="en-US" dirty="0">
-              <a:solidFill>
-                <a:srgbClr val="FF0000"/>
-              </a:solidFill>
-            </a:endParaRPr>
-          </a:p>
-        </p:txBody>
-      </p:sp>
-      <p:sp>
-        <p:nvSpPr>
-          <p:cNvPr id="14" name="文字方塊 13">
-            <a:extLst>
-              <a:ext uri="{FF2B5EF4-FFF2-40B4-BE49-F238E27FC236}">
-                <a16:creationId xmlns:a16="http://schemas.microsoft.com/office/drawing/2014/main" id="{E3FFAC2B-F0A9-BC21-9F19-43321E5B4222}"/>
-              </a:ext>
-            </a:extLst>
-          </p:cNvPr>
-          <p:cNvSpPr txBox="1"/>
-          <p:nvPr/>
-        </p:nvSpPr>
-        <p:spPr>
-          <a:xfrm>
-            <a:off x="3383600" y="1299299"/>
-            <a:ext cx="1459151" cy="369332"/>
-          </a:xfrm>
-          <a:prstGeom prst="rect">
-            <a:avLst/>
-          </a:prstGeom>
-          <a:noFill/>
-        </p:spPr>
-        <p:txBody>
-          <a:bodyPr wrap="square" rtlCol="0">
-            <a:spAutoFit/>
-          </a:bodyPr>
-          <a:lstStyle/>
-          <a:p>
-            <a:r>
-              <a:rPr lang="en-US" altLang="zh-TW" dirty="0">
-                <a:solidFill>
-                  <a:srgbClr val="FF0000"/>
-                </a:solidFill>
-              </a:rPr>
-              <a:t>Group2</a:t>
-            </a:r>
-            <a:endParaRPr lang="zh-TW" altLang="en-US" dirty="0">
-              <a:solidFill>
-                <a:srgbClr val="FF0000"/>
-              </a:solidFill>
-            </a:endParaRPr>
           </a:p>
         </p:txBody>
       </p:sp>
     </p:spTree>
     <p:extLst>
       <p:ext uri="{BB962C8B-B14F-4D97-AF65-F5344CB8AC3E}">
-        <p14:creationId xmlns:p14="http://schemas.microsoft.com/office/powerpoint/2010/main" val="3330601349"/>
+        <p14:creationId xmlns:p14="http://schemas.microsoft.com/office/powerpoint/2010/main" val="4051812973"/>
       </p:ext>
     </p:extLst>
   </p:cSld>
@@ -7603,7 +7210,7 @@
           <p:cNvPr id="2" name="標題 1">
             <a:extLst>
               <a:ext uri="{FF2B5EF4-FFF2-40B4-BE49-F238E27FC236}">
-                <a16:creationId xmlns:a16="http://schemas.microsoft.com/office/drawing/2014/main" id="{F088A994-769F-D5F3-F4FC-1CBDD7540D2D}"/>
+                <a16:creationId xmlns:a16="http://schemas.microsoft.com/office/drawing/2014/main" id="{8D4240B2-F578-CF62-D512-1EAAFE6C0D75}"/>
               </a:ext>
             </a:extLst>
           </p:cNvPr>
@@ -7622,15 +7229,7 @@
             <a:pPr algn="ctr"/>
             <a:r>
               <a:rPr lang="en-US" altLang="zh-TW" dirty="0"/>
-              <a:t>LA</a:t>
-            </a:r>
-            <a:r>
-              <a:rPr lang="zh-TW" altLang="en-US" dirty="0"/>
-              <a:t> 不經過處理的</a:t>
-            </a:r>
-            <a:r>
-              <a:rPr lang="en-US" altLang="zh-TW" dirty="0"/>
-              <a:t>Waveform</a:t>
+              <a:t>Data Group</a:t>
             </a:r>
             <a:endParaRPr lang="zh-TW" altLang="en-US" dirty="0"/>
           </a:p>
@@ -7641,7 +7240,7 @@
           <p:cNvPr id="5" name="內容版面配置區 4">
             <a:extLst>
               <a:ext uri="{FF2B5EF4-FFF2-40B4-BE49-F238E27FC236}">
-                <a16:creationId xmlns:a16="http://schemas.microsoft.com/office/drawing/2014/main" id="{D45CD3D2-2AF4-7403-A594-B7DB1B6339D3}"/>
+                <a16:creationId xmlns:a16="http://schemas.microsoft.com/office/drawing/2014/main" id="{B4BE2AF3-3935-2060-EE77-9DE7C59D5FCD}"/>
               </a:ext>
             </a:extLst>
           </p:cNvPr>
@@ -7653,27 +7252,487 @@
           </p:nvPr>
         </p:nvPicPr>
         <p:blipFill>
-          <a:blip r:embed="rId3">
+          <a:blip r:embed="rId2">
             <a:extLst>
               <a:ext uri="{28A0092B-C50C-407E-A947-70E740481C1C}">
                 <a14:useLocalDpi xmlns:a14="http://schemas.microsoft.com/office/drawing/2010/main" val="0"/>
               </a:ext>
             </a:extLst>
           </a:blip>
-          <a:srcRect/>
-          <a:stretch/>
+          <a:stretch>
+            <a:fillRect/>
+          </a:stretch>
         </p:blipFill>
         <p:spPr>
           <a:xfrm>
-            <a:off x="1560547" y="1825625"/>
-            <a:ext cx="9070906" cy="4351338"/>
+            <a:off x="838200" y="1789889"/>
+            <a:ext cx="10515600" cy="4581728"/>
           </a:xfrm>
         </p:spPr>
       </p:pic>
+      <p:sp>
+        <p:nvSpPr>
+          <p:cNvPr id="6" name="矩形 5">
+            <a:extLst>
+              <a:ext uri="{FF2B5EF4-FFF2-40B4-BE49-F238E27FC236}">
+                <a16:creationId xmlns:a16="http://schemas.microsoft.com/office/drawing/2014/main" id="{7E3972CA-9895-D02B-B2B2-25E0CA83774F}"/>
+              </a:ext>
+            </a:extLst>
+          </p:cNvPr>
+          <p:cNvSpPr/>
+          <p:nvPr/>
+        </p:nvSpPr>
+        <p:spPr>
+          <a:xfrm>
+            <a:off x="3540868" y="1957184"/>
+            <a:ext cx="486383" cy="4513634"/>
+          </a:xfrm>
+          <a:prstGeom prst="rect">
+            <a:avLst/>
+          </a:prstGeom>
+          <a:noFill/>
+          <a:ln w="57150">
+            <a:solidFill>
+              <a:srgbClr val="FF0000"/>
+            </a:solidFill>
+            <a:prstDash val="sysDot"/>
+          </a:ln>
+        </p:spPr>
+        <p:style>
+          <a:lnRef idx="2">
+            <a:schemeClr val="accent1">
+              <a:shade val="50000"/>
+            </a:schemeClr>
+          </a:lnRef>
+          <a:fillRef idx="1">
+            <a:schemeClr val="accent1"/>
+          </a:fillRef>
+          <a:effectRef idx="0">
+            <a:schemeClr val="accent1"/>
+          </a:effectRef>
+          <a:fontRef idx="minor">
+            <a:schemeClr val="lt1"/>
+          </a:fontRef>
+        </p:style>
+        <p:txBody>
+          <a:bodyPr rtlCol="0" anchor="ctr"/>
+          <a:lstStyle/>
+          <a:p>
+            <a:pPr algn="ctr"/>
+            <a:endParaRPr lang="zh-TW" altLang="en-US" dirty="0"/>
+          </a:p>
+        </p:txBody>
+      </p:sp>
+      <p:sp>
+        <p:nvSpPr>
+          <p:cNvPr id="7" name="矩形 6">
+            <a:extLst>
+              <a:ext uri="{FF2B5EF4-FFF2-40B4-BE49-F238E27FC236}">
+                <a16:creationId xmlns:a16="http://schemas.microsoft.com/office/drawing/2014/main" id="{4A6AF674-F91B-80F0-B5D3-71347C318DC1}"/>
+              </a:ext>
+            </a:extLst>
+          </p:cNvPr>
+          <p:cNvSpPr/>
+          <p:nvPr/>
+        </p:nvSpPr>
+        <p:spPr>
+          <a:xfrm>
+            <a:off x="4928680" y="1957184"/>
+            <a:ext cx="486383" cy="4513634"/>
+          </a:xfrm>
+          <a:prstGeom prst="rect">
+            <a:avLst/>
+          </a:prstGeom>
+          <a:noFill/>
+          <a:ln w="57150">
+            <a:solidFill>
+              <a:srgbClr val="FF0000"/>
+            </a:solidFill>
+            <a:prstDash val="sysDot"/>
+          </a:ln>
+        </p:spPr>
+        <p:style>
+          <a:lnRef idx="2">
+            <a:schemeClr val="accent1">
+              <a:shade val="50000"/>
+            </a:schemeClr>
+          </a:lnRef>
+          <a:fillRef idx="1">
+            <a:schemeClr val="accent1"/>
+          </a:fillRef>
+          <a:effectRef idx="0">
+            <a:schemeClr val="accent1"/>
+          </a:effectRef>
+          <a:fontRef idx="minor">
+            <a:schemeClr val="lt1"/>
+          </a:fontRef>
+        </p:style>
+        <p:txBody>
+          <a:bodyPr rtlCol="0" anchor="ctr"/>
+          <a:lstStyle/>
+          <a:p>
+            <a:pPr algn="ctr"/>
+            <a:endParaRPr lang="zh-TW" altLang="en-US" dirty="0"/>
+          </a:p>
+        </p:txBody>
+      </p:sp>
+      <p:sp>
+        <p:nvSpPr>
+          <p:cNvPr id="8" name="矩形 7">
+            <a:extLst>
+              <a:ext uri="{FF2B5EF4-FFF2-40B4-BE49-F238E27FC236}">
+                <a16:creationId xmlns:a16="http://schemas.microsoft.com/office/drawing/2014/main" id="{844E6CE4-65C5-7B55-EB1C-52F550648F31}"/>
+              </a:ext>
+            </a:extLst>
+          </p:cNvPr>
+          <p:cNvSpPr/>
+          <p:nvPr/>
+        </p:nvSpPr>
+        <p:spPr>
+          <a:xfrm>
+            <a:off x="6384587" y="1957184"/>
+            <a:ext cx="486383" cy="4513634"/>
+          </a:xfrm>
+          <a:prstGeom prst="rect">
+            <a:avLst/>
+          </a:prstGeom>
+          <a:noFill/>
+          <a:ln w="57150">
+            <a:solidFill>
+              <a:srgbClr val="FF0000"/>
+            </a:solidFill>
+            <a:prstDash val="sysDot"/>
+          </a:ln>
+        </p:spPr>
+        <p:style>
+          <a:lnRef idx="2">
+            <a:schemeClr val="accent1">
+              <a:shade val="50000"/>
+            </a:schemeClr>
+          </a:lnRef>
+          <a:fillRef idx="1">
+            <a:schemeClr val="accent1"/>
+          </a:fillRef>
+          <a:effectRef idx="0">
+            <a:schemeClr val="accent1"/>
+          </a:effectRef>
+          <a:fontRef idx="minor">
+            <a:schemeClr val="lt1"/>
+          </a:fontRef>
+        </p:style>
+        <p:txBody>
+          <a:bodyPr rtlCol="0" anchor="ctr"/>
+          <a:lstStyle/>
+          <a:p>
+            <a:pPr algn="ctr"/>
+            <a:endParaRPr lang="zh-TW" altLang="en-US" dirty="0"/>
+          </a:p>
+        </p:txBody>
+      </p:sp>
+      <p:sp>
+        <p:nvSpPr>
+          <p:cNvPr id="9" name="矩形 8">
+            <a:extLst>
+              <a:ext uri="{FF2B5EF4-FFF2-40B4-BE49-F238E27FC236}">
+                <a16:creationId xmlns:a16="http://schemas.microsoft.com/office/drawing/2014/main" id="{0F4F6726-83EB-B2D0-B6B2-2AA7056627E4}"/>
+              </a:ext>
+            </a:extLst>
+          </p:cNvPr>
+          <p:cNvSpPr/>
+          <p:nvPr/>
+        </p:nvSpPr>
+        <p:spPr>
+          <a:xfrm>
+            <a:off x="7678368" y="1957184"/>
+            <a:ext cx="486383" cy="4513634"/>
+          </a:xfrm>
+          <a:prstGeom prst="rect">
+            <a:avLst/>
+          </a:prstGeom>
+          <a:noFill/>
+          <a:ln w="57150">
+            <a:solidFill>
+              <a:srgbClr val="FF0000"/>
+            </a:solidFill>
+            <a:prstDash val="sysDot"/>
+          </a:ln>
+        </p:spPr>
+        <p:style>
+          <a:lnRef idx="2">
+            <a:schemeClr val="accent1">
+              <a:shade val="50000"/>
+            </a:schemeClr>
+          </a:lnRef>
+          <a:fillRef idx="1">
+            <a:schemeClr val="accent1"/>
+          </a:fillRef>
+          <a:effectRef idx="0">
+            <a:schemeClr val="accent1"/>
+          </a:effectRef>
+          <a:fontRef idx="minor">
+            <a:schemeClr val="lt1"/>
+          </a:fontRef>
+        </p:style>
+        <p:txBody>
+          <a:bodyPr rtlCol="0" anchor="ctr"/>
+          <a:lstStyle/>
+          <a:p>
+            <a:pPr algn="ctr"/>
+            <a:endParaRPr lang="zh-TW" altLang="en-US" dirty="0"/>
+          </a:p>
+        </p:txBody>
+      </p:sp>
+      <p:sp>
+        <p:nvSpPr>
+          <p:cNvPr id="10" name="矩形 9">
+            <a:extLst>
+              <a:ext uri="{FF2B5EF4-FFF2-40B4-BE49-F238E27FC236}">
+                <a16:creationId xmlns:a16="http://schemas.microsoft.com/office/drawing/2014/main" id="{645EA756-DF06-9EFD-21F4-44D8FFAB2877}"/>
+              </a:ext>
+            </a:extLst>
+          </p:cNvPr>
+          <p:cNvSpPr/>
+          <p:nvPr/>
+        </p:nvSpPr>
+        <p:spPr>
+          <a:xfrm>
+            <a:off x="9153729" y="1957184"/>
+            <a:ext cx="486383" cy="4513634"/>
+          </a:xfrm>
+          <a:prstGeom prst="rect">
+            <a:avLst/>
+          </a:prstGeom>
+          <a:noFill/>
+          <a:ln w="57150">
+            <a:solidFill>
+              <a:srgbClr val="FF0000"/>
+            </a:solidFill>
+            <a:prstDash val="sysDot"/>
+          </a:ln>
+        </p:spPr>
+        <p:style>
+          <a:lnRef idx="2">
+            <a:schemeClr val="accent1">
+              <a:shade val="50000"/>
+            </a:schemeClr>
+          </a:lnRef>
+          <a:fillRef idx="1">
+            <a:schemeClr val="accent1"/>
+          </a:fillRef>
+          <a:effectRef idx="0">
+            <a:schemeClr val="accent1"/>
+          </a:effectRef>
+          <a:fontRef idx="minor">
+            <a:schemeClr val="lt1"/>
+          </a:fontRef>
+        </p:style>
+        <p:txBody>
+          <a:bodyPr rtlCol="0" anchor="ctr"/>
+          <a:lstStyle/>
+          <a:p>
+            <a:pPr algn="ctr"/>
+            <a:endParaRPr lang="zh-TW" altLang="en-US" dirty="0"/>
+          </a:p>
+        </p:txBody>
+      </p:sp>
+      <p:sp>
+        <p:nvSpPr>
+          <p:cNvPr id="11" name="矩形 10">
+            <a:extLst>
+              <a:ext uri="{FF2B5EF4-FFF2-40B4-BE49-F238E27FC236}">
+                <a16:creationId xmlns:a16="http://schemas.microsoft.com/office/drawing/2014/main" id="{5B61E8B6-479A-05C7-05EF-A64D6F5AFC92}"/>
+              </a:ext>
+            </a:extLst>
+          </p:cNvPr>
+          <p:cNvSpPr/>
+          <p:nvPr/>
+        </p:nvSpPr>
+        <p:spPr>
+          <a:xfrm>
+            <a:off x="10473448" y="1957184"/>
+            <a:ext cx="486383" cy="4513634"/>
+          </a:xfrm>
+          <a:prstGeom prst="rect">
+            <a:avLst/>
+          </a:prstGeom>
+          <a:noFill/>
+          <a:ln w="57150">
+            <a:solidFill>
+              <a:srgbClr val="FF0000"/>
+            </a:solidFill>
+            <a:prstDash val="sysDot"/>
+          </a:ln>
+        </p:spPr>
+        <p:style>
+          <a:lnRef idx="2">
+            <a:schemeClr val="accent1">
+              <a:shade val="50000"/>
+            </a:schemeClr>
+          </a:lnRef>
+          <a:fillRef idx="1">
+            <a:schemeClr val="accent1"/>
+          </a:fillRef>
+          <a:effectRef idx="0">
+            <a:schemeClr val="accent1"/>
+          </a:effectRef>
+          <a:fontRef idx="minor">
+            <a:schemeClr val="lt1"/>
+          </a:fontRef>
+        </p:style>
+        <p:txBody>
+          <a:bodyPr rtlCol="0" anchor="ctr"/>
+          <a:lstStyle/>
+          <a:p>
+            <a:pPr algn="ctr"/>
+            <a:endParaRPr lang="zh-TW" altLang="en-US" dirty="0"/>
+          </a:p>
+        </p:txBody>
+      </p:sp>
+      <p:sp>
+        <p:nvSpPr>
+          <p:cNvPr id="12" name="矩形 11">
+            <a:extLst>
+              <a:ext uri="{FF2B5EF4-FFF2-40B4-BE49-F238E27FC236}">
+                <a16:creationId xmlns:a16="http://schemas.microsoft.com/office/drawing/2014/main" id="{94D97ABF-9CFA-9133-411C-86970864CAC8}"/>
+              </a:ext>
+            </a:extLst>
+          </p:cNvPr>
+          <p:cNvSpPr/>
+          <p:nvPr/>
+        </p:nvSpPr>
+        <p:spPr>
+          <a:xfrm>
+            <a:off x="2247087" y="1979241"/>
+            <a:ext cx="486383" cy="4513634"/>
+          </a:xfrm>
+          <a:prstGeom prst="rect">
+            <a:avLst/>
+          </a:prstGeom>
+          <a:noFill/>
+          <a:ln w="57150">
+            <a:solidFill>
+              <a:srgbClr val="FF0000"/>
+            </a:solidFill>
+            <a:prstDash val="sysDot"/>
+          </a:ln>
+        </p:spPr>
+        <p:style>
+          <a:lnRef idx="2">
+            <a:schemeClr val="accent1">
+              <a:shade val="50000"/>
+            </a:schemeClr>
+          </a:lnRef>
+          <a:fillRef idx="1">
+            <a:schemeClr val="accent1"/>
+          </a:fillRef>
+          <a:effectRef idx="0">
+            <a:schemeClr val="accent1"/>
+          </a:effectRef>
+          <a:fontRef idx="minor">
+            <a:schemeClr val="lt1"/>
+          </a:fontRef>
+        </p:style>
+        <p:txBody>
+          <a:bodyPr rtlCol="0" anchor="ctr"/>
+          <a:lstStyle/>
+          <a:p>
+            <a:pPr algn="ctr"/>
+            <a:endParaRPr lang="zh-TW" altLang="en-US" dirty="0"/>
+          </a:p>
+        </p:txBody>
+      </p:sp>
+      <p:sp>
+        <p:nvSpPr>
+          <p:cNvPr id="13" name="文字方塊 12">
+            <a:extLst>
+              <a:ext uri="{FF2B5EF4-FFF2-40B4-BE49-F238E27FC236}">
+                <a16:creationId xmlns:a16="http://schemas.microsoft.com/office/drawing/2014/main" id="{8DA45A5D-DFA9-1B64-7640-236C27475B4C}"/>
+              </a:ext>
+            </a:extLst>
+          </p:cNvPr>
+          <p:cNvSpPr txBox="1"/>
+          <p:nvPr/>
+        </p:nvSpPr>
+        <p:spPr>
+          <a:xfrm>
+            <a:off x="2081717" y="1299299"/>
+            <a:ext cx="1459151" cy="369332"/>
+          </a:xfrm>
+          <a:prstGeom prst="rect">
+            <a:avLst/>
+          </a:prstGeom>
+          <a:noFill/>
+        </p:spPr>
+        <p:txBody>
+          <a:bodyPr wrap="square" rtlCol="0">
+            <a:spAutoFit/>
+          </a:bodyPr>
+          <a:lstStyle/>
+          <a:p>
+            <a:r>
+              <a:rPr lang="en-US" altLang="zh-TW" dirty="0">
+                <a:solidFill>
+                  <a:srgbClr val="FF0000"/>
+                </a:solidFill>
+              </a:rPr>
+              <a:t>Group1</a:t>
+            </a:r>
+            <a:endParaRPr lang="zh-TW" altLang="en-US" dirty="0">
+              <a:solidFill>
+                <a:srgbClr val="FF0000"/>
+              </a:solidFill>
+            </a:endParaRPr>
+          </a:p>
+        </p:txBody>
+      </p:sp>
+      <p:sp>
+        <p:nvSpPr>
+          <p:cNvPr id="14" name="文字方塊 13">
+            <a:extLst>
+              <a:ext uri="{FF2B5EF4-FFF2-40B4-BE49-F238E27FC236}">
+                <a16:creationId xmlns:a16="http://schemas.microsoft.com/office/drawing/2014/main" id="{E3FFAC2B-F0A9-BC21-9F19-43321E5B4222}"/>
+              </a:ext>
+            </a:extLst>
+          </p:cNvPr>
+          <p:cNvSpPr txBox="1"/>
+          <p:nvPr/>
+        </p:nvSpPr>
+        <p:spPr>
+          <a:xfrm>
+            <a:off x="3383600" y="1299299"/>
+            <a:ext cx="1459151" cy="369332"/>
+          </a:xfrm>
+          <a:prstGeom prst="rect">
+            <a:avLst/>
+          </a:prstGeom>
+          <a:noFill/>
+        </p:spPr>
+        <p:txBody>
+          <a:bodyPr wrap="square" rtlCol="0">
+            <a:spAutoFit/>
+          </a:bodyPr>
+          <a:lstStyle/>
+          <a:p>
+            <a:r>
+              <a:rPr lang="en-US" altLang="zh-TW" dirty="0">
+                <a:solidFill>
+                  <a:srgbClr val="FF0000"/>
+                </a:solidFill>
+              </a:rPr>
+              <a:t>Group2</a:t>
+            </a:r>
+            <a:endParaRPr lang="zh-TW" altLang="en-US" dirty="0">
+              <a:solidFill>
+                <a:srgbClr val="FF0000"/>
+              </a:solidFill>
+            </a:endParaRPr>
+          </a:p>
+        </p:txBody>
+      </p:sp>
     </p:spTree>
     <p:extLst>
       <p:ext uri="{BB962C8B-B14F-4D97-AF65-F5344CB8AC3E}">
-        <p14:creationId xmlns:p14="http://schemas.microsoft.com/office/powerpoint/2010/main" val="32255695"/>
+        <p14:creationId xmlns:p14="http://schemas.microsoft.com/office/powerpoint/2010/main" val="3330601349"/>
       </p:ext>
     </p:extLst>
   </p:cSld>
@@ -7705,7 +7764,7 @@
           <p:cNvPr id="2" name="標題 1">
             <a:extLst>
               <a:ext uri="{FF2B5EF4-FFF2-40B4-BE49-F238E27FC236}">
-                <a16:creationId xmlns:a16="http://schemas.microsoft.com/office/drawing/2014/main" id="{639912DB-C67F-6204-4CF5-2C81427E4ADE}"/>
+                <a16:creationId xmlns:a16="http://schemas.microsoft.com/office/drawing/2014/main" id="{F088A994-769F-D5F3-F4FC-1CBDD7540D2D}"/>
               </a:ext>
             </a:extLst>
           </p:cNvPr>
@@ -7724,11 +7783,11 @@
             <a:pPr algn="ctr"/>
             <a:r>
               <a:rPr lang="en-US" altLang="zh-TW" dirty="0"/>
-              <a:t>Sample</a:t>
-            </a:r>
-            <a:r>
-              <a:rPr lang="zh-TW" altLang="en-US" dirty="0"/>
-              <a:t>後的</a:t>
+              <a:t>LA</a:t>
+            </a:r>
+            <a:r>
+              <a:rPr lang="zh-TW" altLang="en-US" dirty="0"/>
+              <a:t> 不經過處理的</a:t>
             </a:r>
             <a:r>
               <a:rPr lang="en-US" altLang="zh-TW" dirty="0"/>
@@ -7743,7 +7802,7 @@
           <p:cNvPr id="5" name="內容版面配置區 4">
             <a:extLst>
               <a:ext uri="{FF2B5EF4-FFF2-40B4-BE49-F238E27FC236}">
-                <a16:creationId xmlns:a16="http://schemas.microsoft.com/office/drawing/2014/main" id="{2631EA26-9809-95D1-32E7-6ACAF2AE9EE4}"/>
+                <a16:creationId xmlns:a16="http://schemas.microsoft.com/office/drawing/2014/main" id="{D45CD3D2-2AF4-7403-A594-B7DB1B6339D3}"/>
               </a:ext>
             </a:extLst>
           </p:cNvPr>
@@ -7755,7 +7814,7 @@
           </p:nvPr>
         </p:nvPicPr>
         <p:blipFill>
-          <a:blip r:embed="rId2">
+          <a:blip r:embed="rId3">
             <a:extLst>
               <a:ext uri="{28A0092B-C50C-407E-A947-70E740481C1C}">
                 <a14:useLocalDpi xmlns:a14="http://schemas.microsoft.com/office/drawing/2010/main" val="0"/>
@@ -7767,15 +7826,15 @@
         </p:blipFill>
         <p:spPr>
           <a:xfrm>
-            <a:off x="1615158" y="1842038"/>
-            <a:ext cx="8961684" cy="4318511"/>
+            <a:off x="1560547" y="1825625"/>
+            <a:ext cx="9070906" cy="4351338"/>
           </a:xfrm>
         </p:spPr>
       </p:pic>
     </p:spTree>
     <p:extLst>
       <p:ext uri="{BB962C8B-B14F-4D97-AF65-F5344CB8AC3E}">
-        <p14:creationId xmlns:p14="http://schemas.microsoft.com/office/powerpoint/2010/main" val="2200525099"/>
+        <p14:creationId xmlns:p14="http://schemas.microsoft.com/office/powerpoint/2010/main" val="32255695"/>
       </p:ext>
     </p:extLst>
   </p:cSld>
@@ -7807,7 +7866,7 @@
           <p:cNvPr id="2" name="標題 1">
             <a:extLst>
               <a:ext uri="{FF2B5EF4-FFF2-40B4-BE49-F238E27FC236}">
-                <a16:creationId xmlns:a16="http://schemas.microsoft.com/office/drawing/2014/main" id="{64FD2677-F2BC-1AEC-3142-38AE75A23EB0}"/>
+                <a16:creationId xmlns:a16="http://schemas.microsoft.com/office/drawing/2014/main" id="{639912DB-C67F-6204-4CF5-2C81427E4ADE}"/>
               </a:ext>
             </a:extLst>
           </p:cNvPr>
@@ -7825,67 +7884,59 @@
           <a:p>
             <a:pPr algn="ctr"/>
             <a:r>
-              <a:rPr lang="zh-TW" altLang="en-US" dirty="0"/>
-              <a:t>總結</a:t>
-            </a:r>
-          </a:p>
-        </p:txBody>
-      </p:sp>
-      <p:sp>
-        <p:nvSpPr>
-          <p:cNvPr id="3" name="內容版面配置區 2">
-            <a:extLst>
-              <a:ext uri="{FF2B5EF4-FFF2-40B4-BE49-F238E27FC236}">
-                <a16:creationId xmlns:a16="http://schemas.microsoft.com/office/drawing/2014/main" id="{B74ED5F4-D303-5CBD-8613-D37E68EE39CF}"/>
-              </a:ext>
-            </a:extLst>
-          </p:cNvPr>
-          <p:cNvSpPr>
-            <a:spLocks noGrp="1"/>
-          </p:cNvSpPr>
+              <a:rPr lang="en-US" altLang="zh-TW" dirty="0"/>
+              <a:t>Sample</a:t>
+            </a:r>
+            <a:r>
+              <a:rPr lang="zh-TW" altLang="en-US" dirty="0"/>
+              <a:t>後的</a:t>
+            </a:r>
+            <a:r>
+              <a:rPr lang="en-US" altLang="zh-TW" dirty="0"/>
+              <a:t>Waveform</a:t>
+            </a:r>
+            <a:endParaRPr lang="zh-TW" altLang="en-US" dirty="0"/>
+          </a:p>
+        </p:txBody>
+      </p:sp>
+      <p:pic>
+        <p:nvPicPr>
+          <p:cNvPr id="5" name="內容版面配置區 4">
+            <a:extLst>
+              <a:ext uri="{FF2B5EF4-FFF2-40B4-BE49-F238E27FC236}">
+                <a16:creationId xmlns:a16="http://schemas.microsoft.com/office/drawing/2014/main" id="{2631EA26-9809-95D1-32E7-6ACAF2AE9EE4}"/>
+              </a:ext>
+            </a:extLst>
+          </p:cNvPr>
+          <p:cNvPicPr>
+            <a:picLocks noGrp="1" noChangeAspect="1"/>
+          </p:cNvPicPr>
           <p:nvPr>
             <p:ph idx="1"/>
           </p:nvPr>
-        </p:nvSpPr>
-        <p:spPr/>
-        <p:txBody>
-          <a:bodyPr/>
-          <a:lstStyle/>
-          <a:p>
-            <a:pPr marL="0" indent="0">
-              <a:buNone/>
-            </a:pPr>
-            <a:r>
-              <a:rPr lang="en-US" altLang="zh-TW" dirty="0"/>
-              <a:t>1. ADC</a:t>
-            </a:r>
-            <a:r>
-              <a:rPr lang="zh-TW" altLang="en-US" dirty="0"/>
-              <a:t> 架構讓</a:t>
-            </a:r>
-            <a:r>
-              <a:rPr lang="en-US" altLang="zh-TW" dirty="0"/>
-              <a:t>FW</a:t>
-            </a:r>
-            <a:r>
-              <a:rPr lang="zh-TW" altLang="en-US" dirty="0"/>
-              <a:t>能夠快速模擬數位硬體行為，降低學長們</a:t>
-            </a:r>
-            <a:r>
-              <a:rPr lang="en-US" altLang="zh-TW" dirty="0"/>
-              <a:t>Sim code</a:t>
-            </a:r>
-            <a:r>
-              <a:rPr lang="zh-TW" altLang="en-US" dirty="0"/>
-              <a:t>的時間</a:t>
-            </a:r>
-          </a:p>
-        </p:txBody>
-      </p:sp>
+        </p:nvPicPr>
+        <p:blipFill>
+          <a:blip r:embed="rId2">
+            <a:extLst>
+              <a:ext uri="{28A0092B-C50C-407E-A947-70E740481C1C}">
+                <a14:useLocalDpi xmlns:a14="http://schemas.microsoft.com/office/drawing/2010/main" val="0"/>
+              </a:ext>
+            </a:extLst>
+          </a:blip>
+          <a:srcRect/>
+          <a:stretch/>
+        </p:blipFill>
+        <p:spPr>
+          <a:xfrm>
+            <a:off x="1615158" y="1842038"/>
+            <a:ext cx="8961684" cy="4318511"/>
+          </a:xfrm>
+        </p:spPr>
+      </p:pic>
     </p:spTree>
     <p:extLst>
       <p:ext uri="{BB962C8B-B14F-4D97-AF65-F5344CB8AC3E}">
-        <p14:creationId xmlns:p14="http://schemas.microsoft.com/office/powerpoint/2010/main" val="172761753"/>
+        <p14:creationId xmlns:p14="http://schemas.microsoft.com/office/powerpoint/2010/main" val="2200525099"/>
       </p:ext>
     </p:extLst>
   </p:cSld>
@@ -8150,7 +8201,7 @@
           <p:cNvPr id="2" name="標題 1">
             <a:extLst>
               <a:ext uri="{FF2B5EF4-FFF2-40B4-BE49-F238E27FC236}">
-                <a16:creationId xmlns:a16="http://schemas.microsoft.com/office/drawing/2014/main" id="{FA0E620C-9F23-2AF8-42C2-543FD8E93800}"/>
+                <a16:creationId xmlns:a16="http://schemas.microsoft.com/office/drawing/2014/main" id="{64FD2677-F2BC-1AEC-3142-38AE75A23EB0}"/>
               </a:ext>
             </a:extLst>
           </p:cNvPr>
@@ -8169,7 +8220,7 @@
             <a:pPr algn="ctr"/>
             <a:r>
               <a:rPr lang="zh-TW" altLang="en-US" dirty="0"/>
-              <a:t>數位架構</a:t>
+              <a:t>總結</a:t>
             </a:r>
           </a:p>
         </p:txBody>
@@ -8179,7 +8230,7 @@
           <p:cNvPr id="3" name="內容版面配置區 2">
             <a:extLst>
               <a:ext uri="{FF2B5EF4-FFF2-40B4-BE49-F238E27FC236}">
-                <a16:creationId xmlns:a16="http://schemas.microsoft.com/office/drawing/2014/main" id="{134E4868-8224-3AB5-A489-C7A069BC88F9}"/>
+                <a16:creationId xmlns:a16="http://schemas.microsoft.com/office/drawing/2014/main" id="{B74ED5F4-D303-5CBD-8613-D37E68EE39CF}"/>
               </a:ext>
             </a:extLst>
           </p:cNvPr>
@@ -8199,24 +8250,12 @@
               <a:buNone/>
             </a:pPr>
             <a:r>
-              <a:rPr lang="zh-TW" altLang="en-US" dirty="0"/>
-              <a:t>目的 </a:t>
-            </a:r>
-            <a:r>
-              <a:rPr lang="en-US" altLang="zh-TW" dirty="0"/>
-              <a:t>:</a:t>
-            </a:r>
-            <a:r>
-              <a:rPr lang="zh-TW" altLang="en-US" dirty="0"/>
-              <a:t> 透過</a:t>
-            </a:r>
-            <a:r>
-              <a:rPr lang="en-US" altLang="zh-TW" dirty="0"/>
-              <a:t>ADC</a:t>
-            </a:r>
-            <a:r>
-              <a:rPr lang="zh-TW" altLang="en-US" dirty="0"/>
-              <a:t> 架構，</a:t>
+              <a:rPr lang="en-US" altLang="zh-TW" dirty="0"/>
+              <a:t>1. ADC</a:t>
+            </a:r>
+            <a:r>
+              <a:rPr lang="zh-TW" altLang="en-US" dirty="0"/>
+              <a:t> 架構讓</a:t>
             </a:r>
             <a:r>
               <a:rPr lang="en-US" altLang="zh-TW" dirty="0"/>
@@ -8224,7 +8263,15 @@
             </a:r>
             <a:r>
               <a:rPr lang="zh-TW" altLang="en-US" dirty="0"/>
-              <a:t>能夠模擬後續硬體處理訊號以及解析訊號的過程</a:t>
+              <a:t>能夠快速模擬數位硬體行為，降低學長們</a:t>
+            </a:r>
+            <a:r>
+              <a:rPr lang="en-US" altLang="zh-TW" dirty="0"/>
+              <a:t>Sim code</a:t>
+            </a:r>
+            <a:r>
+              <a:rPr lang="zh-TW" altLang="en-US" dirty="0"/>
+              <a:t>的時間</a:t>
             </a:r>
           </a:p>
         </p:txBody>
@@ -8232,7 +8279,7 @@
     </p:spTree>
     <p:extLst>
       <p:ext uri="{BB962C8B-B14F-4D97-AF65-F5344CB8AC3E}">
-        <p14:creationId xmlns:p14="http://schemas.microsoft.com/office/powerpoint/2010/main" val="2463456155"/>
+        <p14:creationId xmlns:p14="http://schemas.microsoft.com/office/powerpoint/2010/main" val="172761753"/>
       </p:ext>
     </p:extLst>
   </p:cSld>
@@ -8264,6 +8311,120 @@
           <p:cNvPr id="2" name="標題 1">
             <a:extLst>
               <a:ext uri="{FF2B5EF4-FFF2-40B4-BE49-F238E27FC236}">
+                <a16:creationId xmlns:a16="http://schemas.microsoft.com/office/drawing/2014/main" id="{FA0E620C-9F23-2AF8-42C2-543FD8E93800}"/>
+              </a:ext>
+            </a:extLst>
+          </p:cNvPr>
+          <p:cNvSpPr>
+            <a:spLocks noGrp="1"/>
+          </p:cNvSpPr>
+          <p:nvPr>
+            <p:ph type="title"/>
+          </p:nvPr>
+        </p:nvSpPr>
+        <p:spPr/>
+        <p:txBody>
+          <a:bodyPr/>
+          <a:lstStyle/>
+          <a:p>
+            <a:pPr algn="ctr"/>
+            <a:r>
+              <a:rPr lang="zh-TW" altLang="en-US" dirty="0"/>
+              <a:t>數位架構</a:t>
+            </a:r>
+          </a:p>
+        </p:txBody>
+      </p:sp>
+      <p:sp>
+        <p:nvSpPr>
+          <p:cNvPr id="3" name="內容版面配置區 2">
+            <a:extLst>
+              <a:ext uri="{FF2B5EF4-FFF2-40B4-BE49-F238E27FC236}">
+                <a16:creationId xmlns:a16="http://schemas.microsoft.com/office/drawing/2014/main" id="{134E4868-8224-3AB5-A489-C7A069BC88F9}"/>
+              </a:ext>
+            </a:extLst>
+          </p:cNvPr>
+          <p:cNvSpPr>
+            <a:spLocks noGrp="1"/>
+          </p:cNvSpPr>
+          <p:nvPr>
+            <p:ph idx="1"/>
+          </p:nvPr>
+        </p:nvSpPr>
+        <p:spPr/>
+        <p:txBody>
+          <a:bodyPr/>
+          <a:lstStyle/>
+          <a:p>
+            <a:pPr marL="0" indent="0">
+              <a:buNone/>
+            </a:pPr>
+            <a:r>
+              <a:rPr lang="zh-TW" altLang="en-US" dirty="0"/>
+              <a:t>目的 </a:t>
+            </a:r>
+            <a:r>
+              <a:rPr lang="en-US" altLang="zh-TW" dirty="0"/>
+              <a:t>:</a:t>
+            </a:r>
+            <a:r>
+              <a:rPr lang="zh-TW" altLang="en-US" dirty="0"/>
+              <a:t> 透過</a:t>
+            </a:r>
+            <a:r>
+              <a:rPr lang="en-US" altLang="zh-TW" dirty="0"/>
+              <a:t>ADC</a:t>
+            </a:r>
+            <a:r>
+              <a:rPr lang="zh-TW" altLang="en-US" dirty="0"/>
+              <a:t> 架構，</a:t>
+            </a:r>
+            <a:r>
+              <a:rPr lang="en-US" altLang="zh-TW" dirty="0"/>
+              <a:t>FW</a:t>
+            </a:r>
+            <a:r>
+              <a:rPr lang="zh-TW" altLang="en-US" dirty="0"/>
+              <a:t>能夠模擬後續硬體處理訊號以及解析訊號的過程</a:t>
+            </a:r>
+          </a:p>
+        </p:txBody>
+      </p:sp>
+    </p:spTree>
+    <p:extLst>
+      <p:ext uri="{BB962C8B-B14F-4D97-AF65-F5344CB8AC3E}">
+        <p14:creationId xmlns:p14="http://schemas.microsoft.com/office/powerpoint/2010/main" val="2463456155"/>
+      </p:ext>
+    </p:extLst>
+  </p:cSld>
+  <p:clrMapOvr>
+    <a:masterClrMapping/>
+  </p:clrMapOvr>
+</p:sld>
+</file>
+
+<file path=ppt/slides/slide22.xml><?xml version="1.0" encoding="utf-8"?>
+<p:sld xmlns:a="http://schemas.openxmlformats.org/drawingml/2006/main" xmlns:r="http://schemas.openxmlformats.org/officeDocument/2006/relationships" xmlns:p="http://schemas.openxmlformats.org/presentationml/2006/main">
+  <p:cSld>
+    <p:spTree>
+      <p:nvGrpSpPr>
+        <p:cNvPr id="1" name=""/>
+        <p:cNvGrpSpPr/>
+        <p:nvPr/>
+      </p:nvGrpSpPr>
+      <p:grpSpPr>
+        <a:xfrm>
+          <a:off x="0" y="0"/>
+          <a:ext cx="0" cy="0"/>
+          <a:chOff x="0" y="0"/>
+          <a:chExt cx="0" cy="0"/>
+        </a:xfrm>
+      </p:grpSpPr>
+      <p:sp>
+        <p:nvSpPr>
+          <p:cNvPr id="2" name="標題 1">
+            <a:extLst>
+              <a:ext uri="{FF2B5EF4-FFF2-40B4-BE49-F238E27FC236}">
                 <a16:creationId xmlns:a16="http://schemas.microsoft.com/office/drawing/2014/main" id="{6287649A-A1A1-AFCF-7EF8-79C4CDDED187}"/>
               </a:ext>
             </a:extLst>
@@ -8404,7 +8565,7 @@
 </p:sld>
 </file>
 
-<file path=ppt/slides/slide22.xml><?xml version="1.0" encoding="utf-8"?>
+<file path=ppt/slides/slide23.xml><?xml version="1.0" encoding="utf-8"?>
 <p:sld xmlns:a="http://schemas.openxmlformats.org/drawingml/2006/main" xmlns:r="http://schemas.openxmlformats.org/officeDocument/2006/relationships" xmlns:p="http://schemas.openxmlformats.org/presentationml/2006/main">
   <p:cSld>
     <p:spTree>
@@ -9743,7 +9904,7 @@
 </p:sld>
 </file>
 
-<file path=ppt/slides/slide23.xml><?xml version="1.0" encoding="utf-8"?>
+<file path=ppt/slides/slide24.xml><?xml version="1.0" encoding="utf-8"?>
 <p:sld xmlns:a="http://schemas.openxmlformats.org/drawingml/2006/main" xmlns:r="http://schemas.openxmlformats.org/officeDocument/2006/relationships" xmlns:p="http://schemas.openxmlformats.org/presentationml/2006/main">
   <p:cSld>
     <p:spTree>
@@ -10276,141 +10437,6 @@
 </p:sld>
 </file>
 
-<file path=ppt/slides/slide24.xml><?xml version="1.0" encoding="utf-8"?>
-<p:sld xmlns:a="http://schemas.openxmlformats.org/drawingml/2006/main" xmlns:r="http://schemas.openxmlformats.org/officeDocument/2006/relationships" xmlns:p="http://schemas.openxmlformats.org/presentationml/2006/main">
-  <p:cSld>
-    <p:spTree>
-      <p:nvGrpSpPr>
-        <p:cNvPr id="1" name=""/>
-        <p:cNvGrpSpPr/>
-        <p:nvPr/>
-      </p:nvGrpSpPr>
-      <p:grpSpPr>
-        <a:xfrm>
-          <a:off x="0" y="0"/>
-          <a:ext cx="0" cy="0"/>
-          <a:chOff x="0" y="0"/>
-          <a:chExt cx="0" cy="0"/>
-        </a:xfrm>
-      </p:grpSpPr>
-      <p:sp>
-        <p:nvSpPr>
-          <p:cNvPr id="2" name="標題 1">
-            <a:extLst>
-              <a:ext uri="{FF2B5EF4-FFF2-40B4-BE49-F238E27FC236}">
-                <a16:creationId xmlns:a16="http://schemas.microsoft.com/office/drawing/2014/main" id="{E32E6CD8-2503-30B7-A4F8-AE84BE484917}"/>
-              </a:ext>
-            </a:extLst>
-          </p:cNvPr>
-          <p:cNvSpPr>
-            <a:spLocks noGrp="1"/>
-          </p:cNvSpPr>
-          <p:nvPr>
-            <p:ph type="title"/>
-          </p:nvPr>
-        </p:nvSpPr>
-        <p:spPr/>
-        <p:txBody>
-          <a:bodyPr/>
-          <a:lstStyle/>
-          <a:p>
-            <a:pPr algn="ctr"/>
-            <a:r>
-              <a:rPr lang="en-US" altLang="zh-TW" dirty="0"/>
-              <a:t>AGC flow</a:t>
-            </a:r>
-            <a:r>
-              <a:rPr lang="zh-TW" altLang="en-US" dirty="0"/>
-              <a:t>架構過程</a:t>
-            </a:r>
-          </a:p>
-        </p:txBody>
-      </p:sp>
-      <p:sp>
-        <p:nvSpPr>
-          <p:cNvPr id="3" name="內容版面配置區 2">
-            <a:extLst>
-              <a:ext uri="{FF2B5EF4-FFF2-40B4-BE49-F238E27FC236}">
-                <a16:creationId xmlns:a16="http://schemas.microsoft.com/office/drawing/2014/main" id="{ED8640AC-FE27-0D8C-6B75-7018404197B3}"/>
-              </a:ext>
-            </a:extLst>
-          </p:cNvPr>
-          <p:cNvSpPr>
-            <a:spLocks noGrp="1"/>
-          </p:cNvSpPr>
-          <p:nvPr>
-            <p:ph idx="1"/>
-          </p:nvPr>
-        </p:nvSpPr>
-        <p:spPr/>
-        <p:txBody>
-          <a:bodyPr/>
-          <a:lstStyle/>
-          <a:p>
-            <a:pPr marL="514350" indent="-514350">
-              <a:buAutoNum type="arabicPeriod"/>
-            </a:pPr>
-            <a:r>
-              <a:rPr lang="zh-TW" altLang="en-US" dirty="0"/>
-              <a:t>前期</a:t>
-            </a:r>
-            <a:r>
-              <a:rPr lang="en-US" altLang="zh-TW" dirty="0"/>
-              <a:t>ISSUE</a:t>
-            </a:r>
-          </a:p>
-          <a:p>
-            <a:pPr marL="514350" indent="-514350">
-              <a:buAutoNum type="arabicPeriod"/>
-            </a:pPr>
-            <a:endParaRPr lang="en-US" altLang="zh-TW" dirty="0"/>
-          </a:p>
-          <a:p>
-            <a:pPr marL="514350" indent="-514350">
-              <a:buAutoNum type="arabicPeriod"/>
-            </a:pPr>
-            <a:r>
-              <a:rPr lang="zh-TW" altLang="en-US" dirty="0"/>
-              <a:t>中後期統計</a:t>
-            </a:r>
-            <a:endParaRPr lang="en-US" altLang="zh-TW" dirty="0"/>
-          </a:p>
-          <a:p>
-            <a:pPr marL="514350" indent="-514350">
-              <a:buAutoNum type="arabicPeriod"/>
-            </a:pPr>
-            <a:endParaRPr lang="en-US" altLang="zh-TW" dirty="0"/>
-          </a:p>
-          <a:p>
-            <a:pPr marL="514350" indent="-514350">
-              <a:buAutoNum type="arabicPeriod"/>
-            </a:pPr>
-            <a:endParaRPr lang="en-US" altLang="zh-TW" dirty="0"/>
-          </a:p>
-          <a:p>
-            <a:pPr marL="514350" indent="-514350">
-              <a:buAutoNum type="arabicPeriod"/>
-            </a:pPr>
-            <a:r>
-              <a:rPr lang="zh-TW" altLang="en-US" dirty="0"/>
-              <a:t>後期完工</a:t>
-            </a:r>
-          </a:p>
-        </p:txBody>
-      </p:sp>
-    </p:spTree>
-    <p:extLst>
-      <p:ext uri="{BB962C8B-B14F-4D97-AF65-F5344CB8AC3E}">
-        <p14:creationId xmlns:p14="http://schemas.microsoft.com/office/powerpoint/2010/main" val="3478487214"/>
-      </p:ext>
-    </p:extLst>
-  </p:cSld>
-  <p:clrMapOvr>
-    <a:masterClrMapping/>
-  </p:clrMapOvr>
-</p:sld>
-</file>
-
 <file path=ppt/slides/slide25.xml><?xml version="1.0" encoding="utf-8"?>
 <p:sld xmlns:a="http://schemas.openxmlformats.org/drawingml/2006/main" xmlns:r="http://schemas.openxmlformats.org/officeDocument/2006/relationships" xmlns:p="http://schemas.openxmlformats.org/presentationml/2006/main">
   <p:cSld>
@@ -10433,7 +10459,7 @@
           <p:cNvPr id="2" name="標題 1">
             <a:extLst>
               <a:ext uri="{FF2B5EF4-FFF2-40B4-BE49-F238E27FC236}">
-                <a16:creationId xmlns:a16="http://schemas.microsoft.com/office/drawing/2014/main" id="{75A8CDCF-D217-9237-F0F3-F03F7A3BC82D}"/>
+                <a16:creationId xmlns:a16="http://schemas.microsoft.com/office/drawing/2014/main" id="{E32E6CD8-2503-30B7-A4F8-AE84BE484917}"/>
               </a:ext>
             </a:extLst>
           </p:cNvPr>
@@ -10449,7 +10475,15 @@
           <a:bodyPr/>
           <a:lstStyle/>
           <a:p>
-            <a:endParaRPr lang="zh-TW" altLang="en-US" dirty="0"/>
+            <a:pPr algn="ctr"/>
+            <a:r>
+              <a:rPr lang="en-US" altLang="zh-TW" dirty="0"/>
+              <a:t>AGC flow</a:t>
+            </a:r>
+            <a:r>
+              <a:rPr lang="zh-TW" altLang="en-US" dirty="0"/>
+              <a:t>架構過程</a:t>
+            </a:r>
           </a:p>
         </p:txBody>
       </p:sp>
@@ -10458,7 +10492,7 @@
           <p:cNvPr id="3" name="內容版面配置區 2">
             <a:extLst>
               <a:ext uri="{FF2B5EF4-FFF2-40B4-BE49-F238E27FC236}">
-                <a16:creationId xmlns:a16="http://schemas.microsoft.com/office/drawing/2014/main" id="{A5250B66-E56F-5AAD-0B99-C4E8E1B221C2}"/>
+                <a16:creationId xmlns:a16="http://schemas.microsoft.com/office/drawing/2014/main" id="{ED8640AC-FE27-0D8C-6B75-7018404197B3}"/>
               </a:ext>
             </a:extLst>
           </p:cNvPr>
@@ -10474,14 +10508,61 @@
           <a:bodyPr/>
           <a:lstStyle/>
           <a:p>
-            <a:endParaRPr lang="zh-TW" altLang="en-US"/>
+            <a:pPr marL="514350" indent="-514350">
+              <a:buAutoNum type="arabicPeriod"/>
+            </a:pPr>
+            <a:r>
+              <a:rPr lang="zh-TW" altLang="en-US" dirty="0"/>
+              <a:t>前期</a:t>
+            </a:r>
+            <a:r>
+              <a:rPr lang="en-US" altLang="zh-TW" dirty="0"/>
+              <a:t>ISSUE</a:t>
+            </a:r>
+          </a:p>
+          <a:p>
+            <a:pPr marL="514350" indent="-514350">
+              <a:buAutoNum type="arabicPeriod"/>
+            </a:pPr>
+            <a:endParaRPr lang="en-US" altLang="zh-TW" dirty="0"/>
+          </a:p>
+          <a:p>
+            <a:pPr marL="514350" indent="-514350">
+              <a:buAutoNum type="arabicPeriod"/>
+            </a:pPr>
+            <a:r>
+              <a:rPr lang="zh-TW" altLang="en-US" dirty="0"/>
+              <a:t>中後期統計</a:t>
+            </a:r>
+            <a:endParaRPr lang="en-US" altLang="zh-TW" dirty="0"/>
+          </a:p>
+          <a:p>
+            <a:pPr marL="514350" indent="-514350">
+              <a:buAutoNum type="arabicPeriod"/>
+            </a:pPr>
+            <a:endParaRPr lang="en-US" altLang="zh-TW" dirty="0"/>
+          </a:p>
+          <a:p>
+            <a:pPr marL="514350" indent="-514350">
+              <a:buAutoNum type="arabicPeriod"/>
+            </a:pPr>
+            <a:endParaRPr lang="en-US" altLang="zh-TW" dirty="0"/>
+          </a:p>
+          <a:p>
+            <a:pPr marL="514350" indent="-514350">
+              <a:buAutoNum type="arabicPeriod"/>
+            </a:pPr>
+            <a:r>
+              <a:rPr lang="zh-TW" altLang="en-US" dirty="0"/>
+              <a:t>後期完工</a:t>
+            </a:r>
           </a:p>
         </p:txBody>
       </p:sp>
     </p:spTree>
     <p:extLst>
       <p:ext uri="{BB962C8B-B14F-4D97-AF65-F5344CB8AC3E}">
-        <p14:creationId xmlns:p14="http://schemas.microsoft.com/office/powerpoint/2010/main" val="2364024188"/>
+        <p14:creationId xmlns:p14="http://schemas.microsoft.com/office/powerpoint/2010/main" val="3478487214"/>
       </p:ext>
     </p:extLst>
   </p:cSld>
@@ -10513,7 +10594,7 @@
           <p:cNvPr id="2" name="標題 1">
             <a:extLst>
               <a:ext uri="{FF2B5EF4-FFF2-40B4-BE49-F238E27FC236}">
-                <a16:creationId xmlns:a16="http://schemas.microsoft.com/office/drawing/2014/main" id="{02C3FE11-1F15-4971-95B5-34F7811B7E8A}"/>
+                <a16:creationId xmlns:a16="http://schemas.microsoft.com/office/drawing/2014/main" id="{75A8CDCF-D217-9237-F0F3-F03F7A3BC82D}"/>
               </a:ext>
             </a:extLst>
           </p:cNvPr>
@@ -10529,19 +10610,6 @@
           <a:bodyPr/>
           <a:lstStyle/>
           <a:p>
-            <a:pPr algn="ctr"/>
-            <a:r>
-              <a:rPr lang="en-US" altLang="zh-TW" dirty="0"/>
-              <a:t>Color </a:t>
-            </a:r>
-            <a:r>
-              <a:rPr lang="en-US" altLang="zh-TW" dirty="0" err="1"/>
-              <a:t>Pikcing</a:t>
-            </a:r>
-            <a:r>
-              <a:rPr lang="en-US" altLang="zh-TW" dirty="0"/>
-              <a:t> Project</a:t>
-            </a:r>
             <a:endParaRPr lang="zh-TW" altLang="en-US" dirty="0"/>
           </a:p>
         </p:txBody>
@@ -10551,7 +10619,7 @@
           <p:cNvPr id="3" name="內容版面配置區 2">
             <a:extLst>
               <a:ext uri="{FF2B5EF4-FFF2-40B4-BE49-F238E27FC236}">
-                <a16:creationId xmlns:a16="http://schemas.microsoft.com/office/drawing/2014/main" id="{5C2571F1-765B-42C3-8AAC-2A8441E0FBA0}"/>
+                <a16:creationId xmlns:a16="http://schemas.microsoft.com/office/drawing/2014/main" id="{A5250B66-E56F-5AAD-0B99-C4E8E1B221C2}"/>
               </a:ext>
             </a:extLst>
           </p:cNvPr>
@@ -10567,74 +10635,14 @@
           <a:bodyPr/>
           <a:lstStyle/>
           <a:p>
-            <a:pPr marL="457200" lvl="1" indent="0">
-              <a:lnSpc>
-                <a:spcPct val="150000"/>
-              </a:lnSpc>
-              <a:buNone/>
-            </a:pPr>
-            <a:r>
-              <a:rPr lang="zh-TW" altLang="en-US" sz="2800" dirty="0">
-                <a:solidFill>
-                  <a:srgbClr val="FF0000"/>
-                </a:solidFill>
-              </a:rPr>
-              <a:t>目的</a:t>
-            </a:r>
-            <a:r>
-              <a:rPr lang="zh-TW" altLang="en-US" dirty="0"/>
-              <a:t> </a:t>
-            </a:r>
-            <a:r>
-              <a:rPr lang="en-US" altLang="zh-TW" dirty="0"/>
-              <a:t>:</a:t>
-            </a:r>
-            <a:r>
-              <a:rPr lang="zh-TW" altLang="en-US" dirty="0"/>
-              <a:t>  按壓</a:t>
-            </a:r>
-            <a:r>
-              <a:rPr lang="en-US" altLang="zh-TW" dirty="0"/>
-              <a:t>Color Sensor</a:t>
-            </a:r>
-            <a:r>
-              <a:rPr lang="zh-TW" altLang="en-US" dirty="0"/>
-              <a:t>選擇顏色、並透過筆在</a:t>
-            </a:r>
-            <a:r>
-              <a:rPr lang="en-US" altLang="zh-TW" dirty="0"/>
-              <a:t>Host</a:t>
-            </a:r>
-            <a:r>
-              <a:rPr lang="zh-TW" altLang="en-US" dirty="0"/>
-              <a:t>上畫出對應的顏色</a:t>
-            </a:r>
-            <a:endParaRPr lang="en-US" altLang="zh-TW" dirty="0"/>
-          </a:p>
-          <a:p>
-            <a:pPr marL="457200" lvl="1" indent="0">
-              <a:lnSpc>
-                <a:spcPct val="150000"/>
-              </a:lnSpc>
-              <a:buNone/>
-            </a:pPr>
-            <a:endParaRPr lang="en-US" altLang="zh-TW" dirty="0"/>
-          </a:p>
-          <a:p>
-            <a:pPr marL="457200" lvl="1" indent="0">
-              <a:lnSpc>
-                <a:spcPct val="150000"/>
-              </a:lnSpc>
-              <a:buNone/>
-            </a:pPr>
-            <a:endParaRPr lang="en-US" altLang="zh-TW" dirty="0"/>
+            <a:endParaRPr lang="zh-TW" altLang="en-US"/>
           </a:p>
         </p:txBody>
       </p:sp>
     </p:spTree>
     <p:extLst>
       <p:ext uri="{BB962C8B-B14F-4D97-AF65-F5344CB8AC3E}">
-        <p14:creationId xmlns:p14="http://schemas.microsoft.com/office/powerpoint/2010/main" val="263751651"/>
+        <p14:creationId xmlns:p14="http://schemas.microsoft.com/office/powerpoint/2010/main" val="2364024188"/>
       </p:ext>
     </p:extLst>
   </p:cSld>
@@ -10666,7 +10674,7 @@
           <p:cNvPr id="2" name="標題 1">
             <a:extLst>
               <a:ext uri="{FF2B5EF4-FFF2-40B4-BE49-F238E27FC236}">
-                <a16:creationId xmlns:a16="http://schemas.microsoft.com/office/drawing/2014/main" id="{36663CA0-2783-4A34-8C5A-24686BD0A02B}"/>
+                <a16:creationId xmlns:a16="http://schemas.microsoft.com/office/drawing/2014/main" id="{02C3FE11-1F15-4971-95B5-34F7811B7E8A}"/>
               </a:ext>
             </a:extLst>
           </p:cNvPr>
@@ -10684,9 +10692,18 @@
           <a:p>
             <a:pPr algn="ctr"/>
             <a:r>
-              <a:rPr lang="zh-TW" altLang="en-US" dirty="0"/>
-              <a:t>主要遇到的問題</a:t>
-            </a:r>
+              <a:rPr lang="en-US" altLang="zh-TW" dirty="0"/>
+              <a:t>Color </a:t>
+            </a:r>
+            <a:r>
+              <a:rPr lang="en-US" altLang="zh-TW" dirty="0" err="1"/>
+              <a:t>Pikcing</a:t>
+            </a:r>
+            <a:r>
+              <a:rPr lang="en-US" altLang="zh-TW" dirty="0"/>
+              <a:t> Project</a:t>
+            </a:r>
+            <a:endParaRPr lang="zh-TW" altLang="en-US" dirty="0"/>
           </a:p>
         </p:txBody>
       </p:sp>
@@ -10695,7 +10712,7 @@
           <p:cNvPr id="3" name="內容版面配置區 2">
             <a:extLst>
               <a:ext uri="{FF2B5EF4-FFF2-40B4-BE49-F238E27FC236}">
-                <a16:creationId xmlns:a16="http://schemas.microsoft.com/office/drawing/2014/main" id="{4EB3A3B7-3819-4E07-A5DF-C15C993A0B95}"/>
+                <a16:creationId xmlns:a16="http://schemas.microsoft.com/office/drawing/2014/main" id="{5C2571F1-765B-42C3-8AAC-2A8441E0FBA0}"/>
               </a:ext>
             </a:extLst>
           </p:cNvPr>
@@ -10711,144 +10728,66 @@
           <a:bodyPr/>
           <a:lstStyle/>
           <a:p>
-            <a:pPr marL="0" indent="0">
+            <a:pPr marL="457200" lvl="1" indent="0">
+              <a:lnSpc>
+                <a:spcPct val="150000"/>
+              </a:lnSpc>
               <a:buNone/>
             </a:pPr>
             <a:r>
-              <a:rPr lang="zh-TW" altLang="en-US" dirty="0">
+              <a:rPr lang="zh-TW" altLang="en-US" sz="2800" dirty="0">
                 <a:solidFill>
-                  <a:schemeClr val="accent1"/>
+                  <a:srgbClr val="FF0000"/>
                 </a:solidFill>
               </a:rPr>
-              <a:t>問題</a:t>
-            </a:r>
-            <a:endParaRPr lang="en-US" altLang="zh-TW" dirty="0">
-              <a:solidFill>
-                <a:schemeClr val="accent1"/>
-              </a:solidFill>
-            </a:endParaRPr>
-          </a:p>
-          <a:p>
-            <a:pPr marL="514350" indent="-514350">
-              <a:buAutoNum type="arabicPeriod"/>
+              <a:t>目的</a:t>
+            </a:r>
+            <a:r>
+              <a:rPr lang="zh-TW" altLang="en-US" dirty="0"/>
+              <a:t> </a:t>
+            </a:r>
+            <a:r>
+              <a:rPr lang="en-US" altLang="zh-TW" dirty="0"/>
+              <a:t>:</a:t>
+            </a:r>
+            <a:r>
+              <a:rPr lang="zh-TW" altLang="en-US" dirty="0"/>
+              <a:t>  按壓</a:t>
+            </a:r>
+            <a:r>
+              <a:rPr lang="en-US" altLang="zh-TW" dirty="0"/>
+              <a:t>Color Sensor</a:t>
+            </a:r>
+            <a:r>
+              <a:rPr lang="zh-TW" altLang="en-US" dirty="0"/>
+              <a:t>選擇顏色、並透過筆在</a:t>
+            </a:r>
+            <a:r>
+              <a:rPr lang="en-US" altLang="zh-TW" dirty="0"/>
+              <a:t>Host</a:t>
+            </a:r>
+            <a:r>
+              <a:rPr lang="zh-TW" altLang="en-US" dirty="0"/>
+              <a:t>上畫出對應的顏色</a:t>
+            </a:r>
+            <a:endParaRPr lang="en-US" altLang="zh-TW" dirty="0"/>
+          </a:p>
+          <a:p>
+            <a:pPr marL="457200" lvl="1" indent="0">
+              <a:lnSpc>
+                <a:spcPct val="150000"/>
+              </a:lnSpc>
+              <a:buNone/>
             </a:pPr>
             <a:endParaRPr lang="en-US" altLang="zh-TW" dirty="0"/>
           </a:p>
           <a:p>
-            <a:pPr marL="514350" indent="-514350">
-              <a:buAutoNum type="arabicPeriod"/>
-            </a:pPr>
-            <a:r>
-              <a:rPr lang="zh-TW" altLang="en-US" sz="2400" dirty="0">
-                <a:hlinkClick r:id="rId3" action="ppaction://hlinksldjump"/>
-              </a:rPr>
-              <a:t>傳輸問題 </a:t>
-            </a:r>
-            <a:r>
-              <a:rPr lang="en-US" altLang="zh-TW" sz="2400" dirty="0"/>
-              <a:t>:</a:t>
-            </a:r>
-            <a:r>
-              <a:rPr lang="zh-TW" altLang="en-US" sz="2400" dirty="0"/>
-              <a:t> </a:t>
-            </a:r>
-            <a:endParaRPr lang="en-US" altLang="zh-TW" sz="2400" dirty="0"/>
-          </a:p>
-          <a:p>
             <a:pPr marL="457200" lvl="1" indent="0">
+              <a:lnSpc>
+                <a:spcPct val="150000"/>
+              </a:lnSpc>
               <a:buNone/>
             </a:pPr>
-            <a:r>
-              <a:rPr lang="en-US" altLang="zh-TW" sz="2000" dirty="0"/>
-              <a:t>1.  Set UART</a:t>
-            </a:r>
-            <a:r>
-              <a:rPr lang="zh-TW" altLang="en-US" sz="2000" dirty="0"/>
-              <a:t> </a:t>
-            </a:r>
-            <a:r>
-              <a:rPr lang="en-US" altLang="zh-TW" sz="2000" dirty="0"/>
-              <a:t>RX</a:t>
-            </a:r>
-            <a:r>
-              <a:rPr lang="zh-TW" altLang="en-US" sz="2000" dirty="0"/>
-              <a:t> </a:t>
-            </a:r>
-            <a:r>
-              <a:rPr lang="en-US" altLang="zh-TW" sz="2000" dirty="0"/>
-              <a:t>Setting </a:t>
-            </a:r>
-            <a:r>
-              <a:rPr lang="zh-TW" altLang="en-US" sz="2000" dirty="0"/>
-              <a:t>以及 </a:t>
-            </a:r>
-            <a:r>
-              <a:rPr lang="en-US" altLang="zh-TW" sz="2000" dirty="0"/>
-              <a:t>Flow </a:t>
-            </a:r>
-            <a:r>
-              <a:rPr lang="zh-TW" altLang="en-US" sz="2000" dirty="0"/>
-              <a:t>規劃</a:t>
-            </a:r>
-            <a:endParaRPr lang="en-US" altLang="zh-TW" sz="2000" dirty="0"/>
-          </a:p>
-          <a:p>
-            <a:pPr marL="0" indent="0">
-              <a:buNone/>
-            </a:pPr>
-            <a:endParaRPr lang="en-US" altLang="zh-TW" sz="2400" dirty="0"/>
-          </a:p>
-          <a:p>
-            <a:pPr marL="457200" indent="-457200">
-              <a:buAutoNum type="arabicPeriod" startAt="2"/>
-            </a:pPr>
-            <a:r>
-              <a:rPr lang="zh-TW" altLang="en-US" sz="2400" dirty="0">
-                <a:hlinkClick r:id="rId4" action="ppaction://hlinksldjump"/>
-              </a:rPr>
-              <a:t>最接近顏色</a:t>
-            </a:r>
-            <a:r>
-              <a:rPr lang="en-US" altLang="zh-TW" sz="2400" dirty="0"/>
-              <a:t>:</a:t>
-            </a:r>
-          </a:p>
-          <a:p>
-            <a:pPr marL="914400" lvl="1" indent="-457200">
-              <a:buAutoNum type="arabicPeriod" startAt="2"/>
-            </a:pPr>
-            <a:r>
-              <a:rPr lang="zh-TW" altLang="en-US" sz="2000" dirty="0"/>
-              <a:t>筆的</a:t>
-            </a:r>
-            <a:r>
-              <a:rPr lang="en-US" altLang="zh-TW" sz="2000" dirty="0" err="1"/>
-              <a:t>Protocal</a:t>
-            </a:r>
-            <a:r>
-              <a:rPr lang="en-US" altLang="zh-TW" sz="2000" dirty="0"/>
-              <a:t> </a:t>
-            </a:r>
-            <a:r>
-              <a:rPr lang="zh-TW" altLang="en-US" sz="2000" dirty="0"/>
-              <a:t>定義的顏色只佔</a:t>
-            </a:r>
-            <a:r>
-              <a:rPr lang="en-US" altLang="zh-TW" sz="2000" dirty="0"/>
-              <a:t>RGB</a:t>
-            </a:r>
-            <a:r>
-              <a:rPr lang="zh-TW" altLang="en-US" sz="2000" dirty="0"/>
-              <a:t>裡面</a:t>
-            </a:r>
-            <a:r>
-              <a:rPr lang="en-US" altLang="zh-TW" sz="2000" dirty="0"/>
-              <a:t>200</a:t>
-            </a:r>
-            <a:r>
-              <a:rPr lang="zh-TW" altLang="en-US" sz="2000" dirty="0"/>
-              <a:t>多個</a:t>
-            </a:r>
             <a:endParaRPr lang="en-US" altLang="zh-TW" dirty="0"/>
           </a:p>
         </p:txBody>
@@ -10856,7 +10795,7 @@
     </p:spTree>
     <p:extLst>
       <p:ext uri="{BB962C8B-B14F-4D97-AF65-F5344CB8AC3E}">
-        <p14:creationId xmlns:p14="http://schemas.microsoft.com/office/powerpoint/2010/main" val="2576856385"/>
+        <p14:creationId xmlns:p14="http://schemas.microsoft.com/office/powerpoint/2010/main" val="263751651"/>
       </p:ext>
     </p:extLst>
   </p:cSld>
@@ -10888,7 +10827,7 @@
           <p:cNvPr id="2" name="標題 1">
             <a:extLst>
               <a:ext uri="{FF2B5EF4-FFF2-40B4-BE49-F238E27FC236}">
-                <a16:creationId xmlns:a16="http://schemas.microsoft.com/office/drawing/2014/main" id="{FEDEBC06-C75E-5899-979E-C29912B4A68E}"/>
+                <a16:creationId xmlns:a16="http://schemas.microsoft.com/office/drawing/2014/main" id="{36663CA0-2783-4A34-8C5A-24686BD0A02B}"/>
               </a:ext>
             </a:extLst>
           </p:cNvPr>
@@ -10906,10 +10845,9 @@
           <a:p>
             <a:pPr algn="ctr"/>
             <a:r>
-              <a:rPr lang="en-US" altLang="zh-TW" dirty="0"/>
-              <a:t>UART RX Setting</a:t>
-            </a:r>
-            <a:endParaRPr lang="zh-TW" altLang="en-US" dirty="0"/>
+              <a:rPr lang="zh-TW" altLang="en-US" dirty="0"/>
+              <a:t>主要遇到的問題</a:t>
+            </a:r>
           </a:p>
         </p:txBody>
       </p:sp>
@@ -10918,7 +10856,7 @@
           <p:cNvPr id="3" name="內容版面配置區 2">
             <a:extLst>
               <a:ext uri="{FF2B5EF4-FFF2-40B4-BE49-F238E27FC236}">
-                <a16:creationId xmlns:a16="http://schemas.microsoft.com/office/drawing/2014/main" id="{D33F5725-65BC-FF79-0EEB-A34DF7904932}"/>
+                <a16:creationId xmlns:a16="http://schemas.microsoft.com/office/drawing/2014/main" id="{4EB3A3B7-3819-4E07-A5DF-C15C993A0B95}"/>
               </a:ext>
             </a:extLst>
           </p:cNvPr>
@@ -10931,79 +10869,155 @@
         </p:nvSpPr>
         <p:spPr/>
         <p:txBody>
-          <a:bodyPr>
-            <a:normAutofit/>
-          </a:bodyPr>
-          <a:lstStyle/>
+          <a:bodyPr/>
+          <a:lstStyle/>
+          <a:p>
+            <a:pPr marL="0" indent="0">
+              <a:buNone/>
+            </a:pPr>
+            <a:r>
+              <a:rPr lang="zh-TW" altLang="en-US" dirty="0">
+                <a:solidFill>
+                  <a:schemeClr val="accent1"/>
+                </a:solidFill>
+              </a:rPr>
+              <a:t>問題</a:t>
+            </a:r>
+            <a:endParaRPr lang="en-US" altLang="zh-TW" dirty="0">
+              <a:solidFill>
+                <a:schemeClr val="accent1"/>
+              </a:solidFill>
+            </a:endParaRPr>
+          </a:p>
           <a:p>
             <a:pPr marL="514350" indent="-514350">
               <a:buAutoNum type="arabicPeriod"/>
             </a:pPr>
-            <a:r>
-              <a:rPr lang="en-US" altLang="zh-TW" sz="2000" dirty="0"/>
-              <a:t>UART</a:t>
-            </a:r>
-            <a:r>
-              <a:rPr lang="zh-TW" altLang="en-US" sz="2000" dirty="0"/>
-              <a:t> </a:t>
-            </a:r>
-            <a:r>
-              <a:rPr lang="en-US" altLang="zh-TW" sz="2000" dirty="0"/>
-              <a:t>RX</a:t>
-            </a:r>
-            <a:r>
-              <a:rPr lang="zh-TW" altLang="en-US" sz="2000" dirty="0"/>
-              <a:t> 使用</a:t>
-            </a:r>
-            <a:r>
-              <a:rPr lang="en-US" altLang="zh-TW" sz="2000" dirty="0"/>
-              <a:t>FIFO</a:t>
-            </a:r>
-            <a:r>
-              <a:rPr lang="zh-TW" altLang="en-US" sz="2000" dirty="0"/>
-              <a:t> 架構、這個</a:t>
-            </a:r>
-            <a:r>
-              <a:rPr lang="en-US" altLang="zh-TW" sz="2000" dirty="0"/>
-              <a:t>FIFO</a:t>
-            </a:r>
-            <a:r>
-              <a:rPr lang="zh-TW" altLang="en-US" sz="2000" dirty="0"/>
-              <a:t>架構是被封裝過。</a:t>
-            </a:r>
-            <a:endParaRPr lang="en-US" altLang="zh-TW" sz="2000" dirty="0"/>
+            <a:endParaRPr lang="en-US" altLang="zh-TW" dirty="0"/>
           </a:p>
           <a:p>
             <a:pPr marL="514350" indent="-514350">
               <a:buAutoNum type="arabicPeriod"/>
             </a:pPr>
+            <a:r>
+              <a:rPr lang="zh-TW" altLang="en-US" sz="2400" dirty="0">
+                <a:hlinkClick r:id="rId3" action="ppaction://hlinksldjump"/>
+              </a:rPr>
+              <a:t>傳輸問題 </a:t>
+            </a:r>
+            <a:r>
+              <a:rPr lang="en-US" altLang="zh-TW" sz="2400" dirty="0"/>
+              <a:t>:</a:t>
+            </a:r>
+            <a:r>
+              <a:rPr lang="zh-TW" altLang="en-US" sz="2400" dirty="0"/>
+              <a:t> </a:t>
+            </a:r>
+            <a:endParaRPr lang="en-US" altLang="zh-TW" sz="2400" dirty="0"/>
+          </a:p>
+          <a:p>
+            <a:pPr marL="457200" lvl="1" indent="0">
+              <a:buNone/>
+            </a:pPr>
+            <a:r>
+              <a:rPr lang="en-US" altLang="zh-TW" sz="2000" dirty="0"/>
+              <a:t>1.  Set UART</a:t>
+            </a:r>
+            <a:r>
+              <a:rPr lang="zh-TW" altLang="en-US" sz="2000" dirty="0"/>
+              <a:t> </a:t>
+            </a:r>
+            <a:r>
+              <a:rPr lang="en-US" altLang="zh-TW" sz="2000" dirty="0"/>
+              <a:t>RX</a:t>
+            </a:r>
+            <a:r>
+              <a:rPr lang="zh-TW" altLang="en-US" sz="2000" dirty="0"/>
+              <a:t> </a:t>
+            </a:r>
+            <a:r>
+              <a:rPr lang="en-US" altLang="zh-TW" sz="2000" dirty="0"/>
+              <a:t>Setting </a:t>
+            </a:r>
+            <a:r>
+              <a:rPr lang="zh-TW" altLang="en-US" sz="2000" dirty="0"/>
+              <a:t>以及 </a:t>
+            </a:r>
+            <a:r>
+              <a:rPr lang="en-US" altLang="zh-TW" sz="2000" dirty="0"/>
+              <a:t>Flow </a:t>
+            </a:r>
+            <a:r>
+              <a:rPr lang="zh-TW" altLang="en-US" sz="2000" dirty="0"/>
+              <a:t>規劃</a:t>
+            </a:r>
             <a:endParaRPr lang="en-US" altLang="zh-TW" sz="2000" dirty="0"/>
           </a:p>
           <a:p>
-            <a:pPr marL="514350" indent="-514350">
-              <a:buAutoNum type="arabicPeriod"/>
+            <a:pPr marL="0" indent="0">
+              <a:buNone/>
             </a:pPr>
-            <a:endParaRPr lang="en-US" altLang="zh-TW" sz="2000" dirty="0"/>
-          </a:p>
-          <a:p>
-            <a:pPr marL="514350" indent="-514350">
-              <a:buAutoNum type="arabicPeriod"/>
+            <a:endParaRPr lang="en-US" altLang="zh-TW" sz="2400" dirty="0"/>
+          </a:p>
+          <a:p>
+            <a:pPr marL="457200" indent="-457200">
+              <a:buAutoNum type="arabicPeriod" startAt="2"/>
             </a:pPr>
             <a:r>
+              <a:rPr lang="zh-TW" altLang="en-US" sz="2400" dirty="0">
+                <a:hlinkClick r:id="rId4" action="ppaction://hlinksldjump"/>
+              </a:rPr>
+              <a:t>最接近顏色</a:t>
+            </a:r>
+            <a:r>
+              <a:rPr lang="en-US" altLang="zh-TW" sz="2400" dirty="0"/>
+              <a:t>:</a:t>
+            </a:r>
+          </a:p>
+          <a:p>
+            <a:pPr marL="914400" lvl="1" indent="-457200">
+              <a:buAutoNum type="arabicPeriod" startAt="2"/>
+            </a:pPr>
+            <a:r>
+              <a:rPr lang="zh-TW" altLang="en-US" sz="2000" dirty="0"/>
+              <a:t>筆的</a:t>
+            </a:r>
+            <a:r>
+              <a:rPr lang="en-US" altLang="zh-TW" sz="2000" dirty="0" err="1"/>
+              <a:t>Protocal</a:t>
+            </a:r>
+            <a:r>
               <a:rPr lang="en-US" altLang="zh-TW" sz="2000" dirty="0"/>
-              <a:t>UART RX</a:t>
+              <a:t> </a:t>
             </a:r>
             <a:r>
               <a:rPr lang="zh-TW" altLang="en-US" sz="2000" dirty="0"/>
-              <a:t> 中斷硬體設計</a:t>
-            </a:r>
+              <a:t>定義的顏色只佔</a:t>
+            </a:r>
+            <a:r>
+              <a:rPr lang="en-US" altLang="zh-TW" sz="2000" dirty="0"/>
+              <a:t>RGB</a:t>
+            </a:r>
+            <a:r>
+              <a:rPr lang="zh-TW" altLang="en-US" sz="2000" dirty="0"/>
+              <a:t>裡面</a:t>
+            </a:r>
+            <a:r>
+              <a:rPr lang="en-US" altLang="zh-TW" sz="2000" dirty="0"/>
+              <a:t>200</a:t>
+            </a:r>
+            <a:r>
+              <a:rPr lang="zh-TW" altLang="en-US" sz="2000" dirty="0"/>
+              <a:t>多個</a:t>
+            </a:r>
+            <a:endParaRPr lang="en-US" altLang="zh-TW" dirty="0"/>
           </a:p>
         </p:txBody>
       </p:sp>
     </p:spTree>
     <p:extLst>
       <p:ext uri="{BB962C8B-B14F-4D97-AF65-F5344CB8AC3E}">
-        <p14:creationId xmlns:p14="http://schemas.microsoft.com/office/powerpoint/2010/main" val="3743749783"/>
+        <p14:creationId xmlns:p14="http://schemas.microsoft.com/office/powerpoint/2010/main" val="2576856385"/>
       </p:ext>
     </p:extLst>
   </p:cSld>
@@ -11083,16 +11097,12 @@
           </a:bodyPr>
           <a:lstStyle/>
           <a:p>
-            <a:pPr marL="0" indent="0">
-              <a:buNone/>
+            <a:pPr marL="514350" indent="-514350">
+              <a:buAutoNum type="arabicPeriod"/>
             </a:pPr>
             <a:r>
-              <a:rPr lang="zh-TW" altLang="en-US" sz="2000" dirty="0"/>
-              <a:t>總結 </a:t>
-            </a:r>
-            <a:r>
               <a:rPr lang="en-US" altLang="zh-TW" sz="2000" dirty="0"/>
-              <a:t>:</a:t>
+              <a:t>UART</a:t>
             </a:r>
             <a:r>
               <a:rPr lang="zh-TW" altLang="en-US" sz="2000" dirty="0"/>
@@ -11100,44 +11110,61 @@
             </a:r>
             <a:r>
               <a:rPr lang="en-US" altLang="zh-TW" sz="2000" dirty="0"/>
-              <a:t> </a:t>
+              <a:t>RX</a:t>
             </a:r>
             <a:r>
               <a:rPr lang="zh-TW" altLang="en-US" sz="2000" dirty="0"/>
-              <a:t>由於使用情況是使用者隨時可能會去觸動後發</a:t>
+              <a:t> 使用</a:t>
             </a:r>
             <a:r>
               <a:rPr lang="en-US" altLang="zh-TW" sz="2000" dirty="0"/>
-              <a:t>Sensor</a:t>
+              <a:t>FIFO</a:t>
             </a:r>
             <a:r>
               <a:rPr lang="zh-TW" altLang="en-US" sz="2000" dirty="0"/>
-              <a:t>、筆本身還要</a:t>
+              <a:t> 架構、這個</a:t>
             </a:r>
             <a:r>
               <a:rPr lang="en-US" altLang="zh-TW" sz="2000" dirty="0"/>
-              <a:t>Decode </a:t>
+              <a:t>FIFO</a:t>
             </a:r>
             <a:r>
               <a:rPr lang="zh-TW" altLang="en-US" sz="2000" dirty="0"/>
-              <a:t>訊號，因此中斷是最佳方法，</a:t>
-            </a:r>
+              <a:t>架構是被封裝過。</a:t>
+            </a:r>
+            <a:endParaRPr lang="en-US" altLang="zh-TW" sz="2000" dirty="0"/>
+          </a:p>
+          <a:p>
+            <a:pPr marL="514350" indent="-514350">
+              <a:buAutoNum type="arabicPeriod"/>
+            </a:pPr>
+            <a:endParaRPr lang="en-US" altLang="zh-TW" sz="2000" dirty="0"/>
+          </a:p>
+          <a:p>
+            <a:pPr marL="514350" indent="-514350">
+              <a:buAutoNum type="arabicPeriod"/>
+            </a:pPr>
+            <a:endParaRPr lang="en-US" altLang="zh-TW" sz="2000" dirty="0"/>
+          </a:p>
+          <a:p>
+            <a:pPr marL="514350" indent="-514350">
+              <a:buAutoNum type="arabicPeriod"/>
+            </a:pPr>
             <a:r>
               <a:rPr lang="en-US" altLang="zh-TW" sz="2000" dirty="0"/>
-              <a:t>Polling </a:t>
+              <a:t>UART RX</a:t>
             </a:r>
             <a:r>
               <a:rPr lang="zh-TW" altLang="en-US" sz="2000" dirty="0"/>
-              <a:t>去偵測就不是好方法並且耗電</a:t>
-            </a:r>
-            <a:endParaRPr lang="en-US" altLang="zh-TW" sz="2000" dirty="0"/>
+              <a:t> 中斷硬體設計</a:t>
+            </a:r>
           </a:p>
         </p:txBody>
       </p:sp>
     </p:spTree>
     <p:extLst>
       <p:ext uri="{BB962C8B-B14F-4D97-AF65-F5344CB8AC3E}">
-        <p14:creationId xmlns:p14="http://schemas.microsoft.com/office/powerpoint/2010/main" val="1764172780"/>
+        <p14:creationId xmlns:p14="http://schemas.microsoft.com/office/powerpoint/2010/main" val="3743749783"/>
       </p:ext>
     </p:extLst>
   </p:cSld>
@@ -11233,6 +11260,12 @@
             <a:endParaRPr lang="en-US" altLang="zh-TW" dirty="0"/>
           </a:p>
           <a:p>
+            <a:pPr marL="0" indent="0">
+              <a:buNone/>
+            </a:pPr>
+            <a:endParaRPr lang="en-US" altLang="zh-TW" dirty="0"/>
+          </a:p>
+          <a:p>
             <a:pPr marL="514350" indent="-514350">
               <a:buAutoNum type="arabicPeriod"/>
             </a:pPr>
@@ -11254,7 +11287,7 @@
             </a:pPr>
             <a:r>
               <a:rPr lang="zh-TW" altLang="en-US" dirty="0"/>
-              <a:t>架構解決的問題列表</a:t>
+              <a:t>解決的問題列表</a:t>
             </a:r>
             <a:endParaRPr lang="en-US" altLang="zh-TW" dirty="0"/>
           </a:p>
@@ -11327,7 +11360,7 @@
           <p:cNvPr id="2" name="標題 1">
             <a:extLst>
               <a:ext uri="{FF2B5EF4-FFF2-40B4-BE49-F238E27FC236}">
-                <a16:creationId xmlns:a16="http://schemas.microsoft.com/office/drawing/2014/main" id="{DCAF803D-3CAB-3E11-8A90-4D5310A3A5EA}"/>
+                <a16:creationId xmlns:a16="http://schemas.microsoft.com/office/drawing/2014/main" id="{FEDEBC06-C75E-5899-979E-C29912B4A68E}"/>
               </a:ext>
             </a:extLst>
           </p:cNvPr>
@@ -11357,7 +11390,7 @@
           <p:cNvPr id="3" name="內容版面配置區 2">
             <a:extLst>
               <a:ext uri="{FF2B5EF4-FFF2-40B4-BE49-F238E27FC236}">
-                <a16:creationId xmlns:a16="http://schemas.microsoft.com/office/drawing/2014/main" id="{3B1B8A68-518A-9A03-2325-0016A63D6547}"/>
+                <a16:creationId xmlns:a16="http://schemas.microsoft.com/office/drawing/2014/main" id="{D33F5725-65BC-FF79-0EEB-A34DF7904932}"/>
               </a:ext>
             </a:extLst>
           </p:cNvPr>
@@ -11370,151 +11403,66 @@
         </p:nvSpPr>
         <p:spPr/>
         <p:txBody>
-          <a:bodyPr/>
+          <a:bodyPr>
+            <a:normAutofit/>
+          </a:bodyPr>
           <a:lstStyle/>
           <a:p>
             <a:pPr marL="0" indent="0">
               <a:buNone/>
             </a:pPr>
             <a:r>
-              <a:rPr lang="zh-TW" altLang="en-US" dirty="0">
-                <a:solidFill>
-                  <a:schemeClr val="accent1"/>
-                </a:solidFill>
-              </a:rPr>
-              <a:t>過程中遇到最大問題 </a:t>
-            </a:r>
-            <a:r>
-              <a:rPr lang="en-US" altLang="zh-TW" dirty="0">
-                <a:solidFill>
-                  <a:schemeClr val="accent1"/>
-                </a:solidFill>
-              </a:rPr>
-              <a:t>: </a:t>
-            </a:r>
-          </a:p>
-          <a:p>
-            <a:pPr marL="0" indent="0">
-              <a:buNone/>
-            </a:pPr>
-            <a:r>
-              <a:rPr lang="zh-TW" altLang="en-US" sz="2400" dirty="0"/>
-              <a:t>收完</a:t>
-            </a:r>
-            <a:r>
-              <a:rPr lang="en-US" altLang="zh-TW" sz="2400" dirty="0"/>
-              <a:t>Sensor Data</a:t>
-            </a:r>
-            <a:r>
-              <a:rPr lang="zh-TW" altLang="en-US" sz="2400" dirty="0"/>
-              <a:t>後，顯示資料卻有漏東漏西</a:t>
-            </a:r>
-            <a:endParaRPr lang="en-US" altLang="zh-TW" sz="2400" dirty="0"/>
-          </a:p>
-          <a:p>
-            <a:pPr marL="0" indent="0">
-              <a:buNone/>
-            </a:pPr>
-            <a:r>
-              <a:rPr lang="en-US" altLang="zh-TW" sz="2400" dirty="0"/>
-              <a:t>Source</a:t>
-            </a:r>
-          </a:p>
-          <a:p>
-            <a:pPr marL="0" indent="0">
-              <a:buNone/>
-            </a:pPr>
-            <a:r>
-              <a:rPr lang="en-US" altLang="zh-TW" sz="2400" dirty="0"/>
-              <a:t>1 . </a:t>
-            </a:r>
-            <a:r>
-              <a:rPr lang="zh-TW" altLang="en-US" sz="2400" dirty="0"/>
-              <a:t> 硬體觸發設定 </a:t>
-            </a:r>
-            <a:r>
-              <a:rPr lang="en-US" altLang="zh-TW" sz="2400" dirty="0"/>
-              <a:t>: 4Bytes -&gt; 1Bytes</a:t>
-            </a:r>
-          </a:p>
-          <a:p>
-            <a:pPr marL="0" indent="0">
-              <a:buNone/>
-            </a:pPr>
-            <a:r>
-              <a:rPr lang="en-US" altLang="zh-TW" sz="2400" dirty="0"/>
-              <a:t>2. </a:t>
-            </a:r>
-            <a:r>
-              <a:rPr lang="zh-TW" altLang="en-US" sz="2400" dirty="0"/>
+              <a:rPr lang="zh-TW" altLang="en-US" sz="2000" dirty="0"/>
+              <a:t>總結 </a:t>
+            </a:r>
+            <a:r>
+              <a:rPr lang="en-US" altLang="zh-TW" sz="2000" dirty="0"/>
+              <a:t>:</a:t>
+            </a:r>
+            <a:r>
+              <a:rPr lang="zh-TW" altLang="en-US" sz="2000" dirty="0"/>
               <a:t> </a:t>
             </a:r>
             <a:r>
-              <a:rPr lang="zh-TW" altLang="en-US" sz="2400" dirty="0">
-                <a:solidFill>
-                  <a:srgbClr val="FF0000"/>
-                </a:solidFill>
-              </a:rPr>
-              <a:t>解除中斷</a:t>
-            </a:r>
-            <a:r>
-              <a:rPr lang="en-US" altLang="zh-TW" sz="2400" dirty="0">
-                <a:solidFill>
-                  <a:srgbClr val="FF0000"/>
-                </a:solidFill>
-              </a:rPr>
-              <a:t>Event </a:t>
-            </a:r>
-            <a:r>
-              <a:rPr lang="en-US" altLang="zh-TW" sz="2400" dirty="0" err="1">
-                <a:solidFill>
-                  <a:srgbClr val="FF0000"/>
-                </a:solidFill>
-              </a:rPr>
-              <a:t>regestier</a:t>
-            </a:r>
-            <a:r>
-              <a:rPr lang="zh-TW" altLang="en-US" sz="2400" dirty="0">
-                <a:solidFill>
-                  <a:srgbClr val="FF0000"/>
-                </a:solidFill>
-              </a:rPr>
-              <a:t>在</a:t>
-            </a:r>
-            <a:r>
-              <a:rPr lang="en-US" altLang="zh-TW" sz="2400" dirty="0">
-                <a:solidFill>
-                  <a:srgbClr val="FF0000"/>
-                </a:solidFill>
-              </a:rPr>
-              <a:t>Code</a:t>
-            </a:r>
-            <a:r>
-              <a:rPr lang="zh-TW" altLang="en-US" sz="2400" dirty="0">
-                <a:solidFill>
-                  <a:srgbClr val="FF0000"/>
-                </a:solidFill>
-              </a:rPr>
-              <a:t>中的位置</a:t>
-            </a:r>
-            <a:endParaRPr lang="en-US" altLang="zh-TW" sz="2400" dirty="0">
-              <a:solidFill>
-                <a:srgbClr val="FF0000"/>
-              </a:solidFill>
-            </a:endParaRPr>
-          </a:p>
-          <a:p>
-            <a:pPr marL="0" indent="0">
-              <a:buNone/>
-            </a:pPr>
-            <a:endParaRPr lang="zh-TW" altLang="en-US" dirty="0"/>
+              <a:rPr lang="en-US" altLang="zh-TW" sz="2000" dirty="0"/>
+              <a:t> </a:t>
+            </a:r>
+            <a:r>
+              <a:rPr lang="zh-TW" altLang="en-US" sz="2000" dirty="0"/>
+              <a:t>由於使用情況是使用者隨時可能會去觸動後發</a:t>
+            </a:r>
+            <a:r>
+              <a:rPr lang="en-US" altLang="zh-TW" sz="2000" dirty="0"/>
+              <a:t>Sensor</a:t>
+            </a:r>
+            <a:r>
+              <a:rPr lang="zh-TW" altLang="en-US" sz="2000" dirty="0"/>
+              <a:t>、筆本身還要</a:t>
+            </a:r>
+            <a:r>
+              <a:rPr lang="en-US" altLang="zh-TW" sz="2000" dirty="0"/>
+              <a:t>Decode </a:t>
+            </a:r>
+            <a:r>
+              <a:rPr lang="zh-TW" altLang="en-US" sz="2000" dirty="0"/>
+              <a:t>訊號，因此中斷是最佳方法，</a:t>
+            </a:r>
+            <a:r>
+              <a:rPr lang="en-US" altLang="zh-TW" sz="2000" dirty="0"/>
+              <a:t>Polling </a:t>
+            </a:r>
+            <a:r>
+              <a:rPr lang="zh-TW" altLang="en-US" sz="2000" dirty="0"/>
+              <a:t>去偵測就不是好方法並且耗電</a:t>
+            </a:r>
+            <a:endParaRPr lang="en-US" altLang="zh-TW" sz="2000" dirty="0"/>
           </a:p>
         </p:txBody>
       </p:sp>
     </p:spTree>
     <p:extLst>
       <p:ext uri="{BB962C8B-B14F-4D97-AF65-F5344CB8AC3E}">
-        <p14:creationId xmlns:p14="http://schemas.microsoft.com/office/powerpoint/2010/main" val="719165155"/>
+        <p14:creationId xmlns:p14="http://schemas.microsoft.com/office/powerpoint/2010/main" val="1764172780"/>
       </p:ext>
     </p:extLst>
   </p:cSld>
@@ -11546,7 +11494,7 @@
           <p:cNvPr id="2" name="標題 1">
             <a:extLst>
               <a:ext uri="{FF2B5EF4-FFF2-40B4-BE49-F238E27FC236}">
-                <a16:creationId xmlns:a16="http://schemas.microsoft.com/office/drawing/2014/main" id="{A90C3E7E-AE4E-452E-A66F-A6DA326A606E}"/>
+                <a16:creationId xmlns:a16="http://schemas.microsoft.com/office/drawing/2014/main" id="{DCAF803D-3CAB-3E11-8A90-4D5310A3A5EA}"/>
               </a:ext>
             </a:extLst>
           </p:cNvPr>
@@ -11564,8 +11512,8 @@
           <a:p>
             <a:pPr algn="ctr"/>
             <a:r>
-              <a:rPr lang="zh-TW" altLang="en-US" sz="4400" dirty="0"/>
-              <a:t>最接近顏色</a:t>
+              <a:rPr lang="en-US" altLang="zh-TW" dirty="0"/>
+              <a:t>UART RX Setting</a:t>
             </a:r>
             <a:endParaRPr lang="zh-TW" altLang="en-US" dirty="0"/>
           </a:p>
@@ -11576,7 +11524,7 @@
           <p:cNvPr id="3" name="內容版面配置區 2">
             <a:extLst>
               <a:ext uri="{FF2B5EF4-FFF2-40B4-BE49-F238E27FC236}">
-                <a16:creationId xmlns:a16="http://schemas.microsoft.com/office/drawing/2014/main" id="{2270879B-7395-4917-86B4-47F549C5A985}"/>
+                <a16:creationId xmlns:a16="http://schemas.microsoft.com/office/drawing/2014/main" id="{3B1B8A68-518A-9A03-2325-0016A63D6547}"/>
               </a:ext>
             </a:extLst>
           </p:cNvPr>
@@ -11596,89 +11544,144 @@
               <a:buNone/>
             </a:pPr>
             <a:r>
-              <a:rPr lang="en-US" altLang="zh-TW" dirty="0"/>
-              <a:t>Root Cause :</a:t>
-            </a:r>
-          </a:p>
-          <a:p>
-            <a:pPr marL="514350" indent="-514350">
-              <a:buAutoNum type="arabicPeriod"/>
-            </a:pPr>
-            <a:r>
-              <a:rPr lang="en-US" altLang="zh-TW" dirty="0"/>
-              <a:t>Sensor </a:t>
-            </a:r>
-            <a:r>
-              <a:rPr lang="zh-TW" altLang="en-US" dirty="0"/>
-              <a:t>傳輸的顏色，並不一定落在</a:t>
-            </a:r>
-            <a:r>
-              <a:rPr lang="en-US" altLang="zh-TW" dirty="0"/>
-              <a:t>USI</a:t>
-            </a:r>
-            <a:r>
-              <a:rPr lang="zh-TW" altLang="en-US" dirty="0"/>
-              <a:t>所定義的顏色，因此需要找到最接近的顏色。</a:t>
-            </a:r>
-            <a:endParaRPr lang="en-US" altLang="zh-TW" dirty="0"/>
-          </a:p>
-          <a:p>
-            <a:pPr marL="514350" indent="-514350">
-              <a:buAutoNum type="arabicPeriod"/>
-            </a:pPr>
-            <a:endParaRPr lang="en-US" altLang="zh-TW" dirty="0"/>
+              <a:rPr lang="zh-TW" altLang="en-US" dirty="0">
+                <a:solidFill>
+                  <a:schemeClr val="accent1"/>
+                </a:solidFill>
+              </a:rPr>
+              <a:t>過程中遇到最大問題 </a:t>
+            </a:r>
+            <a:r>
+              <a:rPr lang="en-US" altLang="zh-TW" dirty="0">
+                <a:solidFill>
+                  <a:schemeClr val="accent1"/>
+                </a:solidFill>
+              </a:rPr>
+              <a:t>: </a:t>
+            </a:r>
           </a:p>
           <a:p>
             <a:pPr marL="0" indent="0">
               <a:buNone/>
             </a:pPr>
             <a:r>
-              <a:rPr lang="en-US" altLang="zh-TW" dirty="0"/>
-              <a:t>Solve :</a:t>
-            </a:r>
+              <a:rPr lang="zh-TW" altLang="en-US" sz="2400" dirty="0"/>
+              <a:t>收完</a:t>
+            </a:r>
+            <a:r>
+              <a:rPr lang="en-US" altLang="zh-TW" sz="2400" dirty="0"/>
+              <a:t>Sensor Data</a:t>
+            </a:r>
+            <a:r>
+              <a:rPr lang="zh-TW" altLang="en-US" sz="2400" dirty="0"/>
+              <a:t>後，顯示資料卻有漏東漏西</a:t>
+            </a:r>
+            <a:endParaRPr lang="en-US" altLang="zh-TW" sz="2400" dirty="0"/>
           </a:p>
           <a:p>
             <a:pPr marL="0" indent="0">
               <a:buNone/>
             </a:pPr>
             <a:r>
-              <a:rPr lang="en-US" altLang="zh-TW" dirty="0"/>
-              <a:t>	1. </a:t>
-            </a:r>
-            <a:r>
-              <a:rPr lang="zh-TW" altLang="en-US" dirty="0"/>
-              <a:t>顏色距離定義</a:t>
-            </a:r>
-            <a:endParaRPr lang="en-US" altLang="zh-TW" dirty="0"/>
+              <a:rPr lang="en-US" altLang="zh-TW" sz="2400" dirty="0"/>
+              <a:t>Source</a:t>
+            </a:r>
           </a:p>
           <a:p>
             <a:pPr marL="0" indent="0">
               <a:buNone/>
             </a:pPr>
             <a:r>
-              <a:rPr lang="en-US" altLang="zh-TW" dirty="0"/>
-              <a:t>	2.  </a:t>
-            </a:r>
-            <a:r>
-              <a:rPr lang="zh-TW" altLang="en-US" dirty="0"/>
-              <a:t>使用</a:t>
-            </a:r>
-            <a:r>
-              <a:rPr lang="en-US" altLang="zh-TW" dirty="0" err="1"/>
-              <a:t>matlab</a:t>
-            </a:r>
-            <a:r>
-              <a:rPr lang="zh-TW" altLang="en-US" dirty="0"/>
-              <a:t>來加速驗證速度</a:t>
-            </a:r>
-            <a:endParaRPr lang="en-US" altLang="zh-TW" dirty="0"/>
+              <a:rPr lang="en-US" altLang="zh-TW" sz="2400" dirty="0"/>
+              <a:t>1 . </a:t>
+            </a:r>
+            <a:r>
+              <a:rPr lang="zh-TW" altLang="en-US" sz="2400" dirty="0"/>
+              <a:t> 硬體觸發設定 </a:t>
+            </a:r>
+            <a:r>
+              <a:rPr lang="en-US" altLang="zh-TW" sz="2400" dirty="0"/>
+              <a:t>: 4Bytes -&gt; 1Bytes</a:t>
+            </a:r>
+          </a:p>
+          <a:p>
+            <a:pPr marL="0" indent="0">
+              <a:buNone/>
+            </a:pPr>
+            <a:r>
+              <a:rPr lang="en-US" altLang="zh-TW" sz="2400" dirty="0"/>
+              <a:t>2. </a:t>
+            </a:r>
+            <a:r>
+              <a:rPr lang="zh-TW" altLang="en-US" sz="2400" dirty="0"/>
+              <a:t> </a:t>
+            </a:r>
+            <a:r>
+              <a:rPr lang="zh-TW" altLang="en-US" sz="2400" dirty="0">
+                <a:solidFill>
+                  <a:srgbClr val="FF0000"/>
+                </a:solidFill>
+              </a:rPr>
+              <a:t>解除中斷</a:t>
+            </a:r>
+            <a:r>
+              <a:rPr lang="en-US" altLang="zh-TW" sz="2400" dirty="0">
+                <a:solidFill>
+                  <a:srgbClr val="FF0000"/>
+                </a:solidFill>
+              </a:rPr>
+              <a:t>Event </a:t>
+            </a:r>
+            <a:r>
+              <a:rPr lang="en-US" altLang="zh-TW" sz="2400" dirty="0" err="1">
+                <a:solidFill>
+                  <a:srgbClr val="FF0000"/>
+                </a:solidFill>
+              </a:rPr>
+              <a:t>regestier</a:t>
+            </a:r>
+            <a:r>
+              <a:rPr lang="zh-TW" altLang="en-US" sz="2400" dirty="0">
+                <a:solidFill>
+                  <a:srgbClr val="FF0000"/>
+                </a:solidFill>
+              </a:rPr>
+              <a:t>在</a:t>
+            </a:r>
+            <a:r>
+              <a:rPr lang="en-US" altLang="zh-TW" sz="2400" dirty="0">
+                <a:solidFill>
+                  <a:srgbClr val="FF0000"/>
+                </a:solidFill>
+              </a:rPr>
+              <a:t>Code</a:t>
+            </a:r>
+            <a:r>
+              <a:rPr lang="zh-TW" altLang="en-US" sz="2400" dirty="0">
+                <a:solidFill>
+                  <a:srgbClr val="FF0000"/>
+                </a:solidFill>
+              </a:rPr>
+              <a:t>中的位置</a:t>
+            </a:r>
+            <a:endParaRPr lang="en-US" altLang="zh-TW" sz="2400" dirty="0">
+              <a:solidFill>
+                <a:srgbClr val="FF0000"/>
+              </a:solidFill>
+            </a:endParaRPr>
+          </a:p>
+          <a:p>
+            <a:pPr marL="0" indent="0">
+              <a:buNone/>
+            </a:pPr>
+            <a:endParaRPr lang="zh-TW" altLang="en-US" dirty="0"/>
           </a:p>
         </p:txBody>
       </p:sp>
     </p:spTree>
     <p:extLst>
       <p:ext uri="{BB962C8B-B14F-4D97-AF65-F5344CB8AC3E}">
-        <p14:creationId xmlns:p14="http://schemas.microsoft.com/office/powerpoint/2010/main" val="2172983373"/>
+        <p14:creationId xmlns:p14="http://schemas.microsoft.com/office/powerpoint/2010/main" val="719165155"/>
       </p:ext>
     </p:extLst>
   </p:cSld>
@@ -11710,7 +11713,7 @@
           <p:cNvPr id="2" name="標題 1">
             <a:extLst>
               <a:ext uri="{FF2B5EF4-FFF2-40B4-BE49-F238E27FC236}">
-                <a16:creationId xmlns:a16="http://schemas.microsoft.com/office/drawing/2014/main" id="{77C37F21-5DBA-B401-7D71-7CFB5E6E6C5D}"/>
+                <a16:creationId xmlns:a16="http://schemas.microsoft.com/office/drawing/2014/main" id="{A90C3E7E-AE4E-452E-A66F-A6DA326A606E}"/>
               </a:ext>
             </a:extLst>
           </p:cNvPr>
@@ -11728,21 +11731,10 @@
           <a:p>
             <a:pPr algn="ctr"/>
             <a:r>
-              <a:rPr lang="zh-TW" altLang="en-US" dirty="0"/>
-              <a:t> </a:t>
-            </a:r>
-            <a:r>
-              <a:rPr lang="en-US" altLang="zh-TW" dirty="0" err="1"/>
-              <a:t>Matlab</a:t>
-            </a:r>
-            <a:r>
-              <a:rPr lang="en-US" altLang="zh-TW" dirty="0"/>
-              <a:t> </a:t>
-            </a:r>
-            <a:r>
-              <a:rPr lang="zh-TW" altLang="en-US" dirty="0"/>
-              <a:t>驗證</a:t>
-            </a:r>
+              <a:rPr lang="zh-TW" altLang="en-US" sz="4400" dirty="0"/>
+              <a:t>最接近顏色</a:t>
+            </a:r>
+            <a:endParaRPr lang="zh-TW" altLang="en-US" dirty="0"/>
           </a:p>
         </p:txBody>
       </p:sp>
@@ -11751,7 +11743,7 @@
           <p:cNvPr id="3" name="內容版面配置區 2">
             <a:extLst>
               <a:ext uri="{FF2B5EF4-FFF2-40B4-BE49-F238E27FC236}">
-                <a16:creationId xmlns:a16="http://schemas.microsoft.com/office/drawing/2014/main" id="{534E79D0-3692-7581-7815-5DEF93BC5DAC}"/>
+                <a16:creationId xmlns:a16="http://schemas.microsoft.com/office/drawing/2014/main" id="{2270879B-7395-4917-86B4-47F549C5A985}"/>
               </a:ext>
             </a:extLst>
           </p:cNvPr>
@@ -11772,27 +11764,88 @@
             </a:pPr>
             <a:r>
               <a:rPr lang="en-US" altLang="zh-TW" dirty="0"/>
-              <a:t>Use </a:t>
+              <a:t>Root Cause :</a:t>
+            </a:r>
+          </a:p>
+          <a:p>
+            <a:pPr marL="514350" indent="-514350">
+              <a:buAutoNum type="arabicPeriod"/>
+            </a:pPr>
+            <a:r>
+              <a:rPr lang="en-US" altLang="zh-TW" dirty="0"/>
+              <a:t>Sensor </a:t>
+            </a:r>
+            <a:r>
+              <a:rPr lang="zh-TW" altLang="en-US" dirty="0"/>
+              <a:t>傳輸的顏色，並不一定落在</a:t>
+            </a:r>
+            <a:r>
+              <a:rPr lang="en-US" altLang="zh-TW" dirty="0"/>
+              <a:t>USI</a:t>
+            </a:r>
+            <a:r>
+              <a:rPr lang="zh-TW" altLang="en-US" dirty="0"/>
+              <a:t>所定義的顏色，因此需要找到最接近的顏色。</a:t>
+            </a:r>
+            <a:endParaRPr lang="en-US" altLang="zh-TW" dirty="0"/>
+          </a:p>
+          <a:p>
+            <a:pPr marL="514350" indent="-514350">
+              <a:buAutoNum type="arabicPeriod"/>
+            </a:pPr>
+            <a:endParaRPr lang="en-US" altLang="zh-TW" dirty="0"/>
+          </a:p>
+          <a:p>
+            <a:pPr marL="0" indent="0">
+              <a:buNone/>
+            </a:pPr>
+            <a:r>
+              <a:rPr lang="en-US" altLang="zh-TW" dirty="0"/>
+              <a:t>Solve :</a:t>
+            </a:r>
+          </a:p>
+          <a:p>
+            <a:pPr marL="0" indent="0">
+              <a:buNone/>
+            </a:pPr>
+            <a:r>
+              <a:rPr lang="en-US" altLang="zh-TW" dirty="0"/>
+              <a:t>	1. </a:t>
+            </a:r>
+            <a:r>
+              <a:rPr lang="zh-TW" altLang="en-US" dirty="0"/>
+              <a:t>顏色距離定義</a:t>
+            </a:r>
+            <a:endParaRPr lang="en-US" altLang="zh-TW" dirty="0"/>
+          </a:p>
+          <a:p>
+            <a:pPr marL="0" indent="0">
+              <a:buNone/>
+            </a:pPr>
+            <a:r>
+              <a:rPr lang="en-US" altLang="zh-TW" dirty="0"/>
+              <a:t>	2.  </a:t>
+            </a:r>
+            <a:r>
+              <a:rPr lang="zh-TW" altLang="en-US" dirty="0"/>
+              <a:t>使用</a:t>
             </a:r>
             <a:r>
               <a:rPr lang="en-US" altLang="zh-TW" dirty="0" err="1"/>
-              <a:t>Matalb</a:t>
-            </a:r>
-            <a:r>
-              <a:rPr lang="en-US" altLang="zh-TW" dirty="0"/>
-              <a:t> APP</a:t>
-            </a:r>
-            <a:r>
-              <a:rPr lang="zh-TW" altLang="en-US" dirty="0"/>
-              <a:t> 寫的</a:t>
-            </a:r>
+              <a:t>matlab</a:t>
+            </a:r>
+            <a:r>
+              <a:rPr lang="zh-TW" altLang="en-US" dirty="0"/>
+              <a:t>來加速驗證速度</a:t>
+            </a:r>
+            <a:endParaRPr lang="en-US" altLang="zh-TW" dirty="0"/>
           </a:p>
         </p:txBody>
       </p:sp>
     </p:spTree>
     <p:extLst>
       <p:ext uri="{BB962C8B-B14F-4D97-AF65-F5344CB8AC3E}">
-        <p14:creationId xmlns:p14="http://schemas.microsoft.com/office/powerpoint/2010/main" val="3411917283"/>
+        <p14:creationId xmlns:p14="http://schemas.microsoft.com/office/powerpoint/2010/main" val="2172983373"/>
       </p:ext>
     </p:extLst>
   </p:cSld>
@@ -11824,6 +11877,120 @@
           <p:cNvPr id="2" name="標題 1">
             <a:extLst>
               <a:ext uri="{FF2B5EF4-FFF2-40B4-BE49-F238E27FC236}">
+                <a16:creationId xmlns:a16="http://schemas.microsoft.com/office/drawing/2014/main" id="{77C37F21-5DBA-B401-7D71-7CFB5E6E6C5D}"/>
+              </a:ext>
+            </a:extLst>
+          </p:cNvPr>
+          <p:cNvSpPr>
+            <a:spLocks noGrp="1"/>
+          </p:cNvSpPr>
+          <p:nvPr>
+            <p:ph type="title"/>
+          </p:nvPr>
+        </p:nvSpPr>
+        <p:spPr/>
+        <p:txBody>
+          <a:bodyPr/>
+          <a:lstStyle/>
+          <a:p>
+            <a:pPr algn="ctr"/>
+            <a:r>
+              <a:rPr lang="zh-TW" altLang="en-US" dirty="0"/>
+              <a:t> </a:t>
+            </a:r>
+            <a:r>
+              <a:rPr lang="en-US" altLang="zh-TW" dirty="0" err="1"/>
+              <a:t>Matlab</a:t>
+            </a:r>
+            <a:r>
+              <a:rPr lang="en-US" altLang="zh-TW" dirty="0"/>
+              <a:t> </a:t>
+            </a:r>
+            <a:r>
+              <a:rPr lang="zh-TW" altLang="en-US" dirty="0"/>
+              <a:t>驗證</a:t>
+            </a:r>
+          </a:p>
+        </p:txBody>
+      </p:sp>
+      <p:sp>
+        <p:nvSpPr>
+          <p:cNvPr id="3" name="內容版面配置區 2">
+            <a:extLst>
+              <a:ext uri="{FF2B5EF4-FFF2-40B4-BE49-F238E27FC236}">
+                <a16:creationId xmlns:a16="http://schemas.microsoft.com/office/drawing/2014/main" id="{534E79D0-3692-7581-7815-5DEF93BC5DAC}"/>
+              </a:ext>
+            </a:extLst>
+          </p:cNvPr>
+          <p:cNvSpPr>
+            <a:spLocks noGrp="1"/>
+          </p:cNvSpPr>
+          <p:nvPr>
+            <p:ph idx="1"/>
+          </p:nvPr>
+        </p:nvSpPr>
+        <p:spPr/>
+        <p:txBody>
+          <a:bodyPr/>
+          <a:lstStyle/>
+          <a:p>
+            <a:pPr marL="0" indent="0">
+              <a:buNone/>
+            </a:pPr>
+            <a:r>
+              <a:rPr lang="en-US" altLang="zh-TW" dirty="0"/>
+              <a:t>Use </a:t>
+            </a:r>
+            <a:r>
+              <a:rPr lang="en-US" altLang="zh-TW" dirty="0" err="1"/>
+              <a:t>Matalb</a:t>
+            </a:r>
+            <a:r>
+              <a:rPr lang="en-US" altLang="zh-TW" dirty="0"/>
+              <a:t> APP</a:t>
+            </a:r>
+            <a:r>
+              <a:rPr lang="zh-TW" altLang="en-US" dirty="0"/>
+              <a:t> 寫的</a:t>
+            </a:r>
+          </a:p>
+        </p:txBody>
+      </p:sp>
+    </p:spTree>
+    <p:extLst>
+      <p:ext uri="{BB962C8B-B14F-4D97-AF65-F5344CB8AC3E}">
+        <p14:creationId xmlns:p14="http://schemas.microsoft.com/office/powerpoint/2010/main" val="3411917283"/>
+      </p:ext>
+    </p:extLst>
+  </p:cSld>
+  <p:clrMapOvr>
+    <a:masterClrMapping/>
+  </p:clrMapOvr>
+</p:sld>
+</file>
+
+<file path=ppt/slides/slide34.xml><?xml version="1.0" encoding="utf-8"?>
+<p:sld xmlns:a="http://schemas.openxmlformats.org/drawingml/2006/main" xmlns:r="http://schemas.openxmlformats.org/officeDocument/2006/relationships" xmlns:p="http://schemas.openxmlformats.org/presentationml/2006/main">
+  <p:cSld>
+    <p:spTree>
+      <p:nvGrpSpPr>
+        <p:cNvPr id="1" name=""/>
+        <p:cNvGrpSpPr/>
+        <p:nvPr/>
+      </p:nvGrpSpPr>
+      <p:grpSpPr>
+        <a:xfrm>
+          <a:off x="0" y="0"/>
+          <a:ext cx="0" cy="0"/>
+          <a:chOff x="0" y="0"/>
+          <a:chExt cx="0" cy="0"/>
+        </a:xfrm>
+      </p:grpSpPr>
+      <p:sp>
+        <p:nvSpPr>
+          <p:cNvPr id="2" name="標題 1">
+            <a:extLst>
+              <a:ext uri="{FF2B5EF4-FFF2-40B4-BE49-F238E27FC236}">
                 <a16:creationId xmlns:a16="http://schemas.microsoft.com/office/drawing/2014/main" id="{F0C4E827-8FA5-D200-CB63-931E7FB72A01}"/>
               </a:ext>
             </a:extLst>
@@ -11984,6 +12151,106 @@
     <p:extLst>
       <p:ext uri="{BB962C8B-B14F-4D97-AF65-F5344CB8AC3E}">
         <p14:creationId xmlns:p14="http://schemas.microsoft.com/office/powerpoint/2010/main" val="3116768302"/>
+      </p:ext>
+    </p:extLst>
+  </p:cSld>
+  <p:clrMapOvr>
+    <a:masterClrMapping/>
+  </p:clrMapOvr>
+</p:sld>
+</file>
+
+<file path=ppt/slides/slide35.xml><?xml version="1.0" encoding="utf-8"?>
+<p:sld xmlns:a="http://schemas.openxmlformats.org/drawingml/2006/main" xmlns:r="http://schemas.openxmlformats.org/officeDocument/2006/relationships" xmlns:p="http://schemas.openxmlformats.org/presentationml/2006/main">
+  <p:cSld>
+    <p:spTree>
+      <p:nvGrpSpPr>
+        <p:cNvPr id="1" name=""/>
+        <p:cNvGrpSpPr/>
+        <p:nvPr/>
+      </p:nvGrpSpPr>
+      <p:grpSpPr>
+        <a:xfrm>
+          <a:off x="0" y="0"/>
+          <a:ext cx="0" cy="0"/>
+          <a:chOff x="0" y="0"/>
+          <a:chExt cx="0" cy="0"/>
+        </a:xfrm>
+      </p:grpSpPr>
+      <p:sp>
+        <p:nvSpPr>
+          <p:cNvPr id="2" name="標題 1">
+            <a:extLst>
+              <a:ext uri="{FF2B5EF4-FFF2-40B4-BE49-F238E27FC236}">
+                <a16:creationId xmlns:a16="http://schemas.microsoft.com/office/drawing/2014/main" id="{0AD59BC0-0510-6326-DD50-2DF0BA6A3F5B}"/>
+              </a:ext>
+            </a:extLst>
+          </p:cNvPr>
+          <p:cNvSpPr>
+            <a:spLocks noGrp="1"/>
+          </p:cNvSpPr>
+          <p:nvPr>
+            <p:ph type="title"/>
+          </p:nvPr>
+        </p:nvSpPr>
+        <p:spPr/>
+        <p:txBody>
+          <a:bodyPr/>
+          <a:lstStyle/>
+          <a:p>
+            <a:r>
+              <a:rPr lang="zh-TW" altLang="en-US" dirty="0"/>
+              <a:t>嚴重問題</a:t>
+            </a:r>
+          </a:p>
+        </p:txBody>
+      </p:sp>
+      <p:sp>
+        <p:nvSpPr>
+          <p:cNvPr id="3" name="內容版面配置區 2">
+            <a:extLst>
+              <a:ext uri="{FF2B5EF4-FFF2-40B4-BE49-F238E27FC236}">
+                <a16:creationId xmlns:a16="http://schemas.microsoft.com/office/drawing/2014/main" id="{E2F59C58-A377-FCE2-6D10-158F112376F5}"/>
+              </a:ext>
+            </a:extLst>
+          </p:cNvPr>
+          <p:cNvSpPr>
+            <a:spLocks noGrp="1"/>
+          </p:cNvSpPr>
+          <p:nvPr>
+            <p:ph idx="1"/>
+          </p:nvPr>
+        </p:nvSpPr>
+        <p:spPr/>
+        <p:txBody>
+          <a:bodyPr/>
+          <a:lstStyle/>
+          <a:p>
+            <a:r>
+              <a:rPr lang="zh-TW" altLang="en-US" dirty="0"/>
+              <a:t>電路上</a:t>
+            </a:r>
+            <a:r>
+              <a:rPr lang="en-US" altLang="zh-TW" dirty="0"/>
+              <a:t>ISSUE</a:t>
+            </a:r>
+          </a:p>
+          <a:p>
+            <a:endParaRPr lang="en-US" altLang="zh-TW" dirty="0"/>
+          </a:p>
+          <a:p>
+            <a:r>
+              <a:rPr lang="en-US" altLang="zh-TW" dirty="0"/>
+              <a:t>RX0 CMU </a:t>
+            </a:r>
+            <a:endParaRPr lang="zh-TW" altLang="en-US" dirty="0"/>
+          </a:p>
+        </p:txBody>
+      </p:sp>
+    </p:spTree>
+    <p:extLst>
+      <p:ext uri="{BB962C8B-B14F-4D97-AF65-F5344CB8AC3E}">
+        <p14:creationId xmlns:p14="http://schemas.microsoft.com/office/powerpoint/2010/main" val="832131673"/>
       </p:ext>
     </p:extLst>
   </p:cSld>
@@ -12320,7 +12587,7 @@
             </a:r>
             <a:r>
               <a:rPr lang="en-US" altLang="zh-TW" dirty="0"/>
-              <a:t>filter + Schmitt </a:t>
+              <a:t>filter + Digital Schmitt </a:t>
             </a:r>
             <a:r>
               <a:rPr lang="en-US" altLang="zh-TW" dirty="0" err="1"/>
@@ -12485,15 +12752,7 @@
             </a:pPr>
             <a:r>
               <a:rPr lang="en-US" altLang="zh-TW" sz="2400" dirty="0"/>
-              <a:t>Analog Circuit (</a:t>
-            </a:r>
-            <a:r>
-              <a:rPr lang="zh-TW" altLang="en-US" sz="2400" dirty="0"/>
-              <a:t>* 可斟酌講解</a:t>
-            </a:r>
-            <a:r>
-              <a:rPr lang="en-US" altLang="zh-TW" sz="2400" dirty="0"/>
-              <a:t>)</a:t>
+              <a:t>Analog Circuit</a:t>
             </a:r>
           </a:p>
           <a:p>
@@ -13311,6 +13570,80 @@
           </a:p>
         </p:txBody>
       </p:sp>
+      <p:cxnSp>
+        <p:nvCxnSpPr>
+          <p:cNvPr id="8" name="直線接點 7">
+            <a:extLst>
+              <a:ext uri="{FF2B5EF4-FFF2-40B4-BE49-F238E27FC236}">
+                <a16:creationId xmlns:a16="http://schemas.microsoft.com/office/drawing/2014/main" id="{96E8562C-A905-C2CA-4D54-D9DFB3F48224}"/>
+              </a:ext>
+            </a:extLst>
+          </p:cNvPr>
+          <p:cNvCxnSpPr>
+            <a:stCxn id="20" idx="3"/>
+          </p:cNvCxnSpPr>
+          <p:nvPr/>
+        </p:nvCxnSpPr>
+        <p:spPr>
+          <a:xfrm>
+            <a:off x="7111729" y="3670713"/>
+            <a:ext cx="0" cy="863187"/>
+          </a:xfrm>
+          <a:prstGeom prst="line">
+            <a:avLst/>
+          </a:prstGeom>
+        </p:spPr>
+        <p:style>
+          <a:lnRef idx="1">
+            <a:schemeClr val="accent1"/>
+          </a:lnRef>
+          <a:fillRef idx="0">
+            <a:schemeClr val="accent1"/>
+          </a:fillRef>
+          <a:effectRef idx="0">
+            <a:schemeClr val="accent1"/>
+          </a:effectRef>
+          <a:fontRef idx="minor">
+            <a:schemeClr val="tx1"/>
+          </a:fontRef>
+        </p:style>
+      </p:cxnSp>
+      <p:sp>
+        <p:nvSpPr>
+          <p:cNvPr id="9" name="文字方塊 8">
+            <a:extLst>
+              <a:ext uri="{FF2B5EF4-FFF2-40B4-BE49-F238E27FC236}">
+                <a16:creationId xmlns:a16="http://schemas.microsoft.com/office/drawing/2014/main" id="{B02070EA-33A6-F0C4-E45B-49453C071FF5}"/>
+              </a:ext>
+            </a:extLst>
+          </p:cNvPr>
+          <p:cNvSpPr txBox="1"/>
+          <p:nvPr/>
+        </p:nvSpPr>
+        <p:spPr>
+          <a:xfrm>
+            <a:off x="6483080" y="4561388"/>
+            <a:ext cx="1432196" cy="369332"/>
+          </a:xfrm>
+          <a:prstGeom prst="rect">
+            <a:avLst/>
+          </a:prstGeom>
+          <a:noFill/>
+        </p:spPr>
+        <p:txBody>
+          <a:bodyPr wrap="square" rtlCol="0">
+            <a:spAutoFit/>
+          </a:bodyPr>
+          <a:lstStyle/>
+          <a:p>
+            <a:r>
+              <a:rPr lang="en-US" altLang="zh-TW" dirty="0"/>
+              <a:t>HW ADC Port</a:t>
+            </a:r>
+            <a:endParaRPr lang="zh-TW" altLang="en-US" dirty="0"/>
+          </a:p>
+        </p:txBody>
+      </p:sp>
     </p:spTree>
     <p:extLst>
       <p:ext uri="{BB962C8B-B14F-4D97-AF65-F5344CB8AC3E}">
@@ -13433,7 +13766,7 @@
             </a:r>
             <a:r>
               <a:rPr lang="en-US" altLang="zh-TW" sz="2400" dirty="0"/>
-              <a:t>Debug</a:t>
+              <a:t>ADC</a:t>
             </a:r>
             <a:r>
               <a:rPr lang="zh-TW" altLang="en-US" sz="2400" dirty="0"/>
@@ -13477,31 +13810,6 @@
               <a:rPr lang="zh-TW" altLang="en-US" sz="2000" dirty="0"/>
               <a:t>過程</a:t>
             </a:r>
-            <a:r>
-              <a:rPr lang="en-US" altLang="zh-TW" sz="2000" dirty="0"/>
-              <a:t>(</a:t>
-            </a:r>
-            <a:r>
-              <a:rPr lang="zh-TW" altLang="en-US" sz="2000" dirty="0"/>
-              <a:t>詳細說明、並搭配</a:t>
-            </a:r>
-            <a:r>
-              <a:rPr lang="en-US" altLang="zh-TW" sz="2000" dirty="0"/>
-              <a:t>Logic Analysis</a:t>
-            </a:r>
-            <a:r>
-              <a:rPr lang="zh-TW" altLang="en-US" sz="2000" dirty="0"/>
-              <a:t>講解</a:t>
-            </a:r>
-            <a:r>
-              <a:rPr lang="en-US" altLang="zh-TW" sz="2000" dirty="0"/>
-              <a:t>)</a:t>
-            </a:r>
-          </a:p>
-          <a:p>
-            <a:pPr marL="0" indent="0">
-              <a:buNone/>
-            </a:pPr>
             <a:endParaRPr lang="en-US" altLang="zh-TW" sz="2400" dirty="0"/>
           </a:p>
           <a:p>

</xml_diff>

<commit_message>
* Update Digital Process Chat
</commit_message>
<xml_diff>
--- a/Project_Summary_pdf/Project_Summary.pptx
+++ b/Project_Summary_pdf/Project_Summary.pptx
@@ -399,7 +399,7 @@
           <a:p>
             <a:fld id="{C65320F2-F42B-45F1-AA86-96F1A2E46749}" type="datetimeFigureOut">
               <a:rPr lang="zh-TW" altLang="en-US" smtClean="0"/>
-              <a:t>2023/1/30</a:t>
+              <a:t>2023/1/31</a:t>
             </a:fld>
             <a:endParaRPr lang="zh-TW" altLang="en-US"/>
           </a:p>
@@ -1304,7 +1304,7 @@
           <a:p>
             <a:r>
               <a:rPr lang="zh-TW" altLang="en-US" dirty="0"/>
-              <a:t>硬體模擬需要耗費大量時間，才能</a:t>
+              <a:t>硬體模擬需要耗費大量時間，只能</a:t>
             </a:r>
             <a:r>
               <a:rPr lang="en-US" altLang="zh-TW" dirty="0"/>
@@ -1312,7 +1312,7 @@
             </a:r>
             <a:r>
               <a:rPr lang="zh-TW" altLang="en-US" dirty="0"/>
-              <a:t>出一小段實際行為，</a:t>
+              <a:t>出一小段實際行為。而</a:t>
             </a:r>
             <a:r>
               <a:rPr lang="en-US" altLang="zh-TW" dirty="0"/>
@@ -1320,7 +1320,23 @@
             </a:r>
             <a:r>
               <a:rPr lang="zh-TW" altLang="en-US" dirty="0"/>
-              <a:t>關注的點較少。</a:t>
+              <a:t>關注的點偏向於是否能</a:t>
+            </a:r>
+            <a:r>
+              <a:rPr lang="en-US" altLang="zh-TW" dirty="0"/>
+              <a:t>Decode</a:t>
+            </a:r>
+            <a:r>
+              <a:rPr lang="zh-TW" altLang="en-US" dirty="0"/>
+              <a:t>，</a:t>
+            </a:r>
+            <a:r>
+              <a:rPr lang="en-US" altLang="zh-TW" dirty="0"/>
+              <a:t>Focus</a:t>
+            </a:r>
+            <a:r>
+              <a:rPr lang="zh-TW" altLang="en-US" dirty="0"/>
+              <a:t>的點相對於硬體少很多，所以無需花費大量時間</a:t>
             </a:r>
           </a:p>
         </p:txBody>
@@ -1405,6 +1421,145 @@
           <a:bodyPr/>
           <a:lstStyle/>
           <a:p>
+            <a:r>
+              <a:rPr lang="zh-TW" altLang="en-US" dirty="0"/>
+              <a:t>訊號處理 </a:t>
+            </a:r>
+            <a:r>
+              <a:rPr lang="en-US" altLang="zh-TW" dirty="0"/>
+              <a:t>Path :</a:t>
+            </a:r>
+          </a:p>
+          <a:p>
+            <a:pPr marL="228600" indent="-228600">
+              <a:buAutoNum type="arabicPeriod"/>
+            </a:pPr>
+            <a:r>
+              <a:rPr lang="zh-TW" altLang="en-US" dirty="0"/>
+              <a:t>黃色 </a:t>
+            </a:r>
+            <a:r>
+              <a:rPr lang="en-US" altLang="zh-TW" dirty="0"/>
+              <a:t>(</a:t>
+            </a:r>
+            <a:r>
+              <a:rPr lang="zh-TW" altLang="en-US" dirty="0"/>
+              <a:t> 經過內部 </a:t>
+            </a:r>
+            <a:r>
+              <a:rPr lang="en-US" altLang="zh-TW" dirty="0"/>
+              <a:t>1st HPF)</a:t>
+            </a:r>
+          </a:p>
+          <a:p>
+            <a:pPr marL="228600" indent="-228600">
+              <a:buAutoNum type="arabicPeriod"/>
+            </a:pPr>
+            <a:r>
+              <a:rPr lang="zh-TW" altLang="en-US" dirty="0"/>
+              <a:t>綠色 </a:t>
+            </a:r>
+            <a:r>
+              <a:rPr lang="en-US" altLang="zh-TW" dirty="0"/>
+              <a:t>(</a:t>
+            </a:r>
+            <a:r>
+              <a:rPr lang="zh-TW" altLang="en-US" dirty="0"/>
+              <a:t>不經過任何數位處理</a:t>
+            </a:r>
+            <a:r>
+              <a:rPr lang="en-US" altLang="zh-TW" dirty="0"/>
+              <a:t>)</a:t>
+            </a:r>
+          </a:p>
+          <a:p>
+            <a:pPr marL="228600" indent="-228600">
+              <a:buAutoNum type="arabicPeriod"/>
+            </a:pPr>
+            <a:endParaRPr lang="zh-TW" altLang="en-US" dirty="0"/>
+          </a:p>
+        </p:txBody>
+      </p:sp>
+      <p:sp>
+        <p:nvSpPr>
+          <p:cNvPr id="4" name="投影片編號版面配置區 3"/>
+          <p:cNvSpPr>
+            <a:spLocks noGrp="1"/>
+          </p:cNvSpPr>
+          <p:nvPr>
+            <p:ph type="sldNum" sz="quarter" idx="5"/>
+          </p:nvPr>
+        </p:nvSpPr>
+        <p:spPr/>
+        <p:txBody>
+          <a:bodyPr/>
+          <a:lstStyle/>
+          <a:p>
+            <a:fld id="{0116F853-F7F2-4239-A629-A213C1D67574}" type="slidenum">
+              <a:rPr lang="zh-TW" altLang="en-US" smtClean="0"/>
+              <a:t>30</a:t>
+            </a:fld>
+            <a:endParaRPr lang="zh-TW" altLang="en-US"/>
+          </a:p>
+        </p:txBody>
+      </p:sp>
+    </p:spTree>
+    <p:extLst>
+      <p:ext uri="{BB962C8B-B14F-4D97-AF65-F5344CB8AC3E}">
+        <p14:creationId xmlns:p14="http://schemas.microsoft.com/office/powerpoint/2010/main" val="685821978"/>
+      </p:ext>
+    </p:extLst>
+  </p:cSld>
+  <p:clrMapOvr>
+    <a:masterClrMapping/>
+  </p:clrMapOvr>
+</p:notes>
+</file>
+
+<file path=ppt/notesSlides/notesSlide16.xml><?xml version="1.0" encoding="utf-8"?>
+<p:notes xmlns:a="http://schemas.openxmlformats.org/drawingml/2006/main" xmlns:r="http://schemas.openxmlformats.org/officeDocument/2006/relationships" xmlns:p="http://schemas.openxmlformats.org/presentationml/2006/main">
+  <p:cSld>
+    <p:spTree>
+      <p:nvGrpSpPr>
+        <p:cNvPr id="1" name=""/>
+        <p:cNvGrpSpPr/>
+        <p:nvPr/>
+      </p:nvGrpSpPr>
+      <p:grpSpPr>
+        <a:xfrm>
+          <a:off x="0" y="0"/>
+          <a:ext cx="0" cy="0"/>
+          <a:chOff x="0" y="0"/>
+          <a:chExt cx="0" cy="0"/>
+        </a:xfrm>
+      </p:grpSpPr>
+      <p:sp>
+        <p:nvSpPr>
+          <p:cNvPr id="2" name="投影片影像版面配置區 1"/>
+          <p:cNvSpPr>
+            <a:spLocks noGrp="1" noRot="1" noChangeAspect="1"/>
+          </p:cNvSpPr>
+          <p:nvPr>
+            <p:ph type="sldImg"/>
+          </p:nvPr>
+        </p:nvSpPr>
+        <p:spPr/>
+      </p:sp>
+      <p:sp>
+        <p:nvSpPr>
+          <p:cNvPr id="3" name="備忘稿版面配置區 2"/>
+          <p:cNvSpPr>
+            <a:spLocks noGrp="1"/>
+          </p:cNvSpPr>
+          <p:nvPr>
+            <p:ph type="body" idx="1"/>
+          </p:nvPr>
+        </p:nvSpPr>
+        <p:spPr/>
+        <p:txBody>
+          <a:bodyPr/>
+          <a:lstStyle/>
+          <a:p>
             <a:endParaRPr lang="zh-TW" altLang="en-US"/>
           </a:p>
         </p:txBody>
@@ -1445,7 +1600,7 @@
 </p:notes>
 </file>
 
-<file path=ppt/notesSlides/notesSlide16.xml><?xml version="1.0" encoding="utf-8"?>
+<file path=ppt/notesSlides/notesSlide17.xml><?xml version="1.0" encoding="utf-8"?>
 <p:notes xmlns:a="http://schemas.openxmlformats.org/drawingml/2006/main" xmlns:r="http://schemas.openxmlformats.org/officeDocument/2006/relationships" xmlns:p="http://schemas.openxmlformats.org/presentationml/2006/main">
   <p:cSld>
     <p:spTree>
@@ -2944,7 +3099,7 @@
           <a:p>
             <a:fld id="{8A9F4CB5-1750-4E23-A13C-2C1F028F9724}" type="datetimeFigureOut">
               <a:rPr lang="zh-TW" altLang="en-US" smtClean="0"/>
-              <a:t>2023/1/30</a:t>
+              <a:t>2023/1/31</a:t>
             </a:fld>
             <a:endParaRPr lang="zh-TW" altLang="en-US"/>
           </a:p>
@@ -3142,7 +3297,7 @@
           <a:p>
             <a:fld id="{8A9F4CB5-1750-4E23-A13C-2C1F028F9724}" type="datetimeFigureOut">
               <a:rPr lang="zh-TW" altLang="en-US" smtClean="0"/>
-              <a:t>2023/1/30</a:t>
+              <a:t>2023/1/31</a:t>
             </a:fld>
             <a:endParaRPr lang="zh-TW" altLang="en-US"/>
           </a:p>
@@ -3350,7 +3505,7 @@
           <a:p>
             <a:fld id="{8A9F4CB5-1750-4E23-A13C-2C1F028F9724}" type="datetimeFigureOut">
               <a:rPr lang="zh-TW" altLang="en-US" smtClean="0"/>
-              <a:t>2023/1/30</a:t>
+              <a:t>2023/1/31</a:t>
             </a:fld>
             <a:endParaRPr lang="zh-TW" altLang="en-US"/>
           </a:p>
@@ -3548,7 +3703,7 @@
           <a:p>
             <a:fld id="{8A9F4CB5-1750-4E23-A13C-2C1F028F9724}" type="datetimeFigureOut">
               <a:rPr lang="zh-TW" altLang="en-US" smtClean="0"/>
-              <a:t>2023/1/30</a:t>
+              <a:t>2023/1/31</a:t>
             </a:fld>
             <a:endParaRPr lang="zh-TW" altLang="en-US"/>
           </a:p>
@@ -3823,7 +3978,7 @@
           <a:p>
             <a:fld id="{8A9F4CB5-1750-4E23-A13C-2C1F028F9724}" type="datetimeFigureOut">
               <a:rPr lang="zh-TW" altLang="en-US" smtClean="0"/>
-              <a:t>2023/1/30</a:t>
+              <a:t>2023/1/31</a:t>
             </a:fld>
             <a:endParaRPr lang="zh-TW" altLang="en-US"/>
           </a:p>
@@ -4088,7 +4243,7 @@
           <a:p>
             <a:fld id="{8A9F4CB5-1750-4E23-A13C-2C1F028F9724}" type="datetimeFigureOut">
               <a:rPr lang="zh-TW" altLang="en-US" smtClean="0"/>
-              <a:t>2023/1/30</a:t>
+              <a:t>2023/1/31</a:t>
             </a:fld>
             <a:endParaRPr lang="zh-TW" altLang="en-US"/>
           </a:p>
@@ -4500,7 +4655,7 @@
           <a:p>
             <a:fld id="{8A9F4CB5-1750-4E23-A13C-2C1F028F9724}" type="datetimeFigureOut">
               <a:rPr lang="zh-TW" altLang="en-US" smtClean="0"/>
-              <a:t>2023/1/30</a:t>
+              <a:t>2023/1/31</a:t>
             </a:fld>
             <a:endParaRPr lang="zh-TW" altLang="en-US"/>
           </a:p>
@@ -4641,7 +4796,7 @@
           <a:p>
             <a:fld id="{8A9F4CB5-1750-4E23-A13C-2C1F028F9724}" type="datetimeFigureOut">
               <a:rPr lang="zh-TW" altLang="en-US" smtClean="0"/>
-              <a:t>2023/1/30</a:t>
+              <a:t>2023/1/31</a:t>
             </a:fld>
             <a:endParaRPr lang="zh-TW" altLang="en-US"/>
           </a:p>
@@ -4754,7 +4909,7 @@
           <a:p>
             <a:fld id="{8A9F4CB5-1750-4E23-A13C-2C1F028F9724}" type="datetimeFigureOut">
               <a:rPr lang="zh-TW" altLang="en-US" smtClean="0"/>
-              <a:t>2023/1/30</a:t>
+              <a:t>2023/1/31</a:t>
             </a:fld>
             <a:endParaRPr lang="zh-TW" altLang="en-US"/>
           </a:p>
@@ -5065,7 +5220,7 @@
           <a:p>
             <a:fld id="{8A9F4CB5-1750-4E23-A13C-2C1F028F9724}" type="datetimeFigureOut">
               <a:rPr lang="zh-TW" altLang="en-US" smtClean="0"/>
-              <a:t>2023/1/30</a:t>
+              <a:t>2023/1/31</a:t>
             </a:fld>
             <a:endParaRPr lang="zh-TW" altLang="en-US"/>
           </a:p>
@@ -5353,7 +5508,7 @@
           <a:p>
             <a:fld id="{8A9F4CB5-1750-4E23-A13C-2C1F028F9724}" type="datetimeFigureOut">
               <a:rPr lang="zh-TW" altLang="en-US" smtClean="0"/>
-              <a:t>2023/1/30</a:t>
+              <a:t>2023/1/31</a:t>
             </a:fld>
             <a:endParaRPr lang="zh-TW" altLang="en-US"/>
           </a:p>
@@ -5594,7 +5749,7 @@
           <a:p>
             <a:fld id="{8A9F4CB5-1750-4E23-A13C-2C1F028F9724}" type="datetimeFigureOut">
               <a:rPr lang="zh-TW" altLang="en-US" smtClean="0"/>
-              <a:t>2023/1/30</a:t>
+              <a:t>2023/1/31</a:t>
             </a:fld>
             <a:endParaRPr lang="zh-TW" altLang="en-US"/>
           </a:p>
@@ -13120,8 +13275,8 @@
         </p:nvSpPr>
         <p:spPr>
           <a:xfrm>
-            <a:off x="8652387" y="938955"/>
-            <a:ext cx="3480619" cy="1200329"/>
+            <a:off x="2694037" y="5464342"/>
+            <a:ext cx="6096002" cy="923330"/>
           </a:xfrm>
           <a:prstGeom prst="rect">
             <a:avLst/>
@@ -13155,14 +13310,7 @@
             </a:r>
             <a:r>
               <a:rPr lang="zh-TW" altLang="en-US" dirty="0"/>
-              <a:t>第一排點是上述方法</a:t>
-            </a:r>
-            <a:endParaRPr lang="en-US" altLang="zh-TW" dirty="0"/>
-          </a:p>
-          <a:p>
-            <a:r>
-              <a:rPr lang="zh-TW" altLang="en-US" dirty="0"/>
-              <a:t>取得得</a:t>
+              <a:t>第一排點是以上述方法取得的</a:t>
             </a:r>
             <a:r>
               <a:rPr lang="en-US" altLang="zh-TW" dirty="0"/>
@@ -13177,19 +13325,23 @@
           <a:p>
             <a:r>
               <a:rPr lang="en-US" altLang="zh-TW" dirty="0"/>
-              <a:t>2.</a:t>
-            </a:r>
-            <a:r>
-              <a:rPr lang="zh-TW" altLang="en-US" dirty="0"/>
-              <a:t>將</a:t>
-            </a:r>
-            <a:r>
-              <a:rPr lang="en-US" altLang="zh-TW" dirty="0"/>
-              <a:t>Time </a:t>
-            </a:r>
-            <a:r>
-              <a:rPr lang="zh-TW" altLang="en-US" dirty="0"/>
-              <a:t>劃分以</a:t>
+              <a:t>2. </a:t>
+            </a:r>
+            <a:r>
+              <a:rPr lang="zh-TW" altLang="en-US" dirty="0"/>
+              <a:t>將這段時間進行</a:t>
+            </a:r>
+            <a:r>
+              <a:rPr lang="en-US" altLang="zh-TW" dirty="0"/>
+              <a:t>Sample </a:t>
+            </a:r>
+            <a:r>
+              <a:rPr lang="en-US" altLang="zh-TW" dirty="0" err="1"/>
+              <a:t>Sample</a:t>
+            </a:r>
+            <a:r>
+              <a:rPr lang="zh-TW" altLang="en-US" dirty="0"/>
+              <a:t>時間為</a:t>
             </a:r>
             <a:r>
               <a:rPr lang="en-US" altLang="zh-TW" dirty="0"/>
@@ -14191,7 +14343,7 @@
         </p:nvSpPr>
         <p:spPr>
           <a:xfrm>
-            <a:off x="7549536" y="4045977"/>
+            <a:off x="7519071" y="4041058"/>
             <a:ext cx="137652" cy="216306"/>
           </a:xfrm>
           <a:prstGeom prst="ellipse">
@@ -14421,6 +14573,82 @@
           <a:p>
             <a:pPr algn="ctr"/>
             <a:endParaRPr lang="zh-TW" altLang="en-US"/>
+          </a:p>
+        </p:txBody>
+      </p:sp>
+      <p:sp>
+        <p:nvSpPr>
+          <p:cNvPr id="3" name="文字方塊 2">
+            <a:extLst>
+              <a:ext uri="{FF2B5EF4-FFF2-40B4-BE49-F238E27FC236}">
+                <a16:creationId xmlns:a16="http://schemas.microsoft.com/office/drawing/2014/main" id="{543522E7-BFAB-2670-841C-533602F4BBC4}"/>
+              </a:ext>
+            </a:extLst>
+          </p:cNvPr>
+          <p:cNvSpPr txBox="1"/>
+          <p:nvPr/>
+        </p:nvSpPr>
+        <p:spPr>
+          <a:xfrm>
+            <a:off x="29494" y="2952051"/>
+            <a:ext cx="2054942" cy="369332"/>
+          </a:xfrm>
+          <a:prstGeom prst="rect">
+            <a:avLst/>
+          </a:prstGeom>
+          <a:noFill/>
+        </p:spPr>
+        <p:txBody>
+          <a:bodyPr wrap="square" rtlCol="0">
+            <a:spAutoFit/>
+          </a:bodyPr>
+          <a:lstStyle/>
+          <a:p>
+            <a:r>
+              <a:rPr lang="en-US" altLang="zh-TW" dirty="0" err="1"/>
+              <a:t>GroupLeader</a:t>
+            </a:r>
+            <a:r>
+              <a:rPr lang="en-US" altLang="zh-TW" dirty="0"/>
+              <a:t> Array</a:t>
+            </a:r>
+            <a:endParaRPr lang="zh-TW" altLang="en-US" dirty="0"/>
+          </a:p>
+        </p:txBody>
+      </p:sp>
+      <p:sp>
+        <p:nvSpPr>
+          <p:cNvPr id="4" name="文字方塊 3">
+            <a:extLst>
+              <a:ext uri="{FF2B5EF4-FFF2-40B4-BE49-F238E27FC236}">
+                <a16:creationId xmlns:a16="http://schemas.microsoft.com/office/drawing/2014/main" id="{F53DE8BA-96B0-8732-F6C8-87856C34C799}"/>
+              </a:ext>
+            </a:extLst>
+          </p:cNvPr>
+          <p:cNvSpPr txBox="1"/>
+          <p:nvPr/>
+        </p:nvSpPr>
+        <p:spPr>
+          <a:xfrm>
+            <a:off x="21638" y="3713814"/>
+            <a:ext cx="2054942" cy="369332"/>
+          </a:xfrm>
+          <a:prstGeom prst="rect">
+            <a:avLst/>
+          </a:prstGeom>
+          <a:noFill/>
+        </p:spPr>
+        <p:txBody>
+          <a:bodyPr wrap="square" rtlCol="0">
+            <a:spAutoFit/>
+          </a:bodyPr>
+          <a:lstStyle/>
+          <a:p>
+            <a:r>
+              <a:rPr lang="en-US" altLang="zh-TW" dirty="0"/>
+              <a:t>Sample Data</a:t>
+            </a:r>
+            <a:endParaRPr lang="zh-TW" altLang="en-US" dirty="0"/>
           </a:p>
         </p:txBody>
       </p:sp>
@@ -14643,7 +14871,7 @@
             </a:r>
             <a:r>
               <a:rPr lang="zh-TW" altLang="en-US" dirty="0"/>
-              <a:t>能夠模擬後續硬體處理訊號以及解析訊號的過程</a:t>
+              <a:t>能夠模擬後續硬體如何處理訊號以及解析訊號的過程</a:t>
             </a:r>
           </a:p>
         </p:txBody>
@@ -15034,8 +15262,8 @@
         </p:nvSpPr>
         <p:spPr>
           <a:xfrm>
-            <a:off x="0" y="3004456"/>
-            <a:ext cx="1539551" cy="1110343"/>
+            <a:off x="173856" y="3012626"/>
+            <a:ext cx="1343210" cy="992992"/>
           </a:xfrm>
           <a:prstGeom prst="roundRect">
             <a:avLst/>
@@ -15079,18 +15307,23 @@
               </a:ext>
             </a:extLst>
           </p:cNvPr>
-          <p:cNvCxnSpPr/>
+          <p:cNvCxnSpPr>
+            <a:cxnSpLocks/>
+          </p:cNvCxnSpPr>
           <p:nvPr/>
         </p:nvCxnSpPr>
         <p:spPr>
           <a:xfrm>
-            <a:off x="1604863" y="3581137"/>
-            <a:ext cx="1026367" cy="0"/>
+            <a:off x="1604863" y="3560828"/>
+            <a:ext cx="856398" cy="0"/>
           </a:xfrm>
           <a:prstGeom prst="straightConnector1">
             <a:avLst/>
           </a:prstGeom>
           <a:ln w="38100">
+            <a:solidFill>
+              <a:srgbClr val="FFC000"/>
+            </a:solidFill>
             <a:tailEnd type="triangle"/>
           </a:ln>
         </p:spPr>
@@ -15123,8 +15356,8 @@
         </p:nvSpPr>
         <p:spPr>
           <a:xfrm>
-            <a:off x="2696546" y="3004456"/>
-            <a:ext cx="1539551" cy="1110343"/>
+            <a:off x="2590397" y="3004456"/>
+            <a:ext cx="1386957" cy="972970"/>
           </a:xfrm>
           <a:prstGeom prst="roundRect">
             <a:avLst/>
@@ -15159,100 +15392,22 @@
           </a:p>
         </p:txBody>
       </p:sp>
-      <p:cxnSp>
-        <p:nvCxnSpPr>
-          <p:cNvPr id="8" name="直線單箭頭接點 7">
-            <a:extLst>
-              <a:ext uri="{FF2B5EF4-FFF2-40B4-BE49-F238E27FC236}">
-                <a16:creationId xmlns:a16="http://schemas.microsoft.com/office/drawing/2014/main" id="{9E24CAF3-5FBC-535A-E34B-D0842385A106}"/>
-              </a:ext>
-            </a:extLst>
-          </p:cNvPr>
-          <p:cNvCxnSpPr/>
+      <p:sp>
+        <p:nvSpPr>
+          <p:cNvPr id="11" name="矩形: 圓角 10">
+            <a:extLst>
+              <a:ext uri="{FF2B5EF4-FFF2-40B4-BE49-F238E27FC236}">
+                <a16:creationId xmlns:a16="http://schemas.microsoft.com/office/drawing/2014/main" id="{A5C0EEA4-E1C0-E31E-366C-6E645F764228}"/>
+              </a:ext>
+            </a:extLst>
+          </p:cNvPr>
+          <p:cNvSpPr/>
           <p:nvPr/>
-        </p:nvCxnSpPr>
+        </p:nvSpPr>
         <p:spPr>
           <a:xfrm>
-            <a:off x="4435151" y="3559627"/>
-            <a:ext cx="1026367" cy="0"/>
-          </a:xfrm>
-          <a:prstGeom prst="straightConnector1">
-            <a:avLst/>
-          </a:prstGeom>
-          <a:ln>
-            <a:tailEnd type="triangle"/>
-          </a:ln>
-        </p:spPr>
-        <p:style>
-          <a:lnRef idx="1">
-            <a:schemeClr val="accent1"/>
-          </a:lnRef>
-          <a:fillRef idx="0">
-            <a:schemeClr val="accent1"/>
-          </a:fillRef>
-          <a:effectRef idx="0">
-            <a:schemeClr val="accent1"/>
-          </a:effectRef>
-          <a:fontRef idx="minor">
-            <a:schemeClr val="tx1"/>
-          </a:fontRef>
-        </p:style>
-      </p:cxnSp>
-      <p:cxnSp>
-        <p:nvCxnSpPr>
-          <p:cNvPr id="10" name="直線單箭頭接點 9">
-            <a:extLst>
-              <a:ext uri="{FF2B5EF4-FFF2-40B4-BE49-F238E27FC236}">
-                <a16:creationId xmlns:a16="http://schemas.microsoft.com/office/drawing/2014/main" id="{8AE448BE-A556-EFFA-1B28-239F3FE038C8}"/>
-              </a:ext>
-            </a:extLst>
-          </p:cNvPr>
-          <p:cNvCxnSpPr/>
-          <p:nvPr/>
-        </p:nvCxnSpPr>
-        <p:spPr>
-          <a:xfrm>
-            <a:off x="7498702" y="3559627"/>
-            <a:ext cx="1026367" cy="0"/>
-          </a:xfrm>
-          <a:prstGeom prst="straightConnector1">
-            <a:avLst/>
-          </a:prstGeom>
-          <a:ln>
-            <a:tailEnd type="triangle"/>
-          </a:ln>
-        </p:spPr>
-        <p:style>
-          <a:lnRef idx="1">
-            <a:schemeClr val="accent1"/>
-          </a:lnRef>
-          <a:fillRef idx="0">
-            <a:schemeClr val="accent1"/>
-          </a:fillRef>
-          <a:effectRef idx="0">
-            <a:schemeClr val="accent1"/>
-          </a:effectRef>
-          <a:fontRef idx="minor">
-            <a:schemeClr val="tx1"/>
-          </a:fontRef>
-        </p:style>
-      </p:cxnSp>
-      <p:sp>
-        <p:nvSpPr>
-          <p:cNvPr id="11" name="矩形: 圓角 10">
-            <a:extLst>
-              <a:ext uri="{FF2B5EF4-FFF2-40B4-BE49-F238E27FC236}">
-                <a16:creationId xmlns:a16="http://schemas.microsoft.com/office/drawing/2014/main" id="{A5C0EEA4-E1C0-E31E-366C-6E645F764228}"/>
-              </a:ext>
-            </a:extLst>
-          </p:cNvPr>
-          <p:cNvSpPr/>
-          <p:nvPr/>
-        </p:nvSpPr>
-        <p:spPr>
-          <a:xfrm>
-            <a:off x="8678626" y="3004456"/>
-            <a:ext cx="1539551" cy="1110343"/>
+            <a:off x="7539830" y="2968000"/>
+            <a:ext cx="1317872" cy="972970"/>
           </a:xfrm>
           <a:prstGeom prst="roundRect">
             <a:avLst/>
@@ -15287,102 +15442,22 @@
           </a:p>
         </p:txBody>
       </p:sp>
-      <p:cxnSp>
-        <p:nvCxnSpPr>
-          <p:cNvPr id="13" name="直線單箭頭接點 12">
-            <a:extLst>
-              <a:ext uri="{FF2B5EF4-FFF2-40B4-BE49-F238E27FC236}">
-                <a16:creationId xmlns:a16="http://schemas.microsoft.com/office/drawing/2014/main" id="{8B03FA11-22BE-B9FA-3C38-231FBF56C957}"/>
-              </a:ext>
-            </a:extLst>
-          </p:cNvPr>
-          <p:cNvCxnSpPr/>
+      <p:sp>
+        <p:nvSpPr>
+          <p:cNvPr id="16" name="矩形: 圓角 15">
+            <a:extLst>
+              <a:ext uri="{FF2B5EF4-FFF2-40B4-BE49-F238E27FC236}">
+                <a16:creationId xmlns:a16="http://schemas.microsoft.com/office/drawing/2014/main" id="{19638754-D7C5-A2C1-3BB0-44E6FD66DC72}"/>
+              </a:ext>
+            </a:extLst>
+          </p:cNvPr>
+          <p:cNvSpPr/>
           <p:nvPr/>
-        </p:nvCxnSpPr>
-        <p:spPr>
-          <a:xfrm flipV="1">
-            <a:off x="10478277" y="2799183"/>
-            <a:ext cx="830425" cy="625151"/>
-          </a:xfrm>
-          <a:prstGeom prst="straightConnector1">
-            <a:avLst/>
-          </a:prstGeom>
-          <a:ln>
-            <a:tailEnd type="triangle"/>
-          </a:ln>
-        </p:spPr>
-        <p:style>
-          <a:lnRef idx="1">
-            <a:schemeClr val="accent1"/>
-          </a:lnRef>
-          <a:fillRef idx="0">
-            <a:schemeClr val="accent1"/>
-          </a:fillRef>
-          <a:effectRef idx="0">
-            <a:schemeClr val="accent1"/>
-          </a:effectRef>
-          <a:fontRef idx="minor">
-            <a:schemeClr val="tx1"/>
-          </a:fontRef>
-        </p:style>
-      </p:cxnSp>
-      <p:cxnSp>
-        <p:nvCxnSpPr>
-          <p:cNvPr id="14" name="直線單箭頭接點 13">
-            <a:extLst>
-              <a:ext uri="{FF2B5EF4-FFF2-40B4-BE49-F238E27FC236}">
-                <a16:creationId xmlns:a16="http://schemas.microsoft.com/office/drawing/2014/main" id="{261C1A85-3528-29A9-3569-39D79B465521}"/>
-              </a:ext>
-            </a:extLst>
-          </p:cNvPr>
-          <p:cNvCxnSpPr>
-            <a:cxnSpLocks/>
-          </p:cNvCxnSpPr>
-          <p:nvPr/>
-        </p:nvCxnSpPr>
+        </p:nvSpPr>
         <p:spPr>
           <a:xfrm>
-            <a:off x="10478277" y="3649532"/>
-            <a:ext cx="678025" cy="920620"/>
-          </a:xfrm>
-          <a:prstGeom prst="straightConnector1">
-            <a:avLst/>
-          </a:prstGeom>
-          <a:ln>
-            <a:tailEnd type="triangle"/>
-          </a:ln>
-        </p:spPr>
-        <p:style>
-          <a:lnRef idx="1">
-            <a:schemeClr val="accent1"/>
-          </a:lnRef>
-          <a:fillRef idx="0">
-            <a:schemeClr val="accent1"/>
-          </a:fillRef>
-          <a:effectRef idx="0">
-            <a:schemeClr val="accent1"/>
-          </a:effectRef>
-          <a:fontRef idx="minor">
-            <a:schemeClr val="tx1"/>
-          </a:fontRef>
-        </p:style>
-      </p:cxnSp>
-      <p:sp>
-        <p:nvSpPr>
-          <p:cNvPr id="16" name="矩形: 圓角 15">
-            <a:extLst>
-              <a:ext uri="{FF2B5EF4-FFF2-40B4-BE49-F238E27FC236}">
-                <a16:creationId xmlns:a16="http://schemas.microsoft.com/office/drawing/2014/main" id="{19638754-D7C5-A2C1-3BB0-44E6FD66DC72}"/>
-              </a:ext>
-            </a:extLst>
-          </p:cNvPr>
-          <p:cNvSpPr/>
-          <p:nvPr/>
-        </p:nvSpPr>
-        <p:spPr>
-          <a:xfrm>
-            <a:off x="11635272" y="2001415"/>
-            <a:ext cx="1539551" cy="1110343"/>
+            <a:off x="10313251" y="1947367"/>
+            <a:ext cx="1213384" cy="944437"/>
           </a:xfrm>
           <a:prstGeom prst="roundRect">
             <a:avLst/>
@@ -15431,8 +15506,8 @@
         </p:nvSpPr>
         <p:spPr>
           <a:xfrm>
-            <a:off x="11635271" y="4014980"/>
-            <a:ext cx="1539551" cy="1110343"/>
+            <a:off x="10332935" y="3767913"/>
+            <a:ext cx="1224164" cy="944437"/>
           </a:xfrm>
           <a:prstGeom prst="roundRect">
             <a:avLst/>
@@ -15713,7 +15788,7 @@
         </p:nvCxnSpPr>
         <p:spPr>
           <a:xfrm>
-            <a:off x="6458551" y="3997448"/>
+            <a:off x="5807709" y="3977426"/>
             <a:ext cx="0" cy="514953"/>
           </a:xfrm>
           <a:prstGeom prst="line">
@@ -15753,13 +15828,15 @@
               </a:ext>
             </a:extLst>
           </p:cNvPr>
-          <p:cNvCxnSpPr/>
+          <p:cNvCxnSpPr>
+            <a:cxnSpLocks/>
+          </p:cNvCxnSpPr>
           <p:nvPr/>
         </p:nvCxnSpPr>
         <p:spPr>
           <a:xfrm flipH="1">
             <a:off x="4049029" y="4512401"/>
-            <a:ext cx="2428773" cy="0"/>
+            <a:ext cx="1758680" cy="0"/>
           </a:xfrm>
           <a:prstGeom prst="line">
             <a:avLst/>
@@ -15882,8 +15959,8 @@
         </p:nvSpPr>
         <p:spPr>
           <a:xfrm>
-            <a:off x="-504825" y="1690687"/>
-            <a:ext cx="13791617" cy="3512045"/>
+            <a:off x="131028" y="1690688"/>
+            <a:ext cx="11736507" cy="3215609"/>
           </a:xfrm>
           <a:prstGeom prst="rect">
             <a:avLst/>
@@ -15932,7 +16009,7 @@
         </p:nvSpPr>
         <p:spPr>
           <a:xfrm>
-            <a:off x="-1100725" y="5660299"/>
+            <a:off x="1326991" y="5553781"/>
             <a:ext cx="994090" cy="369332"/>
           </a:xfrm>
           <a:prstGeom prst="rect">
@@ -15968,7 +16045,7 @@
         </p:nvSpPr>
         <p:spPr>
           <a:xfrm>
-            <a:off x="-504824" y="5387606"/>
+            <a:off x="405881" y="5253020"/>
             <a:ext cx="10514062" cy="1519124"/>
           </a:xfrm>
           <a:prstGeom prst="rect">
@@ -16021,8 +16098,8 @@
         </p:nvSpPr>
         <p:spPr>
           <a:xfrm>
-            <a:off x="-1244273" y="3111758"/>
-            <a:ext cx="994090" cy="646331"/>
+            <a:off x="1097159" y="2421826"/>
+            <a:ext cx="2504513" cy="369332"/>
           </a:xfrm>
           <a:prstGeom prst="rect">
             <a:avLst/>
@@ -16065,8 +16142,8 @@
         </p:nvSpPr>
         <p:spPr>
           <a:xfrm>
-            <a:off x="5730553" y="3004456"/>
-            <a:ext cx="1539551" cy="1110343"/>
+            <a:off x="5131594" y="2974757"/>
+            <a:ext cx="1317872" cy="972970"/>
           </a:xfrm>
           <a:prstGeom prst="roundRect">
             <a:avLst/>
@@ -16117,7 +16194,7 @@
         </p:nvCxnSpPr>
         <p:spPr>
           <a:xfrm>
-            <a:off x="6665465" y="2330361"/>
+            <a:off x="5865786" y="2410083"/>
             <a:ext cx="527278" cy="0"/>
           </a:xfrm>
           <a:prstGeom prst="line">
@@ -16155,7 +16232,7 @@
         </p:nvCxnSpPr>
         <p:spPr>
           <a:xfrm flipV="1">
-            <a:off x="6458551" y="2322663"/>
+            <a:off x="5658872" y="2402385"/>
             <a:ext cx="217275" cy="467845"/>
           </a:xfrm>
           <a:prstGeom prst="line">
@@ -16193,7 +16270,7 @@
         </p:nvCxnSpPr>
         <p:spPr>
           <a:xfrm>
-            <a:off x="5931273" y="2799183"/>
+            <a:off x="5131594" y="2878905"/>
             <a:ext cx="527278" cy="0"/>
           </a:xfrm>
           <a:prstGeom prst="line">
@@ -16217,10 +16294,10 @@
       </p:cxnSp>
       <p:cxnSp>
         <p:nvCxnSpPr>
-          <p:cNvPr id="20" name="直線接點 19">
-            <a:extLst>
-              <a:ext uri="{FF2B5EF4-FFF2-40B4-BE49-F238E27FC236}">
-                <a16:creationId xmlns:a16="http://schemas.microsoft.com/office/drawing/2014/main" id="{A4918CC8-D84E-12E4-49F8-50E1CAD1CCAB}"/>
+          <p:cNvPr id="18" name="直線接點 17">
+            <a:extLst>
+              <a:ext uri="{FF2B5EF4-FFF2-40B4-BE49-F238E27FC236}">
+                <a16:creationId xmlns:a16="http://schemas.microsoft.com/office/drawing/2014/main" id="{6B0632FB-B39E-5A8A-11E0-E97409E4296B}"/>
               </a:ext>
             </a:extLst>
           </p:cNvPr>
@@ -16231,13 +16308,17 @@
         </p:nvCxnSpPr>
         <p:spPr>
           <a:xfrm>
-            <a:off x="2118047" y="2522058"/>
-            <a:ext cx="1" cy="944436"/>
+            <a:off x="744793" y="2035124"/>
+            <a:ext cx="0" cy="915965"/>
           </a:xfrm>
           <a:prstGeom prst="line">
             <a:avLst/>
           </a:prstGeom>
-          <a:ln w="38100"/>
+          <a:ln w="38100">
+            <a:solidFill>
+              <a:schemeClr val="accent6"/>
+            </a:solidFill>
+          </a:ln>
         </p:spPr>
         <p:style>
           <a:lnRef idx="1">
@@ -16256,25 +16337,251 @@
       </p:cxnSp>
       <p:cxnSp>
         <p:nvCxnSpPr>
-          <p:cNvPr id="34" name="直線接點 33">
-            <a:extLst>
-              <a:ext uri="{FF2B5EF4-FFF2-40B4-BE49-F238E27FC236}">
-                <a16:creationId xmlns:a16="http://schemas.microsoft.com/office/drawing/2014/main" id="{8A47B95D-F8BC-9D2A-5288-4FF9C2AAD610}"/>
-              </a:ext>
-            </a:extLst>
-          </p:cNvPr>
-          <p:cNvCxnSpPr/>
+          <p:cNvPr id="42" name="直線接點 41">
+            <a:extLst>
+              <a:ext uri="{FF2B5EF4-FFF2-40B4-BE49-F238E27FC236}">
+                <a16:creationId xmlns:a16="http://schemas.microsoft.com/office/drawing/2014/main" id="{7D4BDE05-632A-D6B4-8C12-9D7E9A281573}"/>
+              </a:ext>
+            </a:extLst>
+          </p:cNvPr>
+          <p:cNvCxnSpPr>
+            <a:cxnSpLocks/>
+          </p:cNvCxnSpPr>
           <p:nvPr/>
         </p:nvCxnSpPr>
         <p:spPr>
           <a:xfrm>
-            <a:off x="769775" y="2060020"/>
-            <a:ext cx="8386726" cy="0"/>
+            <a:off x="744793" y="2035124"/>
+            <a:ext cx="7241268" cy="22459"/>
           </a:xfrm>
           <a:prstGeom prst="line">
             <a:avLst/>
           </a:prstGeom>
-          <a:ln w="38100"/>
+          <a:ln w="38100">
+            <a:solidFill>
+              <a:schemeClr val="accent6"/>
+            </a:solidFill>
+          </a:ln>
+        </p:spPr>
+        <p:style>
+          <a:lnRef idx="1">
+            <a:schemeClr val="accent1"/>
+          </a:lnRef>
+          <a:fillRef idx="0">
+            <a:schemeClr val="accent1"/>
+          </a:fillRef>
+          <a:effectRef idx="0">
+            <a:schemeClr val="accent1"/>
+          </a:effectRef>
+          <a:fontRef idx="minor">
+            <a:schemeClr val="tx1"/>
+          </a:fontRef>
+        </p:style>
+      </p:cxnSp>
+      <p:cxnSp>
+        <p:nvCxnSpPr>
+          <p:cNvPr id="45" name="直線單箭頭接點 44">
+            <a:extLst>
+              <a:ext uri="{FF2B5EF4-FFF2-40B4-BE49-F238E27FC236}">
+                <a16:creationId xmlns:a16="http://schemas.microsoft.com/office/drawing/2014/main" id="{58FFFEEE-CC6D-0EA8-4CD9-248232C432F8}"/>
+              </a:ext>
+            </a:extLst>
+          </p:cNvPr>
+          <p:cNvCxnSpPr>
+            <a:cxnSpLocks/>
+          </p:cNvCxnSpPr>
+          <p:nvPr/>
+        </p:nvCxnSpPr>
+        <p:spPr>
+          <a:xfrm>
+            <a:off x="7986061" y="2030321"/>
+            <a:ext cx="0" cy="944436"/>
+          </a:xfrm>
+          <a:prstGeom prst="straightConnector1">
+            <a:avLst/>
+          </a:prstGeom>
+          <a:ln w="38100">
+            <a:solidFill>
+              <a:schemeClr val="accent6"/>
+            </a:solidFill>
+            <a:tailEnd type="triangle"/>
+          </a:ln>
+        </p:spPr>
+        <p:style>
+          <a:lnRef idx="1">
+            <a:schemeClr val="accent1"/>
+          </a:lnRef>
+          <a:fillRef idx="0">
+            <a:schemeClr val="accent1"/>
+          </a:fillRef>
+          <a:effectRef idx="0">
+            <a:schemeClr val="accent1"/>
+          </a:effectRef>
+          <a:fontRef idx="minor">
+            <a:schemeClr val="tx1"/>
+          </a:fontRef>
+        </p:style>
+      </p:cxnSp>
+      <p:cxnSp>
+        <p:nvCxnSpPr>
+          <p:cNvPr id="52" name="直線單箭頭接點 51">
+            <a:extLst>
+              <a:ext uri="{FF2B5EF4-FFF2-40B4-BE49-F238E27FC236}">
+                <a16:creationId xmlns:a16="http://schemas.microsoft.com/office/drawing/2014/main" id="{BB7A4A04-7CBC-D3E7-F813-AEAE795C2592}"/>
+              </a:ext>
+            </a:extLst>
+          </p:cNvPr>
+          <p:cNvCxnSpPr>
+            <a:cxnSpLocks/>
+          </p:cNvCxnSpPr>
+          <p:nvPr/>
+        </p:nvCxnSpPr>
+        <p:spPr>
+          <a:xfrm flipV="1">
+            <a:off x="9047219" y="2477397"/>
+            <a:ext cx="999434" cy="745393"/>
+          </a:xfrm>
+          <a:prstGeom prst="straightConnector1">
+            <a:avLst/>
+          </a:prstGeom>
+          <a:ln w="38100">
+            <a:solidFill>
+              <a:srgbClr val="FF0000"/>
+            </a:solidFill>
+            <a:tailEnd type="triangle"/>
+          </a:ln>
+        </p:spPr>
+        <p:style>
+          <a:lnRef idx="1">
+            <a:schemeClr val="accent1"/>
+          </a:lnRef>
+          <a:fillRef idx="0">
+            <a:schemeClr val="accent1"/>
+          </a:fillRef>
+          <a:effectRef idx="0">
+            <a:schemeClr val="accent1"/>
+          </a:effectRef>
+          <a:fontRef idx="minor">
+            <a:schemeClr val="tx1"/>
+          </a:fontRef>
+        </p:style>
+      </p:cxnSp>
+      <p:cxnSp>
+        <p:nvCxnSpPr>
+          <p:cNvPr id="54" name="直線單箭頭接點 53">
+            <a:extLst>
+              <a:ext uri="{FF2B5EF4-FFF2-40B4-BE49-F238E27FC236}">
+                <a16:creationId xmlns:a16="http://schemas.microsoft.com/office/drawing/2014/main" id="{EDDA30F7-222A-477D-C8D4-72AE390C95C0}"/>
+              </a:ext>
+            </a:extLst>
+          </p:cNvPr>
+          <p:cNvCxnSpPr>
+            <a:cxnSpLocks/>
+          </p:cNvCxnSpPr>
+          <p:nvPr/>
+        </p:nvCxnSpPr>
+        <p:spPr>
+          <a:xfrm>
+            <a:off x="9084987" y="3509122"/>
+            <a:ext cx="863079" cy="725780"/>
+          </a:xfrm>
+          <a:prstGeom prst="straightConnector1">
+            <a:avLst/>
+          </a:prstGeom>
+          <a:ln w="38100">
+            <a:solidFill>
+              <a:srgbClr val="FF0000"/>
+            </a:solidFill>
+            <a:tailEnd type="triangle"/>
+          </a:ln>
+        </p:spPr>
+        <p:style>
+          <a:lnRef idx="1">
+            <a:schemeClr val="accent1"/>
+          </a:lnRef>
+          <a:fillRef idx="0">
+            <a:schemeClr val="accent1"/>
+          </a:fillRef>
+          <a:effectRef idx="0">
+            <a:schemeClr val="accent1"/>
+          </a:effectRef>
+          <a:fontRef idx="minor">
+            <a:schemeClr val="tx1"/>
+          </a:fontRef>
+        </p:style>
+      </p:cxnSp>
+      <p:cxnSp>
+        <p:nvCxnSpPr>
+          <p:cNvPr id="60" name="直線單箭頭接點 59">
+            <a:extLst>
+              <a:ext uri="{FF2B5EF4-FFF2-40B4-BE49-F238E27FC236}">
+                <a16:creationId xmlns:a16="http://schemas.microsoft.com/office/drawing/2014/main" id="{12773E32-BED7-ABC4-F2EF-87F82B3977BB}"/>
+              </a:ext>
+            </a:extLst>
+          </p:cNvPr>
+          <p:cNvCxnSpPr>
+            <a:cxnSpLocks/>
+          </p:cNvCxnSpPr>
+          <p:nvPr/>
+        </p:nvCxnSpPr>
+        <p:spPr>
+          <a:xfrm>
+            <a:off x="4180849" y="3538968"/>
+            <a:ext cx="856398" cy="0"/>
+          </a:xfrm>
+          <a:prstGeom prst="straightConnector1">
+            <a:avLst/>
+          </a:prstGeom>
+          <a:ln w="38100">
+            <a:solidFill>
+              <a:srgbClr val="FFC000"/>
+            </a:solidFill>
+            <a:tailEnd type="triangle"/>
+          </a:ln>
+        </p:spPr>
+        <p:style>
+          <a:lnRef idx="1">
+            <a:schemeClr val="accent1"/>
+          </a:lnRef>
+          <a:fillRef idx="0">
+            <a:schemeClr val="accent1"/>
+          </a:fillRef>
+          <a:effectRef idx="0">
+            <a:schemeClr val="accent1"/>
+          </a:effectRef>
+          <a:fontRef idx="minor">
+            <a:schemeClr val="tx1"/>
+          </a:fontRef>
+        </p:style>
+      </p:cxnSp>
+      <p:cxnSp>
+        <p:nvCxnSpPr>
+          <p:cNvPr id="62" name="直線單箭頭接點 61">
+            <a:extLst>
+              <a:ext uri="{FF2B5EF4-FFF2-40B4-BE49-F238E27FC236}">
+                <a16:creationId xmlns:a16="http://schemas.microsoft.com/office/drawing/2014/main" id="{5A47DA8C-790B-BC26-7C11-D1546416F13B}"/>
+              </a:ext>
+            </a:extLst>
+          </p:cNvPr>
+          <p:cNvCxnSpPr>
+            <a:cxnSpLocks/>
+          </p:cNvCxnSpPr>
+          <p:nvPr/>
+        </p:nvCxnSpPr>
+        <p:spPr>
+          <a:xfrm>
+            <a:off x="6579069" y="3461242"/>
+            <a:ext cx="856398" cy="0"/>
+          </a:xfrm>
+          <a:prstGeom prst="straightConnector1">
+            <a:avLst/>
+          </a:prstGeom>
+          <a:ln w="38100">
+            <a:solidFill>
+              <a:srgbClr val="FFC000"/>
+            </a:solidFill>
+            <a:tailEnd type="triangle"/>
+          </a:ln>
         </p:spPr>
         <p:style>
           <a:lnRef idx="1">

</xml_diff>

<commit_message>
* Updaye digital Circutit chat
</commit_message>
<xml_diff>
--- a/Project_Summary_pdf/Project_Summary.pptx
+++ b/Project_Summary_pdf/Project_Summary.pptx
@@ -5,7 +5,7 @@
     <p:sldMasterId id="2147483648" r:id="rId1"/>
   </p:sldMasterIdLst>
   <p:notesMasterIdLst>
-    <p:notesMasterId r:id="rId46"/>
+    <p:notesMasterId r:id="rId48"/>
   </p:notesMasterIdLst>
   <p:sldIdLst>
     <p:sldId id="256" r:id="rId2"/>
@@ -38,20 +38,22 @@
     <p:sldId id="285" r:id="rId29"/>
     <p:sldId id="286" r:id="rId30"/>
     <p:sldId id="881" r:id="rId31"/>
-    <p:sldId id="889" r:id="rId32"/>
-    <p:sldId id="890" r:id="rId33"/>
-    <p:sldId id="751" r:id="rId34"/>
-    <p:sldId id="882" r:id="rId35"/>
-    <p:sldId id="281" r:id="rId36"/>
-    <p:sldId id="257" r:id="rId37"/>
-    <p:sldId id="258" r:id="rId38"/>
-    <p:sldId id="260" r:id="rId39"/>
-    <p:sldId id="263" r:id="rId40"/>
-    <p:sldId id="264" r:id="rId41"/>
-    <p:sldId id="259" r:id="rId42"/>
-    <p:sldId id="265" r:id="rId43"/>
-    <p:sldId id="282" r:id="rId44"/>
-    <p:sldId id="885" r:id="rId45"/>
+    <p:sldId id="896" r:id="rId32"/>
+    <p:sldId id="895" r:id="rId33"/>
+    <p:sldId id="889" r:id="rId34"/>
+    <p:sldId id="890" r:id="rId35"/>
+    <p:sldId id="751" r:id="rId36"/>
+    <p:sldId id="882" r:id="rId37"/>
+    <p:sldId id="281" r:id="rId38"/>
+    <p:sldId id="257" r:id="rId39"/>
+    <p:sldId id="258" r:id="rId40"/>
+    <p:sldId id="260" r:id="rId41"/>
+    <p:sldId id="263" r:id="rId42"/>
+    <p:sldId id="264" r:id="rId43"/>
+    <p:sldId id="259" r:id="rId44"/>
+    <p:sldId id="265" r:id="rId45"/>
+    <p:sldId id="282" r:id="rId46"/>
+    <p:sldId id="885" r:id="rId47"/>
   </p:sldIdLst>
   <p:sldSz cx="12192000" cy="6858000"/>
   <p:notesSz cx="6858000" cy="9144000"/>
@@ -201,6 +203,8 @@
             <p14:sldId id="285"/>
             <p14:sldId id="286"/>
             <p14:sldId id="881"/>
+            <p14:sldId id="896"/>
+            <p14:sldId id="895"/>
             <p14:sldId id="889"/>
             <p14:sldId id="890"/>
             <p14:sldId id="751"/>
@@ -1421,58 +1425,6 @@
           <a:bodyPr/>
           <a:lstStyle/>
           <a:p>
-            <a:r>
-              <a:rPr lang="zh-TW" altLang="en-US" dirty="0"/>
-              <a:t>訊號處理 </a:t>
-            </a:r>
-            <a:r>
-              <a:rPr lang="en-US" altLang="zh-TW" dirty="0"/>
-              <a:t>Path :</a:t>
-            </a:r>
-          </a:p>
-          <a:p>
-            <a:pPr marL="228600" indent="-228600">
-              <a:buAutoNum type="arabicPeriod"/>
-            </a:pPr>
-            <a:r>
-              <a:rPr lang="zh-TW" altLang="en-US" dirty="0"/>
-              <a:t>黃色 </a:t>
-            </a:r>
-            <a:r>
-              <a:rPr lang="en-US" altLang="zh-TW" dirty="0"/>
-              <a:t>(</a:t>
-            </a:r>
-            <a:r>
-              <a:rPr lang="zh-TW" altLang="en-US" dirty="0"/>
-              <a:t> 經過內部 </a:t>
-            </a:r>
-            <a:r>
-              <a:rPr lang="en-US" altLang="zh-TW" dirty="0"/>
-              <a:t>1st HPF)</a:t>
-            </a:r>
-          </a:p>
-          <a:p>
-            <a:pPr marL="228600" indent="-228600">
-              <a:buAutoNum type="arabicPeriod"/>
-            </a:pPr>
-            <a:r>
-              <a:rPr lang="zh-TW" altLang="en-US" dirty="0"/>
-              <a:t>綠色 </a:t>
-            </a:r>
-            <a:r>
-              <a:rPr lang="en-US" altLang="zh-TW" dirty="0"/>
-              <a:t>(</a:t>
-            </a:r>
-            <a:r>
-              <a:rPr lang="zh-TW" altLang="en-US" dirty="0"/>
-              <a:t>不經過任何數位處理</a:t>
-            </a:r>
-            <a:r>
-              <a:rPr lang="en-US" altLang="zh-TW" dirty="0"/>
-              <a:t>)</a:t>
-            </a:r>
-          </a:p>
-          <a:p>
             <a:pPr marL="228600" indent="-228600">
               <a:buAutoNum type="arabicPeriod"/>
             </a:pPr>
@@ -1581,7 +1533,7 @@
           <a:p>
             <a:fld id="{0116F853-F7F2-4239-A629-A213C1D67574}" type="slidenum">
               <a:rPr lang="zh-TW" altLang="en-US" smtClean="0"/>
-              <a:t>36</a:t>
+              <a:t>38</a:t>
             </a:fld>
             <a:endParaRPr lang="zh-TW" altLang="en-US"/>
           </a:p>
@@ -1729,7 +1681,7 @@
           <a:p>
             <a:fld id="{0116F853-F7F2-4239-A629-A213C1D67574}" type="slidenum">
               <a:rPr lang="zh-TW" altLang="en-US" smtClean="0"/>
-              <a:t>37</a:t>
+              <a:t>39</a:t>
             </a:fld>
             <a:endParaRPr lang="zh-TW" altLang="en-US"/>
           </a:p>
@@ -15021,8 +14973,13 @@
             </a:r>
             <a:r>
               <a:rPr lang="en-US" altLang="zh-TW" dirty="0"/>
-              <a:t>Decode</a:t>
-            </a:r>
+              <a:t>Decoder</a:t>
+            </a:r>
+            <a:r>
+              <a:rPr lang="zh-TW" altLang="en-US" dirty="0"/>
+              <a:t>電路</a:t>
+            </a:r>
+            <a:endParaRPr lang="en-US" altLang="zh-TW" dirty="0"/>
           </a:p>
           <a:p>
             <a:pPr marL="514350" indent="-514350">
@@ -15406,7 +15363,7 @@
         </p:nvSpPr>
         <p:spPr>
           <a:xfrm>
-            <a:off x="7539830" y="2968000"/>
+            <a:off x="7510623" y="3032648"/>
             <a:ext cx="1317872" cy="972970"/>
           </a:xfrm>
           <a:prstGeom prst="roundRect">
@@ -15564,7 +15521,13 @@
           <a:prstGeom prst="line">
             <a:avLst/>
           </a:prstGeom>
-          <a:ln w="38100"/>
+          <a:ln w="38100">
+            <a:solidFill>
+              <a:schemeClr val="accent6">
+                <a:lumMod val="50000"/>
+              </a:schemeClr>
+            </a:solidFill>
+          </a:ln>
         </p:spPr>
         <p:style>
           <a:lnRef idx="1">
@@ -15604,6 +15567,11 @@
             <a:avLst/>
           </a:prstGeom>
           <a:ln w="38100">
+            <a:solidFill>
+              <a:schemeClr val="accent6">
+                <a:lumMod val="50000"/>
+              </a:schemeClr>
+            </a:solidFill>
             <a:tailEnd type="triangle"/>
           </a:ln>
         </p:spPr>
@@ -15959,8 +15927,8 @@
         </p:nvSpPr>
         <p:spPr>
           <a:xfrm>
-            <a:off x="131028" y="1690688"/>
-            <a:ext cx="11736507" cy="3215609"/>
+            <a:off x="101531" y="1668905"/>
+            <a:ext cx="8875321" cy="3214784"/>
           </a:xfrm>
           <a:prstGeom prst="rect">
             <a:avLst/>
@@ -16046,7 +16014,7 @@
         <p:spPr>
           <a:xfrm>
             <a:off x="405881" y="5253020"/>
-            <a:ext cx="10514062" cy="1519124"/>
+            <a:ext cx="9101913" cy="1519124"/>
           </a:xfrm>
           <a:prstGeom prst="rect">
             <a:avLst/>
@@ -16098,7 +16066,7 @@
         </p:nvSpPr>
         <p:spPr>
           <a:xfrm>
-            <a:off x="1097159" y="2421826"/>
+            <a:off x="1104053" y="2362445"/>
             <a:ext cx="2504513" cy="369332"/>
           </a:xfrm>
           <a:prstGeom prst="rect">
@@ -16113,18 +16081,9 @@
           <a:lstStyle/>
           <a:p>
             <a:r>
-              <a:rPr lang="en-US" altLang="zh-TW" dirty="0"/>
-              <a:t>RX</a:t>
-            </a:r>
-            <a:r>
-              <a:rPr lang="zh-TW" altLang="en-US" dirty="0"/>
-              <a:t> </a:t>
-            </a:r>
-            <a:r>
-              <a:rPr lang="en-US" altLang="zh-TW" dirty="0"/>
-              <a:t>Decode</a:t>
-            </a:r>
-            <a:endParaRPr lang="zh-TW" altLang="en-US" dirty="0"/>
+              <a:rPr lang="zh-TW" altLang="en-US" dirty="0"/>
+              <a:t>前端訊號處理</a:t>
+            </a:r>
           </a:p>
         </p:txBody>
       </p:sp>
@@ -16394,7 +16353,7 @@
         </p:nvCxnSpPr>
         <p:spPr>
           <a:xfrm>
-            <a:off x="7986061" y="2030321"/>
+            <a:off x="7986061" y="2060020"/>
             <a:ext cx="0" cy="944436"/>
           </a:xfrm>
           <a:prstGeom prst="straightConnector1">
@@ -16483,7 +16442,7 @@
         <p:spPr>
           <a:xfrm>
             <a:off x="9084987" y="3509122"/>
-            <a:ext cx="863079" cy="725780"/>
+            <a:ext cx="953022" cy="725780"/>
           </a:xfrm>
           <a:prstGeom prst="straightConnector1">
             <a:avLst/>
@@ -16598,6 +16557,234 @@
           </a:fontRef>
         </p:style>
       </p:cxnSp>
+      <p:sp>
+        <p:nvSpPr>
+          <p:cNvPr id="3" name="文字方塊 2">
+            <a:extLst>
+              <a:ext uri="{FF2B5EF4-FFF2-40B4-BE49-F238E27FC236}">
+                <a16:creationId xmlns:a16="http://schemas.microsoft.com/office/drawing/2014/main" id="{1AD53C5D-1B54-8EEF-A818-1812E1064315}"/>
+              </a:ext>
+            </a:extLst>
+          </p:cNvPr>
+          <p:cNvSpPr txBox="1"/>
+          <p:nvPr/>
+        </p:nvSpPr>
+        <p:spPr>
+          <a:xfrm>
+            <a:off x="9557367" y="5120295"/>
+            <a:ext cx="2662162" cy="1754326"/>
+          </a:xfrm>
+          <a:prstGeom prst="rect">
+            <a:avLst/>
+          </a:prstGeom>
+          <a:noFill/>
+        </p:spPr>
+        <p:txBody>
+          <a:bodyPr wrap="square" rtlCol="0">
+            <a:spAutoFit/>
+          </a:bodyPr>
+          <a:lstStyle/>
+          <a:p>
+            <a:r>
+              <a:rPr lang="zh-TW" altLang="en-US" sz="1200" dirty="0"/>
+              <a:t>註解 </a:t>
+            </a:r>
+            <a:r>
+              <a:rPr lang="en-US" altLang="zh-TW" sz="1200" dirty="0"/>
+              <a:t>:</a:t>
+            </a:r>
+          </a:p>
+          <a:p>
+            <a:r>
+              <a:rPr lang="zh-TW" altLang="en-US" sz="1200" dirty="0"/>
+              <a:t>訊號處理 </a:t>
+            </a:r>
+            <a:r>
+              <a:rPr lang="en-US" altLang="zh-TW" sz="1200" dirty="0"/>
+              <a:t>Path :</a:t>
+            </a:r>
+          </a:p>
+          <a:p>
+            <a:pPr marL="228600" indent="-228600">
+              <a:buAutoNum type="arabicPeriod"/>
+            </a:pPr>
+            <a:r>
+              <a:rPr lang="zh-TW" altLang="en-US" sz="1200" dirty="0"/>
+              <a:t>黃色 </a:t>
+            </a:r>
+            <a:r>
+              <a:rPr lang="en-US" altLang="zh-TW" sz="1200" dirty="0"/>
+              <a:t>(</a:t>
+            </a:r>
+            <a:r>
+              <a:rPr lang="zh-TW" altLang="en-US" sz="1200" dirty="0"/>
+              <a:t> 經過內部 </a:t>
+            </a:r>
+            <a:r>
+              <a:rPr lang="en-US" altLang="zh-TW" sz="1200" dirty="0"/>
+              <a:t>1st HPF)</a:t>
+            </a:r>
+          </a:p>
+          <a:p>
+            <a:pPr marL="228600" indent="-228600">
+              <a:buAutoNum type="arabicPeriod"/>
+            </a:pPr>
+            <a:r>
+              <a:rPr lang="zh-TW" altLang="en-US" sz="1200" dirty="0"/>
+              <a:t>綠色 </a:t>
+            </a:r>
+            <a:r>
+              <a:rPr lang="en-US" altLang="zh-TW" sz="1200" dirty="0"/>
+              <a:t>(</a:t>
+            </a:r>
+            <a:r>
+              <a:rPr lang="zh-TW" altLang="en-US" sz="1200" dirty="0"/>
+              <a:t>不經過任何數位處理</a:t>
+            </a:r>
+            <a:r>
+              <a:rPr lang="en-US" altLang="zh-TW" sz="1200" dirty="0"/>
+              <a:t>)</a:t>
+            </a:r>
+          </a:p>
+          <a:p>
+            <a:pPr marL="228600" indent="-228600">
+              <a:buAutoNum type="arabicPeriod"/>
+            </a:pPr>
+            <a:r>
+              <a:rPr lang="zh-TW" altLang="en-US" sz="1200" dirty="0"/>
+              <a:t>紅色 </a:t>
+            </a:r>
+            <a:r>
+              <a:rPr lang="en-US" altLang="zh-TW" sz="1200" dirty="0"/>
+              <a:t>(</a:t>
+            </a:r>
+            <a:r>
+              <a:rPr lang="zh-TW" altLang="en-US" sz="1200" dirty="0"/>
+              <a:t>代表訊號餵給</a:t>
+            </a:r>
+            <a:r>
+              <a:rPr lang="en-US" altLang="zh-TW" sz="1200" dirty="0"/>
+              <a:t>Decoder</a:t>
+            </a:r>
+            <a:r>
+              <a:rPr lang="zh-TW" altLang="en-US" sz="1200" dirty="0"/>
+              <a:t>電路</a:t>
+            </a:r>
+            <a:r>
+              <a:rPr lang="en-US" altLang="zh-TW" sz="1200" dirty="0"/>
+              <a:t>)</a:t>
+            </a:r>
+          </a:p>
+          <a:p>
+            <a:pPr marL="228600" indent="-228600">
+              <a:buAutoNum type="arabicPeriod"/>
+            </a:pPr>
+            <a:r>
+              <a:rPr lang="zh-TW" altLang="en-US" sz="1200" dirty="0"/>
+              <a:t>深綠色</a:t>
+            </a:r>
+            <a:r>
+              <a:rPr lang="en-US" altLang="zh-TW" sz="1200" dirty="0"/>
+              <a:t>(AGC path)</a:t>
+            </a:r>
+          </a:p>
+          <a:p>
+            <a:r>
+              <a:rPr lang="zh-TW" altLang="en-US" dirty="0"/>
+              <a:t> </a:t>
+            </a:r>
+            <a:endParaRPr lang="en-US" altLang="zh-TW" dirty="0"/>
+          </a:p>
+          <a:p>
+            <a:endParaRPr lang="zh-TW" altLang="en-US" dirty="0"/>
+          </a:p>
+        </p:txBody>
+      </p:sp>
+      <p:sp>
+        <p:nvSpPr>
+          <p:cNvPr id="5" name="矩形 4">
+            <a:extLst>
+              <a:ext uri="{FF2B5EF4-FFF2-40B4-BE49-F238E27FC236}">
+                <a16:creationId xmlns:a16="http://schemas.microsoft.com/office/drawing/2014/main" id="{1BEC4FCA-30A1-9801-58B3-8874B3C56DF2}"/>
+              </a:ext>
+            </a:extLst>
+          </p:cNvPr>
+          <p:cNvSpPr/>
+          <p:nvPr/>
+        </p:nvSpPr>
+        <p:spPr>
+          <a:xfrm>
+            <a:off x="10074131" y="1398368"/>
+            <a:ext cx="1962099" cy="3637622"/>
+          </a:xfrm>
+          <a:prstGeom prst="rect">
+            <a:avLst/>
+          </a:prstGeom>
+          <a:noFill/>
+          <a:ln>
+            <a:prstDash val="dash"/>
+          </a:ln>
+        </p:spPr>
+        <p:style>
+          <a:lnRef idx="2">
+            <a:schemeClr val="accent1">
+              <a:shade val="50000"/>
+            </a:schemeClr>
+          </a:lnRef>
+          <a:fillRef idx="1">
+            <a:schemeClr val="accent1"/>
+          </a:fillRef>
+          <a:effectRef idx="0">
+            <a:schemeClr val="accent1"/>
+          </a:effectRef>
+          <a:fontRef idx="minor">
+            <a:schemeClr val="lt1"/>
+          </a:fontRef>
+        </p:style>
+        <p:txBody>
+          <a:bodyPr rtlCol="0" anchor="ctr"/>
+          <a:lstStyle/>
+          <a:p>
+            <a:pPr algn="ctr"/>
+            <a:endParaRPr lang="zh-TW" altLang="en-US"/>
+          </a:p>
+        </p:txBody>
+      </p:sp>
+      <p:sp>
+        <p:nvSpPr>
+          <p:cNvPr id="8" name="文字方塊 7">
+            <a:extLst>
+              <a:ext uri="{FF2B5EF4-FFF2-40B4-BE49-F238E27FC236}">
+                <a16:creationId xmlns:a16="http://schemas.microsoft.com/office/drawing/2014/main" id="{5BB72F2D-7AFF-2323-D1D7-B52906DEE5AD}"/>
+              </a:ext>
+            </a:extLst>
+          </p:cNvPr>
+          <p:cNvSpPr txBox="1"/>
+          <p:nvPr/>
+        </p:nvSpPr>
+        <p:spPr>
+          <a:xfrm>
+            <a:off x="10227608" y="1506578"/>
+            <a:ext cx="2504513" cy="369332"/>
+          </a:xfrm>
+          <a:prstGeom prst="rect">
+            <a:avLst/>
+          </a:prstGeom>
+          <a:noFill/>
+        </p:spPr>
+        <p:txBody>
+          <a:bodyPr wrap="square" rtlCol="0">
+            <a:spAutoFit/>
+          </a:bodyPr>
+          <a:lstStyle/>
+          <a:p>
+            <a:r>
+              <a:rPr lang="zh-TW" altLang="en-US" dirty="0"/>
+              <a:t>後端訊號分析</a:t>
+            </a:r>
+          </a:p>
+        </p:txBody>
+      </p:sp>
     </p:spTree>
     <p:extLst>
       <p:ext uri="{BB962C8B-B14F-4D97-AF65-F5344CB8AC3E}">
@@ -16633,7 +16820,7 @@
           <p:cNvPr id="2" name="標題 1">
             <a:extLst>
               <a:ext uri="{FF2B5EF4-FFF2-40B4-BE49-F238E27FC236}">
-                <a16:creationId xmlns:a16="http://schemas.microsoft.com/office/drawing/2014/main" id="{50BB383F-54B9-1566-5039-3C13647347F8}"/>
+                <a16:creationId xmlns:a16="http://schemas.microsoft.com/office/drawing/2014/main" id="{71F49C4E-50D6-68D6-91C2-BFF48ADEF505}"/>
               </a:ext>
             </a:extLst>
           </p:cNvPr>
@@ -16651,10 +16838,9 @@
           <a:p>
             <a:pPr algn="ctr"/>
             <a:r>
-              <a:rPr lang="en-US" altLang="zh-TW" dirty="0" err="1"/>
-              <a:t>AutoCorrelation</a:t>
-            </a:r>
-            <a:endParaRPr lang="zh-TW" altLang="en-US" dirty="0"/>
+              <a:rPr lang="zh-TW" altLang="en-US" dirty="0"/>
+              <a:t>前端訊號處理</a:t>
+            </a:r>
           </a:p>
         </p:txBody>
       </p:sp>
@@ -16663,7 +16849,7 @@
           <p:cNvPr id="3" name="內容版面配置區 2">
             <a:extLst>
               <a:ext uri="{FF2B5EF4-FFF2-40B4-BE49-F238E27FC236}">
-                <a16:creationId xmlns:a16="http://schemas.microsoft.com/office/drawing/2014/main" id="{2596C747-6CF3-CCCC-4223-2CFCEABA8BA0}"/>
+                <a16:creationId xmlns:a16="http://schemas.microsoft.com/office/drawing/2014/main" id="{2F3C6F51-5701-1BCA-2F51-50A4A4166EC9}"/>
               </a:ext>
             </a:extLst>
           </p:cNvPr>
@@ -16679,66 +16865,188 @@
           <a:bodyPr/>
           <a:lstStyle/>
           <a:p>
+            <a:pPr marL="0" indent="0">
+              <a:buNone/>
+            </a:pPr>
+            <a:r>
+              <a:rPr lang="en-US" altLang="zh-TW" dirty="0"/>
+              <a:t>Benefits and Drawbacks of method</a:t>
+            </a:r>
+          </a:p>
+          <a:p>
+            <a:pPr marL="0" indent="0">
+              <a:buNone/>
+            </a:pPr>
+            <a:endParaRPr lang="en-US" altLang="zh-TW" dirty="0"/>
+          </a:p>
+          <a:p>
             <a:pPr marL="514350" indent="-514350">
               <a:buAutoNum type="arabicPeriod"/>
             </a:pPr>
             <a:r>
               <a:rPr lang="zh-TW" altLang="en-US" dirty="0"/>
-              <a:t>能推倒出</a:t>
-            </a:r>
-            <a:r>
-              <a:rPr lang="en-US" altLang="zh-TW" dirty="0" err="1"/>
-              <a:t>Convolation</a:t>
-            </a:r>
-            <a:r>
-              <a:rPr lang="en-US" altLang="zh-TW" dirty="0"/>
-              <a:t> Property for LTI system</a:t>
-            </a:r>
+              <a:t>不經過任何訊號處理</a:t>
+            </a:r>
+            <a:endParaRPr lang="en-US" altLang="zh-TW" dirty="0"/>
+          </a:p>
+          <a:p>
+            <a:pPr marL="0" indent="0">
+              <a:buNone/>
+            </a:pPr>
+            <a:r>
+              <a:rPr lang="en-US" altLang="zh-TW" dirty="0"/>
+              <a:t>	</a:t>
+            </a:r>
+            <a:r>
+              <a:rPr lang="zh-TW" altLang="en-US" sz="2400" dirty="0"/>
+              <a:t>優點 </a:t>
+            </a:r>
+            <a:r>
+              <a:rPr lang="en-US" altLang="zh-TW" sz="2400" dirty="0"/>
+              <a:t>: </a:t>
+            </a:r>
+            <a:r>
+              <a:rPr lang="zh-TW" altLang="en-US" sz="2400" dirty="0"/>
+              <a:t>省電、參數調整較簡單</a:t>
+            </a:r>
+            <a:endParaRPr lang="en-US" altLang="zh-TW" sz="2400" dirty="0"/>
+          </a:p>
+          <a:p>
+            <a:pPr marL="0" indent="0">
+              <a:buNone/>
+            </a:pPr>
+            <a:r>
+              <a:rPr lang="en-US" altLang="zh-TW" sz="2400" dirty="0"/>
+              <a:t>	</a:t>
+            </a:r>
+            <a:r>
+              <a:rPr lang="zh-TW" altLang="en-US" sz="2400" dirty="0"/>
+              <a:t>缺點 </a:t>
+            </a:r>
+            <a:r>
+              <a:rPr lang="en-US" altLang="zh-TW" sz="2400" dirty="0"/>
+              <a:t>:</a:t>
+            </a:r>
+            <a:r>
+              <a:rPr lang="zh-TW" altLang="en-US" sz="2400" dirty="0"/>
+              <a:t> 無法抗</a:t>
+            </a:r>
+            <a:r>
+              <a:rPr lang="en-US" altLang="zh-TW" sz="2400" dirty="0"/>
+              <a:t>Noise </a:t>
+            </a:r>
+            <a:r>
+              <a:rPr lang="zh-TW" altLang="en-US" sz="2400" dirty="0"/>
+              <a:t>而且 </a:t>
+            </a:r>
+            <a:r>
+              <a:rPr lang="en-US" altLang="zh-TW" sz="2400" dirty="0"/>
+              <a:t>ADC</a:t>
+            </a:r>
+            <a:r>
+              <a:rPr lang="zh-TW" altLang="en-US" sz="2400" dirty="0"/>
+              <a:t> 刻度較少</a:t>
+            </a:r>
+            <a:endParaRPr lang="en-US" altLang="zh-TW" sz="2400" dirty="0"/>
+          </a:p>
+          <a:p>
+            <a:pPr marL="0" indent="0">
+              <a:buNone/>
+            </a:pPr>
+            <a:endParaRPr lang="en-US" altLang="zh-TW" sz="2400" dirty="0"/>
           </a:p>
           <a:p>
             <a:pPr marL="514350" indent="-514350">
-              <a:buAutoNum type="arabicPeriod"/>
+              <a:buAutoNum type="arabicPeriod" startAt="2"/>
             </a:pPr>
+            <a:r>
+              <a:rPr lang="zh-TW" altLang="en-US" dirty="0"/>
+              <a:t>經過</a:t>
+            </a:r>
+            <a:r>
+              <a:rPr lang="en-US" altLang="zh-TW" dirty="0"/>
+              <a:t>1st HPF and Schmitt Trigger</a:t>
+            </a:r>
+            <a:r>
+              <a:rPr lang="zh-TW" altLang="en-US" dirty="0"/>
+              <a:t>電路</a:t>
+            </a:r>
             <a:endParaRPr lang="en-US" altLang="zh-TW" dirty="0"/>
           </a:p>
           <a:p>
-            <a:pPr marL="514350" indent="-514350">
-              <a:buAutoNum type="arabicPeriod"/>
+            <a:pPr marL="0" indent="0">
+              <a:buNone/>
             </a:pPr>
             <a:r>
-              <a:rPr lang="en-US" altLang="zh-TW" dirty="0" err="1"/>
-              <a:t>AutoCorreltion</a:t>
-            </a:r>
-            <a:r>
-              <a:rPr lang="zh-TW" altLang="en-US" dirty="0"/>
-              <a:t> 用處到底是</a:t>
-            </a:r>
-            <a:r>
-              <a:rPr lang="en-US" altLang="zh-TW" dirty="0"/>
-              <a:t>?</a:t>
-            </a:r>
-          </a:p>
-          <a:p>
-            <a:pPr marL="514350" indent="-514350">
-              <a:buAutoNum type="arabicPeriod"/>
+              <a:rPr lang="en-US" altLang="zh-TW" sz="2400" dirty="0"/>
+              <a:t>	</a:t>
+            </a:r>
+            <a:r>
+              <a:rPr lang="zh-TW" altLang="en-US" sz="2400" dirty="0"/>
+              <a:t>優點 </a:t>
+            </a:r>
+            <a:r>
+              <a:rPr lang="en-US" altLang="zh-TW" sz="2400" dirty="0"/>
+              <a:t>:</a:t>
+            </a:r>
+            <a:r>
+              <a:rPr lang="zh-TW" altLang="en-US" sz="2400" dirty="0"/>
+              <a:t>抗低頻</a:t>
+            </a:r>
+            <a:r>
+              <a:rPr lang="en-US" altLang="zh-TW" sz="2400" dirty="0"/>
+              <a:t>Noise</a:t>
+            </a:r>
+            <a:r>
+              <a:rPr lang="zh-TW" altLang="en-US" sz="2400" dirty="0"/>
+              <a:t>、</a:t>
+            </a:r>
+            <a:r>
+              <a:rPr lang="en-US" altLang="zh-TW" sz="2400" dirty="0"/>
+              <a:t>ADC</a:t>
+            </a:r>
+            <a:r>
+              <a:rPr lang="zh-TW" altLang="en-US" sz="2400" dirty="0"/>
+              <a:t>刻度較多</a:t>
+            </a:r>
+            <a:endParaRPr lang="en-US" altLang="zh-TW" sz="2400" dirty="0"/>
+          </a:p>
+          <a:p>
+            <a:pPr marL="0" indent="0">
+              <a:buNone/>
             </a:pPr>
-            <a:endParaRPr lang="en-US" altLang="zh-TW" dirty="0"/>
-          </a:p>
-          <a:p>
-            <a:pPr marL="514350" indent="-514350">
-              <a:buAutoNum type="arabicPeriod"/>
-            </a:pPr>
-            <a:r>
-              <a:rPr lang="zh-TW" altLang="en-US" dirty="0"/>
-              <a:t>訊號上的分析</a:t>
-            </a:r>
+            <a:r>
+              <a:rPr lang="en-US" altLang="zh-TW" sz="2400" dirty="0"/>
+              <a:t>	</a:t>
+            </a:r>
+            <a:r>
+              <a:rPr lang="zh-TW" altLang="en-US" sz="2400" dirty="0"/>
+              <a:t>缺點 </a:t>
+            </a:r>
+            <a:r>
+              <a:rPr lang="en-US" altLang="zh-TW" sz="2400" dirty="0"/>
+              <a:t>:</a:t>
+            </a:r>
+            <a:r>
+              <a:rPr lang="zh-TW" altLang="en-US" sz="2400" dirty="0"/>
+              <a:t> 無法抗高頻</a:t>
+            </a:r>
+            <a:r>
+              <a:rPr lang="en-US" altLang="zh-TW" sz="2400" dirty="0"/>
+              <a:t>Noise </a:t>
+            </a:r>
+            <a:r>
+              <a:rPr lang="zh-TW" altLang="en-US" sz="2400" dirty="0"/>
+              <a:t>、參數調整較多</a:t>
+            </a:r>
+            <a:endParaRPr lang="en-US" altLang="zh-TW" sz="2400" dirty="0"/>
           </a:p>
         </p:txBody>
       </p:sp>
     </p:spTree>
     <p:extLst>
       <p:ext uri="{BB962C8B-B14F-4D97-AF65-F5344CB8AC3E}">
-        <p14:creationId xmlns:p14="http://schemas.microsoft.com/office/powerpoint/2010/main" val="1802279474"/>
+        <p14:creationId xmlns:p14="http://schemas.microsoft.com/office/powerpoint/2010/main" val="1645638314"/>
       </p:ext>
     </p:extLst>
   </p:cSld>
@@ -16770,6 +17078,235 @@
           <p:cNvPr id="2" name="標題 1">
             <a:extLst>
               <a:ext uri="{FF2B5EF4-FFF2-40B4-BE49-F238E27FC236}">
+                <a16:creationId xmlns:a16="http://schemas.microsoft.com/office/drawing/2014/main" id="{41A1B36A-471A-BDE5-0D9F-F818171D72B1}"/>
+              </a:ext>
+            </a:extLst>
+          </p:cNvPr>
+          <p:cNvSpPr>
+            <a:spLocks noGrp="1"/>
+          </p:cNvSpPr>
+          <p:nvPr>
+            <p:ph type="title"/>
+          </p:nvPr>
+        </p:nvSpPr>
+        <p:spPr/>
+        <p:txBody>
+          <a:bodyPr/>
+          <a:lstStyle/>
+          <a:p>
+            <a:pPr algn="ctr"/>
+            <a:r>
+              <a:rPr lang="zh-TW" altLang="en-US" dirty="0"/>
+              <a:t>後端</a:t>
+            </a:r>
+            <a:r>
+              <a:rPr lang="en-US" altLang="zh-TW" dirty="0"/>
+              <a:t>Decoder</a:t>
+            </a:r>
+            <a:r>
+              <a:rPr lang="zh-TW" altLang="en-US" dirty="0"/>
+              <a:t>電路</a:t>
+            </a:r>
+          </a:p>
+        </p:txBody>
+      </p:sp>
+      <p:sp>
+        <p:nvSpPr>
+          <p:cNvPr id="3" name="內容版面配置區 2">
+            <a:extLst>
+              <a:ext uri="{FF2B5EF4-FFF2-40B4-BE49-F238E27FC236}">
+                <a16:creationId xmlns:a16="http://schemas.microsoft.com/office/drawing/2014/main" id="{AEB419E4-8661-C0C0-63D0-CF90B8FED2EC}"/>
+              </a:ext>
+            </a:extLst>
+          </p:cNvPr>
+          <p:cNvSpPr>
+            <a:spLocks noGrp="1"/>
+          </p:cNvSpPr>
+          <p:nvPr>
+            <p:ph idx="1"/>
+          </p:nvPr>
+        </p:nvSpPr>
+        <p:spPr/>
+        <p:txBody>
+          <a:bodyPr/>
+          <a:lstStyle/>
+          <a:p>
+            <a:endParaRPr lang="zh-TW" altLang="en-US" dirty="0"/>
+          </a:p>
+        </p:txBody>
+      </p:sp>
+    </p:spTree>
+    <p:extLst>
+      <p:ext uri="{BB962C8B-B14F-4D97-AF65-F5344CB8AC3E}">
+        <p14:creationId xmlns:p14="http://schemas.microsoft.com/office/powerpoint/2010/main" val="1747056482"/>
+      </p:ext>
+    </p:extLst>
+  </p:cSld>
+  <p:clrMapOvr>
+    <a:masterClrMapping/>
+  </p:clrMapOvr>
+</p:sld>
+</file>
+
+<file path=ppt/slides/slide33.xml><?xml version="1.0" encoding="utf-8"?>
+<p:sld xmlns:a="http://schemas.openxmlformats.org/drawingml/2006/main" xmlns:r="http://schemas.openxmlformats.org/officeDocument/2006/relationships" xmlns:p="http://schemas.openxmlformats.org/presentationml/2006/main">
+  <p:cSld>
+    <p:spTree>
+      <p:nvGrpSpPr>
+        <p:cNvPr id="1" name=""/>
+        <p:cNvGrpSpPr/>
+        <p:nvPr/>
+      </p:nvGrpSpPr>
+      <p:grpSpPr>
+        <a:xfrm>
+          <a:off x="0" y="0"/>
+          <a:ext cx="0" cy="0"/>
+          <a:chOff x="0" y="0"/>
+          <a:chExt cx="0" cy="0"/>
+        </a:xfrm>
+      </p:grpSpPr>
+      <p:sp>
+        <p:nvSpPr>
+          <p:cNvPr id="2" name="標題 1">
+            <a:extLst>
+              <a:ext uri="{FF2B5EF4-FFF2-40B4-BE49-F238E27FC236}">
+                <a16:creationId xmlns:a16="http://schemas.microsoft.com/office/drawing/2014/main" id="{50BB383F-54B9-1566-5039-3C13647347F8}"/>
+              </a:ext>
+            </a:extLst>
+          </p:cNvPr>
+          <p:cNvSpPr>
+            <a:spLocks noGrp="1"/>
+          </p:cNvSpPr>
+          <p:nvPr>
+            <p:ph type="title"/>
+          </p:nvPr>
+        </p:nvSpPr>
+        <p:spPr/>
+        <p:txBody>
+          <a:bodyPr/>
+          <a:lstStyle/>
+          <a:p>
+            <a:pPr algn="ctr"/>
+            <a:r>
+              <a:rPr lang="en-US" altLang="zh-TW" dirty="0" err="1"/>
+              <a:t>AutoCorrelation</a:t>
+            </a:r>
+            <a:endParaRPr lang="zh-TW" altLang="en-US" dirty="0"/>
+          </a:p>
+        </p:txBody>
+      </p:sp>
+      <p:sp>
+        <p:nvSpPr>
+          <p:cNvPr id="3" name="內容版面配置區 2">
+            <a:extLst>
+              <a:ext uri="{FF2B5EF4-FFF2-40B4-BE49-F238E27FC236}">
+                <a16:creationId xmlns:a16="http://schemas.microsoft.com/office/drawing/2014/main" id="{2596C747-6CF3-CCCC-4223-2CFCEABA8BA0}"/>
+              </a:ext>
+            </a:extLst>
+          </p:cNvPr>
+          <p:cNvSpPr>
+            <a:spLocks noGrp="1"/>
+          </p:cNvSpPr>
+          <p:nvPr>
+            <p:ph idx="1"/>
+          </p:nvPr>
+        </p:nvSpPr>
+        <p:spPr/>
+        <p:txBody>
+          <a:bodyPr/>
+          <a:lstStyle/>
+          <a:p>
+            <a:pPr marL="514350" indent="-514350">
+              <a:buAutoNum type="arabicPeriod"/>
+            </a:pPr>
+            <a:r>
+              <a:rPr lang="zh-TW" altLang="en-US" dirty="0"/>
+              <a:t>能推倒出</a:t>
+            </a:r>
+            <a:r>
+              <a:rPr lang="en-US" altLang="zh-TW" dirty="0" err="1"/>
+              <a:t>Convolation</a:t>
+            </a:r>
+            <a:r>
+              <a:rPr lang="en-US" altLang="zh-TW" dirty="0"/>
+              <a:t> Property for LTI system</a:t>
+            </a:r>
+          </a:p>
+          <a:p>
+            <a:pPr marL="514350" indent="-514350">
+              <a:buAutoNum type="arabicPeriod"/>
+            </a:pPr>
+            <a:endParaRPr lang="en-US" altLang="zh-TW" dirty="0"/>
+          </a:p>
+          <a:p>
+            <a:pPr marL="514350" indent="-514350">
+              <a:buAutoNum type="arabicPeriod"/>
+            </a:pPr>
+            <a:r>
+              <a:rPr lang="en-US" altLang="zh-TW" dirty="0" err="1"/>
+              <a:t>AutoCorreltion</a:t>
+            </a:r>
+            <a:r>
+              <a:rPr lang="zh-TW" altLang="en-US" dirty="0"/>
+              <a:t> 用處到底是</a:t>
+            </a:r>
+            <a:r>
+              <a:rPr lang="en-US" altLang="zh-TW" dirty="0"/>
+              <a:t>?</a:t>
+            </a:r>
+          </a:p>
+          <a:p>
+            <a:pPr marL="514350" indent="-514350">
+              <a:buAutoNum type="arabicPeriod"/>
+            </a:pPr>
+            <a:endParaRPr lang="en-US" altLang="zh-TW" dirty="0"/>
+          </a:p>
+          <a:p>
+            <a:pPr marL="514350" indent="-514350">
+              <a:buAutoNum type="arabicPeriod"/>
+            </a:pPr>
+            <a:r>
+              <a:rPr lang="zh-TW" altLang="en-US" dirty="0"/>
+              <a:t>訊號上的分析</a:t>
+            </a:r>
+          </a:p>
+        </p:txBody>
+      </p:sp>
+    </p:spTree>
+    <p:extLst>
+      <p:ext uri="{BB962C8B-B14F-4D97-AF65-F5344CB8AC3E}">
+        <p14:creationId xmlns:p14="http://schemas.microsoft.com/office/powerpoint/2010/main" val="1802279474"/>
+      </p:ext>
+    </p:extLst>
+  </p:cSld>
+  <p:clrMapOvr>
+    <a:masterClrMapping/>
+  </p:clrMapOvr>
+</p:sld>
+</file>
+
+<file path=ppt/slides/slide34.xml><?xml version="1.0" encoding="utf-8"?>
+<p:sld xmlns:a="http://schemas.openxmlformats.org/drawingml/2006/main" xmlns:r="http://schemas.openxmlformats.org/officeDocument/2006/relationships" xmlns:p="http://schemas.openxmlformats.org/presentationml/2006/main">
+  <p:cSld>
+    <p:spTree>
+      <p:nvGrpSpPr>
+        <p:cNvPr id="1" name=""/>
+        <p:cNvGrpSpPr/>
+        <p:nvPr/>
+      </p:nvGrpSpPr>
+      <p:grpSpPr>
+        <a:xfrm>
+          <a:off x="0" y="0"/>
+          <a:ext cx="0" cy="0"/>
+          <a:chOff x="0" y="0"/>
+          <a:chExt cx="0" cy="0"/>
+        </a:xfrm>
+      </p:grpSpPr>
+      <p:sp>
+        <p:nvSpPr>
+          <p:cNvPr id="2" name="標題 1">
+            <a:extLst>
+              <a:ext uri="{FF2B5EF4-FFF2-40B4-BE49-F238E27FC236}">
                 <a16:creationId xmlns:a16="http://schemas.microsoft.com/office/drawing/2014/main" id="{042F1310-2BFC-3D20-5FCD-AB24ABF21979}"/>
               </a:ext>
             </a:extLst>
@@ -16840,7 +17377,7 @@
 </p:sld>
 </file>
 
-<file path=ppt/slides/slide33.xml><?xml version="1.0" encoding="utf-8"?>
+<file path=ppt/slides/slide35.xml><?xml version="1.0" encoding="utf-8"?>
 <p:sld xmlns:a="http://schemas.openxmlformats.org/drawingml/2006/main" xmlns:r="http://schemas.openxmlformats.org/officeDocument/2006/relationships" xmlns:p="http://schemas.openxmlformats.org/presentationml/2006/main">
   <p:cSld>
     <p:spTree>
@@ -17377,215 +17914,6 @@
 </p:sld>
 </file>
 
-<file path=ppt/slides/slide34.xml><?xml version="1.0" encoding="utf-8"?>
-<p:sld xmlns:a="http://schemas.openxmlformats.org/drawingml/2006/main" xmlns:r="http://schemas.openxmlformats.org/officeDocument/2006/relationships" xmlns:p="http://schemas.openxmlformats.org/presentationml/2006/main">
-  <p:cSld>
-    <p:spTree>
-      <p:nvGrpSpPr>
-        <p:cNvPr id="1" name=""/>
-        <p:cNvGrpSpPr/>
-        <p:nvPr/>
-      </p:nvGrpSpPr>
-      <p:grpSpPr>
-        <a:xfrm>
-          <a:off x="0" y="0"/>
-          <a:ext cx="0" cy="0"/>
-          <a:chOff x="0" y="0"/>
-          <a:chExt cx="0" cy="0"/>
-        </a:xfrm>
-      </p:grpSpPr>
-      <p:sp>
-        <p:nvSpPr>
-          <p:cNvPr id="2" name="標題 1">
-            <a:extLst>
-              <a:ext uri="{FF2B5EF4-FFF2-40B4-BE49-F238E27FC236}">
-                <a16:creationId xmlns:a16="http://schemas.microsoft.com/office/drawing/2014/main" id="{E32E6CD8-2503-30B7-A4F8-AE84BE484917}"/>
-              </a:ext>
-            </a:extLst>
-          </p:cNvPr>
-          <p:cNvSpPr>
-            <a:spLocks noGrp="1"/>
-          </p:cNvSpPr>
-          <p:nvPr>
-            <p:ph type="title"/>
-          </p:nvPr>
-        </p:nvSpPr>
-        <p:spPr/>
-        <p:txBody>
-          <a:bodyPr/>
-          <a:lstStyle/>
-          <a:p>
-            <a:pPr algn="ctr"/>
-            <a:r>
-              <a:rPr lang="en-US" altLang="zh-TW" dirty="0"/>
-              <a:t>AGC flow</a:t>
-            </a:r>
-            <a:r>
-              <a:rPr lang="zh-TW" altLang="en-US" dirty="0"/>
-              <a:t>架構過程</a:t>
-            </a:r>
-          </a:p>
-        </p:txBody>
-      </p:sp>
-      <p:sp>
-        <p:nvSpPr>
-          <p:cNvPr id="3" name="內容版面配置區 2">
-            <a:extLst>
-              <a:ext uri="{FF2B5EF4-FFF2-40B4-BE49-F238E27FC236}">
-                <a16:creationId xmlns:a16="http://schemas.microsoft.com/office/drawing/2014/main" id="{ED8640AC-FE27-0D8C-6B75-7018404197B3}"/>
-              </a:ext>
-            </a:extLst>
-          </p:cNvPr>
-          <p:cNvSpPr>
-            <a:spLocks noGrp="1"/>
-          </p:cNvSpPr>
-          <p:nvPr>
-            <p:ph idx="1"/>
-          </p:nvPr>
-        </p:nvSpPr>
-        <p:spPr/>
-        <p:txBody>
-          <a:bodyPr/>
-          <a:lstStyle/>
-          <a:p>
-            <a:pPr marL="514350" indent="-514350">
-              <a:buAutoNum type="arabicPeriod"/>
-            </a:pPr>
-            <a:r>
-              <a:rPr lang="zh-TW" altLang="en-US" dirty="0"/>
-              <a:t>前期</a:t>
-            </a:r>
-            <a:r>
-              <a:rPr lang="en-US" altLang="zh-TW" dirty="0"/>
-              <a:t>ISSUE</a:t>
-            </a:r>
-          </a:p>
-          <a:p>
-            <a:pPr marL="514350" indent="-514350">
-              <a:buAutoNum type="arabicPeriod"/>
-            </a:pPr>
-            <a:endParaRPr lang="en-US" altLang="zh-TW" dirty="0"/>
-          </a:p>
-          <a:p>
-            <a:pPr marL="514350" indent="-514350">
-              <a:buAutoNum type="arabicPeriod"/>
-            </a:pPr>
-            <a:r>
-              <a:rPr lang="zh-TW" altLang="en-US" dirty="0"/>
-              <a:t>中後期統計</a:t>
-            </a:r>
-            <a:endParaRPr lang="en-US" altLang="zh-TW" dirty="0"/>
-          </a:p>
-          <a:p>
-            <a:pPr marL="514350" indent="-514350">
-              <a:buAutoNum type="arabicPeriod"/>
-            </a:pPr>
-            <a:endParaRPr lang="en-US" altLang="zh-TW" dirty="0"/>
-          </a:p>
-          <a:p>
-            <a:pPr marL="514350" indent="-514350">
-              <a:buAutoNum type="arabicPeriod"/>
-            </a:pPr>
-            <a:r>
-              <a:rPr lang="zh-TW" altLang="en-US" dirty="0"/>
-              <a:t>後期完工</a:t>
-            </a:r>
-          </a:p>
-        </p:txBody>
-      </p:sp>
-    </p:spTree>
-    <p:extLst>
-      <p:ext uri="{BB962C8B-B14F-4D97-AF65-F5344CB8AC3E}">
-        <p14:creationId xmlns:p14="http://schemas.microsoft.com/office/powerpoint/2010/main" val="3478487214"/>
-      </p:ext>
-    </p:extLst>
-  </p:cSld>
-  <p:clrMapOvr>
-    <a:masterClrMapping/>
-  </p:clrMapOvr>
-</p:sld>
-</file>
-
-<file path=ppt/slides/slide35.xml><?xml version="1.0" encoding="utf-8"?>
-<p:sld xmlns:a="http://schemas.openxmlformats.org/drawingml/2006/main" xmlns:r="http://schemas.openxmlformats.org/officeDocument/2006/relationships" xmlns:p="http://schemas.openxmlformats.org/presentationml/2006/main">
-  <p:cSld>
-    <p:spTree>
-      <p:nvGrpSpPr>
-        <p:cNvPr id="1" name=""/>
-        <p:cNvGrpSpPr/>
-        <p:nvPr/>
-      </p:nvGrpSpPr>
-      <p:grpSpPr>
-        <a:xfrm>
-          <a:off x="0" y="0"/>
-          <a:ext cx="0" cy="0"/>
-          <a:chOff x="0" y="0"/>
-          <a:chExt cx="0" cy="0"/>
-        </a:xfrm>
-      </p:grpSpPr>
-      <p:sp>
-        <p:nvSpPr>
-          <p:cNvPr id="2" name="標題 1">
-            <a:extLst>
-              <a:ext uri="{FF2B5EF4-FFF2-40B4-BE49-F238E27FC236}">
-                <a16:creationId xmlns:a16="http://schemas.microsoft.com/office/drawing/2014/main" id="{75A8CDCF-D217-9237-F0F3-F03F7A3BC82D}"/>
-              </a:ext>
-            </a:extLst>
-          </p:cNvPr>
-          <p:cNvSpPr>
-            <a:spLocks noGrp="1"/>
-          </p:cNvSpPr>
-          <p:nvPr>
-            <p:ph type="title"/>
-          </p:nvPr>
-        </p:nvSpPr>
-        <p:spPr/>
-        <p:txBody>
-          <a:bodyPr/>
-          <a:lstStyle/>
-          <a:p>
-            <a:endParaRPr lang="zh-TW" altLang="en-US" dirty="0"/>
-          </a:p>
-        </p:txBody>
-      </p:sp>
-      <p:sp>
-        <p:nvSpPr>
-          <p:cNvPr id="3" name="內容版面配置區 2">
-            <a:extLst>
-              <a:ext uri="{FF2B5EF4-FFF2-40B4-BE49-F238E27FC236}">
-                <a16:creationId xmlns:a16="http://schemas.microsoft.com/office/drawing/2014/main" id="{A5250B66-E56F-5AAD-0B99-C4E8E1B221C2}"/>
-              </a:ext>
-            </a:extLst>
-          </p:cNvPr>
-          <p:cNvSpPr>
-            <a:spLocks noGrp="1"/>
-          </p:cNvSpPr>
-          <p:nvPr>
-            <p:ph idx="1"/>
-          </p:nvPr>
-        </p:nvSpPr>
-        <p:spPr/>
-        <p:txBody>
-          <a:bodyPr/>
-          <a:lstStyle/>
-          <a:p>
-            <a:endParaRPr lang="zh-TW" altLang="en-US"/>
-          </a:p>
-        </p:txBody>
-      </p:sp>
-    </p:spTree>
-    <p:extLst>
-      <p:ext uri="{BB962C8B-B14F-4D97-AF65-F5344CB8AC3E}">
-        <p14:creationId xmlns:p14="http://schemas.microsoft.com/office/powerpoint/2010/main" val="2364024188"/>
-      </p:ext>
-    </p:extLst>
-  </p:cSld>
-  <p:clrMapOvr>
-    <a:masterClrMapping/>
-  </p:clrMapOvr>
-</p:sld>
-</file>
-
 <file path=ppt/slides/slide36.xml><?xml version="1.0" encoding="utf-8"?>
 <p:sld xmlns:a="http://schemas.openxmlformats.org/drawingml/2006/main" xmlns:r="http://schemas.openxmlformats.org/officeDocument/2006/relationships" xmlns:p="http://schemas.openxmlformats.org/presentationml/2006/main">
   <p:cSld>
@@ -17608,7 +17936,7 @@
           <p:cNvPr id="2" name="標題 1">
             <a:extLst>
               <a:ext uri="{FF2B5EF4-FFF2-40B4-BE49-F238E27FC236}">
-                <a16:creationId xmlns:a16="http://schemas.microsoft.com/office/drawing/2014/main" id="{02C3FE11-1F15-4971-95B5-34F7811B7E8A}"/>
+                <a16:creationId xmlns:a16="http://schemas.microsoft.com/office/drawing/2014/main" id="{E32E6CD8-2503-30B7-A4F8-AE84BE484917}"/>
               </a:ext>
             </a:extLst>
           </p:cNvPr>
@@ -17627,17 +17955,12 @@
             <a:pPr algn="ctr"/>
             <a:r>
               <a:rPr lang="en-US" altLang="zh-TW" dirty="0"/>
-              <a:t>Color </a:t>
-            </a:r>
-            <a:r>
-              <a:rPr lang="en-US" altLang="zh-TW" dirty="0" err="1"/>
-              <a:t>Pikcing</a:t>
-            </a:r>
-            <a:r>
-              <a:rPr lang="en-US" altLang="zh-TW" dirty="0"/>
-              <a:t> Project</a:t>
-            </a:r>
-            <a:endParaRPr lang="zh-TW" altLang="en-US" dirty="0"/>
+              <a:t>AGC flow</a:t>
+            </a:r>
+            <a:r>
+              <a:rPr lang="zh-TW" altLang="en-US" dirty="0"/>
+              <a:t>架構過程</a:t>
+            </a:r>
           </a:p>
         </p:txBody>
       </p:sp>
@@ -17646,7 +17969,7 @@
           <p:cNvPr id="3" name="內容版面配置區 2">
             <a:extLst>
               <a:ext uri="{FF2B5EF4-FFF2-40B4-BE49-F238E27FC236}">
-                <a16:creationId xmlns:a16="http://schemas.microsoft.com/office/drawing/2014/main" id="{5C2571F1-765B-42C3-8AAC-2A8441E0FBA0}"/>
+                <a16:creationId xmlns:a16="http://schemas.microsoft.com/office/drawing/2014/main" id="{ED8640AC-FE27-0D8C-6B75-7018404197B3}"/>
               </a:ext>
             </a:extLst>
           </p:cNvPr>
@@ -17662,74 +17985,55 @@
           <a:bodyPr/>
           <a:lstStyle/>
           <a:p>
-            <a:pPr marL="457200" lvl="1" indent="0">
-              <a:lnSpc>
-                <a:spcPct val="150000"/>
-              </a:lnSpc>
-              <a:buNone/>
+            <a:pPr marL="514350" indent="-514350">
+              <a:buAutoNum type="arabicPeriod"/>
             </a:pPr>
             <a:r>
-              <a:rPr lang="zh-TW" altLang="en-US" sz="2800" dirty="0">
-                <a:solidFill>
-                  <a:srgbClr val="FF0000"/>
-                </a:solidFill>
-              </a:rPr>
-              <a:t>目的</a:t>
-            </a:r>
-            <a:r>
-              <a:rPr lang="zh-TW" altLang="en-US" dirty="0"/>
-              <a:t> </a:t>
-            </a:r>
-            <a:r>
-              <a:rPr lang="en-US" altLang="zh-TW" dirty="0"/>
-              <a:t>:</a:t>
-            </a:r>
-            <a:r>
-              <a:rPr lang="zh-TW" altLang="en-US" dirty="0"/>
-              <a:t>  按壓</a:t>
-            </a:r>
-            <a:r>
-              <a:rPr lang="en-US" altLang="zh-TW" dirty="0"/>
-              <a:t>Color Sensor</a:t>
-            </a:r>
-            <a:r>
-              <a:rPr lang="zh-TW" altLang="en-US" dirty="0"/>
-              <a:t>選擇顏色、並透過筆在</a:t>
-            </a:r>
-            <a:r>
-              <a:rPr lang="en-US" altLang="zh-TW" dirty="0"/>
-              <a:t>Host</a:t>
-            </a:r>
-            <a:r>
-              <a:rPr lang="zh-TW" altLang="en-US" dirty="0"/>
-              <a:t>上畫出對應的顏色</a:t>
-            </a:r>
-            <a:endParaRPr lang="en-US" altLang="zh-TW" dirty="0"/>
-          </a:p>
-          <a:p>
-            <a:pPr marL="457200" lvl="1" indent="0">
-              <a:lnSpc>
-                <a:spcPct val="150000"/>
-              </a:lnSpc>
-              <a:buNone/>
+              <a:rPr lang="zh-TW" altLang="en-US" dirty="0"/>
+              <a:t>前期</a:t>
+            </a:r>
+            <a:r>
+              <a:rPr lang="en-US" altLang="zh-TW" dirty="0"/>
+              <a:t>ISSUE</a:t>
+            </a:r>
+          </a:p>
+          <a:p>
+            <a:pPr marL="514350" indent="-514350">
+              <a:buAutoNum type="arabicPeriod"/>
             </a:pPr>
             <a:endParaRPr lang="en-US" altLang="zh-TW" dirty="0"/>
           </a:p>
           <a:p>
-            <a:pPr marL="457200" lvl="1" indent="0">
-              <a:lnSpc>
-                <a:spcPct val="150000"/>
-              </a:lnSpc>
-              <a:buNone/>
+            <a:pPr marL="514350" indent="-514350">
+              <a:buAutoNum type="arabicPeriod"/>
+            </a:pPr>
+            <a:r>
+              <a:rPr lang="zh-TW" altLang="en-US" dirty="0"/>
+              <a:t>中後期統計</a:t>
+            </a:r>
+            <a:endParaRPr lang="en-US" altLang="zh-TW" dirty="0"/>
+          </a:p>
+          <a:p>
+            <a:pPr marL="514350" indent="-514350">
+              <a:buAutoNum type="arabicPeriod"/>
             </a:pPr>
             <a:endParaRPr lang="en-US" altLang="zh-TW" dirty="0"/>
+          </a:p>
+          <a:p>
+            <a:pPr marL="514350" indent="-514350">
+              <a:buAutoNum type="arabicPeriod"/>
+            </a:pPr>
+            <a:r>
+              <a:rPr lang="zh-TW" altLang="en-US" dirty="0"/>
+              <a:t>後期完工</a:t>
+            </a:r>
           </a:p>
         </p:txBody>
       </p:sp>
     </p:spTree>
     <p:extLst>
       <p:ext uri="{BB962C8B-B14F-4D97-AF65-F5344CB8AC3E}">
-        <p14:creationId xmlns:p14="http://schemas.microsoft.com/office/powerpoint/2010/main" val="263751651"/>
+        <p14:creationId xmlns:p14="http://schemas.microsoft.com/office/powerpoint/2010/main" val="3478487214"/>
       </p:ext>
     </p:extLst>
   </p:cSld>
@@ -17761,7 +18065,7 @@
           <p:cNvPr id="2" name="標題 1">
             <a:extLst>
               <a:ext uri="{FF2B5EF4-FFF2-40B4-BE49-F238E27FC236}">
-                <a16:creationId xmlns:a16="http://schemas.microsoft.com/office/drawing/2014/main" id="{36663CA0-2783-4A34-8C5A-24686BD0A02B}"/>
+                <a16:creationId xmlns:a16="http://schemas.microsoft.com/office/drawing/2014/main" id="{75A8CDCF-D217-9237-F0F3-F03F7A3BC82D}"/>
               </a:ext>
             </a:extLst>
           </p:cNvPr>
@@ -17777,11 +18081,7 @@
           <a:bodyPr/>
           <a:lstStyle/>
           <a:p>
-            <a:pPr algn="ctr"/>
-            <a:r>
-              <a:rPr lang="zh-TW" altLang="en-US" dirty="0"/>
-              <a:t>主要遇到的問題</a:t>
-            </a:r>
+            <a:endParaRPr lang="zh-TW" altLang="en-US" dirty="0"/>
           </a:p>
         </p:txBody>
       </p:sp>
@@ -17790,7 +18090,7 @@
           <p:cNvPr id="3" name="內容版面配置區 2">
             <a:extLst>
               <a:ext uri="{FF2B5EF4-FFF2-40B4-BE49-F238E27FC236}">
-                <a16:creationId xmlns:a16="http://schemas.microsoft.com/office/drawing/2014/main" id="{4EB3A3B7-3819-4E07-A5DF-C15C993A0B95}"/>
+                <a16:creationId xmlns:a16="http://schemas.microsoft.com/office/drawing/2014/main" id="{A5250B66-E56F-5AAD-0B99-C4E8E1B221C2}"/>
               </a:ext>
             </a:extLst>
           </p:cNvPr>
@@ -17806,152 +18106,14 @@
           <a:bodyPr/>
           <a:lstStyle/>
           <a:p>
-            <a:pPr marL="0" indent="0">
-              <a:buNone/>
-            </a:pPr>
-            <a:r>
-              <a:rPr lang="zh-TW" altLang="en-US" dirty="0">
-                <a:solidFill>
-                  <a:schemeClr val="accent1"/>
-                </a:solidFill>
-              </a:rPr>
-              <a:t>問題</a:t>
-            </a:r>
-            <a:endParaRPr lang="en-US" altLang="zh-TW" dirty="0">
-              <a:solidFill>
-                <a:schemeClr val="accent1"/>
-              </a:solidFill>
-            </a:endParaRPr>
-          </a:p>
-          <a:p>
-            <a:pPr marL="514350" indent="-514350">
-              <a:buAutoNum type="arabicPeriod"/>
-            </a:pPr>
-            <a:endParaRPr lang="en-US" altLang="zh-TW" dirty="0"/>
-          </a:p>
-          <a:p>
-            <a:pPr marL="514350" indent="-514350">
-              <a:buAutoNum type="arabicPeriod"/>
-            </a:pPr>
-            <a:r>
-              <a:rPr lang="zh-TW" altLang="en-US" sz="2400" dirty="0">
-                <a:hlinkClick r:id="rId3" action="ppaction://hlinksldjump"/>
-              </a:rPr>
-              <a:t>傳輸問題 </a:t>
-            </a:r>
-            <a:r>
-              <a:rPr lang="en-US" altLang="zh-TW" sz="2400" dirty="0"/>
-              <a:t>:</a:t>
-            </a:r>
-            <a:r>
-              <a:rPr lang="zh-TW" altLang="en-US" sz="2400" dirty="0"/>
-              <a:t> </a:t>
-            </a:r>
-            <a:endParaRPr lang="en-US" altLang="zh-TW" sz="2400" dirty="0"/>
-          </a:p>
-          <a:p>
-            <a:pPr marL="457200" lvl="1" indent="0">
-              <a:buNone/>
-            </a:pPr>
-            <a:r>
-              <a:rPr lang="en-US" altLang="zh-TW" sz="2000" dirty="0"/>
-              <a:t>1.  Set UART</a:t>
-            </a:r>
-            <a:r>
-              <a:rPr lang="zh-TW" altLang="en-US" sz="2000" dirty="0"/>
-              <a:t> </a:t>
-            </a:r>
-            <a:r>
-              <a:rPr lang="en-US" altLang="zh-TW" sz="2000" dirty="0"/>
-              <a:t>RX</a:t>
-            </a:r>
-            <a:r>
-              <a:rPr lang="zh-TW" altLang="en-US" sz="2000" dirty="0"/>
-              <a:t> </a:t>
-            </a:r>
-            <a:r>
-              <a:rPr lang="en-US" altLang="zh-TW" sz="2000" dirty="0"/>
-              <a:t>Setting </a:t>
-            </a:r>
-            <a:r>
-              <a:rPr lang="zh-TW" altLang="en-US" sz="2000" dirty="0"/>
-              <a:t>以及 </a:t>
-            </a:r>
-            <a:r>
-              <a:rPr lang="en-US" altLang="zh-TW" sz="2000" dirty="0"/>
-              <a:t>Flow </a:t>
-            </a:r>
-            <a:r>
-              <a:rPr lang="zh-TW" altLang="en-US" sz="2000" dirty="0"/>
-              <a:t>規劃</a:t>
-            </a:r>
-            <a:endParaRPr lang="en-US" altLang="zh-TW" sz="2000" dirty="0"/>
-          </a:p>
-          <a:p>
-            <a:pPr marL="0" indent="0">
-              <a:buNone/>
-            </a:pPr>
-            <a:endParaRPr lang="en-US" altLang="zh-TW" sz="2400" dirty="0"/>
-          </a:p>
-          <a:p>
-            <a:pPr marL="457200" indent="-457200">
-              <a:buAutoNum type="arabicPeriod" startAt="2"/>
-            </a:pPr>
-            <a:r>
-              <a:rPr lang="zh-TW" altLang="en-US" sz="2400" dirty="0">
-                <a:hlinkClick r:id="rId4" action="ppaction://hlinksldjump"/>
-              </a:rPr>
-              <a:t>最接近顏色</a:t>
-            </a:r>
-            <a:r>
-              <a:rPr lang="en-US" altLang="zh-TW" sz="2400" dirty="0"/>
-              <a:t>:</a:t>
-            </a:r>
-          </a:p>
-          <a:p>
-            <a:pPr marL="914400" lvl="1" indent="-457200">
-              <a:buAutoNum type="arabicPeriod" startAt="2"/>
-            </a:pPr>
-            <a:r>
-              <a:rPr lang="zh-TW" altLang="en-US" sz="2000" dirty="0"/>
-              <a:t>筆的</a:t>
-            </a:r>
-            <a:r>
-              <a:rPr lang="en-US" altLang="zh-TW" sz="2000" dirty="0" err="1"/>
-              <a:t>Protocal</a:t>
-            </a:r>
-            <a:r>
-              <a:rPr lang="en-US" altLang="zh-TW" sz="2000" dirty="0"/>
-              <a:t> </a:t>
-            </a:r>
-            <a:r>
-              <a:rPr lang="zh-TW" altLang="en-US" sz="2000" dirty="0"/>
-              <a:t>定義的顏色只佔</a:t>
-            </a:r>
-            <a:r>
-              <a:rPr lang="en-US" altLang="zh-TW" sz="2000" dirty="0"/>
-              <a:t>RGB</a:t>
-            </a:r>
-            <a:r>
-              <a:rPr lang="zh-TW" altLang="en-US" sz="2000" dirty="0"/>
-              <a:t>裡面</a:t>
-            </a:r>
-            <a:r>
-              <a:rPr lang="en-US" altLang="zh-TW" sz="2000" dirty="0"/>
-              <a:t>200</a:t>
-            </a:r>
-            <a:r>
-              <a:rPr lang="zh-TW" altLang="en-US" sz="2000" dirty="0"/>
-              <a:t>多個</a:t>
-            </a:r>
-            <a:endParaRPr lang="en-US" altLang="zh-TW" dirty="0"/>
+            <a:endParaRPr lang="zh-TW" altLang="en-US"/>
           </a:p>
         </p:txBody>
       </p:sp>
     </p:spTree>
     <p:extLst>
       <p:ext uri="{BB962C8B-B14F-4D97-AF65-F5344CB8AC3E}">
-        <p14:creationId xmlns:p14="http://schemas.microsoft.com/office/powerpoint/2010/main" val="2576856385"/>
+        <p14:creationId xmlns:p14="http://schemas.microsoft.com/office/powerpoint/2010/main" val="2364024188"/>
       </p:ext>
     </p:extLst>
   </p:cSld>
@@ -17983,7 +18145,7 @@
           <p:cNvPr id="2" name="標題 1">
             <a:extLst>
               <a:ext uri="{FF2B5EF4-FFF2-40B4-BE49-F238E27FC236}">
-                <a16:creationId xmlns:a16="http://schemas.microsoft.com/office/drawing/2014/main" id="{FEDEBC06-C75E-5899-979E-C29912B4A68E}"/>
+                <a16:creationId xmlns:a16="http://schemas.microsoft.com/office/drawing/2014/main" id="{02C3FE11-1F15-4971-95B5-34F7811B7E8A}"/>
               </a:ext>
             </a:extLst>
           </p:cNvPr>
@@ -18002,7 +18164,15 @@
             <a:pPr algn="ctr"/>
             <a:r>
               <a:rPr lang="en-US" altLang="zh-TW" dirty="0"/>
-              <a:t>UART RX Setting</a:t>
+              <a:t>Color </a:t>
+            </a:r>
+            <a:r>
+              <a:rPr lang="en-US" altLang="zh-TW" dirty="0" err="1"/>
+              <a:t>Pikcing</a:t>
+            </a:r>
+            <a:r>
+              <a:rPr lang="en-US" altLang="zh-TW" dirty="0"/>
+              <a:t> Project</a:t>
             </a:r>
             <a:endParaRPr lang="zh-TW" altLang="en-US" dirty="0"/>
           </a:p>
@@ -18013,7 +18183,7 @@
           <p:cNvPr id="3" name="內容版面配置區 2">
             <a:extLst>
               <a:ext uri="{FF2B5EF4-FFF2-40B4-BE49-F238E27FC236}">
-                <a16:creationId xmlns:a16="http://schemas.microsoft.com/office/drawing/2014/main" id="{D33F5725-65BC-FF79-0EEB-A34DF7904932}"/>
+                <a16:creationId xmlns:a16="http://schemas.microsoft.com/office/drawing/2014/main" id="{5C2571F1-765B-42C3-8AAC-2A8441E0FBA0}"/>
               </a:ext>
             </a:extLst>
           </p:cNvPr>
@@ -18026,79 +18196,77 @@
         </p:nvSpPr>
         <p:spPr/>
         <p:txBody>
-          <a:bodyPr>
-            <a:normAutofit/>
-          </a:bodyPr>
-          <a:lstStyle/>
-          <a:p>
-            <a:pPr marL="514350" indent="-514350">
-              <a:buAutoNum type="arabicPeriod"/>
+          <a:bodyPr/>
+          <a:lstStyle/>
+          <a:p>
+            <a:pPr marL="457200" lvl="1" indent="0">
+              <a:lnSpc>
+                <a:spcPct val="150000"/>
+              </a:lnSpc>
+              <a:buNone/>
             </a:pPr>
             <a:r>
-              <a:rPr lang="en-US" altLang="zh-TW" sz="2000" dirty="0"/>
-              <a:t>UART</a:t>
-            </a:r>
-            <a:r>
-              <a:rPr lang="zh-TW" altLang="en-US" sz="2000" dirty="0"/>
+              <a:rPr lang="zh-TW" altLang="en-US" sz="2800" dirty="0">
+                <a:solidFill>
+                  <a:srgbClr val="FF0000"/>
+                </a:solidFill>
+              </a:rPr>
+              <a:t>目的</a:t>
+            </a:r>
+            <a:r>
+              <a:rPr lang="zh-TW" altLang="en-US" dirty="0"/>
               <a:t> </a:t>
             </a:r>
             <a:r>
-              <a:rPr lang="en-US" altLang="zh-TW" sz="2000" dirty="0"/>
-              <a:t>RX</a:t>
-            </a:r>
-            <a:r>
-              <a:rPr lang="zh-TW" altLang="en-US" sz="2000" dirty="0"/>
-              <a:t> 使用</a:t>
-            </a:r>
-            <a:r>
-              <a:rPr lang="en-US" altLang="zh-TW" sz="2000" dirty="0"/>
-              <a:t>FIFO</a:t>
-            </a:r>
-            <a:r>
-              <a:rPr lang="zh-TW" altLang="en-US" sz="2000" dirty="0"/>
-              <a:t> 架構、這個</a:t>
-            </a:r>
-            <a:r>
-              <a:rPr lang="en-US" altLang="zh-TW" sz="2000" dirty="0"/>
-              <a:t>FIFO</a:t>
-            </a:r>
-            <a:r>
-              <a:rPr lang="zh-TW" altLang="en-US" sz="2000" dirty="0"/>
-              <a:t>架構是被封裝過。</a:t>
-            </a:r>
-            <a:endParaRPr lang="en-US" altLang="zh-TW" sz="2000" dirty="0"/>
-          </a:p>
-          <a:p>
-            <a:pPr marL="514350" indent="-514350">
-              <a:buAutoNum type="arabicPeriod"/>
+              <a:rPr lang="en-US" altLang="zh-TW" dirty="0"/>
+              <a:t>:</a:t>
+            </a:r>
+            <a:r>
+              <a:rPr lang="zh-TW" altLang="en-US" dirty="0"/>
+              <a:t>  按壓</a:t>
+            </a:r>
+            <a:r>
+              <a:rPr lang="en-US" altLang="zh-TW" dirty="0"/>
+              <a:t>Color Sensor</a:t>
+            </a:r>
+            <a:r>
+              <a:rPr lang="zh-TW" altLang="en-US" dirty="0"/>
+              <a:t>選擇顏色、並透過筆在</a:t>
+            </a:r>
+            <a:r>
+              <a:rPr lang="en-US" altLang="zh-TW" dirty="0"/>
+              <a:t>Host</a:t>
+            </a:r>
+            <a:r>
+              <a:rPr lang="zh-TW" altLang="en-US" dirty="0"/>
+              <a:t>上畫出對應的顏色</a:t>
+            </a:r>
+            <a:endParaRPr lang="en-US" altLang="zh-TW" dirty="0"/>
+          </a:p>
+          <a:p>
+            <a:pPr marL="457200" lvl="1" indent="0">
+              <a:lnSpc>
+                <a:spcPct val="150000"/>
+              </a:lnSpc>
+              <a:buNone/>
             </a:pPr>
-            <a:endParaRPr lang="en-US" altLang="zh-TW" sz="2000" dirty="0"/>
-          </a:p>
-          <a:p>
-            <a:pPr marL="514350" indent="-514350">
-              <a:buAutoNum type="arabicPeriod"/>
+            <a:endParaRPr lang="en-US" altLang="zh-TW" dirty="0"/>
+          </a:p>
+          <a:p>
+            <a:pPr marL="457200" lvl="1" indent="0">
+              <a:lnSpc>
+                <a:spcPct val="150000"/>
+              </a:lnSpc>
+              <a:buNone/>
             </a:pPr>
-            <a:endParaRPr lang="en-US" altLang="zh-TW" sz="2000" dirty="0"/>
-          </a:p>
-          <a:p>
-            <a:pPr marL="514350" indent="-514350">
-              <a:buAutoNum type="arabicPeriod"/>
-            </a:pPr>
-            <a:r>
-              <a:rPr lang="en-US" altLang="zh-TW" sz="2000" dirty="0"/>
-              <a:t>UART RX</a:t>
-            </a:r>
-            <a:r>
-              <a:rPr lang="zh-TW" altLang="en-US" sz="2000" dirty="0"/>
-              <a:t> 中斷硬體設計</a:t>
-            </a:r>
+            <a:endParaRPr lang="en-US" altLang="zh-TW" dirty="0"/>
           </a:p>
         </p:txBody>
       </p:sp>
     </p:spTree>
     <p:extLst>
       <p:ext uri="{BB962C8B-B14F-4D97-AF65-F5344CB8AC3E}">
-        <p14:creationId xmlns:p14="http://schemas.microsoft.com/office/powerpoint/2010/main" val="3743749783"/>
+        <p14:creationId xmlns:p14="http://schemas.microsoft.com/office/powerpoint/2010/main" val="263751651"/>
       </p:ext>
     </p:extLst>
   </p:cSld>
@@ -18130,7 +18298,7 @@
           <p:cNvPr id="2" name="標題 1">
             <a:extLst>
               <a:ext uri="{FF2B5EF4-FFF2-40B4-BE49-F238E27FC236}">
-                <a16:creationId xmlns:a16="http://schemas.microsoft.com/office/drawing/2014/main" id="{FEDEBC06-C75E-5899-979E-C29912B4A68E}"/>
+                <a16:creationId xmlns:a16="http://schemas.microsoft.com/office/drawing/2014/main" id="{36663CA0-2783-4A34-8C5A-24686BD0A02B}"/>
               </a:ext>
             </a:extLst>
           </p:cNvPr>
@@ -18148,10 +18316,9 @@
           <a:p>
             <a:pPr algn="ctr"/>
             <a:r>
-              <a:rPr lang="en-US" altLang="zh-TW" dirty="0"/>
-              <a:t>UART RX Setting</a:t>
-            </a:r>
-            <a:endParaRPr lang="zh-TW" altLang="en-US" dirty="0"/>
+              <a:rPr lang="zh-TW" altLang="en-US" dirty="0"/>
+              <a:t>主要遇到的問題</a:t>
+            </a:r>
           </a:p>
         </p:txBody>
       </p:sp>
@@ -18160,7 +18327,7 @@
           <p:cNvPr id="3" name="內容版面配置區 2">
             <a:extLst>
               <a:ext uri="{FF2B5EF4-FFF2-40B4-BE49-F238E27FC236}">
-                <a16:creationId xmlns:a16="http://schemas.microsoft.com/office/drawing/2014/main" id="{D33F5725-65BC-FF79-0EEB-A34DF7904932}"/>
+                <a16:creationId xmlns:a16="http://schemas.microsoft.com/office/drawing/2014/main" id="{4EB3A3B7-3819-4E07-A5DF-C15C993A0B95}"/>
               </a:ext>
             </a:extLst>
           </p:cNvPr>
@@ -18173,21 +18340,59 @@
         </p:nvSpPr>
         <p:spPr/>
         <p:txBody>
-          <a:bodyPr>
-            <a:normAutofit/>
-          </a:bodyPr>
+          <a:bodyPr/>
           <a:lstStyle/>
           <a:p>
             <a:pPr marL="0" indent="0">
               <a:buNone/>
             </a:pPr>
             <a:r>
-              <a:rPr lang="zh-TW" altLang="en-US" sz="2000" dirty="0"/>
-              <a:t>總結 </a:t>
-            </a:r>
+              <a:rPr lang="zh-TW" altLang="en-US" dirty="0">
+                <a:solidFill>
+                  <a:schemeClr val="accent1"/>
+                </a:solidFill>
+              </a:rPr>
+              <a:t>問題</a:t>
+            </a:r>
+            <a:endParaRPr lang="en-US" altLang="zh-TW" dirty="0">
+              <a:solidFill>
+                <a:schemeClr val="accent1"/>
+              </a:solidFill>
+            </a:endParaRPr>
+          </a:p>
+          <a:p>
+            <a:pPr marL="514350" indent="-514350">
+              <a:buAutoNum type="arabicPeriod"/>
+            </a:pPr>
+            <a:endParaRPr lang="en-US" altLang="zh-TW" dirty="0"/>
+          </a:p>
+          <a:p>
+            <a:pPr marL="514350" indent="-514350">
+              <a:buAutoNum type="arabicPeriod"/>
+            </a:pPr>
+            <a:r>
+              <a:rPr lang="zh-TW" altLang="en-US" sz="2400" dirty="0">
+                <a:hlinkClick r:id="rId3" action="ppaction://hlinksldjump"/>
+              </a:rPr>
+              <a:t>傳輸問題 </a:t>
+            </a:r>
+            <a:r>
+              <a:rPr lang="en-US" altLang="zh-TW" sz="2400" dirty="0"/>
+              <a:t>:</a:t>
+            </a:r>
+            <a:r>
+              <a:rPr lang="zh-TW" altLang="en-US" sz="2400" dirty="0"/>
+              <a:t> </a:t>
+            </a:r>
+            <a:endParaRPr lang="en-US" altLang="zh-TW" sz="2400" dirty="0"/>
+          </a:p>
+          <a:p>
+            <a:pPr marL="457200" lvl="1" indent="0">
+              <a:buNone/>
+            </a:pPr>
             <a:r>
               <a:rPr lang="en-US" altLang="zh-TW" sz="2000" dirty="0"/>
-              <a:t>:</a:t>
+              <a:t>1.  Set UART</a:t>
             </a:r>
             <a:r>
               <a:rPr lang="zh-TW" altLang="en-US" sz="2000" dirty="0"/>
@@ -18195,44 +18400,95 @@
             </a:r>
             <a:r>
               <a:rPr lang="en-US" altLang="zh-TW" sz="2000" dirty="0"/>
+              <a:t>RX</a:t>
+            </a:r>
+            <a:r>
+              <a:rPr lang="zh-TW" altLang="en-US" sz="2000" dirty="0"/>
               <a:t> </a:t>
             </a:r>
             <a:r>
+              <a:rPr lang="en-US" altLang="zh-TW" sz="2000" dirty="0"/>
+              <a:t>Setting </a:t>
+            </a:r>
+            <a:r>
               <a:rPr lang="zh-TW" altLang="en-US" sz="2000" dirty="0"/>
-              <a:t>由於使用情況是使用者隨時可能會去觸動後發</a:t>
+              <a:t>以及 </a:t>
             </a:r>
             <a:r>
               <a:rPr lang="en-US" altLang="zh-TW" sz="2000" dirty="0"/>
-              <a:t>Sensor</a:t>
+              <a:t>Flow </a:t>
             </a:r>
             <a:r>
               <a:rPr lang="zh-TW" altLang="en-US" sz="2000" dirty="0"/>
-              <a:t>、筆本身還要</a:t>
+              <a:t>規劃</a:t>
+            </a:r>
+            <a:endParaRPr lang="en-US" altLang="zh-TW" sz="2000" dirty="0"/>
+          </a:p>
+          <a:p>
+            <a:pPr marL="0" indent="0">
+              <a:buNone/>
+            </a:pPr>
+            <a:endParaRPr lang="en-US" altLang="zh-TW" sz="2400" dirty="0"/>
+          </a:p>
+          <a:p>
+            <a:pPr marL="457200" indent="-457200">
+              <a:buAutoNum type="arabicPeriod" startAt="2"/>
+            </a:pPr>
+            <a:r>
+              <a:rPr lang="zh-TW" altLang="en-US" sz="2400" dirty="0">
+                <a:hlinkClick r:id="rId4" action="ppaction://hlinksldjump"/>
+              </a:rPr>
+              <a:t>最接近顏色</a:t>
+            </a:r>
+            <a:r>
+              <a:rPr lang="en-US" altLang="zh-TW" sz="2400" dirty="0"/>
+              <a:t>:</a:t>
+            </a:r>
+          </a:p>
+          <a:p>
+            <a:pPr marL="914400" lvl="1" indent="-457200">
+              <a:buAutoNum type="arabicPeriod" startAt="2"/>
+            </a:pPr>
+            <a:r>
+              <a:rPr lang="zh-TW" altLang="en-US" sz="2000" dirty="0"/>
+              <a:t>筆的</a:t>
+            </a:r>
+            <a:r>
+              <a:rPr lang="en-US" altLang="zh-TW" sz="2000" dirty="0" err="1"/>
+              <a:t>Protocal</a:t>
             </a:r>
             <a:r>
               <a:rPr lang="en-US" altLang="zh-TW" sz="2000" dirty="0"/>
-              <a:t>Decode </a:t>
+              <a:t> </a:t>
             </a:r>
             <a:r>
               <a:rPr lang="zh-TW" altLang="en-US" sz="2000" dirty="0"/>
-              <a:t>訊號，因此中斷是最佳方法，</a:t>
+              <a:t>定義的顏色只佔</a:t>
             </a:r>
             <a:r>
               <a:rPr lang="en-US" altLang="zh-TW" sz="2000" dirty="0"/>
-              <a:t>Polling </a:t>
+              <a:t>RGB</a:t>
             </a:r>
             <a:r>
               <a:rPr lang="zh-TW" altLang="en-US" sz="2000" dirty="0"/>
-              <a:t>去偵測就不是好方法並且耗電</a:t>
-            </a:r>
-            <a:endParaRPr lang="en-US" altLang="zh-TW" sz="2000" dirty="0"/>
+              <a:t>裡面</a:t>
+            </a:r>
+            <a:r>
+              <a:rPr lang="en-US" altLang="zh-TW" sz="2000" dirty="0"/>
+              <a:t>200</a:t>
+            </a:r>
+            <a:r>
+              <a:rPr lang="zh-TW" altLang="en-US" sz="2000" dirty="0"/>
+              <a:t>多個</a:t>
+            </a:r>
+            <a:endParaRPr lang="en-US" altLang="zh-TW" dirty="0"/>
           </a:p>
         </p:txBody>
       </p:sp>
     </p:spTree>
     <p:extLst>
       <p:ext uri="{BB962C8B-B14F-4D97-AF65-F5344CB8AC3E}">
-        <p14:creationId xmlns:p14="http://schemas.microsoft.com/office/powerpoint/2010/main" val="1764172780"/>
+        <p14:creationId xmlns:p14="http://schemas.microsoft.com/office/powerpoint/2010/main" val="2576856385"/>
       </p:ext>
     </p:extLst>
   </p:cSld>
@@ -18428,7 +18684,7 @@
           <p:cNvPr id="2" name="標題 1">
             <a:extLst>
               <a:ext uri="{FF2B5EF4-FFF2-40B4-BE49-F238E27FC236}">
-                <a16:creationId xmlns:a16="http://schemas.microsoft.com/office/drawing/2014/main" id="{DCAF803D-3CAB-3E11-8A90-4D5310A3A5EA}"/>
+                <a16:creationId xmlns:a16="http://schemas.microsoft.com/office/drawing/2014/main" id="{FEDEBC06-C75E-5899-979E-C29912B4A68E}"/>
               </a:ext>
             </a:extLst>
           </p:cNvPr>
@@ -18458,7 +18714,7 @@
           <p:cNvPr id="3" name="內容版面配置區 2">
             <a:extLst>
               <a:ext uri="{FF2B5EF4-FFF2-40B4-BE49-F238E27FC236}">
-                <a16:creationId xmlns:a16="http://schemas.microsoft.com/office/drawing/2014/main" id="{3B1B8A68-518A-9A03-2325-0016A63D6547}"/>
+                <a16:creationId xmlns:a16="http://schemas.microsoft.com/office/drawing/2014/main" id="{D33F5725-65BC-FF79-0EEB-A34DF7904932}"/>
               </a:ext>
             </a:extLst>
           </p:cNvPr>
@@ -18471,151 +18727,79 @@
         </p:nvSpPr>
         <p:spPr/>
         <p:txBody>
-          <a:bodyPr/>
-          <a:lstStyle/>
-          <a:p>
-            <a:pPr marL="0" indent="0">
-              <a:buNone/>
+          <a:bodyPr>
+            <a:normAutofit/>
+          </a:bodyPr>
+          <a:lstStyle/>
+          <a:p>
+            <a:pPr marL="514350" indent="-514350">
+              <a:buAutoNum type="arabicPeriod"/>
             </a:pPr>
             <a:r>
-              <a:rPr lang="zh-TW" altLang="en-US" dirty="0">
-                <a:solidFill>
-                  <a:schemeClr val="accent1"/>
-                </a:solidFill>
-              </a:rPr>
-              <a:t>過程中遇到最大問題 </a:t>
-            </a:r>
-            <a:r>
-              <a:rPr lang="en-US" altLang="zh-TW" dirty="0">
-                <a:solidFill>
-                  <a:schemeClr val="accent1"/>
-                </a:solidFill>
-              </a:rPr>
-              <a:t>: </a:t>
-            </a:r>
-          </a:p>
-          <a:p>
-            <a:pPr marL="0" indent="0">
-              <a:buNone/>
+              <a:rPr lang="en-US" altLang="zh-TW" sz="2000" dirty="0"/>
+              <a:t>UART</a:t>
+            </a:r>
+            <a:r>
+              <a:rPr lang="zh-TW" altLang="en-US" sz="2000" dirty="0"/>
+              <a:t> </a:t>
+            </a:r>
+            <a:r>
+              <a:rPr lang="en-US" altLang="zh-TW" sz="2000" dirty="0"/>
+              <a:t>RX</a:t>
+            </a:r>
+            <a:r>
+              <a:rPr lang="zh-TW" altLang="en-US" sz="2000" dirty="0"/>
+              <a:t> 使用</a:t>
+            </a:r>
+            <a:r>
+              <a:rPr lang="en-US" altLang="zh-TW" sz="2000" dirty="0"/>
+              <a:t>FIFO</a:t>
+            </a:r>
+            <a:r>
+              <a:rPr lang="zh-TW" altLang="en-US" sz="2000" dirty="0"/>
+              <a:t> 架構、這個</a:t>
+            </a:r>
+            <a:r>
+              <a:rPr lang="en-US" altLang="zh-TW" sz="2000" dirty="0"/>
+              <a:t>FIFO</a:t>
+            </a:r>
+            <a:r>
+              <a:rPr lang="zh-TW" altLang="en-US" sz="2000" dirty="0"/>
+              <a:t>架構是被封裝過。</a:t>
+            </a:r>
+            <a:endParaRPr lang="en-US" altLang="zh-TW" sz="2000" dirty="0"/>
+          </a:p>
+          <a:p>
+            <a:pPr marL="514350" indent="-514350">
+              <a:buAutoNum type="arabicPeriod"/>
             </a:pPr>
-            <a:r>
-              <a:rPr lang="zh-TW" altLang="en-US" sz="2400" dirty="0"/>
-              <a:t>收完</a:t>
-            </a:r>
-            <a:r>
-              <a:rPr lang="en-US" altLang="zh-TW" sz="2400" dirty="0"/>
-              <a:t>Sensor Data</a:t>
-            </a:r>
-            <a:r>
-              <a:rPr lang="zh-TW" altLang="en-US" sz="2400" dirty="0"/>
-              <a:t>後，顯示資料卻有漏東漏西</a:t>
-            </a:r>
-            <a:endParaRPr lang="en-US" altLang="zh-TW" sz="2400" dirty="0"/>
-          </a:p>
-          <a:p>
-            <a:pPr marL="0" indent="0">
-              <a:buNone/>
+            <a:endParaRPr lang="en-US" altLang="zh-TW" sz="2000" dirty="0"/>
+          </a:p>
+          <a:p>
+            <a:pPr marL="514350" indent="-514350">
+              <a:buAutoNum type="arabicPeriod"/>
             </a:pPr>
-            <a:r>
-              <a:rPr lang="en-US" altLang="zh-TW" sz="2400" dirty="0"/>
-              <a:t>Source</a:t>
-            </a:r>
-          </a:p>
-          <a:p>
-            <a:pPr marL="0" indent="0">
-              <a:buNone/>
+            <a:endParaRPr lang="en-US" altLang="zh-TW" sz="2000" dirty="0"/>
+          </a:p>
+          <a:p>
+            <a:pPr marL="514350" indent="-514350">
+              <a:buAutoNum type="arabicPeriod"/>
             </a:pPr>
             <a:r>
-              <a:rPr lang="en-US" altLang="zh-TW" sz="2400" dirty="0"/>
-              <a:t>1 . </a:t>
-            </a:r>
-            <a:r>
-              <a:rPr lang="zh-TW" altLang="en-US" sz="2400" dirty="0"/>
-              <a:t> 硬體觸發設定 </a:t>
-            </a:r>
-            <a:r>
-              <a:rPr lang="en-US" altLang="zh-TW" sz="2400" dirty="0"/>
-              <a:t>: 4Bytes -&gt; 1Bytes</a:t>
-            </a:r>
-          </a:p>
-          <a:p>
-            <a:pPr marL="0" indent="0">
-              <a:buNone/>
-            </a:pPr>
-            <a:r>
-              <a:rPr lang="en-US" altLang="zh-TW" sz="2400" dirty="0"/>
-              <a:t>2. </a:t>
-            </a:r>
-            <a:r>
-              <a:rPr lang="zh-TW" altLang="en-US" sz="2400" dirty="0"/>
-              <a:t> </a:t>
-            </a:r>
-            <a:r>
-              <a:rPr lang="zh-TW" altLang="en-US" sz="2400" dirty="0">
-                <a:solidFill>
-                  <a:srgbClr val="FF0000"/>
-                </a:solidFill>
-              </a:rPr>
-              <a:t>解除中斷</a:t>
-            </a:r>
-            <a:r>
-              <a:rPr lang="en-US" altLang="zh-TW" sz="2400" dirty="0">
-                <a:solidFill>
-                  <a:srgbClr val="FF0000"/>
-                </a:solidFill>
-              </a:rPr>
-              <a:t>Event </a:t>
-            </a:r>
-            <a:r>
-              <a:rPr lang="en-US" altLang="zh-TW" sz="2400" dirty="0" err="1">
-                <a:solidFill>
-                  <a:srgbClr val="FF0000"/>
-                </a:solidFill>
-              </a:rPr>
-              <a:t>regestier</a:t>
-            </a:r>
-            <a:r>
-              <a:rPr lang="zh-TW" altLang="en-US" sz="2400" dirty="0">
-                <a:solidFill>
-                  <a:srgbClr val="FF0000"/>
-                </a:solidFill>
-              </a:rPr>
-              <a:t>在</a:t>
-            </a:r>
-            <a:r>
-              <a:rPr lang="en-US" altLang="zh-TW" sz="2400" dirty="0">
-                <a:solidFill>
-                  <a:srgbClr val="FF0000"/>
-                </a:solidFill>
-              </a:rPr>
-              <a:t>Code</a:t>
-            </a:r>
-            <a:r>
-              <a:rPr lang="zh-TW" altLang="en-US" sz="2400" dirty="0">
-                <a:solidFill>
-                  <a:srgbClr val="FF0000"/>
-                </a:solidFill>
-              </a:rPr>
-              <a:t>中的位置</a:t>
-            </a:r>
-            <a:endParaRPr lang="en-US" altLang="zh-TW" sz="2400" dirty="0">
-              <a:solidFill>
-                <a:srgbClr val="FF0000"/>
-              </a:solidFill>
-            </a:endParaRPr>
-          </a:p>
-          <a:p>
-            <a:pPr marL="0" indent="0">
-              <a:buNone/>
-            </a:pPr>
-            <a:endParaRPr lang="zh-TW" altLang="en-US" dirty="0"/>
+              <a:rPr lang="en-US" altLang="zh-TW" sz="2000" dirty="0"/>
+              <a:t>UART RX</a:t>
+            </a:r>
+            <a:r>
+              <a:rPr lang="zh-TW" altLang="en-US" sz="2000" dirty="0"/>
+              <a:t> 中斷硬體設計</a:t>
+            </a:r>
           </a:p>
         </p:txBody>
       </p:sp>
     </p:spTree>
     <p:extLst>
       <p:ext uri="{BB962C8B-B14F-4D97-AF65-F5344CB8AC3E}">
-        <p14:creationId xmlns:p14="http://schemas.microsoft.com/office/powerpoint/2010/main" val="719165155"/>
+        <p14:creationId xmlns:p14="http://schemas.microsoft.com/office/powerpoint/2010/main" val="3743749783"/>
       </p:ext>
     </p:extLst>
   </p:cSld>
@@ -18647,7 +18831,7 @@
           <p:cNvPr id="2" name="標題 1">
             <a:extLst>
               <a:ext uri="{FF2B5EF4-FFF2-40B4-BE49-F238E27FC236}">
-                <a16:creationId xmlns:a16="http://schemas.microsoft.com/office/drawing/2014/main" id="{A90C3E7E-AE4E-452E-A66F-A6DA326A606E}"/>
+                <a16:creationId xmlns:a16="http://schemas.microsoft.com/office/drawing/2014/main" id="{FEDEBC06-C75E-5899-979E-C29912B4A68E}"/>
               </a:ext>
             </a:extLst>
           </p:cNvPr>
@@ -18665,8 +18849,8 @@
           <a:p>
             <a:pPr algn="ctr"/>
             <a:r>
-              <a:rPr lang="zh-TW" altLang="en-US" sz="4400" dirty="0"/>
-              <a:t>最接近顏色</a:t>
+              <a:rPr lang="en-US" altLang="zh-TW" dirty="0"/>
+              <a:t>UART RX Setting</a:t>
             </a:r>
             <a:endParaRPr lang="zh-TW" altLang="en-US" dirty="0"/>
           </a:p>
@@ -18677,7 +18861,7 @@
           <p:cNvPr id="3" name="內容版面配置區 2">
             <a:extLst>
               <a:ext uri="{FF2B5EF4-FFF2-40B4-BE49-F238E27FC236}">
-                <a16:creationId xmlns:a16="http://schemas.microsoft.com/office/drawing/2014/main" id="{2270879B-7395-4917-86B4-47F549C5A985}"/>
+                <a16:creationId xmlns:a16="http://schemas.microsoft.com/office/drawing/2014/main" id="{D33F5725-65BC-FF79-0EEB-A34DF7904932}"/>
               </a:ext>
             </a:extLst>
           </p:cNvPr>
@@ -18690,96 +18874,66 @@
         </p:nvSpPr>
         <p:spPr/>
         <p:txBody>
-          <a:bodyPr/>
+          <a:bodyPr>
+            <a:normAutofit/>
+          </a:bodyPr>
           <a:lstStyle/>
           <a:p>
             <a:pPr marL="0" indent="0">
               <a:buNone/>
             </a:pPr>
             <a:r>
-              <a:rPr lang="en-US" altLang="zh-TW" dirty="0"/>
-              <a:t>Root Cause :</a:t>
-            </a:r>
-          </a:p>
-          <a:p>
-            <a:pPr marL="514350" indent="-514350">
-              <a:buAutoNum type="arabicPeriod"/>
-            </a:pPr>
-            <a:r>
-              <a:rPr lang="en-US" altLang="zh-TW" dirty="0"/>
-              <a:t>Sensor </a:t>
-            </a:r>
-            <a:r>
-              <a:rPr lang="zh-TW" altLang="en-US" dirty="0"/>
-              <a:t>傳輸的顏色，並不一定落在</a:t>
-            </a:r>
-            <a:r>
-              <a:rPr lang="en-US" altLang="zh-TW" dirty="0"/>
-              <a:t>USI</a:t>
-            </a:r>
-            <a:r>
-              <a:rPr lang="zh-TW" altLang="en-US" dirty="0"/>
-              <a:t>所定義的顏色，因此需要找到最接近的顏色。</a:t>
-            </a:r>
-            <a:endParaRPr lang="en-US" altLang="zh-TW" dirty="0"/>
-          </a:p>
-          <a:p>
-            <a:pPr marL="514350" indent="-514350">
-              <a:buAutoNum type="arabicPeriod"/>
-            </a:pPr>
-            <a:endParaRPr lang="en-US" altLang="zh-TW" dirty="0"/>
-          </a:p>
-          <a:p>
-            <a:pPr marL="0" indent="0">
-              <a:buNone/>
-            </a:pPr>
-            <a:r>
-              <a:rPr lang="en-US" altLang="zh-TW" dirty="0"/>
-              <a:t>Solve :</a:t>
-            </a:r>
-          </a:p>
-          <a:p>
-            <a:pPr marL="0" indent="0">
-              <a:buNone/>
-            </a:pPr>
-            <a:r>
-              <a:rPr lang="en-US" altLang="zh-TW" dirty="0"/>
-              <a:t>	1. </a:t>
-            </a:r>
-            <a:r>
-              <a:rPr lang="zh-TW" altLang="en-US" dirty="0"/>
-              <a:t>顏色距離定義</a:t>
-            </a:r>
-            <a:endParaRPr lang="en-US" altLang="zh-TW" dirty="0"/>
-          </a:p>
-          <a:p>
-            <a:pPr marL="0" indent="0">
-              <a:buNone/>
-            </a:pPr>
-            <a:r>
-              <a:rPr lang="en-US" altLang="zh-TW" dirty="0"/>
-              <a:t>	2.  </a:t>
-            </a:r>
-            <a:r>
-              <a:rPr lang="zh-TW" altLang="en-US" dirty="0"/>
-              <a:t>使用</a:t>
-            </a:r>
-            <a:r>
-              <a:rPr lang="en-US" altLang="zh-TW" dirty="0" err="1"/>
-              <a:t>matlab</a:t>
-            </a:r>
-            <a:r>
-              <a:rPr lang="zh-TW" altLang="en-US" dirty="0"/>
-              <a:t>來加速驗證速度</a:t>
-            </a:r>
-            <a:endParaRPr lang="en-US" altLang="zh-TW" dirty="0"/>
+              <a:rPr lang="zh-TW" altLang="en-US" sz="2000" dirty="0"/>
+              <a:t>總結 </a:t>
+            </a:r>
+            <a:r>
+              <a:rPr lang="en-US" altLang="zh-TW" sz="2000" dirty="0"/>
+              <a:t>:</a:t>
+            </a:r>
+            <a:r>
+              <a:rPr lang="zh-TW" altLang="en-US" sz="2000" dirty="0"/>
+              <a:t> </a:t>
+            </a:r>
+            <a:r>
+              <a:rPr lang="en-US" altLang="zh-TW" sz="2000" dirty="0"/>
+              <a:t> </a:t>
+            </a:r>
+            <a:r>
+              <a:rPr lang="zh-TW" altLang="en-US" sz="2000" dirty="0"/>
+              <a:t>由於使用情況是使用者隨時可能會去觸動後發</a:t>
+            </a:r>
+            <a:r>
+              <a:rPr lang="en-US" altLang="zh-TW" sz="2000" dirty="0"/>
+              <a:t>Sensor</a:t>
+            </a:r>
+            <a:r>
+              <a:rPr lang="zh-TW" altLang="en-US" sz="2000" dirty="0"/>
+              <a:t>、筆本身還要</a:t>
+            </a:r>
+            <a:r>
+              <a:rPr lang="en-US" altLang="zh-TW" sz="2000" dirty="0"/>
+              <a:t>Decode </a:t>
+            </a:r>
+            <a:r>
+              <a:rPr lang="zh-TW" altLang="en-US" sz="2000" dirty="0"/>
+              <a:t>訊號，因此中斷是最佳方法，</a:t>
+            </a:r>
+            <a:r>
+              <a:rPr lang="en-US" altLang="zh-TW" sz="2000" dirty="0"/>
+              <a:t>Polling </a:t>
+            </a:r>
+            <a:r>
+              <a:rPr lang="zh-TW" altLang="en-US" sz="2000" dirty="0"/>
+              <a:t>去偵測就不是好方法並且耗電</a:t>
+            </a:r>
+            <a:endParaRPr lang="en-US" altLang="zh-TW" sz="2000" dirty="0"/>
           </a:p>
         </p:txBody>
       </p:sp>
     </p:spTree>
     <p:extLst>
       <p:ext uri="{BB962C8B-B14F-4D97-AF65-F5344CB8AC3E}">
-        <p14:creationId xmlns:p14="http://schemas.microsoft.com/office/powerpoint/2010/main" val="2172983373"/>
+        <p14:creationId xmlns:p14="http://schemas.microsoft.com/office/powerpoint/2010/main" val="1764172780"/>
       </p:ext>
     </p:extLst>
   </p:cSld>
@@ -18811,7 +18965,7 @@
           <p:cNvPr id="2" name="標題 1">
             <a:extLst>
               <a:ext uri="{FF2B5EF4-FFF2-40B4-BE49-F238E27FC236}">
-                <a16:creationId xmlns:a16="http://schemas.microsoft.com/office/drawing/2014/main" id="{77C37F21-5DBA-B401-7D71-7CFB5E6E6C5D}"/>
+                <a16:creationId xmlns:a16="http://schemas.microsoft.com/office/drawing/2014/main" id="{DCAF803D-3CAB-3E11-8A90-4D5310A3A5EA}"/>
               </a:ext>
             </a:extLst>
           </p:cNvPr>
@@ -18829,21 +18983,10 @@
           <a:p>
             <a:pPr algn="ctr"/>
             <a:r>
-              <a:rPr lang="zh-TW" altLang="en-US" dirty="0"/>
-              <a:t> </a:t>
-            </a:r>
-            <a:r>
-              <a:rPr lang="en-US" altLang="zh-TW" dirty="0" err="1"/>
-              <a:t>Matlab</a:t>
-            </a:r>
-            <a:r>
-              <a:rPr lang="en-US" altLang="zh-TW" dirty="0"/>
-              <a:t> </a:t>
-            </a:r>
-            <a:r>
-              <a:rPr lang="zh-TW" altLang="en-US" dirty="0"/>
-              <a:t>驗證</a:t>
-            </a:r>
+              <a:rPr lang="en-US" altLang="zh-TW" dirty="0"/>
+              <a:t>UART RX Setting</a:t>
+            </a:r>
+            <a:endParaRPr lang="zh-TW" altLang="en-US" dirty="0"/>
           </a:p>
         </p:txBody>
       </p:sp>
@@ -18852,7 +18995,7 @@
           <p:cNvPr id="3" name="內容版面配置區 2">
             <a:extLst>
               <a:ext uri="{FF2B5EF4-FFF2-40B4-BE49-F238E27FC236}">
-                <a16:creationId xmlns:a16="http://schemas.microsoft.com/office/drawing/2014/main" id="{534E79D0-3692-7581-7815-5DEF93BC5DAC}"/>
+                <a16:creationId xmlns:a16="http://schemas.microsoft.com/office/drawing/2014/main" id="{3B1B8A68-518A-9A03-2325-0016A63D6547}"/>
               </a:ext>
             </a:extLst>
           </p:cNvPr>
@@ -18872,28 +19015,144 @@
               <a:buNone/>
             </a:pPr>
             <a:r>
-              <a:rPr lang="en-US" altLang="zh-TW" dirty="0"/>
-              <a:t>Use </a:t>
-            </a:r>
-            <a:r>
-              <a:rPr lang="en-US" altLang="zh-TW" dirty="0" err="1"/>
-              <a:t>Matalb</a:t>
-            </a:r>
-            <a:r>
-              <a:rPr lang="en-US" altLang="zh-TW" dirty="0"/>
-              <a:t> APP</a:t>
-            </a:r>
-            <a:r>
-              <a:rPr lang="zh-TW" altLang="en-US" dirty="0"/>
-              <a:t> 寫的</a:t>
-            </a:r>
+              <a:rPr lang="zh-TW" altLang="en-US" dirty="0">
+                <a:solidFill>
+                  <a:schemeClr val="accent1"/>
+                </a:solidFill>
+              </a:rPr>
+              <a:t>過程中遇到最大問題 </a:t>
+            </a:r>
+            <a:r>
+              <a:rPr lang="en-US" altLang="zh-TW" dirty="0">
+                <a:solidFill>
+                  <a:schemeClr val="accent1"/>
+                </a:solidFill>
+              </a:rPr>
+              <a:t>: </a:t>
+            </a:r>
+          </a:p>
+          <a:p>
+            <a:pPr marL="0" indent="0">
+              <a:buNone/>
+            </a:pPr>
+            <a:r>
+              <a:rPr lang="zh-TW" altLang="en-US" sz="2400" dirty="0"/>
+              <a:t>收完</a:t>
+            </a:r>
+            <a:r>
+              <a:rPr lang="en-US" altLang="zh-TW" sz="2400" dirty="0"/>
+              <a:t>Sensor Data</a:t>
+            </a:r>
+            <a:r>
+              <a:rPr lang="zh-TW" altLang="en-US" sz="2400" dirty="0"/>
+              <a:t>後，顯示資料卻有漏東漏西</a:t>
+            </a:r>
+            <a:endParaRPr lang="en-US" altLang="zh-TW" sz="2400" dirty="0"/>
+          </a:p>
+          <a:p>
+            <a:pPr marL="0" indent="0">
+              <a:buNone/>
+            </a:pPr>
+            <a:r>
+              <a:rPr lang="en-US" altLang="zh-TW" sz="2400" dirty="0"/>
+              <a:t>Source</a:t>
+            </a:r>
+          </a:p>
+          <a:p>
+            <a:pPr marL="0" indent="0">
+              <a:buNone/>
+            </a:pPr>
+            <a:r>
+              <a:rPr lang="en-US" altLang="zh-TW" sz="2400" dirty="0"/>
+              <a:t>1 . </a:t>
+            </a:r>
+            <a:r>
+              <a:rPr lang="zh-TW" altLang="en-US" sz="2400" dirty="0"/>
+              <a:t> 硬體觸發設定 </a:t>
+            </a:r>
+            <a:r>
+              <a:rPr lang="en-US" altLang="zh-TW" sz="2400" dirty="0"/>
+              <a:t>: 4Bytes -&gt; 1Bytes</a:t>
+            </a:r>
+          </a:p>
+          <a:p>
+            <a:pPr marL="0" indent="0">
+              <a:buNone/>
+            </a:pPr>
+            <a:r>
+              <a:rPr lang="en-US" altLang="zh-TW" sz="2400" dirty="0"/>
+              <a:t>2. </a:t>
+            </a:r>
+            <a:r>
+              <a:rPr lang="zh-TW" altLang="en-US" sz="2400" dirty="0"/>
+              <a:t> </a:t>
+            </a:r>
+            <a:r>
+              <a:rPr lang="zh-TW" altLang="en-US" sz="2400" dirty="0">
+                <a:solidFill>
+                  <a:srgbClr val="FF0000"/>
+                </a:solidFill>
+              </a:rPr>
+              <a:t>解除中斷</a:t>
+            </a:r>
+            <a:r>
+              <a:rPr lang="en-US" altLang="zh-TW" sz="2400" dirty="0">
+                <a:solidFill>
+                  <a:srgbClr val="FF0000"/>
+                </a:solidFill>
+              </a:rPr>
+              <a:t>Event </a:t>
+            </a:r>
+            <a:r>
+              <a:rPr lang="en-US" altLang="zh-TW" sz="2400" dirty="0" err="1">
+                <a:solidFill>
+                  <a:srgbClr val="FF0000"/>
+                </a:solidFill>
+              </a:rPr>
+              <a:t>regestier</a:t>
+            </a:r>
+            <a:r>
+              <a:rPr lang="zh-TW" altLang="en-US" sz="2400" dirty="0">
+                <a:solidFill>
+                  <a:srgbClr val="FF0000"/>
+                </a:solidFill>
+              </a:rPr>
+              <a:t>在</a:t>
+            </a:r>
+            <a:r>
+              <a:rPr lang="en-US" altLang="zh-TW" sz="2400" dirty="0">
+                <a:solidFill>
+                  <a:srgbClr val="FF0000"/>
+                </a:solidFill>
+              </a:rPr>
+              <a:t>Code</a:t>
+            </a:r>
+            <a:r>
+              <a:rPr lang="zh-TW" altLang="en-US" sz="2400" dirty="0">
+                <a:solidFill>
+                  <a:srgbClr val="FF0000"/>
+                </a:solidFill>
+              </a:rPr>
+              <a:t>中的位置</a:t>
+            </a:r>
+            <a:endParaRPr lang="en-US" altLang="zh-TW" sz="2400" dirty="0">
+              <a:solidFill>
+                <a:srgbClr val="FF0000"/>
+              </a:solidFill>
+            </a:endParaRPr>
+          </a:p>
+          <a:p>
+            <a:pPr marL="0" indent="0">
+              <a:buNone/>
+            </a:pPr>
+            <a:endParaRPr lang="zh-TW" altLang="en-US" dirty="0"/>
           </a:p>
         </p:txBody>
       </p:sp>
     </p:spTree>
     <p:extLst>
       <p:ext uri="{BB962C8B-B14F-4D97-AF65-F5344CB8AC3E}">
-        <p14:creationId xmlns:p14="http://schemas.microsoft.com/office/powerpoint/2010/main" val="3411917283"/>
+        <p14:creationId xmlns:p14="http://schemas.microsoft.com/office/powerpoint/2010/main" val="719165155"/>
       </p:ext>
     </p:extLst>
   </p:cSld>
@@ -18925,6 +19184,284 @@
           <p:cNvPr id="2" name="標題 1">
             <a:extLst>
               <a:ext uri="{FF2B5EF4-FFF2-40B4-BE49-F238E27FC236}">
+                <a16:creationId xmlns:a16="http://schemas.microsoft.com/office/drawing/2014/main" id="{A90C3E7E-AE4E-452E-A66F-A6DA326A606E}"/>
+              </a:ext>
+            </a:extLst>
+          </p:cNvPr>
+          <p:cNvSpPr>
+            <a:spLocks noGrp="1"/>
+          </p:cNvSpPr>
+          <p:nvPr>
+            <p:ph type="title"/>
+          </p:nvPr>
+        </p:nvSpPr>
+        <p:spPr/>
+        <p:txBody>
+          <a:bodyPr/>
+          <a:lstStyle/>
+          <a:p>
+            <a:pPr algn="ctr"/>
+            <a:r>
+              <a:rPr lang="zh-TW" altLang="en-US" sz="4400" dirty="0"/>
+              <a:t>最接近顏色</a:t>
+            </a:r>
+            <a:endParaRPr lang="zh-TW" altLang="en-US" dirty="0"/>
+          </a:p>
+        </p:txBody>
+      </p:sp>
+      <p:sp>
+        <p:nvSpPr>
+          <p:cNvPr id="3" name="內容版面配置區 2">
+            <a:extLst>
+              <a:ext uri="{FF2B5EF4-FFF2-40B4-BE49-F238E27FC236}">
+                <a16:creationId xmlns:a16="http://schemas.microsoft.com/office/drawing/2014/main" id="{2270879B-7395-4917-86B4-47F549C5A985}"/>
+              </a:ext>
+            </a:extLst>
+          </p:cNvPr>
+          <p:cNvSpPr>
+            <a:spLocks noGrp="1"/>
+          </p:cNvSpPr>
+          <p:nvPr>
+            <p:ph idx="1"/>
+          </p:nvPr>
+        </p:nvSpPr>
+        <p:spPr/>
+        <p:txBody>
+          <a:bodyPr/>
+          <a:lstStyle/>
+          <a:p>
+            <a:pPr marL="0" indent="0">
+              <a:buNone/>
+            </a:pPr>
+            <a:r>
+              <a:rPr lang="en-US" altLang="zh-TW" dirty="0"/>
+              <a:t>Root Cause :</a:t>
+            </a:r>
+          </a:p>
+          <a:p>
+            <a:pPr marL="514350" indent="-514350">
+              <a:buAutoNum type="arabicPeriod"/>
+            </a:pPr>
+            <a:r>
+              <a:rPr lang="en-US" altLang="zh-TW" dirty="0"/>
+              <a:t>Sensor </a:t>
+            </a:r>
+            <a:r>
+              <a:rPr lang="zh-TW" altLang="en-US" dirty="0"/>
+              <a:t>傳輸的顏色，並不一定落在</a:t>
+            </a:r>
+            <a:r>
+              <a:rPr lang="en-US" altLang="zh-TW" dirty="0"/>
+              <a:t>USI</a:t>
+            </a:r>
+            <a:r>
+              <a:rPr lang="zh-TW" altLang="en-US" dirty="0"/>
+              <a:t>所定義的顏色，因此需要找到最接近的顏色。</a:t>
+            </a:r>
+            <a:endParaRPr lang="en-US" altLang="zh-TW" dirty="0"/>
+          </a:p>
+          <a:p>
+            <a:pPr marL="514350" indent="-514350">
+              <a:buAutoNum type="arabicPeriod"/>
+            </a:pPr>
+            <a:endParaRPr lang="en-US" altLang="zh-TW" dirty="0"/>
+          </a:p>
+          <a:p>
+            <a:pPr marL="0" indent="0">
+              <a:buNone/>
+            </a:pPr>
+            <a:r>
+              <a:rPr lang="en-US" altLang="zh-TW" dirty="0"/>
+              <a:t>Solve :</a:t>
+            </a:r>
+          </a:p>
+          <a:p>
+            <a:pPr marL="0" indent="0">
+              <a:buNone/>
+            </a:pPr>
+            <a:r>
+              <a:rPr lang="en-US" altLang="zh-TW" dirty="0"/>
+              <a:t>	1. </a:t>
+            </a:r>
+            <a:r>
+              <a:rPr lang="zh-TW" altLang="en-US" dirty="0"/>
+              <a:t>顏色距離定義</a:t>
+            </a:r>
+            <a:endParaRPr lang="en-US" altLang="zh-TW" dirty="0"/>
+          </a:p>
+          <a:p>
+            <a:pPr marL="0" indent="0">
+              <a:buNone/>
+            </a:pPr>
+            <a:r>
+              <a:rPr lang="en-US" altLang="zh-TW" dirty="0"/>
+              <a:t>	2.  </a:t>
+            </a:r>
+            <a:r>
+              <a:rPr lang="zh-TW" altLang="en-US" dirty="0"/>
+              <a:t>使用</a:t>
+            </a:r>
+            <a:r>
+              <a:rPr lang="en-US" altLang="zh-TW" dirty="0" err="1"/>
+              <a:t>matlab</a:t>
+            </a:r>
+            <a:r>
+              <a:rPr lang="zh-TW" altLang="en-US" dirty="0"/>
+              <a:t>來加速驗證速度</a:t>
+            </a:r>
+            <a:endParaRPr lang="en-US" altLang="zh-TW" dirty="0"/>
+          </a:p>
+        </p:txBody>
+      </p:sp>
+    </p:spTree>
+    <p:extLst>
+      <p:ext uri="{BB962C8B-B14F-4D97-AF65-F5344CB8AC3E}">
+        <p14:creationId xmlns:p14="http://schemas.microsoft.com/office/powerpoint/2010/main" val="2172983373"/>
+      </p:ext>
+    </p:extLst>
+  </p:cSld>
+  <p:clrMapOvr>
+    <a:masterClrMapping/>
+  </p:clrMapOvr>
+</p:sld>
+</file>
+
+<file path=ppt/slides/slide44.xml><?xml version="1.0" encoding="utf-8"?>
+<p:sld xmlns:a="http://schemas.openxmlformats.org/drawingml/2006/main" xmlns:r="http://schemas.openxmlformats.org/officeDocument/2006/relationships" xmlns:p="http://schemas.openxmlformats.org/presentationml/2006/main">
+  <p:cSld>
+    <p:spTree>
+      <p:nvGrpSpPr>
+        <p:cNvPr id="1" name=""/>
+        <p:cNvGrpSpPr/>
+        <p:nvPr/>
+      </p:nvGrpSpPr>
+      <p:grpSpPr>
+        <a:xfrm>
+          <a:off x="0" y="0"/>
+          <a:ext cx="0" cy="0"/>
+          <a:chOff x="0" y="0"/>
+          <a:chExt cx="0" cy="0"/>
+        </a:xfrm>
+      </p:grpSpPr>
+      <p:sp>
+        <p:nvSpPr>
+          <p:cNvPr id="2" name="標題 1">
+            <a:extLst>
+              <a:ext uri="{FF2B5EF4-FFF2-40B4-BE49-F238E27FC236}">
+                <a16:creationId xmlns:a16="http://schemas.microsoft.com/office/drawing/2014/main" id="{77C37F21-5DBA-B401-7D71-7CFB5E6E6C5D}"/>
+              </a:ext>
+            </a:extLst>
+          </p:cNvPr>
+          <p:cNvSpPr>
+            <a:spLocks noGrp="1"/>
+          </p:cNvSpPr>
+          <p:nvPr>
+            <p:ph type="title"/>
+          </p:nvPr>
+        </p:nvSpPr>
+        <p:spPr/>
+        <p:txBody>
+          <a:bodyPr/>
+          <a:lstStyle/>
+          <a:p>
+            <a:pPr algn="ctr"/>
+            <a:r>
+              <a:rPr lang="zh-TW" altLang="en-US" dirty="0"/>
+              <a:t> </a:t>
+            </a:r>
+            <a:r>
+              <a:rPr lang="en-US" altLang="zh-TW" dirty="0" err="1"/>
+              <a:t>Matlab</a:t>
+            </a:r>
+            <a:r>
+              <a:rPr lang="en-US" altLang="zh-TW" dirty="0"/>
+              <a:t> </a:t>
+            </a:r>
+            <a:r>
+              <a:rPr lang="zh-TW" altLang="en-US" dirty="0"/>
+              <a:t>驗證</a:t>
+            </a:r>
+          </a:p>
+        </p:txBody>
+      </p:sp>
+      <p:sp>
+        <p:nvSpPr>
+          <p:cNvPr id="3" name="內容版面配置區 2">
+            <a:extLst>
+              <a:ext uri="{FF2B5EF4-FFF2-40B4-BE49-F238E27FC236}">
+                <a16:creationId xmlns:a16="http://schemas.microsoft.com/office/drawing/2014/main" id="{534E79D0-3692-7581-7815-5DEF93BC5DAC}"/>
+              </a:ext>
+            </a:extLst>
+          </p:cNvPr>
+          <p:cNvSpPr>
+            <a:spLocks noGrp="1"/>
+          </p:cNvSpPr>
+          <p:nvPr>
+            <p:ph idx="1"/>
+          </p:nvPr>
+        </p:nvSpPr>
+        <p:spPr/>
+        <p:txBody>
+          <a:bodyPr/>
+          <a:lstStyle/>
+          <a:p>
+            <a:pPr marL="0" indent="0">
+              <a:buNone/>
+            </a:pPr>
+            <a:r>
+              <a:rPr lang="en-US" altLang="zh-TW" dirty="0"/>
+              <a:t>Use </a:t>
+            </a:r>
+            <a:r>
+              <a:rPr lang="en-US" altLang="zh-TW" dirty="0" err="1"/>
+              <a:t>Matalb</a:t>
+            </a:r>
+            <a:r>
+              <a:rPr lang="en-US" altLang="zh-TW" dirty="0"/>
+              <a:t> APP</a:t>
+            </a:r>
+            <a:r>
+              <a:rPr lang="zh-TW" altLang="en-US" dirty="0"/>
+              <a:t> 寫的</a:t>
+            </a:r>
+          </a:p>
+        </p:txBody>
+      </p:sp>
+    </p:spTree>
+    <p:extLst>
+      <p:ext uri="{BB962C8B-B14F-4D97-AF65-F5344CB8AC3E}">
+        <p14:creationId xmlns:p14="http://schemas.microsoft.com/office/powerpoint/2010/main" val="3411917283"/>
+      </p:ext>
+    </p:extLst>
+  </p:cSld>
+  <p:clrMapOvr>
+    <a:masterClrMapping/>
+  </p:clrMapOvr>
+</p:sld>
+</file>
+
+<file path=ppt/slides/slide45.xml><?xml version="1.0" encoding="utf-8"?>
+<p:sld xmlns:a="http://schemas.openxmlformats.org/drawingml/2006/main" xmlns:r="http://schemas.openxmlformats.org/officeDocument/2006/relationships" xmlns:p="http://schemas.openxmlformats.org/presentationml/2006/main">
+  <p:cSld>
+    <p:spTree>
+      <p:nvGrpSpPr>
+        <p:cNvPr id="1" name=""/>
+        <p:cNvGrpSpPr/>
+        <p:nvPr/>
+      </p:nvGrpSpPr>
+      <p:grpSpPr>
+        <a:xfrm>
+          <a:off x="0" y="0"/>
+          <a:ext cx="0" cy="0"/>
+          <a:chOff x="0" y="0"/>
+          <a:chExt cx="0" cy="0"/>
+        </a:xfrm>
+      </p:grpSpPr>
+      <p:sp>
+        <p:nvSpPr>
+          <p:cNvPr id="2" name="標題 1">
+            <a:extLst>
+              <a:ext uri="{FF2B5EF4-FFF2-40B4-BE49-F238E27FC236}">
                 <a16:creationId xmlns:a16="http://schemas.microsoft.com/office/drawing/2014/main" id="{F0C4E827-8FA5-D200-CB63-931E7FB72A01}"/>
               </a:ext>
             </a:extLst>
@@ -19094,7 +19631,7 @@
 </p:sld>
 </file>
 
-<file path=ppt/slides/slide44.xml><?xml version="1.0" encoding="utf-8"?>
+<file path=ppt/slides/slide46.xml><?xml version="1.0" encoding="utf-8"?>
 <p:sld xmlns:a="http://schemas.openxmlformats.org/drawingml/2006/main" xmlns:r="http://schemas.openxmlformats.org/officeDocument/2006/relationships" xmlns:p="http://schemas.openxmlformats.org/presentationml/2006/main">
   <p:cSld>
     <p:spTree>

</xml_diff>

<commit_message>
+ Add a page which How to find Slicer Mode in RX0 Decoder
</commit_message>
<xml_diff>
--- a/Project_Summary_pdf/Project_Summary.pptx
+++ b/Project_Summary_pdf/Project_Summary.pptx
@@ -5,7 +5,7 @@
     <p:sldMasterId id="2147483648" r:id="rId1"/>
   </p:sldMasterIdLst>
   <p:notesMasterIdLst>
-    <p:notesMasterId r:id="rId48"/>
+    <p:notesMasterId r:id="rId49"/>
   </p:notesMasterIdLst>
   <p:sldIdLst>
     <p:sldId id="256" r:id="rId2"/>
@@ -38,22 +38,23 @@
     <p:sldId id="285" r:id="rId29"/>
     <p:sldId id="286" r:id="rId30"/>
     <p:sldId id="881" r:id="rId31"/>
-    <p:sldId id="896" r:id="rId32"/>
-    <p:sldId id="895" r:id="rId33"/>
-    <p:sldId id="889" r:id="rId34"/>
-    <p:sldId id="890" r:id="rId35"/>
-    <p:sldId id="751" r:id="rId36"/>
-    <p:sldId id="882" r:id="rId37"/>
-    <p:sldId id="281" r:id="rId38"/>
-    <p:sldId id="257" r:id="rId39"/>
-    <p:sldId id="258" r:id="rId40"/>
-    <p:sldId id="260" r:id="rId41"/>
-    <p:sldId id="263" r:id="rId42"/>
-    <p:sldId id="264" r:id="rId43"/>
-    <p:sldId id="259" r:id="rId44"/>
-    <p:sldId id="265" r:id="rId45"/>
-    <p:sldId id="282" r:id="rId46"/>
-    <p:sldId id="885" r:id="rId47"/>
+    <p:sldId id="897" r:id="rId32"/>
+    <p:sldId id="896" r:id="rId33"/>
+    <p:sldId id="895" r:id="rId34"/>
+    <p:sldId id="889" r:id="rId35"/>
+    <p:sldId id="890" r:id="rId36"/>
+    <p:sldId id="751" r:id="rId37"/>
+    <p:sldId id="882" r:id="rId38"/>
+    <p:sldId id="281" r:id="rId39"/>
+    <p:sldId id="257" r:id="rId40"/>
+    <p:sldId id="258" r:id="rId41"/>
+    <p:sldId id="260" r:id="rId42"/>
+    <p:sldId id="263" r:id="rId43"/>
+    <p:sldId id="264" r:id="rId44"/>
+    <p:sldId id="259" r:id="rId45"/>
+    <p:sldId id="265" r:id="rId46"/>
+    <p:sldId id="282" r:id="rId47"/>
+    <p:sldId id="885" r:id="rId48"/>
   </p:sldIdLst>
   <p:sldSz cx="12192000" cy="6858000"/>
   <p:notesSz cx="6858000" cy="9144000"/>
@@ -203,6 +204,7 @@
             <p14:sldId id="285"/>
             <p14:sldId id="286"/>
             <p14:sldId id="881"/>
+            <p14:sldId id="897"/>
             <p14:sldId id="896"/>
             <p14:sldId id="895"/>
             <p14:sldId id="889"/>
@@ -1428,7 +1430,32 @@
             <a:pPr marL="228600" indent="-228600">
               <a:buAutoNum type="arabicPeriod"/>
             </a:pPr>
-            <a:endParaRPr lang="zh-TW" altLang="en-US" dirty="0"/>
+            <a:r>
+              <a:rPr lang="zh-TW" altLang="en-US"/>
+              <a:t>這裡可以強調原先學長們有提到某一路是不可行的。但是透過自身對數位電路理解，將其電路串起來可以</a:t>
+            </a:r>
+            <a:r>
+              <a:rPr lang="en-US" altLang="zh-TW"/>
+              <a:t>Work . “RX0 Decoder </a:t>
+            </a:r>
+            <a:r>
+              <a:rPr lang="zh-TW" altLang="en-US"/>
+              <a:t>無法搭配 </a:t>
+            </a:r>
+            <a:r>
+              <a:rPr lang="en-US" altLang="zh-TW"/>
+              <a:t>1st HPF filter + Schmitt Digital “</a:t>
+            </a:r>
+          </a:p>
+          <a:p>
+            <a:pPr marL="0" indent="0">
+              <a:buNone/>
+            </a:pPr>
+            <a:r>
+              <a:rPr lang="zh-TW" altLang="en-US"/>
+              <a:t>這裡可以講細一點，我是如何將電路串起來的</a:t>
+            </a:r>
+            <a:endParaRPr lang="en-US" altLang="zh-TW"/>
           </a:p>
         </p:txBody>
       </p:sp>
@@ -1512,7 +1539,46 @@
           <a:bodyPr/>
           <a:lstStyle/>
           <a:p>
-            <a:endParaRPr lang="zh-TW" altLang="en-US"/>
+            <a:pPr marL="0" marR="0" lvl="0" indent="0" algn="l" defTabSz="914400" rtl="0" eaLnBrk="1" fontAlgn="auto" latinLnBrk="0" hangingPunct="1">
+              <a:lnSpc>
+                <a:spcPct val="100000"/>
+              </a:lnSpc>
+              <a:spcBef>
+                <a:spcPts val="0"/>
+              </a:spcBef>
+              <a:spcAft>
+                <a:spcPts val="0"/>
+              </a:spcAft>
+              <a:buClrTx/>
+              <a:buSzTx/>
+              <a:buFontTx/>
+              <a:buNone/>
+              <a:tabLst/>
+              <a:defRPr/>
+            </a:pPr>
+            <a:r>
+              <a:rPr lang="zh-TW" altLang="en-US"/>
+              <a:t>針對第一點 </a:t>
+            </a:r>
+            <a:r>
+              <a:rPr lang="en-US" altLang="zh-TW"/>
+              <a:t>:</a:t>
+            </a:r>
+            <a:r>
+              <a:rPr lang="zh-TW" altLang="en-US"/>
+              <a:t>不經過任何訊號處理</a:t>
+            </a:r>
+            <a:endParaRPr lang="en-US" altLang="zh-TW"/>
+          </a:p>
+          <a:p>
+            <a:r>
+              <a:rPr lang="en-US" altLang="zh-TW"/>
+              <a:t>1. ADC </a:t>
+            </a:r>
+            <a:r>
+              <a:rPr lang="zh-TW" altLang="en-US"/>
+              <a:t>刻度少，是指說</a:t>
+            </a:r>
           </a:p>
         </p:txBody>
       </p:sp>
@@ -1533,7 +1599,7 @@
           <a:p>
             <a:fld id="{0116F853-F7F2-4239-A629-A213C1D67574}" type="slidenum">
               <a:rPr lang="zh-TW" altLang="en-US" smtClean="0"/>
-              <a:t>38</a:t>
+              <a:t>32</a:t>
             </a:fld>
             <a:endParaRPr lang="zh-TW" altLang="en-US"/>
           </a:p>
@@ -1542,7 +1608,7 @@
     </p:spTree>
     <p:extLst>
       <p:ext uri="{BB962C8B-B14F-4D97-AF65-F5344CB8AC3E}">
-        <p14:creationId xmlns:p14="http://schemas.microsoft.com/office/powerpoint/2010/main" val="2670570649"/>
+        <p14:creationId xmlns:p14="http://schemas.microsoft.com/office/powerpoint/2010/main" val="4159971274"/>
       </p:ext>
     </p:extLst>
   </p:cSld>
@@ -1596,71 +1662,7 @@
           <a:bodyPr/>
           <a:lstStyle/>
           <a:p>
-            <a:pPr marL="228600" indent="-228600">
-              <a:buAutoNum type="arabicPeriod"/>
-            </a:pPr>
-            <a:r>
-              <a:rPr lang="zh-TW" altLang="en-US"/>
-              <a:t>由於筆只使用</a:t>
-            </a:r>
-            <a:r>
-              <a:rPr lang="en-US" altLang="zh-TW"/>
-              <a:t>UART TX</a:t>
-            </a:r>
-            <a:r>
-              <a:rPr lang="zh-TW" altLang="en-US"/>
-              <a:t>來印出相關資訊、並沒有使用</a:t>
-            </a:r>
-            <a:r>
-              <a:rPr lang="en-US" altLang="zh-TW"/>
-              <a:t>RX</a:t>
-            </a:r>
-            <a:r>
-              <a:rPr lang="zh-TW" altLang="en-US"/>
-              <a:t>來接收其他</a:t>
-            </a:r>
-            <a:r>
-              <a:rPr lang="en-US" altLang="zh-TW"/>
-              <a:t>Sensor</a:t>
-            </a:r>
-            <a:r>
-              <a:rPr lang="zh-TW" altLang="en-US"/>
-              <a:t>的</a:t>
-            </a:r>
-            <a:r>
-              <a:rPr lang="en-US" altLang="zh-TW"/>
-              <a:t>information</a:t>
-            </a:r>
-            <a:r>
-              <a:rPr lang="zh-TW" altLang="en-US"/>
-              <a:t>。</a:t>
-            </a:r>
-            <a:endParaRPr lang="en-US" altLang="zh-TW"/>
-          </a:p>
-          <a:p>
-            <a:pPr marL="0" indent="0">
-              <a:buNone/>
-            </a:pPr>
-            <a:r>
-              <a:rPr lang="zh-TW" altLang="en-US"/>
-              <a:t>       </a:t>
-            </a:r>
-            <a:r>
-              <a:rPr lang="en-US" altLang="zh-TW"/>
-              <a:t>1.1 UART</a:t>
-            </a:r>
-            <a:r>
-              <a:rPr lang="zh-TW" altLang="en-US"/>
-              <a:t> </a:t>
-            </a:r>
-            <a:r>
-              <a:rPr lang="en-US" altLang="zh-TW"/>
-              <a:t>RX Setting</a:t>
-            </a:r>
-            <a:r>
-              <a:rPr lang="zh-TW" altLang="en-US"/>
-              <a:t>建立</a:t>
-            </a:r>
+            <a:endParaRPr lang="zh-TW" altLang="en-US"/>
           </a:p>
         </p:txBody>
       </p:sp>
@@ -1682,6 +1684,154 @@
             <a:fld id="{0116F853-F7F2-4239-A629-A213C1D67574}" type="slidenum">
               <a:rPr lang="zh-TW" altLang="en-US" smtClean="0"/>
               <a:t>39</a:t>
+            </a:fld>
+            <a:endParaRPr lang="zh-TW" altLang="en-US"/>
+          </a:p>
+        </p:txBody>
+      </p:sp>
+    </p:spTree>
+    <p:extLst>
+      <p:ext uri="{BB962C8B-B14F-4D97-AF65-F5344CB8AC3E}">
+        <p14:creationId xmlns:p14="http://schemas.microsoft.com/office/powerpoint/2010/main" val="2670570649"/>
+      </p:ext>
+    </p:extLst>
+  </p:cSld>
+  <p:clrMapOvr>
+    <a:masterClrMapping/>
+  </p:clrMapOvr>
+</p:notes>
+</file>
+
+<file path=ppt/notesSlides/notesSlide18.xml><?xml version="1.0" encoding="utf-8"?>
+<p:notes xmlns:a="http://schemas.openxmlformats.org/drawingml/2006/main" xmlns:r="http://schemas.openxmlformats.org/officeDocument/2006/relationships" xmlns:p="http://schemas.openxmlformats.org/presentationml/2006/main">
+  <p:cSld>
+    <p:spTree>
+      <p:nvGrpSpPr>
+        <p:cNvPr id="1" name=""/>
+        <p:cNvGrpSpPr/>
+        <p:nvPr/>
+      </p:nvGrpSpPr>
+      <p:grpSpPr>
+        <a:xfrm>
+          <a:off x="0" y="0"/>
+          <a:ext cx="0" cy="0"/>
+          <a:chOff x="0" y="0"/>
+          <a:chExt cx="0" cy="0"/>
+        </a:xfrm>
+      </p:grpSpPr>
+      <p:sp>
+        <p:nvSpPr>
+          <p:cNvPr id="2" name="投影片影像版面配置區 1"/>
+          <p:cNvSpPr>
+            <a:spLocks noGrp="1" noRot="1" noChangeAspect="1"/>
+          </p:cNvSpPr>
+          <p:nvPr>
+            <p:ph type="sldImg"/>
+          </p:nvPr>
+        </p:nvSpPr>
+        <p:spPr/>
+      </p:sp>
+      <p:sp>
+        <p:nvSpPr>
+          <p:cNvPr id="3" name="備忘稿版面配置區 2"/>
+          <p:cNvSpPr>
+            <a:spLocks noGrp="1"/>
+          </p:cNvSpPr>
+          <p:nvPr>
+            <p:ph type="body" idx="1"/>
+          </p:nvPr>
+        </p:nvSpPr>
+        <p:spPr/>
+        <p:txBody>
+          <a:bodyPr/>
+          <a:lstStyle/>
+          <a:p>
+            <a:pPr marL="228600" indent="-228600">
+              <a:buAutoNum type="arabicPeriod"/>
+            </a:pPr>
+            <a:r>
+              <a:rPr lang="zh-TW" altLang="en-US"/>
+              <a:t>由於筆只使用</a:t>
+            </a:r>
+            <a:r>
+              <a:rPr lang="en-US" altLang="zh-TW"/>
+              <a:t>UART TX</a:t>
+            </a:r>
+            <a:r>
+              <a:rPr lang="zh-TW" altLang="en-US"/>
+              <a:t>來印出相關資訊、並沒有使用</a:t>
+            </a:r>
+            <a:r>
+              <a:rPr lang="en-US" altLang="zh-TW"/>
+              <a:t>RX</a:t>
+            </a:r>
+            <a:r>
+              <a:rPr lang="zh-TW" altLang="en-US"/>
+              <a:t>來接收其他</a:t>
+            </a:r>
+            <a:r>
+              <a:rPr lang="en-US" altLang="zh-TW"/>
+              <a:t>Sensor</a:t>
+            </a:r>
+            <a:r>
+              <a:rPr lang="zh-TW" altLang="en-US"/>
+              <a:t>的</a:t>
+            </a:r>
+            <a:r>
+              <a:rPr lang="en-US" altLang="zh-TW"/>
+              <a:t>information</a:t>
+            </a:r>
+            <a:r>
+              <a:rPr lang="zh-TW" altLang="en-US"/>
+              <a:t>。</a:t>
+            </a:r>
+            <a:endParaRPr lang="en-US" altLang="zh-TW"/>
+          </a:p>
+          <a:p>
+            <a:pPr marL="0" indent="0">
+              <a:buNone/>
+            </a:pPr>
+            <a:r>
+              <a:rPr lang="zh-TW" altLang="en-US"/>
+              <a:t>       </a:t>
+            </a:r>
+            <a:r>
+              <a:rPr lang="en-US" altLang="zh-TW"/>
+              <a:t>1.1 UART</a:t>
+            </a:r>
+            <a:r>
+              <a:rPr lang="zh-TW" altLang="en-US"/>
+              <a:t> </a:t>
+            </a:r>
+            <a:r>
+              <a:rPr lang="en-US" altLang="zh-TW"/>
+              <a:t>RX Setting</a:t>
+            </a:r>
+            <a:r>
+              <a:rPr lang="zh-TW" altLang="en-US"/>
+              <a:t>建立</a:t>
+            </a:r>
+          </a:p>
+        </p:txBody>
+      </p:sp>
+      <p:sp>
+        <p:nvSpPr>
+          <p:cNvPr id="4" name="投影片編號版面配置區 3"/>
+          <p:cNvSpPr>
+            <a:spLocks noGrp="1"/>
+          </p:cNvSpPr>
+          <p:nvPr>
+            <p:ph type="sldNum" sz="quarter" idx="5"/>
+          </p:nvPr>
+        </p:nvSpPr>
+        <p:spPr/>
+        <p:txBody>
+          <a:bodyPr/>
+          <a:lstStyle/>
+          <a:p>
+            <a:fld id="{0116F853-F7F2-4239-A629-A213C1D67574}" type="slidenum">
+              <a:rPr lang="zh-TW" altLang="en-US" smtClean="0"/>
+              <a:t>40</a:t>
             </a:fld>
             <a:endParaRPr lang="zh-TW" altLang="en-US"/>
           </a:p>
@@ -1757,7 +1907,23 @@
             </a:r>
             <a:r>
               <a:rPr lang="zh-TW" altLang="en-US" dirty="0"/>
-              <a:t>建構多個系統來分析</a:t>
+              <a:t>建構多個系統</a:t>
+            </a:r>
+            <a:r>
+              <a:rPr lang="zh-TW" altLang="en-US"/>
+              <a:t>來分析，並且當初學長設計就不是讓</a:t>
+            </a:r>
+            <a:r>
+              <a:rPr lang="en-US" altLang="zh-TW"/>
+              <a:t>FW</a:t>
+            </a:r>
+            <a:r>
+              <a:rPr lang="zh-TW" altLang="en-US"/>
+              <a:t>拿來用而是他們自身利用硬體來</a:t>
+            </a:r>
+            <a:r>
+              <a:rPr lang="en-US" altLang="zh-TW"/>
+              <a:t>SIM</a:t>
             </a:r>
             <a:endParaRPr lang="en-US" altLang="zh-TW" dirty="0"/>
           </a:p>
@@ -14936,8 +15102,12 @@
               <a:buAutoNum type="arabicPeriod"/>
             </a:pPr>
             <a:r>
-              <a:rPr lang="zh-TW" altLang="en-US" dirty="0"/>
-              <a:t>簡略數位架構</a:t>
+              <a:rPr lang="zh-TW" altLang="en-US"/>
+              <a:t>數位架構 </a:t>
+            </a:r>
+            <a:r>
+              <a:rPr lang="en-US" altLang="zh-TW"/>
+              <a:t>Diagram</a:t>
             </a:r>
             <a:endParaRPr lang="en-US" altLang="zh-TW" dirty="0"/>
           </a:p>
@@ -15927,7 +16097,7 @@
         </p:nvSpPr>
         <p:spPr>
           <a:xfrm>
-            <a:off x="101531" y="1668905"/>
+            <a:off x="90106" y="1609787"/>
             <a:ext cx="8875321" cy="3214784"/>
           </a:xfrm>
           <a:prstGeom prst="rect">
@@ -16820,7 +16990,7 @@
           <p:cNvPr id="2" name="標題 1">
             <a:extLst>
               <a:ext uri="{FF2B5EF4-FFF2-40B4-BE49-F238E27FC236}">
-                <a16:creationId xmlns:a16="http://schemas.microsoft.com/office/drawing/2014/main" id="{71F49C4E-50D6-68D6-91C2-BFF48ADEF505}"/>
+                <a16:creationId xmlns:a16="http://schemas.microsoft.com/office/drawing/2014/main" id="{F712403E-D6B6-6830-AE3E-84456F8C9218}"/>
               </a:ext>
             </a:extLst>
           </p:cNvPr>
@@ -16838,6 +17008,367 @@
           <a:p>
             <a:pPr algn="ctr"/>
             <a:r>
+              <a:rPr lang="zh-TW" altLang="en-US"/>
+              <a:t>額外補充</a:t>
+            </a:r>
+          </a:p>
+        </p:txBody>
+      </p:sp>
+      <p:sp>
+        <p:nvSpPr>
+          <p:cNvPr id="4" name="矩形: 圓角 3">
+            <a:extLst>
+              <a:ext uri="{FF2B5EF4-FFF2-40B4-BE49-F238E27FC236}">
+                <a16:creationId xmlns:a16="http://schemas.microsoft.com/office/drawing/2014/main" id="{0007A4D0-14C4-7D69-8FE3-ABCF5CD9CB15}"/>
+              </a:ext>
+            </a:extLst>
+          </p:cNvPr>
+          <p:cNvSpPr/>
+          <p:nvPr/>
+        </p:nvSpPr>
+        <p:spPr>
+          <a:xfrm>
+            <a:off x="173855" y="2974757"/>
+            <a:ext cx="1719113" cy="1629323"/>
+          </a:xfrm>
+          <a:prstGeom prst="roundRect">
+            <a:avLst/>
+          </a:prstGeom>
+        </p:spPr>
+        <p:style>
+          <a:lnRef idx="2">
+            <a:schemeClr val="accent1">
+              <a:shade val="50000"/>
+            </a:schemeClr>
+          </a:lnRef>
+          <a:fillRef idx="1">
+            <a:schemeClr val="accent1"/>
+          </a:fillRef>
+          <a:effectRef idx="0">
+            <a:schemeClr val="accent1"/>
+          </a:effectRef>
+          <a:fontRef idx="minor">
+            <a:schemeClr val="lt1"/>
+          </a:fontRef>
+        </p:style>
+        <p:txBody>
+          <a:bodyPr rtlCol="0" anchor="ctr"/>
+          <a:lstStyle/>
+          <a:p>
+            <a:pPr algn="ctr"/>
+            <a:r>
+              <a:rPr lang="en-US" altLang="zh-TW" dirty="0"/>
+              <a:t>ADC</a:t>
+            </a:r>
+            <a:endParaRPr lang="zh-TW" altLang="en-US" dirty="0"/>
+          </a:p>
+        </p:txBody>
+      </p:sp>
+      <p:cxnSp>
+        <p:nvCxnSpPr>
+          <p:cNvPr id="5" name="直線單箭頭接點 4">
+            <a:extLst>
+              <a:ext uri="{FF2B5EF4-FFF2-40B4-BE49-F238E27FC236}">
+                <a16:creationId xmlns:a16="http://schemas.microsoft.com/office/drawing/2014/main" id="{9688909B-B780-CB3C-CF6E-CCEE1D2ED9EF}"/>
+              </a:ext>
+            </a:extLst>
+          </p:cNvPr>
+          <p:cNvCxnSpPr>
+            <a:cxnSpLocks/>
+          </p:cNvCxnSpPr>
+          <p:nvPr/>
+        </p:nvCxnSpPr>
+        <p:spPr>
+          <a:xfrm>
+            <a:off x="2005238" y="3750185"/>
+            <a:ext cx="856398" cy="0"/>
+          </a:xfrm>
+          <a:prstGeom prst="straightConnector1">
+            <a:avLst/>
+          </a:prstGeom>
+          <a:ln w="38100">
+            <a:solidFill>
+              <a:srgbClr val="FFC000"/>
+            </a:solidFill>
+            <a:tailEnd type="triangle"/>
+          </a:ln>
+        </p:spPr>
+        <p:style>
+          <a:lnRef idx="1">
+            <a:schemeClr val="accent1"/>
+          </a:lnRef>
+          <a:fillRef idx="0">
+            <a:schemeClr val="accent1"/>
+          </a:fillRef>
+          <a:effectRef idx="0">
+            <a:schemeClr val="accent1"/>
+          </a:effectRef>
+          <a:fontRef idx="minor">
+            <a:schemeClr val="tx1"/>
+          </a:fontRef>
+        </p:style>
+      </p:cxnSp>
+      <p:sp>
+        <p:nvSpPr>
+          <p:cNvPr id="6" name="矩形: 圓角 5">
+            <a:extLst>
+              <a:ext uri="{FF2B5EF4-FFF2-40B4-BE49-F238E27FC236}">
+                <a16:creationId xmlns:a16="http://schemas.microsoft.com/office/drawing/2014/main" id="{FE6B3FB6-C3FF-0FB3-4F9E-5BF6A6159F50}"/>
+              </a:ext>
+            </a:extLst>
+          </p:cNvPr>
+          <p:cNvSpPr/>
+          <p:nvPr/>
+        </p:nvSpPr>
+        <p:spPr>
+          <a:xfrm>
+            <a:off x="2885255" y="2903442"/>
+            <a:ext cx="1740106" cy="1629324"/>
+          </a:xfrm>
+          <a:prstGeom prst="roundRect">
+            <a:avLst/>
+          </a:prstGeom>
+        </p:spPr>
+        <p:style>
+          <a:lnRef idx="2">
+            <a:schemeClr val="accent1">
+              <a:shade val="50000"/>
+            </a:schemeClr>
+          </a:lnRef>
+          <a:fillRef idx="1">
+            <a:schemeClr val="accent1"/>
+          </a:fillRef>
+          <a:effectRef idx="0">
+            <a:schemeClr val="accent1"/>
+          </a:effectRef>
+          <a:fontRef idx="minor">
+            <a:schemeClr val="lt1"/>
+          </a:fontRef>
+        </p:style>
+        <p:txBody>
+          <a:bodyPr rtlCol="0" anchor="ctr"/>
+          <a:lstStyle/>
+          <a:p>
+            <a:pPr algn="ctr"/>
+            <a:r>
+              <a:rPr lang="en-US" altLang="zh-TW" dirty="0"/>
+              <a:t>Digital HPF</a:t>
+            </a:r>
+            <a:endParaRPr lang="zh-TW" altLang="en-US" dirty="0"/>
+          </a:p>
+        </p:txBody>
+      </p:sp>
+      <p:sp>
+        <p:nvSpPr>
+          <p:cNvPr id="7" name="矩形: 圓角 6">
+            <a:extLst>
+              <a:ext uri="{FF2B5EF4-FFF2-40B4-BE49-F238E27FC236}">
+                <a16:creationId xmlns:a16="http://schemas.microsoft.com/office/drawing/2014/main" id="{D8A2DABC-F2F1-6DB7-F5AD-FA8846EB98DD}"/>
+              </a:ext>
+            </a:extLst>
+          </p:cNvPr>
+          <p:cNvSpPr/>
+          <p:nvPr/>
+        </p:nvSpPr>
+        <p:spPr>
+          <a:xfrm>
+            <a:off x="7895467" y="2974757"/>
+            <a:ext cx="1585094" cy="1558003"/>
+          </a:xfrm>
+          <a:prstGeom prst="roundRect">
+            <a:avLst/>
+          </a:prstGeom>
+        </p:spPr>
+        <p:style>
+          <a:lnRef idx="2">
+            <a:schemeClr val="accent1">
+              <a:shade val="50000"/>
+            </a:schemeClr>
+          </a:lnRef>
+          <a:fillRef idx="1">
+            <a:schemeClr val="accent1"/>
+          </a:fillRef>
+          <a:effectRef idx="0">
+            <a:schemeClr val="accent1"/>
+          </a:effectRef>
+          <a:fontRef idx="minor">
+            <a:schemeClr val="lt1"/>
+          </a:fontRef>
+        </p:style>
+        <p:txBody>
+          <a:bodyPr rtlCol="0" anchor="ctr"/>
+          <a:lstStyle/>
+          <a:p>
+            <a:pPr algn="ctr"/>
+            <a:r>
+              <a:rPr lang="en-US" altLang="zh-TW" dirty="0"/>
+              <a:t>FIFO</a:t>
+            </a:r>
+            <a:endParaRPr lang="zh-TW" altLang="en-US" dirty="0"/>
+          </a:p>
+        </p:txBody>
+      </p:sp>
+      <p:sp>
+        <p:nvSpPr>
+          <p:cNvPr id="8" name="矩形: 圓角 7">
+            <a:extLst>
+              <a:ext uri="{FF2B5EF4-FFF2-40B4-BE49-F238E27FC236}">
+                <a16:creationId xmlns:a16="http://schemas.microsoft.com/office/drawing/2014/main" id="{7D9A7A69-EBE1-3D24-69E1-A60D3C559428}"/>
+              </a:ext>
+            </a:extLst>
+          </p:cNvPr>
+          <p:cNvSpPr/>
+          <p:nvPr/>
+        </p:nvSpPr>
+        <p:spPr>
+          <a:xfrm>
+            <a:off x="10774297" y="2325405"/>
+            <a:ext cx="1213384" cy="944437"/>
+          </a:xfrm>
+          <a:prstGeom prst="roundRect">
+            <a:avLst/>
+          </a:prstGeom>
+        </p:spPr>
+        <p:style>
+          <a:lnRef idx="2">
+            <a:schemeClr val="accent1">
+              <a:shade val="50000"/>
+            </a:schemeClr>
+          </a:lnRef>
+          <a:fillRef idx="1">
+            <a:schemeClr val="accent1"/>
+          </a:fillRef>
+          <a:effectRef idx="0">
+            <a:schemeClr val="accent1"/>
+          </a:effectRef>
+          <a:fontRef idx="minor">
+            <a:schemeClr val="lt1"/>
+          </a:fontRef>
+        </p:style>
+        <p:txBody>
+          <a:bodyPr rtlCol="0" anchor="ctr"/>
+          <a:lstStyle/>
+          <a:p>
+            <a:pPr algn="ctr"/>
+            <a:r>
+              <a:rPr lang="en-US" altLang="zh-TW" dirty="0"/>
+              <a:t>RX1 Decoder</a:t>
+            </a:r>
+            <a:endParaRPr lang="zh-TW" altLang="en-US" dirty="0"/>
+          </a:p>
+        </p:txBody>
+      </p:sp>
+      <p:sp>
+        <p:nvSpPr>
+          <p:cNvPr id="9" name="矩形: 圓角 8">
+            <a:extLst>
+              <a:ext uri="{FF2B5EF4-FFF2-40B4-BE49-F238E27FC236}">
+                <a16:creationId xmlns:a16="http://schemas.microsoft.com/office/drawing/2014/main" id="{16C2F692-930E-E361-3147-BDBC5E3F1B62}"/>
+              </a:ext>
+            </a:extLst>
+          </p:cNvPr>
+          <p:cNvSpPr/>
+          <p:nvPr/>
+        </p:nvSpPr>
+        <p:spPr>
+          <a:xfrm>
+            <a:off x="10793981" y="4145951"/>
+            <a:ext cx="1224164" cy="944437"/>
+          </a:xfrm>
+          <a:prstGeom prst="roundRect">
+            <a:avLst/>
+          </a:prstGeom>
+        </p:spPr>
+        <p:style>
+          <a:lnRef idx="2">
+            <a:schemeClr val="accent1">
+              <a:shade val="50000"/>
+            </a:schemeClr>
+          </a:lnRef>
+          <a:fillRef idx="1">
+            <a:schemeClr val="accent1"/>
+          </a:fillRef>
+          <a:effectRef idx="0">
+            <a:schemeClr val="accent1"/>
+          </a:effectRef>
+          <a:fontRef idx="minor">
+            <a:schemeClr val="lt1"/>
+          </a:fontRef>
+        </p:style>
+        <p:txBody>
+          <a:bodyPr rtlCol="0" anchor="ctr"/>
+          <a:lstStyle/>
+          <a:p>
+            <a:pPr algn="ctr"/>
+            <a:r>
+              <a:rPr lang="en-US" altLang="zh-TW" dirty="0"/>
+              <a:t>RX0 Decoder</a:t>
+            </a:r>
+            <a:endParaRPr lang="zh-TW" altLang="en-US" dirty="0"/>
+          </a:p>
+        </p:txBody>
+      </p:sp>
+      <p:sp>
+        <p:nvSpPr>
+          <p:cNvPr id="18" name="文字方塊 17">
+            <a:extLst>
+              <a:ext uri="{FF2B5EF4-FFF2-40B4-BE49-F238E27FC236}">
+                <a16:creationId xmlns:a16="http://schemas.microsoft.com/office/drawing/2014/main" id="{D1162461-4C48-9557-9672-12A7BAC5E75A}"/>
+              </a:ext>
+            </a:extLst>
+          </p:cNvPr>
+          <p:cNvSpPr txBox="1"/>
+          <p:nvPr/>
+        </p:nvSpPr>
+        <p:spPr>
+          <a:xfrm>
+            <a:off x="4812386" y="1690688"/>
+            <a:ext cx="1800170" cy="369332"/>
+          </a:xfrm>
+          <a:prstGeom prst="rect">
+            <a:avLst/>
+          </a:prstGeom>
+          <a:noFill/>
+        </p:spPr>
+        <p:txBody>
+          <a:bodyPr wrap="square" rtlCol="0">
+            <a:spAutoFit/>
+          </a:bodyPr>
+          <a:lstStyle/>
+          <a:p>
+            <a:endParaRPr lang="zh-TW" altLang="en-US" dirty="0"/>
+          </a:p>
+        </p:txBody>
+      </p:sp>
+      <p:sp>
+        <p:nvSpPr>
+          <p:cNvPr id="22" name="文字方塊 21">
+            <a:extLst>
+              <a:ext uri="{FF2B5EF4-FFF2-40B4-BE49-F238E27FC236}">
+                <a16:creationId xmlns:a16="http://schemas.microsoft.com/office/drawing/2014/main" id="{5523AC61-23D7-6825-5AB5-50B9814E1FFB}"/>
+              </a:ext>
+            </a:extLst>
+          </p:cNvPr>
+          <p:cNvSpPr txBox="1"/>
+          <p:nvPr/>
+        </p:nvSpPr>
+        <p:spPr>
+          <a:xfrm>
+            <a:off x="1104053" y="2362445"/>
+            <a:ext cx="2504513" cy="369332"/>
+          </a:xfrm>
+          <a:prstGeom prst="rect">
+            <a:avLst/>
+          </a:prstGeom>
+          <a:noFill/>
+        </p:spPr>
+        <p:txBody>
+          <a:bodyPr wrap="square" rtlCol="0">
+            <a:spAutoFit/>
+          </a:bodyPr>
+          <a:lstStyle/>
+          <a:p>
+            <a:r>
               <a:rPr lang="zh-TW" altLang="en-US" dirty="0"/>
               <a:t>前端訊號處理</a:t>
             </a:r>
@@ -16846,207 +17377,524 @@
       </p:sp>
       <p:sp>
         <p:nvSpPr>
-          <p:cNvPr id="3" name="內容版面配置區 2">
-            <a:extLst>
-              <a:ext uri="{FF2B5EF4-FFF2-40B4-BE49-F238E27FC236}">
-                <a16:creationId xmlns:a16="http://schemas.microsoft.com/office/drawing/2014/main" id="{2F3C6F51-5701-1BCA-2F51-50A4A4166EC9}"/>
-              </a:ext>
-            </a:extLst>
-          </p:cNvPr>
-          <p:cNvSpPr>
-            <a:spLocks noGrp="1"/>
-          </p:cNvSpPr>
-          <p:nvPr>
-            <p:ph idx="1"/>
-          </p:nvPr>
-        </p:nvSpPr>
-        <p:spPr/>
-        <p:txBody>
-          <a:bodyPr/>
-          <a:lstStyle/>
-          <a:p>
-            <a:pPr marL="0" indent="0">
-              <a:buNone/>
-            </a:pPr>
-            <a:r>
-              <a:rPr lang="en-US" altLang="zh-TW" dirty="0"/>
-              <a:t>Benefits and Drawbacks of method</a:t>
-            </a:r>
-          </a:p>
-          <a:p>
-            <a:pPr marL="0" indent="0">
-              <a:buNone/>
-            </a:pPr>
-            <a:endParaRPr lang="en-US" altLang="zh-TW" dirty="0"/>
-          </a:p>
-          <a:p>
-            <a:pPr marL="514350" indent="-514350">
-              <a:buAutoNum type="arabicPeriod"/>
-            </a:pPr>
-            <a:r>
-              <a:rPr lang="zh-TW" altLang="en-US" dirty="0"/>
-              <a:t>不經過任何訊號處理</a:t>
-            </a:r>
-            <a:endParaRPr lang="en-US" altLang="zh-TW" dirty="0"/>
-          </a:p>
-          <a:p>
-            <a:pPr marL="0" indent="0">
-              <a:buNone/>
-            </a:pPr>
-            <a:r>
-              <a:rPr lang="en-US" altLang="zh-TW" dirty="0"/>
-              <a:t>	</a:t>
-            </a:r>
-            <a:r>
-              <a:rPr lang="zh-TW" altLang="en-US" sz="2400" dirty="0"/>
-              <a:t>優點 </a:t>
-            </a:r>
-            <a:r>
-              <a:rPr lang="en-US" altLang="zh-TW" sz="2400" dirty="0"/>
-              <a:t>: </a:t>
-            </a:r>
-            <a:r>
-              <a:rPr lang="zh-TW" altLang="en-US" sz="2400" dirty="0"/>
-              <a:t>省電、參數調整較簡單</a:t>
-            </a:r>
-            <a:endParaRPr lang="en-US" altLang="zh-TW" sz="2400" dirty="0"/>
-          </a:p>
-          <a:p>
-            <a:pPr marL="0" indent="0">
-              <a:buNone/>
-            </a:pPr>
-            <a:r>
-              <a:rPr lang="en-US" altLang="zh-TW" sz="2400" dirty="0"/>
-              <a:t>	</a:t>
-            </a:r>
-            <a:r>
-              <a:rPr lang="zh-TW" altLang="en-US" sz="2400" dirty="0"/>
-              <a:t>缺點 </a:t>
-            </a:r>
-            <a:r>
-              <a:rPr lang="en-US" altLang="zh-TW" sz="2400" dirty="0"/>
-              <a:t>:</a:t>
-            </a:r>
-            <a:r>
-              <a:rPr lang="zh-TW" altLang="en-US" sz="2400" dirty="0"/>
-              <a:t> 無法抗</a:t>
-            </a:r>
-            <a:r>
-              <a:rPr lang="en-US" altLang="zh-TW" sz="2400" dirty="0"/>
-              <a:t>Noise </a:t>
-            </a:r>
-            <a:r>
-              <a:rPr lang="zh-TW" altLang="en-US" sz="2400" dirty="0"/>
-              <a:t>而且 </a:t>
-            </a:r>
-            <a:r>
-              <a:rPr lang="en-US" altLang="zh-TW" sz="2400" dirty="0"/>
-              <a:t>ADC</a:t>
-            </a:r>
-            <a:r>
-              <a:rPr lang="zh-TW" altLang="en-US" sz="2400" dirty="0"/>
-              <a:t> 刻度較少</a:t>
-            </a:r>
-            <a:endParaRPr lang="en-US" altLang="zh-TW" sz="2400" dirty="0"/>
-          </a:p>
-          <a:p>
-            <a:pPr marL="0" indent="0">
-              <a:buNone/>
-            </a:pPr>
-            <a:endParaRPr lang="en-US" altLang="zh-TW" sz="2400" dirty="0"/>
-          </a:p>
-          <a:p>
-            <a:pPr marL="514350" indent="-514350">
-              <a:buAutoNum type="arabicPeriod" startAt="2"/>
-            </a:pPr>
-            <a:r>
-              <a:rPr lang="zh-TW" altLang="en-US" dirty="0"/>
-              <a:t>經過</a:t>
-            </a:r>
-            <a:r>
-              <a:rPr lang="en-US" altLang="zh-TW" dirty="0"/>
-              <a:t>1st HPF and Schmitt Trigger</a:t>
-            </a:r>
-            <a:r>
-              <a:rPr lang="zh-TW" altLang="en-US" dirty="0"/>
-              <a:t>電路</a:t>
-            </a:r>
-            <a:endParaRPr lang="en-US" altLang="zh-TW" dirty="0"/>
-          </a:p>
-          <a:p>
-            <a:pPr marL="0" indent="0">
-              <a:buNone/>
-            </a:pPr>
-            <a:r>
-              <a:rPr lang="en-US" altLang="zh-TW" sz="2400" dirty="0"/>
-              <a:t>	</a:t>
-            </a:r>
-            <a:r>
-              <a:rPr lang="zh-TW" altLang="en-US" sz="2400" dirty="0"/>
-              <a:t>優點 </a:t>
-            </a:r>
-            <a:r>
-              <a:rPr lang="en-US" altLang="zh-TW" sz="2400" dirty="0"/>
-              <a:t>:</a:t>
-            </a:r>
-            <a:r>
-              <a:rPr lang="zh-TW" altLang="en-US" sz="2400" dirty="0"/>
-              <a:t>抗低頻</a:t>
-            </a:r>
-            <a:r>
-              <a:rPr lang="en-US" altLang="zh-TW" sz="2400" dirty="0"/>
-              <a:t>Noise</a:t>
-            </a:r>
-            <a:r>
-              <a:rPr lang="zh-TW" altLang="en-US" sz="2400" dirty="0"/>
-              <a:t>、</a:t>
-            </a:r>
-            <a:r>
-              <a:rPr lang="en-US" altLang="zh-TW" sz="2400" dirty="0"/>
-              <a:t>ADC</a:t>
-            </a:r>
-            <a:r>
-              <a:rPr lang="zh-TW" altLang="en-US" sz="2400" dirty="0"/>
-              <a:t>刻度較多</a:t>
-            </a:r>
-            <a:endParaRPr lang="en-US" altLang="zh-TW" sz="2400" dirty="0"/>
-          </a:p>
-          <a:p>
-            <a:pPr marL="0" indent="0">
-              <a:buNone/>
-            </a:pPr>
-            <a:r>
-              <a:rPr lang="en-US" altLang="zh-TW" sz="2400" dirty="0"/>
-              <a:t>	</a:t>
-            </a:r>
-            <a:r>
-              <a:rPr lang="zh-TW" altLang="en-US" sz="2400" dirty="0"/>
-              <a:t>缺點 </a:t>
-            </a:r>
-            <a:r>
-              <a:rPr lang="en-US" altLang="zh-TW" sz="2400" dirty="0"/>
-              <a:t>:</a:t>
-            </a:r>
-            <a:r>
-              <a:rPr lang="zh-TW" altLang="en-US" sz="2400" dirty="0"/>
-              <a:t> 無法抗高頻</a:t>
-            </a:r>
-            <a:r>
-              <a:rPr lang="en-US" altLang="zh-TW" sz="2400" dirty="0"/>
-              <a:t>Noise </a:t>
-            </a:r>
-            <a:r>
-              <a:rPr lang="zh-TW" altLang="en-US" sz="2400" dirty="0"/>
-              <a:t>、參數調整較多</a:t>
-            </a:r>
-            <a:endParaRPr lang="en-US" altLang="zh-TW" sz="2400" dirty="0"/>
+          <p:cNvPr id="23" name="矩形: 圓角 22">
+            <a:extLst>
+              <a:ext uri="{FF2B5EF4-FFF2-40B4-BE49-F238E27FC236}">
+                <a16:creationId xmlns:a16="http://schemas.microsoft.com/office/drawing/2014/main" id="{B7801C8D-3BC9-84B5-031F-1629709A8986}"/>
+              </a:ext>
+            </a:extLst>
+          </p:cNvPr>
+          <p:cNvSpPr/>
+          <p:nvPr/>
+        </p:nvSpPr>
+        <p:spPr>
+          <a:xfrm>
+            <a:off x="5547642" y="2974757"/>
+            <a:ext cx="1668056" cy="1558005"/>
+          </a:xfrm>
+          <a:prstGeom prst="roundRect">
+            <a:avLst/>
+          </a:prstGeom>
+        </p:spPr>
+        <p:style>
+          <a:lnRef idx="2">
+            <a:schemeClr val="accent1">
+              <a:shade val="50000"/>
+            </a:schemeClr>
+          </a:lnRef>
+          <a:fillRef idx="1">
+            <a:schemeClr val="accent1"/>
+          </a:fillRef>
+          <a:effectRef idx="0">
+            <a:schemeClr val="accent1"/>
+          </a:effectRef>
+          <a:fontRef idx="minor">
+            <a:schemeClr val="lt1"/>
+          </a:fontRef>
+        </p:style>
+        <p:txBody>
+          <a:bodyPr rtlCol="0" anchor="ctr"/>
+          <a:lstStyle/>
+          <a:p>
+            <a:pPr algn="ctr"/>
+            <a:r>
+              <a:rPr lang="en-US" altLang="zh-TW" dirty="0"/>
+              <a:t>Schmitt Digital</a:t>
+            </a:r>
+            <a:endParaRPr lang="zh-TW" altLang="en-US" dirty="0"/>
+          </a:p>
+        </p:txBody>
+      </p:sp>
+      <p:cxnSp>
+        <p:nvCxnSpPr>
+          <p:cNvPr id="30" name="直線單箭頭接點 29">
+            <a:extLst>
+              <a:ext uri="{FF2B5EF4-FFF2-40B4-BE49-F238E27FC236}">
+                <a16:creationId xmlns:a16="http://schemas.microsoft.com/office/drawing/2014/main" id="{4B5A7F4A-4407-DC21-4B6B-906C461871E7}"/>
+              </a:ext>
+            </a:extLst>
+          </p:cNvPr>
+          <p:cNvCxnSpPr>
+            <a:cxnSpLocks/>
+          </p:cNvCxnSpPr>
+          <p:nvPr/>
+        </p:nvCxnSpPr>
+        <p:spPr>
+          <a:xfrm flipV="1">
+            <a:off x="9660760" y="2869335"/>
+            <a:ext cx="999434" cy="745393"/>
+          </a:xfrm>
+          <a:prstGeom prst="straightConnector1">
+            <a:avLst/>
+          </a:prstGeom>
+          <a:ln w="38100">
+            <a:solidFill>
+              <a:srgbClr val="FF0000"/>
+            </a:solidFill>
+            <a:tailEnd type="triangle"/>
+          </a:ln>
+        </p:spPr>
+        <p:style>
+          <a:lnRef idx="1">
+            <a:schemeClr val="accent1"/>
+          </a:lnRef>
+          <a:fillRef idx="0">
+            <a:schemeClr val="accent1"/>
+          </a:fillRef>
+          <a:effectRef idx="0">
+            <a:schemeClr val="accent1"/>
+          </a:effectRef>
+          <a:fontRef idx="minor">
+            <a:schemeClr val="tx1"/>
+          </a:fontRef>
+        </p:style>
+      </p:cxnSp>
+      <p:cxnSp>
+        <p:nvCxnSpPr>
+          <p:cNvPr id="31" name="直線單箭頭接點 30">
+            <a:extLst>
+              <a:ext uri="{FF2B5EF4-FFF2-40B4-BE49-F238E27FC236}">
+                <a16:creationId xmlns:a16="http://schemas.microsoft.com/office/drawing/2014/main" id="{D97C862F-8A88-7DD1-E6A9-F7F41BEF9DE5}"/>
+              </a:ext>
+            </a:extLst>
+          </p:cNvPr>
+          <p:cNvCxnSpPr>
+            <a:cxnSpLocks/>
+          </p:cNvCxnSpPr>
+          <p:nvPr/>
+        </p:nvCxnSpPr>
+        <p:spPr>
+          <a:xfrm>
+            <a:off x="9660760" y="3861325"/>
+            <a:ext cx="953022" cy="725780"/>
+          </a:xfrm>
+          <a:prstGeom prst="straightConnector1">
+            <a:avLst/>
+          </a:prstGeom>
+          <a:ln w="38100">
+            <a:solidFill>
+              <a:srgbClr val="FF0000"/>
+            </a:solidFill>
+            <a:tailEnd type="triangle"/>
+          </a:ln>
+        </p:spPr>
+        <p:style>
+          <a:lnRef idx="1">
+            <a:schemeClr val="accent1"/>
+          </a:lnRef>
+          <a:fillRef idx="0">
+            <a:schemeClr val="accent1"/>
+          </a:fillRef>
+          <a:effectRef idx="0">
+            <a:schemeClr val="accent1"/>
+          </a:effectRef>
+          <a:fontRef idx="minor">
+            <a:schemeClr val="tx1"/>
+          </a:fontRef>
+        </p:style>
+      </p:cxnSp>
+      <p:cxnSp>
+        <p:nvCxnSpPr>
+          <p:cNvPr id="32" name="直線單箭頭接點 31">
+            <a:extLst>
+              <a:ext uri="{FF2B5EF4-FFF2-40B4-BE49-F238E27FC236}">
+                <a16:creationId xmlns:a16="http://schemas.microsoft.com/office/drawing/2014/main" id="{2B8479B3-09A4-F38C-2B41-8B5C582EB746}"/>
+              </a:ext>
+            </a:extLst>
+          </p:cNvPr>
+          <p:cNvCxnSpPr>
+            <a:cxnSpLocks/>
+          </p:cNvCxnSpPr>
+          <p:nvPr/>
+        </p:nvCxnSpPr>
+        <p:spPr>
+          <a:xfrm>
+            <a:off x="4645368" y="3745217"/>
+            <a:ext cx="856398" cy="0"/>
+          </a:xfrm>
+          <a:prstGeom prst="straightConnector1">
+            <a:avLst/>
+          </a:prstGeom>
+          <a:ln w="38100">
+            <a:solidFill>
+              <a:srgbClr val="FFC000"/>
+            </a:solidFill>
+            <a:tailEnd type="triangle"/>
+          </a:ln>
+        </p:spPr>
+        <p:style>
+          <a:lnRef idx="1">
+            <a:schemeClr val="accent1"/>
+          </a:lnRef>
+          <a:fillRef idx="0">
+            <a:schemeClr val="accent1"/>
+          </a:fillRef>
+          <a:effectRef idx="0">
+            <a:schemeClr val="accent1"/>
+          </a:effectRef>
+          <a:fontRef idx="minor">
+            <a:schemeClr val="tx1"/>
+          </a:fontRef>
+        </p:style>
+      </p:cxnSp>
+      <p:cxnSp>
+        <p:nvCxnSpPr>
+          <p:cNvPr id="33" name="直線單箭頭接點 32">
+            <a:extLst>
+              <a:ext uri="{FF2B5EF4-FFF2-40B4-BE49-F238E27FC236}">
+                <a16:creationId xmlns:a16="http://schemas.microsoft.com/office/drawing/2014/main" id="{2F8F6418-E81C-16B0-E683-61051A87FFF0}"/>
+              </a:ext>
+            </a:extLst>
+          </p:cNvPr>
+          <p:cNvCxnSpPr>
+            <a:cxnSpLocks/>
+          </p:cNvCxnSpPr>
+          <p:nvPr/>
+        </p:nvCxnSpPr>
+        <p:spPr>
+          <a:xfrm>
+            <a:off x="7215698" y="3753759"/>
+            <a:ext cx="596807" cy="0"/>
+          </a:xfrm>
+          <a:prstGeom prst="straightConnector1">
+            <a:avLst/>
+          </a:prstGeom>
+          <a:ln w="38100">
+            <a:solidFill>
+              <a:srgbClr val="FFC000"/>
+            </a:solidFill>
+            <a:tailEnd type="triangle"/>
+          </a:ln>
+        </p:spPr>
+        <p:style>
+          <a:lnRef idx="1">
+            <a:schemeClr val="accent1"/>
+          </a:lnRef>
+          <a:fillRef idx="0">
+            <a:schemeClr val="accent1"/>
+          </a:fillRef>
+          <a:effectRef idx="0">
+            <a:schemeClr val="accent1"/>
+          </a:effectRef>
+          <a:fontRef idx="minor">
+            <a:schemeClr val="tx1"/>
+          </a:fontRef>
+        </p:style>
+      </p:cxnSp>
+      <p:sp>
+        <p:nvSpPr>
+          <p:cNvPr id="37" name="矩形: 圓角 36">
+            <a:extLst>
+              <a:ext uri="{FF2B5EF4-FFF2-40B4-BE49-F238E27FC236}">
+                <a16:creationId xmlns:a16="http://schemas.microsoft.com/office/drawing/2014/main" id="{A0CCA80C-C358-DE20-C7AA-542E32D0D8EF}"/>
+              </a:ext>
+            </a:extLst>
+          </p:cNvPr>
+          <p:cNvSpPr/>
+          <p:nvPr/>
+        </p:nvSpPr>
+        <p:spPr>
+          <a:xfrm>
+            <a:off x="977655" y="2974757"/>
+            <a:ext cx="706646" cy="646592"/>
+          </a:xfrm>
+          <a:prstGeom prst="roundRect">
+            <a:avLst/>
+          </a:prstGeom>
+          <a:solidFill>
+            <a:srgbClr val="92D050"/>
+          </a:solidFill>
+        </p:spPr>
+        <p:style>
+          <a:lnRef idx="2">
+            <a:schemeClr val="accent1">
+              <a:shade val="50000"/>
+            </a:schemeClr>
+          </a:lnRef>
+          <a:fillRef idx="1">
+            <a:schemeClr val="accent1"/>
+          </a:fillRef>
+          <a:effectRef idx="0">
+            <a:schemeClr val="accent1"/>
+          </a:effectRef>
+          <a:fontRef idx="minor">
+            <a:schemeClr val="lt1"/>
+          </a:fontRef>
+        </p:style>
+        <p:txBody>
+          <a:bodyPr rtlCol="0" anchor="ctr"/>
+          <a:lstStyle/>
+          <a:p>
+            <a:pPr algn="ctr"/>
+            <a:r>
+              <a:rPr lang="en-US" altLang="zh-TW" sz="1000"/>
+              <a:t>RX7 CLK</a:t>
+            </a:r>
+          </a:p>
+          <a:p>
+            <a:pPr algn="ctr"/>
+            <a:r>
+              <a:rPr lang="en-US" altLang="zh-TW" sz="1000"/>
+              <a:t>………..</a:t>
+            </a:r>
+          </a:p>
+          <a:p>
+            <a:pPr algn="ctr"/>
+            <a:r>
+              <a:rPr lang="en-US" altLang="zh-TW" sz="1000"/>
+              <a:t>RX0 CLK</a:t>
+            </a:r>
+            <a:endParaRPr lang="zh-TW" altLang="en-US" sz="1000"/>
+          </a:p>
+        </p:txBody>
+      </p:sp>
+      <p:sp>
+        <p:nvSpPr>
+          <p:cNvPr id="39" name="矩形 38">
+            <a:extLst>
+              <a:ext uri="{FF2B5EF4-FFF2-40B4-BE49-F238E27FC236}">
+                <a16:creationId xmlns:a16="http://schemas.microsoft.com/office/drawing/2014/main" id="{77416AB1-7237-B5C3-B5F2-7DF690660CE7}"/>
+              </a:ext>
+            </a:extLst>
+          </p:cNvPr>
+          <p:cNvSpPr/>
+          <p:nvPr/>
+        </p:nvSpPr>
+        <p:spPr>
+          <a:xfrm>
+            <a:off x="2711439" y="2205789"/>
+            <a:ext cx="4740119" cy="2618781"/>
+          </a:xfrm>
+          <a:prstGeom prst="rect">
+            <a:avLst/>
+          </a:prstGeom>
+          <a:noFill/>
+          <a:ln>
+            <a:prstDash val="dash"/>
+          </a:ln>
+        </p:spPr>
+        <p:style>
+          <a:lnRef idx="2">
+            <a:schemeClr val="accent1">
+              <a:shade val="50000"/>
+            </a:schemeClr>
+          </a:lnRef>
+          <a:fillRef idx="1">
+            <a:schemeClr val="accent1"/>
+          </a:fillRef>
+          <a:effectRef idx="0">
+            <a:schemeClr val="accent1"/>
+          </a:effectRef>
+          <a:fontRef idx="minor">
+            <a:schemeClr val="lt1"/>
+          </a:fontRef>
+        </p:style>
+        <p:txBody>
+          <a:bodyPr rtlCol="0" anchor="ctr"/>
+          <a:lstStyle/>
+          <a:p>
+            <a:pPr algn="ctr"/>
+            <a:endParaRPr lang="zh-TW" altLang="en-US"/>
+          </a:p>
+        </p:txBody>
+      </p:sp>
+      <p:sp>
+        <p:nvSpPr>
+          <p:cNvPr id="40" name="文字方塊 39">
+            <a:extLst>
+              <a:ext uri="{FF2B5EF4-FFF2-40B4-BE49-F238E27FC236}">
+                <a16:creationId xmlns:a16="http://schemas.microsoft.com/office/drawing/2014/main" id="{8806E0C5-BD1C-A500-511A-3A61B6FDC4D6}"/>
+              </a:ext>
+            </a:extLst>
+          </p:cNvPr>
+          <p:cNvSpPr txBox="1"/>
+          <p:nvPr/>
+        </p:nvSpPr>
+        <p:spPr>
+          <a:xfrm>
+            <a:off x="3520658" y="2316278"/>
+            <a:ext cx="2703679" cy="276999"/>
+          </a:xfrm>
+          <a:prstGeom prst="rect">
+            <a:avLst/>
+          </a:prstGeom>
+          <a:noFill/>
+        </p:spPr>
+        <p:txBody>
+          <a:bodyPr wrap="square" rtlCol="0">
+            <a:spAutoFit/>
+          </a:bodyPr>
+          <a:lstStyle/>
+          <a:p>
+            <a:r>
+              <a:rPr lang="en-US" altLang="zh-TW" sz="1200"/>
+              <a:t>It need to </a:t>
+            </a:r>
+            <a:r>
+              <a:rPr lang="en-US" altLang="zh-TW" sz="1200">
+                <a:highlight>
+                  <a:srgbClr val="FFFF00"/>
+                </a:highlight>
+              </a:rPr>
+              <a:t>FIFO</a:t>
+            </a:r>
+            <a:r>
+              <a:rPr lang="en-US" altLang="zh-TW" sz="1200"/>
+              <a:t> RX7 CLK and RX6 CLK</a:t>
+            </a:r>
+            <a:endParaRPr lang="zh-TW" altLang="en-US" sz="1200"/>
+          </a:p>
+        </p:txBody>
+      </p:sp>
+      <p:sp>
+        <p:nvSpPr>
+          <p:cNvPr id="41" name="矩形: 圓角 40">
+            <a:extLst>
+              <a:ext uri="{FF2B5EF4-FFF2-40B4-BE49-F238E27FC236}">
+                <a16:creationId xmlns:a16="http://schemas.microsoft.com/office/drawing/2014/main" id="{5FBFCE58-4038-164A-B33F-81A358BC222E}"/>
+              </a:ext>
+            </a:extLst>
+          </p:cNvPr>
+          <p:cNvSpPr/>
+          <p:nvPr/>
+        </p:nvSpPr>
+        <p:spPr>
+          <a:xfrm>
+            <a:off x="8157759" y="2974757"/>
+            <a:ext cx="1185474" cy="646592"/>
+          </a:xfrm>
+          <a:prstGeom prst="roundRect">
+            <a:avLst/>
+          </a:prstGeom>
+          <a:solidFill>
+            <a:srgbClr val="FFC000"/>
+          </a:solidFill>
+        </p:spPr>
+        <p:style>
+          <a:lnRef idx="2">
+            <a:schemeClr val="accent1">
+              <a:shade val="50000"/>
+            </a:schemeClr>
+          </a:lnRef>
+          <a:fillRef idx="1">
+            <a:schemeClr val="accent1"/>
+          </a:fillRef>
+          <a:effectRef idx="0">
+            <a:schemeClr val="accent1"/>
+          </a:effectRef>
+          <a:fontRef idx="minor">
+            <a:schemeClr val="lt1"/>
+          </a:fontRef>
+        </p:style>
+        <p:txBody>
+          <a:bodyPr rtlCol="0" anchor="ctr"/>
+          <a:lstStyle/>
+          <a:p>
+            <a:pPr algn="ctr"/>
+            <a:r>
+              <a:rPr lang="en-US" altLang="zh-TW" sz="1000"/>
+              <a:t>FIFO RX7 CLK</a:t>
+            </a:r>
+          </a:p>
+          <a:p>
+            <a:pPr algn="ctr"/>
+            <a:r>
+              <a:rPr lang="en-US" altLang="zh-TW" sz="1000"/>
+              <a:t>………..</a:t>
+            </a:r>
+          </a:p>
+          <a:p>
+            <a:pPr algn="ctr"/>
+            <a:r>
+              <a:rPr lang="en-US" altLang="zh-TW" sz="1000"/>
+              <a:t>FIFO RX0 CLK</a:t>
+            </a:r>
+            <a:endParaRPr lang="zh-TW" altLang="en-US" sz="1000"/>
+          </a:p>
+        </p:txBody>
+      </p:sp>
+      <p:sp>
+        <p:nvSpPr>
+          <p:cNvPr id="42" name="文字方塊 41">
+            <a:extLst>
+              <a:ext uri="{FF2B5EF4-FFF2-40B4-BE49-F238E27FC236}">
+                <a16:creationId xmlns:a16="http://schemas.microsoft.com/office/drawing/2014/main" id="{E282F682-5AB1-598C-D755-2BBF79BB9F84}"/>
+              </a:ext>
+            </a:extLst>
+          </p:cNvPr>
+          <p:cNvSpPr txBox="1"/>
+          <p:nvPr/>
+        </p:nvSpPr>
+        <p:spPr>
+          <a:xfrm>
+            <a:off x="2861636" y="5957524"/>
+            <a:ext cx="4924926" cy="646331"/>
+          </a:xfrm>
+          <a:prstGeom prst="rect">
+            <a:avLst/>
+          </a:prstGeom>
+          <a:noFill/>
+        </p:spPr>
+        <p:txBody>
+          <a:bodyPr wrap="square" rtlCol="0">
+            <a:spAutoFit/>
+          </a:bodyPr>
+          <a:lstStyle/>
+          <a:p>
+            <a:r>
+              <a:rPr lang="en-US" altLang="zh-TW"/>
+              <a:t>RX1 Decoder Only eat FIFO</a:t>
+            </a:r>
+            <a:r>
+              <a:rPr lang="zh-TW" altLang="en-US"/>
+              <a:t> </a:t>
+            </a:r>
+            <a:r>
+              <a:rPr lang="en-US" altLang="zh-TW"/>
+              <a:t>RX7 CLK to calulate </a:t>
+            </a:r>
+          </a:p>
+          <a:p>
+            <a:r>
+              <a:rPr lang="en-US" altLang="zh-TW"/>
+              <a:t>But RX0 Decoder Eat FIFO RX7 ~</a:t>
+            </a:r>
+            <a:r>
+              <a:rPr lang="zh-TW" altLang="en-US"/>
+              <a:t> </a:t>
+            </a:r>
+            <a:r>
+              <a:rPr lang="en-US" altLang="zh-TW"/>
+              <a:t>RX0  to calculate</a:t>
+            </a:r>
+            <a:endParaRPr lang="zh-TW" altLang="en-US"/>
           </a:p>
         </p:txBody>
       </p:sp>
     </p:spTree>
     <p:extLst>
       <p:ext uri="{BB962C8B-B14F-4D97-AF65-F5344CB8AC3E}">
-        <p14:creationId xmlns:p14="http://schemas.microsoft.com/office/powerpoint/2010/main" val="1645638314"/>
+        <p14:creationId xmlns:p14="http://schemas.microsoft.com/office/powerpoint/2010/main" val="793939072"/>
       </p:ext>
     </p:extLst>
   </p:cSld>
@@ -17078,7 +17926,7 @@
           <p:cNvPr id="2" name="標題 1">
             <a:extLst>
               <a:ext uri="{FF2B5EF4-FFF2-40B4-BE49-F238E27FC236}">
-                <a16:creationId xmlns:a16="http://schemas.microsoft.com/office/drawing/2014/main" id="{41A1B36A-471A-BDE5-0D9F-F818171D72B1}"/>
+                <a16:creationId xmlns:a16="http://schemas.microsoft.com/office/drawing/2014/main" id="{71F49C4E-50D6-68D6-91C2-BFF48ADEF505}"/>
               </a:ext>
             </a:extLst>
           </p:cNvPr>
@@ -17097,15 +17945,7 @@
             <a:pPr algn="ctr"/>
             <a:r>
               <a:rPr lang="zh-TW" altLang="en-US" dirty="0"/>
-              <a:t>後端</a:t>
-            </a:r>
-            <a:r>
-              <a:rPr lang="en-US" altLang="zh-TW" dirty="0"/>
-              <a:t>Decoder</a:t>
-            </a:r>
-            <a:r>
-              <a:rPr lang="zh-TW" altLang="en-US" dirty="0"/>
-              <a:t>電路</a:t>
+              <a:t>前端訊號處理</a:t>
             </a:r>
           </a:p>
         </p:txBody>
@@ -17115,7 +17955,7 @@
           <p:cNvPr id="3" name="內容版面配置區 2">
             <a:extLst>
               <a:ext uri="{FF2B5EF4-FFF2-40B4-BE49-F238E27FC236}">
-                <a16:creationId xmlns:a16="http://schemas.microsoft.com/office/drawing/2014/main" id="{AEB419E4-8661-C0C0-63D0-CF90B8FED2EC}"/>
+                <a16:creationId xmlns:a16="http://schemas.microsoft.com/office/drawing/2014/main" id="{2F3C6F51-5701-1BCA-2F51-50A4A4166EC9}"/>
               </a:ext>
             </a:extLst>
           </p:cNvPr>
@@ -17131,14 +17971,188 @@
           <a:bodyPr/>
           <a:lstStyle/>
           <a:p>
-            <a:endParaRPr lang="zh-TW" altLang="en-US" dirty="0"/>
+            <a:pPr marL="0" indent="0">
+              <a:buNone/>
+            </a:pPr>
+            <a:r>
+              <a:rPr lang="en-US" altLang="zh-TW" dirty="0"/>
+              <a:t>Benefits and Drawbacks of method</a:t>
+            </a:r>
+          </a:p>
+          <a:p>
+            <a:pPr marL="0" indent="0">
+              <a:buNone/>
+            </a:pPr>
+            <a:endParaRPr lang="en-US" altLang="zh-TW" dirty="0"/>
+          </a:p>
+          <a:p>
+            <a:pPr marL="514350" indent="-514350">
+              <a:buAutoNum type="arabicPeriod"/>
+            </a:pPr>
+            <a:r>
+              <a:rPr lang="zh-TW" altLang="en-US" dirty="0"/>
+              <a:t>不經過任何訊號處理</a:t>
+            </a:r>
+            <a:endParaRPr lang="en-US" altLang="zh-TW" dirty="0"/>
+          </a:p>
+          <a:p>
+            <a:pPr marL="0" indent="0">
+              <a:buNone/>
+            </a:pPr>
+            <a:r>
+              <a:rPr lang="en-US" altLang="zh-TW" dirty="0"/>
+              <a:t>	</a:t>
+            </a:r>
+            <a:r>
+              <a:rPr lang="zh-TW" altLang="en-US" sz="2400" dirty="0"/>
+              <a:t>優點 </a:t>
+            </a:r>
+            <a:r>
+              <a:rPr lang="en-US" altLang="zh-TW" sz="2400" dirty="0"/>
+              <a:t>: </a:t>
+            </a:r>
+            <a:r>
+              <a:rPr lang="zh-TW" altLang="en-US" sz="2400" dirty="0"/>
+              <a:t>省電、參數調整較簡單</a:t>
+            </a:r>
+            <a:endParaRPr lang="en-US" altLang="zh-TW" sz="2400" dirty="0"/>
+          </a:p>
+          <a:p>
+            <a:pPr marL="0" indent="0">
+              <a:buNone/>
+            </a:pPr>
+            <a:r>
+              <a:rPr lang="en-US" altLang="zh-TW" sz="2400" dirty="0"/>
+              <a:t>	</a:t>
+            </a:r>
+            <a:r>
+              <a:rPr lang="zh-TW" altLang="en-US" sz="2400" dirty="0"/>
+              <a:t>缺點 </a:t>
+            </a:r>
+            <a:r>
+              <a:rPr lang="en-US" altLang="zh-TW" sz="2400" dirty="0"/>
+              <a:t>:</a:t>
+            </a:r>
+            <a:r>
+              <a:rPr lang="zh-TW" altLang="en-US" sz="2400" dirty="0"/>
+              <a:t> 無法抗</a:t>
+            </a:r>
+            <a:r>
+              <a:rPr lang="en-US" altLang="zh-TW" sz="2400" dirty="0"/>
+              <a:t>Noise </a:t>
+            </a:r>
+            <a:r>
+              <a:rPr lang="zh-TW" altLang="en-US" sz="2400" dirty="0"/>
+              <a:t>而且 </a:t>
+            </a:r>
+            <a:r>
+              <a:rPr lang="en-US" altLang="zh-TW" sz="2400" dirty="0"/>
+              <a:t>ADC</a:t>
+            </a:r>
+            <a:r>
+              <a:rPr lang="zh-TW" altLang="en-US" sz="2400" dirty="0"/>
+              <a:t> 刻度較少</a:t>
+            </a:r>
+            <a:endParaRPr lang="en-US" altLang="zh-TW" sz="2400" dirty="0"/>
+          </a:p>
+          <a:p>
+            <a:pPr marL="0" indent="0">
+              <a:buNone/>
+            </a:pPr>
+            <a:endParaRPr lang="en-US" altLang="zh-TW" sz="2400" dirty="0"/>
+          </a:p>
+          <a:p>
+            <a:pPr marL="514350" indent="-514350">
+              <a:buAutoNum type="arabicPeriod" startAt="2"/>
+            </a:pPr>
+            <a:r>
+              <a:rPr lang="zh-TW" altLang="en-US" dirty="0"/>
+              <a:t>經過</a:t>
+            </a:r>
+            <a:r>
+              <a:rPr lang="en-US" altLang="zh-TW" dirty="0"/>
+              <a:t>1st HPF and Schmitt Trigger</a:t>
+            </a:r>
+            <a:r>
+              <a:rPr lang="zh-TW" altLang="en-US" dirty="0"/>
+              <a:t>電路</a:t>
+            </a:r>
+            <a:endParaRPr lang="en-US" altLang="zh-TW" dirty="0"/>
+          </a:p>
+          <a:p>
+            <a:pPr marL="0" indent="0">
+              <a:buNone/>
+            </a:pPr>
+            <a:r>
+              <a:rPr lang="en-US" altLang="zh-TW" sz="2400" dirty="0"/>
+              <a:t>	</a:t>
+            </a:r>
+            <a:r>
+              <a:rPr lang="zh-TW" altLang="en-US" sz="2400" dirty="0"/>
+              <a:t>優點 </a:t>
+            </a:r>
+            <a:r>
+              <a:rPr lang="en-US" altLang="zh-TW" sz="2400" dirty="0"/>
+              <a:t>:</a:t>
+            </a:r>
+            <a:r>
+              <a:rPr lang="zh-TW" altLang="en-US" sz="2400" dirty="0"/>
+              <a:t>抗低頻</a:t>
+            </a:r>
+            <a:r>
+              <a:rPr lang="en-US" altLang="zh-TW" sz="2400" dirty="0"/>
+              <a:t>Noise</a:t>
+            </a:r>
+            <a:r>
+              <a:rPr lang="zh-TW" altLang="en-US" sz="2400" dirty="0"/>
+              <a:t>、</a:t>
+            </a:r>
+            <a:r>
+              <a:rPr lang="en-US" altLang="zh-TW" sz="2400" dirty="0"/>
+              <a:t>ADC</a:t>
+            </a:r>
+            <a:r>
+              <a:rPr lang="zh-TW" altLang="en-US" sz="2400" dirty="0"/>
+              <a:t>刻度較多</a:t>
+            </a:r>
+            <a:endParaRPr lang="en-US" altLang="zh-TW" sz="2400" dirty="0"/>
+          </a:p>
+          <a:p>
+            <a:pPr marL="0" indent="0">
+              <a:buNone/>
+            </a:pPr>
+            <a:r>
+              <a:rPr lang="en-US" altLang="zh-TW" sz="2400" dirty="0"/>
+              <a:t>	</a:t>
+            </a:r>
+            <a:r>
+              <a:rPr lang="zh-TW" altLang="en-US" sz="2400" dirty="0"/>
+              <a:t>缺點 </a:t>
+            </a:r>
+            <a:r>
+              <a:rPr lang="en-US" altLang="zh-TW" sz="2400" dirty="0"/>
+              <a:t>:</a:t>
+            </a:r>
+            <a:r>
+              <a:rPr lang="zh-TW" altLang="en-US" sz="2400" dirty="0"/>
+              <a:t> 無法抗高頻</a:t>
+            </a:r>
+            <a:r>
+              <a:rPr lang="en-US" altLang="zh-TW" sz="2400" dirty="0"/>
+              <a:t>Noise </a:t>
+            </a:r>
+            <a:r>
+              <a:rPr lang="zh-TW" altLang="en-US" sz="2400" dirty="0"/>
+              <a:t>、參數調整較多</a:t>
+            </a:r>
+            <a:endParaRPr lang="en-US" altLang="zh-TW" sz="2400" dirty="0"/>
           </a:p>
         </p:txBody>
       </p:sp>
     </p:spTree>
     <p:extLst>
       <p:ext uri="{BB962C8B-B14F-4D97-AF65-F5344CB8AC3E}">
-        <p14:creationId xmlns:p14="http://schemas.microsoft.com/office/powerpoint/2010/main" val="1747056482"/>
+        <p14:creationId xmlns:p14="http://schemas.microsoft.com/office/powerpoint/2010/main" val="1645638314"/>
       </p:ext>
     </p:extLst>
   </p:cSld>
@@ -17170,7 +18184,7 @@
           <p:cNvPr id="2" name="標題 1">
             <a:extLst>
               <a:ext uri="{FF2B5EF4-FFF2-40B4-BE49-F238E27FC236}">
-                <a16:creationId xmlns:a16="http://schemas.microsoft.com/office/drawing/2014/main" id="{50BB383F-54B9-1566-5039-3C13647347F8}"/>
+                <a16:creationId xmlns:a16="http://schemas.microsoft.com/office/drawing/2014/main" id="{41A1B36A-471A-BDE5-0D9F-F818171D72B1}"/>
               </a:ext>
             </a:extLst>
           </p:cNvPr>
@@ -17188,10 +18202,17 @@
           <a:p>
             <a:pPr algn="ctr"/>
             <a:r>
-              <a:rPr lang="en-US" altLang="zh-TW" dirty="0" err="1"/>
-              <a:t>AutoCorrelation</a:t>
-            </a:r>
-            <a:endParaRPr lang="zh-TW" altLang="en-US" dirty="0"/>
+              <a:rPr lang="zh-TW" altLang="en-US" dirty="0"/>
+              <a:t>後端</a:t>
+            </a:r>
+            <a:r>
+              <a:rPr lang="en-US" altLang="zh-TW" dirty="0"/>
+              <a:t>Decoder</a:t>
+            </a:r>
+            <a:r>
+              <a:rPr lang="zh-TW" altLang="en-US" dirty="0"/>
+              <a:t>電路</a:t>
+            </a:r>
           </a:p>
         </p:txBody>
       </p:sp>
@@ -17200,7 +18221,7 @@
           <p:cNvPr id="3" name="內容版面配置區 2">
             <a:extLst>
               <a:ext uri="{FF2B5EF4-FFF2-40B4-BE49-F238E27FC236}">
-                <a16:creationId xmlns:a16="http://schemas.microsoft.com/office/drawing/2014/main" id="{2596C747-6CF3-CCCC-4223-2CFCEABA8BA0}"/>
+                <a16:creationId xmlns:a16="http://schemas.microsoft.com/office/drawing/2014/main" id="{AEB419E4-8661-C0C0-63D0-CF90B8FED2EC}"/>
               </a:ext>
             </a:extLst>
           </p:cNvPr>
@@ -17216,66 +18237,14 @@
           <a:bodyPr/>
           <a:lstStyle/>
           <a:p>
-            <a:pPr marL="514350" indent="-514350">
-              <a:buAutoNum type="arabicPeriod"/>
-            </a:pPr>
-            <a:r>
-              <a:rPr lang="zh-TW" altLang="en-US" dirty="0"/>
-              <a:t>能推倒出</a:t>
-            </a:r>
-            <a:r>
-              <a:rPr lang="en-US" altLang="zh-TW" dirty="0" err="1"/>
-              <a:t>Convolation</a:t>
-            </a:r>
-            <a:r>
-              <a:rPr lang="en-US" altLang="zh-TW" dirty="0"/>
-              <a:t> Property for LTI system</a:t>
-            </a:r>
-          </a:p>
-          <a:p>
-            <a:pPr marL="514350" indent="-514350">
-              <a:buAutoNum type="arabicPeriod"/>
-            </a:pPr>
-            <a:endParaRPr lang="en-US" altLang="zh-TW" dirty="0"/>
-          </a:p>
-          <a:p>
-            <a:pPr marL="514350" indent="-514350">
-              <a:buAutoNum type="arabicPeriod"/>
-            </a:pPr>
-            <a:r>
-              <a:rPr lang="en-US" altLang="zh-TW" dirty="0" err="1"/>
-              <a:t>AutoCorreltion</a:t>
-            </a:r>
-            <a:r>
-              <a:rPr lang="zh-TW" altLang="en-US" dirty="0"/>
-              <a:t> 用處到底是</a:t>
-            </a:r>
-            <a:r>
-              <a:rPr lang="en-US" altLang="zh-TW" dirty="0"/>
-              <a:t>?</a:t>
-            </a:r>
-          </a:p>
-          <a:p>
-            <a:pPr marL="514350" indent="-514350">
-              <a:buAutoNum type="arabicPeriod"/>
-            </a:pPr>
-            <a:endParaRPr lang="en-US" altLang="zh-TW" dirty="0"/>
-          </a:p>
-          <a:p>
-            <a:pPr marL="514350" indent="-514350">
-              <a:buAutoNum type="arabicPeriod"/>
-            </a:pPr>
-            <a:r>
-              <a:rPr lang="zh-TW" altLang="en-US" dirty="0"/>
-              <a:t>訊號上的分析</a:t>
-            </a:r>
+            <a:endParaRPr lang="zh-TW" altLang="en-US" dirty="0"/>
           </a:p>
         </p:txBody>
       </p:sp>
     </p:spTree>
     <p:extLst>
       <p:ext uri="{BB962C8B-B14F-4D97-AF65-F5344CB8AC3E}">
-        <p14:creationId xmlns:p14="http://schemas.microsoft.com/office/powerpoint/2010/main" val="1802279474"/>
+        <p14:creationId xmlns:p14="http://schemas.microsoft.com/office/powerpoint/2010/main" val="1747056482"/>
       </p:ext>
     </p:extLst>
   </p:cSld>
@@ -17307,6 +18276,143 @@
           <p:cNvPr id="2" name="標題 1">
             <a:extLst>
               <a:ext uri="{FF2B5EF4-FFF2-40B4-BE49-F238E27FC236}">
+                <a16:creationId xmlns:a16="http://schemas.microsoft.com/office/drawing/2014/main" id="{50BB383F-54B9-1566-5039-3C13647347F8}"/>
+              </a:ext>
+            </a:extLst>
+          </p:cNvPr>
+          <p:cNvSpPr>
+            <a:spLocks noGrp="1"/>
+          </p:cNvSpPr>
+          <p:nvPr>
+            <p:ph type="title"/>
+          </p:nvPr>
+        </p:nvSpPr>
+        <p:spPr/>
+        <p:txBody>
+          <a:bodyPr/>
+          <a:lstStyle/>
+          <a:p>
+            <a:pPr algn="ctr"/>
+            <a:r>
+              <a:rPr lang="en-US" altLang="zh-TW" dirty="0" err="1"/>
+              <a:t>AutoCorrelation</a:t>
+            </a:r>
+            <a:endParaRPr lang="zh-TW" altLang="en-US" dirty="0"/>
+          </a:p>
+        </p:txBody>
+      </p:sp>
+      <p:sp>
+        <p:nvSpPr>
+          <p:cNvPr id="3" name="內容版面配置區 2">
+            <a:extLst>
+              <a:ext uri="{FF2B5EF4-FFF2-40B4-BE49-F238E27FC236}">
+                <a16:creationId xmlns:a16="http://schemas.microsoft.com/office/drawing/2014/main" id="{2596C747-6CF3-CCCC-4223-2CFCEABA8BA0}"/>
+              </a:ext>
+            </a:extLst>
+          </p:cNvPr>
+          <p:cNvSpPr>
+            <a:spLocks noGrp="1"/>
+          </p:cNvSpPr>
+          <p:nvPr>
+            <p:ph idx="1"/>
+          </p:nvPr>
+        </p:nvSpPr>
+        <p:spPr/>
+        <p:txBody>
+          <a:bodyPr/>
+          <a:lstStyle/>
+          <a:p>
+            <a:pPr marL="514350" indent="-514350">
+              <a:buAutoNum type="arabicPeriod"/>
+            </a:pPr>
+            <a:r>
+              <a:rPr lang="zh-TW" altLang="en-US" dirty="0"/>
+              <a:t>能推倒出</a:t>
+            </a:r>
+            <a:r>
+              <a:rPr lang="en-US" altLang="zh-TW" dirty="0" err="1"/>
+              <a:t>Convolation</a:t>
+            </a:r>
+            <a:r>
+              <a:rPr lang="en-US" altLang="zh-TW" dirty="0"/>
+              <a:t> Property for LTI system</a:t>
+            </a:r>
+          </a:p>
+          <a:p>
+            <a:pPr marL="514350" indent="-514350">
+              <a:buAutoNum type="arabicPeriod"/>
+            </a:pPr>
+            <a:endParaRPr lang="en-US" altLang="zh-TW" dirty="0"/>
+          </a:p>
+          <a:p>
+            <a:pPr marL="514350" indent="-514350">
+              <a:buAutoNum type="arabicPeriod"/>
+            </a:pPr>
+            <a:r>
+              <a:rPr lang="en-US" altLang="zh-TW" dirty="0" err="1"/>
+              <a:t>AutoCorreltion</a:t>
+            </a:r>
+            <a:r>
+              <a:rPr lang="zh-TW" altLang="en-US" dirty="0"/>
+              <a:t> 用處到底是</a:t>
+            </a:r>
+            <a:r>
+              <a:rPr lang="en-US" altLang="zh-TW" dirty="0"/>
+              <a:t>?</a:t>
+            </a:r>
+          </a:p>
+          <a:p>
+            <a:pPr marL="514350" indent="-514350">
+              <a:buAutoNum type="arabicPeriod"/>
+            </a:pPr>
+            <a:endParaRPr lang="en-US" altLang="zh-TW" dirty="0"/>
+          </a:p>
+          <a:p>
+            <a:pPr marL="514350" indent="-514350">
+              <a:buAutoNum type="arabicPeriod"/>
+            </a:pPr>
+            <a:r>
+              <a:rPr lang="zh-TW" altLang="en-US" dirty="0"/>
+              <a:t>訊號上的分析</a:t>
+            </a:r>
+          </a:p>
+        </p:txBody>
+      </p:sp>
+    </p:spTree>
+    <p:extLst>
+      <p:ext uri="{BB962C8B-B14F-4D97-AF65-F5344CB8AC3E}">
+        <p14:creationId xmlns:p14="http://schemas.microsoft.com/office/powerpoint/2010/main" val="1802279474"/>
+      </p:ext>
+    </p:extLst>
+  </p:cSld>
+  <p:clrMapOvr>
+    <a:masterClrMapping/>
+  </p:clrMapOvr>
+</p:sld>
+</file>
+
+<file path=ppt/slides/slide35.xml><?xml version="1.0" encoding="utf-8"?>
+<p:sld xmlns:a="http://schemas.openxmlformats.org/drawingml/2006/main" xmlns:r="http://schemas.openxmlformats.org/officeDocument/2006/relationships" xmlns:p="http://schemas.openxmlformats.org/presentationml/2006/main">
+  <p:cSld>
+    <p:spTree>
+      <p:nvGrpSpPr>
+        <p:cNvPr id="1" name=""/>
+        <p:cNvGrpSpPr/>
+        <p:nvPr/>
+      </p:nvGrpSpPr>
+      <p:grpSpPr>
+        <a:xfrm>
+          <a:off x="0" y="0"/>
+          <a:ext cx="0" cy="0"/>
+          <a:chOff x="0" y="0"/>
+          <a:chExt cx="0" cy="0"/>
+        </a:xfrm>
+      </p:grpSpPr>
+      <p:sp>
+        <p:nvSpPr>
+          <p:cNvPr id="2" name="標題 1">
+            <a:extLst>
+              <a:ext uri="{FF2B5EF4-FFF2-40B4-BE49-F238E27FC236}">
                 <a16:creationId xmlns:a16="http://schemas.microsoft.com/office/drawing/2014/main" id="{042F1310-2BFC-3D20-5FCD-AB24ABF21979}"/>
               </a:ext>
             </a:extLst>
@@ -17377,7 +18483,7 @@
 </p:sld>
 </file>
 
-<file path=ppt/slides/slide35.xml><?xml version="1.0" encoding="utf-8"?>
+<file path=ppt/slides/slide36.xml><?xml version="1.0" encoding="utf-8"?>
 <p:sld xmlns:a="http://schemas.openxmlformats.org/drawingml/2006/main" xmlns:r="http://schemas.openxmlformats.org/officeDocument/2006/relationships" xmlns:p="http://schemas.openxmlformats.org/presentationml/2006/main">
   <p:cSld>
     <p:spTree>
@@ -17914,135 +19020,6 @@
 </p:sld>
 </file>
 
-<file path=ppt/slides/slide36.xml><?xml version="1.0" encoding="utf-8"?>
-<p:sld xmlns:a="http://schemas.openxmlformats.org/drawingml/2006/main" xmlns:r="http://schemas.openxmlformats.org/officeDocument/2006/relationships" xmlns:p="http://schemas.openxmlformats.org/presentationml/2006/main">
-  <p:cSld>
-    <p:spTree>
-      <p:nvGrpSpPr>
-        <p:cNvPr id="1" name=""/>
-        <p:cNvGrpSpPr/>
-        <p:nvPr/>
-      </p:nvGrpSpPr>
-      <p:grpSpPr>
-        <a:xfrm>
-          <a:off x="0" y="0"/>
-          <a:ext cx="0" cy="0"/>
-          <a:chOff x="0" y="0"/>
-          <a:chExt cx="0" cy="0"/>
-        </a:xfrm>
-      </p:grpSpPr>
-      <p:sp>
-        <p:nvSpPr>
-          <p:cNvPr id="2" name="標題 1">
-            <a:extLst>
-              <a:ext uri="{FF2B5EF4-FFF2-40B4-BE49-F238E27FC236}">
-                <a16:creationId xmlns:a16="http://schemas.microsoft.com/office/drawing/2014/main" id="{E32E6CD8-2503-30B7-A4F8-AE84BE484917}"/>
-              </a:ext>
-            </a:extLst>
-          </p:cNvPr>
-          <p:cNvSpPr>
-            <a:spLocks noGrp="1"/>
-          </p:cNvSpPr>
-          <p:nvPr>
-            <p:ph type="title"/>
-          </p:nvPr>
-        </p:nvSpPr>
-        <p:spPr/>
-        <p:txBody>
-          <a:bodyPr/>
-          <a:lstStyle/>
-          <a:p>
-            <a:pPr algn="ctr"/>
-            <a:r>
-              <a:rPr lang="en-US" altLang="zh-TW" dirty="0"/>
-              <a:t>AGC flow</a:t>
-            </a:r>
-            <a:r>
-              <a:rPr lang="zh-TW" altLang="en-US" dirty="0"/>
-              <a:t>架構過程</a:t>
-            </a:r>
-          </a:p>
-        </p:txBody>
-      </p:sp>
-      <p:sp>
-        <p:nvSpPr>
-          <p:cNvPr id="3" name="內容版面配置區 2">
-            <a:extLst>
-              <a:ext uri="{FF2B5EF4-FFF2-40B4-BE49-F238E27FC236}">
-                <a16:creationId xmlns:a16="http://schemas.microsoft.com/office/drawing/2014/main" id="{ED8640AC-FE27-0D8C-6B75-7018404197B3}"/>
-              </a:ext>
-            </a:extLst>
-          </p:cNvPr>
-          <p:cNvSpPr>
-            <a:spLocks noGrp="1"/>
-          </p:cNvSpPr>
-          <p:nvPr>
-            <p:ph idx="1"/>
-          </p:nvPr>
-        </p:nvSpPr>
-        <p:spPr/>
-        <p:txBody>
-          <a:bodyPr/>
-          <a:lstStyle/>
-          <a:p>
-            <a:pPr marL="514350" indent="-514350">
-              <a:buAutoNum type="arabicPeriod"/>
-            </a:pPr>
-            <a:r>
-              <a:rPr lang="zh-TW" altLang="en-US" dirty="0"/>
-              <a:t>前期</a:t>
-            </a:r>
-            <a:r>
-              <a:rPr lang="en-US" altLang="zh-TW" dirty="0"/>
-              <a:t>ISSUE</a:t>
-            </a:r>
-          </a:p>
-          <a:p>
-            <a:pPr marL="514350" indent="-514350">
-              <a:buAutoNum type="arabicPeriod"/>
-            </a:pPr>
-            <a:endParaRPr lang="en-US" altLang="zh-TW" dirty="0"/>
-          </a:p>
-          <a:p>
-            <a:pPr marL="514350" indent="-514350">
-              <a:buAutoNum type="arabicPeriod"/>
-            </a:pPr>
-            <a:r>
-              <a:rPr lang="zh-TW" altLang="en-US" dirty="0"/>
-              <a:t>中後期統計</a:t>
-            </a:r>
-            <a:endParaRPr lang="en-US" altLang="zh-TW" dirty="0"/>
-          </a:p>
-          <a:p>
-            <a:pPr marL="514350" indent="-514350">
-              <a:buAutoNum type="arabicPeriod"/>
-            </a:pPr>
-            <a:endParaRPr lang="en-US" altLang="zh-TW" dirty="0"/>
-          </a:p>
-          <a:p>
-            <a:pPr marL="514350" indent="-514350">
-              <a:buAutoNum type="arabicPeriod"/>
-            </a:pPr>
-            <a:r>
-              <a:rPr lang="zh-TW" altLang="en-US" dirty="0"/>
-              <a:t>後期完工</a:t>
-            </a:r>
-          </a:p>
-        </p:txBody>
-      </p:sp>
-    </p:spTree>
-    <p:extLst>
-      <p:ext uri="{BB962C8B-B14F-4D97-AF65-F5344CB8AC3E}">
-        <p14:creationId xmlns:p14="http://schemas.microsoft.com/office/powerpoint/2010/main" val="3478487214"/>
-      </p:ext>
-    </p:extLst>
-  </p:cSld>
-  <p:clrMapOvr>
-    <a:masterClrMapping/>
-  </p:clrMapOvr>
-</p:sld>
-</file>
-
 <file path=ppt/slides/slide37.xml><?xml version="1.0" encoding="utf-8"?>
 <p:sld xmlns:a="http://schemas.openxmlformats.org/drawingml/2006/main" xmlns:r="http://schemas.openxmlformats.org/officeDocument/2006/relationships" xmlns:p="http://schemas.openxmlformats.org/presentationml/2006/main">
   <p:cSld>
@@ -18065,7 +19042,7 @@
           <p:cNvPr id="2" name="標題 1">
             <a:extLst>
               <a:ext uri="{FF2B5EF4-FFF2-40B4-BE49-F238E27FC236}">
-                <a16:creationId xmlns:a16="http://schemas.microsoft.com/office/drawing/2014/main" id="{75A8CDCF-D217-9237-F0F3-F03F7A3BC82D}"/>
+                <a16:creationId xmlns:a16="http://schemas.microsoft.com/office/drawing/2014/main" id="{E32E6CD8-2503-30B7-A4F8-AE84BE484917}"/>
               </a:ext>
             </a:extLst>
           </p:cNvPr>
@@ -18081,7 +19058,15 @@
           <a:bodyPr/>
           <a:lstStyle/>
           <a:p>
-            <a:endParaRPr lang="zh-TW" altLang="en-US" dirty="0"/>
+            <a:pPr algn="ctr"/>
+            <a:r>
+              <a:rPr lang="en-US" altLang="zh-TW" dirty="0"/>
+              <a:t>AGC flow</a:t>
+            </a:r>
+            <a:r>
+              <a:rPr lang="zh-TW" altLang="en-US" dirty="0"/>
+              <a:t>架構過程</a:t>
+            </a:r>
           </a:p>
         </p:txBody>
       </p:sp>
@@ -18090,7 +19075,7 @@
           <p:cNvPr id="3" name="內容版面配置區 2">
             <a:extLst>
               <a:ext uri="{FF2B5EF4-FFF2-40B4-BE49-F238E27FC236}">
-                <a16:creationId xmlns:a16="http://schemas.microsoft.com/office/drawing/2014/main" id="{A5250B66-E56F-5AAD-0B99-C4E8E1B221C2}"/>
+                <a16:creationId xmlns:a16="http://schemas.microsoft.com/office/drawing/2014/main" id="{ED8640AC-FE27-0D8C-6B75-7018404197B3}"/>
               </a:ext>
             </a:extLst>
           </p:cNvPr>
@@ -18106,14 +19091,55 @@
           <a:bodyPr/>
           <a:lstStyle/>
           <a:p>
-            <a:endParaRPr lang="zh-TW" altLang="en-US"/>
+            <a:pPr marL="514350" indent="-514350">
+              <a:buAutoNum type="arabicPeriod"/>
+            </a:pPr>
+            <a:r>
+              <a:rPr lang="zh-TW" altLang="en-US" dirty="0"/>
+              <a:t>前期</a:t>
+            </a:r>
+            <a:r>
+              <a:rPr lang="en-US" altLang="zh-TW" dirty="0"/>
+              <a:t>ISSUE</a:t>
+            </a:r>
+          </a:p>
+          <a:p>
+            <a:pPr marL="514350" indent="-514350">
+              <a:buAutoNum type="arabicPeriod"/>
+            </a:pPr>
+            <a:endParaRPr lang="en-US" altLang="zh-TW" dirty="0"/>
+          </a:p>
+          <a:p>
+            <a:pPr marL="514350" indent="-514350">
+              <a:buAutoNum type="arabicPeriod"/>
+            </a:pPr>
+            <a:r>
+              <a:rPr lang="zh-TW" altLang="en-US" dirty="0"/>
+              <a:t>中後期統計</a:t>
+            </a:r>
+            <a:endParaRPr lang="en-US" altLang="zh-TW" dirty="0"/>
+          </a:p>
+          <a:p>
+            <a:pPr marL="514350" indent="-514350">
+              <a:buAutoNum type="arabicPeriod"/>
+            </a:pPr>
+            <a:endParaRPr lang="en-US" altLang="zh-TW" dirty="0"/>
+          </a:p>
+          <a:p>
+            <a:pPr marL="514350" indent="-514350">
+              <a:buAutoNum type="arabicPeriod"/>
+            </a:pPr>
+            <a:r>
+              <a:rPr lang="zh-TW" altLang="en-US" dirty="0"/>
+              <a:t>後期完工</a:t>
+            </a:r>
           </a:p>
         </p:txBody>
       </p:sp>
     </p:spTree>
     <p:extLst>
       <p:ext uri="{BB962C8B-B14F-4D97-AF65-F5344CB8AC3E}">
-        <p14:creationId xmlns:p14="http://schemas.microsoft.com/office/powerpoint/2010/main" val="2364024188"/>
+        <p14:creationId xmlns:p14="http://schemas.microsoft.com/office/powerpoint/2010/main" val="3478487214"/>
       </p:ext>
     </p:extLst>
   </p:cSld>
@@ -18145,7 +19171,7 @@
           <p:cNvPr id="2" name="標題 1">
             <a:extLst>
               <a:ext uri="{FF2B5EF4-FFF2-40B4-BE49-F238E27FC236}">
-                <a16:creationId xmlns:a16="http://schemas.microsoft.com/office/drawing/2014/main" id="{02C3FE11-1F15-4971-95B5-34F7811B7E8A}"/>
+                <a16:creationId xmlns:a16="http://schemas.microsoft.com/office/drawing/2014/main" id="{75A8CDCF-D217-9237-F0F3-F03F7A3BC82D}"/>
               </a:ext>
             </a:extLst>
           </p:cNvPr>
@@ -18161,19 +19187,6 @@
           <a:bodyPr/>
           <a:lstStyle/>
           <a:p>
-            <a:pPr algn="ctr"/>
-            <a:r>
-              <a:rPr lang="en-US" altLang="zh-TW" dirty="0"/>
-              <a:t>Color </a:t>
-            </a:r>
-            <a:r>
-              <a:rPr lang="en-US" altLang="zh-TW" dirty="0" err="1"/>
-              <a:t>Pikcing</a:t>
-            </a:r>
-            <a:r>
-              <a:rPr lang="en-US" altLang="zh-TW" dirty="0"/>
-              <a:t> Project</a:t>
-            </a:r>
             <a:endParaRPr lang="zh-TW" altLang="en-US" dirty="0"/>
           </a:p>
         </p:txBody>
@@ -18183,7 +19196,7 @@
           <p:cNvPr id="3" name="內容版面配置區 2">
             <a:extLst>
               <a:ext uri="{FF2B5EF4-FFF2-40B4-BE49-F238E27FC236}">
-                <a16:creationId xmlns:a16="http://schemas.microsoft.com/office/drawing/2014/main" id="{5C2571F1-765B-42C3-8AAC-2A8441E0FBA0}"/>
+                <a16:creationId xmlns:a16="http://schemas.microsoft.com/office/drawing/2014/main" id="{A5250B66-E56F-5AAD-0B99-C4E8E1B221C2}"/>
               </a:ext>
             </a:extLst>
           </p:cNvPr>
@@ -18199,74 +19212,14 @@
           <a:bodyPr/>
           <a:lstStyle/>
           <a:p>
-            <a:pPr marL="457200" lvl="1" indent="0">
-              <a:lnSpc>
-                <a:spcPct val="150000"/>
-              </a:lnSpc>
-              <a:buNone/>
-            </a:pPr>
-            <a:r>
-              <a:rPr lang="zh-TW" altLang="en-US" sz="2800" dirty="0">
-                <a:solidFill>
-                  <a:srgbClr val="FF0000"/>
-                </a:solidFill>
-              </a:rPr>
-              <a:t>目的</a:t>
-            </a:r>
-            <a:r>
-              <a:rPr lang="zh-TW" altLang="en-US" dirty="0"/>
-              <a:t> </a:t>
-            </a:r>
-            <a:r>
-              <a:rPr lang="en-US" altLang="zh-TW" dirty="0"/>
-              <a:t>:</a:t>
-            </a:r>
-            <a:r>
-              <a:rPr lang="zh-TW" altLang="en-US" dirty="0"/>
-              <a:t>  按壓</a:t>
-            </a:r>
-            <a:r>
-              <a:rPr lang="en-US" altLang="zh-TW" dirty="0"/>
-              <a:t>Color Sensor</a:t>
-            </a:r>
-            <a:r>
-              <a:rPr lang="zh-TW" altLang="en-US" dirty="0"/>
-              <a:t>選擇顏色、並透過筆在</a:t>
-            </a:r>
-            <a:r>
-              <a:rPr lang="en-US" altLang="zh-TW" dirty="0"/>
-              <a:t>Host</a:t>
-            </a:r>
-            <a:r>
-              <a:rPr lang="zh-TW" altLang="en-US" dirty="0"/>
-              <a:t>上畫出對應的顏色</a:t>
-            </a:r>
-            <a:endParaRPr lang="en-US" altLang="zh-TW" dirty="0"/>
-          </a:p>
-          <a:p>
-            <a:pPr marL="457200" lvl="1" indent="0">
-              <a:lnSpc>
-                <a:spcPct val="150000"/>
-              </a:lnSpc>
-              <a:buNone/>
-            </a:pPr>
-            <a:endParaRPr lang="en-US" altLang="zh-TW" dirty="0"/>
-          </a:p>
-          <a:p>
-            <a:pPr marL="457200" lvl="1" indent="0">
-              <a:lnSpc>
-                <a:spcPct val="150000"/>
-              </a:lnSpc>
-              <a:buNone/>
-            </a:pPr>
-            <a:endParaRPr lang="en-US" altLang="zh-TW" dirty="0"/>
+            <a:endParaRPr lang="zh-TW" altLang="en-US"/>
           </a:p>
         </p:txBody>
       </p:sp>
     </p:spTree>
     <p:extLst>
       <p:ext uri="{BB962C8B-B14F-4D97-AF65-F5344CB8AC3E}">
-        <p14:creationId xmlns:p14="http://schemas.microsoft.com/office/powerpoint/2010/main" val="263751651"/>
+        <p14:creationId xmlns:p14="http://schemas.microsoft.com/office/powerpoint/2010/main" val="2364024188"/>
       </p:ext>
     </p:extLst>
   </p:cSld>
@@ -18298,7 +19251,7 @@
           <p:cNvPr id="2" name="標題 1">
             <a:extLst>
               <a:ext uri="{FF2B5EF4-FFF2-40B4-BE49-F238E27FC236}">
-                <a16:creationId xmlns:a16="http://schemas.microsoft.com/office/drawing/2014/main" id="{36663CA0-2783-4A34-8C5A-24686BD0A02B}"/>
+                <a16:creationId xmlns:a16="http://schemas.microsoft.com/office/drawing/2014/main" id="{02C3FE11-1F15-4971-95B5-34F7811B7E8A}"/>
               </a:ext>
             </a:extLst>
           </p:cNvPr>
@@ -18316,9 +19269,18 @@
           <a:p>
             <a:pPr algn="ctr"/>
             <a:r>
-              <a:rPr lang="zh-TW" altLang="en-US" dirty="0"/>
-              <a:t>主要遇到的問題</a:t>
-            </a:r>
+              <a:rPr lang="en-US" altLang="zh-TW" dirty="0"/>
+              <a:t>Color </a:t>
+            </a:r>
+            <a:r>
+              <a:rPr lang="en-US" altLang="zh-TW" dirty="0" err="1"/>
+              <a:t>Pikcing</a:t>
+            </a:r>
+            <a:r>
+              <a:rPr lang="en-US" altLang="zh-TW" dirty="0"/>
+              <a:t> Project</a:t>
+            </a:r>
+            <a:endParaRPr lang="zh-TW" altLang="en-US" dirty="0"/>
           </a:p>
         </p:txBody>
       </p:sp>
@@ -18327,7 +19289,7 @@
           <p:cNvPr id="3" name="內容版面配置區 2">
             <a:extLst>
               <a:ext uri="{FF2B5EF4-FFF2-40B4-BE49-F238E27FC236}">
-                <a16:creationId xmlns:a16="http://schemas.microsoft.com/office/drawing/2014/main" id="{4EB3A3B7-3819-4E07-A5DF-C15C993A0B95}"/>
+                <a16:creationId xmlns:a16="http://schemas.microsoft.com/office/drawing/2014/main" id="{5C2571F1-765B-42C3-8AAC-2A8441E0FBA0}"/>
               </a:ext>
             </a:extLst>
           </p:cNvPr>
@@ -18343,144 +19305,66 @@
           <a:bodyPr/>
           <a:lstStyle/>
           <a:p>
-            <a:pPr marL="0" indent="0">
+            <a:pPr marL="457200" lvl="1" indent="0">
+              <a:lnSpc>
+                <a:spcPct val="150000"/>
+              </a:lnSpc>
               <a:buNone/>
             </a:pPr>
             <a:r>
-              <a:rPr lang="zh-TW" altLang="en-US" dirty="0">
+              <a:rPr lang="zh-TW" altLang="en-US" sz="2800" dirty="0">
                 <a:solidFill>
-                  <a:schemeClr val="accent1"/>
+                  <a:srgbClr val="FF0000"/>
                 </a:solidFill>
               </a:rPr>
-              <a:t>問題</a:t>
-            </a:r>
-            <a:endParaRPr lang="en-US" altLang="zh-TW" dirty="0">
-              <a:solidFill>
-                <a:schemeClr val="accent1"/>
-              </a:solidFill>
-            </a:endParaRPr>
-          </a:p>
-          <a:p>
-            <a:pPr marL="514350" indent="-514350">
-              <a:buAutoNum type="arabicPeriod"/>
+              <a:t>目的</a:t>
+            </a:r>
+            <a:r>
+              <a:rPr lang="zh-TW" altLang="en-US" dirty="0"/>
+              <a:t> </a:t>
+            </a:r>
+            <a:r>
+              <a:rPr lang="en-US" altLang="zh-TW" dirty="0"/>
+              <a:t>:</a:t>
+            </a:r>
+            <a:r>
+              <a:rPr lang="zh-TW" altLang="en-US" dirty="0"/>
+              <a:t>  按壓</a:t>
+            </a:r>
+            <a:r>
+              <a:rPr lang="en-US" altLang="zh-TW" dirty="0"/>
+              <a:t>Color Sensor</a:t>
+            </a:r>
+            <a:r>
+              <a:rPr lang="zh-TW" altLang="en-US" dirty="0"/>
+              <a:t>選擇顏色、並透過筆在</a:t>
+            </a:r>
+            <a:r>
+              <a:rPr lang="en-US" altLang="zh-TW" dirty="0"/>
+              <a:t>Host</a:t>
+            </a:r>
+            <a:r>
+              <a:rPr lang="zh-TW" altLang="en-US" dirty="0"/>
+              <a:t>上畫出對應的顏色</a:t>
+            </a:r>
+            <a:endParaRPr lang="en-US" altLang="zh-TW" dirty="0"/>
+          </a:p>
+          <a:p>
+            <a:pPr marL="457200" lvl="1" indent="0">
+              <a:lnSpc>
+                <a:spcPct val="150000"/>
+              </a:lnSpc>
+              <a:buNone/>
             </a:pPr>
             <a:endParaRPr lang="en-US" altLang="zh-TW" dirty="0"/>
           </a:p>
           <a:p>
-            <a:pPr marL="514350" indent="-514350">
-              <a:buAutoNum type="arabicPeriod"/>
-            </a:pPr>
-            <a:r>
-              <a:rPr lang="zh-TW" altLang="en-US" sz="2400" dirty="0">
-                <a:hlinkClick r:id="rId3" action="ppaction://hlinksldjump"/>
-              </a:rPr>
-              <a:t>傳輸問題 </a:t>
-            </a:r>
-            <a:r>
-              <a:rPr lang="en-US" altLang="zh-TW" sz="2400" dirty="0"/>
-              <a:t>:</a:t>
-            </a:r>
-            <a:r>
-              <a:rPr lang="zh-TW" altLang="en-US" sz="2400" dirty="0"/>
-              <a:t> </a:t>
-            </a:r>
-            <a:endParaRPr lang="en-US" altLang="zh-TW" sz="2400" dirty="0"/>
-          </a:p>
-          <a:p>
             <a:pPr marL="457200" lvl="1" indent="0">
+              <a:lnSpc>
+                <a:spcPct val="150000"/>
+              </a:lnSpc>
               <a:buNone/>
             </a:pPr>
-            <a:r>
-              <a:rPr lang="en-US" altLang="zh-TW" sz="2000" dirty="0"/>
-              <a:t>1.  Set UART</a:t>
-            </a:r>
-            <a:r>
-              <a:rPr lang="zh-TW" altLang="en-US" sz="2000" dirty="0"/>
-              <a:t> </a:t>
-            </a:r>
-            <a:r>
-              <a:rPr lang="en-US" altLang="zh-TW" sz="2000" dirty="0"/>
-              <a:t>RX</a:t>
-            </a:r>
-            <a:r>
-              <a:rPr lang="zh-TW" altLang="en-US" sz="2000" dirty="0"/>
-              <a:t> </a:t>
-            </a:r>
-            <a:r>
-              <a:rPr lang="en-US" altLang="zh-TW" sz="2000" dirty="0"/>
-              <a:t>Setting </a:t>
-            </a:r>
-            <a:r>
-              <a:rPr lang="zh-TW" altLang="en-US" sz="2000" dirty="0"/>
-              <a:t>以及 </a:t>
-            </a:r>
-            <a:r>
-              <a:rPr lang="en-US" altLang="zh-TW" sz="2000" dirty="0"/>
-              <a:t>Flow </a:t>
-            </a:r>
-            <a:r>
-              <a:rPr lang="zh-TW" altLang="en-US" sz="2000" dirty="0"/>
-              <a:t>規劃</a:t>
-            </a:r>
-            <a:endParaRPr lang="en-US" altLang="zh-TW" sz="2000" dirty="0"/>
-          </a:p>
-          <a:p>
-            <a:pPr marL="0" indent="0">
-              <a:buNone/>
-            </a:pPr>
-            <a:endParaRPr lang="en-US" altLang="zh-TW" sz="2400" dirty="0"/>
-          </a:p>
-          <a:p>
-            <a:pPr marL="457200" indent="-457200">
-              <a:buAutoNum type="arabicPeriod" startAt="2"/>
-            </a:pPr>
-            <a:r>
-              <a:rPr lang="zh-TW" altLang="en-US" sz="2400" dirty="0">
-                <a:hlinkClick r:id="rId4" action="ppaction://hlinksldjump"/>
-              </a:rPr>
-              <a:t>最接近顏色</a:t>
-            </a:r>
-            <a:r>
-              <a:rPr lang="en-US" altLang="zh-TW" sz="2400" dirty="0"/>
-              <a:t>:</a:t>
-            </a:r>
-          </a:p>
-          <a:p>
-            <a:pPr marL="914400" lvl="1" indent="-457200">
-              <a:buAutoNum type="arabicPeriod" startAt="2"/>
-            </a:pPr>
-            <a:r>
-              <a:rPr lang="zh-TW" altLang="en-US" sz="2000" dirty="0"/>
-              <a:t>筆的</a:t>
-            </a:r>
-            <a:r>
-              <a:rPr lang="en-US" altLang="zh-TW" sz="2000" dirty="0" err="1"/>
-              <a:t>Protocal</a:t>
-            </a:r>
-            <a:r>
-              <a:rPr lang="en-US" altLang="zh-TW" sz="2000" dirty="0"/>
-              <a:t> </a:t>
-            </a:r>
-            <a:r>
-              <a:rPr lang="zh-TW" altLang="en-US" sz="2000" dirty="0"/>
-              <a:t>定義的顏色只佔</a:t>
-            </a:r>
-            <a:r>
-              <a:rPr lang="en-US" altLang="zh-TW" sz="2000" dirty="0"/>
-              <a:t>RGB</a:t>
-            </a:r>
-            <a:r>
-              <a:rPr lang="zh-TW" altLang="en-US" sz="2000" dirty="0"/>
-              <a:t>裡面</a:t>
-            </a:r>
-            <a:r>
-              <a:rPr lang="en-US" altLang="zh-TW" sz="2000" dirty="0"/>
-              <a:t>200</a:t>
-            </a:r>
-            <a:r>
-              <a:rPr lang="zh-TW" altLang="en-US" sz="2000" dirty="0"/>
-              <a:t>多個</a:t>
-            </a:r>
             <a:endParaRPr lang="en-US" altLang="zh-TW" dirty="0"/>
           </a:p>
         </p:txBody>
@@ -18488,7 +19372,7 @@
     </p:spTree>
     <p:extLst>
       <p:ext uri="{BB962C8B-B14F-4D97-AF65-F5344CB8AC3E}">
-        <p14:creationId xmlns:p14="http://schemas.microsoft.com/office/powerpoint/2010/main" val="2576856385"/>
+        <p14:creationId xmlns:p14="http://schemas.microsoft.com/office/powerpoint/2010/main" val="263751651"/>
       </p:ext>
     </p:extLst>
   </p:cSld>
@@ -18684,7 +19568,7 @@
           <p:cNvPr id="2" name="標題 1">
             <a:extLst>
               <a:ext uri="{FF2B5EF4-FFF2-40B4-BE49-F238E27FC236}">
-                <a16:creationId xmlns:a16="http://schemas.microsoft.com/office/drawing/2014/main" id="{FEDEBC06-C75E-5899-979E-C29912B4A68E}"/>
+                <a16:creationId xmlns:a16="http://schemas.microsoft.com/office/drawing/2014/main" id="{36663CA0-2783-4A34-8C5A-24686BD0A02B}"/>
               </a:ext>
             </a:extLst>
           </p:cNvPr>
@@ -18702,10 +19586,9 @@
           <a:p>
             <a:pPr algn="ctr"/>
             <a:r>
-              <a:rPr lang="en-US" altLang="zh-TW" dirty="0"/>
-              <a:t>UART RX Setting</a:t>
-            </a:r>
-            <a:endParaRPr lang="zh-TW" altLang="en-US" dirty="0"/>
+              <a:rPr lang="zh-TW" altLang="en-US" dirty="0"/>
+              <a:t>主要遇到的問題</a:t>
+            </a:r>
           </a:p>
         </p:txBody>
       </p:sp>
@@ -18714,7 +19597,7 @@
           <p:cNvPr id="3" name="內容版面配置區 2">
             <a:extLst>
               <a:ext uri="{FF2B5EF4-FFF2-40B4-BE49-F238E27FC236}">
-                <a16:creationId xmlns:a16="http://schemas.microsoft.com/office/drawing/2014/main" id="{D33F5725-65BC-FF79-0EEB-A34DF7904932}"/>
+                <a16:creationId xmlns:a16="http://schemas.microsoft.com/office/drawing/2014/main" id="{4EB3A3B7-3819-4E07-A5DF-C15C993A0B95}"/>
               </a:ext>
             </a:extLst>
           </p:cNvPr>
@@ -18727,79 +19610,155 @@
         </p:nvSpPr>
         <p:spPr/>
         <p:txBody>
-          <a:bodyPr>
-            <a:normAutofit/>
-          </a:bodyPr>
-          <a:lstStyle/>
+          <a:bodyPr/>
+          <a:lstStyle/>
+          <a:p>
+            <a:pPr marL="0" indent="0">
+              <a:buNone/>
+            </a:pPr>
+            <a:r>
+              <a:rPr lang="zh-TW" altLang="en-US" dirty="0">
+                <a:solidFill>
+                  <a:schemeClr val="accent1"/>
+                </a:solidFill>
+              </a:rPr>
+              <a:t>問題</a:t>
+            </a:r>
+            <a:endParaRPr lang="en-US" altLang="zh-TW" dirty="0">
+              <a:solidFill>
+                <a:schemeClr val="accent1"/>
+              </a:solidFill>
+            </a:endParaRPr>
+          </a:p>
           <a:p>
             <a:pPr marL="514350" indent="-514350">
               <a:buAutoNum type="arabicPeriod"/>
             </a:pPr>
-            <a:r>
-              <a:rPr lang="en-US" altLang="zh-TW" sz="2000" dirty="0"/>
-              <a:t>UART</a:t>
-            </a:r>
-            <a:r>
-              <a:rPr lang="zh-TW" altLang="en-US" sz="2000" dirty="0"/>
-              <a:t> </a:t>
-            </a:r>
-            <a:r>
-              <a:rPr lang="en-US" altLang="zh-TW" sz="2000" dirty="0"/>
-              <a:t>RX</a:t>
-            </a:r>
-            <a:r>
-              <a:rPr lang="zh-TW" altLang="en-US" sz="2000" dirty="0"/>
-              <a:t> 使用</a:t>
-            </a:r>
-            <a:r>
-              <a:rPr lang="en-US" altLang="zh-TW" sz="2000" dirty="0"/>
-              <a:t>FIFO</a:t>
-            </a:r>
-            <a:r>
-              <a:rPr lang="zh-TW" altLang="en-US" sz="2000" dirty="0"/>
-              <a:t> 架構、這個</a:t>
-            </a:r>
-            <a:r>
-              <a:rPr lang="en-US" altLang="zh-TW" sz="2000" dirty="0"/>
-              <a:t>FIFO</a:t>
-            </a:r>
-            <a:r>
-              <a:rPr lang="zh-TW" altLang="en-US" sz="2000" dirty="0"/>
-              <a:t>架構是被封裝過。</a:t>
-            </a:r>
-            <a:endParaRPr lang="en-US" altLang="zh-TW" sz="2000" dirty="0"/>
+            <a:endParaRPr lang="en-US" altLang="zh-TW" dirty="0"/>
           </a:p>
           <a:p>
             <a:pPr marL="514350" indent="-514350">
               <a:buAutoNum type="arabicPeriod"/>
             </a:pPr>
+            <a:r>
+              <a:rPr lang="zh-TW" altLang="en-US" sz="2400" dirty="0">
+                <a:hlinkClick r:id="rId3" action="ppaction://hlinksldjump"/>
+              </a:rPr>
+              <a:t>傳輸問題 </a:t>
+            </a:r>
+            <a:r>
+              <a:rPr lang="en-US" altLang="zh-TW" sz="2400" dirty="0"/>
+              <a:t>:</a:t>
+            </a:r>
+            <a:r>
+              <a:rPr lang="zh-TW" altLang="en-US" sz="2400" dirty="0"/>
+              <a:t> </a:t>
+            </a:r>
+            <a:endParaRPr lang="en-US" altLang="zh-TW" sz="2400" dirty="0"/>
+          </a:p>
+          <a:p>
+            <a:pPr marL="457200" lvl="1" indent="0">
+              <a:buNone/>
+            </a:pPr>
+            <a:r>
+              <a:rPr lang="en-US" altLang="zh-TW" sz="2000" dirty="0"/>
+              <a:t>1.  Set UART</a:t>
+            </a:r>
+            <a:r>
+              <a:rPr lang="zh-TW" altLang="en-US" sz="2000" dirty="0"/>
+              <a:t> </a:t>
+            </a:r>
+            <a:r>
+              <a:rPr lang="en-US" altLang="zh-TW" sz="2000" dirty="0"/>
+              <a:t>RX</a:t>
+            </a:r>
+            <a:r>
+              <a:rPr lang="zh-TW" altLang="en-US" sz="2000" dirty="0"/>
+              <a:t> </a:t>
+            </a:r>
+            <a:r>
+              <a:rPr lang="en-US" altLang="zh-TW" sz="2000" dirty="0"/>
+              <a:t>Setting </a:t>
+            </a:r>
+            <a:r>
+              <a:rPr lang="zh-TW" altLang="en-US" sz="2000" dirty="0"/>
+              <a:t>以及 </a:t>
+            </a:r>
+            <a:r>
+              <a:rPr lang="en-US" altLang="zh-TW" sz="2000" dirty="0"/>
+              <a:t>Flow </a:t>
+            </a:r>
+            <a:r>
+              <a:rPr lang="zh-TW" altLang="en-US" sz="2000" dirty="0"/>
+              <a:t>規劃</a:t>
+            </a:r>
             <a:endParaRPr lang="en-US" altLang="zh-TW" sz="2000" dirty="0"/>
           </a:p>
           <a:p>
-            <a:pPr marL="514350" indent="-514350">
-              <a:buAutoNum type="arabicPeriod"/>
+            <a:pPr marL="0" indent="0">
+              <a:buNone/>
             </a:pPr>
-            <a:endParaRPr lang="en-US" altLang="zh-TW" sz="2000" dirty="0"/>
-          </a:p>
-          <a:p>
-            <a:pPr marL="514350" indent="-514350">
-              <a:buAutoNum type="arabicPeriod"/>
+            <a:endParaRPr lang="en-US" altLang="zh-TW" sz="2400" dirty="0"/>
+          </a:p>
+          <a:p>
+            <a:pPr marL="457200" indent="-457200">
+              <a:buAutoNum type="arabicPeriod" startAt="2"/>
             </a:pPr>
             <a:r>
+              <a:rPr lang="zh-TW" altLang="en-US" sz="2400" dirty="0">
+                <a:hlinkClick r:id="rId4" action="ppaction://hlinksldjump"/>
+              </a:rPr>
+              <a:t>最接近顏色</a:t>
+            </a:r>
+            <a:r>
+              <a:rPr lang="en-US" altLang="zh-TW" sz="2400" dirty="0"/>
+              <a:t>:</a:t>
+            </a:r>
+          </a:p>
+          <a:p>
+            <a:pPr marL="914400" lvl="1" indent="-457200">
+              <a:buAutoNum type="arabicPeriod" startAt="2"/>
+            </a:pPr>
+            <a:r>
+              <a:rPr lang="zh-TW" altLang="en-US" sz="2000" dirty="0"/>
+              <a:t>筆的</a:t>
+            </a:r>
+            <a:r>
+              <a:rPr lang="en-US" altLang="zh-TW" sz="2000" dirty="0" err="1"/>
+              <a:t>Protocal</a:t>
+            </a:r>
+            <a:r>
               <a:rPr lang="en-US" altLang="zh-TW" sz="2000" dirty="0"/>
-              <a:t>UART RX</a:t>
+              <a:t> </a:t>
             </a:r>
             <a:r>
               <a:rPr lang="zh-TW" altLang="en-US" sz="2000" dirty="0"/>
-              <a:t> 中斷硬體設計</a:t>
-            </a:r>
+              <a:t>定義的顏色只佔</a:t>
+            </a:r>
+            <a:r>
+              <a:rPr lang="en-US" altLang="zh-TW" sz="2000" dirty="0"/>
+              <a:t>RGB</a:t>
+            </a:r>
+            <a:r>
+              <a:rPr lang="zh-TW" altLang="en-US" sz="2000" dirty="0"/>
+              <a:t>裡面</a:t>
+            </a:r>
+            <a:r>
+              <a:rPr lang="en-US" altLang="zh-TW" sz="2000" dirty="0"/>
+              <a:t>200</a:t>
+            </a:r>
+            <a:r>
+              <a:rPr lang="zh-TW" altLang="en-US" sz="2000" dirty="0"/>
+              <a:t>多個</a:t>
+            </a:r>
+            <a:endParaRPr lang="en-US" altLang="zh-TW" dirty="0"/>
           </a:p>
         </p:txBody>
       </p:sp>
     </p:spTree>
     <p:extLst>
       <p:ext uri="{BB962C8B-B14F-4D97-AF65-F5344CB8AC3E}">
-        <p14:creationId xmlns:p14="http://schemas.microsoft.com/office/powerpoint/2010/main" val="3743749783"/>
+        <p14:creationId xmlns:p14="http://schemas.microsoft.com/office/powerpoint/2010/main" val="2576856385"/>
       </p:ext>
     </p:extLst>
   </p:cSld>
@@ -18879,16 +19838,12 @@
           </a:bodyPr>
           <a:lstStyle/>
           <a:p>
-            <a:pPr marL="0" indent="0">
-              <a:buNone/>
+            <a:pPr marL="514350" indent="-514350">
+              <a:buAutoNum type="arabicPeriod"/>
             </a:pPr>
             <a:r>
-              <a:rPr lang="zh-TW" altLang="en-US" sz="2000" dirty="0"/>
-              <a:t>總結 </a:t>
-            </a:r>
-            <a:r>
               <a:rPr lang="en-US" altLang="zh-TW" sz="2000" dirty="0"/>
-              <a:t>:</a:t>
+              <a:t>UART</a:t>
             </a:r>
             <a:r>
               <a:rPr lang="zh-TW" altLang="en-US" sz="2000" dirty="0"/>
@@ -18896,44 +19851,61 @@
             </a:r>
             <a:r>
               <a:rPr lang="en-US" altLang="zh-TW" sz="2000" dirty="0"/>
-              <a:t> </a:t>
+              <a:t>RX</a:t>
             </a:r>
             <a:r>
               <a:rPr lang="zh-TW" altLang="en-US" sz="2000" dirty="0"/>
-              <a:t>由於使用情況是使用者隨時可能會去觸動後發</a:t>
+              <a:t> 使用</a:t>
             </a:r>
             <a:r>
               <a:rPr lang="en-US" altLang="zh-TW" sz="2000" dirty="0"/>
-              <a:t>Sensor</a:t>
+              <a:t>FIFO</a:t>
             </a:r>
             <a:r>
               <a:rPr lang="zh-TW" altLang="en-US" sz="2000" dirty="0"/>
-              <a:t>、筆本身還要</a:t>
+              <a:t> 架構、這個</a:t>
             </a:r>
             <a:r>
               <a:rPr lang="en-US" altLang="zh-TW" sz="2000" dirty="0"/>
-              <a:t>Decode </a:t>
+              <a:t>FIFO</a:t>
             </a:r>
             <a:r>
               <a:rPr lang="zh-TW" altLang="en-US" sz="2000" dirty="0"/>
-              <a:t>訊號，因此中斷是最佳方法，</a:t>
-            </a:r>
+              <a:t>架構是被封裝過。</a:t>
+            </a:r>
+            <a:endParaRPr lang="en-US" altLang="zh-TW" sz="2000" dirty="0"/>
+          </a:p>
+          <a:p>
+            <a:pPr marL="514350" indent="-514350">
+              <a:buAutoNum type="arabicPeriod"/>
+            </a:pPr>
+            <a:endParaRPr lang="en-US" altLang="zh-TW" sz="2000" dirty="0"/>
+          </a:p>
+          <a:p>
+            <a:pPr marL="514350" indent="-514350">
+              <a:buAutoNum type="arabicPeriod"/>
+            </a:pPr>
+            <a:endParaRPr lang="en-US" altLang="zh-TW" sz="2000" dirty="0"/>
+          </a:p>
+          <a:p>
+            <a:pPr marL="514350" indent="-514350">
+              <a:buAutoNum type="arabicPeriod"/>
+            </a:pPr>
             <a:r>
               <a:rPr lang="en-US" altLang="zh-TW" sz="2000" dirty="0"/>
-              <a:t>Polling </a:t>
+              <a:t>UART RX</a:t>
             </a:r>
             <a:r>
               <a:rPr lang="zh-TW" altLang="en-US" sz="2000" dirty="0"/>
-              <a:t>去偵測就不是好方法並且耗電</a:t>
-            </a:r>
-            <a:endParaRPr lang="en-US" altLang="zh-TW" sz="2000" dirty="0"/>
+              <a:t> 中斷硬體設計</a:t>
+            </a:r>
           </a:p>
         </p:txBody>
       </p:sp>
     </p:spTree>
     <p:extLst>
       <p:ext uri="{BB962C8B-B14F-4D97-AF65-F5344CB8AC3E}">
-        <p14:creationId xmlns:p14="http://schemas.microsoft.com/office/powerpoint/2010/main" val="1764172780"/>
+        <p14:creationId xmlns:p14="http://schemas.microsoft.com/office/powerpoint/2010/main" val="3743749783"/>
       </p:ext>
     </p:extLst>
   </p:cSld>
@@ -18965,7 +19937,7 @@
           <p:cNvPr id="2" name="標題 1">
             <a:extLst>
               <a:ext uri="{FF2B5EF4-FFF2-40B4-BE49-F238E27FC236}">
-                <a16:creationId xmlns:a16="http://schemas.microsoft.com/office/drawing/2014/main" id="{DCAF803D-3CAB-3E11-8A90-4D5310A3A5EA}"/>
+                <a16:creationId xmlns:a16="http://schemas.microsoft.com/office/drawing/2014/main" id="{FEDEBC06-C75E-5899-979E-C29912B4A68E}"/>
               </a:ext>
             </a:extLst>
           </p:cNvPr>
@@ -18995,7 +19967,7 @@
           <p:cNvPr id="3" name="內容版面配置區 2">
             <a:extLst>
               <a:ext uri="{FF2B5EF4-FFF2-40B4-BE49-F238E27FC236}">
-                <a16:creationId xmlns:a16="http://schemas.microsoft.com/office/drawing/2014/main" id="{3B1B8A68-518A-9A03-2325-0016A63D6547}"/>
+                <a16:creationId xmlns:a16="http://schemas.microsoft.com/office/drawing/2014/main" id="{D33F5725-65BC-FF79-0EEB-A34DF7904932}"/>
               </a:ext>
             </a:extLst>
           </p:cNvPr>
@@ -19008,151 +19980,66 @@
         </p:nvSpPr>
         <p:spPr/>
         <p:txBody>
-          <a:bodyPr/>
+          <a:bodyPr>
+            <a:normAutofit/>
+          </a:bodyPr>
           <a:lstStyle/>
           <a:p>
             <a:pPr marL="0" indent="0">
               <a:buNone/>
             </a:pPr>
             <a:r>
-              <a:rPr lang="zh-TW" altLang="en-US" dirty="0">
-                <a:solidFill>
-                  <a:schemeClr val="accent1"/>
-                </a:solidFill>
-              </a:rPr>
-              <a:t>過程中遇到最大問題 </a:t>
-            </a:r>
-            <a:r>
-              <a:rPr lang="en-US" altLang="zh-TW" dirty="0">
-                <a:solidFill>
-                  <a:schemeClr val="accent1"/>
-                </a:solidFill>
-              </a:rPr>
-              <a:t>: </a:t>
-            </a:r>
-          </a:p>
-          <a:p>
-            <a:pPr marL="0" indent="0">
-              <a:buNone/>
-            </a:pPr>
-            <a:r>
-              <a:rPr lang="zh-TW" altLang="en-US" sz="2400" dirty="0"/>
-              <a:t>收完</a:t>
-            </a:r>
-            <a:r>
-              <a:rPr lang="en-US" altLang="zh-TW" sz="2400" dirty="0"/>
-              <a:t>Sensor Data</a:t>
-            </a:r>
-            <a:r>
-              <a:rPr lang="zh-TW" altLang="en-US" sz="2400" dirty="0"/>
-              <a:t>後，顯示資料卻有漏東漏西</a:t>
-            </a:r>
-            <a:endParaRPr lang="en-US" altLang="zh-TW" sz="2400" dirty="0"/>
-          </a:p>
-          <a:p>
-            <a:pPr marL="0" indent="0">
-              <a:buNone/>
-            </a:pPr>
-            <a:r>
-              <a:rPr lang="en-US" altLang="zh-TW" sz="2400" dirty="0"/>
-              <a:t>Source</a:t>
-            </a:r>
-          </a:p>
-          <a:p>
-            <a:pPr marL="0" indent="0">
-              <a:buNone/>
-            </a:pPr>
-            <a:r>
-              <a:rPr lang="en-US" altLang="zh-TW" sz="2400" dirty="0"/>
-              <a:t>1 . </a:t>
-            </a:r>
-            <a:r>
-              <a:rPr lang="zh-TW" altLang="en-US" sz="2400" dirty="0"/>
-              <a:t> 硬體觸發設定 </a:t>
-            </a:r>
-            <a:r>
-              <a:rPr lang="en-US" altLang="zh-TW" sz="2400" dirty="0"/>
-              <a:t>: 4Bytes -&gt; 1Bytes</a:t>
-            </a:r>
-          </a:p>
-          <a:p>
-            <a:pPr marL="0" indent="0">
-              <a:buNone/>
-            </a:pPr>
-            <a:r>
-              <a:rPr lang="en-US" altLang="zh-TW" sz="2400" dirty="0"/>
-              <a:t>2. </a:t>
-            </a:r>
-            <a:r>
-              <a:rPr lang="zh-TW" altLang="en-US" sz="2400" dirty="0"/>
+              <a:rPr lang="zh-TW" altLang="en-US" sz="2000" dirty="0"/>
+              <a:t>總結 </a:t>
+            </a:r>
+            <a:r>
+              <a:rPr lang="en-US" altLang="zh-TW" sz="2000" dirty="0"/>
+              <a:t>:</a:t>
+            </a:r>
+            <a:r>
+              <a:rPr lang="zh-TW" altLang="en-US" sz="2000" dirty="0"/>
               <a:t> </a:t>
             </a:r>
             <a:r>
-              <a:rPr lang="zh-TW" altLang="en-US" sz="2400" dirty="0">
-                <a:solidFill>
-                  <a:srgbClr val="FF0000"/>
-                </a:solidFill>
-              </a:rPr>
-              <a:t>解除中斷</a:t>
-            </a:r>
-            <a:r>
-              <a:rPr lang="en-US" altLang="zh-TW" sz="2400" dirty="0">
-                <a:solidFill>
-                  <a:srgbClr val="FF0000"/>
-                </a:solidFill>
-              </a:rPr>
-              <a:t>Event </a:t>
-            </a:r>
-            <a:r>
-              <a:rPr lang="en-US" altLang="zh-TW" sz="2400" dirty="0" err="1">
-                <a:solidFill>
-                  <a:srgbClr val="FF0000"/>
-                </a:solidFill>
-              </a:rPr>
-              <a:t>regestier</a:t>
-            </a:r>
-            <a:r>
-              <a:rPr lang="zh-TW" altLang="en-US" sz="2400" dirty="0">
-                <a:solidFill>
-                  <a:srgbClr val="FF0000"/>
-                </a:solidFill>
-              </a:rPr>
-              <a:t>在</a:t>
-            </a:r>
-            <a:r>
-              <a:rPr lang="en-US" altLang="zh-TW" sz="2400" dirty="0">
-                <a:solidFill>
-                  <a:srgbClr val="FF0000"/>
-                </a:solidFill>
-              </a:rPr>
-              <a:t>Code</a:t>
-            </a:r>
-            <a:r>
-              <a:rPr lang="zh-TW" altLang="en-US" sz="2400" dirty="0">
-                <a:solidFill>
-                  <a:srgbClr val="FF0000"/>
-                </a:solidFill>
-              </a:rPr>
-              <a:t>中的位置</a:t>
-            </a:r>
-            <a:endParaRPr lang="en-US" altLang="zh-TW" sz="2400" dirty="0">
-              <a:solidFill>
-                <a:srgbClr val="FF0000"/>
-              </a:solidFill>
-            </a:endParaRPr>
-          </a:p>
-          <a:p>
-            <a:pPr marL="0" indent="0">
-              <a:buNone/>
-            </a:pPr>
-            <a:endParaRPr lang="zh-TW" altLang="en-US" dirty="0"/>
+              <a:rPr lang="en-US" altLang="zh-TW" sz="2000" dirty="0"/>
+              <a:t> </a:t>
+            </a:r>
+            <a:r>
+              <a:rPr lang="zh-TW" altLang="en-US" sz="2000" dirty="0"/>
+              <a:t>由於使用情況是使用者隨時可能會去觸動後發</a:t>
+            </a:r>
+            <a:r>
+              <a:rPr lang="en-US" altLang="zh-TW" sz="2000" dirty="0"/>
+              <a:t>Sensor</a:t>
+            </a:r>
+            <a:r>
+              <a:rPr lang="zh-TW" altLang="en-US" sz="2000" dirty="0"/>
+              <a:t>、筆本身還要</a:t>
+            </a:r>
+            <a:r>
+              <a:rPr lang="en-US" altLang="zh-TW" sz="2000" dirty="0"/>
+              <a:t>Decode </a:t>
+            </a:r>
+            <a:r>
+              <a:rPr lang="zh-TW" altLang="en-US" sz="2000" dirty="0"/>
+              <a:t>訊號，因此中斷是最佳方法，</a:t>
+            </a:r>
+            <a:r>
+              <a:rPr lang="en-US" altLang="zh-TW" sz="2000" dirty="0"/>
+              <a:t>Polling </a:t>
+            </a:r>
+            <a:r>
+              <a:rPr lang="zh-TW" altLang="en-US" sz="2000" dirty="0"/>
+              <a:t>去偵測就不是好方法並且耗電</a:t>
+            </a:r>
+            <a:endParaRPr lang="en-US" altLang="zh-TW" sz="2000" dirty="0"/>
           </a:p>
         </p:txBody>
       </p:sp>
     </p:spTree>
     <p:extLst>
       <p:ext uri="{BB962C8B-B14F-4D97-AF65-F5344CB8AC3E}">
-        <p14:creationId xmlns:p14="http://schemas.microsoft.com/office/powerpoint/2010/main" val="719165155"/>
+        <p14:creationId xmlns:p14="http://schemas.microsoft.com/office/powerpoint/2010/main" val="1764172780"/>
       </p:ext>
     </p:extLst>
   </p:cSld>
@@ -19184,7 +20071,7 @@
           <p:cNvPr id="2" name="標題 1">
             <a:extLst>
               <a:ext uri="{FF2B5EF4-FFF2-40B4-BE49-F238E27FC236}">
-                <a16:creationId xmlns:a16="http://schemas.microsoft.com/office/drawing/2014/main" id="{A90C3E7E-AE4E-452E-A66F-A6DA326A606E}"/>
+                <a16:creationId xmlns:a16="http://schemas.microsoft.com/office/drawing/2014/main" id="{DCAF803D-3CAB-3E11-8A90-4D5310A3A5EA}"/>
               </a:ext>
             </a:extLst>
           </p:cNvPr>
@@ -19202,8 +20089,8 @@
           <a:p>
             <a:pPr algn="ctr"/>
             <a:r>
-              <a:rPr lang="zh-TW" altLang="en-US" sz="4400" dirty="0"/>
-              <a:t>最接近顏色</a:t>
+              <a:rPr lang="en-US" altLang="zh-TW" dirty="0"/>
+              <a:t>UART RX Setting</a:t>
             </a:r>
             <a:endParaRPr lang="zh-TW" altLang="en-US" dirty="0"/>
           </a:p>
@@ -19214,7 +20101,7 @@
           <p:cNvPr id="3" name="內容版面配置區 2">
             <a:extLst>
               <a:ext uri="{FF2B5EF4-FFF2-40B4-BE49-F238E27FC236}">
-                <a16:creationId xmlns:a16="http://schemas.microsoft.com/office/drawing/2014/main" id="{2270879B-7395-4917-86B4-47F549C5A985}"/>
+                <a16:creationId xmlns:a16="http://schemas.microsoft.com/office/drawing/2014/main" id="{3B1B8A68-518A-9A03-2325-0016A63D6547}"/>
               </a:ext>
             </a:extLst>
           </p:cNvPr>
@@ -19234,89 +20121,144 @@
               <a:buNone/>
             </a:pPr>
             <a:r>
-              <a:rPr lang="en-US" altLang="zh-TW" dirty="0"/>
-              <a:t>Root Cause :</a:t>
-            </a:r>
-          </a:p>
-          <a:p>
-            <a:pPr marL="514350" indent="-514350">
-              <a:buAutoNum type="arabicPeriod"/>
-            </a:pPr>
-            <a:r>
-              <a:rPr lang="en-US" altLang="zh-TW" dirty="0"/>
-              <a:t>Sensor </a:t>
-            </a:r>
-            <a:r>
-              <a:rPr lang="zh-TW" altLang="en-US" dirty="0"/>
-              <a:t>傳輸的顏色，並不一定落在</a:t>
-            </a:r>
-            <a:r>
-              <a:rPr lang="en-US" altLang="zh-TW" dirty="0"/>
-              <a:t>USI</a:t>
-            </a:r>
-            <a:r>
-              <a:rPr lang="zh-TW" altLang="en-US" dirty="0"/>
-              <a:t>所定義的顏色，因此需要找到最接近的顏色。</a:t>
-            </a:r>
-            <a:endParaRPr lang="en-US" altLang="zh-TW" dirty="0"/>
-          </a:p>
-          <a:p>
-            <a:pPr marL="514350" indent="-514350">
-              <a:buAutoNum type="arabicPeriod"/>
-            </a:pPr>
-            <a:endParaRPr lang="en-US" altLang="zh-TW" dirty="0"/>
+              <a:rPr lang="zh-TW" altLang="en-US" dirty="0">
+                <a:solidFill>
+                  <a:schemeClr val="accent1"/>
+                </a:solidFill>
+              </a:rPr>
+              <a:t>過程中遇到最大問題 </a:t>
+            </a:r>
+            <a:r>
+              <a:rPr lang="en-US" altLang="zh-TW" dirty="0">
+                <a:solidFill>
+                  <a:schemeClr val="accent1"/>
+                </a:solidFill>
+              </a:rPr>
+              <a:t>: </a:t>
+            </a:r>
           </a:p>
           <a:p>
             <a:pPr marL="0" indent="0">
               <a:buNone/>
             </a:pPr>
             <a:r>
-              <a:rPr lang="en-US" altLang="zh-TW" dirty="0"/>
-              <a:t>Solve :</a:t>
-            </a:r>
+              <a:rPr lang="zh-TW" altLang="en-US" sz="2400" dirty="0"/>
+              <a:t>收完</a:t>
+            </a:r>
+            <a:r>
+              <a:rPr lang="en-US" altLang="zh-TW" sz="2400" dirty="0"/>
+              <a:t>Sensor Data</a:t>
+            </a:r>
+            <a:r>
+              <a:rPr lang="zh-TW" altLang="en-US" sz="2400" dirty="0"/>
+              <a:t>後，顯示資料卻有漏東漏西</a:t>
+            </a:r>
+            <a:endParaRPr lang="en-US" altLang="zh-TW" sz="2400" dirty="0"/>
           </a:p>
           <a:p>
             <a:pPr marL="0" indent="0">
               <a:buNone/>
             </a:pPr>
             <a:r>
-              <a:rPr lang="en-US" altLang="zh-TW" dirty="0"/>
-              <a:t>	1. </a:t>
-            </a:r>
-            <a:r>
-              <a:rPr lang="zh-TW" altLang="en-US" dirty="0"/>
-              <a:t>顏色距離定義</a:t>
-            </a:r>
-            <a:endParaRPr lang="en-US" altLang="zh-TW" dirty="0"/>
+              <a:rPr lang="en-US" altLang="zh-TW" sz="2400" dirty="0"/>
+              <a:t>Source</a:t>
+            </a:r>
           </a:p>
           <a:p>
             <a:pPr marL="0" indent="0">
               <a:buNone/>
             </a:pPr>
             <a:r>
-              <a:rPr lang="en-US" altLang="zh-TW" dirty="0"/>
-              <a:t>	2.  </a:t>
-            </a:r>
-            <a:r>
-              <a:rPr lang="zh-TW" altLang="en-US" dirty="0"/>
-              <a:t>使用</a:t>
-            </a:r>
-            <a:r>
-              <a:rPr lang="en-US" altLang="zh-TW" dirty="0" err="1"/>
-              <a:t>matlab</a:t>
-            </a:r>
-            <a:r>
-              <a:rPr lang="zh-TW" altLang="en-US" dirty="0"/>
-              <a:t>來加速驗證速度</a:t>
-            </a:r>
-            <a:endParaRPr lang="en-US" altLang="zh-TW" dirty="0"/>
+              <a:rPr lang="en-US" altLang="zh-TW" sz="2400" dirty="0"/>
+              <a:t>1 . </a:t>
+            </a:r>
+            <a:r>
+              <a:rPr lang="zh-TW" altLang="en-US" sz="2400" dirty="0"/>
+              <a:t> 硬體觸發設定 </a:t>
+            </a:r>
+            <a:r>
+              <a:rPr lang="en-US" altLang="zh-TW" sz="2400" dirty="0"/>
+              <a:t>: 4Bytes -&gt; 1Bytes</a:t>
+            </a:r>
+          </a:p>
+          <a:p>
+            <a:pPr marL="0" indent="0">
+              <a:buNone/>
+            </a:pPr>
+            <a:r>
+              <a:rPr lang="en-US" altLang="zh-TW" sz="2400" dirty="0"/>
+              <a:t>2. </a:t>
+            </a:r>
+            <a:r>
+              <a:rPr lang="zh-TW" altLang="en-US" sz="2400" dirty="0"/>
+              <a:t> </a:t>
+            </a:r>
+            <a:r>
+              <a:rPr lang="zh-TW" altLang="en-US" sz="2400" dirty="0">
+                <a:solidFill>
+                  <a:srgbClr val="FF0000"/>
+                </a:solidFill>
+              </a:rPr>
+              <a:t>解除中斷</a:t>
+            </a:r>
+            <a:r>
+              <a:rPr lang="en-US" altLang="zh-TW" sz="2400" dirty="0">
+                <a:solidFill>
+                  <a:srgbClr val="FF0000"/>
+                </a:solidFill>
+              </a:rPr>
+              <a:t>Event </a:t>
+            </a:r>
+            <a:r>
+              <a:rPr lang="en-US" altLang="zh-TW" sz="2400" dirty="0" err="1">
+                <a:solidFill>
+                  <a:srgbClr val="FF0000"/>
+                </a:solidFill>
+              </a:rPr>
+              <a:t>regestier</a:t>
+            </a:r>
+            <a:r>
+              <a:rPr lang="zh-TW" altLang="en-US" sz="2400" dirty="0">
+                <a:solidFill>
+                  <a:srgbClr val="FF0000"/>
+                </a:solidFill>
+              </a:rPr>
+              <a:t>在</a:t>
+            </a:r>
+            <a:r>
+              <a:rPr lang="en-US" altLang="zh-TW" sz="2400" dirty="0">
+                <a:solidFill>
+                  <a:srgbClr val="FF0000"/>
+                </a:solidFill>
+              </a:rPr>
+              <a:t>Code</a:t>
+            </a:r>
+            <a:r>
+              <a:rPr lang="zh-TW" altLang="en-US" sz="2400" dirty="0">
+                <a:solidFill>
+                  <a:srgbClr val="FF0000"/>
+                </a:solidFill>
+              </a:rPr>
+              <a:t>中的位置</a:t>
+            </a:r>
+            <a:endParaRPr lang="en-US" altLang="zh-TW" sz="2400" dirty="0">
+              <a:solidFill>
+                <a:srgbClr val="FF0000"/>
+              </a:solidFill>
+            </a:endParaRPr>
+          </a:p>
+          <a:p>
+            <a:pPr marL="0" indent="0">
+              <a:buNone/>
+            </a:pPr>
+            <a:endParaRPr lang="zh-TW" altLang="en-US" dirty="0"/>
           </a:p>
         </p:txBody>
       </p:sp>
     </p:spTree>
     <p:extLst>
       <p:ext uri="{BB962C8B-B14F-4D97-AF65-F5344CB8AC3E}">
-        <p14:creationId xmlns:p14="http://schemas.microsoft.com/office/powerpoint/2010/main" val="2172983373"/>
+        <p14:creationId xmlns:p14="http://schemas.microsoft.com/office/powerpoint/2010/main" val="719165155"/>
       </p:ext>
     </p:extLst>
   </p:cSld>
@@ -19348,7 +20290,7 @@
           <p:cNvPr id="2" name="標題 1">
             <a:extLst>
               <a:ext uri="{FF2B5EF4-FFF2-40B4-BE49-F238E27FC236}">
-                <a16:creationId xmlns:a16="http://schemas.microsoft.com/office/drawing/2014/main" id="{77C37F21-5DBA-B401-7D71-7CFB5E6E6C5D}"/>
+                <a16:creationId xmlns:a16="http://schemas.microsoft.com/office/drawing/2014/main" id="{A90C3E7E-AE4E-452E-A66F-A6DA326A606E}"/>
               </a:ext>
             </a:extLst>
           </p:cNvPr>
@@ -19366,21 +20308,10 @@
           <a:p>
             <a:pPr algn="ctr"/>
             <a:r>
-              <a:rPr lang="zh-TW" altLang="en-US" dirty="0"/>
-              <a:t> </a:t>
-            </a:r>
-            <a:r>
-              <a:rPr lang="en-US" altLang="zh-TW" dirty="0" err="1"/>
-              <a:t>Matlab</a:t>
-            </a:r>
-            <a:r>
-              <a:rPr lang="en-US" altLang="zh-TW" dirty="0"/>
-              <a:t> </a:t>
-            </a:r>
-            <a:r>
-              <a:rPr lang="zh-TW" altLang="en-US" dirty="0"/>
-              <a:t>驗證</a:t>
-            </a:r>
+              <a:rPr lang="zh-TW" altLang="en-US" sz="4400" dirty="0"/>
+              <a:t>最接近顏色</a:t>
+            </a:r>
+            <a:endParaRPr lang="zh-TW" altLang="en-US" dirty="0"/>
           </a:p>
         </p:txBody>
       </p:sp>
@@ -19389,7 +20320,7 @@
           <p:cNvPr id="3" name="內容版面配置區 2">
             <a:extLst>
               <a:ext uri="{FF2B5EF4-FFF2-40B4-BE49-F238E27FC236}">
-                <a16:creationId xmlns:a16="http://schemas.microsoft.com/office/drawing/2014/main" id="{534E79D0-3692-7581-7815-5DEF93BC5DAC}"/>
+                <a16:creationId xmlns:a16="http://schemas.microsoft.com/office/drawing/2014/main" id="{2270879B-7395-4917-86B4-47F549C5A985}"/>
               </a:ext>
             </a:extLst>
           </p:cNvPr>
@@ -19410,27 +20341,88 @@
             </a:pPr>
             <a:r>
               <a:rPr lang="en-US" altLang="zh-TW" dirty="0"/>
-              <a:t>Use </a:t>
+              <a:t>Root Cause :</a:t>
+            </a:r>
+          </a:p>
+          <a:p>
+            <a:pPr marL="514350" indent="-514350">
+              <a:buAutoNum type="arabicPeriod"/>
+            </a:pPr>
+            <a:r>
+              <a:rPr lang="en-US" altLang="zh-TW" dirty="0"/>
+              <a:t>Sensor </a:t>
+            </a:r>
+            <a:r>
+              <a:rPr lang="zh-TW" altLang="en-US" dirty="0"/>
+              <a:t>傳輸的顏色，並不一定落在</a:t>
+            </a:r>
+            <a:r>
+              <a:rPr lang="en-US" altLang="zh-TW" dirty="0"/>
+              <a:t>USI</a:t>
+            </a:r>
+            <a:r>
+              <a:rPr lang="zh-TW" altLang="en-US" dirty="0"/>
+              <a:t>所定義的顏色，因此需要找到最接近的顏色。</a:t>
+            </a:r>
+            <a:endParaRPr lang="en-US" altLang="zh-TW" dirty="0"/>
+          </a:p>
+          <a:p>
+            <a:pPr marL="514350" indent="-514350">
+              <a:buAutoNum type="arabicPeriod"/>
+            </a:pPr>
+            <a:endParaRPr lang="en-US" altLang="zh-TW" dirty="0"/>
+          </a:p>
+          <a:p>
+            <a:pPr marL="0" indent="0">
+              <a:buNone/>
+            </a:pPr>
+            <a:r>
+              <a:rPr lang="en-US" altLang="zh-TW" dirty="0"/>
+              <a:t>Solve :</a:t>
+            </a:r>
+          </a:p>
+          <a:p>
+            <a:pPr marL="0" indent="0">
+              <a:buNone/>
+            </a:pPr>
+            <a:r>
+              <a:rPr lang="en-US" altLang="zh-TW" dirty="0"/>
+              <a:t>	1. </a:t>
+            </a:r>
+            <a:r>
+              <a:rPr lang="zh-TW" altLang="en-US" dirty="0"/>
+              <a:t>顏色距離定義</a:t>
+            </a:r>
+            <a:endParaRPr lang="en-US" altLang="zh-TW" dirty="0"/>
+          </a:p>
+          <a:p>
+            <a:pPr marL="0" indent="0">
+              <a:buNone/>
+            </a:pPr>
+            <a:r>
+              <a:rPr lang="en-US" altLang="zh-TW" dirty="0"/>
+              <a:t>	2.  </a:t>
+            </a:r>
+            <a:r>
+              <a:rPr lang="zh-TW" altLang="en-US" dirty="0"/>
+              <a:t>使用</a:t>
             </a:r>
             <a:r>
               <a:rPr lang="en-US" altLang="zh-TW" dirty="0" err="1"/>
-              <a:t>Matalb</a:t>
-            </a:r>
-            <a:r>
-              <a:rPr lang="en-US" altLang="zh-TW" dirty="0"/>
-              <a:t> APP</a:t>
+              <a:t>matlab</a:t>
             </a:r>
             <a:r>
               <a:rPr lang="zh-TW" altLang="en-US" dirty="0"/>
-              <a:t> 寫的</a:t>
-            </a:r>
+              <a:t>來加速驗證速度</a:t>
+            </a:r>
+            <a:endParaRPr lang="en-US" altLang="zh-TW" dirty="0"/>
           </a:p>
         </p:txBody>
       </p:sp>
     </p:spTree>
     <p:extLst>
       <p:ext uri="{BB962C8B-B14F-4D97-AF65-F5344CB8AC3E}">
-        <p14:creationId xmlns:p14="http://schemas.microsoft.com/office/powerpoint/2010/main" val="3411917283"/>
+        <p14:creationId xmlns:p14="http://schemas.microsoft.com/office/powerpoint/2010/main" val="2172983373"/>
       </p:ext>
     </p:extLst>
   </p:cSld>
@@ -19462,6 +20454,120 @@
           <p:cNvPr id="2" name="標題 1">
             <a:extLst>
               <a:ext uri="{FF2B5EF4-FFF2-40B4-BE49-F238E27FC236}">
+                <a16:creationId xmlns:a16="http://schemas.microsoft.com/office/drawing/2014/main" id="{77C37F21-5DBA-B401-7D71-7CFB5E6E6C5D}"/>
+              </a:ext>
+            </a:extLst>
+          </p:cNvPr>
+          <p:cNvSpPr>
+            <a:spLocks noGrp="1"/>
+          </p:cNvSpPr>
+          <p:nvPr>
+            <p:ph type="title"/>
+          </p:nvPr>
+        </p:nvSpPr>
+        <p:spPr/>
+        <p:txBody>
+          <a:bodyPr/>
+          <a:lstStyle/>
+          <a:p>
+            <a:pPr algn="ctr"/>
+            <a:r>
+              <a:rPr lang="zh-TW" altLang="en-US" dirty="0"/>
+              <a:t> </a:t>
+            </a:r>
+            <a:r>
+              <a:rPr lang="en-US" altLang="zh-TW" dirty="0" err="1"/>
+              <a:t>Matlab</a:t>
+            </a:r>
+            <a:r>
+              <a:rPr lang="en-US" altLang="zh-TW" dirty="0"/>
+              <a:t> </a:t>
+            </a:r>
+            <a:r>
+              <a:rPr lang="zh-TW" altLang="en-US" dirty="0"/>
+              <a:t>驗證</a:t>
+            </a:r>
+          </a:p>
+        </p:txBody>
+      </p:sp>
+      <p:sp>
+        <p:nvSpPr>
+          <p:cNvPr id="3" name="內容版面配置區 2">
+            <a:extLst>
+              <a:ext uri="{FF2B5EF4-FFF2-40B4-BE49-F238E27FC236}">
+                <a16:creationId xmlns:a16="http://schemas.microsoft.com/office/drawing/2014/main" id="{534E79D0-3692-7581-7815-5DEF93BC5DAC}"/>
+              </a:ext>
+            </a:extLst>
+          </p:cNvPr>
+          <p:cNvSpPr>
+            <a:spLocks noGrp="1"/>
+          </p:cNvSpPr>
+          <p:nvPr>
+            <p:ph idx="1"/>
+          </p:nvPr>
+        </p:nvSpPr>
+        <p:spPr/>
+        <p:txBody>
+          <a:bodyPr/>
+          <a:lstStyle/>
+          <a:p>
+            <a:pPr marL="0" indent="0">
+              <a:buNone/>
+            </a:pPr>
+            <a:r>
+              <a:rPr lang="en-US" altLang="zh-TW" dirty="0"/>
+              <a:t>Use </a:t>
+            </a:r>
+            <a:r>
+              <a:rPr lang="en-US" altLang="zh-TW" dirty="0" err="1"/>
+              <a:t>Matalb</a:t>
+            </a:r>
+            <a:r>
+              <a:rPr lang="en-US" altLang="zh-TW" dirty="0"/>
+              <a:t> APP</a:t>
+            </a:r>
+            <a:r>
+              <a:rPr lang="zh-TW" altLang="en-US" dirty="0"/>
+              <a:t> 寫的</a:t>
+            </a:r>
+          </a:p>
+        </p:txBody>
+      </p:sp>
+    </p:spTree>
+    <p:extLst>
+      <p:ext uri="{BB962C8B-B14F-4D97-AF65-F5344CB8AC3E}">
+        <p14:creationId xmlns:p14="http://schemas.microsoft.com/office/powerpoint/2010/main" val="3411917283"/>
+      </p:ext>
+    </p:extLst>
+  </p:cSld>
+  <p:clrMapOvr>
+    <a:masterClrMapping/>
+  </p:clrMapOvr>
+</p:sld>
+</file>
+
+<file path=ppt/slides/slide46.xml><?xml version="1.0" encoding="utf-8"?>
+<p:sld xmlns:a="http://schemas.openxmlformats.org/drawingml/2006/main" xmlns:r="http://schemas.openxmlformats.org/officeDocument/2006/relationships" xmlns:p="http://schemas.openxmlformats.org/presentationml/2006/main">
+  <p:cSld>
+    <p:spTree>
+      <p:nvGrpSpPr>
+        <p:cNvPr id="1" name=""/>
+        <p:cNvGrpSpPr/>
+        <p:nvPr/>
+      </p:nvGrpSpPr>
+      <p:grpSpPr>
+        <a:xfrm>
+          <a:off x="0" y="0"/>
+          <a:ext cx="0" cy="0"/>
+          <a:chOff x="0" y="0"/>
+          <a:chExt cx="0" cy="0"/>
+        </a:xfrm>
+      </p:grpSpPr>
+      <p:sp>
+        <p:nvSpPr>
+          <p:cNvPr id="2" name="標題 1">
+            <a:extLst>
+              <a:ext uri="{FF2B5EF4-FFF2-40B4-BE49-F238E27FC236}">
                 <a16:creationId xmlns:a16="http://schemas.microsoft.com/office/drawing/2014/main" id="{F0C4E827-8FA5-D200-CB63-931E7FB72A01}"/>
               </a:ext>
             </a:extLst>
@@ -19631,7 +20737,7 @@
 </p:sld>
 </file>
 
-<file path=ppt/slides/slide46.xml><?xml version="1.0" encoding="utf-8"?>
+<file path=ppt/slides/slide47.xml><?xml version="1.0" encoding="utf-8"?>
 <p:sld xmlns:a="http://schemas.openxmlformats.org/drawingml/2006/main" xmlns:r="http://schemas.openxmlformats.org/officeDocument/2006/relationships" xmlns:p="http://schemas.openxmlformats.org/presentationml/2006/main">
   <p:cSld>
     <p:spTree>

</xml_diff>

<commit_message>
* Update T5 page
</commit_message>
<xml_diff>
--- a/Project_Summary_pdf/Project_Summary.pptx
+++ b/Project_Summary_pdf/Project_Summary.pptx
@@ -427,7 +427,7 @@
           <a:p>
             <a:fld id="{C65320F2-F42B-45F1-AA86-96F1A2E46749}" type="datetimeFigureOut">
               <a:rPr lang="zh-TW" altLang="en-US" smtClean="0"/>
-              <a:t>2023/2/1</a:t>
+              <a:t>2023/2/3</a:t>
             </a:fld>
             <a:endParaRPr lang="zh-TW" altLang="en-US"/>
           </a:p>
@@ -3432,7 +3432,7 @@
           <a:p>
             <a:fld id="{8A9F4CB5-1750-4E23-A13C-2C1F028F9724}" type="datetimeFigureOut">
               <a:rPr lang="zh-TW" altLang="en-US" smtClean="0"/>
-              <a:t>2023/2/1</a:t>
+              <a:t>2023/2/3</a:t>
             </a:fld>
             <a:endParaRPr lang="zh-TW" altLang="en-US"/>
           </a:p>
@@ -3630,7 +3630,7 @@
           <a:p>
             <a:fld id="{8A9F4CB5-1750-4E23-A13C-2C1F028F9724}" type="datetimeFigureOut">
               <a:rPr lang="zh-TW" altLang="en-US" smtClean="0"/>
-              <a:t>2023/2/1</a:t>
+              <a:t>2023/2/3</a:t>
             </a:fld>
             <a:endParaRPr lang="zh-TW" altLang="en-US"/>
           </a:p>
@@ -3838,7 +3838,7 @@
           <a:p>
             <a:fld id="{8A9F4CB5-1750-4E23-A13C-2C1F028F9724}" type="datetimeFigureOut">
               <a:rPr lang="zh-TW" altLang="en-US" smtClean="0"/>
-              <a:t>2023/2/1</a:t>
+              <a:t>2023/2/3</a:t>
             </a:fld>
             <a:endParaRPr lang="zh-TW" altLang="en-US"/>
           </a:p>
@@ -4036,7 +4036,7 @@
           <a:p>
             <a:fld id="{8A9F4CB5-1750-4E23-A13C-2C1F028F9724}" type="datetimeFigureOut">
               <a:rPr lang="zh-TW" altLang="en-US" smtClean="0"/>
-              <a:t>2023/2/1</a:t>
+              <a:t>2023/2/3</a:t>
             </a:fld>
             <a:endParaRPr lang="zh-TW" altLang="en-US"/>
           </a:p>
@@ -4311,7 +4311,7 @@
           <a:p>
             <a:fld id="{8A9F4CB5-1750-4E23-A13C-2C1F028F9724}" type="datetimeFigureOut">
               <a:rPr lang="zh-TW" altLang="en-US" smtClean="0"/>
-              <a:t>2023/2/1</a:t>
+              <a:t>2023/2/3</a:t>
             </a:fld>
             <a:endParaRPr lang="zh-TW" altLang="en-US"/>
           </a:p>
@@ -4576,7 +4576,7 @@
           <a:p>
             <a:fld id="{8A9F4CB5-1750-4E23-A13C-2C1F028F9724}" type="datetimeFigureOut">
               <a:rPr lang="zh-TW" altLang="en-US" smtClean="0"/>
-              <a:t>2023/2/1</a:t>
+              <a:t>2023/2/3</a:t>
             </a:fld>
             <a:endParaRPr lang="zh-TW" altLang="en-US"/>
           </a:p>
@@ -4988,7 +4988,7 @@
           <a:p>
             <a:fld id="{8A9F4CB5-1750-4E23-A13C-2C1F028F9724}" type="datetimeFigureOut">
               <a:rPr lang="zh-TW" altLang="en-US" smtClean="0"/>
-              <a:t>2023/2/1</a:t>
+              <a:t>2023/2/3</a:t>
             </a:fld>
             <a:endParaRPr lang="zh-TW" altLang="en-US"/>
           </a:p>
@@ -5129,7 +5129,7 @@
           <a:p>
             <a:fld id="{8A9F4CB5-1750-4E23-A13C-2C1F028F9724}" type="datetimeFigureOut">
               <a:rPr lang="zh-TW" altLang="en-US" smtClean="0"/>
-              <a:t>2023/2/1</a:t>
+              <a:t>2023/2/3</a:t>
             </a:fld>
             <a:endParaRPr lang="zh-TW" altLang="en-US"/>
           </a:p>
@@ -5242,7 +5242,7 @@
           <a:p>
             <a:fld id="{8A9F4CB5-1750-4E23-A13C-2C1F028F9724}" type="datetimeFigureOut">
               <a:rPr lang="zh-TW" altLang="en-US" smtClean="0"/>
-              <a:t>2023/2/1</a:t>
+              <a:t>2023/2/3</a:t>
             </a:fld>
             <a:endParaRPr lang="zh-TW" altLang="en-US"/>
           </a:p>
@@ -5553,7 +5553,7 @@
           <a:p>
             <a:fld id="{8A9F4CB5-1750-4E23-A13C-2C1F028F9724}" type="datetimeFigureOut">
               <a:rPr lang="zh-TW" altLang="en-US" smtClean="0"/>
-              <a:t>2023/2/1</a:t>
+              <a:t>2023/2/3</a:t>
             </a:fld>
             <a:endParaRPr lang="zh-TW" altLang="en-US"/>
           </a:p>
@@ -5841,7 +5841,7 @@
           <a:p>
             <a:fld id="{8A9F4CB5-1750-4E23-A13C-2C1F028F9724}" type="datetimeFigureOut">
               <a:rPr lang="zh-TW" altLang="en-US" smtClean="0"/>
-              <a:t>2023/2/1</a:t>
+              <a:t>2023/2/3</a:t>
             </a:fld>
             <a:endParaRPr lang="zh-TW" altLang="en-US"/>
           </a:p>
@@ -6082,7 +6082,7 @@
           <a:p>
             <a:fld id="{8A9F4CB5-1750-4E23-A13C-2C1F028F9724}" type="datetimeFigureOut">
               <a:rPr lang="zh-TW" altLang="en-US" smtClean="0"/>
-              <a:t>2023/2/1</a:t>
+              <a:t>2023/2/3</a:t>
             </a:fld>
             <a:endParaRPr lang="zh-TW" altLang="en-US"/>
           </a:p>
@@ -18624,8 +18624,8 @@
           </a:p>
         </p:txBody>
       </p:sp>
-      <mc:AlternateContent xmlns:mc="http://schemas.openxmlformats.org/markup-compatibility/2006">
-        <mc:Choice xmlns:a14="http://schemas.microsoft.com/office/drawing/2010/main" Requires="a14">
+      <mc:AlternateContent xmlns:mc="http://schemas.openxmlformats.org/markup-compatibility/2006" xmlns:a14="http://schemas.microsoft.com/office/drawing/2010/main">
+        <mc:Choice Requires="a14">
           <p:sp>
             <p:nvSpPr>
               <p:cNvPr id="3" name="內容版面配置區 2">
@@ -18760,7 +18760,7 @@
             </p:txBody>
           </p:sp>
         </mc:Choice>
-        <mc:Fallback>
+        <mc:Fallback xmlns="">
           <p:sp>
             <p:nvSpPr>
               <p:cNvPr id="3" name="內容版面配置區 2">
@@ -18836,8 +18836,8 @@
           </a:p>
         </p:txBody>
       </p:sp>
-      <mc:AlternateContent xmlns:mc="http://schemas.openxmlformats.org/markup-compatibility/2006">
-        <mc:Choice xmlns:a14="http://schemas.microsoft.com/office/drawing/2010/main" Requires="a14">
+      <mc:AlternateContent xmlns:mc="http://schemas.openxmlformats.org/markup-compatibility/2006" xmlns:a14="http://schemas.microsoft.com/office/drawing/2010/main">
+        <mc:Choice Requires="a14">
           <p:sp>
             <p:nvSpPr>
               <p:cNvPr id="5" name="文字方塊 4">
@@ -18866,6 +18866,7 @@
               </a:bodyPr>
               <a:lstStyle/>
               <a:p>
+                <a:pPr/>
                 <a14:m>
                   <m:oMathPara xmlns:m="http://schemas.openxmlformats.org/officeDocument/2006/math">
                     <m:oMathParaPr>
@@ -18916,7 +18917,7 @@
             </p:txBody>
           </p:sp>
         </mc:Choice>
-        <mc:Fallback>
+        <mc:Fallback xmlns="">
           <p:sp>
             <p:nvSpPr>
               <p:cNvPr id="5" name="文字方塊 4">
@@ -19036,8 +19037,8 @@
           </a:p>
         </p:txBody>
       </p:sp>
-      <mc:AlternateContent xmlns:mc="http://schemas.openxmlformats.org/markup-compatibility/2006">
-        <mc:Choice xmlns:a14="http://schemas.microsoft.com/office/drawing/2010/main" Requires="a14">
+      <mc:AlternateContent xmlns:mc="http://schemas.openxmlformats.org/markup-compatibility/2006" xmlns:a14="http://schemas.microsoft.com/office/drawing/2010/main">
+        <mc:Choice Requires="a14">
           <p:sp>
             <p:nvSpPr>
               <p:cNvPr id="9" name="文字方塊 8">
@@ -19066,6 +19067,7 @@
               </a:bodyPr>
               <a:lstStyle/>
               <a:p>
+                <a:pPr/>
                 <a14:m>
                   <m:oMathPara xmlns:m="http://schemas.openxmlformats.org/officeDocument/2006/math">
                     <m:oMathParaPr>
@@ -19100,7 +19102,7 @@
             </p:txBody>
           </p:sp>
         </mc:Choice>
-        <mc:Fallback>
+        <mc:Fallback xmlns="">
           <p:sp>
             <p:nvSpPr>
               <p:cNvPr id="9" name="文字方塊 8">

</xml_diff>

<commit_message>
* Update Schmitt Page
</commit_message>
<xml_diff>
--- a/Project_Summary_pdf/Project_Summary.pptx
+++ b/Project_Summary_pdf/Project_Summary.pptx
@@ -42,20 +42,20 @@
     <p:sldId id="896" r:id="rId33"/>
     <p:sldId id="898" r:id="rId34"/>
     <p:sldId id="899" r:id="rId35"/>
-    <p:sldId id="900" r:id="rId36"/>
-    <p:sldId id="902" r:id="rId37"/>
+    <p:sldId id="327" r:id="rId36"/>
+    <p:sldId id="903" r:id="rId37"/>
     <p:sldId id="836" r:id="rId38"/>
     <p:sldId id="839" r:id="rId39"/>
     <p:sldId id="840" r:id="rId40"/>
     <p:sldId id="848" r:id="rId41"/>
     <p:sldId id="849" r:id="rId42"/>
     <p:sldId id="842" r:id="rId43"/>
-    <p:sldId id="901" r:id="rId44"/>
-    <p:sldId id="895" r:id="rId45"/>
-    <p:sldId id="889" r:id="rId46"/>
-    <p:sldId id="890" r:id="rId47"/>
-    <p:sldId id="751" r:id="rId48"/>
-    <p:sldId id="882" r:id="rId49"/>
+    <p:sldId id="895" r:id="rId44"/>
+    <p:sldId id="889" r:id="rId45"/>
+    <p:sldId id="890" r:id="rId46"/>
+    <p:sldId id="751" r:id="rId47"/>
+    <p:sldId id="882" r:id="rId48"/>
+    <p:sldId id="902" r:id="rId49"/>
     <p:sldId id="281" r:id="rId50"/>
     <p:sldId id="257" r:id="rId51"/>
     <p:sldId id="258" r:id="rId52"/>
@@ -219,15 +219,14 @@
             <p14:sldId id="896"/>
             <p14:sldId id="898"/>
             <p14:sldId id="899"/>
-            <p14:sldId id="900"/>
-            <p14:sldId id="902"/>
+            <p14:sldId id="327"/>
+            <p14:sldId id="903"/>
             <p14:sldId id="836"/>
             <p14:sldId id="839"/>
             <p14:sldId id="840"/>
             <p14:sldId id="848"/>
             <p14:sldId id="849"/>
             <p14:sldId id="842"/>
-            <p14:sldId id="901"/>
             <p14:sldId id="895"/>
             <p14:sldId id="889"/>
             <p14:sldId id="890"/>
@@ -237,6 +236,7 @@
         <p14:section name="AGC flow" id="{D4987742-1940-4315-8C24-0E7FB243CB3A}">
           <p14:sldIdLst>
             <p14:sldId id="882"/>
+            <p14:sldId id="902"/>
           </p14:sldIdLst>
         </p14:section>
         <p14:section name="數位電路驗證" id="{D5C40446-EBF3-4C53-8497-3F374EA8D1ED}">
@@ -244,7 +244,7 @@
             <p14:sldId id="281"/>
           </p14:sldIdLst>
         </p14:section>
-        <p14:section name="Project Name : ColorPicking" id="{2A9654F3-D5BC-4227-9ADF-A1FABED36332}">
+        <p14:section name="First Project : ColorPicking" id="{2A9654F3-D5BC-4227-9ADF-A1FABED36332}">
           <p14:sldIdLst>
             <p14:sldId id="257"/>
             <p14:sldId id="258"/>
@@ -427,7 +427,7 @@
           <a:p>
             <a:fld id="{C65320F2-F42B-45F1-AA86-96F1A2E46749}" type="datetimeFigureOut">
               <a:rPr lang="zh-TW" altLang="en-US" smtClean="0"/>
-              <a:t>2023/2/3</a:t>
+              <a:t>2023/2/4</a:t>
             </a:fld>
             <a:endParaRPr lang="zh-TW" altLang="en-US"/>
           </a:p>
@@ -822,106 +822,129 @@
           <a:bodyPr/>
           <a:lstStyle/>
           <a:p>
-            <a:r>
-              <a:rPr lang="en-US" altLang="zh-TW" dirty="0"/>
-              <a:t>First Method </a:t>
-            </a:r>
-          </a:p>
-          <a:p>
-            <a:r>
-              <a:rPr lang="en-US" altLang="zh-TW" sz="1800" dirty="0"/>
-              <a:t>1. </a:t>
-            </a:r>
-          </a:p>
-          <a:p>
-            <a:r>
-              <a:rPr lang="zh-TW" altLang="en-US" dirty="0"/>
-              <a:t>利用</a:t>
-            </a:r>
-            <a:r>
-              <a:rPr lang="en-US" altLang="zh-TW" dirty="0" err="1"/>
-              <a:t>Matlab</a:t>
-            </a:r>
-            <a:r>
-              <a:rPr lang="zh-TW" altLang="en-US" dirty="0"/>
-              <a:t>處理矩陣速度較快的理由。假定 </a:t>
-            </a:r>
-            <a:r>
-              <a:rPr lang="en-US" altLang="zh-TW" dirty="0"/>
-              <a:t>x[n] = 0, x[ n+1] = 1, </a:t>
-            </a:r>
-          </a:p>
-          <a:p>
-            <a:r>
-              <a:rPr lang="en-US" altLang="zh-TW" dirty="0"/>
-              <a:t>x[n+1]</a:t>
-            </a:r>
-            <a:r>
-              <a:rPr lang="zh-TW" altLang="en-US" dirty="0"/>
-              <a:t> </a:t>
-            </a:r>
-            <a:r>
-              <a:rPr lang="en-US" altLang="zh-TW" dirty="0"/>
-              <a:t>is rising edge, D[k] = [ 0 , x ] , C[k] = [x, 0] then (D-C )[k] = D[k] –C[k]</a:t>
-            </a:r>
-          </a:p>
-          <a:p>
-            <a:r>
-              <a:rPr lang="en-US" altLang="zh-TW" dirty="0"/>
-              <a:t>(D-C)[n+1] = x[n] – x[n+1] = -1 , then if and only if  x[n+1] is also Rising edge</a:t>
-            </a:r>
-          </a:p>
-          <a:p>
-            <a:r>
-              <a:rPr lang="en-US" altLang="zh-TW" dirty="0"/>
-              <a:t>Similar for falling edge. It is </a:t>
-            </a:r>
-            <a:r>
-              <a:rPr lang="en-US" altLang="zh-TW" dirty="0" err="1"/>
-              <a:t>fastly</a:t>
-            </a:r>
-            <a:r>
-              <a:rPr lang="en-US" altLang="zh-TW" dirty="0"/>
-              <a:t> in </a:t>
-            </a:r>
-            <a:r>
-              <a:rPr lang="en-US" altLang="zh-TW" dirty="0" err="1"/>
-              <a:t>matalb</a:t>
-            </a:r>
-            <a:r>
-              <a:rPr lang="en-US" altLang="zh-TW" dirty="0"/>
-              <a:t> use matrix </a:t>
-            </a:r>
-            <a:r>
-              <a:rPr lang="en-US" altLang="zh-TW" dirty="0" err="1"/>
-              <a:t>calulation</a:t>
-            </a:r>
-            <a:r>
-              <a:rPr lang="en-US" altLang="zh-TW" dirty="0"/>
-              <a:t> </a:t>
-            </a:r>
-          </a:p>
-          <a:p>
-            <a:r>
-              <a:rPr lang="en-US" altLang="zh-TW" dirty="0"/>
-              <a:t>2. </a:t>
-            </a:r>
-            <a:r>
-              <a:rPr lang="zh-TW" altLang="en-US" dirty="0"/>
-              <a:t>利用</a:t>
-            </a:r>
-            <a:r>
-              <a:rPr lang="en-US" altLang="zh-TW" dirty="0"/>
-              <a:t>merge sort </a:t>
-            </a:r>
-            <a:r>
-              <a:rPr lang="zh-TW" altLang="en-US" dirty="0"/>
-              <a:t>將</a:t>
-            </a:r>
-            <a:r>
-              <a:rPr lang="en-US" altLang="zh-TW" dirty="0"/>
-              <a:t>Rising Edge and Falling Edge merge</a:t>
-            </a:r>
+            <a:pPr marL="457200" lvl="1" indent="0" algn="l">
+              <a:buNone/>
+            </a:pPr>
+            <a:endParaRPr lang="en-US" altLang="zh-TW" dirty="0"/>
+          </a:p>
+          <a:p>
+            <a:pPr marL="228600" indent="-228600" algn="l">
+              <a:buAutoNum type="arabicPeriod"/>
+            </a:pPr>
+            <a:r>
+              <a:rPr lang="en-US" altLang="zh-TW" dirty="0"/>
+              <a:t>Sample</a:t>
+            </a:r>
+            <a:r>
+              <a:rPr lang="zh-TW" altLang="en-US" dirty="0"/>
+              <a:t>的時間點取這個</a:t>
+            </a:r>
+            <a:r>
+              <a:rPr lang="en-US" altLang="zh-TW" dirty="0"/>
+              <a:t>Group</a:t>
+            </a:r>
+            <a:r>
+              <a:rPr lang="zh-TW" altLang="en-US" dirty="0"/>
+              <a:t>的最後</a:t>
+            </a:r>
+            <a:endParaRPr lang="en-US" altLang="zh-TW" dirty="0"/>
+          </a:p>
+          <a:p>
+            <a:pPr marL="228600" indent="-228600" algn="l">
+              <a:buAutoNum type="arabicPeriod" startAt="2"/>
+            </a:pPr>
+            <a:r>
+              <a:rPr lang="en-US" altLang="zh-TW" dirty="0"/>
+              <a:t>Group </a:t>
+            </a:r>
+            <a:r>
+              <a:rPr lang="zh-TW" altLang="en-US" dirty="0"/>
+              <a:t>指的是 </a:t>
+            </a:r>
+            <a:r>
+              <a:rPr lang="en-US" altLang="zh-TW" dirty="0"/>
+              <a:t>8</a:t>
+            </a:r>
+            <a:r>
+              <a:rPr lang="zh-TW" altLang="en-US" dirty="0"/>
+              <a:t>個</a:t>
+            </a:r>
+            <a:r>
+              <a:rPr lang="en-US" altLang="zh-TW" dirty="0"/>
+              <a:t>Port </a:t>
+            </a:r>
+            <a:r>
+              <a:rPr lang="zh-TW" altLang="en-US" dirty="0"/>
+              <a:t>開始變化的時間不超過</a:t>
+            </a:r>
+            <a:r>
+              <a:rPr lang="en-US" altLang="zh-TW" dirty="0"/>
+              <a:t>40ns</a:t>
+            </a:r>
+            <a:r>
+              <a:rPr lang="zh-TW" altLang="en-US" dirty="0"/>
+              <a:t>，將這些時間點列在相同的</a:t>
+            </a:r>
+            <a:r>
+              <a:rPr lang="en-US" altLang="zh-TW" dirty="0"/>
+              <a:t>Group</a:t>
+            </a:r>
+            <a:r>
+              <a:rPr lang="zh-TW" altLang="en-US" dirty="0"/>
+              <a:t>。</a:t>
+            </a:r>
+            <a:endParaRPr lang="en-US" altLang="zh-TW" dirty="0"/>
+          </a:p>
+          <a:p>
+            <a:pPr marL="228600" marR="0" lvl="0" indent="-228600" algn="l" defTabSz="914400" rtl="0" eaLnBrk="1" fontAlgn="auto" latinLnBrk="0" hangingPunct="1">
+              <a:lnSpc>
+                <a:spcPct val="100000"/>
+              </a:lnSpc>
+              <a:spcBef>
+                <a:spcPts val="0"/>
+              </a:spcBef>
+              <a:spcAft>
+                <a:spcPts val="0"/>
+              </a:spcAft>
+              <a:buClrTx/>
+              <a:buSzTx/>
+              <a:buFontTx/>
+              <a:buAutoNum type="arabicPeriod" startAt="2"/>
+              <a:tabLst/>
+              <a:defRPr/>
+            </a:pPr>
+            <a:r>
+              <a:rPr lang="en-US" altLang="zh-TW" dirty="0"/>
+              <a:t>1. ADC CLK </a:t>
+            </a:r>
+            <a:r>
+              <a:rPr lang="zh-TW" altLang="en-US" dirty="0"/>
+              <a:t>利用該</a:t>
+            </a:r>
+            <a:r>
+              <a:rPr lang="en-US" altLang="zh-TW" dirty="0"/>
+              <a:t>Port </a:t>
+            </a:r>
+            <a:r>
+              <a:rPr lang="zh-TW" altLang="en-US" dirty="0"/>
+              <a:t>會損失</a:t>
+            </a:r>
+            <a:r>
+              <a:rPr lang="en-US" altLang="zh-TW" dirty="0"/>
+              <a:t>LSB information</a:t>
+            </a:r>
+          </a:p>
+          <a:p>
+            <a:pPr marL="228600" indent="-228600" algn="l">
+              <a:buAutoNum type="arabicPeriod" startAt="2"/>
+            </a:pPr>
+            <a:endParaRPr lang="en-US" altLang="zh-TW" dirty="0"/>
+          </a:p>
+          <a:p>
+            <a:pPr marL="228600" indent="-228600">
+              <a:buAutoNum type="arabicPeriod"/>
+            </a:pPr>
+            <a:endParaRPr lang="zh-TW" altLang="en-US" dirty="0"/>
           </a:p>
         </p:txBody>
       </p:sp>
@@ -942,7 +965,7 @@
           <a:p>
             <a:fld id="{0116F853-F7F2-4239-A629-A213C1D67574}" type="slidenum">
               <a:rPr lang="zh-TW" altLang="en-US" smtClean="0"/>
-              <a:t>21</a:t>
+              <a:t>18</a:t>
             </a:fld>
             <a:endParaRPr lang="zh-TW" altLang="en-US"/>
           </a:p>
@@ -951,7 +974,7 @@
     </p:spTree>
     <p:extLst>
       <p:ext uri="{BB962C8B-B14F-4D97-AF65-F5344CB8AC3E}">
-        <p14:creationId xmlns:p14="http://schemas.microsoft.com/office/powerpoint/2010/main" val="3272922513"/>
+        <p14:creationId xmlns:p14="http://schemas.microsoft.com/office/powerpoint/2010/main" val="1746073952"/>
       </p:ext>
     </p:extLst>
   </p:cSld>
@@ -1006,8 +1029,104 @@
           <a:lstStyle/>
           <a:p>
             <a:r>
-              <a:rPr lang="zh-TW" altLang="en-US"/>
-              <a:t>透過分群的作法</a:t>
+              <a:rPr lang="en-US" altLang="zh-TW" dirty="0"/>
+              <a:t>First Method </a:t>
+            </a:r>
+          </a:p>
+          <a:p>
+            <a:r>
+              <a:rPr lang="en-US" altLang="zh-TW" sz="1800" dirty="0"/>
+              <a:t>1. </a:t>
+            </a:r>
+          </a:p>
+          <a:p>
+            <a:r>
+              <a:rPr lang="zh-TW" altLang="en-US" dirty="0"/>
+              <a:t>利用</a:t>
+            </a:r>
+            <a:r>
+              <a:rPr lang="en-US" altLang="zh-TW" dirty="0" err="1"/>
+              <a:t>Matlab</a:t>
+            </a:r>
+            <a:r>
+              <a:rPr lang="zh-TW" altLang="en-US" dirty="0"/>
+              <a:t>處理矩陣速度較快的理由。假定 </a:t>
+            </a:r>
+            <a:r>
+              <a:rPr lang="en-US" altLang="zh-TW" dirty="0"/>
+              <a:t>x[n] = 0, x[ n+1] = 1, </a:t>
+            </a:r>
+          </a:p>
+          <a:p>
+            <a:r>
+              <a:rPr lang="en-US" altLang="zh-TW" dirty="0"/>
+              <a:t>x[n+1]</a:t>
+            </a:r>
+            <a:r>
+              <a:rPr lang="zh-TW" altLang="en-US" dirty="0"/>
+              <a:t> </a:t>
+            </a:r>
+            <a:r>
+              <a:rPr lang="en-US" altLang="zh-TW" dirty="0"/>
+              <a:t>is rising edge, D[k] = [ 0 , x ] , C[k] = [x, 0] then (D-C )[k] = D[k] –C[k]</a:t>
+            </a:r>
+          </a:p>
+          <a:p>
+            <a:r>
+              <a:rPr lang="en-US" altLang="zh-TW" dirty="0"/>
+              <a:t>(D-C)[n+1] = x[n] – x[n+1] = -1 , then if and only if  x[n+1] is also Rising edge</a:t>
+            </a:r>
+          </a:p>
+          <a:p>
+            <a:r>
+              <a:rPr lang="en-US" altLang="zh-TW" dirty="0"/>
+              <a:t>Similar for falling edge. It is </a:t>
+            </a:r>
+            <a:r>
+              <a:rPr lang="en-US" altLang="zh-TW" dirty="0" err="1"/>
+              <a:t>fastly</a:t>
+            </a:r>
+            <a:r>
+              <a:rPr lang="en-US" altLang="zh-TW" dirty="0"/>
+              <a:t> in </a:t>
+            </a:r>
+            <a:r>
+              <a:rPr lang="en-US" altLang="zh-TW" dirty="0" err="1"/>
+              <a:t>matalb</a:t>
+            </a:r>
+            <a:r>
+              <a:rPr lang="en-US" altLang="zh-TW" dirty="0"/>
+              <a:t> use matrix </a:t>
+            </a:r>
+            <a:r>
+              <a:rPr lang="en-US" altLang="zh-TW" dirty="0" err="1"/>
+              <a:t>calulation</a:t>
+            </a:r>
+            <a:r>
+              <a:rPr lang="en-US" altLang="zh-TW" dirty="0"/>
+              <a:t> </a:t>
+            </a:r>
+          </a:p>
+          <a:p>
+            <a:r>
+              <a:rPr lang="en-US" altLang="zh-TW" dirty="0"/>
+              <a:t>2. </a:t>
+            </a:r>
+            <a:r>
+              <a:rPr lang="zh-TW" altLang="en-US" dirty="0"/>
+              <a:t>利用</a:t>
+            </a:r>
+            <a:r>
+              <a:rPr lang="en-US" altLang="zh-TW" dirty="0"/>
+              <a:t>merge sort </a:t>
+            </a:r>
+            <a:r>
+              <a:rPr lang="zh-TW" altLang="en-US" dirty="0"/>
+              <a:t>將</a:t>
+            </a:r>
+            <a:r>
+              <a:rPr lang="en-US" altLang="zh-TW" dirty="0"/>
+              <a:t>Rising Edge and Falling Edge merge</a:t>
             </a:r>
           </a:p>
         </p:txBody>
@@ -1029,7 +1148,7 @@
           <a:p>
             <a:fld id="{0116F853-F7F2-4239-A629-A213C1D67574}" type="slidenum">
               <a:rPr lang="zh-TW" altLang="en-US" smtClean="0"/>
-              <a:t>22</a:t>
+              <a:t>21</a:t>
             </a:fld>
             <a:endParaRPr lang="zh-TW" altLang="en-US"/>
           </a:p>
@@ -1038,7 +1157,7 @@
     </p:spTree>
     <p:extLst>
       <p:ext uri="{BB962C8B-B14F-4D97-AF65-F5344CB8AC3E}">
-        <p14:creationId xmlns:p14="http://schemas.microsoft.com/office/powerpoint/2010/main" val="1082152292"/>
+        <p14:creationId xmlns:p14="http://schemas.microsoft.com/office/powerpoint/2010/main" val="3272922513"/>
       </p:ext>
     </p:extLst>
   </p:cSld>
@@ -1092,7 +1211,10 @@
           <a:bodyPr/>
           <a:lstStyle/>
           <a:p>
-            <a:endParaRPr lang="zh-TW" altLang="en-US" dirty="0"/>
+            <a:r>
+              <a:rPr lang="zh-TW" altLang="en-US"/>
+              <a:t>透過分群的作法</a:t>
+            </a:r>
           </a:p>
         </p:txBody>
       </p:sp>
@@ -1113,7 +1235,7 @@
           <a:p>
             <a:fld id="{0116F853-F7F2-4239-A629-A213C1D67574}" type="slidenum">
               <a:rPr lang="zh-TW" altLang="en-US" smtClean="0"/>
-              <a:t>24</a:t>
+              <a:t>22</a:t>
             </a:fld>
             <a:endParaRPr lang="zh-TW" altLang="en-US"/>
           </a:p>
@@ -1122,7 +1244,7 @@
     </p:spTree>
     <p:extLst>
       <p:ext uri="{BB962C8B-B14F-4D97-AF65-F5344CB8AC3E}">
-        <p14:creationId xmlns:p14="http://schemas.microsoft.com/office/powerpoint/2010/main" val="1503720047"/>
+        <p14:creationId xmlns:p14="http://schemas.microsoft.com/office/powerpoint/2010/main" val="1082152292"/>
       </p:ext>
     </p:extLst>
   </p:cSld>
@@ -1176,76 +1298,6 @@
           <a:bodyPr/>
           <a:lstStyle/>
           <a:p>
-            <a:r>
-              <a:rPr lang="en-US" altLang="zh-TW" dirty="0"/>
-              <a:t>Use </a:t>
-            </a:r>
-          </a:p>
-          <a:p>
-            <a:r>
-              <a:rPr lang="en-US" altLang="zh-TW" dirty="0" err="1"/>
-              <a:t>Diff_time</a:t>
-            </a:r>
-            <a:r>
-              <a:rPr lang="en-US" altLang="zh-TW" dirty="0"/>
-              <a:t>[n]  = Time[n] – Time[n+1] and </a:t>
-            </a:r>
-            <a:r>
-              <a:rPr lang="en-US" altLang="zh-TW" dirty="0" err="1"/>
-              <a:t>GroupLeader</a:t>
-            </a:r>
-            <a:r>
-              <a:rPr lang="en-US" altLang="zh-TW" dirty="0"/>
-              <a:t> always lock in new Group</a:t>
-            </a:r>
-          </a:p>
-          <a:p>
-            <a:r>
-              <a:rPr lang="en-US" altLang="zh-TW" dirty="0"/>
-              <a:t>Sum(</a:t>
-            </a:r>
-            <a:r>
-              <a:rPr lang="en-US" altLang="zh-TW" dirty="0" err="1"/>
-              <a:t>Diff_time</a:t>
-            </a:r>
-            <a:r>
-              <a:rPr lang="en-US" altLang="zh-TW" dirty="0"/>
-              <a:t>[k] + … </a:t>
-            </a:r>
-            <a:r>
-              <a:rPr lang="en-US" altLang="zh-TW" dirty="0" err="1"/>
-              <a:t>Diff_time</a:t>
-            </a:r>
-            <a:r>
-              <a:rPr lang="en-US" altLang="zh-TW" dirty="0"/>
-              <a:t>[</a:t>
-            </a:r>
-            <a:r>
-              <a:rPr lang="en-US" altLang="zh-TW" dirty="0" err="1"/>
-              <a:t>k+j</a:t>
-            </a:r>
-            <a:r>
-              <a:rPr lang="en-US" altLang="zh-TW" dirty="0"/>
-              <a:t>])</a:t>
-            </a:r>
-            <a:r>
-              <a:rPr lang="zh-TW" altLang="en-US" dirty="0"/>
-              <a:t> </a:t>
-            </a:r>
-            <a:r>
-              <a:rPr lang="en-US" altLang="zh-TW" dirty="0"/>
-              <a:t>&gt;</a:t>
-            </a:r>
-            <a:r>
-              <a:rPr lang="zh-TW" altLang="en-US" dirty="0"/>
-              <a:t> </a:t>
-            </a:r>
-            <a:r>
-              <a:rPr lang="en-US" altLang="zh-TW" dirty="0"/>
-              <a:t>40ns( tolerance) then find the last point of Group</a:t>
-            </a:r>
-          </a:p>
-          <a:p>
             <a:endParaRPr lang="zh-TW" altLang="en-US" dirty="0"/>
           </a:p>
         </p:txBody>
@@ -1267,7 +1319,7 @@
           <a:p>
             <a:fld id="{0116F853-F7F2-4239-A629-A213C1D67574}" type="slidenum">
               <a:rPr lang="zh-TW" altLang="en-US" smtClean="0"/>
-              <a:t>25</a:t>
+              <a:t>24</a:t>
             </a:fld>
             <a:endParaRPr lang="zh-TW" altLang="en-US"/>
           </a:p>
@@ -1276,7 +1328,7 @@
     </p:spTree>
     <p:extLst>
       <p:ext uri="{BB962C8B-B14F-4D97-AF65-F5344CB8AC3E}">
-        <p14:creationId xmlns:p14="http://schemas.microsoft.com/office/powerpoint/2010/main" val="2483701480"/>
+        <p14:creationId xmlns:p14="http://schemas.microsoft.com/office/powerpoint/2010/main" val="1503720047"/>
       </p:ext>
     </p:extLst>
   </p:cSld>
@@ -1330,86 +1382,57 @@
           <a:bodyPr/>
           <a:lstStyle/>
           <a:p>
-            <a:pPr marL="228600" indent="-228600">
-              <a:buAutoNum type="arabicPeriod"/>
-            </a:pPr>
-            <a:r>
-              <a:rPr lang="zh-TW" altLang="en-US" dirty="0"/>
-              <a:t>下方點的</a:t>
-            </a:r>
-            <a:r>
-              <a:rPr lang="en-US" altLang="zh-TW" dirty="0"/>
-              <a:t>Sample</a:t>
-            </a:r>
-            <a:r>
-              <a:rPr lang="zh-TW" altLang="en-US" dirty="0"/>
-              <a:t>是固定的</a:t>
-            </a:r>
-            <a:r>
-              <a:rPr lang="en-US" altLang="zh-TW" dirty="0"/>
-              <a:t>(Sample</a:t>
-            </a:r>
-            <a:r>
-              <a:rPr lang="zh-TW" altLang="en-US" dirty="0"/>
-              <a:t>的頭節點會取第一個</a:t>
+            <a:r>
+              <a:rPr lang="en-US" altLang="zh-TW" dirty="0"/>
+              <a:t>Use </a:t>
+            </a:r>
+          </a:p>
+          <a:p>
+            <a:r>
+              <a:rPr lang="en-US" altLang="zh-TW" dirty="0" err="1"/>
+              <a:t>Diff_time</a:t>
+            </a:r>
+            <a:r>
+              <a:rPr lang="en-US" altLang="zh-TW" dirty="0"/>
+              <a:t>[n]  = Time[n] – Time[n+1] and </a:t>
             </a:r>
             <a:r>
               <a:rPr lang="en-US" altLang="zh-TW" dirty="0" err="1"/>
               <a:t>GroupLeader</a:t>
             </a:r>
             <a:r>
-              <a:rPr lang="zh-TW" altLang="en-US" dirty="0"/>
-              <a:t>的點當作起始點</a:t>
-            </a:r>
-            <a:r>
-              <a:rPr lang="en-US" altLang="zh-TW" dirty="0"/>
-              <a:t>)</a:t>
-            </a:r>
-            <a:r>
-              <a:rPr lang="zh-TW" altLang="en-US" dirty="0"/>
-              <a:t>。</a:t>
-            </a:r>
-            <a:endParaRPr lang="en-US" altLang="zh-TW" dirty="0"/>
-          </a:p>
-          <a:p>
-            <a:pPr marL="228600" indent="-228600">
-              <a:buAutoNum type="arabicPeriod"/>
-            </a:pPr>
-            <a:r>
-              <a:rPr lang="zh-TW" altLang="en-US" dirty="0"/>
-              <a:t>以下每個</a:t>
-            </a:r>
-            <a:r>
-              <a:rPr lang="en-US" altLang="zh-TW" dirty="0"/>
-              <a:t>Sample</a:t>
-            </a:r>
-            <a:r>
-              <a:rPr lang="zh-TW" altLang="en-US" dirty="0"/>
-              <a:t>點的值依照以下方法取值  </a:t>
+              <a:rPr lang="en-US" altLang="zh-TW" dirty="0"/>
+              <a:t> always lock in new Group</a:t>
+            </a:r>
+          </a:p>
+          <a:p>
+            <a:r>
+              <a:rPr lang="en-US" altLang="zh-TW" dirty="0"/>
+              <a:t>Sum(</a:t>
             </a:r>
             <a:r>
               <a:rPr lang="en-US" altLang="zh-TW" dirty="0" err="1"/>
-              <a:t>G_time</a:t>
-            </a:r>
-            <a:r>
-              <a:rPr lang="en-US" altLang="zh-TW" dirty="0"/>
-              <a:t>[n]&lt; </a:t>
+              <a:t>Diff_time</a:t>
+            </a:r>
+            <a:r>
+              <a:rPr lang="en-US" altLang="zh-TW" dirty="0"/>
+              <a:t>[k] + … </a:t>
             </a:r>
             <a:r>
               <a:rPr lang="en-US" altLang="zh-TW" dirty="0" err="1"/>
-              <a:t>S_time</a:t>
-            </a:r>
-            <a:r>
-              <a:rPr lang="en-US" altLang="zh-TW" dirty="0"/>
-              <a:t>[m] &lt; </a:t>
+              <a:t>Diff_time</a:t>
+            </a:r>
+            <a:r>
+              <a:rPr lang="en-US" altLang="zh-TW" dirty="0"/>
+              <a:t>[</a:t>
             </a:r>
             <a:r>
               <a:rPr lang="en-US" altLang="zh-TW" dirty="0" err="1"/>
-              <a:t>G_time</a:t>
-            </a:r>
-            <a:r>
-              <a:rPr lang="en-US" altLang="zh-TW" dirty="0"/>
-              <a:t>[n+1]</a:t>
+              <a:t>k+j</a:t>
+            </a:r>
+            <a:r>
+              <a:rPr lang="en-US" altLang="zh-TW" dirty="0"/>
+              <a:t>])</a:t>
             </a:r>
             <a:r>
               <a:rPr lang="zh-TW" altLang="en-US" dirty="0"/>
@@ -1417,28 +1440,18 @@
             </a:r>
             <a:r>
               <a:rPr lang="en-US" altLang="zh-TW" dirty="0"/>
-              <a:t>=&gt;</a:t>
+              <a:t>&gt;</a:t>
             </a:r>
             <a:r>
               <a:rPr lang="zh-TW" altLang="en-US" dirty="0"/>
               <a:t> </a:t>
             </a:r>
             <a:r>
-              <a:rPr lang="en-US" altLang="zh-TW" dirty="0" err="1"/>
-              <a:t>S_val</a:t>
-            </a:r>
-            <a:r>
-              <a:rPr lang="en-US" altLang="zh-TW" dirty="0"/>
-              <a:t>[m] = </a:t>
-            </a:r>
-            <a:r>
-              <a:rPr lang="en-US" altLang="zh-TW" dirty="0" err="1"/>
-              <a:t>G_Val</a:t>
-            </a:r>
-            <a:r>
-              <a:rPr lang="en-US" altLang="zh-TW" dirty="0"/>
-              <a:t>[n]</a:t>
-            </a:r>
+              <a:rPr lang="en-US" altLang="zh-TW" dirty="0"/>
+              <a:t>40ns( tolerance) then find the last point of Group</a:t>
+            </a:r>
+          </a:p>
+          <a:p>
             <a:endParaRPr lang="zh-TW" altLang="en-US" dirty="0"/>
           </a:p>
         </p:txBody>
@@ -1460,7 +1473,7 @@
           <a:p>
             <a:fld id="{0116F853-F7F2-4239-A629-A213C1D67574}" type="slidenum">
               <a:rPr lang="zh-TW" altLang="en-US" smtClean="0"/>
-              <a:t>26</a:t>
+              <a:t>25</a:t>
             </a:fld>
             <a:endParaRPr lang="zh-TW" altLang="en-US"/>
           </a:p>
@@ -1469,7 +1482,7 @@
     </p:spTree>
     <p:extLst>
       <p:ext uri="{BB962C8B-B14F-4D97-AF65-F5344CB8AC3E}">
-        <p14:creationId xmlns:p14="http://schemas.microsoft.com/office/powerpoint/2010/main" val="2126586939"/>
+        <p14:creationId xmlns:p14="http://schemas.microsoft.com/office/powerpoint/2010/main" val="2483701480"/>
       </p:ext>
     </p:extLst>
   </p:cSld>
@@ -1523,42 +1536,116 @@
           <a:bodyPr/>
           <a:lstStyle/>
           <a:p>
-            <a:r>
-              <a:rPr lang="zh-TW" altLang="en-US" dirty="0"/>
-              <a:t>硬體模擬需要耗費大量時間，只能</a:t>
-            </a:r>
-            <a:r>
-              <a:rPr lang="en-US" altLang="zh-TW" dirty="0"/>
-              <a:t>Sim</a:t>
-            </a:r>
-            <a:r>
-              <a:rPr lang="zh-TW" altLang="en-US" dirty="0"/>
-              <a:t>出一小段實際行為。而</a:t>
-            </a:r>
-            <a:r>
-              <a:rPr lang="en-US" altLang="zh-TW" dirty="0"/>
-              <a:t>FW</a:t>
-            </a:r>
-            <a:r>
-              <a:rPr lang="zh-TW" altLang="en-US" dirty="0"/>
-              <a:t>關注的點偏向於是否能</a:t>
-            </a:r>
-            <a:r>
-              <a:rPr lang="en-US" altLang="zh-TW" dirty="0"/>
-              <a:t>Decode</a:t>
-            </a:r>
-            <a:r>
-              <a:rPr lang="zh-TW" altLang="en-US" dirty="0"/>
-              <a:t>，</a:t>
-            </a:r>
-            <a:r>
-              <a:rPr lang="en-US" altLang="zh-TW" dirty="0"/>
-              <a:t>Focus</a:t>
-            </a:r>
-            <a:r>
-              <a:rPr lang="zh-TW" altLang="en-US" dirty="0"/>
-              <a:t>的點相對於硬體少很多，所以無需花費大量時間</a:t>
-            </a:r>
+            <a:pPr marL="228600" indent="-228600">
+              <a:buAutoNum type="arabicPeriod"/>
+            </a:pPr>
+            <a:r>
+              <a:rPr lang="zh-TW" altLang="en-US" dirty="0"/>
+              <a:t>下方點的</a:t>
+            </a:r>
+            <a:r>
+              <a:rPr lang="en-US" altLang="zh-TW" dirty="0"/>
+              <a:t>Sample</a:t>
+            </a:r>
+            <a:r>
+              <a:rPr lang="zh-TW" altLang="en-US" dirty="0"/>
+              <a:t>是固定的</a:t>
+            </a:r>
+            <a:r>
+              <a:rPr lang="en-US" altLang="zh-TW" dirty="0"/>
+              <a:t>(Sample</a:t>
+            </a:r>
+            <a:r>
+              <a:rPr lang="zh-TW" altLang="en-US" dirty="0"/>
+              <a:t>的頭節點會取第一個</a:t>
+            </a:r>
+            <a:r>
+              <a:rPr lang="en-US" altLang="zh-TW" dirty="0" err="1"/>
+              <a:t>GroupLeader</a:t>
+            </a:r>
+            <a:r>
+              <a:rPr lang="zh-TW" altLang="en-US" dirty="0"/>
+              <a:t>的點當作起始點</a:t>
+            </a:r>
+            <a:r>
+              <a:rPr lang="en-US" altLang="zh-TW" dirty="0"/>
+              <a:t>)</a:t>
+            </a:r>
+            <a:r>
+              <a:rPr lang="zh-TW" altLang="en-US" dirty="0"/>
+              <a:t>。</a:t>
+            </a:r>
+            <a:endParaRPr lang="en-US" altLang="zh-TW" dirty="0"/>
+          </a:p>
+          <a:p>
+            <a:pPr marL="228600" indent="-228600">
+              <a:buAutoNum type="arabicPeriod"/>
+            </a:pPr>
+            <a:r>
+              <a:rPr lang="zh-TW" altLang="en-US" dirty="0"/>
+              <a:t>以下每個</a:t>
+            </a:r>
+            <a:r>
+              <a:rPr lang="en-US" altLang="zh-TW" dirty="0"/>
+              <a:t>Sample</a:t>
+            </a:r>
+            <a:r>
+              <a:rPr lang="zh-TW" altLang="en-US" dirty="0"/>
+              <a:t>點的值依照以下方法取值  </a:t>
+            </a:r>
+            <a:r>
+              <a:rPr lang="en-US" altLang="zh-TW" dirty="0" err="1"/>
+              <a:t>G_time</a:t>
+            </a:r>
+            <a:r>
+              <a:rPr lang="en-US" altLang="zh-TW" dirty="0"/>
+              <a:t>[n]&lt; </a:t>
+            </a:r>
+            <a:r>
+              <a:rPr lang="en-US" altLang="zh-TW" dirty="0" err="1"/>
+              <a:t>S_time</a:t>
+            </a:r>
+            <a:r>
+              <a:rPr lang="en-US" altLang="zh-TW" dirty="0"/>
+              <a:t>[m] &lt; </a:t>
+            </a:r>
+            <a:r>
+              <a:rPr lang="en-US" altLang="zh-TW" dirty="0" err="1"/>
+              <a:t>G_time</a:t>
+            </a:r>
+            <a:r>
+              <a:rPr lang="en-US" altLang="zh-TW" dirty="0"/>
+              <a:t>[n+1]</a:t>
+            </a:r>
+            <a:r>
+              <a:rPr lang="zh-TW" altLang="en-US" dirty="0"/>
+              <a:t> </a:t>
+            </a:r>
+            <a:r>
+              <a:rPr lang="en-US" altLang="zh-TW" dirty="0"/>
+              <a:t>=&gt;</a:t>
+            </a:r>
+            <a:r>
+              <a:rPr lang="zh-TW" altLang="en-US" dirty="0"/>
+              <a:t> </a:t>
+            </a:r>
+            <a:r>
+              <a:rPr lang="en-US" altLang="zh-TW" dirty="0" err="1"/>
+              <a:t>S_val</a:t>
+            </a:r>
+            <a:r>
+              <a:rPr lang="en-US" altLang="zh-TW" dirty="0"/>
+              <a:t>[m] = </a:t>
+            </a:r>
+            <a:r>
+              <a:rPr lang="en-US" altLang="zh-TW" dirty="0" err="1"/>
+              <a:t>G_Val</a:t>
+            </a:r>
+            <a:r>
+              <a:rPr lang="en-US" altLang="zh-TW" dirty="0"/>
+              <a:t>[n]</a:t>
+            </a:r>
+            <a:endParaRPr lang="zh-TW" altLang="en-US" dirty="0"/>
           </a:p>
         </p:txBody>
       </p:sp>
@@ -1579,7 +1666,7 @@
           <a:p>
             <a:fld id="{0116F853-F7F2-4239-A629-A213C1D67574}" type="slidenum">
               <a:rPr lang="zh-TW" altLang="en-US" smtClean="0"/>
-              <a:t>27</a:t>
+              <a:t>26</a:t>
             </a:fld>
             <a:endParaRPr lang="zh-TW" altLang="en-US"/>
           </a:p>
@@ -1588,7 +1675,7 @@
     </p:spTree>
     <p:extLst>
       <p:ext uri="{BB962C8B-B14F-4D97-AF65-F5344CB8AC3E}">
-        <p14:creationId xmlns:p14="http://schemas.microsoft.com/office/powerpoint/2010/main" val="1884394461"/>
+        <p14:creationId xmlns:p14="http://schemas.microsoft.com/office/powerpoint/2010/main" val="2126586939"/>
       </p:ext>
     </p:extLst>
   </p:cSld>
@@ -1642,35 +1729,42 @@
           <a:bodyPr/>
           <a:lstStyle/>
           <a:p>
-            <a:pPr marL="228600" indent="-228600">
-              <a:buAutoNum type="arabicPeriod"/>
-            </a:pPr>
-            <a:r>
-              <a:rPr lang="zh-TW" altLang="en-US"/>
-              <a:t>這裡可以強調原先學長們有提到某一路是不可行的。但是透過自身對數位電路理解，將其電路串起來可以</a:t>
-            </a:r>
-            <a:r>
-              <a:rPr lang="en-US" altLang="zh-TW"/>
-              <a:t>Work . “RX0 Decoder </a:t>
-            </a:r>
-            <a:r>
-              <a:rPr lang="zh-TW" altLang="en-US"/>
-              <a:t>無法搭配 </a:t>
-            </a:r>
-            <a:r>
-              <a:rPr lang="en-US" altLang="zh-TW"/>
-              <a:t>1st HPF filter + Schmitt Digital “</a:t>
-            </a:r>
-          </a:p>
-          <a:p>
-            <a:pPr marL="0" indent="0">
-              <a:buNone/>
-            </a:pPr>
-            <a:r>
-              <a:rPr lang="zh-TW" altLang="en-US"/>
-              <a:t>這裡可以講細一點，我是如何將電路串起來的</a:t>
-            </a:r>
-            <a:endParaRPr lang="en-US" altLang="zh-TW"/>
+            <a:r>
+              <a:rPr lang="zh-TW" altLang="en-US" dirty="0"/>
+              <a:t>硬體模擬需要耗費大量時間，只能</a:t>
+            </a:r>
+            <a:r>
+              <a:rPr lang="en-US" altLang="zh-TW" dirty="0"/>
+              <a:t>Sim</a:t>
+            </a:r>
+            <a:r>
+              <a:rPr lang="zh-TW" altLang="en-US" dirty="0"/>
+              <a:t>出一小段實際行為。而</a:t>
+            </a:r>
+            <a:r>
+              <a:rPr lang="en-US" altLang="zh-TW" dirty="0"/>
+              <a:t>FW</a:t>
+            </a:r>
+            <a:r>
+              <a:rPr lang="zh-TW" altLang="en-US" dirty="0"/>
+              <a:t>關注的點偏向於是否能</a:t>
+            </a:r>
+            <a:r>
+              <a:rPr lang="en-US" altLang="zh-TW" dirty="0"/>
+              <a:t>Decode</a:t>
+            </a:r>
+            <a:r>
+              <a:rPr lang="zh-TW" altLang="en-US" dirty="0"/>
+              <a:t>，</a:t>
+            </a:r>
+            <a:r>
+              <a:rPr lang="en-US" altLang="zh-TW" dirty="0"/>
+              <a:t>Focus</a:t>
+            </a:r>
+            <a:r>
+              <a:rPr lang="zh-TW" altLang="en-US" dirty="0"/>
+              <a:t>的點相對於硬體少很多，所以無需花費大量時間</a:t>
+            </a:r>
           </a:p>
         </p:txBody>
       </p:sp>
@@ -1691,7 +1785,7 @@
           <a:p>
             <a:fld id="{0116F853-F7F2-4239-A629-A213C1D67574}" type="slidenum">
               <a:rPr lang="zh-TW" altLang="en-US" smtClean="0"/>
-              <a:t>30</a:t>
+              <a:t>27</a:t>
             </a:fld>
             <a:endParaRPr lang="zh-TW" altLang="en-US"/>
           </a:p>
@@ -1700,7 +1794,7 @@
     </p:spTree>
     <p:extLst>
       <p:ext uri="{BB962C8B-B14F-4D97-AF65-F5344CB8AC3E}">
-        <p14:creationId xmlns:p14="http://schemas.microsoft.com/office/powerpoint/2010/main" val="685821978"/>
+        <p14:creationId xmlns:p14="http://schemas.microsoft.com/office/powerpoint/2010/main" val="1884394461"/>
       </p:ext>
     </p:extLst>
   </p:cSld>
@@ -1754,46 +1848,27 @@
           <a:bodyPr/>
           <a:lstStyle/>
           <a:p>
-            <a:pPr marL="0" marR="0" lvl="0" indent="0" algn="l" defTabSz="914400" rtl="0" eaLnBrk="1" fontAlgn="auto" latinLnBrk="0" hangingPunct="1">
-              <a:lnSpc>
-                <a:spcPct val="100000"/>
-              </a:lnSpc>
-              <a:spcBef>
-                <a:spcPts val="0"/>
-              </a:spcBef>
-              <a:spcAft>
-                <a:spcPts val="0"/>
-              </a:spcAft>
-              <a:buClrTx/>
-              <a:buSzTx/>
-              <a:buFontTx/>
-              <a:buNone/>
-              <a:tabLst/>
-              <a:defRPr/>
+            <a:pPr marL="228600" indent="-228600">
+              <a:buAutoNum type="arabicPeriod"/>
             </a:pPr>
             <a:r>
-              <a:rPr lang="zh-TW" altLang="en-US"/>
-              <a:t>針對第一點 </a:t>
-            </a:r>
-            <a:r>
-              <a:rPr lang="en-US" altLang="zh-TW"/>
-              <a:t>:</a:t>
-            </a:r>
-            <a:r>
-              <a:rPr lang="zh-TW" altLang="en-US"/>
-              <a:t>不經過任何訊號處理</a:t>
-            </a:r>
-            <a:endParaRPr lang="en-US" altLang="zh-TW"/>
-          </a:p>
-          <a:p>
-            <a:r>
-              <a:rPr lang="en-US" altLang="zh-TW"/>
-              <a:t>1. ADC </a:t>
-            </a:r>
-            <a:r>
-              <a:rPr lang="zh-TW" altLang="en-US"/>
-              <a:t>刻度少，是指說</a:t>
-            </a:r>
+              <a:rPr lang="zh-TW" altLang="en-US" dirty="0"/>
+              <a:t>數位電路總攬 </a:t>
+            </a:r>
+            <a:r>
+              <a:rPr lang="en-US" altLang="zh-TW" dirty="0"/>
+              <a:t>: </a:t>
+            </a:r>
+          </a:p>
+          <a:p>
+            <a:pPr marL="228600" indent="-228600">
+              <a:buAutoNum type="arabicPeriod"/>
+            </a:pPr>
+            <a:r>
+              <a:rPr lang="en-US" altLang="zh-TW" dirty="0"/>
+              <a:t>B=</a:t>
+            </a:r>
+            <a:endParaRPr lang="zh-TW" altLang="en-US" dirty="0"/>
           </a:p>
         </p:txBody>
       </p:sp>
@@ -1814,7 +1889,7 @@
           <a:p>
             <a:fld id="{0116F853-F7F2-4239-A629-A213C1D67574}" type="slidenum">
               <a:rPr lang="zh-TW" altLang="en-US" smtClean="0"/>
-              <a:t>32</a:t>
+              <a:t>29</a:t>
             </a:fld>
             <a:endParaRPr lang="zh-TW" altLang="en-US"/>
           </a:p>
@@ -1823,7 +1898,7 @@
     </p:spTree>
     <p:extLst>
       <p:ext uri="{BB962C8B-B14F-4D97-AF65-F5344CB8AC3E}">
-        <p14:creationId xmlns:p14="http://schemas.microsoft.com/office/powerpoint/2010/main" val="4159971274"/>
+        <p14:creationId xmlns:p14="http://schemas.microsoft.com/office/powerpoint/2010/main" val="188277632"/>
       </p:ext>
     </p:extLst>
   </p:cSld>
@@ -1877,7 +1952,68 @@
           <a:bodyPr/>
           <a:lstStyle/>
           <a:p>
-            <a:endParaRPr lang="zh-TW" altLang="en-US"/>
+            <a:pPr marL="228600" indent="-228600">
+              <a:buAutoNum type="arabicPeriod"/>
+            </a:pPr>
+            <a:r>
+              <a:rPr lang="zh-TW" altLang="en-US" dirty="0"/>
+              <a:t>這裡可以強調原先學長們有提到某一路是不可行的。但是透過自身對數位電路理解，將其電路串起來可以</a:t>
+            </a:r>
+            <a:r>
+              <a:rPr lang="en-US" altLang="zh-TW" dirty="0"/>
+              <a:t>Work . “RX0 Decoder </a:t>
+            </a:r>
+            <a:r>
+              <a:rPr lang="zh-TW" altLang="en-US" dirty="0"/>
+              <a:t>無法搭配 </a:t>
+            </a:r>
+            <a:r>
+              <a:rPr lang="en-US" altLang="zh-TW" dirty="0"/>
+              <a:t>1st HPF filter + Schmitt Digital “</a:t>
+            </a:r>
+          </a:p>
+          <a:p>
+            <a:pPr marL="0" indent="0">
+              <a:buNone/>
+            </a:pPr>
+            <a:r>
+              <a:rPr lang="zh-TW" altLang="en-US" dirty="0"/>
+              <a:t>這裡可以講細一點，我是如何將電路串起來的</a:t>
+            </a:r>
+            <a:endParaRPr lang="en-US" altLang="zh-TW" dirty="0"/>
+          </a:p>
+          <a:p>
+            <a:pPr marL="0" marR="0" lvl="0" indent="0" algn="l" defTabSz="914400" rtl="0" eaLnBrk="1" fontAlgn="auto" latinLnBrk="0" hangingPunct="1">
+              <a:lnSpc>
+                <a:spcPct val="100000"/>
+              </a:lnSpc>
+              <a:spcBef>
+                <a:spcPts val="0"/>
+              </a:spcBef>
+              <a:spcAft>
+                <a:spcPts val="0"/>
+              </a:spcAft>
+              <a:buClrTx/>
+              <a:buSzTx/>
+              <a:buFontTx/>
+              <a:buNone/>
+              <a:tabLst/>
+              <a:defRPr/>
+            </a:pPr>
+            <a:r>
+              <a:rPr lang="en-US" altLang="zh-TW" dirty="0"/>
+              <a:t>2.   </a:t>
+            </a:r>
+            <a:r>
+              <a:rPr lang="zh-TW" altLang="en-US" dirty="0"/>
+              <a:t>等前後端電路都講解完，可以補充上述電路發現過程</a:t>
+            </a:r>
+          </a:p>
+          <a:p>
+            <a:pPr marL="0" indent="0">
+              <a:buNone/>
+            </a:pPr>
+            <a:endParaRPr lang="en-US" altLang="zh-TW" dirty="0"/>
           </a:p>
         </p:txBody>
       </p:sp>
@@ -1898,7 +2034,7 @@
           <a:p>
             <a:fld id="{0116F853-F7F2-4239-A629-A213C1D67574}" type="slidenum">
               <a:rPr lang="zh-TW" altLang="en-US" smtClean="0"/>
-              <a:t>50</a:t>
+              <a:t>30</a:t>
             </a:fld>
             <a:endParaRPr lang="zh-TW" altLang="en-US"/>
           </a:p>
@@ -1907,7 +2043,7 @@
     </p:spTree>
     <p:extLst>
       <p:ext uri="{BB962C8B-B14F-4D97-AF65-F5344CB8AC3E}">
-        <p14:creationId xmlns:p14="http://schemas.microsoft.com/office/powerpoint/2010/main" val="2670570649"/>
+        <p14:creationId xmlns:p14="http://schemas.microsoft.com/office/powerpoint/2010/main" val="685821978"/>
       </p:ext>
     </p:extLst>
   </p:cSld>
@@ -1961,71 +2097,7 @@
           <a:bodyPr/>
           <a:lstStyle/>
           <a:p>
-            <a:pPr marL="228600" indent="-228600">
-              <a:buAutoNum type="arabicPeriod"/>
-            </a:pPr>
-            <a:r>
-              <a:rPr lang="zh-TW" altLang="en-US"/>
-              <a:t>由於筆只使用</a:t>
-            </a:r>
-            <a:r>
-              <a:rPr lang="en-US" altLang="zh-TW"/>
-              <a:t>UART TX</a:t>
-            </a:r>
-            <a:r>
-              <a:rPr lang="zh-TW" altLang="en-US"/>
-              <a:t>來印出相關資訊、並沒有使用</a:t>
-            </a:r>
-            <a:r>
-              <a:rPr lang="en-US" altLang="zh-TW"/>
-              <a:t>RX</a:t>
-            </a:r>
-            <a:r>
-              <a:rPr lang="zh-TW" altLang="en-US"/>
-              <a:t>來接收其他</a:t>
-            </a:r>
-            <a:r>
-              <a:rPr lang="en-US" altLang="zh-TW"/>
-              <a:t>Sensor</a:t>
-            </a:r>
-            <a:r>
-              <a:rPr lang="zh-TW" altLang="en-US"/>
-              <a:t>的</a:t>
-            </a:r>
-            <a:r>
-              <a:rPr lang="en-US" altLang="zh-TW"/>
-              <a:t>information</a:t>
-            </a:r>
-            <a:r>
-              <a:rPr lang="zh-TW" altLang="en-US"/>
-              <a:t>。</a:t>
-            </a:r>
-            <a:endParaRPr lang="en-US" altLang="zh-TW"/>
-          </a:p>
-          <a:p>
-            <a:pPr marL="0" indent="0">
-              <a:buNone/>
-            </a:pPr>
-            <a:r>
-              <a:rPr lang="zh-TW" altLang="en-US"/>
-              <a:t>       </a:t>
-            </a:r>
-            <a:r>
-              <a:rPr lang="en-US" altLang="zh-TW"/>
-              <a:t>1.1 UART</a:t>
-            </a:r>
-            <a:r>
-              <a:rPr lang="zh-TW" altLang="en-US"/>
-              <a:t> </a:t>
-            </a:r>
-            <a:r>
-              <a:rPr lang="en-US" altLang="zh-TW"/>
-              <a:t>RX Setting</a:t>
-            </a:r>
-            <a:r>
-              <a:rPr lang="zh-TW" altLang="en-US"/>
-              <a:t>建立</a:t>
-            </a:r>
+            <a:endParaRPr lang="zh-TW" altLang="en-US" dirty="0"/>
           </a:p>
         </p:txBody>
       </p:sp>
@@ -2046,7 +2118,7 @@
           <a:p>
             <a:fld id="{0116F853-F7F2-4239-A629-A213C1D67574}" type="slidenum">
               <a:rPr lang="zh-TW" altLang="en-US" smtClean="0"/>
-              <a:t>51</a:t>
+              <a:t>31</a:t>
             </a:fld>
             <a:endParaRPr lang="zh-TW" altLang="en-US"/>
           </a:p>
@@ -2055,7 +2127,7 @@
     </p:spTree>
     <p:extLst>
       <p:ext uri="{BB962C8B-B14F-4D97-AF65-F5344CB8AC3E}">
-        <p14:creationId xmlns:p14="http://schemas.microsoft.com/office/powerpoint/2010/main" val="978169652"/>
+        <p14:creationId xmlns:p14="http://schemas.microsoft.com/office/powerpoint/2010/main" val="2782265935"/>
       </p:ext>
     </p:extLst>
   </p:cSld>
@@ -2177,6 +2249,532 @@
     <p:extLst>
       <p:ext uri="{BB962C8B-B14F-4D97-AF65-F5344CB8AC3E}">
         <p14:creationId xmlns:p14="http://schemas.microsoft.com/office/powerpoint/2010/main" val="2700440100"/>
+      </p:ext>
+    </p:extLst>
+  </p:cSld>
+  <p:clrMapOvr>
+    <a:masterClrMapping/>
+  </p:clrMapOvr>
+</p:notes>
+</file>
+
+<file path=ppt/notesSlides/notesSlide20.xml><?xml version="1.0" encoding="utf-8"?>
+<p:notes xmlns:a="http://schemas.openxmlformats.org/drawingml/2006/main" xmlns:r="http://schemas.openxmlformats.org/officeDocument/2006/relationships" xmlns:p="http://schemas.openxmlformats.org/presentationml/2006/main">
+  <p:cSld>
+    <p:spTree>
+      <p:nvGrpSpPr>
+        <p:cNvPr id="1" name=""/>
+        <p:cNvGrpSpPr/>
+        <p:nvPr/>
+      </p:nvGrpSpPr>
+      <p:grpSpPr>
+        <a:xfrm>
+          <a:off x="0" y="0"/>
+          <a:ext cx="0" cy="0"/>
+          <a:chOff x="0" y="0"/>
+          <a:chExt cx="0" cy="0"/>
+        </a:xfrm>
+      </p:grpSpPr>
+      <p:sp>
+        <p:nvSpPr>
+          <p:cNvPr id="2" name="投影片影像版面配置區 1"/>
+          <p:cNvSpPr>
+            <a:spLocks noGrp="1" noRot="1" noChangeAspect="1"/>
+          </p:cNvSpPr>
+          <p:nvPr>
+            <p:ph type="sldImg"/>
+          </p:nvPr>
+        </p:nvSpPr>
+        <p:spPr/>
+      </p:sp>
+      <p:sp>
+        <p:nvSpPr>
+          <p:cNvPr id="3" name="備忘稿版面配置區 2"/>
+          <p:cNvSpPr>
+            <a:spLocks noGrp="1"/>
+          </p:cNvSpPr>
+          <p:nvPr>
+            <p:ph type="body" idx="1"/>
+          </p:nvPr>
+        </p:nvSpPr>
+        <p:spPr/>
+        <p:txBody>
+          <a:bodyPr/>
+          <a:lstStyle/>
+          <a:p>
+            <a:pPr marL="0" marR="0" lvl="0" indent="0" algn="l" defTabSz="914400" rtl="0" eaLnBrk="1" fontAlgn="auto" latinLnBrk="0" hangingPunct="1">
+              <a:lnSpc>
+                <a:spcPct val="100000"/>
+              </a:lnSpc>
+              <a:spcBef>
+                <a:spcPts val="0"/>
+              </a:spcBef>
+              <a:spcAft>
+                <a:spcPts val="0"/>
+              </a:spcAft>
+              <a:buClrTx/>
+              <a:buSzTx/>
+              <a:buFontTx/>
+              <a:buNone/>
+              <a:tabLst/>
+              <a:defRPr/>
+            </a:pPr>
+            <a:r>
+              <a:rPr lang="zh-TW" altLang="en-US"/>
+              <a:t>針對第一點 </a:t>
+            </a:r>
+            <a:r>
+              <a:rPr lang="en-US" altLang="zh-TW"/>
+              <a:t>:</a:t>
+            </a:r>
+            <a:r>
+              <a:rPr lang="zh-TW" altLang="en-US"/>
+              <a:t>不經過任何訊號處理</a:t>
+            </a:r>
+            <a:endParaRPr lang="en-US" altLang="zh-TW"/>
+          </a:p>
+          <a:p>
+            <a:r>
+              <a:rPr lang="en-US" altLang="zh-TW"/>
+              <a:t>1. ADC </a:t>
+            </a:r>
+            <a:r>
+              <a:rPr lang="zh-TW" altLang="en-US"/>
+              <a:t>刻度少，是指說</a:t>
+            </a:r>
+          </a:p>
+        </p:txBody>
+      </p:sp>
+      <p:sp>
+        <p:nvSpPr>
+          <p:cNvPr id="4" name="投影片編號版面配置區 3"/>
+          <p:cNvSpPr>
+            <a:spLocks noGrp="1"/>
+          </p:cNvSpPr>
+          <p:nvPr>
+            <p:ph type="sldNum" sz="quarter" idx="5"/>
+          </p:nvPr>
+        </p:nvSpPr>
+        <p:spPr/>
+        <p:txBody>
+          <a:bodyPr/>
+          <a:lstStyle/>
+          <a:p>
+            <a:fld id="{0116F853-F7F2-4239-A629-A213C1D67574}" type="slidenum">
+              <a:rPr lang="zh-TW" altLang="en-US" smtClean="0"/>
+              <a:t>32</a:t>
+            </a:fld>
+            <a:endParaRPr lang="zh-TW" altLang="en-US"/>
+          </a:p>
+        </p:txBody>
+      </p:sp>
+    </p:spTree>
+    <p:extLst>
+      <p:ext uri="{BB962C8B-B14F-4D97-AF65-F5344CB8AC3E}">
+        <p14:creationId xmlns:p14="http://schemas.microsoft.com/office/powerpoint/2010/main" val="4159971274"/>
+      </p:ext>
+    </p:extLst>
+  </p:cSld>
+  <p:clrMapOvr>
+    <a:masterClrMapping/>
+  </p:clrMapOvr>
+</p:notes>
+</file>
+
+<file path=ppt/notesSlides/notesSlide21.xml><?xml version="1.0" encoding="utf-8"?>
+<p:notes xmlns:a="http://schemas.openxmlformats.org/drawingml/2006/main" xmlns:r="http://schemas.openxmlformats.org/officeDocument/2006/relationships" xmlns:p="http://schemas.openxmlformats.org/presentationml/2006/main">
+  <p:cSld>
+    <p:spTree>
+      <p:nvGrpSpPr>
+        <p:cNvPr id="1" name=""/>
+        <p:cNvGrpSpPr/>
+        <p:nvPr/>
+      </p:nvGrpSpPr>
+      <p:grpSpPr>
+        <a:xfrm>
+          <a:off x="0" y="0"/>
+          <a:ext cx="0" cy="0"/>
+          <a:chOff x="0" y="0"/>
+          <a:chExt cx="0" cy="0"/>
+        </a:xfrm>
+      </p:grpSpPr>
+      <p:sp>
+        <p:nvSpPr>
+          <p:cNvPr id="2" name="投影片影像版面配置區 1"/>
+          <p:cNvSpPr>
+            <a:spLocks noGrp="1" noRot="1" noChangeAspect="1"/>
+          </p:cNvSpPr>
+          <p:nvPr>
+            <p:ph type="sldImg"/>
+          </p:nvPr>
+        </p:nvSpPr>
+        <p:spPr/>
+      </p:sp>
+      <p:sp>
+        <p:nvSpPr>
+          <p:cNvPr id="3" name="備忘稿版面配置區 2"/>
+          <p:cNvSpPr>
+            <a:spLocks noGrp="1"/>
+          </p:cNvSpPr>
+          <p:nvPr>
+            <p:ph type="body" idx="1"/>
+          </p:nvPr>
+        </p:nvSpPr>
+        <p:spPr/>
+        <p:txBody>
+          <a:bodyPr/>
+          <a:lstStyle/>
+          <a:p>
+            <a:endParaRPr lang="zh-TW" altLang="en-US" dirty="0"/>
+          </a:p>
+        </p:txBody>
+      </p:sp>
+      <p:sp>
+        <p:nvSpPr>
+          <p:cNvPr id="4" name="投影片編號版面配置區 3"/>
+          <p:cNvSpPr>
+            <a:spLocks noGrp="1"/>
+          </p:cNvSpPr>
+          <p:nvPr>
+            <p:ph type="sldNum" sz="quarter" idx="5"/>
+          </p:nvPr>
+        </p:nvSpPr>
+        <p:spPr/>
+        <p:txBody>
+          <a:bodyPr/>
+          <a:lstStyle/>
+          <a:p>
+            <a:fld id="{0116F853-F7F2-4239-A629-A213C1D67574}" type="slidenum">
+              <a:rPr lang="zh-TW" altLang="en-US" smtClean="0"/>
+              <a:t>33</a:t>
+            </a:fld>
+            <a:endParaRPr lang="zh-TW" altLang="en-US"/>
+          </a:p>
+        </p:txBody>
+      </p:sp>
+    </p:spTree>
+    <p:extLst>
+      <p:ext uri="{BB962C8B-B14F-4D97-AF65-F5344CB8AC3E}">
+        <p14:creationId xmlns:p14="http://schemas.microsoft.com/office/powerpoint/2010/main" val="990445044"/>
+      </p:ext>
+    </p:extLst>
+  </p:cSld>
+  <p:clrMapOvr>
+    <a:masterClrMapping/>
+  </p:clrMapOvr>
+</p:notes>
+</file>
+
+<file path=ppt/notesSlides/notesSlide22.xml><?xml version="1.0" encoding="utf-8"?>
+<p:notes xmlns:a="http://schemas.openxmlformats.org/drawingml/2006/main" xmlns:r="http://schemas.openxmlformats.org/officeDocument/2006/relationships" xmlns:p="http://schemas.openxmlformats.org/presentationml/2006/main">
+  <p:cSld>
+    <p:spTree>
+      <p:nvGrpSpPr>
+        <p:cNvPr id="1" name=""/>
+        <p:cNvGrpSpPr/>
+        <p:nvPr/>
+      </p:nvGrpSpPr>
+      <p:grpSpPr>
+        <a:xfrm>
+          <a:off x="0" y="0"/>
+          <a:ext cx="0" cy="0"/>
+          <a:chOff x="0" y="0"/>
+          <a:chExt cx="0" cy="0"/>
+        </a:xfrm>
+      </p:grpSpPr>
+      <p:sp>
+        <p:nvSpPr>
+          <p:cNvPr id="2" name="投影片影像版面配置區 1"/>
+          <p:cNvSpPr>
+            <a:spLocks noGrp="1" noRot="1" noChangeAspect="1"/>
+          </p:cNvSpPr>
+          <p:nvPr>
+            <p:ph type="sldImg"/>
+          </p:nvPr>
+        </p:nvSpPr>
+        <p:spPr/>
+      </p:sp>
+      <p:sp>
+        <p:nvSpPr>
+          <p:cNvPr id="3" name="備忘稿版面配置區 2"/>
+          <p:cNvSpPr>
+            <a:spLocks noGrp="1"/>
+          </p:cNvSpPr>
+          <p:nvPr>
+            <p:ph type="body" idx="1"/>
+          </p:nvPr>
+        </p:nvSpPr>
+        <p:spPr/>
+        <p:txBody>
+          <a:bodyPr/>
+          <a:lstStyle/>
+          <a:p>
+            <a:r>
+              <a:rPr lang="zh-TW" altLang="en-US" dirty="0"/>
+              <a:t>利用這張圖解釋</a:t>
+            </a:r>
+          </a:p>
+        </p:txBody>
+      </p:sp>
+      <p:sp>
+        <p:nvSpPr>
+          <p:cNvPr id="4" name="投影片編號版面配置區 3"/>
+          <p:cNvSpPr>
+            <a:spLocks noGrp="1"/>
+          </p:cNvSpPr>
+          <p:nvPr>
+            <p:ph type="sldNum" sz="quarter" idx="5"/>
+          </p:nvPr>
+        </p:nvSpPr>
+        <p:spPr/>
+        <p:txBody>
+          <a:bodyPr/>
+          <a:lstStyle/>
+          <a:p>
+            <a:fld id="{0116F853-F7F2-4239-A629-A213C1D67574}" type="slidenum">
+              <a:rPr lang="zh-TW" altLang="en-US" smtClean="0"/>
+              <a:t>35</a:t>
+            </a:fld>
+            <a:endParaRPr lang="zh-TW" altLang="en-US"/>
+          </a:p>
+        </p:txBody>
+      </p:sp>
+    </p:spTree>
+    <p:extLst>
+      <p:ext uri="{BB962C8B-B14F-4D97-AF65-F5344CB8AC3E}">
+        <p14:creationId xmlns:p14="http://schemas.microsoft.com/office/powerpoint/2010/main" val="1884241967"/>
+      </p:ext>
+    </p:extLst>
+  </p:cSld>
+  <p:clrMapOvr>
+    <a:masterClrMapping/>
+  </p:clrMapOvr>
+</p:notes>
+</file>
+
+<file path=ppt/notesSlides/notesSlide23.xml><?xml version="1.0" encoding="utf-8"?>
+<p:notes xmlns:a="http://schemas.openxmlformats.org/drawingml/2006/main" xmlns:r="http://schemas.openxmlformats.org/officeDocument/2006/relationships" xmlns:p="http://schemas.openxmlformats.org/presentationml/2006/main">
+  <p:cSld>
+    <p:spTree>
+      <p:nvGrpSpPr>
+        <p:cNvPr id="1" name=""/>
+        <p:cNvGrpSpPr/>
+        <p:nvPr/>
+      </p:nvGrpSpPr>
+      <p:grpSpPr>
+        <a:xfrm>
+          <a:off x="0" y="0"/>
+          <a:ext cx="0" cy="0"/>
+          <a:chOff x="0" y="0"/>
+          <a:chExt cx="0" cy="0"/>
+        </a:xfrm>
+      </p:grpSpPr>
+      <p:sp>
+        <p:nvSpPr>
+          <p:cNvPr id="2" name="投影片影像版面配置區 1"/>
+          <p:cNvSpPr>
+            <a:spLocks noGrp="1" noRot="1" noChangeAspect="1"/>
+          </p:cNvSpPr>
+          <p:nvPr>
+            <p:ph type="sldImg"/>
+          </p:nvPr>
+        </p:nvSpPr>
+        <p:spPr/>
+      </p:sp>
+      <p:sp>
+        <p:nvSpPr>
+          <p:cNvPr id="3" name="備忘稿版面配置區 2"/>
+          <p:cNvSpPr>
+            <a:spLocks noGrp="1"/>
+          </p:cNvSpPr>
+          <p:nvPr>
+            <p:ph type="body" idx="1"/>
+          </p:nvPr>
+        </p:nvSpPr>
+        <p:spPr/>
+        <p:txBody>
+          <a:bodyPr/>
+          <a:lstStyle/>
+          <a:p>
+            <a:endParaRPr lang="zh-TW" altLang="en-US"/>
+          </a:p>
+        </p:txBody>
+      </p:sp>
+      <p:sp>
+        <p:nvSpPr>
+          <p:cNvPr id="4" name="投影片編號版面配置區 3"/>
+          <p:cNvSpPr>
+            <a:spLocks noGrp="1"/>
+          </p:cNvSpPr>
+          <p:nvPr>
+            <p:ph type="sldNum" sz="quarter" idx="5"/>
+          </p:nvPr>
+        </p:nvSpPr>
+        <p:spPr/>
+        <p:txBody>
+          <a:bodyPr/>
+          <a:lstStyle/>
+          <a:p>
+            <a:fld id="{0116F853-F7F2-4239-A629-A213C1D67574}" type="slidenum">
+              <a:rPr lang="zh-TW" altLang="en-US" smtClean="0"/>
+              <a:t>50</a:t>
+            </a:fld>
+            <a:endParaRPr lang="zh-TW" altLang="en-US"/>
+          </a:p>
+        </p:txBody>
+      </p:sp>
+    </p:spTree>
+    <p:extLst>
+      <p:ext uri="{BB962C8B-B14F-4D97-AF65-F5344CB8AC3E}">
+        <p14:creationId xmlns:p14="http://schemas.microsoft.com/office/powerpoint/2010/main" val="2670570649"/>
+      </p:ext>
+    </p:extLst>
+  </p:cSld>
+  <p:clrMapOvr>
+    <a:masterClrMapping/>
+  </p:clrMapOvr>
+</p:notes>
+</file>
+
+<file path=ppt/notesSlides/notesSlide24.xml><?xml version="1.0" encoding="utf-8"?>
+<p:notes xmlns:a="http://schemas.openxmlformats.org/drawingml/2006/main" xmlns:r="http://schemas.openxmlformats.org/officeDocument/2006/relationships" xmlns:p="http://schemas.openxmlformats.org/presentationml/2006/main">
+  <p:cSld>
+    <p:spTree>
+      <p:nvGrpSpPr>
+        <p:cNvPr id="1" name=""/>
+        <p:cNvGrpSpPr/>
+        <p:nvPr/>
+      </p:nvGrpSpPr>
+      <p:grpSpPr>
+        <a:xfrm>
+          <a:off x="0" y="0"/>
+          <a:ext cx="0" cy="0"/>
+          <a:chOff x="0" y="0"/>
+          <a:chExt cx="0" cy="0"/>
+        </a:xfrm>
+      </p:grpSpPr>
+      <p:sp>
+        <p:nvSpPr>
+          <p:cNvPr id="2" name="投影片影像版面配置區 1"/>
+          <p:cNvSpPr>
+            <a:spLocks noGrp="1" noRot="1" noChangeAspect="1"/>
+          </p:cNvSpPr>
+          <p:nvPr>
+            <p:ph type="sldImg"/>
+          </p:nvPr>
+        </p:nvSpPr>
+        <p:spPr/>
+      </p:sp>
+      <p:sp>
+        <p:nvSpPr>
+          <p:cNvPr id="3" name="備忘稿版面配置區 2"/>
+          <p:cNvSpPr>
+            <a:spLocks noGrp="1"/>
+          </p:cNvSpPr>
+          <p:nvPr>
+            <p:ph type="body" idx="1"/>
+          </p:nvPr>
+        </p:nvSpPr>
+        <p:spPr/>
+        <p:txBody>
+          <a:bodyPr/>
+          <a:lstStyle/>
+          <a:p>
+            <a:pPr marL="228600" indent="-228600">
+              <a:buAutoNum type="arabicPeriod"/>
+            </a:pPr>
+            <a:r>
+              <a:rPr lang="zh-TW" altLang="en-US"/>
+              <a:t>由於筆只使用</a:t>
+            </a:r>
+            <a:r>
+              <a:rPr lang="en-US" altLang="zh-TW"/>
+              <a:t>UART TX</a:t>
+            </a:r>
+            <a:r>
+              <a:rPr lang="zh-TW" altLang="en-US"/>
+              <a:t>來印出相關資訊、並沒有使用</a:t>
+            </a:r>
+            <a:r>
+              <a:rPr lang="en-US" altLang="zh-TW"/>
+              <a:t>RX</a:t>
+            </a:r>
+            <a:r>
+              <a:rPr lang="zh-TW" altLang="en-US"/>
+              <a:t>來接收其他</a:t>
+            </a:r>
+            <a:r>
+              <a:rPr lang="en-US" altLang="zh-TW"/>
+              <a:t>Sensor</a:t>
+            </a:r>
+            <a:r>
+              <a:rPr lang="zh-TW" altLang="en-US"/>
+              <a:t>的</a:t>
+            </a:r>
+            <a:r>
+              <a:rPr lang="en-US" altLang="zh-TW"/>
+              <a:t>information</a:t>
+            </a:r>
+            <a:r>
+              <a:rPr lang="zh-TW" altLang="en-US"/>
+              <a:t>。</a:t>
+            </a:r>
+            <a:endParaRPr lang="en-US" altLang="zh-TW"/>
+          </a:p>
+          <a:p>
+            <a:pPr marL="0" indent="0">
+              <a:buNone/>
+            </a:pPr>
+            <a:r>
+              <a:rPr lang="zh-TW" altLang="en-US"/>
+              <a:t>       </a:t>
+            </a:r>
+            <a:r>
+              <a:rPr lang="en-US" altLang="zh-TW"/>
+              <a:t>1.1 UART</a:t>
+            </a:r>
+            <a:r>
+              <a:rPr lang="zh-TW" altLang="en-US"/>
+              <a:t> </a:t>
+            </a:r>
+            <a:r>
+              <a:rPr lang="en-US" altLang="zh-TW"/>
+              <a:t>RX Setting</a:t>
+            </a:r>
+            <a:r>
+              <a:rPr lang="zh-TW" altLang="en-US"/>
+              <a:t>建立</a:t>
+            </a:r>
+          </a:p>
+        </p:txBody>
+      </p:sp>
+      <p:sp>
+        <p:nvSpPr>
+          <p:cNvPr id="4" name="投影片編號版面配置區 3"/>
+          <p:cNvSpPr>
+            <a:spLocks noGrp="1"/>
+          </p:cNvSpPr>
+          <p:nvPr>
+            <p:ph type="sldNum" sz="quarter" idx="5"/>
+          </p:nvPr>
+        </p:nvSpPr>
+        <p:spPr/>
+        <p:txBody>
+          <a:bodyPr/>
+          <a:lstStyle/>
+          <a:p>
+            <a:fld id="{0116F853-F7F2-4239-A629-A213C1D67574}" type="slidenum">
+              <a:rPr lang="zh-TW" altLang="en-US" smtClean="0"/>
+              <a:t>51</a:t>
+            </a:fld>
+            <a:endParaRPr lang="zh-TW" altLang="en-US"/>
+          </a:p>
+        </p:txBody>
+      </p:sp>
+    </p:spTree>
+    <p:extLst>
+      <p:ext uri="{BB962C8B-B14F-4D97-AF65-F5344CB8AC3E}">
+        <p14:creationId xmlns:p14="http://schemas.microsoft.com/office/powerpoint/2010/main" val="978169652"/>
       </p:ext>
     </p:extLst>
   </p:cSld>
@@ -2757,7 +3355,15 @@
           <a:p>
             <a:r>
               <a:rPr lang="en-US" altLang="zh-TW" dirty="0"/>
-              <a:t>1. PGA </a:t>
+              <a:t>1.  </a:t>
+            </a:r>
+            <a:r>
+              <a:rPr lang="zh-TW" altLang="en-US" dirty="0"/>
+              <a:t> </a:t>
+            </a:r>
+            <a:r>
+              <a:rPr lang="en-US" altLang="zh-TW" dirty="0"/>
+              <a:t>PGA </a:t>
             </a:r>
             <a:r>
               <a:rPr lang="zh-TW" altLang="en-US" dirty="0"/>
@@ -2801,8 +3407,9 @@
             </a:r>
             <a:r>
               <a:rPr lang="zh-TW" altLang="en-US" dirty="0"/>
-              <a:t>流程有密切關係</a:t>
-            </a:r>
+              <a:t>流程有密切關係。</a:t>
+            </a:r>
+            <a:endParaRPr lang="en-US" altLang="zh-TW" dirty="0"/>
           </a:p>
         </p:txBody>
       </p:sp>
@@ -2981,65 +3588,7 @@
           <a:bodyPr/>
           <a:lstStyle/>
           <a:p>
-            <a:r>
-              <a:rPr lang="zh-TW" altLang="en-US" dirty="0"/>
-              <a:t>講述</a:t>
-            </a:r>
-            <a:r>
-              <a:rPr lang="en-US" altLang="zh-TW" dirty="0"/>
-              <a:t>LA</a:t>
-            </a:r>
-            <a:r>
-              <a:rPr lang="zh-TW" altLang="en-US" dirty="0"/>
-              <a:t>的儲存方式</a:t>
-            </a:r>
-            <a:endParaRPr lang="en-US" altLang="zh-TW" dirty="0"/>
-          </a:p>
-          <a:p>
-            <a:pPr marL="228600" indent="-228600">
-              <a:buAutoNum type="arabicPeriod"/>
-            </a:pPr>
-            <a:r>
-              <a:rPr lang="en-US" altLang="zh-TW" dirty="0"/>
-              <a:t>LA </a:t>
-            </a:r>
-            <a:r>
-              <a:rPr lang="zh-TW" altLang="en-US" dirty="0"/>
-              <a:t>的 </a:t>
-            </a:r>
-            <a:r>
-              <a:rPr lang="en-US" altLang="zh-TW" dirty="0" err="1"/>
-              <a:t>SampleRate</a:t>
-            </a:r>
-            <a:r>
-              <a:rPr lang="en-US" altLang="zh-TW" dirty="0"/>
-              <a:t> </a:t>
-            </a:r>
-            <a:r>
-              <a:rPr lang="zh-TW" altLang="en-US" dirty="0"/>
-              <a:t>最高可以到</a:t>
-            </a:r>
-            <a:r>
-              <a:rPr lang="en-US" altLang="zh-TW" dirty="0"/>
-              <a:t>500MHZ</a:t>
-            </a:r>
-          </a:p>
-          <a:p>
-            <a:pPr marL="228600" indent="-228600">
-              <a:buAutoNum type="arabicPeriod"/>
-            </a:pPr>
-            <a:r>
-              <a:rPr lang="zh-TW" altLang="en-US" dirty="0"/>
-              <a:t>當儲存成</a:t>
-            </a:r>
-            <a:r>
-              <a:rPr lang="en-US" altLang="zh-TW" dirty="0"/>
-              <a:t>csv</a:t>
-            </a:r>
-            <a:r>
-              <a:rPr lang="zh-TW" altLang="en-US" dirty="0"/>
-              <a:t>檔時，指針對數值變化的時間點儲存</a:t>
-            </a:r>
+            <a:endParaRPr lang="zh-TW" altLang="en-US" dirty="0"/>
           </a:p>
         </p:txBody>
       </p:sp>
@@ -3060,7 +3609,7 @@
           <a:p>
             <a:fld id="{0116F853-F7F2-4239-A629-A213C1D67574}" type="slidenum">
               <a:rPr lang="zh-TW" altLang="en-US" smtClean="0"/>
-              <a:t>17</a:t>
+              <a:t>14</a:t>
             </a:fld>
             <a:endParaRPr lang="zh-TW" altLang="en-US"/>
           </a:p>
@@ -3069,7 +3618,7 @@
     </p:spTree>
     <p:extLst>
       <p:ext uri="{BB962C8B-B14F-4D97-AF65-F5344CB8AC3E}">
-        <p14:creationId xmlns:p14="http://schemas.microsoft.com/office/powerpoint/2010/main" val="2752075676"/>
+        <p14:creationId xmlns:p14="http://schemas.microsoft.com/office/powerpoint/2010/main" val="1427615133"/>
       </p:ext>
     </p:extLst>
   </p:cSld>
@@ -3123,129 +3672,65 @@
           <a:bodyPr/>
           <a:lstStyle/>
           <a:p>
-            <a:pPr marL="457200" lvl="1" indent="0" algn="l">
-              <a:buNone/>
-            </a:pPr>
-            <a:endParaRPr lang="en-US" altLang="zh-TW" dirty="0"/>
-          </a:p>
-          <a:p>
-            <a:pPr marL="228600" indent="-228600" algn="l">
-              <a:buAutoNum type="arabicPeriod"/>
-            </a:pPr>
-            <a:r>
-              <a:rPr lang="en-US" altLang="zh-TW" dirty="0"/>
-              <a:t>Sample</a:t>
-            </a:r>
-            <a:r>
-              <a:rPr lang="zh-TW" altLang="en-US" dirty="0"/>
-              <a:t>的時間點取這個</a:t>
-            </a:r>
-            <a:r>
-              <a:rPr lang="en-US" altLang="zh-TW" dirty="0"/>
-              <a:t>Group</a:t>
-            </a:r>
-            <a:r>
-              <a:rPr lang="zh-TW" altLang="en-US" dirty="0"/>
-              <a:t>的最後</a:t>
-            </a:r>
-            <a:endParaRPr lang="en-US" altLang="zh-TW" dirty="0"/>
-          </a:p>
-          <a:p>
-            <a:pPr marL="228600" indent="-228600" algn="l">
-              <a:buAutoNum type="arabicPeriod" startAt="2"/>
-            </a:pPr>
-            <a:r>
-              <a:rPr lang="en-US" altLang="zh-TW" dirty="0"/>
-              <a:t>Group </a:t>
-            </a:r>
-            <a:r>
-              <a:rPr lang="zh-TW" altLang="en-US" dirty="0"/>
-              <a:t>指的是 </a:t>
-            </a:r>
-            <a:r>
-              <a:rPr lang="en-US" altLang="zh-TW" dirty="0"/>
-              <a:t>8</a:t>
-            </a:r>
-            <a:r>
-              <a:rPr lang="zh-TW" altLang="en-US" dirty="0"/>
-              <a:t>個</a:t>
-            </a:r>
-            <a:r>
-              <a:rPr lang="en-US" altLang="zh-TW" dirty="0"/>
-              <a:t>Port </a:t>
-            </a:r>
-            <a:r>
-              <a:rPr lang="zh-TW" altLang="en-US" dirty="0"/>
-              <a:t>開始變化的時間不超過</a:t>
-            </a:r>
-            <a:r>
-              <a:rPr lang="en-US" altLang="zh-TW" dirty="0"/>
-              <a:t>40ns</a:t>
-            </a:r>
-            <a:r>
-              <a:rPr lang="zh-TW" altLang="en-US" dirty="0"/>
-              <a:t>，將這些時間點列在相同的</a:t>
-            </a:r>
-            <a:r>
-              <a:rPr lang="en-US" altLang="zh-TW" dirty="0"/>
-              <a:t>Group</a:t>
-            </a:r>
-            <a:r>
-              <a:rPr lang="zh-TW" altLang="en-US" dirty="0"/>
-              <a:t>。</a:t>
-            </a:r>
-            <a:endParaRPr lang="en-US" altLang="zh-TW" dirty="0"/>
-          </a:p>
-          <a:p>
-            <a:pPr marL="228600" marR="0" lvl="0" indent="-228600" algn="l" defTabSz="914400" rtl="0" eaLnBrk="1" fontAlgn="auto" latinLnBrk="0" hangingPunct="1">
-              <a:lnSpc>
-                <a:spcPct val="100000"/>
-              </a:lnSpc>
-              <a:spcBef>
-                <a:spcPts val="0"/>
-              </a:spcBef>
-              <a:spcAft>
-                <a:spcPts val="0"/>
-              </a:spcAft>
-              <a:buClrTx/>
-              <a:buSzTx/>
-              <a:buFontTx/>
-              <a:buAutoNum type="arabicPeriod" startAt="2"/>
-              <a:tabLst/>
-              <a:defRPr/>
-            </a:pPr>
-            <a:r>
-              <a:rPr lang="en-US" altLang="zh-TW" dirty="0"/>
-              <a:t>1. ADC CLK </a:t>
-            </a:r>
-            <a:r>
-              <a:rPr lang="zh-TW" altLang="en-US" dirty="0"/>
-              <a:t>利用該</a:t>
-            </a:r>
-            <a:r>
-              <a:rPr lang="en-US" altLang="zh-TW" dirty="0"/>
-              <a:t>Port </a:t>
-            </a:r>
-            <a:r>
-              <a:rPr lang="zh-TW" altLang="en-US" dirty="0"/>
-              <a:t>會損失</a:t>
-            </a:r>
-            <a:r>
-              <a:rPr lang="en-US" altLang="zh-TW" dirty="0"/>
-              <a:t>LSB information</a:t>
-            </a:r>
-          </a:p>
-          <a:p>
-            <a:pPr marL="228600" indent="-228600" algn="l">
-              <a:buAutoNum type="arabicPeriod" startAt="2"/>
-            </a:pPr>
+            <a:r>
+              <a:rPr lang="zh-TW" altLang="en-US" dirty="0"/>
+              <a:t>講述</a:t>
+            </a:r>
+            <a:r>
+              <a:rPr lang="en-US" altLang="zh-TW" dirty="0"/>
+              <a:t>LA</a:t>
+            </a:r>
+            <a:r>
+              <a:rPr lang="zh-TW" altLang="en-US" dirty="0"/>
+              <a:t>的儲存方式</a:t>
+            </a:r>
             <a:endParaRPr lang="en-US" altLang="zh-TW" dirty="0"/>
           </a:p>
           <a:p>
             <a:pPr marL="228600" indent="-228600">
               <a:buAutoNum type="arabicPeriod"/>
             </a:pPr>
-            <a:endParaRPr lang="zh-TW" altLang="en-US" dirty="0"/>
+            <a:r>
+              <a:rPr lang="en-US" altLang="zh-TW" dirty="0"/>
+              <a:t>LA </a:t>
+            </a:r>
+            <a:r>
+              <a:rPr lang="zh-TW" altLang="en-US" dirty="0"/>
+              <a:t>的 </a:t>
+            </a:r>
+            <a:r>
+              <a:rPr lang="en-US" altLang="zh-TW" dirty="0" err="1"/>
+              <a:t>SampleRate</a:t>
+            </a:r>
+            <a:r>
+              <a:rPr lang="en-US" altLang="zh-TW" dirty="0"/>
+              <a:t> </a:t>
+            </a:r>
+            <a:r>
+              <a:rPr lang="zh-TW" altLang="en-US" dirty="0"/>
+              <a:t>最高可以到</a:t>
+            </a:r>
+            <a:r>
+              <a:rPr lang="en-US" altLang="zh-TW" dirty="0"/>
+              <a:t>500MHZ</a:t>
+            </a:r>
+          </a:p>
+          <a:p>
+            <a:pPr marL="228600" indent="-228600">
+              <a:buAutoNum type="arabicPeriod"/>
+            </a:pPr>
+            <a:r>
+              <a:rPr lang="zh-TW" altLang="en-US" dirty="0"/>
+              <a:t>當儲存成</a:t>
+            </a:r>
+            <a:r>
+              <a:rPr lang="en-US" altLang="zh-TW" dirty="0"/>
+              <a:t>csv</a:t>
+            </a:r>
+            <a:r>
+              <a:rPr lang="zh-TW" altLang="en-US" dirty="0"/>
+              <a:t>檔時，指針對數值變化的時間點儲存</a:t>
+            </a:r>
           </a:p>
         </p:txBody>
       </p:sp>
@@ -3266,7 +3751,7 @@
           <a:p>
             <a:fld id="{0116F853-F7F2-4239-A629-A213C1D67574}" type="slidenum">
               <a:rPr lang="zh-TW" altLang="en-US" smtClean="0"/>
-              <a:t>18</a:t>
+              <a:t>17</a:t>
             </a:fld>
             <a:endParaRPr lang="zh-TW" altLang="en-US"/>
           </a:p>
@@ -3275,7 +3760,7 @@
     </p:spTree>
     <p:extLst>
       <p:ext uri="{BB962C8B-B14F-4D97-AF65-F5344CB8AC3E}">
-        <p14:creationId xmlns:p14="http://schemas.microsoft.com/office/powerpoint/2010/main" val="1746073952"/>
+        <p14:creationId xmlns:p14="http://schemas.microsoft.com/office/powerpoint/2010/main" val="2752075676"/>
       </p:ext>
     </p:extLst>
   </p:cSld>
@@ -3432,7 +3917,7 @@
           <a:p>
             <a:fld id="{8A9F4CB5-1750-4E23-A13C-2C1F028F9724}" type="datetimeFigureOut">
               <a:rPr lang="zh-TW" altLang="en-US" smtClean="0"/>
-              <a:t>2023/2/3</a:t>
+              <a:t>2023/2/4</a:t>
             </a:fld>
             <a:endParaRPr lang="zh-TW" altLang="en-US"/>
           </a:p>
@@ -3630,7 +4115,7 @@
           <a:p>
             <a:fld id="{8A9F4CB5-1750-4E23-A13C-2C1F028F9724}" type="datetimeFigureOut">
               <a:rPr lang="zh-TW" altLang="en-US" smtClean="0"/>
-              <a:t>2023/2/3</a:t>
+              <a:t>2023/2/4</a:t>
             </a:fld>
             <a:endParaRPr lang="zh-TW" altLang="en-US"/>
           </a:p>
@@ -3838,7 +4323,7 @@
           <a:p>
             <a:fld id="{8A9F4CB5-1750-4E23-A13C-2C1F028F9724}" type="datetimeFigureOut">
               <a:rPr lang="zh-TW" altLang="en-US" smtClean="0"/>
-              <a:t>2023/2/3</a:t>
+              <a:t>2023/2/4</a:t>
             </a:fld>
             <a:endParaRPr lang="zh-TW" altLang="en-US"/>
           </a:p>
@@ -4036,7 +4521,7 @@
           <a:p>
             <a:fld id="{8A9F4CB5-1750-4E23-A13C-2C1F028F9724}" type="datetimeFigureOut">
               <a:rPr lang="zh-TW" altLang="en-US" smtClean="0"/>
-              <a:t>2023/2/3</a:t>
+              <a:t>2023/2/4</a:t>
             </a:fld>
             <a:endParaRPr lang="zh-TW" altLang="en-US"/>
           </a:p>
@@ -4311,7 +4796,7 @@
           <a:p>
             <a:fld id="{8A9F4CB5-1750-4E23-A13C-2C1F028F9724}" type="datetimeFigureOut">
               <a:rPr lang="zh-TW" altLang="en-US" smtClean="0"/>
-              <a:t>2023/2/3</a:t>
+              <a:t>2023/2/4</a:t>
             </a:fld>
             <a:endParaRPr lang="zh-TW" altLang="en-US"/>
           </a:p>
@@ -4576,7 +5061,7 @@
           <a:p>
             <a:fld id="{8A9F4CB5-1750-4E23-A13C-2C1F028F9724}" type="datetimeFigureOut">
               <a:rPr lang="zh-TW" altLang="en-US" smtClean="0"/>
-              <a:t>2023/2/3</a:t>
+              <a:t>2023/2/4</a:t>
             </a:fld>
             <a:endParaRPr lang="zh-TW" altLang="en-US"/>
           </a:p>
@@ -4988,7 +5473,7 @@
           <a:p>
             <a:fld id="{8A9F4CB5-1750-4E23-A13C-2C1F028F9724}" type="datetimeFigureOut">
               <a:rPr lang="zh-TW" altLang="en-US" smtClean="0"/>
-              <a:t>2023/2/3</a:t>
+              <a:t>2023/2/4</a:t>
             </a:fld>
             <a:endParaRPr lang="zh-TW" altLang="en-US"/>
           </a:p>
@@ -5129,7 +5614,7 @@
           <a:p>
             <a:fld id="{8A9F4CB5-1750-4E23-A13C-2C1F028F9724}" type="datetimeFigureOut">
               <a:rPr lang="zh-TW" altLang="en-US" smtClean="0"/>
-              <a:t>2023/2/3</a:t>
+              <a:t>2023/2/4</a:t>
             </a:fld>
             <a:endParaRPr lang="zh-TW" altLang="en-US"/>
           </a:p>
@@ -5242,7 +5727,7 @@
           <a:p>
             <a:fld id="{8A9F4CB5-1750-4E23-A13C-2C1F028F9724}" type="datetimeFigureOut">
               <a:rPr lang="zh-TW" altLang="en-US" smtClean="0"/>
-              <a:t>2023/2/3</a:t>
+              <a:t>2023/2/4</a:t>
             </a:fld>
             <a:endParaRPr lang="zh-TW" altLang="en-US"/>
           </a:p>
@@ -5553,7 +6038,7 @@
           <a:p>
             <a:fld id="{8A9F4CB5-1750-4E23-A13C-2C1F028F9724}" type="datetimeFigureOut">
               <a:rPr lang="zh-TW" altLang="en-US" smtClean="0"/>
-              <a:t>2023/2/3</a:t>
+              <a:t>2023/2/4</a:t>
             </a:fld>
             <a:endParaRPr lang="zh-TW" altLang="en-US"/>
           </a:p>
@@ -5841,7 +6326,7 @@
           <a:p>
             <a:fld id="{8A9F4CB5-1750-4E23-A13C-2C1F028F9724}" type="datetimeFigureOut">
               <a:rPr lang="zh-TW" altLang="en-US" smtClean="0"/>
-              <a:t>2023/2/3</a:t>
+              <a:t>2023/2/4</a:t>
             </a:fld>
             <a:endParaRPr lang="zh-TW" altLang="en-US"/>
           </a:p>
@@ -6082,7 +6567,7 @@
           <a:p>
             <a:fld id="{8A9F4CB5-1750-4E23-A13C-2C1F028F9724}" type="datetimeFigureOut">
               <a:rPr lang="zh-TW" altLang="en-US" smtClean="0"/>
-              <a:t>2023/2/3</a:t>
+              <a:t>2023/2/4</a:t>
             </a:fld>
             <a:endParaRPr lang="zh-TW" altLang="en-US"/>
           </a:p>
@@ -8763,7 +9248,7 @@
           <p:nvPr/>
         </p:nvPicPr>
         <p:blipFill>
-          <a:blip r:embed="rId2">
+          <a:blip r:embed="rId3">
             <a:extLst>
               <a:ext uri="{28A0092B-C50C-407E-A947-70E740481C1C}">
                 <a14:useLocalDpi xmlns:a14="http://schemas.microsoft.com/office/drawing/2010/main" val="0"/>
@@ -8784,6 +9269,54 @@
           </a:prstGeom>
         </p:spPr>
       </p:pic>
+      <p:sp>
+        <p:nvSpPr>
+          <p:cNvPr id="4" name="文字方塊 3">
+            <a:extLst>
+              <a:ext uri="{FF2B5EF4-FFF2-40B4-BE49-F238E27FC236}">
+                <a16:creationId xmlns:a16="http://schemas.microsoft.com/office/drawing/2014/main" id="{B0F52082-0664-0566-9386-69815B5E7897}"/>
+              </a:ext>
+            </a:extLst>
+          </p:cNvPr>
+          <p:cNvSpPr txBox="1"/>
+          <p:nvPr/>
+        </p:nvSpPr>
+        <p:spPr>
+          <a:xfrm>
+            <a:off x="6901543" y="6377459"/>
+            <a:ext cx="5211096" cy="230832"/>
+          </a:xfrm>
+          <a:prstGeom prst="rect">
+            <a:avLst/>
+          </a:prstGeom>
+          <a:noFill/>
+        </p:spPr>
+        <p:txBody>
+          <a:bodyPr wrap="square" rtlCol="0">
+            <a:spAutoFit/>
+          </a:bodyPr>
+          <a:lstStyle/>
+          <a:p>
+            <a:r>
+              <a:rPr lang="zh-TW" altLang="en-US" sz="900" dirty="0"/>
+              <a:t>附上圖片網址 </a:t>
+            </a:r>
+            <a:r>
+              <a:rPr lang="en-US" altLang="zh-TW" sz="900" dirty="0"/>
+              <a:t>:</a:t>
+            </a:r>
+            <a:r>
+              <a:rPr lang="zh-TW" altLang="en-US" sz="900" dirty="0"/>
+              <a:t> </a:t>
+            </a:r>
+            <a:r>
+              <a:rPr lang="en-US" altLang="zh-TW" sz="900" dirty="0"/>
+              <a:t>https://www.digikey.tw/zh/articles/analog-basics-part-1-sar-analog-to-digital-converters</a:t>
+            </a:r>
+            <a:endParaRPr lang="zh-TW" altLang="en-US" sz="900" dirty="0"/>
+          </a:p>
+        </p:txBody>
+      </p:sp>
     </p:spTree>
     <p:extLst>
       <p:ext uri="{BB962C8B-B14F-4D97-AF65-F5344CB8AC3E}">
@@ -16598,8 +17131,8 @@
         </p:nvCxnSpPr>
         <p:spPr>
           <a:xfrm>
-            <a:off x="5865786" y="2410083"/>
-            <a:ext cx="527278" cy="0"/>
+            <a:off x="5643716" y="2402385"/>
+            <a:ext cx="759709" cy="0"/>
           </a:xfrm>
           <a:prstGeom prst="line">
             <a:avLst/>
@@ -16636,46 +17169,8 @@
         </p:nvCxnSpPr>
         <p:spPr>
           <a:xfrm flipV="1">
-            <a:off x="5658872" y="2402385"/>
-            <a:ext cx="217275" cy="467845"/>
-          </a:xfrm>
-          <a:prstGeom prst="line">
-            <a:avLst/>
-          </a:prstGeom>
-        </p:spPr>
-        <p:style>
-          <a:lnRef idx="1">
-            <a:schemeClr val="accent1"/>
-          </a:lnRef>
-          <a:fillRef idx="0">
-            <a:schemeClr val="accent1"/>
-          </a:fillRef>
-          <a:effectRef idx="0">
-            <a:schemeClr val="accent1"/>
-          </a:effectRef>
-          <a:fontRef idx="minor">
-            <a:schemeClr val="tx1"/>
-          </a:fontRef>
-        </p:style>
-      </p:cxnSp>
-      <p:cxnSp>
-        <p:nvCxnSpPr>
-          <p:cNvPr id="43" name="直線接點 42">
-            <a:extLst>
-              <a:ext uri="{FF2B5EF4-FFF2-40B4-BE49-F238E27FC236}">
-                <a16:creationId xmlns:a16="http://schemas.microsoft.com/office/drawing/2014/main" id="{1C8D913C-1216-D04E-F801-CAD76536B8B4}"/>
-              </a:ext>
-            </a:extLst>
-          </p:cNvPr>
-          <p:cNvCxnSpPr>
-            <a:cxnSpLocks/>
-          </p:cNvCxnSpPr>
-          <p:nvPr/>
-        </p:nvCxnSpPr>
-        <p:spPr>
-          <a:xfrm>
-            <a:off x="5131594" y="2878905"/>
-            <a:ext cx="527278" cy="0"/>
+            <a:off x="5865786" y="2402385"/>
+            <a:ext cx="10361" cy="476520"/>
           </a:xfrm>
           <a:prstGeom prst="line">
             <a:avLst/>
@@ -17230,6 +17725,82 @@
           </a:p>
         </p:txBody>
       </p:sp>
+      <p:cxnSp>
+        <p:nvCxnSpPr>
+          <p:cNvPr id="14" name="直線接點 13">
+            <a:extLst>
+              <a:ext uri="{FF2B5EF4-FFF2-40B4-BE49-F238E27FC236}">
+                <a16:creationId xmlns:a16="http://schemas.microsoft.com/office/drawing/2014/main" id="{F8139C0E-9B93-C435-28F2-354FDF69768A}"/>
+              </a:ext>
+            </a:extLst>
+          </p:cNvPr>
+          <p:cNvCxnSpPr>
+            <a:cxnSpLocks/>
+          </p:cNvCxnSpPr>
+          <p:nvPr/>
+        </p:nvCxnSpPr>
+        <p:spPr>
+          <a:xfrm>
+            <a:off x="5131594" y="2878905"/>
+            <a:ext cx="759709" cy="0"/>
+          </a:xfrm>
+          <a:prstGeom prst="line">
+            <a:avLst/>
+          </a:prstGeom>
+        </p:spPr>
+        <p:style>
+          <a:lnRef idx="1">
+            <a:schemeClr val="accent1"/>
+          </a:lnRef>
+          <a:fillRef idx="0">
+            <a:schemeClr val="accent1"/>
+          </a:fillRef>
+          <a:effectRef idx="0">
+            <a:schemeClr val="accent1"/>
+          </a:effectRef>
+          <a:fontRef idx="minor">
+            <a:schemeClr val="tx1"/>
+          </a:fontRef>
+        </p:style>
+      </p:cxnSp>
+      <p:cxnSp>
+        <p:nvCxnSpPr>
+          <p:cNvPr id="15" name="直線接點 14">
+            <a:extLst>
+              <a:ext uri="{FF2B5EF4-FFF2-40B4-BE49-F238E27FC236}">
+                <a16:creationId xmlns:a16="http://schemas.microsoft.com/office/drawing/2014/main" id="{168B1D4E-4D51-4587-3123-0A9C8EF73BF0}"/>
+              </a:ext>
+            </a:extLst>
+          </p:cNvPr>
+          <p:cNvCxnSpPr>
+            <a:cxnSpLocks/>
+          </p:cNvCxnSpPr>
+          <p:nvPr/>
+        </p:nvCxnSpPr>
+        <p:spPr>
+          <a:xfrm flipV="1">
+            <a:off x="5643716" y="2387180"/>
+            <a:ext cx="10361" cy="476520"/>
+          </a:xfrm>
+          <a:prstGeom prst="line">
+            <a:avLst/>
+          </a:prstGeom>
+        </p:spPr>
+        <p:style>
+          <a:lnRef idx="1">
+            <a:schemeClr val="accent1"/>
+          </a:lnRef>
+          <a:fillRef idx="0">
+            <a:schemeClr val="accent1"/>
+          </a:fillRef>
+          <a:effectRef idx="0">
+            <a:schemeClr val="accent1"/>
+          </a:effectRef>
+          <a:fontRef idx="minor">
+            <a:schemeClr val="tx1"/>
+          </a:fontRef>
+        </p:style>
+      </p:cxnSp>
     </p:spTree>
     <p:extLst>
       <p:ext uri="{BB962C8B-B14F-4D97-AF65-F5344CB8AC3E}">
@@ -18552,6 +19123,33 @@
               <a:rPr lang="en-US" altLang="zh-TW" dirty="0"/>
               <a:t> Digital </a:t>
             </a:r>
+          </a:p>
+          <a:p>
+            <a:pPr marL="514350" indent="-514350">
+              <a:buAutoNum type="arabicPeriod"/>
+            </a:pPr>
+            <a:endParaRPr lang="en-US" altLang="zh-TW" dirty="0"/>
+          </a:p>
+          <a:p>
+            <a:pPr marL="514350" indent="-514350">
+              <a:buAutoNum type="arabicPeriod"/>
+            </a:pPr>
+            <a:r>
+              <a:rPr lang="zh-TW" altLang="en-US" dirty="0"/>
+              <a:t>用處 </a:t>
+            </a:r>
+            <a:r>
+              <a:rPr lang="en-US" altLang="zh-TW" dirty="0"/>
+              <a:t>:</a:t>
+            </a:r>
+            <a:r>
+              <a:rPr lang="zh-TW" altLang="en-US" dirty="0"/>
+              <a:t> </a:t>
+            </a:r>
+            <a:r>
+              <a:rPr lang="en-US" altLang="zh-TW" dirty="0"/>
+              <a:t>T5 Tube</a:t>
+            </a:r>
             <a:endParaRPr lang="zh-TW" altLang="en-US" dirty="0"/>
           </a:p>
         </p:txBody>
@@ -18624,8 +19222,8 @@
           </a:p>
         </p:txBody>
       </p:sp>
-      <mc:AlternateContent xmlns:mc="http://schemas.openxmlformats.org/markup-compatibility/2006" xmlns:a14="http://schemas.microsoft.com/office/drawing/2010/main">
-        <mc:Choice Requires="a14">
+      <mc:AlternateContent xmlns:mc="http://schemas.openxmlformats.org/markup-compatibility/2006">
+        <mc:Choice xmlns:a14="http://schemas.microsoft.com/office/drawing/2010/main" Requires="a14">
           <p:sp>
             <p:nvSpPr>
               <p:cNvPr id="3" name="內容版面配置區 2">
@@ -18652,7 +19250,7 @@
                 </a:pPr>
                 <a:r>
                   <a:rPr lang="en-US" altLang="zh-TW" dirty="0"/>
-                  <a:t>First Difference :</a:t>
+                  <a:t>Difference :</a:t>
                 </a:r>
               </a:p>
               <a:p>
@@ -18760,7 +19358,7 @@
             </p:txBody>
           </p:sp>
         </mc:Choice>
-        <mc:Fallback xmlns="">
+        <mc:Fallback>
           <p:sp>
             <p:nvSpPr>
               <p:cNvPr id="3" name="內容版面配置區 2">
@@ -19161,7 +19759,7 @@
         </p:nvSpPr>
         <p:spPr>
           <a:xfrm>
-            <a:off x="3878443" y="4631524"/>
+            <a:off x="3681798" y="4455165"/>
             <a:ext cx="5835444" cy="369332"/>
           </a:xfrm>
           <a:prstGeom prst="rect">
@@ -19177,11 +19775,19 @@
           <a:p>
             <a:r>
               <a:rPr lang="zh-TW" altLang="en-US" dirty="0"/>
-              <a:t>畫圖來表示，並請搭配</a:t>
+              <a:t>圖來表示，並請搭配</a:t>
             </a:r>
             <a:r>
               <a:rPr lang="en-US" altLang="zh-TW" dirty="0"/>
               <a:t>Sample Rate</a:t>
+            </a:r>
+            <a:r>
+              <a:rPr lang="zh-TW" altLang="en-US" dirty="0"/>
+              <a:t>，</a:t>
+            </a:r>
+            <a:r>
+              <a:rPr lang="en-US" altLang="zh-TW" dirty="0"/>
+              <a:t>Linear Phase </a:t>
             </a:r>
             <a:endParaRPr lang="zh-TW" altLang="en-US" dirty="0"/>
           </a:p>
@@ -19219,13 +19825,7 @@
       </p:grpSpPr>
       <p:sp>
         <p:nvSpPr>
-          <p:cNvPr id="2" name="標題 1">
-            <a:extLst>
-              <a:ext uri="{FF2B5EF4-FFF2-40B4-BE49-F238E27FC236}">
-                <a16:creationId xmlns:a16="http://schemas.microsoft.com/office/drawing/2014/main" id="{F87106D1-6A38-7DC5-94DE-C5CC9C4A3A6D}"/>
-              </a:ext>
-            </a:extLst>
-          </p:cNvPr>
+          <p:cNvPr id="2" name="標題 1"/>
           <p:cNvSpPr>
             <a:spLocks noGrp="1"/>
           </p:cNvSpPr>
@@ -19233,23 +19833,22 @@
             <p:ph type="title"/>
           </p:nvPr>
         </p:nvSpPr>
-        <p:spPr/>
-        <p:txBody>
-          <a:bodyPr/>
+        <p:spPr>
+          <a:xfrm>
+            <a:off x="947928" y="255397"/>
+            <a:ext cx="10515600" cy="1325563"/>
+          </a:xfrm>
+        </p:spPr>
+        <p:txBody>
+          <a:bodyPr>
+            <a:normAutofit/>
+          </a:bodyPr>
           <a:lstStyle/>
           <a:p>
             <a:pPr algn="ctr"/>
             <a:r>
               <a:rPr lang="en-US" altLang="zh-TW" dirty="0"/>
-              <a:t>1</a:t>
-            </a:r>
-            <a:r>
-              <a:rPr lang="en-US" altLang="zh-TW" baseline="30000" dirty="0"/>
-              <a:t>st</a:t>
-            </a:r>
-            <a:r>
-              <a:rPr lang="en-US" altLang="zh-TW" dirty="0"/>
-              <a:t> HPF</a:t>
+              <a:t>Schmitt Circuit</a:t>
             </a:r>
             <a:endParaRPr lang="zh-TW" altLang="en-US" dirty="0"/>
           </a:p>
@@ -19257,31 +19856,111 @@
       </p:sp>
       <p:sp>
         <p:nvSpPr>
-          <p:cNvPr id="3" name="內容版面配置區 2">
-            <a:extLst>
-              <a:ext uri="{FF2B5EF4-FFF2-40B4-BE49-F238E27FC236}">
-                <a16:creationId xmlns:a16="http://schemas.microsoft.com/office/drawing/2014/main" id="{1CC4437C-1835-0D5B-4532-2D3DACA7A45C}"/>
-              </a:ext>
-            </a:extLst>
-          </p:cNvPr>
-          <p:cNvSpPr>
-            <a:spLocks noGrp="1"/>
-          </p:cNvSpPr>
-          <p:nvPr>
-            <p:ph idx="1"/>
-          </p:nvPr>
-        </p:nvSpPr>
-        <p:spPr/>
-        <p:txBody>
-          <a:bodyPr/>
-          <a:lstStyle/>
-          <a:p>
-            <a:pPr marL="0" indent="0">
-              <a:buNone/>
-            </a:pPr>
-            <a:r>
-              <a:rPr lang="zh-TW" altLang="en-US" dirty="0"/>
-              <a:t>用處 </a:t>
+          <p:cNvPr id="5" name="矩形 4">
+            <a:extLst>
+              <a:ext uri="{FF2B5EF4-FFF2-40B4-BE49-F238E27FC236}">
+                <a16:creationId xmlns:a16="http://schemas.microsoft.com/office/drawing/2014/main" id="{610D6BE4-1B34-4BCF-9FEB-60E2C7959C3C}"/>
+              </a:ext>
+            </a:extLst>
+          </p:cNvPr>
+          <p:cNvSpPr/>
+          <p:nvPr/>
+        </p:nvSpPr>
+        <p:spPr>
+          <a:xfrm>
+            <a:off x="1774825" y="1772816"/>
+            <a:ext cx="8642350" cy="738664"/>
+          </a:xfrm>
+          <a:prstGeom prst="rect">
+            <a:avLst/>
+          </a:prstGeom>
+          <a:noFill/>
+          <a:ln>
+            <a:noFill/>
+          </a:ln>
+        </p:spPr>
+        <p:txBody>
+          <a:bodyPr>
+            <a:spAutoFit/>
+          </a:bodyPr>
+          <a:lstStyle/>
+          <a:p>
+            <a:endParaRPr lang="en-US" altLang="zh-TW" sz="1400" dirty="0"/>
+          </a:p>
+          <a:p>
+            <a:endParaRPr lang="en-US" altLang="zh-TW" sz="1400" dirty="0"/>
+          </a:p>
+          <a:p>
+            <a:endParaRPr lang="en-US" altLang="zh-TW" sz="1400" dirty="0"/>
+          </a:p>
+        </p:txBody>
+      </p:sp>
+      <p:pic>
+        <p:nvPicPr>
+          <p:cNvPr id="4" name="圖片 3">
+            <a:extLst>
+              <a:ext uri="{FF2B5EF4-FFF2-40B4-BE49-F238E27FC236}">
+                <a16:creationId xmlns:a16="http://schemas.microsoft.com/office/drawing/2014/main" id="{191C003D-54DA-4629-83D3-590EE5208F39}"/>
+              </a:ext>
+            </a:extLst>
+          </p:cNvPr>
+          <p:cNvPicPr>
+            <a:picLocks noChangeAspect="1"/>
+          </p:cNvPicPr>
+          <p:nvPr/>
+        </p:nvPicPr>
+        <p:blipFill>
+          <a:blip r:embed="rId3">
+            <a:extLst>
+              <a:ext uri="{28A0092B-C50C-407E-A947-70E740481C1C}">
+                <a14:useLocalDpi xmlns:a14="http://schemas.microsoft.com/office/drawing/2010/main" val="0"/>
+              </a:ext>
+            </a:extLst>
+          </a:blip>
+          <a:srcRect/>
+          <a:stretch/>
+        </p:blipFill>
+        <p:spPr>
+          <a:xfrm>
+            <a:off x="831384" y="1988841"/>
+            <a:ext cx="10515600" cy="4751685"/>
+          </a:xfrm>
+          <a:prstGeom prst="rect">
+            <a:avLst/>
+          </a:prstGeom>
+        </p:spPr>
+      </p:pic>
+      <p:sp>
+        <p:nvSpPr>
+          <p:cNvPr id="6" name="文字方塊 5">
+            <a:extLst>
+              <a:ext uri="{FF2B5EF4-FFF2-40B4-BE49-F238E27FC236}">
+                <a16:creationId xmlns:a16="http://schemas.microsoft.com/office/drawing/2014/main" id="{8B84FB90-D9DB-4381-BBEC-CCEA2C18F138}"/>
+              </a:ext>
+            </a:extLst>
+          </p:cNvPr>
+          <p:cNvSpPr txBox="1"/>
+          <p:nvPr/>
+        </p:nvSpPr>
+        <p:spPr>
+          <a:xfrm>
+            <a:off x="207363" y="692584"/>
+            <a:ext cx="6264696" cy="1200329"/>
+          </a:xfrm>
+          <a:prstGeom prst="rect">
+            <a:avLst/>
+          </a:prstGeom>
+          <a:noFill/>
+        </p:spPr>
+        <p:txBody>
+          <a:bodyPr wrap="square" rtlCol="0">
+            <a:spAutoFit/>
+          </a:bodyPr>
+          <a:lstStyle/>
+          <a:p>
+            <a:r>
+              <a:rPr lang="zh-TW" altLang="en-US" dirty="0"/>
+              <a:t>黃色 </a:t>
             </a:r>
             <a:r>
               <a:rPr lang="en-US" altLang="zh-TW" dirty="0"/>
@@ -19289,21 +19968,51 @@
             </a:r>
             <a:r>
               <a:rPr lang="zh-TW" altLang="en-US" dirty="0"/>
+              <a:t> 原始訊號</a:t>
+            </a:r>
+            <a:endParaRPr lang="en-US" altLang="zh-TW" dirty="0"/>
+          </a:p>
+          <a:p>
+            <a:r>
+              <a:rPr lang="zh-TW" altLang="en-US" dirty="0"/>
+              <a:t>紅色 </a:t>
+            </a:r>
+            <a:r>
+              <a:rPr lang="en-US" altLang="zh-TW" dirty="0"/>
+              <a:t>:</a:t>
+            </a:r>
+            <a:r>
+              <a:rPr lang="zh-TW" altLang="en-US" dirty="0"/>
               <a:t> </a:t>
             </a:r>
+            <a:r>
+              <a:rPr lang="en-US" altLang="zh-TW" dirty="0"/>
+              <a:t>1st HPF</a:t>
+            </a:r>
+            <a:r>
+              <a:rPr lang="zh-TW" altLang="en-US" dirty="0"/>
+              <a:t>後訊號</a:t>
+            </a:r>
             <a:endParaRPr lang="en-US" altLang="zh-TW" dirty="0"/>
           </a:p>
           <a:p>
-            <a:pPr marL="0" indent="0">
-              <a:buNone/>
-            </a:pPr>
-            <a:r>
-              <a:rPr lang="zh-TW" altLang="en-US" dirty="0"/>
-              <a:t>濾掉相對低頻訊號 </a:t>
-            </a:r>
-            <a:r>
-              <a:rPr lang="en-US" altLang="zh-TW" dirty="0"/>
-              <a:t>T5</a:t>
+            <a:r>
+              <a:rPr lang="zh-TW" altLang="en-US" dirty="0"/>
+              <a:t>綠色</a:t>
+            </a:r>
+            <a:r>
+              <a:rPr lang="en-US" altLang="zh-TW" dirty="0"/>
+              <a:t>Digital Port : CMP_DOUT&lt;1&gt; ,for High Threshold</a:t>
+            </a:r>
+          </a:p>
+          <a:p>
+            <a:r>
+              <a:rPr lang="zh-TW" altLang="en-US" dirty="0"/>
+              <a:t>藍色</a:t>
+            </a:r>
+            <a:r>
+              <a:rPr lang="en-US" altLang="zh-TW" dirty="0"/>
+              <a:t>Digital Port</a:t>
             </a:r>
             <a:r>
               <a:rPr lang="zh-TW" altLang="en-US" dirty="0"/>
@@ -19311,23 +20020,19 @@
             </a:r>
             <a:r>
               <a:rPr lang="en-US" altLang="zh-TW" dirty="0"/>
-              <a:t>(</a:t>
-            </a:r>
-            <a:r>
-              <a:rPr lang="zh-TW" altLang="en-US" dirty="0"/>
-              <a:t>這裡可以解釋</a:t>
-            </a:r>
-            <a:r>
-              <a:rPr lang="en-US" altLang="zh-TW" dirty="0"/>
-              <a:t>T5 </a:t>
-            </a:r>
-            <a:r>
-              <a:rPr lang="zh-TW" altLang="en-US" dirty="0"/>
-              <a:t>以及為何波型會像</a:t>
-            </a:r>
-            <a:r>
-              <a:rPr lang="en-US" altLang="zh-TW" dirty="0"/>
-              <a:t>T5)</a:t>
+              <a:t>:</a:t>
+            </a:r>
+            <a:r>
+              <a:rPr lang="zh-TW" altLang="en-US" dirty="0"/>
+              <a:t> </a:t>
+            </a:r>
+            <a:r>
+              <a:rPr lang="en-US" altLang="zh-TW" dirty="0" err="1"/>
+              <a:t>OutPut</a:t>
+            </a:r>
+            <a:r>
+              <a:rPr lang="en-US" altLang="zh-TW" dirty="0"/>
+              <a:t>&lt;1&gt;</a:t>
             </a:r>
             <a:endParaRPr lang="zh-TW" altLang="en-US" dirty="0"/>
           </a:p>
@@ -19336,7 +20041,7 @@
     </p:spTree>
     <p:extLst>
       <p:ext uri="{BB962C8B-B14F-4D97-AF65-F5344CB8AC3E}">
-        <p14:creationId xmlns:p14="http://schemas.microsoft.com/office/powerpoint/2010/main" val="1051270182"/>
+        <p14:creationId xmlns:p14="http://schemas.microsoft.com/office/powerpoint/2010/main" val="1559203381"/>
       </p:ext>
     </p:extLst>
   </p:cSld>
@@ -19368,7 +20073,7 @@
           <p:cNvPr id="2" name="標題 1">
             <a:extLst>
               <a:ext uri="{FF2B5EF4-FFF2-40B4-BE49-F238E27FC236}">
-                <a16:creationId xmlns:a16="http://schemas.microsoft.com/office/drawing/2014/main" id="{77A82EA5-5CA2-7D42-8199-77430683873D}"/>
+                <a16:creationId xmlns:a16="http://schemas.microsoft.com/office/drawing/2014/main" id="{19E36743-25A1-BE5C-A8C2-0019D13586BB}"/>
               </a:ext>
             </a:extLst>
           </p:cNvPr>
@@ -19386,12 +20091,8 @@
           <a:p>
             <a:pPr algn="ctr"/>
             <a:r>
-              <a:rPr lang="zh-TW" altLang="en-US" dirty="0"/>
-              <a:t>補充 </a:t>
-            </a:r>
-            <a:r>
-              <a:rPr lang="en-US" altLang="zh-TW" dirty="0"/>
-              <a:t>T5</a:t>
+              <a:rPr lang="en-US" altLang="zh-TW" dirty="0"/>
+              <a:t>Schmitt Digital Code</a:t>
             </a:r>
             <a:endParaRPr lang="zh-TW" altLang="en-US" dirty="0"/>
           </a:p>
@@ -19402,7 +20103,7 @@
           <p:cNvPr id="3" name="內容版面配置區 2">
             <a:extLst>
               <a:ext uri="{FF2B5EF4-FFF2-40B4-BE49-F238E27FC236}">
-                <a16:creationId xmlns:a16="http://schemas.microsoft.com/office/drawing/2014/main" id="{7B7047CA-B0ED-0ADD-56B8-AB4F04614DDA}"/>
+                <a16:creationId xmlns:a16="http://schemas.microsoft.com/office/drawing/2014/main" id="{541FFBC3-4351-9F46-B8A7-208139BF452D}"/>
               </a:ext>
             </a:extLst>
           </p:cNvPr>
@@ -19418,14 +20119,14 @@
           <a:bodyPr/>
           <a:lstStyle/>
           <a:p>
-            <a:endParaRPr lang="zh-TW" altLang="en-US"/>
+            <a:endParaRPr lang="zh-TW" altLang="en-US" dirty="0"/>
           </a:p>
         </p:txBody>
       </p:sp>
     </p:spTree>
     <p:extLst>
       <p:ext uri="{BB962C8B-B14F-4D97-AF65-F5344CB8AC3E}">
-        <p14:creationId xmlns:p14="http://schemas.microsoft.com/office/powerpoint/2010/main" val="3262252602"/>
+        <p14:creationId xmlns:p14="http://schemas.microsoft.com/office/powerpoint/2010/main" val="4245840055"/>
       </p:ext>
     </p:extLst>
   </p:cSld>
@@ -21239,7 +21940,7 @@
           <p:cNvPr id="2" name="標題 1">
             <a:extLst>
               <a:ext uri="{FF2B5EF4-FFF2-40B4-BE49-F238E27FC236}">
-                <a16:creationId xmlns:a16="http://schemas.microsoft.com/office/drawing/2014/main" id="{77B76CDA-2D03-836D-750B-6F0405B93A9F}"/>
+                <a16:creationId xmlns:a16="http://schemas.microsoft.com/office/drawing/2014/main" id="{41A1B36A-471A-BDE5-0D9F-F818171D72B1}"/>
               </a:ext>
             </a:extLst>
           </p:cNvPr>
@@ -21257,10 +21958,17 @@
           <a:p>
             <a:pPr algn="ctr"/>
             <a:r>
-              <a:rPr lang="en-US" altLang="zh-TW" dirty="0"/>
-              <a:t>Schmitt Digital</a:t>
-            </a:r>
-            <a:endParaRPr lang="zh-TW" altLang="en-US" dirty="0"/>
+              <a:rPr lang="zh-TW" altLang="en-US" dirty="0"/>
+              <a:t>後端</a:t>
+            </a:r>
+            <a:r>
+              <a:rPr lang="en-US" altLang="zh-TW" dirty="0"/>
+              <a:t>Decoder</a:t>
+            </a:r>
+            <a:r>
+              <a:rPr lang="zh-TW" altLang="en-US" dirty="0"/>
+              <a:t>電路</a:t>
+            </a:r>
           </a:p>
         </p:txBody>
       </p:sp>
@@ -21269,7 +21977,7 @@
           <p:cNvPr id="3" name="內容版面配置區 2">
             <a:extLst>
               <a:ext uri="{FF2B5EF4-FFF2-40B4-BE49-F238E27FC236}">
-                <a16:creationId xmlns:a16="http://schemas.microsoft.com/office/drawing/2014/main" id="{539F7440-3ABC-79D7-D088-A074EF678298}"/>
+                <a16:creationId xmlns:a16="http://schemas.microsoft.com/office/drawing/2014/main" id="{AEB419E4-8661-C0C0-63D0-CF90B8FED2EC}"/>
               </a:ext>
             </a:extLst>
           </p:cNvPr>
@@ -21289,30 +21997,61 @@
               <a:buNone/>
             </a:pPr>
             <a:r>
-              <a:rPr lang="zh-TW" altLang="en-US" dirty="0"/>
-              <a:t>行為</a:t>
-            </a:r>
-            <a:endParaRPr lang="en-US" altLang="zh-TW" dirty="0"/>
+              <a:rPr lang="en-US" altLang="zh-TW" dirty="0"/>
+              <a:t>Auto Correlation</a:t>
+            </a:r>
           </a:p>
           <a:p>
             <a:pPr marL="0" indent="0">
               <a:buNone/>
             </a:pPr>
-            <a:r>
-              <a:rPr lang="en-US" altLang="zh-TW" dirty="0"/>
-              <a:t>Code</a:t>
-            </a:r>
-            <a:r>
-              <a:rPr lang="zh-TW" altLang="en-US" dirty="0"/>
-              <a:t>寫法</a:t>
-            </a:r>
+            <a:endParaRPr lang="en-US" altLang="zh-TW" dirty="0"/>
+          </a:p>
+          <a:p>
+            <a:pPr marL="0" indent="0">
+              <a:buNone/>
+            </a:pPr>
+            <a:r>
+              <a:rPr lang="en-US" altLang="zh-TW" dirty="0"/>
+              <a:t>Decode</a:t>
+            </a:r>
+            <a:r>
+              <a:rPr lang="zh-TW" altLang="en-US" dirty="0"/>
+              <a:t> </a:t>
+            </a:r>
+            <a:r>
+              <a:rPr lang="en-US" altLang="zh-TW" dirty="0"/>
+              <a:t>RX1 </a:t>
+            </a:r>
+          </a:p>
+          <a:p>
+            <a:pPr marL="0" indent="0">
+              <a:buNone/>
+            </a:pPr>
+            <a:endParaRPr lang="en-US" altLang="zh-TW" dirty="0"/>
+          </a:p>
+          <a:p>
+            <a:pPr marL="0" indent="0">
+              <a:buNone/>
+            </a:pPr>
+            <a:endParaRPr lang="en-US" altLang="zh-TW" dirty="0"/>
+          </a:p>
+          <a:p>
+            <a:pPr marL="0" indent="0">
+              <a:buNone/>
+            </a:pPr>
+            <a:r>
+              <a:rPr lang="en-US" altLang="zh-TW" dirty="0"/>
+              <a:t>Decode RX0</a:t>
+            </a:r>
+            <a:endParaRPr lang="zh-TW" altLang="en-US" dirty="0"/>
           </a:p>
         </p:txBody>
       </p:sp>
     </p:spTree>
     <p:extLst>
       <p:ext uri="{BB962C8B-B14F-4D97-AF65-F5344CB8AC3E}">
-        <p14:creationId xmlns:p14="http://schemas.microsoft.com/office/powerpoint/2010/main" val="2446044506"/>
+        <p14:creationId xmlns:p14="http://schemas.microsoft.com/office/powerpoint/2010/main" val="1747056482"/>
       </p:ext>
     </p:extLst>
   </p:cSld>
@@ -21344,7 +22083,7 @@
           <p:cNvPr id="2" name="標題 1">
             <a:extLst>
               <a:ext uri="{FF2B5EF4-FFF2-40B4-BE49-F238E27FC236}">
-                <a16:creationId xmlns:a16="http://schemas.microsoft.com/office/drawing/2014/main" id="{41A1B36A-471A-BDE5-0D9F-F818171D72B1}"/>
+                <a16:creationId xmlns:a16="http://schemas.microsoft.com/office/drawing/2014/main" id="{50BB383F-54B9-1566-5039-3C13647347F8}"/>
               </a:ext>
             </a:extLst>
           </p:cNvPr>
@@ -21362,17 +22101,10 @@
           <a:p>
             <a:pPr algn="ctr"/>
             <a:r>
-              <a:rPr lang="zh-TW" altLang="en-US" dirty="0"/>
-              <a:t>後端</a:t>
-            </a:r>
-            <a:r>
-              <a:rPr lang="en-US" altLang="zh-TW" dirty="0"/>
-              <a:t>Decoder</a:t>
-            </a:r>
-            <a:r>
-              <a:rPr lang="zh-TW" altLang="en-US" dirty="0"/>
-              <a:t>電路</a:t>
-            </a:r>
+              <a:rPr lang="en-US" altLang="zh-TW" dirty="0" err="1"/>
+              <a:t>AutoCorrelation</a:t>
+            </a:r>
+            <a:endParaRPr lang="zh-TW" altLang="en-US" dirty="0"/>
           </a:p>
         </p:txBody>
       </p:sp>
@@ -21381,7 +22113,7 @@
           <p:cNvPr id="3" name="內容版面配置區 2">
             <a:extLst>
               <a:ext uri="{FF2B5EF4-FFF2-40B4-BE49-F238E27FC236}">
-                <a16:creationId xmlns:a16="http://schemas.microsoft.com/office/drawing/2014/main" id="{AEB419E4-8661-C0C0-63D0-CF90B8FED2EC}"/>
+                <a16:creationId xmlns:a16="http://schemas.microsoft.com/office/drawing/2014/main" id="{2596C747-6CF3-CCCC-4223-2CFCEABA8BA0}"/>
               </a:ext>
             </a:extLst>
           </p:cNvPr>
@@ -21397,65 +22129,66 @@
           <a:bodyPr/>
           <a:lstStyle/>
           <a:p>
-            <a:pPr marL="0" indent="0">
-              <a:buNone/>
+            <a:pPr marL="514350" indent="-514350">
+              <a:buAutoNum type="arabicPeriod"/>
             </a:pPr>
             <a:r>
-              <a:rPr lang="en-US" altLang="zh-TW" dirty="0"/>
-              <a:t>Auto Correlation</a:t>
-            </a:r>
-          </a:p>
-          <a:p>
-            <a:pPr marL="0" indent="0">
-              <a:buNone/>
+              <a:rPr lang="zh-TW" altLang="en-US" dirty="0"/>
+              <a:t>能推倒出</a:t>
+            </a:r>
+            <a:r>
+              <a:rPr lang="en-US" altLang="zh-TW" dirty="0" err="1"/>
+              <a:t>Convolation</a:t>
+            </a:r>
+            <a:r>
+              <a:rPr lang="en-US" altLang="zh-TW" dirty="0"/>
+              <a:t> Property for LTI system</a:t>
+            </a:r>
+          </a:p>
+          <a:p>
+            <a:pPr marL="514350" indent="-514350">
+              <a:buAutoNum type="arabicPeriod"/>
             </a:pPr>
             <a:endParaRPr lang="en-US" altLang="zh-TW" dirty="0"/>
           </a:p>
           <a:p>
-            <a:pPr marL="0" indent="0">
-              <a:buNone/>
+            <a:pPr marL="514350" indent="-514350">
+              <a:buAutoNum type="arabicPeriod"/>
             </a:pPr>
             <a:r>
-              <a:rPr lang="en-US" altLang="zh-TW" dirty="0"/>
-              <a:t>Decode</a:t>
-            </a:r>
-            <a:r>
-              <a:rPr lang="zh-TW" altLang="en-US" dirty="0"/>
-              <a:t> </a:t>
-            </a:r>
-            <a:r>
-              <a:rPr lang="en-US" altLang="zh-TW" dirty="0"/>
-              <a:t>RX1 </a:t>
-            </a:r>
-          </a:p>
-          <a:p>
-            <a:pPr marL="0" indent="0">
-              <a:buNone/>
+              <a:rPr lang="en-US" altLang="zh-TW" dirty="0" err="1"/>
+              <a:t>AutoCorreltion</a:t>
+            </a:r>
+            <a:r>
+              <a:rPr lang="zh-TW" altLang="en-US" dirty="0"/>
+              <a:t> 用處到底是</a:t>
+            </a:r>
+            <a:r>
+              <a:rPr lang="en-US" altLang="zh-TW" dirty="0"/>
+              <a:t>?</a:t>
+            </a:r>
+          </a:p>
+          <a:p>
+            <a:pPr marL="514350" indent="-514350">
+              <a:buAutoNum type="arabicPeriod"/>
             </a:pPr>
             <a:endParaRPr lang="en-US" altLang="zh-TW" dirty="0"/>
           </a:p>
           <a:p>
-            <a:pPr marL="0" indent="0">
-              <a:buNone/>
+            <a:pPr marL="514350" indent="-514350">
+              <a:buAutoNum type="arabicPeriod"/>
             </a:pPr>
-            <a:endParaRPr lang="en-US" altLang="zh-TW" dirty="0"/>
-          </a:p>
-          <a:p>
-            <a:pPr marL="0" indent="0">
-              <a:buNone/>
-            </a:pPr>
-            <a:r>
-              <a:rPr lang="en-US" altLang="zh-TW" dirty="0"/>
-              <a:t>Decode RX0</a:t>
-            </a:r>
-            <a:endParaRPr lang="zh-TW" altLang="en-US" dirty="0"/>
+            <a:r>
+              <a:rPr lang="zh-TW" altLang="en-US" dirty="0"/>
+              <a:t>訊號上的分析</a:t>
+            </a:r>
           </a:p>
         </p:txBody>
       </p:sp>
     </p:spTree>
     <p:extLst>
       <p:ext uri="{BB962C8B-B14F-4D97-AF65-F5344CB8AC3E}">
-        <p14:creationId xmlns:p14="http://schemas.microsoft.com/office/powerpoint/2010/main" val="1747056482"/>
+        <p14:creationId xmlns:p14="http://schemas.microsoft.com/office/powerpoint/2010/main" val="1802279474"/>
       </p:ext>
     </p:extLst>
   </p:cSld>
@@ -21487,143 +22220,6 @@
           <p:cNvPr id="2" name="標題 1">
             <a:extLst>
               <a:ext uri="{FF2B5EF4-FFF2-40B4-BE49-F238E27FC236}">
-                <a16:creationId xmlns:a16="http://schemas.microsoft.com/office/drawing/2014/main" id="{50BB383F-54B9-1566-5039-3C13647347F8}"/>
-              </a:ext>
-            </a:extLst>
-          </p:cNvPr>
-          <p:cNvSpPr>
-            <a:spLocks noGrp="1"/>
-          </p:cNvSpPr>
-          <p:nvPr>
-            <p:ph type="title"/>
-          </p:nvPr>
-        </p:nvSpPr>
-        <p:spPr/>
-        <p:txBody>
-          <a:bodyPr/>
-          <a:lstStyle/>
-          <a:p>
-            <a:pPr algn="ctr"/>
-            <a:r>
-              <a:rPr lang="en-US" altLang="zh-TW" dirty="0" err="1"/>
-              <a:t>AutoCorrelation</a:t>
-            </a:r>
-            <a:endParaRPr lang="zh-TW" altLang="en-US" dirty="0"/>
-          </a:p>
-        </p:txBody>
-      </p:sp>
-      <p:sp>
-        <p:nvSpPr>
-          <p:cNvPr id="3" name="內容版面配置區 2">
-            <a:extLst>
-              <a:ext uri="{FF2B5EF4-FFF2-40B4-BE49-F238E27FC236}">
-                <a16:creationId xmlns:a16="http://schemas.microsoft.com/office/drawing/2014/main" id="{2596C747-6CF3-CCCC-4223-2CFCEABA8BA0}"/>
-              </a:ext>
-            </a:extLst>
-          </p:cNvPr>
-          <p:cNvSpPr>
-            <a:spLocks noGrp="1"/>
-          </p:cNvSpPr>
-          <p:nvPr>
-            <p:ph idx="1"/>
-          </p:nvPr>
-        </p:nvSpPr>
-        <p:spPr/>
-        <p:txBody>
-          <a:bodyPr/>
-          <a:lstStyle/>
-          <a:p>
-            <a:pPr marL="514350" indent="-514350">
-              <a:buAutoNum type="arabicPeriod"/>
-            </a:pPr>
-            <a:r>
-              <a:rPr lang="zh-TW" altLang="en-US" dirty="0"/>
-              <a:t>能推倒出</a:t>
-            </a:r>
-            <a:r>
-              <a:rPr lang="en-US" altLang="zh-TW" dirty="0" err="1"/>
-              <a:t>Convolation</a:t>
-            </a:r>
-            <a:r>
-              <a:rPr lang="en-US" altLang="zh-TW" dirty="0"/>
-              <a:t> Property for LTI system</a:t>
-            </a:r>
-          </a:p>
-          <a:p>
-            <a:pPr marL="514350" indent="-514350">
-              <a:buAutoNum type="arabicPeriod"/>
-            </a:pPr>
-            <a:endParaRPr lang="en-US" altLang="zh-TW" dirty="0"/>
-          </a:p>
-          <a:p>
-            <a:pPr marL="514350" indent="-514350">
-              <a:buAutoNum type="arabicPeriod"/>
-            </a:pPr>
-            <a:r>
-              <a:rPr lang="en-US" altLang="zh-TW" dirty="0" err="1"/>
-              <a:t>AutoCorreltion</a:t>
-            </a:r>
-            <a:r>
-              <a:rPr lang="zh-TW" altLang="en-US" dirty="0"/>
-              <a:t> 用處到底是</a:t>
-            </a:r>
-            <a:r>
-              <a:rPr lang="en-US" altLang="zh-TW" dirty="0"/>
-              <a:t>?</a:t>
-            </a:r>
-          </a:p>
-          <a:p>
-            <a:pPr marL="514350" indent="-514350">
-              <a:buAutoNum type="arabicPeriod"/>
-            </a:pPr>
-            <a:endParaRPr lang="en-US" altLang="zh-TW" dirty="0"/>
-          </a:p>
-          <a:p>
-            <a:pPr marL="514350" indent="-514350">
-              <a:buAutoNum type="arabicPeriod"/>
-            </a:pPr>
-            <a:r>
-              <a:rPr lang="zh-TW" altLang="en-US" dirty="0"/>
-              <a:t>訊號上的分析</a:t>
-            </a:r>
-          </a:p>
-        </p:txBody>
-      </p:sp>
-    </p:spTree>
-    <p:extLst>
-      <p:ext uri="{BB962C8B-B14F-4D97-AF65-F5344CB8AC3E}">
-        <p14:creationId xmlns:p14="http://schemas.microsoft.com/office/powerpoint/2010/main" val="1802279474"/>
-      </p:ext>
-    </p:extLst>
-  </p:cSld>
-  <p:clrMapOvr>
-    <a:masterClrMapping/>
-  </p:clrMapOvr>
-</p:sld>
-</file>
-
-<file path=ppt/slides/slide46.xml><?xml version="1.0" encoding="utf-8"?>
-<p:sld xmlns:a="http://schemas.openxmlformats.org/drawingml/2006/main" xmlns:r="http://schemas.openxmlformats.org/officeDocument/2006/relationships" xmlns:p="http://schemas.openxmlformats.org/presentationml/2006/main">
-  <p:cSld>
-    <p:spTree>
-      <p:nvGrpSpPr>
-        <p:cNvPr id="1" name=""/>
-        <p:cNvGrpSpPr/>
-        <p:nvPr/>
-      </p:nvGrpSpPr>
-      <p:grpSpPr>
-        <a:xfrm>
-          <a:off x="0" y="0"/>
-          <a:ext cx="0" cy="0"/>
-          <a:chOff x="0" y="0"/>
-          <a:chExt cx="0" cy="0"/>
-        </a:xfrm>
-      </p:grpSpPr>
-      <p:sp>
-        <p:nvSpPr>
-          <p:cNvPr id="2" name="標題 1">
-            <a:extLst>
-              <a:ext uri="{FF2B5EF4-FFF2-40B4-BE49-F238E27FC236}">
                 <a16:creationId xmlns:a16="http://schemas.microsoft.com/office/drawing/2014/main" id="{042F1310-2BFC-3D20-5FCD-AB24ABF21979}"/>
               </a:ext>
             </a:extLst>
@@ -21694,7 +22290,7 @@
 </p:sld>
 </file>
 
-<file path=ppt/slides/slide47.xml><?xml version="1.0" encoding="utf-8"?>
+<file path=ppt/slides/slide46.xml><?xml version="1.0" encoding="utf-8"?>
 <p:sld xmlns:a="http://schemas.openxmlformats.org/drawingml/2006/main" xmlns:r="http://schemas.openxmlformats.org/officeDocument/2006/relationships" xmlns:p="http://schemas.openxmlformats.org/presentationml/2006/main">
   <p:cSld>
     <p:spTree>
@@ -22231,6 +22827,135 @@
 </p:sld>
 </file>
 
+<file path=ppt/slides/slide47.xml><?xml version="1.0" encoding="utf-8"?>
+<p:sld xmlns:a="http://schemas.openxmlformats.org/drawingml/2006/main" xmlns:r="http://schemas.openxmlformats.org/officeDocument/2006/relationships" xmlns:p="http://schemas.openxmlformats.org/presentationml/2006/main">
+  <p:cSld>
+    <p:spTree>
+      <p:nvGrpSpPr>
+        <p:cNvPr id="1" name=""/>
+        <p:cNvGrpSpPr/>
+        <p:nvPr/>
+      </p:nvGrpSpPr>
+      <p:grpSpPr>
+        <a:xfrm>
+          <a:off x="0" y="0"/>
+          <a:ext cx="0" cy="0"/>
+          <a:chOff x="0" y="0"/>
+          <a:chExt cx="0" cy="0"/>
+        </a:xfrm>
+      </p:grpSpPr>
+      <p:sp>
+        <p:nvSpPr>
+          <p:cNvPr id="2" name="標題 1">
+            <a:extLst>
+              <a:ext uri="{FF2B5EF4-FFF2-40B4-BE49-F238E27FC236}">
+                <a16:creationId xmlns:a16="http://schemas.microsoft.com/office/drawing/2014/main" id="{E32E6CD8-2503-30B7-A4F8-AE84BE484917}"/>
+              </a:ext>
+            </a:extLst>
+          </p:cNvPr>
+          <p:cNvSpPr>
+            <a:spLocks noGrp="1"/>
+          </p:cNvSpPr>
+          <p:nvPr>
+            <p:ph type="title"/>
+          </p:nvPr>
+        </p:nvSpPr>
+        <p:spPr/>
+        <p:txBody>
+          <a:bodyPr/>
+          <a:lstStyle/>
+          <a:p>
+            <a:pPr algn="ctr"/>
+            <a:r>
+              <a:rPr lang="en-US" altLang="zh-TW" dirty="0"/>
+              <a:t>AGC flow</a:t>
+            </a:r>
+            <a:r>
+              <a:rPr lang="zh-TW" altLang="en-US" dirty="0"/>
+              <a:t>架構過程</a:t>
+            </a:r>
+          </a:p>
+        </p:txBody>
+      </p:sp>
+      <p:sp>
+        <p:nvSpPr>
+          <p:cNvPr id="3" name="內容版面配置區 2">
+            <a:extLst>
+              <a:ext uri="{FF2B5EF4-FFF2-40B4-BE49-F238E27FC236}">
+                <a16:creationId xmlns:a16="http://schemas.microsoft.com/office/drawing/2014/main" id="{ED8640AC-FE27-0D8C-6B75-7018404197B3}"/>
+              </a:ext>
+            </a:extLst>
+          </p:cNvPr>
+          <p:cNvSpPr>
+            <a:spLocks noGrp="1"/>
+          </p:cNvSpPr>
+          <p:nvPr>
+            <p:ph idx="1"/>
+          </p:nvPr>
+        </p:nvSpPr>
+        <p:spPr/>
+        <p:txBody>
+          <a:bodyPr/>
+          <a:lstStyle/>
+          <a:p>
+            <a:pPr marL="514350" indent="-514350">
+              <a:buAutoNum type="arabicPeriod"/>
+            </a:pPr>
+            <a:r>
+              <a:rPr lang="zh-TW" altLang="en-US" dirty="0"/>
+              <a:t>前期</a:t>
+            </a:r>
+            <a:r>
+              <a:rPr lang="en-US" altLang="zh-TW" dirty="0"/>
+              <a:t>ISSUE</a:t>
+            </a:r>
+          </a:p>
+          <a:p>
+            <a:pPr marL="514350" indent="-514350">
+              <a:buAutoNum type="arabicPeriod"/>
+            </a:pPr>
+            <a:endParaRPr lang="en-US" altLang="zh-TW" dirty="0"/>
+          </a:p>
+          <a:p>
+            <a:pPr marL="514350" indent="-514350">
+              <a:buAutoNum type="arabicPeriod"/>
+            </a:pPr>
+            <a:r>
+              <a:rPr lang="zh-TW" altLang="en-US" dirty="0"/>
+              <a:t>中後期統計</a:t>
+            </a:r>
+            <a:endParaRPr lang="en-US" altLang="zh-TW" dirty="0"/>
+          </a:p>
+          <a:p>
+            <a:pPr marL="514350" indent="-514350">
+              <a:buAutoNum type="arabicPeriod"/>
+            </a:pPr>
+            <a:endParaRPr lang="en-US" altLang="zh-TW" dirty="0"/>
+          </a:p>
+          <a:p>
+            <a:pPr marL="514350" indent="-514350">
+              <a:buAutoNum type="arabicPeriod"/>
+            </a:pPr>
+            <a:r>
+              <a:rPr lang="zh-TW" altLang="en-US" dirty="0"/>
+              <a:t>後期完工</a:t>
+            </a:r>
+          </a:p>
+        </p:txBody>
+      </p:sp>
+    </p:spTree>
+    <p:extLst>
+      <p:ext uri="{BB962C8B-B14F-4D97-AF65-F5344CB8AC3E}">
+        <p14:creationId xmlns:p14="http://schemas.microsoft.com/office/powerpoint/2010/main" val="3478487214"/>
+      </p:ext>
+    </p:extLst>
+  </p:cSld>
+  <p:clrMapOvr>
+    <a:masterClrMapping/>
+  </p:clrMapOvr>
+</p:sld>
+</file>
+
 <file path=ppt/slides/slide48.xml><?xml version="1.0" encoding="utf-8"?>
 <p:sld xmlns:a="http://schemas.openxmlformats.org/drawingml/2006/main" xmlns:r="http://schemas.openxmlformats.org/officeDocument/2006/relationships" xmlns:p="http://schemas.openxmlformats.org/presentationml/2006/main">
   <p:cSld>
@@ -22253,7 +22978,7 @@
           <p:cNvPr id="2" name="標題 1">
             <a:extLst>
               <a:ext uri="{FF2B5EF4-FFF2-40B4-BE49-F238E27FC236}">
-                <a16:creationId xmlns:a16="http://schemas.microsoft.com/office/drawing/2014/main" id="{E32E6CD8-2503-30B7-A4F8-AE84BE484917}"/>
+                <a16:creationId xmlns:a16="http://schemas.microsoft.com/office/drawing/2014/main" id="{3A28C725-6131-003C-3B09-A135BB92DB74}"/>
               </a:ext>
             </a:extLst>
           </p:cNvPr>
@@ -22269,15 +22994,7 @@
           <a:bodyPr/>
           <a:lstStyle/>
           <a:p>
-            <a:pPr algn="ctr"/>
-            <a:r>
-              <a:rPr lang="en-US" altLang="zh-TW" dirty="0"/>
-              <a:t>AGC flow</a:t>
-            </a:r>
-            <a:r>
-              <a:rPr lang="zh-TW" altLang="en-US" dirty="0"/>
-              <a:t>架構過程</a:t>
-            </a:r>
+            <a:endParaRPr lang="zh-TW" altLang="en-US"/>
           </a:p>
         </p:txBody>
       </p:sp>
@@ -22286,7 +23003,7 @@
           <p:cNvPr id="3" name="內容版面配置區 2">
             <a:extLst>
               <a:ext uri="{FF2B5EF4-FFF2-40B4-BE49-F238E27FC236}">
-                <a16:creationId xmlns:a16="http://schemas.microsoft.com/office/drawing/2014/main" id="{ED8640AC-FE27-0D8C-6B75-7018404197B3}"/>
+                <a16:creationId xmlns:a16="http://schemas.microsoft.com/office/drawing/2014/main" id="{5818DC31-9BA2-F239-57B3-E888E732592C}"/>
               </a:ext>
             </a:extLst>
           </p:cNvPr>
@@ -22302,47 +23019,17 @@
           <a:bodyPr/>
           <a:lstStyle/>
           <a:p>
-            <a:pPr marL="514350" indent="-514350">
-              <a:buAutoNum type="arabicPeriod"/>
-            </a:pPr>
-            <a:r>
-              <a:rPr lang="zh-TW" altLang="en-US" dirty="0"/>
-              <a:t>前期</a:t>
-            </a:r>
-            <a:r>
-              <a:rPr lang="en-US" altLang="zh-TW" dirty="0"/>
-              <a:t>ISSUE</a:t>
-            </a:r>
-          </a:p>
-          <a:p>
-            <a:pPr marL="514350" indent="-514350">
-              <a:buAutoNum type="arabicPeriod"/>
-            </a:pPr>
-            <a:endParaRPr lang="en-US" altLang="zh-TW" dirty="0"/>
-          </a:p>
-          <a:p>
-            <a:pPr marL="514350" indent="-514350">
-              <a:buAutoNum type="arabicPeriod"/>
-            </a:pPr>
-            <a:r>
-              <a:rPr lang="zh-TW" altLang="en-US" dirty="0"/>
-              <a:t>中後期統計</a:t>
-            </a:r>
-            <a:endParaRPr lang="en-US" altLang="zh-TW" dirty="0"/>
-          </a:p>
-          <a:p>
-            <a:pPr marL="514350" indent="-514350">
-              <a:buAutoNum type="arabicPeriod"/>
-            </a:pPr>
-            <a:endParaRPr lang="en-US" altLang="zh-TW" dirty="0"/>
-          </a:p>
-          <a:p>
-            <a:pPr marL="514350" indent="-514350">
-              <a:buAutoNum type="arabicPeriod"/>
-            </a:pPr>
-            <a:r>
-              <a:rPr lang="zh-TW" altLang="en-US" dirty="0"/>
-              <a:t>後期完工</a:t>
+            <a:r>
+              <a:rPr lang="zh-TW" altLang="en-US" dirty="0"/>
+              <a:t>為何要取</a:t>
+            </a:r>
+            <a:r>
+              <a:rPr lang="en-US" altLang="zh-TW" dirty="0"/>
+              <a:t>4T</a:t>
+            </a:r>
+            <a:r>
+              <a:rPr lang="zh-TW" altLang="en-US" dirty="0"/>
+              <a:t>來做的原因</a:t>
             </a:r>
           </a:p>
         </p:txBody>
@@ -22350,7 +23037,7 @@
     </p:spTree>
     <p:extLst>
       <p:ext uri="{BB962C8B-B14F-4D97-AF65-F5344CB8AC3E}">
-        <p14:creationId xmlns:p14="http://schemas.microsoft.com/office/powerpoint/2010/main" val="3478487214"/>
+        <p14:creationId xmlns:p14="http://schemas.microsoft.com/office/powerpoint/2010/main" val="147892164"/>
       </p:ext>
     </p:extLst>
   </p:cSld>

</xml_diff>

<commit_message>
* Update Schmitt Digital Page
</commit_message>
<xml_diff>
--- a/Project_Summary_pdf/Project_Summary.pptx
+++ b/Project_Summary_pdf/Project_Summary.pptx
@@ -282,6 +282,13 @@
       </p:ext>
     </p:extLst>
   </p:cmAuthor>
+  <p:cmAuthor id="2" name="User" initials="U" lastIdx="1" clrIdx="1">
+    <p:extLst>
+      <p:ext uri="{19B8F6BF-5375-455C-9EA6-DF929625EA0E}">
+        <p15:presenceInfo xmlns:p15="http://schemas.microsoft.com/office/powerpoint/2012/main" userId="User" providerId="None"/>
+      </p:ext>
+    </p:extLst>
+  </p:cmAuthor>
 </p:cmAuthorLst>
 </file>
 
@@ -427,7 +434,7 @@
           <a:p>
             <a:fld id="{C65320F2-F42B-45F1-AA86-96F1A2E46749}" type="datetimeFigureOut">
               <a:rPr lang="zh-TW" altLang="en-US" smtClean="0"/>
-              <a:t>2023/2/4</a:t>
+              <a:t>2023/2/8</a:t>
             </a:fld>
             <a:endParaRPr lang="zh-TW" altLang="en-US"/>
           </a:p>
@@ -2511,8 +2518,109 @@
           <a:p>
             <a:r>
               <a:rPr lang="zh-TW" altLang="en-US" dirty="0"/>
-              <a:t>利用這張圖解釋</a:t>
-            </a:r>
+              <a:t>利用這</a:t>
+            </a:r>
+            <a:r>
+              <a:rPr lang="zh-TW" altLang="en-US"/>
+              <a:t>張圖以及紅色框框解釋何謂</a:t>
+            </a:r>
+            <a:r>
+              <a:rPr lang="en-US" altLang="zh-TW"/>
+              <a:t>Schmitt</a:t>
+            </a:r>
+          </a:p>
+          <a:p>
+            <a:r>
+              <a:rPr lang="zh-TW" altLang="en-US"/>
+              <a:t>解釋 </a:t>
+            </a:r>
+            <a:r>
+              <a:rPr lang="en-US" altLang="zh-TW"/>
+              <a:t>:</a:t>
+            </a:r>
+            <a:r>
+              <a:rPr lang="zh-TW" altLang="en-US"/>
+              <a:t> </a:t>
+            </a:r>
+            <a:endParaRPr lang="en-US" altLang="zh-TW"/>
+          </a:p>
+          <a:p>
+            <a:r>
+              <a:rPr lang="zh-TW" altLang="en-US"/>
+              <a:t>藍色訊號 如何利用綠色得到 </a:t>
+            </a:r>
+            <a:r>
+              <a:rPr lang="en-US" altLang="zh-TW"/>
+              <a:t>:</a:t>
+            </a:r>
+            <a:r>
+              <a:rPr lang="zh-TW" altLang="en-US"/>
+              <a:t> </a:t>
+            </a:r>
+            <a:endParaRPr lang="en-US" altLang="zh-TW"/>
+          </a:p>
+          <a:p>
+            <a:r>
+              <a:rPr lang="zh-TW" altLang="en-US"/>
+              <a:t>當訊號</a:t>
+            </a:r>
+            <a:r>
+              <a:rPr lang="en-US" altLang="zh-TW"/>
+              <a:t>Rising Edge</a:t>
+            </a:r>
+            <a:r>
+              <a:rPr lang="zh-TW" altLang="en-US"/>
+              <a:t>電壓大過</a:t>
+            </a:r>
+            <a:r>
+              <a:rPr lang="en-US" altLang="zh-TW"/>
+              <a:t>HT</a:t>
+            </a:r>
+            <a:r>
+              <a:rPr lang="zh-TW" altLang="en-US"/>
+              <a:t>時輸出為</a:t>
+            </a:r>
+            <a:r>
+              <a:rPr lang="en-US" altLang="zh-TW"/>
+              <a:t> 1, </a:t>
+            </a:r>
+            <a:r>
+              <a:rPr lang="zh-TW" altLang="en-US"/>
+              <a:t>當訊號</a:t>
+            </a:r>
+            <a:r>
+              <a:rPr lang="en-US" altLang="zh-TW"/>
+              <a:t>Rising Edge</a:t>
+            </a:r>
+            <a:r>
+              <a:rPr lang="zh-TW" altLang="en-US"/>
+              <a:t>小過</a:t>
+            </a:r>
+            <a:r>
+              <a:rPr lang="en-US" altLang="zh-TW"/>
+              <a:t>LT</a:t>
+            </a:r>
+            <a:r>
+              <a:rPr lang="zh-TW" altLang="en-US"/>
+              <a:t>時輸出為</a:t>
+            </a:r>
+            <a:r>
+              <a:rPr lang="en-US" altLang="zh-TW"/>
+              <a:t>0</a:t>
+            </a:r>
+            <a:r>
+              <a:rPr lang="zh-TW" altLang="en-US"/>
+              <a:t>，中間則根據</a:t>
+            </a:r>
+            <a:r>
+              <a:rPr lang="en-US" altLang="zh-TW"/>
+              <a:t>Lock</a:t>
+            </a:r>
+            <a:r>
+              <a:rPr lang="zh-TW" altLang="en-US"/>
+              <a:t>到的訊號決定。</a:t>
+            </a:r>
+            <a:endParaRPr lang="zh-TW" altLang="en-US" dirty="0"/>
           </a:p>
         </p:txBody>
       </p:sp>
@@ -3917,7 +4025,7 @@
           <a:p>
             <a:fld id="{8A9F4CB5-1750-4E23-A13C-2C1F028F9724}" type="datetimeFigureOut">
               <a:rPr lang="zh-TW" altLang="en-US" smtClean="0"/>
-              <a:t>2023/2/4</a:t>
+              <a:t>2023/2/8</a:t>
             </a:fld>
             <a:endParaRPr lang="zh-TW" altLang="en-US"/>
           </a:p>
@@ -4115,7 +4223,7 @@
           <a:p>
             <a:fld id="{8A9F4CB5-1750-4E23-A13C-2C1F028F9724}" type="datetimeFigureOut">
               <a:rPr lang="zh-TW" altLang="en-US" smtClean="0"/>
-              <a:t>2023/2/4</a:t>
+              <a:t>2023/2/8</a:t>
             </a:fld>
             <a:endParaRPr lang="zh-TW" altLang="en-US"/>
           </a:p>
@@ -4323,7 +4431,7 @@
           <a:p>
             <a:fld id="{8A9F4CB5-1750-4E23-A13C-2C1F028F9724}" type="datetimeFigureOut">
               <a:rPr lang="zh-TW" altLang="en-US" smtClean="0"/>
-              <a:t>2023/2/4</a:t>
+              <a:t>2023/2/8</a:t>
             </a:fld>
             <a:endParaRPr lang="zh-TW" altLang="en-US"/>
           </a:p>
@@ -4521,7 +4629,7 @@
           <a:p>
             <a:fld id="{8A9F4CB5-1750-4E23-A13C-2C1F028F9724}" type="datetimeFigureOut">
               <a:rPr lang="zh-TW" altLang="en-US" smtClean="0"/>
-              <a:t>2023/2/4</a:t>
+              <a:t>2023/2/8</a:t>
             </a:fld>
             <a:endParaRPr lang="zh-TW" altLang="en-US"/>
           </a:p>
@@ -4796,7 +4904,7 @@
           <a:p>
             <a:fld id="{8A9F4CB5-1750-4E23-A13C-2C1F028F9724}" type="datetimeFigureOut">
               <a:rPr lang="zh-TW" altLang="en-US" smtClean="0"/>
-              <a:t>2023/2/4</a:t>
+              <a:t>2023/2/8</a:t>
             </a:fld>
             <a:endParaRPr lang="zh-TW" altLang="en-US"/>
           </a:p>
@@ -5061,7 +5169,7 @@
           <a:p>
             <a:fld id="{8A9F4CB5-1750-4E23-A13C-2C1F028F9724}" type="datetimeFigureOut">
               <a:rPr lang="zh-TW" altLang="en-US" smtClean="0"/>
-              <a:t>2023/2/4</a:t>
+              <a:t>2023/2/8</a:t>
             </a:fld>
             <a:endParaRPr lang="zh-TW" altLang="en-US"/>
           </a:p>
@@ -5473,7 +5581,7 @@
           <a:p>
             <a:fld id="{8A9F4CB5-1750-4E23-A13C-2C1F028F9724}" type="datetimeFigureOut">
               <a:rPr lang="zh-TW" altLang="en-US" smtClean="0"/>
-              <a:t>2023/2/4</a:t>
+              <a:t>2023/2/8</a:t>
             </a:fld>
             <a:endParaRPr lang="zh-TW" altLang="en-US"/>
           </a:p>
@@ -5614,7 +5722,7 @@
           <a:p>
             <a:fld id="{8A9F4CB5-1750-4E23-A13C-2C1F028F9724}" type="datetimeFigureOut">
               <a:rPr lang="zh-TW" altLang="en-US" smtClean="0"/>
-              <a:t>2023/2/4</a:t>
+              <a:t>2023/2/8</a:t>
             </a:fld>
             <a:endParaRPr lang="zh-TW" altLang="en-US"/>
           </a:p>
@@ -5727,7 +5835,7 @@
           <a:p>
             <a:fld id="{8A9F4CB5-1750-4E23-A13C-2C1F028F9724}" type="datetimeFigureOut">
               <a:rPr lang="zh-TW" altLang="en-US" smtClean="0"/>
-              <a:t>2023/2/4</a:t>
+              <a:t>2023/2/8</a:t>
             </a:fld>
             <a:endParaRPr lang="zh-TW" altLang="en-US"/>
           </a:p>
@@ -6038,7 +6146,7 @@
           <a:p>
             <a:fld id="{8A9F4CB5-1750-4E23-A13C-2C1F028F9724}" type="datetimeFigureOut">
               <a:rPr lang="zh-TW" altLang="en-US" smtClean="0"/>
-              <a:t>2023/2/4</a:t>
+              <a:t>2023/2/8</a:t>
             </a:fld>
             <a:endParaRPr lang="zh-TW" altLang="en-US"/>
           </a:p>
@@ -6326,7 +6434,7 @@
           <a:p>
             <a:fld id="{8A9F4CB5-1750-4E23-A13C-2C1F028F9724}" type="datetimeFigureOut">
               <a:rPr lang="zh-TW" altLang="en-US" smtClean="0"/>
-              <a:t>2023/2/4</a:t>
+              <a:t>2023/2/8</a:t>
             </a:fld>
             <a:endParaRPr lang="zh-TW" altLang="en-US"/>
           </a:p>
@@ -6567,7 +6675,7 @@
           <a:p>
             <a:fld id="{8A9F4CB5-1750-4E23-A13C-2C1F028F9724}" type="datetimeFigureOut">
               <a:rPr lang="zh-TW" altLang="en-US" smtClean="0"/>
-              <a:t>2023/2/4</a:t>
+              <a:t>2023/2/8</a:t>
             </a:fld>
             <a:endParaRPr lang="zh-TW" altLang="en-US"/>
           </a:p>
@@ -19222,8 +19330,8 @@
           </a:p>
         </p:txBody>
       </p:sp>
-      <mc:AlternateContent xmlns:mc="http://schemas.openxmlformats.org/markup-compatibility/2006">
-        <mc:Choice xmlns:a14="http://schemas.microsoft.com/office/drawing/2010/main" Requires="a14">
+      <mc:AlternateContent xmlns:mc="http://schemas.openxmlformats.org/markup-compatibility/2006" xmlns:a14="http://schemas.microsoft.com/office/drawing/2010/main">
+        <mc:Choice Requires="a14">
           <p:sp>
             <p:nvSpPr>
               <p:cNvPr id="3" name="內容版面配置區 2">
@@ -19358,7 +19466,7 @@
             </p:txBody>
           </p:sp>
         </mc:Choice>
-        <mc:Fallback>
+        <mc:Fallback xmlns="">
           <p:sp>
             <p:nvSpPr>
               <p:cNvPr id="3" name="內容版面配置區 2">
@@ -19944,7 +20052,7 @@
         </p:nvSpPr>
         <p:spPr>
           <a:xfrm>
-            <a:off x="207363" y="692584"/>
+            <a:off x="94075" y="692584"/>
             <a:ext cx="6264696" cy="1200329"/>
           </a:xfrm>
           <a:prstGeom prst="rect">
@@ -19959,8 +20067,16 @@
           <a:lstStyle/>
           <a:p>
             <a:r>
+              <a:rPr lang="zh-TW" altLang="en-US" dirty="0">
+                <a:highlight>
+                  <a:srgbClr val="FFFF00"/>
+                </a:highlight>
+              </a:rPr>
+              <a:t>黃色</a:t>
+            </a:r>
+            <a:r>
               <a:rPr lang="zh-TW" altLang="en-US" dirty="0"/>
-              <a:t>黃色 </a:t>
+              <a:t> </a:t>
             </a:r>
             <a:r>
               <a:rPr lang="en-US" altLang="zh-TW" dirty="0"/>
@@ -19974,12 +20090,12 @@
           </a:p>
           <a:p>
             <a:r>
-              <a:rPr lang="zh-TW" altLang="en-US" dirty="0"/>
-              <a:t>紅色 </a:t>
-            </a:r>
-            <a:r>
-              <a:rPr lang="en-US" altLang="zh-TW" dirty="0"/>
-              <a:t>:</a:t>
+              <a:rPr lang="zh-TW" altLang="en-US" dirty="0">
+                <a:highlight>
+                  <a:srgbClr val="FF0000"/>
+                </a:highlight>
+              </a:rPr>
+              <a:t>紅色</a:t>
             </a:r>
             <a:r>
               <a:rPr lang="zh-TW" altLang="en-US" dirty="0"/>
@@ -19987,6 +20103,14 @@
             </a:r>
             <a:r>
               <a:rPr lang="en-US" altLang="zh-TW" dirty="0"/>
+              <a:t>:</a:t>
+            </a:r>
+            <a:r>
+              <a:rPr lang="zh-TW" altLang="en-US" dirty="0"/>
+              <a:t> </a:t>
+            </a:r>
+            <a:r>
+              <a:rPr lang="en-US" altLang="zh-TW" dirty="0"/>
               <a:t>1st HPF</a:t>
             </a:r>
             <a:r>
@@ -19997,44 +20121,278 @@
           </a:p>
           <a:p>
             <a:r>
-              <a:rPr lang="zh-TW" altLang="en-US" dirty="0"/>
+              <a:rPr lang="zh-TW" altLang="en-US">
+                <a:highlight>
+                  <a:srgbClr val="00FF00"/>
+                </a:highlight>
+              </a:rPr>
               <a:t>綠色</a:t>
             </a:r>
             <a:r>
-              <a:rPr lang="en-US" altLang="zh-TW" dirty="0"/>
-              <a:t>Digital Port : CMP_DOUT&lt;1&gt; ,for High Threshold</a:t>
-            </a:r>
-          </a:p>
-          <a:p>
-            <a:r>
-              <a:rPr lang="zh-TW" altLang="en-US" dirty="0"/>
+              <a:rPr lang="en-US" altLang="zh-TW"/>
+              <a:t> : More Than High </a:t>
+            </a:r>
+            <a:r>
+              <a:rPr lang="en-US" altLang="zh-TW" dirty="0"/>
+              <a:t>Threshold</a:t>
+            </a:r>
+          </a:p>
+          <a:p>
+            <a:r>
+              <a:rPr lang="zh-TW" altLang="en-US">
+                <a:highlight>
+                  <a:srgbClr val="00FFFF"/>
+                </a:highlight>
+              </a:rPr>
               <a:t>藍色</a:t>
             </a:r>
             <a:r>
-              <a:rPr lang="en-US" altLang="zh-TW" dirty="0"/>
-              <a:t>Digital Port</a:t>
-            </a:r>
-            <a:r>
-              <a:rPr lang="zh-TW" altLang="en-US" dirty="0"/>
+              <a:rPr lang="zh-TW" altLang="en-US"/>
               <a:t> </a:t>
             </a:r>
             <a:r>
-              <a:rPr lang="en-US" altLang="zh-TW" dirty="0"/>
+              <a:rPr lang="en-US" altLang="zh-TW"/>
               <a:t>:</a:t>
             </a:r>
             <a:r>
-              <a:rPr lang="zh-TW" altLang="en-US" dirty="0"/>
+              <a:rPr lang="zh-TW" altLang="en-US"/>
               <a:t> </a:t>
             </a:r>
             <a:r>
-              <a:rPr lang="en-US" altLang="zh-TW" dirty="0" err="1"/>
-              <a:t>OutPut</a:t>
+              <a:rPr lang="en-US" altLang="zh-TW"/>
+              <a:t>Schmitt OutPut</a:t>
             </a:r>
             <a:r>
               <a:rPr lang="en-US" altLang="zh-TW" dirty="0"/>
               <a:t>&lt;1&gt;</a:t>
             </a:r>
             <a:endParaRPr lang="zh-TW" altLang="en-US" dirty="0"/>
+          </a:p>
+        </p:txBody>
+      </p:sp>
+      <p:cxnSp>
+        <p:nvCxnSpPr>
+          <p:cNvPr id="7" name="直線接點 6">
+            <a:extLst>
+              <a:ext uri="{FF2B5EF4-FFF2-40B4-BE49-F238E27FC236}">
+                <a16:creationId xmlns:a16="http://schemas.microsoft.com/office/drawing/2014/main" id="{48986426-D8B9-A965-D13B-951AACC49CED}"/>
+              </a:ext>
+            </a:extLst>
+          </p:cNvPr>
+          <p:cNvCxnSpPr>
+            <a:cxnSpLocks/>
+          </p:cNvCxnSpPr>
+          <p:nvPr/>
+        </p:nvCxnSpPr>
+        <p:spPr>
+          <a:xfrm>
+            <a:off x="1994281" y="3348304"/>
+            <a:ext cx="9469247" cy="0"/>
+          </a:xfrm>
+          <a:prstGeom prst="line">
+            <a:avLst/>
+          </a:prstGeom>
+          <a:ln w="28575">
+            <a:solidFill>
+              <a:srgbClr val="7030A0"/>
+            </a:solidFill>
+            <a:prstDash val="dashDot"/>
+          </a:ln>
+        </p:spPr>
+        <p:style>
+          <a:lnRef idx="1">
+            <a:schemeClr val="accent1"/>
+          </a:lnRef>
+          <a:fillRef idx="0">
+            <a:schemeClr val="accent1"/>
+          </a:fillRef>
+          <a:effectRef idx="0">
+            <a:schemeClr val="accent1"/>
+          </a:effectRef>
+          <a:fontRef idx="minor">
+            <a:schemeClr val="tx1"/>
+          </a:fontRef>
+        </p:style>
+      </p:cxnSp>
+      <p:cxnSp>
+        <p:nvCxnSpPr>
+          <p:cNvPr id="9" name="直線接點 8">
+            <a:extLst>
+              <a:ext uri="{FF2B5EF4-FFF2-40B4-BE49-F238E27FC236}">
+                <a16:creationId xmlns:a16="http://schemas.microsoft.com/office/drawing/2014/main" id="{A3DDCFA6-8C8F-6165-4DFA-98A13A102FCF}"/>
+              </a:ext>
+            </a:extLst>
+          </p:cNvPr>
+          <p:cNvCxnSpPr>
+            <a:cxnSpLocks/>
+          </p:cNvCxnSpPr>
+          <p:nvPr/>
+        </p:nvCxnSpPr>
+        <p:spPr>
+          <a:xfrm>
+            <a:off x="1877736" y="3751556"/>
+            <a:ext cx="9585792" cy="0"/>
+          </a:xfrm>
+          <a:prstGeom prst="line">
+            <a:avLst/>
+          </a:prstGeom>
+          <a:ln w="28575">
+            <a:solidFill>
+              <a:schemeClr val="accent6">
+                <a:lumMod val="60000"/>
+                <a:lumOff val="40000"/>
+              </a:schemeClr>
+            </a:solidFill>
+            <a:prstDash val="dashDot"/>
+          </a:ln>
+        </p:spPr>
+        <p:style>
+          <a:lnRef idx="1">
+            <a:schemeClr val="accent1"/>
+          </a:lnRef>
+          <a:fillRef idx="0">
+            <a:schemeClr val="accent1"/>
+          </a:fillRef>
+          <a:effectRef idx="0">
+            <a:schemeClr val="accent1"/>
+          </a:effectRef>
+          <a:fontRef idx="minor">
+            <a:schemeClr val="tx1"/>
+          </a:fontRef>
+        </p:style>
+      </p:cxnSp>
+      <p:sp>
+        <p:nvSpPr>
+          <p:cNvPr id="12" name="文字方塊 11">
+            <a:extLst>
+              <a:ext uri="{FF2B5EF4-FFF2-40B4-BE49-F238E27FC236}">
+                <a16:creationId xmlns:a16="http://schemas.microsoft.com/office/drawing/2014/main" id="{0F3DADD4-6F0F-3C2E-01F3-DEA47010A0C2}"/>
+              </a:ext>
+            </a:extLst>
+          </p:cNvPr>
+          <p:cNvSpPr txBox="1"/>
+          <p:nvPr/>
+        </p:nvSpPr>
+        <p:spPr>
+          <a:xfrm>
+            <a:off x="11531150" y="3107342"/>
+            <a:ext cx="534075" cy="380324"/>
+          </a:xfrm>
+          <a:prstGeom prst="rect">
+            <a:avLst/>
+          </a:prstGeom>
+          <a:solidFill>
+            <a:schemeClr val="accent1">
+              <a:lumMod val="40000"/>
+              <a:lumOff val="60000"/>
+            </a:schemeClr>
+          </a:solidFill>
+        </p:spPr>
+        <p:txBody>
+          <a:bodyPr wrap="square" rtlCol="0">
+            <a:spAutoFit/>
+          </a:bodyPr>
+          <a:lstStyle/>
+          <a:p>
+            <a:r>
+              <a:rPr lang="en-US" altLang="zh-TW"/>
+              <a:t>HT</a:t>
+            </a:r>
+            <a:endParaRPr lang="zh-TW" altLang="en-US"/>
+          </a:p>
+        </p:txBody>
+      </p:sp>
+      <p:sp>
+        <p:nvSpPr>
+          <p:cNvPr id="13" name="文字方塊 12">
+            <a:extLst>
+              <a:ext uri="{FF2B5EF4-FFF2-40B4-BE49-F238E27FC236}">
+                <a16:creationId xmlns:a16="http://schemas.microsoft.com/office/drawing/2014/main" id="{C52813D4-6981-0264-9EF2-FB4C1A75B3A2}"/>
+              </a:ext>
+            </a:extLst>
+          </p:cNvPr>
+          <p:cNvSpPr txBox="1"/>
+          <p:nvPr/>
+        </p:nvSpPr>
+        <p:spPr>
+          <a:xfrm>
+            <a:off x="11531149" y="3487666"/>
+            <a:ext cx="534075" cy="380324"/>
+          </a:xfrm>
+          <a:prstGeom prst="rect">
+            <a:avLst/>
+          </a:prstGeom>
+          <a:solidFill>
+            <a:schemeClr val="accent2">
+              <a:lumMod val="40000"/>
+              <a:lumOff val="60000"/>
+            </a:schemeClr>
+          </a:solidFill>
+        </p:spPr>
+        <p:txBody>
+          <a:bodyPr wrap="square" rtlCol="0">
+            <a:spAutoFit/>
+          </a:bodyPr>
+          <a:lstStyle/>
+          <a:p>
+            <a:r>
+              <a:rPr lang="en-US" altLang="zh-TW"/>
+              <a:t>LT</a:t>
+            </a:r>
+            <a:endParaRPr lang="zh-TW" altLang="en-US"/>
+          </a:p>
+        </p:txBody>
+      </p:sp>
+      <p:sp>
+        <p:nvSpPr>
+          <p:cNvPr id="16" name="矩形: 圓角 15">
+            <a:extLst>
+              <a:ext uri="{FF2B5EF4-FFF2-40B4-BE49-F238E27FC236}">
+                <a16:creationId xmlns:a16="http://schemas.microsoft.com/office/drawing/2014/main" id="{40B72A63-F3FC-C29A-AB1C-ADEBE6E0A209}"/>
+              </a:ext>
+            </a:extLst>
+          </p:cNvPr>
+          <p:cNvSpPr/>
+          <p:nvPr/>
+        </p:nvSpPr>
+        <p:spPr>
+          <a:xfrm>
+            <a:off x="7218096" y="3847485"/>
+            <a:ext cx="776835" cy="1792664"/>
+          </a:xfrm>
+          <a:prstGeom prst="roundRect">
+            <a:avLst/>
+          </a:prstGeom>
+          <a:noFill/>
+          <a:ln w="38100">
+            <a:solidFill>
+              <a:srgbClr val="FF0000"/>
+            </a:solidFill>
+            <a:prstDash val="dash"/>
+          </a:ln>
+        </p:spPr>
+        <p:style>
+          <a:lnRef idx="2">
+            <a:schemeClr val="accent1">
+              <a:shade val="50000"/>
+            </a:schemeClr>
+          </a:lnRef>
+          <a:fillRef idx="1">
+            <a:schemeClr val="accent1"/>
+          </a:fillRef>
+          <a:effectRef idx="0">
+            <a:schemeClr val="accent1"/>
+          </a:effectRef>
+          <a:fontRef idx="minor">
+            <a:schemeClr val="lt1"/>
+          </a:fontRef>
+        </p:style>
+        <p:txBody>
+          <a:bodyPr rtlCol="0" anchor="ctr"/>
+          <a:lstStyle/>
+          <a:p>
+            <a:pPr algn="ctr"/>
+            <a:endParaRPr lang="zh-TW" altLang="en-US"/>
           </a:p>
         </p:txBody>
       </p:sp>
@@ -20073,7 +20431,7 @@
           <p:cNvPr id="2" name="標題 1">
             <a:extLst>
               <a:ext uri="{FF2B5EF4-FFF2-40B4-BE49-F238E27FC236}">
-                <a16:creationId xmlns:a16="http://schemas.microsoft.com/office/drawing/2014/main" id="{19E36743-25A1-BE5C-A8C2-0019D13586BB}"/>
+                <a16:creationId xmlns:a16="http://schemas.microsoft.com/office/drawing/2014/main" id="{47D96773-D6B2-972C-8B3F-89FD60177D30}"/>
               </a:ext>
             </a:extLst>
           </p:cNvPr>
@@ -20091,10 +20449,10 @@
           <a:p>
             <a:pPr algn="ctr"/>
             <a:r>
-              <a:rPr lang="en-US" altLang="zh-TW" dirty="0"/>
+              <a:rPr lang="en-US" altLang="zh-TW"/>
               <a:t>Schmitt Digital Code</a:t>
             </a:r>
-            <a:endParaRPr lang="zh-TW" altLang="en-US" dirty="0"/>
+            <a:endParaRPr lang="zh-TW" altLang="en-US"/>
           </a:p>
         </p:txBody>
       </p:sp>
@@ -20103,7 +20461,7 @@
           <p:cNvPr id="3" name="內容版面配置區 2">
             <a:extLst>
               <a:ext uri="{FF2B5EF4-FFF2-40B4-BE49-F238E27FC236}">
-                <a16:creationId xmlns:a16="http://schemas.microsoft.com/office/drawing/2014/main" id="{541FFBC3-4351-9F46-B8A7-208139BF452D}"/>
+                <a16:creationId xmlns:a16="http://schemas.microsoft.com/office/drawing/2014/main" id="{A24B6AF3-B97B-C725-DBD9-94462BD9B29B}"/>
               </a:ext>
             </a:extLst>
           </p:cNvPr>
@@ -20119,14 +20477,17 @@
           <a:bodyPr/>
           <a:lstStyle/>
           <a:p>
-            <a:endParaRPr lang="zh-TW" altLang="en-US" dirty="0"/>
+            <a:pPr marL="0" indent="0">
+              <a:buNone/>
+            </a:pPr>
+            <a:endParaRPr lang="zh-TW" altLang="en-US"/>
           </a:p>
         </p:txBody>
       </p:sp>
     </p:spTree>
     <p:extLst>
       <p:ext uri="{BB962C8B-B14F-4D97-AF65-F5344CB8AC3E}">
-        <p14:creationId xmlns:p14="http://schemas.microsoft.com/office/powerpoint/2010/main" val="4245840055"/>
+        <p14:creationId xmlns:p14="http://schemas.microsoft.com/office/powerpoint/2010/main" val="1737055496"/>
       </p:ext>
     </p:extLst>
   </p:cSld>

</xml_diff>

<commit_message>
* Update Schmitt Digital
</commit_message>
<xml_diff>
--- a/Project_Summary_pdf/Project_Summary.pptx
+++ b/Project_Summary_pdf/Project_Summary.pptx
@@ -281,7 +281,7 @@
 
 <file path=ppt/commentAuthors.xml><?xml version="1.0" encoding="utf-8"?>
 <p:cmAuthorLst xmlns:a="http://schemas.openxmlformats.org/drawingml/2006/main" xmlns:r="http://schemas.openxmlformats.org/officeDocument/2006/relationships" xmlns:p="http://schemas.openxmlformats.org/presentationml/2006/main">
-  <p:cmAuthor id="1" name="sis-fw-3" initials="s" lastIdx="13" clrIdx="0">
+  <p:cmAuthor id="1" name="sis-fw-3" initials="s" lastIdx="14" clrIdx="0">
     <p:extLst>
       <p:ext uri="{19B8F6BF-5375-455C-9EA6-DF929625EA0E}">
         <p15:presenceInfo xmlns:p15="http://schemas.microsoft.com/office/powerpoint/2012/main" userId="sis-fw-3" providerId="None"/>
@@ -440,7 +440,7 @@
           <a:p>
             <a:fld id="{C65320F2-F42B-45F1-AA86-96F1A2E46749}" type="datetimeFigureOut">
               <a:rPr lang="zh-TW" altLang="en-US" smtClean="0"/>
-              <a:t>2023/2/8</a:t>
+              <a:t>2023/2/9</a:t>
             </a:fld>
             <a:endParaRPr lang="zh-TW" altLang="en-US"/>
           </a:p>
@@ -2706,9 +2706,27 @@
           <a:lstStyle/>
           <a:p>
             <a:r>
-              <a:rPr lang="zh-TW" altLang="en-US" dirty="0"/>
-              <a:t>利用上面的圖來解釋 </a:t>
-            </a:r>
+              <a:rPr lang="en-US" altLang="zh-TW" dirty="0"/>
+              <a:t>“</a:t>
+            </a:r>
+            <a:r>
+              <a:rPr lang="zh-TW" altLang="en-US" dirty="0">
+                <a:solidFill>
+                  <a:srgbClr val="FF0000"/>
+                </a:solidFill>
+              </a:rPr>
+              <a:t>如何將類比的敘述轉換成數位的方程式</a:t>
+            </a:r>
+            <a:r>
+              <a:rPr lang="en-US" altLang="zh-TW" dirty="0">
+                <a:solidFill>
+                  <a:srgbClr val="FF0000"/>
+                </a:solidFill>
+              </a:rPr>
+              <a:t>”</a:t>
+            </a:r>
+          </a:p>
+          <a:p>
             <a:r>
               <a:rPr lang="en-US" altLang="zh-TW" dirty="0"/>
               <a:t>Code </a:t>
@@ -3013,6 +3031,326 @@
           <a:bodyPr/>
           <a:lstStyle/>
           <a:p>
+            <a:r>
+              <a:rPr lang="zh-TW" altLang="en-US" dirty="0"/>
+              <a:t>解釋 </a:t>
+            </a:r>
+            <a:endParaRPr lang="en-US" altLang="zh-TW" dirty="0"/>
+          </a:p>
+          <a:p>
+            <a:pPr marL="228600" indent="-228600">
+              <a:buAutoNum type="arabicPeriod"/>
+            </a:pPr>
+            <a:r>
+              <a:rPr lang="zh-TW" altLang="en-US" dirty="0"/>
+              <a:t>第一排 </a:t>
+            </a:r>
+            <a:r>
+              <a:rPr lang="en-US" altLang="zh-TW" dirty="0"/>
+              <a:t>:</a:t>
+            </a:r>
+            <a:r>
+              <a:rPr lang="zh-TW" altLang="en-US" dirty="0"/>
+              <a:t> </a:t>
+            </a:r>
+            <a:r>
+              <a:rPr lang="en-US" altLang="zh-TW" dirty="0"/>
+              <a:t>Rising  </a:t>
+            </a:r>
+            <a:r>
+              <a:rPr lang="en-US" altLang="zh-TW" dirty="0" err="1"/>
+              <a:t>Idx</a:t>
+            </a:r>
+            <a:r>
+              <a:rPr lang="en-US" altLang="zh-TW" dirty="0"/>
+              <a:t>  (</a:t>
+            </a:r>
+            <a:r>
+              <a:rPr lang="zh-TW" altLang="en-US" dirty="0"/>
+              <a:t>上一頁滿足</a:t>
+            </a:r>
+            <a:r>
+              <a:rPr lang="en-US" altLang="zh-TW" dirty="0"/>
+              <a:t>Cond1</a:t>
+            </a:r>
+            <a:r>
+              <a:rPr lang="zh-TW" altLang="en-US" dirty="0"/>
+              <a:t>該不等式的點</a:t>
+            </a:r>
+            <a:r>
+              <a:rPr lang="en-US" altLang="zh-TW" dirty="0"/>
+              <a:t>)</a:t>
+            </a:r>
+          </a:p>
+          <a:p>
+            <a:pPr marL="228600" marR="0" lvl="0" indent="-228600" algn="l" defTabSz="914400" rtl="0" eaLnBrk="1" fontAlgn="auto" latinLnBrk="0" hangingPunct="1">
+              <a:lnSpc>
+                <a:spcPct val="100000"/>
+              </a:lnSpc>
+              <a:spcBef>
+                <a:spcPts val="0"/>
+              </a:spcBef>
+              <a:spcAft>
+                <a:spcPts val="0"/>
+              </a:spcAft>
+              <a:buClrTx/>
+              <a:buSzTx/>
+              <a:buFontTx/>
+              <a:buAutoNum type="arabicPeriod"/>
+              <a:tabLst/>
+              <a:defRPr/>
+            </a:pPr>
+            <a:r>
+              <a:rPr lang="zh-TW" altLang="en-US" dirty="0"/>
+              <a:t>第二排 </a:t>
+            </a:r>
+            <a:r>
+              <a:rPr lang="en-US" altLang="zh-TW" dirty="0"/>
+              <a:t>:</a:t>
+            </a:r>
+            <a:r>
+              <a:rPr lang="zh-TW" altLang="en-US" dirty="0"/>
+              <a:t> </a:t>
+            </a:r>
+            <a:r>
+              <a:rPr lang="en-US" altLang="zh-TW" dirty="0"/>
+              <a:t>Falling </a:t>
+            </a:r>
+            <a:r>
+              <a:rPr lang="en-US" altLang="zh-TW" dirty="0" err="1"/>
+              <a:t>Idx</a:t>
+            </a:r>
+            <a:r>
+              <a:rPr lang="zh-TW" altLang="en-US" dirty="0"/>
+              <a:t>  </a:t>
+            </a:r>
+            <a:r>
+              <a:rPr lang="en-US" altLang="zh-TW" dirty="0"/>
+              <a:t>(</a:t>
+            </a:r>
+            <a:r>
+              <a:rPr lang="zh-TW" altLang="en-US" dirty="0"/>
+              <a:t>上一頁滿足</a:t>
+            </a:r>
+            <a:r>
+              <a:rPr lang="en-US" altLang="zh-TW" dirty="0"/>
+              <a:t>Cond1</a:t>
+            </a:r>
+            <a:r>
+              <a:rPr lang="zh-TW" altLang="en-US" dirty="0"/>
+              <a:t>該不等式的點</a:t>
+            </a:r>
+            <a:r>
+              <a:rPr lang="en-US" altLang="zh-TW" dirty="0"/>
+              <a:t>)</a:t>
+            </a:r>
+          </a:p>
+          <a:p>
+            <a:pPr marL="228600" marR="0" lvl="0" indent="-228600" algn="l" defTabSz="914400" rtl="0" eaLnBrk="1" fontAlgn="auto" latinLnBrk="0" hangingPunct="1">
+              <a:lnSpc>
+                <a:spcPct val="100000"/>
+              </a:lnSpc>
+              <a:spcBef>
+                <a:spcPts val="0"/>
+              </a:spcBef>
+              <a:spcAft>
+                <a:spcPts val="0"/>
+              </a:spcAft>
+              <a:buClrTx/>
+              <a:buSzTx/>
+              <a:buFontTx/>
+              <a:buAutoNum type="arabicPeriod"/>
+              <a:tabLst/>
+              <a:defRPr/>
+            </a:pPr>
+            <a:r>
+              <a:rPr lang="en-US" altLang="zh-TW" dirty="0"/>
+              <a:t>Sampling</a:t>
+            </a:r>
+            <a:r>
+              <a:rPr lang="zh-TW" altLang="en-US" dirty="0"/>
+              <a:t>的所有</a:t>
+            </a:r>
+            <a:r>
+              <a:rPr lang="en-US" altLang="zh-TW" dirty="0"/>
+              <a:t>Timing </a:t>
+            </a:r>
+          </a:p>
+          <a:p>
+            <a:pPr marL="228600" marR="0" lvl="0" indent="-228600" algn="l" defTabSz="914400" rtl="0" eaLnBrk="1" fontAlgn="auto" latinLnBrk="0" hangingPunct="1">
+              <a:lnSpc>
+                <a:spcPct val="100000"/>
+              </a:lnSpc>
+              <a:spcBef>
+                <a:spcPts val="0"/>
+              </a:spcBef>
+              <a:spcAft>
+                <a:spcPts val="0"/>
+              </a:spcAft>
+              <a:buClrTx/>
+              <a:buSzTx/>
+              <a:buFontTx/>
+              <a:buAutoNum type="arabicPeriod"/>
+              <a:tabLst/>
+              <a:defRPr/>
+            </a:pPr>
+            <a:r>
+              <a:rPr lang="zh-TW" altLang="en-US" dirty="0"/>
+              <a:t>透過</a:t>
+            </a:r>
+            <a:r>
+              <a:rPr lang="en-US" altLang="zh-TW" dirty="0"/>
+              <a:t>1,2 </a:t>
+            </a:r>
+            <a:r>
+              <a:rPr lang="zh-TW" altLang="en-US" dirty="0"/>
+              <a:t>兩排對處理後的訊號</a:t>
+            </a:r>
+            <a:r>
+              <a:rPr lang="en-US" altLang="zh-TW" dirty="0"/>
+              <a:t>Sample</a:t>
+            </a:r>
+            <a:r>
+              <a:rPr lang="zh-TW" altLang="en-US" dirty="0"/>
+              <a:t>結果</a:t>
+            </a:r>
+            <a:endParaRPr lang="en-US" altLang="zh-TW" dirty="0"/>
+          </a:p>
+          <a:p>
+            <a:pPr marL="228600" marR="0" lvl="0" indent="-228600" algn="l" defTabSz="914400" rtl="0" eaLnBrk="1" fontAlgn="auto" latinLnBrk="0" hangingPunct="1">
+              <a:lnSpc>
+                <a:spcPct val="100000"/>
+              </a:lnSpc>
+              <a:spcBef>
+                <a:spcPts val="0"/>
+              </a:spcBef>
+              <a:spcAft>
+                <a:spcPts val="0"/>
+              </a:spcAft>
+              <a:buClrTx/>
+              <a:buSzTx/>
+              <a:buFontTx/>
+              <a:buAutoNum type="arabicPeriod"/>
+              <a:tabLst/>
+              <a:defRPr/>
+            </a:pPr>
+            <a:endParaRPr lang="en-US" altLang="zh-TW" dirty="0"/>
+          </a:p>
+          <a:p>
+            <a:pPr marL="0" marR="0" lvl="0" indent="0" algn="l" defTabSz="914400" rtl="0" eaLnBrk="1" fontAlgn="auto" latinLnBrk="0" hangingPunct="1">
+              <a:lnSpc>
+                <a:spcPct val="100000"/>
+              </a:lnSpc>
+              <a:spcBef>
+                <a:spcPts val="0"/>
+              </a:spcBef>
+              <a:spcAft>
+                <a:spcPts val="0"/>
+              </a:spcAft>
+              <a:buClrTx/>
+              <a:buSzTx/>
+              <a:buFontTx/>
+              <a:buNone/>
+              <a:tabLst/>
+              <a:defRPr/>
+            </a:pPr>
+            <a:r>
+              <a:rPr lang="zh-TW" altLang="en-US" dirty="0"/>
+              <a:t>以下解釋如何得到</a:t>
+            </a:r>
+            <a:r>
+              <a:rPr lang="en-US" altLang="zh-TW" dirty="0"/>
+              <a:t>4</a:t>
+            </a:r>
+          </a:p>
+          <a:p>
+            <a:pPr marL="228600" indent="-228600">
+              <a:buAutoNum type="arabicPeriod"/>
+            </a:pPr>
+            <a:endParaRPr lang="zh-TW" altLang="en-US" dirty="0"/>
+          </a:p>
+        </p:txBody>
+      </p:sp>
+      <p:sp>
+        <p:nvSpPr>
+          <p:cNvPr id="4" name="投影片編號版面配置區 3"/>
+          <p:cNvSpPr>
+            <a:spLocks noGrp="1"/>
+          </p:cNvSpPr>
+          <p:nvPr>
+            <p:ph type="sldNum" sz="quarter" idx="5"/>
+          </p:nvPr>
+        </p:nvSpPr>
+        <p:spPr/>
+        <p:txBody>
+          <a:bodyPr/>
+          <a:lstStyle/>
+          <a:p>
+            <a:fld id="{0116F853-F7F2-4239-A629-A213C1D67574}" type="slidenum">
+              <a:rPr lang="zh-TW" altLang="en-US" smtClean="0"/>
+              <a:t>38</a:t>
+            </a:fld>
+            <a:endParaRPr lang="zh-TW" altLang="en-US"/>
+          </a:p>
+        </p:txBody>
+      </p:sp>
+    </p:spTree>
+    <p:extLst>
+      <p:ext uri="{BB962C8B-B14F-4D97-AF65-F5344CB8AC3E}">
+        <p14:creationId xmlns:p14="http://schemas.microsoft.com/office/powerpoint/2010/main" val="192923879"/>
+      </p:ext>
+    </p:extLst>
+  </p:cSld>
+  <p:clrMapOvr>
+    <a:masterClrMapping/>
+  </p:clrMapOvr>
+</p:notes>
+</file>
+
+<file path=ppt/notesSlides/notesSlide25.xml><?xml version="1.0" encoding="utf-8"?>
+<p:notes xmlns:a="http://schemas.openxmlformats.org/drawingml/2006/main" xmlns:r="http://schemas.openxmlformats.org/officeDocument/2006/relationships" xmlns:p="http://schemas.openxmlformats.org/presentationml/2006/main">
+  <p:cSld>
+    <p:spTree>
+      <p:nvGrpSpPr>
+        <p:cNvPr id="1" name=""/>
+        <p:cNvGrpSpPr/>
+        <p:nvPr/>
+      </p:nvGrpSpPr>
+      <p:grpSpPr>
+        <a:xfrm>
+          <a:off x="0" y="0"/>
+          <a:ext cx="0" cy="0"/>
+          <a:chOff x="0" y="0"/>
+          <a:chExt cx="0" cy="0"/>
+        </a:xfrm>
+      </p:grpSpPr>
+      <p:sp>
+        <p:nvSpPr>
+          <p:cNvPr id="2" name="投影片影像版面配置區 1"/>
+          <p:cNvSpPr>
+            <a:spLocks noGrp="1" noRot="1" noChangeAspect="1"/>
+          </p:cNvSpPr>
+          <p:nvPr>
+            <p:ph type="sldImg"/>
+          </p:nvPr>
+        </p:nvSpPr>
+        <p:spPr/>
+      </p:sp>
+      <p:sp>
+        <p:nvSpPr>
+          <p:cNvPr id="3" name="備忘稿版面配置區 2"/>
+          <p:cNvSpPr>
+            <a:spLocks noGrp="1"/>
+          </p:cNvSpPr>
+          <p:nvPr>
+            <p:ph type="body" idx="1"/>
+          </p:nvPr>
+        </p:nvSpPr>
+        <p:spPr/>
+        <p:txBody>
+          <a:bodyPr/>
+          <a:lstStyle/>
+          <a:p>
             <a:endParaRPr lang="zh-TW" altLang="en-US"/>
           </a:p>
         </p:txBody>
@@ -3053,7 +3391,7 @@
 </p:notes>
 </file>
 
-<file path=ppt/notesSlides/notesSlide25.xml><?xml version="1.0" encoding="utf-8"?>
+<file path=ppt/notesSlides/notesSlide26.xml><?xml version="1.0" encoding="utf-8"?>
 <p:notes xmlns:a="http://schemas.openxmlformats.org/drawingml/2006/main" xmlns:r="http://schemas.openxmlformats.org/officeDocument/2006/relationships" xmlns:p="http://schemas.openxmlformats.org/presentationml/2006/main">
   <p:cSld>
     <p:spTree>
@@ -4334,7 +4672,7 @@
           <a:p>
             <a:fld id="{8A9F4CB5-1750-4E23-A13C-2C1F028F9724}" type="datetimeFigureOut">
               <a:rPr lang="zh-TW" altLang="en-US" smtClean="0"/>
-              <a:t>2023/2/8</a:t>
+              <a:t>2023/2/9</a:t>
             </a:fld>
             <a:endParaRPr lang="zh-TW" altLang="en-US"/>
           </a:p>
@@ -4532,7 +4870,7 @@
           <a:p>
             <a:fld id="{8A9F4CB5-1750-4E23-A13C-2C1F028F9724}" type="datetimeFigureOut">
               <a:rPr lang="zh-TW" altLang="en-US" smtClean="0"/>
-              <a:t>2023/2/8</a:t>
+              <a:t>2023/2/9</a:t>
             </a:fld>
             <a:endParaRPr lang="zh-TW" altLang="en-US"/>
           </a:p>
@@ -4740,7 +5078,7 @@
           <a:p>
             <a:fld id="{8A9F4CB5-1750-4E23-A13C-2C1F028F9724}" type="datetimeFigureOut">
               <a:rPr lang="zh-TW" altLang="en-US" smtClean="0"/>
-              <a:t>2023/2/8</a:t>
+              <a:t>2023/2/9</a:t>
             </a:fld>
             <a:endParaRPr lang="zh-TW" altLang="en-US"/>
           </a:p>
@@ -4938,7 +5276,7 @@
           <a:p>
             <a:fld id="{8A9F4CB5-1750-4E23-A13C-2C1F028F9724}" type="datetimeFigureOut">
               <a:rPr lang="zh-TW" altLang="en-US" smtClean="0"/>
-              <a:t>2023/2/8</a:t>
+              <a:t>2023/2/9</a:t>
             </a:fld>
             <a:endParaRPr lang="zh-TW" altLang="en-US"/>
           </a:p>
@@ -5213,7 +5551,7 @@
           <a:p>
             <a:fld id="{8A9F4CB5-1750-4E23-A13C-2C1F028F9724}" type="datetimeFigureOut">
               <a:rPr lang="zh-TW" altLang="en-US" smtClean="0"/>
-              <a:t>2023/2/8</a:t>
+              <a:t>2023/2/9</a:t>
             </a:fld>
             <a:endParaRPr lang="zh-TW" altLang="en-US"/>
           </a:p>
@@ -5478,7 +5816,7 @@
           <a:p>
             <a:fld id="{8A9F4CB5-1750-4E23-A13C-2C1F028F9724}" type="datetimeFigureOut">
               <a:rPr lang="zh-TW" altLang="en-US" smtClean="0"/>
-              <a:t>2023/2/8</a:t>
+              <a:t>2023/2/9</a:t>
             </a:fld>
             <a:endParaRPr lang="zh-TW" altLang="en-US"/>
           </a:p>
@@ -5890,7 +6228,7 @@
           <a:p>
             <a:fld id="{8A9F4CB5-1750-4E23-A13C-2C1F028F9724}" type="datetimeFigureOut">
               <a:rPr lang="zh-TW" altLang="en-US" smtClean="0"/>
-              <a:t>2023/2/8</a:t>
+              <a:t>2023/2/9</a:t>
             </a:fld>
             <a:endParaRPr lang="zh-TW" altLang="en-US"/>
           </a:p>
@@ -6031,7 +6369,7 @@
           <a:p>
             <a:fld id="{8A9F4CB5-1750-4E23-A13C-2C1F028F9724}" type="datetimeFigureOut">
               <a:rPr lang="zh-TW" altLang="en-US" smtClean="0"/>
-              <a:t>2023/2/8</a:t>
+              <a:t>2023/2/9</a:t>
             </a:fld>
             <a:endParaRPr lang="zh-TW" altLang="en-US"/>
           </a:p>
@@ -6144,7 +6482,7 @@
           <a:p>
             <a:fld id="{8A9F4CB5-1750-4E23-A13C-2C1F028F9724}" type="datetimeFigureOut">
               <a:rPr lang="zh-TW" altLang="en-US" smtClean="0"/>
-              <a:t>2023/2/8</a:t>
+              <a:t>2023/2/9</a:t>
             </a:fld>
             <a:endParaRPr lang="zh-TW" altLang="en-US"/>
           </a:p>
@@ -6455,7 +6793,7 @@
           <a:p>
             <a:fld id="{8A9F4CB5-1750-4E23-A13C-2C1F028F9724}" type="datetimeFigureOut">
               <a:rPr lang="zh-TW" altLang="en-US" smtClean="0"/>
-              <a:t>2023/2/8</a:t>
+              <a:t>2023/2/9</a:t>
             </a:fld>
             <a:endParaRPr lang="zh-TW" altLang="en-US"/>
           </a:p>
@@ -6743,7 +7081,7 @@
           <a:p>
             <a:fld id="{8A9F4CB5-1750-4E23-A13C-2C1F028F9724}" type="datetimeFigureOut">
               <a:rPr lang="zh-TW" altLang="en-US" smtClean="0"/>
-              <a:t>2023/2/8</a:t>
+              <a:t>2023/2/9</a:t>
             </a:fld>
             <a:endParaRPr lang="zh-TW" altLang="en-US"/>
           </a:p>
@@ -6984,7 +7322,7 @@
           <a:p>
             <a:fld id="{8A9F4CB5-1750-4E23-A13C-2C1F028F9724}" type="datetimeFigureOut">
               <a:rPr lang="zh-TW" altLang="en-US" smtClean="0"/>
-              <a:t>2023/2/8</a:t>
+              <a:t>2023/2/9</a:t>
             </a:fld>
             <a:endParaRPr lang="zh-TW" altLang="en-US"/>
           </a:p>
@@ -16506,27 +16844,39 @@
               </a:rPr>
               <a:t> 系統</a:t>
             </a:r>
-            <a:endParaRPr lang="en-US" altLang="zh-TW" sz="2000" dirty="0">
-              <a:hlinkClick r:id="rId3" action="ppaction://hlinksldjump"/>
-            </a:endParaRPr>
+            <a:endParaRPr lang="en-US" altLang="zh-TW" sz="2000" dirty="0"/>
           </a:p>
           <a:p>
             <a:pPr marL="457200" indent="-457200">
               <a:buAutoNum type="arabicPeriod"/>
             </a:pPr>
-            <a:endParaRPr lang="en-US" altLang="zh-TW" sz="2000" dirty="0">
-              <a:hlinkClick r:id="rId3" action="ppaction://hlinksldjump"/>
-            </a:endParaRPr>
+            <a:endParaRPr lang="en-US" altLang="zh-TW" sz="2000" dirty="0"/>
           </a:p>
           <a:p>
             <a:pPr marL="457200" indent="-457200">
               <a:buAutoNum type="arabicPeriod"/>
             </a:pPr>
             <a:r>
+              <a:rPr lang="zh-TW" altLang="en-US" sz="2000" dirty="0"/>
+              <a:t> </a:t>
+            </a:r>
+            <a:r>
               <a:rPr lang="zh-TW" altLang="en-US" sz="2000" dirty="0">
-                <a:hlinkClick r:id="rId3" action="ppaction://hlinksldjump"/>
+                <a:hlinkClick r:id="rId4" action="ppaction://hlinksldjump"/>
               </a:rPr>
-              <a:t> </a:t>
+              <a:t>利用</a:t>
+            </a:r>
+            <a:r>
+              <a:rPr lang="en-US" altLang="zh-TW" sz="2000" dirty="0" err="1">
+                <a:hlinkClick r:id="rId4" action="ppaction://hlinksldjump"/>
+              </a:rPr>
+              <a:t>matlab</a:t>
+            </a:r>
+            <a:r>
+              <a:rPr lang="zh-TW" altLang="en-US" sz="2000" dirty="0">
+                <a:hlinkClick r:id="rId4" action="ppaction://hlinksldjump"/>
+              </a:rPr>
+              <a:t>建構 數位架構</a:t>
             </a:r>
             <a:endParaRPr lang="zh-TW" altLang="en-US" sz="2000" dirty="0"/>
           </a:p>
@@ -21072,8 +21422,8 @@
           </a:p>
         </p:txBody>
       </p:sp>
-      <mc:AlternateContent xmlns:mc="http://schemas.openxmlformats.org/markup-compatibility/2006">
-        <mc:Choice xmlns:a14="http://schemas.microsoft.com/office/drawing/2010/main" Requires="a14">
+      <mc:AlternateContent xmlns:mc="http://schemas.openxmlformats.org/markup-compatibility/2006" xmlns:a14="http://schemas.microsoft.com/office/drawing/2010/main">
+        <mc:Choice Requires="a14">
           <p:sp>
             <p:nvSpPr>
               <p:cNvPr id="3" name="內容版面配置區 2">
@@ -21198,7 +21548,7 @@
             </p:txBody>
           </p:sp>
         </mc:Choice>
-        <mc:Fallback>
+        <mc:Fallback xmlns="">
           <p:sp>
             <p:nvSpPr>
               <p:cNvPr id="3" name="內容版面配置區 2">
@@ -21238,8 +21588,8 @@
           </p:sp>
         </mc:Fallback>
       </mc:AlternateContent>
-      <mc:AlternateContent xmlns:mc="http://schemas.openxmlformats.org/markup-compatibility/2006">
-        <mc:Choice xmlns:a14="http://schemas.microsoft.com/office/drawing/2010/main" Requires="a14">
+      <mc:AlternateContent xmlns:mc="http://schemas.openxmlformats.org/markup-compatibility/2006" xmlns:a14="http://schemas.microsoft.com/office/drawing/2010/main">
+        <mc:Choice Requires="a14">
           <p:sp>
             <p:nvSpPr>
               <p:cNvPr id="4" name="文字方塊 3">
@@ -21409,7 +21759,7 @@
             </p:txBody>
           </p:sp>
         </mc:Choice>
-        <mc:Fallback>
+        <mc:Fallback xmlns="">
           <p:sp>
             <p:nvSpPr>
               <p:cNvPr id="4" name="文字方塊 3">
@@ -21504,7 +21854,7 @@
         </p:nvSpPr>
         <p:spPr>
           <a:xfrm>
-            <a:off x="3686355" y="4504588"/>
+            <a:off x="3553046" y="4447498"/>
             <a:ext cx="2296633" cy="369332"/>
           </a:xfrm>
           <a:prstGeom prst="rect">
@@ -21526,8 +21876,8 @@
           </a:p>
         </p:txBody>
       </p:sp>
-      <mc:AlternateContent xmlns:mc="http://schemas.openxmlformats.org/markup-compatibility/2006">
-        <mc:Choice xmlns:a14="http://schemas.microsoft.com/office/drawing/2010/main" Requires="a14">
+      <mc:AlternateContent xmlns:mc="http://schemas.openxmlformats.org/markup-compatibility/2006" xmlns:a14="http://schemas.microsoft.com/office/drawing/2010/main">
+        <mc:Choice Requires="a14">
           <p:sp>
             <p:nvSpPr>
               <p:cNvPr id="11" name="文字方塊 10">
@@ -21697,7 +22047,7 @@
             </p:txBody>
           </p:sp>
         </mc:Choice>
-        <mc:Fallback>
+        <mc:Fallback xmlns="">
           <p:sp>
             <p:nvSpPr>
               <p:cNvPr id="11" name="文字方塊 10">
@@ -21808,7 +22158,7 @@
         </p:nvSpPr>
         <p:spPr>
           <a:xfrm>
-            <a:off x="5255628" y="4488764"/>
+            <a:off x="5286154" y="4521368"/>
             <a:ext cx="1127051" cy="295462"/>
           </a:xfrm>
           <a:prstGeom prst="leftRightArrow">
@@ -21843,6 +22193,58 @@
           <a:p>
             <a:pPr algn="ctr"/>
             <a:endParaRPr lang="zh-TW" altLang="en-US"/>
+          </a:p>
+        </p:txBody>
+      </p:sp>
+      <p:sp>
+        <p:nvSpPr>
+          <p:cNvPr id="9" name="文字方塊 8">
+            <a:extLst>
+              <a:ext uri="{FF2B5EF4-FFF2-40B4-BE49-F238E27FC236}">
+                <a16:creationId xmlns:a16="http://schemas.microsoft.com/office/drawing/2014/main" id="{98E48F5D-921B-D652-0384-544776F71E74}"/>
+              </a:ext>
+            </a:extLst>
+          </p:cNvPr>
+          <p:cNvSpPr txBox="1"/>
+          <p:nvPr/>
+        </p:nvSpPr>
+        <p:spPr>
+          <a:xfrm>
+            <a:off x="2851355" y="5752538"/>
+            <a:ext cx="7885471" cy="369332"/>
+          </a:xfrm>
+          <a:prstGeom prst="rect">
+            <a:avLst/>
+          </a:prstGeom>
+          <a:noFill/>
+        </p:spPr>
+        <p:txBody>
+          <a:bodyPr wrap="square" rtlCol="0">
+            <a:spAutoFit/>
+          </a:bodyPr>
+          <a:lstStyle/>
+          <a:p>
+            <a:r>
+              <a:rPr lang="zh-TW" altLang="en-US" dirty="0"/>
+              <a:t>透過以上兩組 </a:t>
+            </a:r>
+            <a:r>
+              <a:rPr lang="en-US" altLang="zh-TW" dirty="0"/>
+              <a:t>Timing </a:t>
+            </a:r>
+            <a:r>
+              <a:rPr lang="en-US" altLang="zh-TW" dirty="0" err="1"/>
+              <a:t>Idx</a:t>
+            </a:r>
+            <a:r>
+              <a:rPr lang="zh-TW" altLang="en-US" dirty="0"/>
+              <a:t>，下一頁將敘述如何透過這兩組進行 </a:t>
+            </a:r>
+            <a:r>
+              <a:rPr lang="en-US" altLang="zh-TW" dirty="0"/>
+              <a:t>Sample</a:t>
+            </a:r>
+            <a:endParaRPr lang="zh-TW" altLang="en-US" dirty="0"/>
           </a:p>
         </p:txBody>
       </p:sp>
@@ -22038,7 +22440,7 @@
         </p:nvSpPr>
         <p:spPr>
           <a:xfrm>
-            <a:off x="0" y="2395133"/>
+            <a:off x="5904156" y="1647695"/>
             <a:ext cx="1222744" cy="369332"/>
           </a:xfrm>
           <a:prstGeom prst="rect">
@@ -22078,7 +22480,7 @@
         </p:nvSpPr>
         <p:spPr>
           <a:xfrm>
-            <a:off x="0" y="3617512"/>
+            <a:off x="4294669" y="3129135"/>
             <a:ext cx="1222744" cy="369332"/>
           </a:xfrm>
           <a:prstGeom prst="rect">
@@ -23282,6 +23684,2748 @@
           <a:p>
             <a:pPr algn="ctr"/>
             <a:endParaRPr lang="zh-TW" altLang="en-US"/>
+          </a:p>
+        </p:txBody>
+      </p:sp>
+      <p:sp>
+        <p:nvSpPr>
+          <p:cNvPr id="3" name="橢圓 2">
+            <a:extLst>
+              <a:ext uri="{FF2B5EF4-FFF2-40B4-BE49-F238E27FC236}">
+                <a16:creationId xmlns:a16="http://schemas.microsoft.com/office/drawing/2014/main" id="{3AE2E82C-CE1F-C573-3BD5-814BF1B7A9D1}"/>
+              </a:ext>
+            </a:extLst>
+          </p:cNvPr>
+          <p:cNvSpPr/>
+          <p:nvPr/>
+        </p:nvSpPr>
+        <p:spPr>
+          <a:xfrm>
+            <a:off x="1989173" y="3916784"/>
+            <a:ext cx="111643" cy="260492"/>
+          </a:xfrm>
+          <a:prstGeom prst="ellipse">
+            <a:avLst/>
+          </a:prstGeom>
+          <a:solidFill>
+            <a:srgbClr val="FFFF00"/>
+          </a:solidFill>
+        </p:spPr>
+        <p:style>
+          <a:lnRef idx="2">
+            <a:schemeClr val="accent1">
+              <a:shade val="50000"/>
+            </a:schemeClr>
+          </a:lnRef>
+          <a:fillRef idx="1">
+            <a:schemeClr val="accent1"/>
+          </a:fillRef>
+          <a:effectRef idx="0">
+            <a:schemeClr val="accent1"/>
+          </a:effectRef>
+          <a:fontRef idx="minor">
+            <a:schemeClr val="lt1"/>
+          </a:fontRef>
+        </p:style>
+        <p:txBody>
+          <a:bodyPr rtlCol="0" anchor="ctr"/>
+          <a:lstStyle/>
+          <a:p>
+            <a:pPr algn="ctr"/>
+            <a:endParaRPr lang="zh-TW" altLang="en-US"/>
+          </a:p>
+        </p:txBody>
+      </p:sp>
+      <p:sp>
+        <p:nvSpPr>
+          <p:cNvPr id="4" name="橢圓 3">
+            <a:extLst>
+              <a:ext uri="{FF2B5EF4-FFF2-40B4-BE49-F238E27FC236}">
+                <a16:creationId xmlns:a16="http://schemas.microsoft.com/office/drawing/2014/main" id="{7F26D987-220C-6FEA-8B47-6EC1D92DA9EC}"/>
+              </a:ext>
+            </a:extLst>
+          </p:cNvPr>
+          <p:cNvSpPr/>
+          <p:nvPr/>
+        </p:nvSpPr>
+        <p:spPr>
+          <a:xfrm>
+            <a:off x="3556587" y="3934936"/>
+            <a:ext cx="111643" cy="260492"/>
+          </a:xfrm>
+          <a:prstGeom prst="ellipse">
+            <a:avLst/>
+          </a:prstGeom>
+          <a:solidFill>
+            <a:srgbClr val="FFFF00"/>
+          </a:solidFill>
+        </p:spPr>
+        <p:style>
+          <a:lnRef idx="2">
+            <a:schemeClr val="accent1">
+              <a:shade val="50000"/>
+            </a:schemeClr>
+          </a:lnRef>
+          <a:fillRef idx="1">
+            <a:schemeClr val="accent1"/>
+          </a:fillRef>
+          <a:effectRef idx="0">
+            <a:schemeClr val="accent1"/>
+          </a:effectRef>
+          <a:fontRef idx="minor">
+            <a:schemeClr val="lt1"/>
+          </a:fontRef>
+        </p:style>
+        <p:txBody>
+          <a:bodyPr rtlCol="0" anchor="ctr"/>
+          <a:lstStyle/>
+          <a:p>
+            <a:pPr algn="ctr"/>
+            <a:endParaRPr lang="zh-TW" altLang="en-US"/>
+          </a:p>
+        </p:txBody>
+      </p:sp>
+      <p:sp>
+        <p:nvSpPr>
+          <p:cNvPr id="10" name="橢圓 9">
+            <a:extLst>
+              <a:ext uri="{FF2B5EF4-FFF2-40B4-BE49-F238E27FC236}">
+                <a16:creationId xmlns:a16="http://schemas.microsoft.com/office/drawing/2014/main" id="{672063CC-52A1-C315-E54E-1A273E52EB11}"/>
+              </a:ext>
+            </a:extLst>
+          </p:cNvPr>
+          <p:cNvSpPr/>
+          <p:nvPr/>
+        </p:nvSpPr>
+        <p:spPr>
+          <a:xfrm>
+            <a:off x="5984357" y="3910267"/>
+            <a:ext cx="111643" cy="260492"/>
+          </a:xfrm>
+          <a:prstGeom prst="ellipse">
+            <a:avLst/>
+          </a:prstGeom>
+          <a:solidFill>
+            <a:srgbClr val="FFFF00"/>
+          </a:solidFill>
+        </p:spPr>
+        <p:style>
+          <a:lnRef idx="2">
+            <a:schemeClr val="accent1">
+              <a:shade val="50000"/>
+            </a:schemeClr>
+          </a:lnRef>
+          <a:fillRef idx="1">
+            <a:schemeClr val="accent1"/>
+          </a:fillRef>
+          <a:effectRef idx="0">
+            <a:schemeClr val="accent1"/>
+          </a:effectRef>
+          <a:fontRef idx="minor">
+            <a:schemeClr val="lt1"/>
+          </a:fontRef>
+        </p:style>
+        <p:txBody>
+          <a:bodyPr rtlCol="0" anchor="ctr"/>
+          <a:lstStyle/>
+          <a:p>
+            <a:pPr algn="ctr"/>
+            <a:endParaRPr lang="zh-TW" altLang="en-US"/>
+          </a:p>
+        </p:txBody>
+      </p:sp>
+      <p:sp>
+        <p:nvSpPr>
+          <p:cNvPr id="11" name="橢圓 10">
+            <a:extLst>
+              <a:ext uri="{FF2B5EF4-FFF2-40B4-BE49-F238E27FC236}">
+                <a16:creationId xmlns:a16="http://schemas.microsoft.com/office/drawing/2014/main" id="{A1B972E2-61E7-4C4A-3609-6C740F06F840}"/>
+              </a:ext>
+            </a:extLst>
+          </p:cNvPr>
+          <p:cNvSpPr/>
+          <p:nvPr/>
+        </p:nvSpPr>
+        <p:spPr>
+          <a:xfrm>
+            <a:off x="4424912" y="3934936"/>
+            <a:ext cx="111643" cy="260492"/>
+          </a:xfrm>
+          <a:prstGeom prst="ellipse">
+            <a:avLst/>
+          </a:prstGeom>
+          <a:solidFill>
+            <a:srgbClr val="FFFF00"/>
+          </a:solidFill>
+        </p:spPr>
+        <p:style>
+          <a:lnRef idx="2">
+            <a:schemeClr val="accent1">
+              <a:shade val="50000"/>
+            </a:schemeClr>
+          </a:lnRef>
+          <a:fillRef idx="1">
+            <a:schemeClr val="accent1"/>
+          </a:fillRef>
+          <a:effectRef idx="0">
+            <a:schemeClr val="accent1"/>
+          </a:effectRef>
+          <a:fontRef idx="minor">
+            <a:schemeClr val="lt1"/>
+          </a:fontRef>
+        </p:style>
+        <p:txBody>
+          <a:bodyPr rtlCol="0" anchor="ctr"/>
+          <a:lstStyle/>
+          <a:p>
+            <a:pPr algn="ctr"/>
+            <a:endParaRPr lang="zh-TW" altLang="en-US"/>
+          </a:p>
+        </p:txBody>
+      </p:sp>
+      <p:sp>
+        <p:nvSpPr>
+          <p:cNvPr id="12" name="橢圓 11">
+            <a:extLst>
+              <a:ext uri="{FF2B5EF4-FFF2-40B4-BE49-F238E27FC236}">
+                <a16:creationId xmlns:a16="http://schemas.microsoft.com/office/drawing/2014/main" id="{769CFB46-E1F2-A40A-40CA-D7CCBA5BFCB4}"/>
+              </a:ext>
+            </a:extLst>
+          </p:cNvPr>
+          <p:cNvSpPr/>
+          <p:nvPr/>
+        </p:nvSpPr>
+        <p:spPr>
+          <a:xfrm>
+            <a:off x="8879955" y="3949497"/>
+            <a:ext cx="111643" cy="260492"/>
+          </a:xfrm>
+          <a:prstGeom prst="ellipse">
+            <a:avLst/>
+          </a:prstGeom>
+          <a:solidFill>
+            <a:srgbClr val="FFFF00"/>
+          </a:solidFill>
+        </p:spPr>
+        <p:style>
+          <a:lnRef idx="2">
+            <a:schemeClr val="accent1">
+              <a:shade val="50000"/>
+            </a:schemeClr>
+          </a:lnRef>
+          <a:fillRef idx="1">
+            <a:schemeClr val="accent1"/>
+          </a:fillRef>
+          <a:effectRef idx="0">
+            <a:schemeClr val="accent1"/>
+          </a:effectRef>
+          <a:fontRef idx="minor">
+            <a:schemeClr val="lt1"/>
+          </a:fontRef>
+        </p:style>
+        <p:txBody>
+          <a:bodyPr rtlCol="0" anchor="ctr"/>
+          <a:lstStyle/>
+          <a:p>
+            <a:pPr algn="ctr"/>
+            <a:endParaRPr lang="zh-TW" altLang="en-US"/>
+          </a:p>
+        </p:txBody>
+      </p:sp>
+      <p:sp>
+        <p:nvSpPr>
+          <p:cNvPr id="13" name="橢圓 12">
+            <a:extLst>
+              <a:ext uri="{FF2B5EF4-FFF2-40B4-BE49-F238E27FC236}">
+                <a16:creationId xmlns:a16="http://schemas.microsoft.com/office/drawing/2014/main" id="{8B441BC0-D329-5F79-F99C-E92C39E1C2FC}"/>
+              </a:ext>
+            </a:extLst>
+          </p:cNvPr>
+          <p:cNvSpPr/>
+          <p:nvPr/>
+        </p:nvSpPr>
+        <p:spPr>
+          <a:xfrm>
+            <a:off x="10481043" y="3867555"/>
+            <a:ext cx="111643" cy="260492"/>
+          </a:xfrm>
+          <a:prstGeom prst="ellipse">
+            <a:avLst/>
+          </a:prstGeom>
+          <a:solidFill>
+            <a:srgbClr val="FFFF00"/>
+          </a:solidFill>
+        </p:spPr>
+        <p:style>
+          <a:lnRef idx="2">
+            <a:schemeClr val="accent1">
+              <a:shade val="50000"/>
+            </a:schemeClr>
+          </a:lnRef>
+          <a:fillRef idx="1">
+            <a:schemeClr val="accent1"/>
+          </a:fillRef>
+          <a:effectRef idx="0">
+            <a:schemeClr val="accent1"/>
+          </a:effectRef>
+          <a:fontRef idx="minor">
+            <a:schemeClr val="lt1"/>
+          </a:fontRef>
+        </p:style>
+        <p:txBody>
+          <a:bodyPr rtlCol="0" anchor="ctr"/>
+          <a:lstStyle/>
+          <a:p>
+            <a:pPr algn="ctr"/>
+            <a:endParaRPr lang="zh-TW" altLang="en-US"/>
+          </a:p>
+        </p:txBody>
+      </p:sp>
+      <p:cxnSp>
+        <p:nvCxnSpPr>
+          <p:cNvPr id="18" name="直線接點 17">
+            <a:extLst>
+              <a:ext uri="{FF2B5EF4-FFF2-40B4-BE49-F238E27FC236}">
+                <a16:creationId xmlns:a16="http://schemas.microsoft.com/office/drawing/2014/main" id="{8DB91C8B-97D0-478C-A0E2-23ED3FC26A94}"/>
+              </a:ext>
+            </a:extLst>
+          </p:cNvPr>
+          <p:cNvCxnSpPr/>
+          <p:nvPr/>
+        </p:nvCxnSpPr>
+        <p:spPr>
+          <a:xfrm>
+            <a:off x="795671" y="5944948"/>
+            <a:ext cx="0" cy="194930"/>
+          </a:xfrm>
+          <a:prstGeom prst="line">
+            <a:avLst/>
+          </a:prstGeom>
+          <a:ln w="38100"/>
+        </p:spPr>
+        <p:style>
+          <a:lnRef idx="1">
+            <a:schemeClr val="accent1"/>
+          </a:lnRef>
+          <a:fillRef idx="0">
+            <a:schemeClr val="accent1"/>
+          </a:fillRef>
+          <a:effectRef idx="0">
+            <a:schemeClr val="accent1"/>
+          </a:effectRef>
+          <a:fontRef idx="minor">
+            <a:schemeClr val="tx1"/>
+          </a:fontRef>
+        </p:style>
+      </p:cxnSp>
+      <p:cxnSp>
+        <p:nvCxnSpPr>
+          <p:cNvPr id="19" name="直線接點 18">
+            <a:extLst>
+              <a:ext uri="{FF2B5EF4-FFF2-40B4-BE49-F238E27FC236}">
+                <a16:creationId xmlns:a16="http://schemas.microsoft.com/office/drawing/2014/main" id="{938FDD9B-CF15-737F-CD87-21E3A5E129BE}"/>
+              </a:ext>
+            </a:extLst>
+          </p:cNvPr>
+          <p:cNvCxnSpPr/>
+          <p:nvPr/>
+        </p:nvCxnSpPr>
+        <p:spPr>
+          <a:xfrm>
+            <a:off x="771745" y="6146649"/>
+            <a:ext cx="10536865" cy="0"/>
+          </a:xfrm>
+          <a:prstGeom prst="line">
+            <a:avLst/>
+          </a:prstGeom>
+        </p:spPr>
+        <p:style>
+          <a:lnRef idx="1">
+            <a:schemeClr val="accent1"/>
+          </a:lnRef>
+          <a:fillRef idx="0">
+            <a:schemeClr val="accent1"/>
+          </a:fillRef>
+          <a:effectRef idx="0">
+            <a:schemeClr val="accent1"/>
+          </a:effectRef>
+          <a:fontRef idx="minor">
+            <a:schemeClr val="tx1"/>
+          </a:fontRef>
+        </p:style>
+      </p:cxnSp>
+      <p:cxnSp>
+        <p:nvCxnSpPr>
+          <p:cNvPr id="21" name="直線接點 20">
+            <a:extLst>
+              <a:ext uri="{FF2B5EF4-FFF2-40B4-BE49-F238E27FC236}">
+                <a16:creationId xmlns:a16="http://schemas.microsoft.com/office/drawing/2014/main" id="{279BFABD-83B4-0AE0-406B-8BC9F3C64A7C}"/>
+              </a:ext>
+            </a:extLst>
+          </p:cNvPr>
+          <p:cNvCxnSpPr/>
+          <p:nvPr/>
+        </p:nvCxnSpPr>
+        <p:spPr>
+          <a:xfrm>
+            <a:off x="1201480" y="5944948"/>
+            <a:ext cx="0" cy="194930"/>
+          </a:xfrm>
+          <a:prstGeom prst="line">
+            <a:avLst/>
+          </a:prstGeom>
+          <a:ln w="38100"/>
+        </p:spPr>
+        <p:style>
+          <a:lnRef idx="1">
+            <a:schemeClr val="accent1"/>
+          </a:lnRef>
+          <a:fillRef idx="0">
+            <a:schemeClr val="accent1"/>
+          </a:fillRef>
+          <a:effectRef idx="0">
+            <a:schemeClr val="accent1"/>
+          </a:effectRef>
+          <a:fontRef idx="minor">
+            <a:schemeClr val="tx1"/>
+          </a:fontRef>
+        </p:style>
+      </p:cxnSp>
+      <p:cxnSp>
+        <p:nvCxnSpPr>
+          <p:cNvPr id="22" name="直線接點 21">
+            <a:extLst>
+              <a:ext uri="{FF2B5EF4-FFF2-40B4-BE49-F238E27FC236}">
+                <a16:creationId xmlns:a16="http://schemas.microsoft.com/office/drawing/2014/main" id="{B6A6E0DF-3CD7-370F-B76F-A35EEE517218}"/>
+              </a:ext>
+            </a:extLst>
+          </p:cNvPr>
+          <p:cNvCxnSpPr/>
+          <p:nvPr/>
+        </p:nvCxnSpPr>
+        <p:spPr>
+          <a:xfrm>
+            <a:off x="1573620" y="5944948"/>
+            <a:ext cx="0" cy="194930"/>
+          </a:xfrm>
+          <a:prstGeom prst="line">
+            <a:avLst/>
+          </a:prstGeom>
+          <a:ln w="38100"/>
+        </p:spPr>
+        <p:style>
+          <a:lnRef idx="1">
+            <a:schemeClr val="accent1"/>
+          </a:lnRef>
+          <a:fillRef idx="0">
+            <a:schemeClr val="accent1"/>
+          </a:fillRef>
+          <a:effectRef idx="0">
+            <a:schemeClr val="accent1"/>
+          </a:effectRef>
+          <a:fontRef idx="minor">
+            <a:schemeClr val="tx1"/>
+          </a:fontRef>
+        </p:style>
+      </p:cxnSp>
+      <p:cxnSp>
+        <p:nvCxnSpPr>
+          <p:cNvPr id="50" name="直線接點 49">
+            <a:extLst>
+              <a:ext uri="{FF2B5EF4-FFF2-40B4-BE49-F238E27FC236}">
+                <a16:creationId xmlns:a16="http://schemas.microsoft.com/office/drawing/2014/main" id="{065EDB5E-A183-759A-7E22-5ADDCB70E7D5}"/>
+              </a:ext>
+            </a:extLst>
+          </p:cNvPr>
+          <p:cNvCxnSpPr/>
+          <p:nvPr/>
+        </p:nvCxnSpPr>
+        <p:spPr>
+          <a:xfrm>
+            <a:off x="2023731" y="5944948"/>
+            <a:ext cx="0" cy="194930"/>
+          </a:xfrm>
+          <a:prstGeom prst="line">
+            <a:avLst/>
+          </a:prstGeom>
+          <a:ln w="38100"/>
+        </p:spPr>
+        <p:style>
+          <a:lnRef idx="1">
+            <a:schemeClr val="accent1"/>
+          </a:lnRef>
+          <a:fillRef idx="0">
+            <a:schemeClr val="accent1"/>
+          </a:fillRef>
+          <a:effectRef idx="0">
+            <a:schemeClr val="accent1"/>
+          </a:effectRef>
+          <a:fontRef idx="minor">
+            <a:schemeClr val="tx1"/>
+          </a:fontRef>
+        </p:style>
+      </p:cxnSp>
+      <p:cxnSp>
+        <p:nvCxnSpPr>
+          <p:cNvPr id="51" name="直線接點 50">
+            <a:extLst>
+              <a:ext uri="{FF2B5EF4-FFF2-40B4-BE49-F238E27FC236}">
+                <a16:creationId xmlns:a16="http://schemas.microsoft.com/office/drawing/2014/main" id="{1CA1491B-1023-5EF4-CB08-4E4A2254BE40}"/>
+              </a:ext>
+            </a:extLst>
+          </p:cNvPr>
+          <p:cNvCxnSpPr/>
+          <p:nvPr/>
+        </p:nvCxnSpPr>
+        <p:spPr>
+          <a:xfrm>
+            <a:off x="2417136" y="5944948"/>
+            <a:ext cx="0" cy="194930"/>
+          </a:xfrm>
+          <a:prstGeom prst="line">
+            <a:avLst/>
+          </a:prstGeom>
+          <a:ln w="38100"/>
+        </p:spPr>
+        <p:style>
+          <a:lnRef idx="1">
+            <a:schemeClr val="accent1"/>
+          </a:lnRef>
+          <a:fillRef idx="0">
+            <a:schemeClr val="accent1"/>
+          </a:fillRef>
+          <a:effectRef idx="0">
+            <a:schemeClr val="accent1"/>
+          </a:effectRef>
+          <a:fontRef idx="minor">
+            <a:schemeClr val="tx1"/>
+          </a:fontRef>
+        </p:style>
+      </p:cxnSp>
+      <p:cxnSp>
+        <p:nvCxnSpPr>
+          <p:cNvPr id="52" name="直線接點 51">
+            <a:extLst>
+              <a:ext uri="{FF2B5EF4-FFF2-40B4-BE49-F238E27FC236}">
+                <a16:creationId xmlns:a16="http://schemas.microsoft.com/office/drawing/2014/main" id="{59560B76-6CB2-AD1C-7FD9-A56ACEFB6BEE}"/>
+              </a:ext>
+            </a:extLst>
+          </p:cNvPr>
+          <p:cNvCxnSpPr/>
+          <p:nvPr/>
+        </p:nvCxnSpPr>
+        <p:spPr>
+          <a:xfrm>
+            <a:off x="2843322" y="5944948"/>
+            <a:ext cx="0" cy="194930"/>
+          </a:xfrm>
+          <a:prstGeom prst="line">
+            <a:avLst/>
+          </a:prstGeom>
+          <a:ln w="38100"/>
+        </p:spPr>
+        <p:style>
+          <a:lnRef idx="1">
+            <a:schemeClr val="accent1"/>
+          </a:lnRef>
+          <a:fillRef idx="0">
+            <a:schemeClr val="accent1"/>
+          </a:fillRef>
+          <a:effectRef idx="0">
+            <a:schemeClr val="accent1"/>
+          </a:effectRef>
+          <a:fontRef idx="minor">
+            <a:schemeClr val="tx1"/>
+          </a:fontRef>
+        </p:style>
+      </p:cxnSp>
+      <p:cxnSp>
+        <p:nvCxnSpPr>
+          <p:cNvPr id="53" name="直線接點 52">
+            <a:extLst>
+              <a:ext uri="{FF2B5EF4-FFF2-40B4-BE49-F238E27FC236}">
+                <a16:creationId xmlns:a16="http://schemas.microsoft.com/office/drawing/2014/main" id="{B0C805CB-A990-7B7E-8B78-39E63A69FE8C}"/>
+              </a:ext>
+            </a:extLst>
+          </p:cNvPr>
+          <p:cNvCxnSpPr/>
+          <p:nvPr/>
+        </p:nvCxnSpPr>
+        <p:spPr>
+          <a:xfrm>
+            <a:off x="3215461" y="5939413"/>
+            <a:ext cx="0" cy="194930"/>
+          </a:xfrm>
+          <a:prstGeom prst="line">
+            <a:avLst/>
+          </a:prstGeom>
+          <a:ln w="38100"/>
+        </p:spPr>
+        <p:style>
+          <a:lnRef idx="1">
+            <a:schemeClr val="accent1"/>
+          </a:lnRef>
+          <a:fillRef idx="0">
+            <a:schemeClr val="accent1"/>
+          </a:fillRef>
+          <a:effectRef idx="0">
+            <a:schemeClr val="accent1"/>
+          </a:effectRef>
+          <a:fontRef idx="minor">
+            <a:schemeClr val="tx1"/>
+          </a:fontRef>
+        </p:style>
+      </p:cxnSp>
+      <p:cxnSp>
+        <p:nvCxnSpPr>
+          <p:cNvPr id="54" name="直線接點 53">
+            <a:extLst>
+              <a:ext uri="{FF2B5EF4-FFF2-40B4-BE49-F238E27FC236}">
+                <a16:creationId xmlns:a16="http://schemas.microsoft.com/office/drawing/2014/main" id="{482120C0-DE6A-1101-E549-A749168D5B16}"/>
+              </a:ext>
+            </a:extLst>
+          </p:cNvPr>
+          <p:cNvCxnSpPr/>
+          <p:nvPr/>
+        </p:nvCxnSpPr>
+        <p:spPr>
+          <a:xfrm>
+            <a:off x="3591145" y="5947059"/>
+            <a:ext cx="0" cy="194930"/>
+          </a:xfrm>
+          <a:prstGeom prst="line">
+            <a:avLst/>
+          </a:prstGeom>
+          <a:ln w="38100"/>
+        </p:spPr>
+        <p:style>
+          <a:lnRef idx="1">
+            <a:schemeClr val="accent1"/>
+          </a:lnRef>
+          <a:fillRef idx="0">
+            <a:schemeClr val="accent1"/>
+          </a:fillRef>
+          <a:effectRef idx="0">
+            <a:schemeClr val="accent1"/>
+          </a:effectRef>
+          <a:fontRef idx="minor">
+            <a:schemeClr val="tx1"/>
+          </a:fontRef>
+        </p:style>
+      </p:cxnSp>
+      <p:cxnSp>
+        <p:nvCxnSpPr>
+          <p:cNvPr id="55" name="直線接點 54">
+            <a:extLst>
+              <a:ext uri="{FF2B5EF4-FFF2-40B4-BE49-F238E27FC236}">
+                <a16:creationId xmlns:a16="http://schemas.microsoft.com/office/drawing/2014/main" id="{8F351C64-9E94-AF71-578C-833495396642}"/>
+              </a:ext>
+            </a:extLst>
+          </p:cNvPr>
+          <p:cNvCxnSpPr/>
+          <p:nvPr/>
+        </p:nvCxnSpPr>
+        <p:spPr>
+          <a:xfrm>
+            <a:off x="4051889" y="5951719"/>
+            <a:ext cx="0" cy="194930"/>
+          </a:xfrm>
+          <a:prstGeom prst="line">
+            <a:avLst/>
+          </a:prstGeom>
+          <a:ln w="38100"/>
+        </p:spPr>
+        <p:style>
+          <a:lnRef idx="1">
+            <a:schemeClr val="accent1"/>
+          </a:lnRef>
+          <a:fillRef idx="0">
+            <a:schemeClr val="accent1"/>
+          </a:fillRef>
+          <a:effectRef idx="0">
+            <a:schemeClr val="accent1"/>
+          </a:effectRef>
+          <a:fontRef idx="minor">
+            <a:schemeClr val="tx1"/>
+          </a:fontRef>
+        </p:style>
+      </p:cxnSp>
+      <p:cxnSp>
+        <p:nvCxnSpPr>
+          <p:cNvPr id="56" name="直線接點 55">
+            <a:extLst>
+              <a:ext uri="{FF2B5EF4-FFF2-40B4-BE49-F238E27FC236}">
+                <a16:creationId xmlns:a16="http://schemas.microsoft.com/office/drawing/2014/main" id="{0C056F6A-FE74-A7D7-82C6-1F5C6D92FC33}"/>
+              </a:ext>
+            </a:extLst>
+          </p:cNvPr>
+          <p:cNvCxnSpPr/>
+          <p:nvPr/>
+        </p:nvCxnSpPr>
+        <p:spPr>
+          <a:xfrm>
+            <a:off x="4459470" y="5939413"/>
+            <a:ext cx="0" cy="194930"/>
+          </a:xfrm>
+          <a:prstGeom prst="line">
+            <a:avLst/>
+          </a:prstGeom>
+          <a:ln w="38100"/>
+        </p:spPr>
+        <p:style>
+          <a:lnRef idx="1">
+            <a:schemeClr val="accent1"/>
+          </a:lnRef>
+          <a:fillRef idx="0">
+            <a:schemeClr val="accent1"/>
+          </a:fillRef>
+          <a:effectRef idx="0">
+            <a:schemeClr val="accent1"/>
+          </a:effectRef>
+          <a:fontRef idx="minor">
+            <a:schemeClr val="tx1"/>
+          </a:fontRef>
+        </p:style>
+      </p:cxnSp>
+      <p:cxnSp>
+        <p:nvCxnSpPr>
+          <p:cNvPr id="57" name="直線接點 56">
+            <a:extLst>
+              <a:ext uri="{FF2B5EF4-FFF2-40B4-BE49-F238E27FC236}">
+                <a16:creationId xmlns:a16="http://schemas.microsoft.com/office/drawing/2014/main" id="{F8526C4C-656F-29AD-037F-1B493169AD25}"/>
+              </a:ext>
+            </a:extLst>
+          </p:cNvPr>
+          <p:cNvCxnSpPr/>
+          <p:nvPr/>
+        </p:nvCxnSpPr>
+        <p:spPr>
+          <a:xfrm>
+            <a:off x="4835745" y="5939413"/>
+            <a:ext cx="0" cy="194930"/>
+          </a:xfrm>
+          <a:prstGeom prst="line">
+            <a:avLst/>
+          </a:prstGeom>
+          <a:ln w="38100"/>
+        </p:spPr>
+        <p:style>
+          <a:lnRef idx="1">
+            <a:schemeClr val="accent1"/>
+          </a:lnRef>
+          <a:fillRef idx="0">
+            <a:schemeClr val="accent1"/>
+          </a:fillRef>
+          <a:effectRef idx="0">
+            <a:schemeClr val="accent1"/>
+          </a:effectRef>
+          <a:fontRef idx="minor">
+            <a:schemeClr val="tx1"/>
+          </a:fontRef>
+        </p:style>
+      </p:cxnSp>
+      <p:cxnSp>
+        <p:nvCxnSpPr>
+          <p:cNvPr id="58" name="直線接點 57">
+            <a:extLst>
+              <a:ext uri="{FF2B5EF4-FFF2-40B4-BE49-F238E27FC236}">
+                <a16:creationId xmlns:a16="http://schemas.microsoft.com/office/drawing/2014/main" id="{C6F833FD-3BAC-DA15-8E3F-A5A880436A0F}"/>
+              </a:ext>
+            </a:extLst>
+          </p:cNvPr>
+          <p:cNvCxnSpPr/>
+          <p:nvPr/>
+        </p:nvCxnSpPr>
+        <p:spPr>
+          <a:xfrm>
+            <a:off x="5247168" y="5933440"/>
+            <a:ext cx="0" cy="194930"/>
+          </a:xfrm>
+          <a:prstGeom prst="line">
+            <a:avLst/>
+          </a:prstGeom>
+          <a:ln w="38100"/>
+        </p:spPr>
+        <p:style>
+          <a:lnRef idx="1">
+            <a:schemeClr val="accent1"/>
+          </a:lnRef>
+          <a:fillRef idx="0">
+            <a:schemeClr val="accent1"/>
+          </a:fillRef>
+          <a:effectRef idx="0">
+            <a:schemeClr val="accent1"/>
+          </a:effectRef>
+          <a:fontRef idx="minor">
+            <a:schemeClr val="tx1"/>
+          </a:fontRef>
+        </p:style>
+      </p:cxnSp>
+      <p:cxnSp>
+        <p:nvCxnSpPr>
+          <p:cNvPr id="59" name="直線接點 58">
+            <a:extLst>
+              <a:ext uri="{FF2B5EF4-FFF2-40B4-BE49-F238E27FC236}">
+                <a16:creationId xmlns:a16="http://schemas.microsoft.com/office/drawing/2014/main" id="{7A928D9F-1CB5-6934-335C-F98AD772BBF7}"/>
+              </a:ext>
+            </a:extLst>
+          </p:cNvPr>
+          <p:cNvCxnSpPr/>
+          <p:nvPr/>
+        </p:nvCxnSpPr>
+        <p:spPr>
+          <a:xfrm>
+            <a:off x="5654749" y="5951719"/>
+            <a:ext cx="0" cy="194930"/>
+          </a:xfrm>
+          <a:prstGeom prst="line">
+            <a:avLst/>
+          </a:prstGeom>
+          <a:ln w="38100"/>
+        </p:spPr>
+        <p:style>
+          <a:lnRef idx="1">
+            <a:schemeClr val="accent1"/>
+          </a:lnRef>
+          <a:fillRef idx="0">
+            <a:schemeClr val="accent1"/>
+          </a:fillRef>
+          <a:effectRef idx="0">
+            <a:schemeClr val="accent1"/>
+          </a:effectRef>
+          <a:fontRef idx="minor">
+            <a:schemeClr val="tx1"/>
+          </a:fontRef>
+        </p:style>
+      </p:cxnSp>
+      <p:cxnSp>
+        <p:nvCxnSpPr>
+          <p:cNvPr id="60" name="直線接點 59">
+            <a:extLst>
+              <a:ext uri="{FF2B5EF4-FFF2-40B4-BE49-F238E27FC236}">
+                <a16:creationId xmlns:a16="http://schemas.microsoft.com/office/drawing/2014/main" id="{7A771904-A844-F988-F89F-25736827C738}"/>
+              </a:ext>
+            </a:extLst>
+          </p:cNvPr>
+          <p:cNvCxnSpPr/>
+          <p:nvPr/>
+        </p:nvCxnSpPr>
+        <p:spPr>
+          <a:xfrm>
+            <a:off x="6040177" y="5933440"/>
+            <a:ext cx="0" cy="194930"/>
+          </a:xfrm>
+          <a:prstGeom prst="line">
+            <a:avLst/>
+          </a:prstGeom>
+          <a:ln w="38100"/>
+        </p:spPr>
+        <p:style>
+          <a:lnRef idx="1">
+            <a:schemeClr val="accent1"/>
+          </a:lnRef>
+          <a:fillRef idx="0">
+            <a:schemeClr val="accent1"/>
+          </a:fillRef>
+          <a:effectRef idx="0">
+            <a:schemeClr val="accent1"/>
+          </a:effectRef>
+          <a:fontRef idx="minor">
+            <a:schemeClr val="tx1"/>
+          </a:fontRef>
+        </p:style>
+      </p:cxnSp>
+      <p:cxnSp>
+        <p:nvCxnSpPr>
+          <p:cNvPr id="61" name="直線接點 60">
+            <a:extLst>
+              <a:ext uri="{FF2B5EF4-FFF2-40B4-BE49-F238E27FC236}">
+                <a16:creationId xmlns:a16="http://schemas.microsoft.com/office/drawing/2014/main" id="{333CF4ED-F8B6-D571-83A3-FE2B9832E8B0}"/>
+              </a:ext>
+            </a:extLst>
+          </p:cNvPr>
+          <p:cNvCxnSpPr/>
+          <p:nvPr/>
+        </p:nvCxnSpPr>
+        <p:spPr>
+          <a:xfrm>
+            <a:off x="6458391" y="5933440"/>
+            <a:ext cx="0" cy="194930"/>
+          </a:xfrm>
+          <a:prstGeom prst="line">
+            <a:avLst/>
+          </a:prstGeom>
+          <a:ln w="38100"/>
+        </p:spPr>
+        <p:style>
+          <a:lnRef idx="1">
+            <a:schemeClr val="accent1"/>
+          </a:lnRef>
+          <a:fillRef idx="0">
+            <a:schemeClr val="accent1"/>
+          </a:fillRef>
+          <a:effectRef idx="0">
+            <a:schemeClr val="accent1"/>
+          </a:effectRef>
+          <a:fontRef idx="minor">
+            <a:schemeClr val="tx1"/>
+          </a:fontRef>
+        </p:style>
+      </p:cxnSp>
+      <p:cxnSp>
+        <p:nvCxnSpPr>
+          <p:cNvPr id="62" name="直線接點 61">
+            <a:extLst>
+              <a:ext uri="{FF2B5EF4-FFF2-40B4-BE49-F238E27FC236}">
+                <a16:creationId xmlns:a16="http://schemas.microsoft.com/office/drawing/2014/main" id="{6BB72EAA-6FC2-F22D-2459-BFFB8F7E6061}"/>
+              </a:ext>
+            </a:extLst>
+          </p:cNvPr>
+          <p:cNvCxnSpPr/>
+          <p:nvPr/>
+        </p:nvCxnSpPr>
+        <p:spPr>
+          <a:xfrm>
+            <a:off x="6823442" y="5933440"/>
+            <a:ext cx="0" cy="194930"/>
+          </a:xfrm>
+          <a:prstGeom prst="line">
+            <a:avLst/>
+          </a:prstGeom>
+          <a:ln w="38100"/>
+        </p:spPr>
+        <p:style>
+          <a:lnRef idx="1">
+            <a:schemeClr val="accent1"/>
+          </a:lnRef>
+          <a:fillRef idx="0">
+            <a:schemeClr val="accent1"/>
+          </a:fillRef>
+          <a:effectRef idx="0">
+            <a:schemeClr val="accent1"/>
+          </a:effectRef>
+          <a:fontRef idx="minor">
+            <a:schemeClr val="tx1"/>
+          </a:fontRef>
+        </p:style>
+      </p:cxnSp>
+      <p:cxnSp>
+        <p:nvCxnSpPr>
+          <p:cNvPr id="63" name="直線接點 62">
+            <a:extLst>
+              <a:ext uri="{FF2B5EF4-FFF2-40B4-BE49-F238E27FC236}">
+                <a16:creationId xmlns:a16="http://schemas.microsoft.com/office/drawing/2014/main" id="{62CE50B8-73FD-2180-879C-3F9365DAFAB2}"/>
+              </a:ext>
+            </a:extLst>
+          </p:cNvPr>
+          <p:cNvCxnSpPr/>
+          <p:nvPr/>
+        </p:nvCxnSpPr>
+        <p:spPr>
+          <a:xfrm>
+            <a:off x="7262922" y="5946621"/>
+            <a:ext cx="0" cy="194930"/>
+          </a:xfrm>
+          <a:prstGeom prst="line">
+            <a:avLst/>
+          </a:prstGeom>
+          <a:ln w="38100"/>
+        </p:spPr>
+        <p:style>
+          <a:lnRef idx="1">
+            <a:schemeClr val="accent1"/>
+          </a:lnRef>
+          <a:fillRef idx="0">
+            <a:schemeClr val="accent1"/>
+          </a:fillRef>
+          <a:effectRef idx="0">
+            <a:schemeClr val="accent1"/>
+          </a:effectRef>
+          <a:fontRef idx="minor">
+            <a:schemeClr val="tx1"/>
+          </a:fontRef>
+        </p:style>
+      </p:cxnSp>
+      <p:cxnSp>
+        <p:nvCxnSpPr>
+          <p:cNvPr id="64" name="直線接點 63">
+            <a:extLst>
+              <a:ext uri="{FF2B5EF4-FFF2-40B4-BE49-F238E27FC236}">
+                <a16:creationId xmlns:a16="http://schemas.microsoft.com/office/drawing/2014/main" id="{549F988A-CCA3-F291-16AA-EF4C7FAF45A7}"/>
+              </a:ext>
+            </a:extLst>
+          </p:cNvPr>
+          <p:cNvCxnSpPr/>
+          <p:nvPr/>
+        </p:nvCxnSpPr>
+        <p:spPr>
+          <a:xfrm>
+            <a:off x="7681136" y="5951719"/>
+            <a:ext cx="0" cy="194930"/>
+          </a:xfrm>
+          <a:prstGeom prst="line">
+            <a:avLst/>
+          </a:prstGeom>
+          <a:ln w="38100"/>
+        </p:spPr>
+        <p:style>
+          <a:lnRef idx="1">
+            <a:schemeClr val="accent1"/>
+          </a:lnRef>
+          <a:fillRef idx="0">
+            <a:schemeClr val="accent1"/>
+          </a:fillRef>
+          <a:effectRef idx="0">
+            <a:schemeClr val="accent1"/>
+          </a:effectRef>
+          <a:fontRef idx="minor">
+            <a:schemeClr val="tx1"/>
+          </a:fontRef>
+        </p:style>
+      </p:cxnSp>
+      <p:cxnSp>
+        <p:nvCxnSpPr>
+          <p:cNvPr id="65" name="直線接點 64">
+            <a:extLst>
+              <a:ext uri="{FF2B5EF4-FFF2-40B4-BE49-F238E27FC236}">
+                <a16:creationId xmlns:a16="http://schemas.microsoft.com/office/drawing/2014/main" id="{E19ED6FD-1BCE-0071-C2CC-CAA445304201}"/>
+              </a:ext>
+            </a:extLst>
+          </p:cNvPr>
+          <p:cNvCxnSpPr/>
+          <p:nvPr/>
+        </p:nvCxnSpPr>
+        <p:spPr>
+          <a:xfrm>
+            <a:off x="8056820" y="5976429"/>
+            <a:ext cx="0" cy="194930"/>
+          </a:xfrm>
+          <a:prstGeom prst="line">
+            <a:avLst/>
+          </a:prstGeom>
+          <a:ln w="38100"/>
+        </p:spPr>
+        <p:style>
+          <a:lnRef idx="1">
+            <a:schemeClr val="accent1"/>
+          </a:lnRef>
+          <a:fillRef idx="0">
+            <a:schemeClr val="accent1"/>
+          </a:fillRef>
+          <a:effectRef idx="0">
+            <a:schemeClr val="accent1"/>
+          </a:effectRef>
+          <a:fontRef idx="minor">
+            <a:schemeClr val="tx1"/>
+          </a:fontRef>
+        </p:style>
+      </p:cxnSp>
+      <p:cxnSp>
+        <p:nvCxnSpPr>
+          <p:cNvPr id="66" name="直線接點 65">
+            <a:extLst>
+              <a:ext uri="{FF2B5EF4-FFF2-40B4-BE49-F238E27FC236}">
+                <a16:creationId xmlns:a16="http://schemas.microsoft.com/office/drawing/2014/main" id="{4463CA11-86C1-D88D-6E8E-FCD568EAF8DF}"/>
+              </a:ext>
+            </a:extLst>
+          </p:cNvPr>
+          <p:cNvCxnSpPr/>
+          <p:nvPr/>
+        </p:nvCxnSpPr>
+        <p:spPr>
+          <a:xfrm>
+            <a:off x="8506932" y="5946205"/>
+            <a:ext cx="0" cy="194930"/>
+          </a:xfrm>
+          <a:prstGeom prst="line">
+            <a:avLst/>
+          </a:prstGeom>
+          <a:ln w="38100"/>
+        </p:spPr>
+        <p:style>
+          <a:lnRef idx="1">
+            <a:schemeClr val="accent1"/>
+          </a:lnRef>
+          <a:fillRef idx="0">
+            <a:schemeClr val="accent1"/>
+          </a:fillRef>
+          <a:effectRef idx="0">
+            <a:schemeClr val="accent1"/>
+          </a:effectRef>
+          <a:fontRef idx="minor">
+            <a:schemeClr val="tx1"/>
+          </a:fontRef>
+        </p:style>
+      </p:cxnSp>
+      <p:cxnSp>
+        <p:nvCxnSpPr>
+          <p:cNvPr id="67" name="直線接點 66">
+            <a:extLst>
+              <a:ext uri="{FF2B5EF4-FFF2-40B4-BE49-F238E27FC236}">
+                <a16:creationId xmlns:a16="http://schemas.microsoft.com/office/drawing/2014/main" id="{1C367861-C767-F775-31C8-1F1CEFBFB441}"/>
+              </a:ext>
+            </a:extLst>
+          </p:cNvPr>
+          <p:cNvCxnSpPr/>
+          <p:nvPr/>
+        </p:nvCxnSpPr>
+        <p:spPr>
+          <a:xfrm>
+            <a:off x="8914513" y="5959386"/>
+            <a:ext cx="0" cy="194930"/>
+          </a:xfrm>
+          <a:prstGeom prst="line">
+            <a:avLst/>
+          </a:prstGeom>
+          <a:ln w="38100"/>
+        </p:spPr>
+        <p:style>
+          <a:lnRef idx="1">
+            <a:schemeClr val="accent1"/>
+          </a:lnRef>
+          <a:fillRef idx="0">
+            <a:schemeClr val="accent1"/>
+          </a:fillRef>
+          <a:effectRef idx="0">
+            <a:schemeClr val="accent1"/>
+          </a:effectRef>
+          <a:fontRef idx="minor">
+            <a:schemeClr val="tx1"/>
+          </a:fontRef>
+        </p:style>
+      </p:cxnSp>
+      <p:cxnSp>
+        <p:nvCxnSpPr>
+          <p:cNvPr id="68" name="直線接點 67">
+            <a:extLst>
+              <a:ext uri="{FF2B5EF4-FFF2-40B4-BE49-F238E27FC236}">
+                <a16:creationId xmlns:a16="http://schemas.microsoft.com/office/drawing/2014/main" id="{030349BF-7E40-1A41-CF90-7637D8AEF3C5}"/>
+              </a:ext>
+            </a:extLst>
+          </p:cNvPr>
+          <p:cNvCxnSpPr/>
+          <p:nvPr/>
+        </p:nvCxnSpPr>
+        <p:spPr>
+          <a:xfrm>
+            <a:off x="9290197" y="5951719"/>
+            <a:ext cx="0" cy="194930"/>
+          </a:xfrm>
+          <a:prstGeom prst="line">
+            <a:avLst/>
+          </a:prstGeom>
+          <a:ln w="38100"/>
+        </p:spPr>
+        <p:style>
+          <a:lnRef idx="1">
+            <a:schemeClr val="accent1"/>
+          </a:lnRef>
+          <a:fillRef idx="0">
+            <a:schemeClr val="accent1"/>
+          </a:fillRef>
+          <a:effectRef idx="0">
+            <a:schemeClr val="accent1"/>
+          </a:effectRef>
+          <a:fontRef idx="minor">
+            <a:schemeClr val="tx1"/>
+          </a:fontRef>
+        </p:style>
+      </p:cxnSp>
+      <p:cxnSp>
+        <p:nvCxnSpPr>
+          <p:cNvPr id="69" name="直線接點 68">
+            <a:extLst>
+              <a:ext uri="{FF2B5EF4-FFF2-40B4-BE49-F238E27FC236}">
+                <a16:creationId xmlns:a16="http://schemas.microsoft.com/office/drawing/2014/main" id="{F4A93A2F-A7AD-FA62-15D5-F091D2982B62}"/>
+              </a:ext>
+            </a:extLst>
+          </p:cNvPr>
+          <p:cNvCxnSpPr/>
+          <p:nvPr/>
+        </p:nvCxnSpPr>
+        <p:spPr>
+          <a:xfrm>
+            <a:off x="9697779" y="5954268"/>
+            <a:ext cx="0" cy="194930"/>
+          </a:xfrm>
+          <a:prstGeom prst="line">
+            <a:avLst/>
+          </a:prstGeom>
+          <a:ln w="38100"/>
+        </p:spPr>
+        <p:style>
+          <a:lnRef idx="1">
+            <a:schemeClr val="accent1"/>
+          </a:lnRef>
+          <a:fillRef idx="0">
+            <a:schemeClr val="accent1"/>
+          </a:fillRef>
+          <a:effectRef idx="0">
+            <a:schemeClr val="accent1"/>
+          </a:effectRef>
+          <a:fontRef idx="minor">
+            <a:schemeClr val="tx1"/>
+          </a:fontRef>
+        </p:style>
+      </p:cxnSp>
+      <p:cxnSp>
+        <p:nvCxnSpPr>
+          <p:cNvPr id="70" name="直線接點 69">
+            <a:extLst>
+              <a:ext uri="{FF2B5EF4-FFF2-40B4-BE49-F238E27FC236}">
+                <a16:creationId xmlns:a16="http://schemas.microsoft.com/office/drawing/2014/main" id="{94681DE8-9D35-C8DC-5266-2CC648786133}"/>
+              </a:ext>
+            </a:extLst>
+          </p:cNvPr>
+          <p:cNvCxnSpPr/>
+          <p:nvPr/>
+        </p:nvCxnSpPr>
+        <p:spPr>
+          <a:xfrm>
+            <a:off x="10126625" y="5944948"/>
+            <a:ext cx="0" cy="194930"/>
+          </a:xfrm>
+          <a:prstGeom prst="line">
+            <a:avLst/>
+          </a:prstGeom>
+          <a:ln w="38100"/>
+        </p:spPr>
+        <p:style>
+          <a:lnRef idx="1">
+            <a:schemeClr val="accent1"/>
+          </a:lnRef>
+          <a:fillRef idx="0">
+            <a:schemeClr val="accent1"/>
+          </a:fillRef>
+          <a:effectRef idx="0">
+            <a:schemeClr val="accent1"/>
+          </a:effectRef>
+          <a:fontRef idx="minor">
+            <a:schemeClr val="tx1"/>
+          </a:fontRef>
+        </p:style>
+      </p:cxnSp>
+      <p:cxnSp>
+        <p:nvCxnSpPr>
+          <p:cNvPr id="71" name="直線接點 70">
+            <a:extLst>
+              <a:ext uri="{FF2B5EF4-FFF2-40B4-BE49-F238E27FC236}">
+                <a16:creationId xmlns:a16="http://schemas.microsoft.com/office/drawing/2014/main" id="{E5F1994E-09D2-49D6-2C9F-D0BC6FDA2B31}"/>
+              </a:ext>
+            </a:extLst>
+          </p:cNvPr>
+          <p:cNvCxnSpPr/>
+          <p:nvPr/>
+        </p:nvCxnSpPr>
+        <p:spPr>
+          <a:xfrm>
+            <a:off x="10534206" y="5959386"/>
+            <a:ext cx="0" cy="194930"/>
+          </a:xfrm>
+          <a:prstGeom prst="line">
+            <a:avLst/>
+          </a:prstGeom>
+          <a:ln w="38100"/>
+        </p:spPr>
+        <p:style>
+          <a:lnRef idx="1">
+            <a:schemeClr val="accent1"/>
+          </a:lnRef>
+          <a:fillRef idx="0">
+            <a:schemeClr val="accent1"/>
+          </a:fillRef>
+          <a:effectRef idx="0">
+            <a:schemeClr val="accent1"/>
+          </a:effectRef>
+          <a:fontRef idx="minor">
+            <a:schemeClr val="tx1"/>
+          </a:fontRef>
+        </p:style>
+      </p:cxnSp>
+      <p:sp>
+        <p:nvSpPr>
+          <p:cNvPr id="72" name="文字方塊 71">
+            <a:extLst>
+              <a:ext uri="{FF2B5EF4-FFF2-40B4-BE49-F238E27FC236}">
+                <a16:creationId xmlns:a16="http://schemas.microsoft.com/office/drawing/2014/main" id="{7E3DE2F1-F84A-D799-71C2-5AD1027126B8}"/>
+              </a:ext>
+            </a:extLst>
+          </p:cNvPr>
+          <p:cNvSpPr txBox="1"/>
+          <p:nvPr/>
+        </p:nvSpPr>
+        <p:spPr>
+          <a:xfrm>
+            <a:off x="-119448" y="4455453"/>
+            <a:ext cx="2054942" cy="369332"/>
+          </a:xfrm>
+          <a:prstGeom prst="rect">
+            <a:avLst/>
+          </a:prstGeom>
+          <a:noFill/>
+        </p:spPr>
+        <p:txBody>
+          <a:bodyPr wrap="square" rtlCol="0">
+            <a:spAutoFit/>
+          </a:bodyPr>
+          <a:lstStyle/>
+          <a:p>
+            <a:r>
+              <a:rPr lang="en-US" altLang="zh-TW" dirty="0"/>
+              <a:t>Sampling Timing</a:t>
+            </a:r>
+            <a:endParaRPr lang="zh-TW" altLang="en-US" dirty="0"/>
+          </a:p>
+        </p:txBody>
+      </p:sp>
+      <p:sp>
+        <p:nvSpPr>
+          <p:cNvPr id="73" name="橢圓 72">
+            <a:extLst>
+              <a:ext uri="{FF2B5EF4-FFF2-40B4-BE49-F238E27FC236}">
+                <a16:creationId xmlns:a16="http://schemas.microsoft.com/office/drawing/2014/main" id="{561B792F-1FD4-41D6-244F-E9ADC8EFA03C}"/>
+              </a:ext>
+            </a:extLst>
+          </p:cNvPr>
+          <p:cNvSpPr/>
+          <p:nvPr/>
+        </p:nvSpPr>
+        <p:spPr>
+          <a:xfrm>
+            <a:off x="741622" y="5854676"/>
+            <a:ext cx="111643" cy="260492"/>
+          </a:xfrm>
+          <a:prstGeom prst="ellipse">
+            <a:avLst/>
+          </a:prstGeom>
+          <a:solidFill>
+            <a:schemeClr val="accent3">
+              <a:lumMod val="20000"/>
+              <a:lumOff val="80000"/>
+            </a:schemeClr>
+          </a:solidFill>
+        </p:spPr>
+        <p:style>
+          <a:lnRef idx="2">
+            <a:schemeClr val="accent1">
+              <a:shade val="50000"/>
+            </a:schemeClr>
+          </a:lnRef>
+          <a:fillRef idx="1">
+            <a:schemeClr val="accent1"/>
+          </a:fillRef>
+          <a:effectRef idx="0">
+            <a:schemeClr val="accent1"/>
+          </a:effectRef>
+          <a:fontRef idx="minor">
+            <a:schemeClr val="lt1"/>
+          </a:fontRef>
+        </p:style>
+        <p:txBody>
+          <a:bodyPr rtlCol="0" anchor="ctr"/>
+          <a:lstStyle/>
+          <a:p>
+            <a:pPr algn="ctr"/>
+            <a:endParaRPr lang="zh-TW" altLang="en-US"/>
+          </a:p>
+        </p:txBody>
+      </p:sp>
+      <p:sp>
+        <p:nvSpPr>
+          <p:cNvPr id="74" name="橢圓 73">
+            <a:extLst>
+              <a:ext uri="{FF2B5EF4-FFF2-40B4-BE49-F238E27FC236}">
+                <a16:creationId xmlns:a16="http://schemas.microsoft.com/office/drawing/2014/main" id="{6F51BF6D-0149-34DA-5555-81A0F74E48EF}"/>
+              </a:ext>
+            </a:extLst>
+          </p:cNvPr>
+          <p:cNvSpPr/>
+          <p:nvPr/>
+        </p:nvSpPr>
+        <p:spPr>
+          <a:xfrm>
+            <a:off x="1129679" y="5879688"/>
+            <a:ext cx="111643" cy="260492"/>
+          </a:xfrm>
+          <a:prstGeom prst="ellipse">
+            <a:avLst/>
+          </a:prstGeom>
+        </p:spPr>
+        <p:style>
+          <a:lnRef idx="2">
+            <a:schemeClr val="accent1">
+              <a:shade val="50000"/>
+            </a:schemeClr>
+          </a:lnRef>
+          <a:fillRef idx="1">
+            <a:schemeClr val="accent1"/>
+          </a:fillRef>
+          <a:effectRef idx="0">
+            <a:schemeClr val="accent1"/>
+          </a:effectRef>
+          <a:fontRef idx="minor">
+            <a:schemeClr val="lt1"/>
+          </a:fontRef>
+        </p:style>
+        <p:txBody>
+          <a:bodyPr rtlCol="0" anchor="ctr"/>
+          <a:lstStyle/>
+          <a:p>
+            <a:pPr algn="ctr"/>
+            <a:endParaRPr lang="zh-TW" altLang="en-US"/>
+          </a:p>
+        </p:txBody>
+      </p:sp>
+      <p:sp>
+        <p:nvSpPr>
+          <p:cNvPr id="75" name="橢圓 74">
+            <a:extLst>
+              <a:ext uri="{FF2B5EF4-FFF2-40B4-BE49-F238E27FC236}">
+                <a16:creationId xmlns:a16="http://schemas.microsoft.com/office/drawing/2014/main" id="{899EB2B7-D371-64A2-7139-A1E3378A56F8}"/>
+              </a:ext>
+            </a:extLst>
+          </p:cNvPr>
+          <p:cNvSpPr/>
+          <p:nvPr/>
+        </p:nvSpPr>
+        <p:spPr>
+          <a:xfrm>
+            <a:off x="1517736" y="5876837"/>
+            <a:ext cx="111643" cy="260492"/>
+          </a:xfrm>
+          <a:prstGeom prst="ellipse">
+            <a:avLst/>
+          </a:prstGeom>
+        </p:spPr>
+        <p:style>
+          <a:lnRef idx="2">
+            <a:schemeClr val="accent1">
+              <a:shade val="50000"/>
+            </a:schemeClr>
+          </a:lnRef>
+          <a:fillRef idx="1">
+            <a:schemeClr val="accent1"/>
+          </a:fillRef>
+          <a:effectRef idx="0">
+            <a:schemeClr val="accent1"/>
+          </a:effectRef>
+          <a:fontRef idx="minor">
+            <a:schemeClr val="lt1"/>
+          </a:fontRef>
+        </p:style>
+        <p:txBody>
+          <a:bodyPr rtlCol="0" anchor="ctr"/>
+          <a:lstStyle/>
+          <a:p>
+            <a:pPr algn="ctr"/>
+            <a:endParaRPr lang="zh-TW" altLang="en-US"/>
+          </a:p>
+        </p:txBody>
+      </p:sp>
+      <p:sp>
+        <p:nvSpPr>
+          <p:cNvPr id="76" name="橢圓 75">
+            <a:extLst>
+              <a:ext uri="{FF2B5EF4-FFF2-40B4-BE49-F238E27FC236}">
+                <a16:creationId xmlns:a16="http://schemas.microsoft.com/office/drawing/2014/main" id="{C25D1120-4821-42BD-4BA4-6B292E1686A8}"/>
+              </a:ext>
+            </a:extLst>
+          </p:cNvPr>
+          <p:cNvSpPr/>
+          <p:nvPr/>
+        </p:nvSpPr>
+        <p:spPr>
+          <a:xfrm>
+            <a:off x="1935494" y="5878896"/>
+            <a:ext cx="111643" cy="260492"/>
+          </a:xfrm>
+          <a:prstGeom prst="ellipse">
+            <a:avLst/>
+          </a:prstGeom>
+          <a:solidFill>
+            <a:srgbClr val="FFFF00"/>
+          </a:solidFill>
+        </p:spPr>
+        <p:style>
+          <a:lnRef idx="2">
+            <a:schemeClr val="accent1">
+              <a:shade val="50000"/>
+            </a:schemeClr>
+          </a:lnRef>
+          <a:fillRef idx="1">
+            <a:schemeClr val="accent1"/>
+          </a:fillRef>
+          <a:effectRef idx="0">
+            <a:schemeClr val="accent1"/>
+          </a:effectRef>
+          <a:fontRef idx="minor">
+            <a:schemeClr val="lt1"/>
+          </a:fontRef>
+        </p:style>
+        <p:txBody>
+          <a:bodyPr rtlCol="0" anchor="ctr"/>
+          <a:lstStyle/>
+          <a:p>
+            <a:pPr algn="ctr"/>
+            <a:endParaRPr lang="zh-TW" altLang="en-US"/>
+          </a:p>
+        </p:txBody>
+      </p:sp>
+      <p:sp>
+        <p:nvSpPr>
+          <p:cNvPr id="78" name="橢圓 77">
+            <a:extLst>
+              <a:ext uri="{FF2B5EF4-FFF2-40B4-BE49-F238E27FC236}">
+                <a16:creationId xmlns:a16="http://schemas.microsoft.com/office/drawing/2014/main" id="{0E3C6DCE-FFC8-59E1-FECB-B82C7C762446}"/>
+              </a:ext>
+            </a:extLst>
+          </p:cNvPr>
+          <p:cNvSpPr/>
+          <p:nvPr/>
+        </p:nvSpPr>
+        <p:spPr>
+          <a:xfrm>
+            <a:off x="2364414" y="5876837"/>
+            <a:ext cx="111643" cy="260492"/>
+          </a:xfrm>
+          <a:prstGeom prst="ellipse">
+            <a:avLst/>
+          </a:prstGeom>
+        </p:spPr>
+        <p:style>
+          <a:lnRef idx="2">
+            <a:schemeClr val="accent1">
+              <a:shade val="50000"/>
+            </a:schemeClr>
+          </a:lnRef>
+          <a:fillRef idx="1">
+            <a:schemeClr val="accent1"/>
+          </a:fillRef>
+          <a:effectRef idx="0">
+            <a:schemeClr val="accent1"/>
+          </a:effectRef>
+          <a:fontRef idx="minor">
+            <a:schemeClr val="lt1"/>
+          </a:fontRef>
+        </p:style>
+        <p:txBody>
+          <a:bodyPr rtlCol="0" anchor="ctr"/>
+          <a:lstStyle/>
+          <a:p>
+            <a:pPr algn="ctr"/>
+            <a:endParaRPr lang="zh-TW" altLang="en-US"/>
+          </a:p>
+        </p:txBody>
+      </p:sp>
+      <p:sp>
+        <p:nvSpPr>
+          <p:cNvPr id="79" name="橢圓 78">
+            <a:extLst>
+              <a:ext uri="{FF2B5EF4-FFF2-40B4-BE49-F238E27FC236}">
+                <a16:creationId xmlns:a16="http://schemas.microsoft.com/office/drawing/2014/main" id="{A1C6832C-96B4-7F8B-D1C0-4C62C0A09CCC}"/>
+              </a:ext>
+            </a:extLst>
+          </p:cNvPr>
+          <p:cNvSpPr/>
+          <p:nvPr/>
+        </p:nvSpPr>
+        <p:spPr>
+          <a:xfrm>
+            <a:off x="2768008" y="5887057"/>
+            <a:ext cx="111643" cy="260492"/>
+          </a:xfrm>
+          <a:prstGeom prst="ellipse">
+            <a:avLst/>
+          </a:prstGeom>
+        </p:spPr>
+        <p:style>
+          <a:lnRef idx="2">
+            <a:schemeClr val="accent1">
+              <a:shade val="50000"/>
+            </a:schemeClr>
+          </a:lnRef>
+          <a:fillRef idx="1">
+            <a:schemeClr val="accent1"/>
+          </a:fillRef>
+          <a:effectRef idx="0">
+            <a:schemeClr val="accent1"/>
+          </a:effectRef>
+          <a:fontRef idx="minor">
+            <a:schemeClr val="lt1"/>
+          </a:fontRef>
+        </p:style>
+        <p:txBody>
+          <a:bodyPr rtlCol="0" anchor="ctr"/>
+          <a:lstStyle/>
+          <a:p>
+            <a:pPr algn="ctr"/>
+            <a:endParaRPr lang="zh-TW" altLang="en-US"/>
+          </a:p>
+        </p:txBody>
+      </p:sp>
+      <p:sp>
+        <p:nvSpPr>
+          <p:cNvPr id="80" name="橢圓 79">
+            <a:extLst>
+              <a:ext uri="{FF2B5EF4-FFF2-40B4-BE49-F238E27FC236}">
+                <a16:creationId xmlns:a16="http://schemas.microsoft.com/office/drawing/2014/main" id="{00020647-9046-DA23-2BE1-7FD9491512CB}"/>
+              </a:ext>
+            </a:extLst>
+          </p:cNvPr>
+          <p:cNvSpPr/>
+          <p:nvPr/>
+        </p:nvSpPr>
+        <p:spPr>
+          <a:xfrm>
+            <a:off x="3161413" y="5869409"/>
+            <a:ext cx="111643" cy="260492"/>
+          </a:xfrm>
+          <a:prstGeom prst="ellipse">
+            <a:avLst/>
+          </a:prstGeom>
+        </p:spPr>
+        <p:style>
+          <a:lnRef idx="2">
+            <a:schemeClr val="accent1">
+              <a:shade val="50000"/>
+            </a:schemeClr>
+          </a:lnRef>
+          <a:fillRef idx="1">
+            <a:schemeClr val="accent1"/>
+          </a:fillRef>
+          <a:effectRef idx="0">
+            <a:schemeClr val="accent1"/>
+          </a:effectRef>
+          <a:fontRef idx="minor">
+            <a:schemeClr val="lt1"/>
+          </a:fontRef>
+        </p:style>
+        <p:txBody>
+          <a:bodyPr rtlCol="0" anchor="ctr"/>
+          <a:lstStyle/>
+          <a:p>
+            <a:pPr algn="ctr"/>
+            <a:endParaRPr lang="zh-TW" altLang="en-US"/>
+          </a:p>
+        </p:txBody>
+      </p:sp>
+      <p:sp>
+        <p:nvSpPr>
+          <p:cNvPr id="81" name="橢圓 80">
+            <a:extLst>
+              <a:ext uri="{FF2B5EF4-FFF2-40B4-BE49-F238E27FC236}">
+                <a16:creationId xmlns:a16="http://schemas.microsoft.com/office/drawing/2014/main" id="{4A5F027C-6023-FF33-E3E9-39B0077D0052}"/>
+              </a:ext>
+            </a:extLst>
+          </p:cNvPr>
+          <p:cNvSpPr/>
+          <p:nvPr/>
+        </p:nvSpPr>
+        <p:spPr>
+          <a:xfrm>
+            <a:off x="3522031" y="5876837"/>
+            <a:ext cx="111643" cy="260492"/>
+          </a:xfrm>
+          <a:prstGeom prst="ellipse">
+            <a:avLst/>
+          </a:prstGeom>
+          <a:solidFill>
+            <a:srgbClr val="FFFF00"/>
+          </a:solidFill>
+        </p:spPr>
+        <p:style>
+          <a:lnRef idx="2">
+            <a:schemeClr val="accent1">
+              <a:shade val="50000"/>
+            </a:schemeClr>
+          </a:lnRef>
+          <a:fillRef idx="1">
+            <a:schemeClr val="accent1"/>
+          </a:fillRef>
+          <a:effectRef idx="0">
+            <a:schemeClr val="accent1"/>
+          </a:effectRef>
+          <a:fontRef idx="minor">
+            <a:schemeClr val="lt1"/>
+          </a:fontRef>
+        </p:style>
+        <p:txBody>
+          <a:bodyPr rtlCol="0" anchor="ctr"/>
+          <a:lstStyle/>
+          <a:p>
+            <a:pPr algn="ctr"/>
+            <a:endParaRPr lang="zh-TW" altLang="en-US"/>
+          </a:p>
+        </p:txBody>
+      </p:sp>
+      <p:sp>
+        <p:nvSpPr>
+          <p:cNvPr id="82" name="橢圓 81">
+            <a:extLst>
+              <a:ext uri="{FF2B5EF4-FFF2-40B4-BE49-F238E27FC236}">
+                <a16:creationId xmlns:a16="http://schemas.microsoft.com/office/drawing/2014/main" id="{0A66F8A7-D11D-4C84-ECDC-CEC4256E4A15}"/>
+              </a:ext>
+            </a:extLst>
+          </p:cNvPr>
+          <p:cNvSpPr/>
+          <p:nvPr/>
+        </p:nvSpPr>
+        <p:spPr>
+          <a:xfrm>
+            <a:off x="3988997" y="5861447"/>
+            <a:ext cx="111643" cy="260492"/>
+          </a:xfrm>
+          <a:prstGeom prst="ellipse">
+            <a:avLst/>
+          </a:prstGeom>
+          <a:solidFill>
+            <a:srgbClr val="FFFF00"/>
+          </a:solidFill>
+        </p:spPr>
+        <p:style>
+          <a:lnRef idx="2">
+            <a:schemeClr val="accent1">
+              <a:shade val="50000"/>
+            </a:schemeClr>
+          </a:lnRef>
+          <a:fillRef idx="1">
+            <a:schemeClr val="accent1"/>
+          </a:fillRef>
+          <a:effectRef idx="0">
+            <a:schemeClr val="accent1"/>
+          </a:effectRef>
+          <a:fontRef idx="minor">
+            <a:schemeClr val="lt1"/>
+          </a:fontRef>
+        </p:style>
+        <p:txBody>
+          <a:bodyPr rtlCol="0" anchor="ctr"/>
+          <a:lstStyle/>
+          <a:p>
+            <a:pPr algn="ctr"/>
+            <a:endParaRPr lang="zh-TW" altLang="en-US"/>
+          </a:p>
+        </p:txBody>
+      </p:sp>
+      <p:sp>
+        <p:nvSpPr>
+          <p:cNvPr id="83" name="橢圓 82">
+            <a:extLst>
+              <a:ext uri="{FF2B5EF4-FFF2-40B4-BE49-F238E27FC236}">
+                <a16:creationId xmlns:a16="http://schemas.microsoft.com/office/drawing/2014/main" id="{555E46C7-9986-A8B7-CF58-28E18A6C11C5}"/>
+              </a:ext>
+            </a:extLst>
+          </p:cNvPr>
+          <p:cNvSpPr/>
+          <p:nvPr/>
+        </p:nvSpPr>
+        <p:spPr>
+          <a:xfrm>
+            <a:off x="4416498" y="5885929"/>
+            <a:ext cx="111643" cy="260492"/>
+          </a:xfrm>
+          <a:prstGeom prst="ellipse">
+            <a:avLst/>
+          </a:prstGeom>
+          <a:solidFill>
+            <a:srgbClr val="FFFF00"/>
+          </a:solidFill>
+        </p:spPr>
+        <p:style>
+          <a:lnRef idx="2">
+            <a:schemeClr val="accent1">
+              <a:shade val="50000"/>
+            </a:schemeClr>
+          </a:lnRef>
+          <a:fillRef idx="1">
+            <a:schemeClr val="accent1"/>
+          </a:fillRef>
+          <a:effectRef idx="0">
+            <a:schemeClr val="accent1"/>
+          </a:effectRef>
+          <a:fontRef idx="minor">
+            <a:schemeClr val="lt1"/>
+          </a:fontRef>
+        </p:style>
+        <p:txBody>
+          <a:bodyPr rtlCol="0" anchor="ctr"/>
+          <a:lstStyle/>
+          <a:p>
+            <a:pPr algn="ctr"/>
+            <a:endParaRPr lang="zh-TW" altLang="en-US"/>
+          </a:p>
+        </p:txBody>
+      </p:sp>
+      <p:sp>
+        <p:nvSpPr>
+          <p:cNvPr id="84" name="橢圓 83">
+            <a:extLst>
+              <a:ext uri="{FF2B5EF4-FFF2-40B4-BE49-F238E27FC236}">
+                <a16:creationId xmlns:a16="http://schemas.microsoft.com/office/drawing/2014/main" id="{1978C457-EED9-AC21-6A0D-63B5C2039491}"/>
+              </a:ext>
+            </a:extLst>
+          </p:cNvPr>
+          <p:cNvSpPr/>
+          <p:nvPr/>
+        </p:nvSpPr>
+        <p:spPr>
+          <a:xfrm>
+            <a:off x="4794398" y="5870478"/>
+            <a:ext cx="111643" cy="260492"/>
+          </a:xfrm>
+          <a:prstGeom prst="ellipse">
+            <a:avLst/>
+          </a:prstGeom>
+          <a:solidFill>
+            <a:srgbClr val="FFFF00"/>
+          </a:solidFill>
+        </p:spPr>
+        <p:style>
+          <a:lnRef idx="2">
+            <a:schemeClr val="accent1">
+              <a:shade val="50000"/>
+            </a:schemeClr>
+          </a:lnRef>
+          <a:fillRef idx="1">
+            <a:schemeClr val="accent1"/>
+          </a:fillRef>
+          <a:effectRef idx="0">
+            <a:schemeClr val="accent1"/>
+          </a:effectRef>
+          <a:fontRef idx="minor">
+            <a:schemeClr val="lt1"/>
+          </a:fontRef>
+        </p:style>
+        <p:txBody>
+          <a:bodyPr rtlCol="0" anchor="ctr"/>
+          <a:lstStyle/>
+          <a:p>
+            <a:pPr algn="ctr"/>
+            <a:endParaRPr lang="zh-TW" altLang="en-US"/>
+          </a:p>
+        </p:txBody>
+      </p:sp>
+      <p:sp>
+        <p:nvSpPr>
+          <p:cNvPr id="86" name="橢圓 85">
+            <a:extLst>
+              <a:ext uri="{FF2B5EF4-FFF2-40B4-BE49-F238E27FC236}">
+                <a16:creationId xmlns:a16="http://schemas.microsoft.com/office/drawing/2014/main" id="{B5506666-902A-9590-8494-74DAF0D4A156}"/>
+              </a:ext>
+            </a:extLst>
+          </p:cNvPr>
+          <p:cNvSpPr/>
+          <p:nvPr/>
+        </p:nvSpPr>
+        <p:spPr>
+          <a:xfrm>
+            <a:off x="5199762" y="5868777"/>
+            <a:ext cx="111643" cy="260492"/>
+          </a:xfrm>
+          <a:prstGeom prst="ellipse">
+            <a:avLst/>
+          </a:prstGeom>
+        </p:spPr>
+        <p:style>
+          <a:lnRef idx="2">
+            <a:schemeClr val="accent1">
+              <a:shade val="50000"/>
+            </a:schemeClr>
+          </a:lnRef>
+          <a:fillRef idx="1">
+            <a:schemeClr val="accent1"/>
+          </a:fillRef>
+          <a:effectRef idx="0">
+            <a:schemeClr val="accent1"/>
+          </a:effectRef>
+          <a:fontRef idx="minor">
+            <a:schemeClr val="lt1"/>
+          </a:fontRef>
+        </p:style>
+        <p:txBody>
+          <a:bodyPr rtlCol="0" anchor="ctr"/>
+          <a:lstStyle/>
+          <a:p>
+            <a:pPr algn="ctr"/>
+            <a:endParaRPr lang="zh-TW" altLang="en-US"/>
+          </a:p>
+        </p:txBody>
+      </p:sp>
+      <p:sp>
+        <p:nvSpPr>
+          <p:cNvPr id="87" name="橢圓 86">
+            <a:extLst>
+              <a:ext uri="{FF2B5EF4-FFF2-40B4-BE49-F238E27FC236}">
+                <a16:creationId xmlns:a16="http://schemas.microsoft.com/office/drawing/2014/main" id="{6E957C0F-680D-EE95-7944-E530AB1A6CA8}"/>
+              </a:ext>
+            </a:extLst>
+          </p:cNvPr>
+          <p:cNvSpPr/>
+          <p:nvPr/>
+        </p:nvSpPr>
+        <p:spPr>
+          <a:xfrm>
+            <a:off x="5598484" y="5862965"/>
+            <a:ext cx="111643" cy="260492"/>
+          </a:xfrm>
+          <a:prstGeom prst="ellipse">
+            <a:avLst/>
+          </a:prstGeom>
+        </p:spPr>
+        <p:style>
+          <a:lnRef idx="2">
+            <a:schemeClr val="accent1">
+              <a:shade val="50000"/>
+            </a:schemeClr>
+          </a:lnRef>
+          <a:fillRef idx="1">
+            <a:schemeClr val="accent1"/>
+          </a:fillRef>
+          <a:effectRef idx="0">
+            <a:schemeClr val="accent1"/>
+          </a:effectRef>
+          <a:fontRef idx="minor">
+            <a:schemeClr val="lt1"/>
+          </a:fontRef>
+        </p:style>
+        <p:txBody>
+          <a:bodyPr rtlCol="0" anchor="ctr"/>
+          <a:lstStyle/>
+          <a:p>
+            <a:pPr algn="ctr"/>
+            <a:endParaRPr lang="zh-TW" altLang="en-US"/>
+          </a:p>
+        </p:txBody>
+      </p:sp>
+      <p:sp>
+        <p:nvSpPr>
+          <p:cNvPr id="89" name="橢圓 88">
+            <a:extLst>
+              <a:ext uri="{FF2B5EF4-FFF2-40B4-BE49-F238E27FC236}">
+                <a16:creationId xmlns:a16="http://schemas.microsoft.com/office/drawing/2014/main" id="{2E8DD5C3-33D7-7AFC-99FF-0792CD839406}"/>
+              </a:ext>
+            </a:extLst>
+          </p:cNvPr>
+          <p:cNvSpPr/>
+          <p:nvPr/>
+        </p:nvSpPr>
+        <p:spPr>
+          <a:xfrm>
+            <a:off x="5957460" y="5853345"/>
+            <a:ext cx="111643" cy="260492"/>
+          </a:xfrm>
+          <a:prstGeom prst="ellipse">
+            <a:avLst/>
+          </a:prstGeom>
+          <a:solidFill>
+            <a:srgbClr val="FFFF00"/>
+          </a:solidFill>
+        </p:spPr>
+        <p:style>
+          <a:lnRef idx="2">
+            <a:schemeClr val="accent1">
+              <a:shade val="50000"/>
+            </a:schemeClr>
+          </a:lnRef>
+          <a:fillRef idx="1">
+            <a:schemeClr val="accent1"/>
+          </a:fillRef>
+          <a:effectRef idx="0">
+            <a:schemeClr val="accent1"/>
+          </a:effectRef>
+          <a:fontRef idx="minor">
+            <a:schemeClr val="lt1"/>
+          </a:fontRef>
+        </p:style>
+        <p:txBody>
+          <a:bodyPr rtlCol="0" anchor="ctr"/>
+          <a:lstStyle/>
+          <a:p>
+            <a:pPr algn="ctr"/>
+            <a:endParaRPr lang="zh-TW" altLang="en-US"/>
+          </a:p>
+        </p:txBody>
+      </p:sp>
+      <p:sp>
+        <p:nvSpPr>
+          <p:cNvPr id="90" name="橢圓 89">
+            <a:extLst>
+              <a:ext uri="{FF2B5EF4-FFF2-40B4-BE49-F238E27FC236}">
+                <a16:creationId xmlns:a16="http://schemas.microsoft.com/office/drawing/2014/main" id="{6999BC87-4F18-D63C-A610-ABD05A80AE83}"/>
+              </a:ext>
+            </a:extLst>
+          </p:cNvPr>
+          <p:cNvSpPr/>
+          <p:nvPr/>
+        </p:nvSpPr>
+        <p:spPr>
+          <a:xfrm>
+            <a:off x="6403885" y="5877220"/>
+            <a:ext cx="111643" cy="260492"/>
+          </a:xfrm>
+          <a:prstGeom prst="ellipse">
+            <a:avLst/>
+          </a:prstGeom>
+          <a:solidFill>
+            <a:srgbClr val="FFFF00"/>
+          </a:solidFill>
+        </p:spPr>
+        <p:style>
+          <a:lnRef idx="2">
+            <a:schemeClr val="accent1">
+              <a:shade val="50000"/>
+            </a:schemeClr>
+          </a:lnRef>
+          <a:fillRef idx="1">
+            <a:schemeClr val="accent1"/>
+          </a:fillRef>
+          <a:effectRef idx="0">
+            <a:schemeClr val="accent1"/>
+          </a:effectRef>
+          <a:fontRef idx="minor">
+            <a:schemeClr val="lt1"/>
+          </a:fontRef>
+        </p:style>
+        <p:txBody>
+          <a:bodyPr rtlCol="0" anchor="ctr"/>
+          <a:lstStyle/>
+          <a:p>
+            <a:pPr algn="ctr"/>
+            <a:endParaRPr lang="zh-TW" altLang="en-US"/>
+          </a:p>
+        </p:txBody>
+      </p:sp>
+      <p:sp>
+        <p:nvSpPr>
+          <p:cNvPr id="91" name="橢圓 90">
+            <a:extLst>
+              <a:ext uri="{FF2B5EF4-FFF2-40B4-BE49-F238E27FC236}">
+                <a16:creationId xmlns:a16="http://schemas.microsoft.com/office/drawing/2014/main" id="{CA65AA6E-ADB0-036B-C4F3-42F1748A1A6D}"/>
+              </a:ext>
+            </a:extLst>
+          </p:cNvPr>
+          <p:cNvSpPr/>
+          <p:nvPr/>
+        </p:nvSpPr>
+        <p:spPr>
+          <a:xfrm>
+            <a:off x="6774677" y="5853345"/>
+            <a:ext cx="111643" cy="260492"/>
+          </a:xfrm>
+          <a:prstGeom prst="ellipse">
+            <a:avLst/>
+          </a:prstGeom>
+          <a:solidFill>
+            <a:srgbClr val="FFFF00"/>
+          </a:solidFill>
+        </p:spPr>
+        <p:style>
+          <a:lnRef idx="2">
+            <a:schemeClr val="accent1">
+              <a:shade val="50000"/>
+            </a:schemeClr>
+          </a:lnRef>
+          <a:fillRef idx="1">
+            <a:schemeClr val="accent1"/>
+          </a:fillRef>
+          <a:effectRef idx="0">
+            <a:schemeClr val="accent1"/>
+          </a:effectRef>
+          <a:fontRef idx="minor">
+            <a:schemeClr val="lt1"/>
+          </a:fontRef>
+        </p:style>
+        <p:txBody>
+          <a:bodyPr rtlCol="0" anchor="ctr"/>
+          <a:lstStyle/>
+          <a:p>
+            <a:pPr algn="ctr"/>
+            <a:endParaRPr lang="zh-TW" altLang="en-US"/>
+          </a:p>
+        </p:txBody>
+      </p:sp>
+      <p:sp>
+        <p:nvSpPr>
+          <p:cNvPr id="92" name="橢圓 91">
+            <a:extLst>
+              <a:ext uri="{FF2B5EF4-FFF2-40B4-BE49-F238E27FC236}">
+                <a16:creationId xmlns:a16="http://schemas.microsoft.com/office/drawing/2014/main" id="{3BE11FB8-F222-8CEE-FBCD-B021F083F3FD}"/>
+              </a:ext>
+            </a:extLst>
+          </p:cNvPr>
+          <p:cNvSpPr/>
+          <p:nvPr/>
+        </p:nvSpPr>
+        <p:spPr>
+          <a:xfrm>
+            <a:off x="7201787" y="5868099"/>
+            <a:ext cx="111643" cy="260492"/>
+          </a:xfrm>
+          <a:prstGeom prst="ellipse">
+            <a:avLst/>
+          </a:prstGeom>
+          <a:solidFill>
+            <a:srgbClr val="FFFF00"/>
+          </a:solidFill>
+        </p:spPr>
+        <p:style>
+          <a:lnRef idx="2">
+            <a:schemeClr val="accent1">
+              <a:shade val="50000"/>
+            </a:schemeClr>
+          </a:lnRef>
+          <a:fillRef idx="1">
+            <a:schemeClr val="accent1"/>
+          </a:fillRef>
+          <a:effectRef idx="0">
+            <a:schemeClr val="accent1"/>
+          </a:effectRef>
+          <a:fontRef idx="minor">
+            <a:schemeClr val="lt1"/>
+          </a:fontRef>
+        </p:style>
+        <p:txBody>
+          <a:bodyPr rtlCol="0" anchor="ctr"/>
+          <a:lstStyle/>
+          <a:p>
+            <a:pPr algn="ctr"/>
+            <a:endParaRPr lang="zh-TW" altLang="en-US"/>
+          </a:p>
+        </p:txBody>
+      </p:sp>
+      <p:sp>
+        <p:nvSpPr>
+          <p:cNvPr id="94" name="橢圓 93">
+            <a:extLst>
+              <a:ext uri="{FF2B5EF4-FFF2-40B4-BE49-F238E27FC236}">
+                <a16:creationId xmlns:a16="http://schemas.microsoft.com/office/drawing/2014/main" id="{0DA3DE5C-AE95-9015-E4FF-EB2E49E8A429}"/>
+              </a:ext>
+            </a:extLst>
+          </p:cNvPr>
+          <p:cNvSpPr/>
+          <p:nvPr/>
+        </p:nvSpPr>
+        <p:spPr>
+          <a:xfrm>
+            <a:off x="7640344" y="5860280"/>
+            <a:ext cx="111643" cy="260492"/>
+          </a:xfrm>
+          <a:prstGeom prst="ellipse">
+            <a:avLst/>
+          </a:prstGeom>
+        </p:spPr>
+        <p:style>
+          <a:lnRef idx="2">
+            <a:schemeClr val="accent1">
+              <a:shade val="50000"/>
+            </a:schemeClr>
+          </a:lnRef>
+          <a:fillRef idx="1">
+            <a:schemeClr val="accent1"/>
+          </a:fillRef>
+          <a:effectRef idx="0">
+            <a:schemeClr val="accent1"/>
+          </a:effectRef>
+          <a:fontRef idx="minor">
+            <a:schemeClr val="lt1"/>
+          </a:fontRef>
+        </p:style>
+        <p:txBody>
+          <a:bodyPr rtlCol="0" anchor="ctr"/>
+          <a:lstStyle/>
+          <a:p>
+            <a:pPr algn="ctr"/>
+            <a:endParaRPr lang="zh-TW" altLang="en-US"/>
+          </a:p>
+        </p:txBody>
+      </p:sp>
+      <p:sp>
+        <p:nvSpPr>
+          <p:cNvPr id="95" name="橢圓 94">
+            <a:extLst>
+              <a:ext uri="{FF2B5EF4-FFF2-40B4-BE49-F238E27FC236}">
+                <a16:creationId xmlns:a16="http://schemas.microsoft.com/office/drawing/2014/main" id="{E2484E51-F3F2-18CB-8D2F-84035C27D9F9}"/>
+              </a:ext>
+            </a:extLst>
+          </p:cNvPr>
+          <p:cNvSpPr/>
+          <p:nvPr/>
+        </p:nvSpPr>
+        <p:spPr>
+          <a:xfrm>
+            <a:off x="7979634" y="5853345"/>
+            <a:ext cx="111643" cy="260492"/>
+          </a:xfrm>
+          <a:prstGeom prst="ellipse">
+            <a:avLst/>
+          </a:prstGeom>
+        </p:spPr>
+        <p:style>
+          <a:lnRef idx="2">
+            <a:schemeClr val="accent1">
+              <a:shade val="50000"/>
+            </a:schemeClr>
+          </a:lnRef>
+          <a:fillRef idx="1">
+            <a:schemeClr val="accent1"/>
+          </a:fillRef>
+          <a:effectRef idx="0">
+            <a:schemeClr val="accent1"/>
+          </a:effectRef>
+          <a:fontRef idx="minor">
+            <a:schemeClr val="lt1"/>
+          </a:fontRef>
+        </p:style>
+        <p:txBody>
+          <a:bodyPr rtlCol="0" anchor="ctr"/>
+          <a:lstStyle/>
+          <a:p>
+            <a:pPr algn="ctr"/>
+            <a:endParaRPr lang="zh-TW" altLang="en-US"/>
+          </a:p>
+        </p:txBody>
+      </p:sp>
+      <p:cxnSp>
+        <p:nvCxnSpPr>
+          <p:cNvPr id="97" name="直線單箭頭接點 96">
+            <a:extLst>
+              <a:ext uri="{FF2B5EF4-FFF2-40B4-BE49-F238E27FC236}">
+                <a16:creationId xmlns:a16="http://schemas.microsoft.com/office/drawing/2014/main" id="{B47D1895-E289-8ED6-2787-39967C440579}"/>
+              </a:ext>
+            </a:extLst>
+          </p:cNvPr>
+          <p:cNvCxnSpPr/>
+          <p:nvPr/>
+        </p:nvCxnSpPr>
+        <p:spPr>
+          <a:xfrm flipH="1">
+            <a:off x="5396922" y="2035306"/>
+            <a:ext cx="403123" cy="358184"/>
+          </a:xfrm>
+          <a:prstGeom prst="straightConnector1">
+            <a:avLst/>
+          </a:prstGeom>
+          <a:ln w="38100">
+            <a:solidFill>
+              <a:srgbClr val="002060"/>
+            </a:solidFill>
+            <a:tailEnd type="triangle"/>
+          </a:ln>
+        </p:spPr>
+        <p:style>
+          <a:lnRef idx="1">
+            <a:schemeClr val="accent1"/>
+          </a:lnRef>
+          <a:fillRef idx="0">
+            <a:schemeClr val="accent1"/>
+          </a:fillRef>
+          <a:effectRef idx="0">
+            <a:schemeClr val="accent1"/>
+          </a:effectRef>
+          <a:fontRef idx="minor">
+            <a:schemeClr val="tx1"/>
+          </a:fontRef>
+        </p:style>
+      </p:cxnSp>
+      <p:cxnSp>
+        <p:nvCxnSpPr>
+          <p:cNvPr id="99" name="直線單箭頭接點 98">
+            <a:extLst>
+              <a:ext uri="{FF2B5EF4-FFF2-40B4-BE49-F238E27FC236}">
+                <a16:creationId xmlns:a16="http://schemas.microsoft.com/office/drawing/2014/main" id="{8EEDEE41-A126-4917-F3EF-545A278A8AC7}"/>
+              </a:ext>
+            </a:extLst>
+          </p:cNvPr>
+          <p:cNvCxnSpPr/>
+          <p:nvPr/>
+        </p:nvCxnSpPr>
+        <p:spPr>
+          <a:xfrm flipH="1">
+            <a:off x="3712035" y="3470064"/>
+            <a:ext cx="403123" cy="358184"/>
+          </a:xfrm>
+          <a:prstGeom prst="straightConnector1">
+            <a:avLst/>
+          </a:prstGeom>
+          <a:ln w="38100">
+            <a:solidFill>
+              <a:srgbClr val="002060"/>
+            </a:solidFill>
+            <a:tailEnd type="triangle"/>
+          </a:ln>
+        </p:spPr>
+        <p:style>
+          <a:lnRef idx="1">
+            <a:schemeClr val="accent1"/>
+          </a:lnRef>
+          <a:fillRef idx="0">
+            <a:schemeClr val="accent1"/>
+          </a:fillRef>
+          <a:effectRef idx="0">
+            <a:schemeClr val="accent1"/>
+          </a:effectRef>
+          <a:fontRef idx="minor">
+            <a:schemeClr val="tx1"/>
+          </a:fontRef>
+        </p:style>
+      </p:cxnSp>
+      <p:sp>
+        <p:nvSpPr>
+          <p:cNvPr id="100" name="橢圓 99">
+            <a:extLst>
+              <a:ext uri="{FF2B5EF4-FFF2-40B4-BE49-F238E27FC236}">
+                <a16:creationId xmlns:a16="http://schemas.microsoft.com/office/drawing/2014/main" id="{C4471045-BE8A-A03C-F35D-509FBFAB5BF2}"/>
+              </a:ext>
+            </a:extLst>
+          </p:cNvPr>
+          <p:cNvSpPr/>
+          <p:nvPr/>
+        </p:nvSpPr>
+        <p:spPr>
+          <a:xfrm>
+            <a:off x="8445795" y="5846183"/>
+            <a:ext cx="111643" cy="260492"/>
+          </a:xfrm>
+          <a:prstGeom prst="ellipse">
+            <a:avLst/>
+          </a:prstGeom>
+        </p:spPr>
+        <p:style>
+          <a:lnRef idx="2">
+            <a:schemeClr val="accent1">
+              <a:shade val="50000"/>
+            </a:schemeClr>
+          </a:lnRef>
+          <a:fillRef idx="1">
+            <a:schemeClr val="accent1"/>
+          </a:fillRef>
+          <a:effectRef idx="0">
+            <a:schemeClr val="accent1"/>
+          </a:effectRef>
+          <a:fontRef idx="minor">
+            <a:schemeClr val="lt1"/>
+          </a:fontRef>
+        </p:style>
+        <p:txBody>
+          <a:bodyPr rtlCol="0" anchor="ctr"/>
+          <a:lstStyle/>
+          <a:p>
+            <a:pPr algn="ctr"/>
+            <a:endParaRPr lang="zh-TW" altLang="en-US"/>
+          </a:p>
+        </p:txBody>
+      </p:sp>
+      <p:sp>
+        <p:nvSpPr>
+          <p:cNvPr id="101" name="橢圓 100">
+            <a:extLst>
+              <a:ext uri="{FF2B5EF4-FFF2-40B4-BE49-F238E27FC236}">
+                <a16:creationId xmlns:a16="http://schemas.microsoft.com/office/drawing/2014/main" id="{EA301159-DDA3-1EE8-961D-CD9E98970F3E}"/>
+              </a:ext>
+            </a:extLst>
+          </p:cNvPr>
+          <p:cNvSpPr/>
+          <p:nvPr/>
+        </p:nvSpPr>
+        <p:spPr>
+          <a:xfrm>
+            <a:off x="8849246" y="5874561"/>
+            <a:ext cx="111643" cy="260492"/>
+          </a:xfrm>
+          <a:prstGeom prst="ellipse">
+            <a:avLst/>
+          </a:prstGeom>
+          <a:solidFill>
+            <a:srgbClr val="FFFF00"/>
+          </a:solidFill>
+        </p:spPr>
+        <p:style>
+          <a:lnRef idx="2">
+            <a:schemeClr val="accent1">
+              <a:shade val="50000"/>
+            </a:schemeClr>
+          </a:lnRef>
+          <a:fillRef idx="1">
+            <a:schemeClr val="accent1"/>
+          </a:fillRef>
+          <a:effectRef idx="0">
+            <a:schemeClr val="accent1"/>
+          </a:effectRef>
+          <a:fontRef idx="minor">
+            <a:schemeClr val="lt1"/>
+          </a:fontRef>
+        </p:style>
+        <p:txBody>
+          <a:bodyPr rtlCol="0" anchor="ctr"/>
+          <a:lstStyle/>
+          <a:p>
+            <a:pPr algn="ctr"/>
+            <a:endParaRPr lang="zh-TW" altLang="en-US"/>
+          </a:p>
+        </p:txBody>
+      </p:sp>
+      <p:sp>
+        <p:nvSpPr>
+          <p:cNvPr id="102" name="橢圓 101">
+            <a:extLst>
+              <a:ext uri="{FF2B5EF4-FFF2-40B4-BE49-F238E27FC236}">
+                <a16:creationId xmlns:a16="http://schemas.microsoft.com/office/drawing/2014/main" id="{EE0BA736-5DF2-089B-7EDC-A29B317B2F51}"/>
+              </a:ext>
+            </a:extLst>
+          </p:cNvPr>
+          <p:cNvSpPr/>
+          <p:nvPr/>
+        </p:nvSpPr>
+        <p:spPr>
+          <a:xfrm>
+            <a:off x="9228173" y="5868099"/>
+            <a:ext cx="111643" cy="260492"/>
+          </a:xfrm>
+          <a:prstGeom prst="ellipse">
+            <a:avLst/>
+          </a:prstGeom>
+          <a:solidFill>
+            <a:srgbClr val="FFFF00"/>
+          </a:solidFill>
+        </p:spPr>
+        <p:style>
+          <a:lnRef idx="2">
+            <a:schemeClr val="accent1">
+              <a:shade val="50000"/>
+            </a:schemeClr>
+          </a:lnRef>
+          <a:fillRef idx="1">
+            <a:schemeClr val="accent1"/>
+          </a:fillRef>
+          <a:effectRef idx="0">
+            <a:schemeClr val="accent1"/>
+          </a:effectRef>
+          <a:fontRef idx="minor">
+            <a:schemeClr val="lt1"/>
+          </a:fontRef>
+        </p:style>
+        <p:txBody>
+          <a:bodyPr rtlCol="0" anchor="ctr"/>
+          <a:lstStyle/>
+          <a:p>
+            <a:pPr algn="ctr"/>
+            <a:endParaRPr lang="zh-TW" altLang="en-US"/>
+          </a:p>
+        </p:txBody>
+      </p:sp>
+      <p:sp>
+        <p:nvSpPr>
+          <p:cNvPr id="103" name="橢圓 102">
+            <a:extLst>
+              <a:ext uri="{FF2B5EF4-FFF2-40B4-BE49-F238E27FC236}">
+                <a16:creationId xmlns:a16="http://schemas.microsoft.com/office/drawing/2014/main" id="{BBAAFF60-42C5-DE98-0267-FF0F8E87F9E2}"/>
+              </a:ext>
+            </a:extLst>
+          </p:cNvPr>
+          <p:cNvSpPr/>
+          <p:nvPr/>
+        </p:nvSpPr>
+        <p:spPr>
+          <a:xfrm>
+            <a:off x="9656216" y="5881497"/>
+            <a:ext cx="111643" cy="260492"/>
+          </a:xfrm>
+          <a:prstGeom prst="ellipse">
+            <a:avLst/>
+          </a:prstGeom>
+          <a:solidFill>
+            <a:srgbClr val="FFFF00"/>
+          </a:solidFill>
+        </p:spPr>
+        <p:style>
+          <a:lnRef idx="2">
+            <a:schemeClr val="accent1">
+              <a:shade val="50000"/>
+            </a:schemeClr>
+          </a:lnRef>
+          <a:fillRef idx="1">
+            <a:schemeClr val="accent1"/>
+          </a:fillRef>
+          <a:effectRef idx="0">
+            <a:schemeClr val="accent1"/>
+          </a:effectRef>
+          <a:fontRef idx="minor">
+            <a:schemeClr val="lt1"/>
+          </a:fontRef>
+        </p:style>
+        <p:txBody>
+          <a:bodyPr rtlCol="0" anchor="ctr"/>
+          <a:lstStyle/>
+          <a:p>
+            <a:pPr algn="ctr"/>
+            <a:endParaRPr lang="zh-TW" altLang="en-US"/>
+          </a:p>
+        </p:txBody>
+      </p:sp>
+      <p:sp>
+        <p:nvSpPr>
+          <p:cNvPr id="104" name="橢圓 103">
+            <a:extLst>
+              <a:ext uri="{FF2B5EF4-FFF2-40B4-BE49-F238E27FC236}">
+                <a16:creationId xmlns:a16="http://schemas.microsoft.com/office/drawing/2014/main" id="{E7E029FA-DE0E-336D-99BE-D7B082E69C65}"/>
+              </a:ext>
+            </a:extLst>
+          </p:cNvPr>
+          <p:cNvSpPr/>
+          <p:nvPr/>
+        </p:nvSpPr>
+        <p:spPr>
+          <a:xfrm>
+            <a:off x="10050341" y="5867878"/>
+            <a:ext cx="111643" cy="260492"/>
+          </a:xfrm>
+          <a:prstGeom prst="ellipse">
+            <a:avLst/>
+          </a:prstGeom>
+        </p:spPr>
+        <p:style>
+          <a:lnRef idx="2">
+            <a:schemeClr val="accent1">
+              <a:shade val="50000"/>
+            </a:schemeClr>
+          </a:lnRef>
+          <a:fillRef idx="1">
+            <a:schemeClr val="accent1"/>
+          </a:fillRef>
+          <a:effectRef idx="0">
+            <a:schemeClr val="accent1"/>
+          </a:effectRef>
+          <a:fontRef idx="minor">
+            <a:schemeClr val="lt1"/>
+          </a:fontRef>
+        </p:style>
+        <p:txBody>
+          <a:bodyPr rtlCol="0" anchor="ctr"/>
+          <a:lstStyle/>
+          <a:p>
+            <a:pPr algn="ctr"/>
+            <a:endParaRPr lang="zh-TW" altLang="en-US"/>
+          </a:p>
+        </p:txBody>
+      </p:sp>
+      <p:sp>
+        <p:nvSpPr>
+          <p:cNvPr id="105" name="橢圓 104">
+            <a:extLst>
+              <a:ext uri="{FF2B5EF4-FFF2-40B4-BE49-F238E27FC236}">
+                <a16:creationId xmlns:a16="http://schemas.microsoft.com/office/drawing/2014/main" id="{872DA3DB-648F-DBB2-09A8-E2DB5FA4426E}"/>
+              </a:ext>
+            </a:extLst>
+          </p:cNvPr>
+          <p:cNvSpPr/>
+          <p:nvPr/>
+        </p:nvSpPr>
+        <p:spPr>
+          <a:xfrm>
+            <a:off x="10478384" y="5836806"/>
+            <a:ext cx="111643" cy="260492"/>
+          </a:xfrm>
+          <a:prstGeom prst="ellipse">
+            <a:avLst/>
+          </a:prstGeom>
+          <a:solidFill>
+            <a:srgbClr val="FFFF00"/>
+          </a:solidFill>
+        </p:spPr>
+        <p:style>
+          <a:lnRef idx="2">
+            <a:schemeClr val="accent1">
+              <a:shade val="50000"/>
+            </a:schemeClr>
+          </a:lnRef>
+          <a:fillRef idx="1">
+            <a:schemeClr val="accent1"/>
+          </a:fillRef>
+          <a:effectRef idx="0">
+            <a:schemeClr val="accent1"/>
+          </a:effectRef>
+          <a:fontRef idx="minor">
+            <a:schemeClr val="lt1"/>
+          </a:fontRef>
+        </p:style>
+        <p:txBody>
+          <a:bodyPr rtlCol="0" anchor="ctr"/>
+          <a:lstStyle/>
+          <a:p>
+            <a:pPr algn="ctr"/>
+            <a:endParaRPr lang="zh-TW" altLang="en-US"/>
+          </a:p>
+        </p:txBody>
+      </p:sp>
+      <p:sp>
+        <p:nvSpPr>
+          <p:cNvPr id="106" name="文字方塊 105">
+            <a:extLst>
+              <a:ext uri="{FF2B5EF4-FFF2-40B4-BE49-F238E27FC236}">
+                <a16:creationId xmlns:a16="http://schemas.microsoft.com/office/drawing/2014/main" id="{53B946A0-782C-FEE4-0BC1-CC5D67972F0C}"/>
+              </a:ext>
+            </a:extLst>
+          </p:cNvPr>
+          <p:cNvSpPr txBox="1"/>
+          <p:nvPr/>
+        </p:nvSpPr>
+        <p:spPr>
+          <a:xfrm>
+            <a:off x="10697497" y="1915165"/>
+            <a:ext cx="1494503" cy="369332"/>
+          </a:xfrm>
+          <a:prstGeom prst="rect">
+            <a:avLst/>
+          </a:prstGeom>
+          <a:noFill/>
+        </p:spPr>
+        <p:txBody>
+          <a:bodyPr wrap="square" rtlCol="0">
+            <a:spAutoFit/>
+          </a:bodyPr>
+          <a:lstStyle/>
+          <a:p>
+            <a:r>
+              <a:rPr lang="zh-TW" altLang="en-US" dirty="0"/>
+              <a:t>顏色代表值</a:t>
+            </a:r>
+          </a:p>
+        </p:txBody>
+      </p:sp>
+      <p:sp>
+        <p:nvSpPr>
+          <p:cNvPr id="107" name="矩形 106">
+            <a:extLst>
+              <a:ext uri="{FF2B5EF4-FFF2-40B4-BE49-F238E27FC236}">
+                <a16:creationId xmlns:a16="http://schemas.microsoft.com/office/drawing/2014/main" id="{B1F3CAB7-181A-301D-129E-02D80D784630}"/>
+              </a:ext>
+            </a:extLst>
+          </p:cNvPr>
+          <p:cNvSpPr/>
+          <p:nvPr/>
+        </p:nvSpPr>
+        <p:spPr>
+          <a:xfrm>
+            <a:off x="2282881" y="5562758"/>
+            <a:ext cx="1147556" cy="807061"/>
+          </a:xfrm>
+          <a:prstGeom prst="rect">
+            <a:avLst/>
+          </a:prstGeom>
+          <a:noFill/>
+          <a:ln>
+            <a:solidFill>
+              <a:srgbClr val="FF0000"/>
+            </a:solidFill>
+            <a:prstDash val="sysDash"/>
+          </a:ln>
+        </p:spPr>
+        <p:style>
+          <a:lnRef idx="2">
+            <a:schemeClr val="accent1">
+              <a:shade val="50000"/>
+            </a:schemeClr>
+          </a:lnRef>
+          <a:fillRef idx="1">
+            <a:schemeClr val="accent1"/>
+          </a:fillRef>
+          <a:effectRef idx="0">
+            <a:schemeClr val="accent1"/>
+          </a:effectRef>
+          <a:fontRef idx="minor">
+            <a:schemeClr val="lt1"/>
+          </a:fontRef>
+        </p:style>
+        <p:txBody>
+          <a:bodyPr rtlCol="0" anchor="ctr"/>
+          <a:lstStyle/>
+          <a:p>
+            <a:pPr algn="ctr"/>
+            <a:endParaRPr lang="zh-TW" altLang="en-US"/>
+          </a:p>
+        </p:txBody>
+      </p:sp>
+      <p:cxnSp>
+        <p:nvCxnSpPr>
+          <p:cNvPr id="110" name="直線單箭頭接點 109">
+            <a:extLst>
+              <a:ext uri="{FF2B5EF4-FFF2-40B4-BE49-F238E27FC236}">
+                <a16:creationId xmlns:a16="http://schemas.microsoft.com/office/drawing/2014/main" id="{949CEA8E-5969-C101-8175-83316F42AD58}"/>
+              </a:ext>
+            </a:extLst>
+          </p:cNvPr>
+          <p:cNvCxnSpPr>
+            <a:cxnSpLocks/>
+          </p:cNvCxnSpPr>
+          <p:nvPr/>
+        </p:nvCxnSpPr>
+        <p:spPr>
+          <a:xfrm>
+            <a:off x="2481657" y="1915165"/>
+            <a:ext cx="0" cy="478325"/>
+          </a:xfrm>
+          <a:prstGeom prst="straightConnector1">
+            <a:avLst/>
+          </a:prstGeom>
+          <a:ln w="38100">
+            <a:solidFill>
+              <a:srgbClr val="002060"/>
+            </a:solidFill>
+            <a:tailEnd type="triangle"/>
+          </a:ln>
+        </p:spPr>
+        <p:style>
+          <a:lnRef idx="1">
+            <a:schemeClr val="accent1"/>
+          </a:lnRef>
+          <a:fillRef idx="0">
+            <a:schemeClr val="accent1"/>
+          </a:fillRef>
+          <a:effectRef idx="0">
+            <a:schemeClr val="accent1"/>
+          </a:effectRef>
+          <a:fontRef idx="minor">
+            <a:schemeClr val="tx1"/>
+          </a:fontRef>
+        </p:style>
+      </p:cxnSp>
+      <p:sp>
+        <p:nvSpPr>
+          <p:cNvPr id="114" name="文字方塊 113">
+            <a:extLst>
+              <a:ext uri="{FF2B5EF4-FFF2-40B4-BE49-F238E27FC236}">
+                <a16:creationId xmlns:a16="http://schemas.microsoft.com/office/drawing/2014/main" id="{41606BF3-3514-2010-4EB5-9737A335C487}"/>
+              </a:ext>
+            </a:extLst>
+          </p:cNvPr>
+          <p:cNvSpPr txBox="1"/>
+          <p:nvPr/>
+        </p:nvSpPr>
+        <p:spPr>
+          <a:xfrm>
+            <a:off x="2006941" y="1210991"/>
+            <a:ext cx="1699436" cy="646331"/>
+          </a:xfrm>
+          <a:prstGeom prst="rect">
+            <a:avLst/>
+          </a:prstGeom>
+          <a:noFill/>
+        </p:spPr>
+        <p:txBody>
+          <a:bodyPr wrap="square" rtlCol="0">
+            <a:spAutoFit/>
+          </a:bodyPr>
+          <a:lstStyle/>
+          <a:p>
+            <a:r>
+              <a:rPr lang="en-US" altLang="zh-TW" dirty="0"/>
+              <a:t>Last Sample </a:t>
+            </a:r>
+            <a:r>
+              <a:rPr lang="en-US" altLang="zh-TW" dirty="0" err="1"/>
+              <a:t>Positon</a:t>
+            </a:r>
+            <a:endParaRPr lang="zh-TW" altLang="en-US" dirty="0"/>
           </a:p>
         </p:txBody>
       </p:sp>
@@ -28070,7 +31214,7 @@
             <a:pPr algn="ctr"/>
             <a:r>
               <a:rPr lang="zh-TW" altLang="en-US" dirty="0"/>
-              <a:t>解決過最難得</a:t>
+              <a:t>解決過最難</a:t>
             </a:r>
             <a:r>
               <a:rPr lang="en-US" altLang="zh-TW" dirty="0"/>

</xml_diff>

<commit_message>
* Update Schmitt Page for Digital
</commit_message>
<xml_diff>
--- a/Project_Summary_pdf/Project_Summary.pptx
+++ b/Project_Summary_pdf/Project_Summary.pptx
@@ -440,7 +440,7 @@
           <a:p>
             <a:fld id="{C65320F2-F42B-45F1-AA86-96F1A2E46749}" type="datetimeFigureOut">
               <a:rPr lang="zh-TW" altLang="en-US" smtClean="0"/>
-              <a:t>2023/2/9</a:t>
+              <a:t>2023/2/10</a:t>
             </a:fld>
             <a:endParaRPr lang="zh-TW" altLang="en-US"/>
           </a:p>
@@ -4672,7 +4672,7 @@
           <a:p>
             <a:fld id="{8A9F4CB5-1750-4E23-A13C-2C1F028F9724}" type="datetimeFigureOut">
               <a:rPr lang="zh-TW" altLang="en-US" smtClean="0"/>
-              <a:t>2023/2/9</a:t>
+              <a:t>2023/2/10</a:t>
             </a:fld>
             <a:endParaRPr lang="zh-TW" altLang="en-US"/>
           </a:p>
@@ -4870,7 +4870,7 @@
           <a:p>
             <a:fld id="{8A9F4CB5-1750-4E23-A13C-2C1F028F9724}" type="datetimeFigureOut">
               <a:rPr lang="zh-TW" altLang="en-US" smtClean="0"/>
-              <a:t>2023/2/9</a:t>
+              <a:t>2023/2/10</a:t>
             </a:fld>
             <a:endParaRPr lang="zh-TW" altLang="en-US"/>
           </a:p>
@@ -5078,7 +5078,7 @@
           <a:p>
             <a:fld id="{8A9F4CB5-1750-4E23-A13C-2C1F028F9724}" type="datetimeFigureOut">
               <a:rPr lang="zh-TW" altLang="en-US" smtClean="0"/>
-              <a:t>2023/2/9</a:t>
+              <a:t>2023/2/10</a:t>
             </a:fld>
             <a:endParaRPr lang="zh-TW" altLang="en-US"/>
           </a:p>
@@ -5276,7 +5276,7 @@
           <a:p>
             <a:fld id="{8A9F4CB5-1750-4E23-A13C-2C1F028F9724}" type="datetimeFigureOut">
               <a:rPr lang="zh-TW" altLang="en-US" smtClean="0"/>
-              <a:t>2023/2/9</a:t>
+              <a:t>2023/2/10</a:t>
             </a:fld>
             <a:endParaRPr lang="zh-TW" altLang="en-US"/>
           </a:p>
@@ -5551,7 +5551,7 @@
           <a:p>
             <a:fld id="{8A9F4CB5-1750-4E23-A13C-2C1F028F9724}" type="datetimeFigureOut">
               <a:rPr lang="zh-TW" altLang="en-US" smtClean="0"/>
-              <a:t>2023/2/9</a:t>
+              <a:t>2023/2/10</a:t>
             </a:fld>
             <a:endParaRPr lang="zh-TW" altLang="en-US"/>
           </a:p>
@@ -5816,7 +5816,7 @@
           <a:p>
             <a:fld id="{8A9F4CB5-1750-4E23-A13C-2C1F028F9724}" type="datetimeFigureOut">
               <a:rPr lang="zh-TW" altLang="en-US" smtClean="0"/>
-              <a:t>2023/2/9</a:t>
+              <a:t>2023/2/10</a:t>
             </a:fld>
             <a:endParaRPr lang="zh-TW" altLang="en-US"/>
           </a:p>
@@ -6228,7 +6228,7 @@
           <a:p>
             <a:fld id="{8A9F4CB5-1750-4E23-A13C-2C1F028F9724}" type="datetimeFigureOut">
               <a:rPr lang="zh-TW" altLang="en-US" smtClean="0"/>
-              <a:t>2023/2/9</a:t>
+              <a:t>2023/2/10</a:t>
             </a:fld>
             <a:endParaRPr lang="zh-TW" altLang="en-US"/>
           </a:p>
@@ -6369,7 +6369,7 @@
           <a:p>
             <a:fld id="{8A9F4CB5-1750-4E23-A13C-2C1F028F9724}" type="datetimeFigureOut">
               <a:rPr lang="zh-TW" altLang="en-US" smtClean="0"/>
-              <a:t>2023/2/9</a:t>
+              <a:t>2023/2/10</a:t>
             </a:fld>
             <a:endParaRPr lang="zh-TW" altLang="en-US"/>
           </a:p>
@@ -6482,7 +6482,7 @@
           <a:p>
             <a:fld id="{8A9F4CB5-1750-4E23-A13C-2C1F028F9724}" type="datetimeFigureOut">
               <a:rPr lang="zh-TW" altLang="en-US" smtClean="0"/>
-              <a:t>2023/2/9</a:t>
+              <a:t>2023/2/10</a:t>
             </a:fld>
             <a:endParaRPr lang="zh-TW" altLang="en-US"/>
           </a:p>
@@ -6793,7 +6793,7 @@
           <a:p>
             <a:fld id="{8A9F4CB5-1750-4E23-A13C-2C1F028F9724}" type="datetimeFigureOut">
               <a:rPr lang="zh-TW" altLang="en-US" smtClean="0"/>
-              <a:t>2023/2/9</a:t>
+              <a:t>2023/2/10</a:t>
             </a:fld>
             <a:endParaRPr lang="zh-TW" altLang="en-US"/>
           </a:p>
@@ -7081,7 +7081,7 @@
           <a:p>
             <a:fld id="{8A9F4CB5-1750-4E23-A13C-2C1F028F9724}" type="datetimeFigureOut">
               <a:rPr lang="zh-TW" altLang="en-US" smtClean="0"/>
-              <a:t>2023/2/9</a:t>
+              <a:t>2023/2/10</a:t>
             </a:fld>
             <a:endParaRPr lang="zh-TW" altLang="en-US"/>
           </a:p>
@@ -7322,7 +7322,7 @@
           <a:p>
             <a:fld id="{8A9F4CB5-1750-4E23-A13C-2C1F028F9724}" type="datetimeFigureOut">
               <a:rPr lang="zh-TW" altLang="en-US" smtClean="0"/>
-              <a:t>2023/2/9</a:t>
+              <a:t>2023/2/10</a:t>
             </a:fld>
             <a:endParaRPr lang="zh-TW" altLang="en-US"/>
           </a:p>
@@ -19902,8 +19902,8 @@
               <a:buAutoNum type="arabicPeriod"/>
             </a:pPr>
             <a:r>
-              <a:rPr lang="zh-TW" altLang="en-US" dirty="0"/>
-              <a:t>用處 </a:t>
+              <a:rPr lang="zh-TW" altLang="en-US"/>
+              <a:t>實際用處 </a:t>
             </a:r>
             <a:r>
               <a:rPr lang="en-US" altLang="zh-TW" dirty="0"/>
@@ -21362,6 +21362,110 @@
           </a:p>
         </p:txBody>
       </p:sp>
+      <p:sp>
+        <p:nvSpPr>
+          <p:cNvPr id="3" name="橢圓 2">
+            <a:extLst>
+              <a:ext uri="{FF2B5EF4-FFF2-40B4-BE49-F238E27FC236}">
+                <a16:creationId xmlns:a16="http://schemas.microsoft.com/office/drawing/2014/main" id="{10CA2C01-1AFE-2C47-50FE-99CDBDDDBF58}"/>
+              </a:ext>
+            </a:extLst>
+          </p:cNvPr>
+          <p:cNvSpPr/>
+          <p:nvPr/>
+        </p:nvSpPr>
+        <p:spPr>
+          <a:xfrm>
+            <a:off x="3228722" y="3266587"/>
+            <a:ext cx="169933" cy="184666"/>
+          </a:xfrm>
+          <a:prstGeom prst="ellipse">
+            <a:avLst/>
+          </a:prstGeom>
+          <a:noFill/>
+          <a:ln>
+            <a:solidFill>
+              <a:srgbClr val="FF0000"/>
+            </a:solidFill>
+          </a:ln>
+        </p:spPr>
+        <p:style>
+          <a:lnRef idx="2">
+            <a:schemeClr val="accent1">
+              <a:shade val="50000"/>
+            </a:schemeClr>
+          </a:lnRef>
+          <a:fillRef idx="1">
+            <a:schemeClr val="accent1"/>
+          </a:fillRef>
+          <a:effectRef idx="0">
+            <a:schemeClr val="accent1"/>
+          </a:effectRef>
+          <a:fontRef idx="minor">
+            <a:schemeClr val="lt1"/>
+          </a:fontRef>
+        </p:style>
+        <p:txBody>
+          <a:bodyPr rtlCol="0" anchor="ctr"/>
+          <a:lstStyle/>
+          <a:p>
+            <a:pPr algn="ctr"/>
+            <a:endParaRPr lang="zh-TW" altLang="en-US"/>
+          </a:p>
+        </p:txBody>
+      </p:sp>
+      <p:sp>
+        <p:nvSpPr>
+          <p:cNvPr id="4" name="橢圓 3">
+            <a:extLst>
+              <a:ext uri="{FF2B5EF4-FFF2-40B4-BE49-F238E27FC236}">
+                <a16:creationId xmlns:a16="http://schemas.microsoft.com/office/drawing/2014/main" id="{F07E6FB6-C0D5-AB0F-4717-4E73E5878081}"/>
+              </a:ext>
+            </a:extLst>
+          </p:cNvPr>
+          <p:cNvSpPr/>
+          <p:nvPr/>
+        </p:nvSpPr>
+        <p:spPr>
+          <a:xfrm>
+            <a:off x="4575543" y="4617295"/>
+            <a:ext cx="169933" cy="184666"/>
+          </a:xfrm>
+          <a:prstGeom prst="ellipse">
+            <a:avLst/>
+          </a:prstGeom>
+          <a:noFill/>
+          <a:ln>
+            <a:solidFill>
+              <a:srgbClr val="FF0000"/>
+            </a:solidFill>
+          </a:ln>
+        </p:spPr>
+        <p:style>
+          <a:lnRef idx="2">
+            <a:schemeClr val="accent1">
+              <a:shade val="50000"/>
+            </a:schemeClr>
+          </a:lnRef>
+          <a:fillRef idx="1">
+            <a:schemeClr val="accent1"/>
+          </a:fillRef>
+          <a:effectRef idx="0">
+            <a:schemeClr val="accent1"/>
+          </a:effectRef>
+          <a:fontRef idx="minor">
+            <a:schemeClr val="lt1"/>
+          </a:fontRef>
+        </p:style>
+        <p:txBody>
+          <a:bodyPr rtlCol="0" anchor="ctr"/>
+          <a:lstStyle/>
+          <a:p>
+            <a:pPr algn="ctr"/>
+            <a:endParaRPr lang="zh-TW" altLang="en-US"/>
+          </a:p>
+        </p:txBody>
+      </p:sp>
     </p:spTree>
     <p:extLst>
       <p:ext uri="{BB962C8B-B14F-4D97-AF65-F5344CB8AC3E}">
@@ -21422,8 +21526,8 @@
           </a:p>
         </p:txBody>
       </p:sp>
-      <mc:AlternateContent xmlns:mc="http://schemas.openxmlformats.org/markup-compatibility/2006" xmlns:a14="http://schemas.microsoft.com/office/drawing/2010/main">
-        <mc:Choice Requires="a14">
+      <mc:AlternateContent xmlns:mc="http://schemas.openxmlformats.org/markup-compatibility/2006">
+        <mc:Choice xmlns:a14="http://schemas.microsoft.com/office/drawing/2010/main" Requires="a14">
           <p:sp>
             <p:nvSpPr>
               <p:cNvPr id="3" name="內容版面配置區 2">
@@ -21548,7 +21652,7 @@
             </p:txBody>
           </p:sp>
         </mc:Choice>
-        <mc:Fallback xmlns="">
+        <mc:Fallback>
           <p:sp>
             <p:nvSpPr>
               <p:cNvPr id="3" name="內容版面配置區 2">
@@ -21588,8 +21692,8 @@
           </p:sp>
         </mc:Fallback>
       </mc:AlternateContent>
-      <mc:AlternateContent xmlns:mc="http://schemas.openxmlformats.org/markup-compatibility/2006" xmlns:a14="http://schemas.microsoft.com/office/drawing/2010/main">
-        <mc:Choice Requires="a14">
+      <mc:AlternateContent xmlns:mc="http://schemas.openxmlformats.org/markup-compatibility/2006">
+        <mc:Choice xmlns:a14="http://schemas.microsoft.com/office/drawing/2010/main" Requires="a14">
           <p:sp>
             <p:nvSpPr>
               <p:cNvPr id="4" name="文字方塊 3">
@@ -21604,7 +21708,7 @@
             </p:nvSpPr>
             <p:spPr>
               <a:xfrm>
-                <a:off x="6905847" y="2929270"/>
+                <a:off x="6625856" y="3518012"/>
                 <a:ext cx="5566144" cy="276999"/>
               </a:xfrm>
               <a:prstGeom prst="rect">
@@ -21759,7 +21863,7 @@
             </p:txBody>
           </p:sp>
         </mc:Choice>
-        <mc:Fallback xmlns="">
+        <mc:Fallback>
           <p:sp>
             <p:nvSpPr>
               <p:cNvPr id="4" name="文字方塊 3">
@@ -21776,7 +21880,7 @@
             </p:nvSpPr>
             <p:spPr>
               <a:xfrm>
-                <a:off x="6905847" y="2929270"/>
+                <a:off x="6625856" y="3518012"/>
                 <a:ext cx="5566144" cy="276999"/>
               </a:xfrm>
               <a:prstGeom prst="rect">
@@ -21785,7 +21889,7 @@
               <a:blipFill>
                 <a:blip r:embed="rId3"/>
                 <a:stretch>
-                  <a:fillRect l="-1533" b="-26667"/>
+                  <a:fillRect l="-1533" b="-23913"/>
                 </a:stretch>
               </a:blipFill>
             </p:spPr>
@@ -21818,7 +21922,7 @@
         </p:nvSpPr>
         <p:spPr>
           <a:xfrm>
-            <a:off x="3524291" y="2905756"/>
+            <a:off x="3244300" y="3494498"/>
             <a:ext cx="2296633" cy="369332"/>
           </a:xfrm>
           <a:prstGeom prst="rect">
@@ -21854,7 +21958,7 @@
         </p:nvSpPr>
         <p:spPr>
           <a:xfrm>
-            <a:off x="3553046" y="4447498"/>
+            <a:off x="3273055" y="5036240"/>
             <a:ext cx="2296633" cy="369332"/>
           </a:xfrm>
           <a:prstGeom prst="rect">
@@ -21876,8 +21980,8 @@
           </a:p>
         </p:txBody>
       </p:sp>
-      <mc:AlternateContent xmlns:mc="http://schemas.openxmlformats.org/markup-compatibility/2006" xmlns:a14="http://schemas.microsoft.com/office/drawing/2010/main">
-        <mc:Choice Requires="a14">
+      <mc:AlternateContent xmlns:mc="http://schemas.openxmlformats.org/markup-compatibility/2006">
+        <mc:Choice xmlns:a14="http://schemas.microsoft.com/office/drawing/2010/main" Requires="a14">
           <p:sp>
             <p:nvSpPr>
               <p:cNvPr id="11" name="文字方塊 10">
@@ -21892,7 +21996,7 @@
             </p:nvSpPr>
             <p:spPr>
               <a:xfrm>
-                <a:off x="6905847" y="4479815"/>
+                <a:off x="6622314" y="5082406"/>
                 <a:ext cx="5566144" cy="276999"/>
               </a:xfrm>
               <a:prstGeom prst="rect">
@@ -22047,7 +22151,7 @@
             </p:txBody>
           </p:sp>
         </mc:Choice>
-        <mc:Fallback xmlns="">
+        <mc:Fallback>
           <p:sp>
             <p:nvSpPr>
               <p:cNvPr id="11" name="文字方塊 10">
@@ -22064,7 +22168,7 @@
             </p:nvSpPr>
             <p:spPr>
               <a:xfrm>
-                <a:off x="6905847" y="4479815"/>
+                <a:off x="6622314" y="5082406"/>
                 <a:ext cx="5566144" cy="276999"/>
               </a:xfrm>
               <a:prstGeom prst="rect">
@@ -22106,7 +22210,7 @@
         </p:nvSpPr>
         <p:spPr>
           <a:xfrm>
-            <a:off x="5286154" y="2920866"/>
+            <a:off x="5006163" y="3509608"/>
             <a:ext cx="1127051" cy="295462"/>
           </a:xfrm>
           <a:prstGeom prst="leftRightArrow">
@@ -22158,7 +22262,7 @@
         </p:nvSpPr>
         <p:spPr>
           <a:xfrm>
-            <a:off x="5286154" y="4521368"/>
+            <a:off x="5006163" y="5130171"/>
             <a:ext cx="1127051" cy="295462"/>
           </a:xfrm>
           <a:prstGeom prst="leftRightArrow">
@@ -22210,7 +22314,7 @@
         </p:nvSpPr>
         <p:spPr>
           <a:xfrm>
-            <a:off x="2851355" y="5752538"/>
+            <a:off x="2571364" y="6341280"/>
             <a:ext cx="7885471" cy="369332"/>
           </a:xfrm>
           <a:prstGeom prst="rect">
@@ -22245,6 +22349,156 @@
               <a:t>Sample</a:t>
             </a:r>
             <a:endParaRPr lang="zh-TW" altLang="en-US" dirty="0"/>
+          </a:p>
+        </p:txBody>
+      </p:sp>
+      <p:sp>
+        <p:nvSpPr>
+          <p:cNvPr id="5" name="矩形 4">
+            <a:extLst>
+              <a:ext uri="{FF2B5EF4-FFF2-40B4-BE49-F238E27FC236}">
+                <a16:creationId xmlns:a16="http://schemas.microsoft.com/office/drawing/2014/main" id="{B5294F53-F331-64CC-24E5-812BB7A9F7DD}"/>
+              </a:ext>
+            </a:extLst>
+          </p:cNvPr>
+          <p:cNvSpPr/>
+          <p:nvPr/>
+        </p:nvSpPr>
+        <p:spPr>
+          <a:xfrm>
+            <a:off x="2571364" y="2600447"/>
+            <a:ext cx="2095837" cy="760651"/>
+          </a:xfrm>
+          <a:prstGeom prst="rect">
+            <a:avLst/>
+          </a:prstGeom>
+          <a:noFill/>
+        </p:spPr>
+        <p:style>
+          <a:lnRef idx="2">
+            <a:schemeClr val="accent1">
+              <a:shade val="50000"/>
+            </a:schemeClr>
+          </a:lnRef>
+          <a:fillRef idx="1">
+            <a:schemeClr val="accent1"/>
+          </a:fillRef>
+          <a:effectRef idx="0">
+            <a:schemeClr val="accent1"/>
+          </a:effectRef>
+          <a:fontRef idx="minor">
+            <a:schemeClr val="lt1"/>
+          </a:fontRef>
+        </p:style>
+        <p:txBody>
+          <a:bodyPr rtlCol="0" anchor="ctr"/>
+          <a:lstStyle/>
+          <a:p>
+            <a:pPr algn="ctr"/>
+            <a:r>
+              <a:rPr lang="en-US" altLang="zh-TW">
+                <a:ln w="0"/>
+                <a:solidFill>
+                  <a:schemeClr val="tx1"/>
+                </a:solidFill>
+                <a:effectLst>
+                  <a:outerShdw blurRad="38100" dist="19050" dir="2700000" algn="tl" rotWithShape="0">
+                    <a:schemeClr val="dk1">
+                      <a:alpha val="40000"/>
+                    </a:schemeClr>
+                  </a:outerShdw>
+                </a:effectLst>
+              </a:rPr>
+              <a:t>Analog Condtion</a:t>
+            </a:r>
+            <a:endParaRPr lang="zh-TW" altLang="en-US">
+              <a:ln w="0"/>
+              <a:solidFill>
+                <a:schemeClr val="tx1"/>
+              </a:solidFill>
+              <a:effectLst>
+                <a:outerShdw blurRad="38100" dist="19050" dir="2700000" algn="tl" rotWithShape="0">
+                  <a:schemeClr val="dk1">
+                    <a:alpha val="40000"/>
+                  </a:schemeClr>
+                </a:outerShdw>
+              </a:effectLst>
+            </a:endParaRPr>
+          </a:p>
+        </p:txBody>
+      </p:sp>
+      <p:sp>
+        <p:nvSpPr>
+          <p:cNvPr id="7" name="矩形 6">
+            <a:extLst>
+              <a:ext uri="{FF2B5EF4-FFF2-40B4-BE49-F238E27FC236}">
+                <a16:creationId xmlns:a16="http://schemas.microsoft.com/office/drawing/2014/main" id="{B7AA7B55-B9F1-A0D8-2258-BB1F2613E998}"/>
+              </a:ext>
+            </a:extLst>
+          </p:cNvPr>
+          <p:cNvSpPr/>
+          <p:nvPr/>
+        </p:nvSpPr>
+        <p:spPr>
+          <a:xfrm>
+            <a:off x="7053003" y="2600447"/>
+            <a:ext cx="2095837" cy="760651"/>
+          </a:xfrm>
+          <a:prstGeom prst="rect">
+            <a:avLst/>
+          </a:prstGeom>
+          <a:noFill/>
+        </p:spPr>
+        <p:style>
+          <a:lnRef idx="2">
+            <a:schemeClr val="accent1">
+              <a:shade val="50000"/>
+            </a:schemeClr>
+          </a:lnRef>
+          <a:fillRef idx="1">
+            <a:schemeClr val="accent1"/>
+          </a:fillRef>
+          <a:effectRef idx="0">
+            <a:schemeClr val="accent1"/>
+          </a:effectRef>
+          <a:fontRef idx="minor">
+            <a:schemeClr val="lt1"/>
+          </a:fontRef>
+        </p:style>
+        <p:txBody>
+          <a:bodyPr rtlCol="0" anchor="ctr"/>
+          <a:lstStyle/>
+          <a:p>
+            <a:pPr algn="ctr"/>
+            <a:r>
+              <a:rPr lang="en-US" altLang="zh-TW">
+                <a:ln w="0"/>
+                <a:solidFill>
+                  <a:schemeClr val="tx1"/>
+                </a:solidFill>
+                <a:effectLst>
+                  <a:outerShdw blurRad="38100" dist="19050" dir="2700000" algn="tl" rotWithShape="0">
+                    <a:schemeClr val="dk1">
+                      <a:alpha val="40000"/>
+                    </a:schemeClr>
+                  </a:outerShdw>
+                </a:effectLst>
+              </a:rPr>
+              <a:t>Digital Condtion</a:t>
+            </a:r>
+            <a:endParaRPr lang="zh-TW" altLang="en-US">
+              <a:ln w="0"/>
+              <a:solidFill>
+                <a:schemeClr val="tx1"/>
+              </a:solidFill>
+              <a:effectLst>
+                <a:outerShdw blurRad="38100" dist="19050" dir="2700000" algn="tl" rotWithShape="0">
+                  <a:schemeClr val="dk1">
+                    <a:alpha val="40000"/>
+                  </a:schemeClr>
+                </a:outerShdw>
+              </a:effectLst>
+            </a:endParaRPr>
           </a:p>
         </p:txBody>
       </p:sp>

</xml_diff>

<commit_message>
* Update and Use anime in PPT
</commit_message>
<xml_diff>
--- a/Project_Summary_pdf/Project_Summary.pptx
+++ b/Project_Summary_pdf/Project_Summary.pptx
@@ -5,7 +5,7 @@
     <p:sldMasterId id="2147483648" r:id="rId1"/>
   </p:sldMasterIdLst>
   <p:notesMasterIdLst>
-    <p:notesMasterId r:id="rId70"/>
+    <p:notesMasterId r:id="rId71"/>
   </p:notesMasterIdLst>
   <p:sldIdLst>
     <p:sldId id="256" r:id="rId2"/>
@@ -61,21 +61,22 @@
     <p:sldId id="842" r:id="rId52"/>
     <p:sldId id="895" r:id="rId53"/>
     <p:sldId id="889" r:id="rId54"/>
-    <p:sldId id="890" r:id="rId55"/>
-    <p:sldId id="751" r:id="rId56"/>
-    <p:sldId id="882" r:id="rId57"/>
-    <p:sldId id="902" r:id="rId58"/>
-    <p:sldId id="281" r:id="rId59"/>
-    <p:sldId id="257" r:id="rId60"/>
-    <p:sldId id="258" r:id="rId61"/>
-    <p:sldId id="260" r:id="rId62"/>
-    <p:sldId id="263" r:id="rId63"/>
-    <p:sldId id="264" r:id="rId64"/>
-    <p:sldId id="259" r:id="rId65"/>
-    <p:sldId id="265" r:id="rId66"/>
-    <p:sldId id="282" r:id="rId67"/>
-    <p:sldId id="885" r:id="rId68"/>
-    <p:sldId id="904" r:id="rId69"/>
+    <p:sldId id="914" r:id="rId55"/>
+    <p:sldId id="890" r:id="rId56"/>
+    <p:sldId id="751" r:id="rId57"/>
+    <p:sldId id="882" r:id="rId58"/>
+    <p:sldId id="902" r:id="rId59"/>
+    <p:sldId id="281" r:id="rId60"/>
+    <p:sldId id="257" r:id="rId61"/>
+    <p:sldId id="258" r:id="rId62"/>
+    <p:sldId id="260" r:id="rId63"/>
+    <p:sldId id="263" r:id="rId64"/>
+    <p:sldId id="264" r:id="rId65"/>
+    <p:sldId id="259" r:id="rId66"/>
+    <p:sldId id="265" r:id="rId67"/>
+    <p:sldId id="282" r:id="rId68"/>
+    <p:sldId id="885" r:id="rId69"/>
+    <p:sldId id="904" r:id="rId70"/>
   </p:sldIdLst>
   <p:sldSz cx="12192000" cy="6858000"/>
   <p:notesSz cx="6858000" cy="9144000"/>
@@ -248,6 +249,7 @@
             <p14:sldId id="842"/>
             <p14:sldId id="895"/>
             <p14:sldId id="889"/>
+            <p14:sldId id="914"/>
             <p14:sldId id="890"/>
             <p14:sldId id="751"/>
           </p14:sldIdLst>
@@ -454,7 +456,7 @@
           <a:p>
             <a:fld id="{C65320F2-F42B-45F1-AA86-96F1A2E46749}" type="datetimeFigureOut">
               <a:rPr lang="zh-TW" altLang="en-US" smtClean="0"/>
-              <a:t>2023/2/11</a:t>
+              <a:t>2023/2/13</a:t>
             </a:fld>
             <a:endParaRPr lang="zh-TW" altLang="en-US"/>
           </a:p>
@@ -4493,7 +4495,7 @@
           <a:p>
             <a:fld id="{0116F853-F7F2-4239-A629-A213C1D67574}" type="slidenum">
               <a:rPr lang="zh-TW" altLang="en-US" smtClean="0"/>
-              <a:t>59</a:t>
+              <a:t>60</a:t>
             </a:fld>
             <a:endParaRPr lang="zh-TW" altLang="en-US"/>
           </a:p>
@@ -4641,7 +4643,7 @@
           <a:p>
             <a:fld id="{0116F853-F7F2-4239-A629-A213C1D67574}" type="slidenum">
               <a:rPr lang="zh-TW" altLang="en-US" smtClean="0"/>
-              <a:t>60</a:t>
+              <a:t>61</a:t>
             </a:fld>
             <a:endParaRPr lang="zh-TW" altLang="en-US"/>
           </a:p>
@@ -5455,7 +5457,7 @@
           <a:p>
             <a:fld id="{8A9F4CB5-1750-4E23-A13C-2C1F028F9724}" type="datetimeFigureOut">
               <a:rPr lang="zh-TW" altLang="en-US" smtClean="0"/>
-              <a:t>2023/2/11</a:t>
+              <a:t>2023/2/13</a:t>
             </a:fld>
             <a:endParaRPr lang="zh-TW" altLang="en-US"/>
           </a:p>
@@ -5653,7 +5655,7 @@
           <a:p>
             <a:fld id="{8A9F4CB5-1750-4E23-A13C-2C1F028F9724}" type="datetimeFigureOut">
               <a:rPr lang="zh-TW" altLang="en-US" smtClean="0"/>
-              <a:t>2023/2/11</a:t>
+              <a:t>2023/2/13</a:t>
             </a:fld>
             <a:endParaRPr lang="zh-TW" altLang="en-US"/>
           </a:p>
@@ -5861,7 +5863,7 @@
           <a:p>
             <a:fld id="{8A9F4CB5-1750-4E23-A13C-2C1F028F9724}" type="datetimeFigureOut">
               <a:rPr lang="zh-TW" altLang="en-US" smtClean="0"/>
-              <a:t>2023/2/11</a:t>
+              <a:t>2023/2/13</a:t>
             </a:fld>
             <a:endParaRPr lang="zh-TW" altLang="en-US"/>
           </a:p>
@@ -6059,7 +6061,7 @@
           <a:p>
             <a:fld id="{8A9F4CB5-1750-4E23-A13C-2C1F028F9724}" type="datetimeFigureOut">
               <a:rPr lang="zh-TW" altLang="en-US" smtClean="0"/>
-              <a:t>2023/2/11</a:t>
+              <a:t>2023/2/13</a:t>
             </a:fld>
             <a:endParaRPr lang="zh-TW" altLang="en-US"/>
           </a:p>
@@ -6334,7 +6336,7 @@
           <a:p>
             <a:fld id="{8A9F4CB5-1750-4E23-A13C-2C1F028F9724}" type="datetimeFigureOut">
               <a:rPr lang="zh-TW" altLang="en-US" smtClean="0"/>
-              <a:t>2023/2/11</a:t>
+              <a:t>2023/2/13</a:t>
             </a:fld>
             <a:endParaRPr lang="zh-TW" altLang="en-US"/>
           </a:p>
@@ -6599,7 +6601,7 @@
           <a:p>
             <a:fld id="{8A9F4CB5-1750-4E23-A13C-2C1F028F9724}" type="datetimeFigureOut">
               <a:rPr lang="zh-TW" altLang="en-US" smtClean="0"/>
-              <a:t>2023/2/11</a:t>
+              <a:t>2023/2/13</a:t>
             </a:fld>
             <a:endParaRPr lang="zh-TW" altLang="en-US"/>
           </a:p>
@@ -7011,7 +7013,7 @@
           <a:p>
             <a:fld id="{8A9F4CB5-1750-4E23-A13C-2C1F028F9724}" type="datetimeFigureOut">
               <a:rPr lang="zh-TW" altLang="en-US" smtClean="0"/>
-              <a:t>2023/2/11</a:t>
+              <a:t>2023/2/13</a:t>
             </a:fld>
             <a:endParaRPr lang="zh-TW" altLang="en-US"/>
           </a:p>
@@ -7152,7 +7154,7 @@
           <a:p>
             <a:fld id="{8A9F4CB5-1750-4E23-A13C-2C1F028F9724}" type="datetimeFigureOut">
               <a:rPr lang="zh-TW" altLang="en-US" smtClean="0"/>
-              <a:t>2023/2/11</a:t>
+              <a:t>2023/2/13</a:t>
             </a:fld>
             <a:endParaRPr lang="zh-TW" altLang="en-US"/>
           </a:p>
@@ -7265,7 +7267,7 @@
           <a:p>
             <a:fld id="{8A9F4CB5-1750-4E23-A13C-2C1F028F9724}" type="datetimeFigureOut">
               <a:rPr lang="zh-TW" altLang="en-US" smtClean="0"/>
-              <a:t>2023/2/11</a:t>
+              <a:t>2023/2/13</a:t>
             </a:fld>
             <a:endParaRPr lang="zh-TW" altLang="en-US"/>
           </a:p>
@@ -7576,7 +7578,7 @@
           <a:p>
             <a:fld id="{8A9F4CB5-1750-4E23-A13C-2C1F028F9724}" type="datetimeFigureOut">
               <a:rPr lang="zh-TW" altLang="en-US" smtClean="0"/>
-              <a:t>2023/2/11</a:t>
+              <a:t>2023/2/13</a:t>
             </a:fld>
             <a:endParaRPr lang="zh-TW" altLang="en-US"/>
           </a:p>
@@ -7864,7 +7866,7 @@
           <a:p>
             <a:fld id="{8A9F4CB5-1750-4E23-A13C-2C1F028F9724}" type="datetimeFigureOut">
               <a:rPr lang="zh-TW" altLang="en-US" smtClean="0"/>
-              <a:t>2023/2/11</a:t>
+              <a:t>2023/2/13</a:t>
             </a:fld>
             <a:endParaRPr lang="zh-TW" altLang="en-US"/>
           </a:p>
@@ -8105,7 +8107,7 @@
           <a:p>
             <a:fld id="{8A9F4CB5-1750-4E23-A13C-2C1F028F9724}" type="datetimeFigureOut">
               <a:rPr lang="zh-TW" altLang="en-US" smtClean="0"/>
-              <a:t>2023/2/11</a:t>
+              <a:t>2023/2/13</a:t>
             </a:fld>
             <a:endParaRPr lang="zh-TW" altLang="en-US"/>
           </a:p>
@@ -21184,8 +21186,8 @@
           </a:p>
         </p:txBody>
       </p:sp>
-      <mc:AlternateContent xmlns:mc="http://schemas.openxmlformats.org/markup-compatibility/2006">
-        <mc:Choice xmlns:a14="http://schemas.microsoft.com/office/drawing/2010/main" Requires="a14">
+      <mc:AlternateContent xmlns:mc="http://schemas.openxmlformats.org/markup-compatibility/2006" xmlns:a14="http://schemas.microsoft.com/office/drawing/2010/main">
+        <mc:Choice Requires="a14">
           <p:sp>
             <p:nvSpPr>
               <p:cNvPr id="5" name="文字方塊 4">
@@ -21265,7 +21267,7 @@
             </p:txBody>
           </p:sp>
         </mc:Choice>
-        <mc:Fallback>
+        <mc:Fallback xmlns="">
           <p:sp>
             <p:nvSpPr>
               <p:cNvPr id="5" name="文字方塊 4">
@@ -21385,8 +21387,8 @@
           </a:p>
         </p:txBody>
       </p:sp>
-      <mc:AlternateContent xmlns:mc="http://schemas.openxmlformats.org/markup-compatibility/2006">
-        <mc:Choice xmlns:a14="http://schemas.microsoft.com/office/drawing/2010/main" Requires="a14">
+      <mc:AlternateContent xmlns:mc="http://schemas.openxmlformats.org/markup-compatibility/2006" xmlns:a14="http://schemas.microsoft.com/office/drawing/2010/main">
+        <mc:Choice Requires="a14">
           <p:sp>
             <p:nvSpPr>
               <p:cNvPr id="9" name="文字方塊 8">
@@ -21450,7 +21452,7 @@
             </p:txBody>
           </p:sp>
         </mc:Choice>
-        <mc:Fallback>
+        <mc:Fallback xmlns="">
           <p:sp>
             <p:nvSpPr>
               <p:cNvPr id="9" name="文字方塊 8">
@@ -28349,8 +28351,8 @@
           </a:p>
         </p:txBody>
       </p:sp>
-      <mc:AlternateContent xmlns:mc="http://schemas.openxmlformats.org/markup-compatibility/2006">
-        <mc:Choice xmlns:a14="http://schemas.microsoft.com/office/drawing/2010/main" Requires="a14">
+      <mc:AlternateContent xmlns:mc="http://schemas.openxmlformats.org/markup-compatibility/2006" xmlns:a14="http://schemas.microsoft.com/office/drawing/2010/main">
+        <mc:Choice Requires="a14">
           <p:sp>
             <p:nvSpPr>
               <p:cNvPr id="3" name="內容版面配置區 2">
@@ -28705,7 +28707,7 @@
             </p:txBody>
           </p:sp>
         </mc:Choice>
-        <mc:Fallback>
+        <mc:Fallback xmlns="">
           <p:sp>
             <p:nvSpPr>
               <p:cNvPr id="3" name="內容版面配置區 2">
@@ -30629,6 +30631,20 @@
             <a:pPr marL="0" indent="0">
               <a:buNone/>
             </a:pPr>
+            <a:endParaRPr lang="en-US" altLang="zh-TW" dirty="0"/>
+          </a:p>
+          <a:p>
+            <a:pPr marL="0" indent="0">
+              <a:buNone/>
+            </a:pPr>
+            <a:r>
+              <a:rPr lang="en-US" altLang="zh-TW" dirty="0"/>
+              <a:t>1. </a:t>
+            </a:r>
+            <a:r>
+              <a:rPr lang="zh-TW" altLang="en-US" dirty="0"/>
+              <a:t>介紹 </a:t>
+            </a:r>
             <a:r>
               <a:rPr lang="en-US" altLang="zh-TW" dirty="0"/>
               <a:t>Auto Correlation</a:t>
@@ -30646,7 +30662,7 @@
             </a:pPr>
             <a:r>
               <a:rPr lang="en-US" altLang="zh-TW" dirty="0"/>
-              <a:t>Decode</a:t>
+              <a:t>2. Decoder</a:t>
             </a:r>
             <a:r>
               <a:rPr lang="zh-TW" altLang="en-US" dirty="0"/>
@@ -30654,7 +30670,7 @@
             </a:r>
             <a:r>
               <a:rPr lang="en-US" altLang="zh-TW" dirty="0"/>
-              <a:t>RX1 </a:t>
+              <a:t>RX1</a:t>
             </a:r>
           </a:p>
           <a:p>
@@ -30667,15 +30683,9 @@
             <a:pPr marL="0" indent="0">
               <a:buNone/>
             </a:pPr>
-            <a:endParaRPr lang="en-US" altLang="zh-TW" dirty="0"/>
-          </a:p>
-          <a:p>
-            <a:pPr marL="0" indent="0">
-              <a:buNone/>
-            </a:pPr>
-            <a:r>
-              <a:rPr lang="en-US" altLang="zh-TW" dirty="0"/>
-              <a:t>Decode RX0</a:t>
+            <a:r>
+              <a:rPr lang="en-US" altLang="zh-TW" dirty="0"/>
+              <a:t>3. Decoder RX0</a:t>
             </a:r>
             <a:endParaRPr lang="zh-TW" altLang="en-US" dirty="0"/>
           </a:p>
@@ -30853,6 +30863,99 @@
           <p:cNvPr id="2" name="標題 1">
             <a:extLst>
               <a:ext uri="{FF2B5EF4-FFF2-40B4-BE49-F238E27FC236}">
+                <a16:creationId xmlns:a16="http://schemas.microsoft.com/office/drawing/2014/main" id="{68BC7F6B-9065-EF92-9D4F-4CCFD46D0F90}"/>
+              </a:ext>
+            </a:extLst>
+          </p:cNvPr>
+          <p:cNvSpPr>
+            <a:spLocks noGrp="1"/>
+          </p:cNvSpPr>
+          <p:nvPr>
+            <p:ph type="title"/>
+          </p:nvPr>
+        </p:nvSpPr>
+        <p:spPr/>
+        <p:txBody>
+          <a:bodyPr/>
+          <a:lstStyle/>
+          <a:p>
+            <a:pPr algn="ctr"/>
+            <a:r>
+              <a:rPr lang="en-US" altLang="zh-TW" dirty="0"/>
+              <a:t>Auto </a:t>
+            </a:r>
+            <a:r>
+              <a:rPr lang="en-US" altLang="zh-TW" dirty="0" err="1"/>
+              <a:t>Corrlation</a:t>
+            </a:r>
+            <a:r>
+              <a:rPr lang="en-US" altLang="zh-TW" dirty="0"/>
+              <a:t> </a:t>
+            </a:r>
+            <a:endParaRPr lang="zh-TW" altLang="en-US" dirty="0"/>
+          </a:p>
+        </p:txBody>
+      </p:sp>
+      <p:sp>
+        <p:nvSpPr>
+          <p:cNvPr id="3" name="內容版面配置區 2">
+            <a:extLst>
+              <a:ext uri="{FF2B5EF4-FFF2-40B4-BE49-F238E27FC236}">
+                <a16:creationId xmlns:a16="http://schemas.microsoft.com/office/drawing/2014/main" id="{CE9FF161-A534-B9A9-7610-E254462C80C0}"/>
+              </a:ext>
+            </a:extLst>
+          </p:cNvPr>
+          <p:cNvSpPr>
+            <a:spLocks noGrp="1"/>
+          </p:cNvSpPr>
+          <p:nvPr>
+            <p:ph idx="1"/>
+          </p:nvPr>
+        </p:nvSpPr>
+        <p:spPr/>
+        <p:txBody>
+          <a:bodyPr/>
+          <a:lstStyle/>
+          <a:p>
+            <a:endParaRPr lang="zh-TW" altLang="en-US" dirty="0"/>
+          </a:p>
+        </p:txBody>
+      </p:sp>
+    </p:spTree>
+    <p:extLst>
+      <p:ext uri="{BB962C8B-B14F-4D97-AF65-F5344CB8AC3E}">
+        <p14:creationId xmlns:p14="http://schemas.microsoft.com/office/powerpoint/2010/main" val="2183230230"/>
+      </p:ext>
+    </p:extLst>
+  </p:cSld>
+  <p:clrMapOvr>
+    <a:masterClrMapping/>
+  </p:clrMapOvr>
+</p:sld>
+</file>
+
+<file path=ppt/slides/slide55.xml><?xml version="1.0" encoding="utf-8"?>
+<p:sld xmlns:a="http://schemas.openxmlformats.org/drawingml/2006/main" xmlns:r="http://schemas.openxmlformats.org/officeDocument/2006/relationships" xmlns:p="http://schemas.openxmlformats.org/presentationml/2006/main">
+  <p:cSld>
+    <p:spTree>
+      <p:nvGrpSpPr>
+        <p:cNvPr id="1" name=""/>
+        <p:cNvGrpSpPr/>
+        <p:nvPr/>
+      </p:nvGrpSpPr>
+      <p:grpSpPr>
+        <a:xfrm>
+          <a:off x="0" y="0"/>
+          <a:ext cx="0" cy="0"/>
+          <a:chOff x="0" y="0"/>
+          <a:chExt cx="0" cy="0"/>
+        </a:xfrm>
+      </p:grpSpPr>
+      <p:sp>
+        <p:nvSpPr>
+          <p:cNvPr id="2" name="標題 1">
+            <a:extLst>
+              <a:ext uri="{FF2B5EF4-FFF2-40B4-BE49-F238E27FC236}">
                 <a16:creationId xmlns:a16="http://schemas.microsoft.com/office/drawing/2014/main" id="{042F1310-2BFC-3D20-5FCD-AB24ABF21979}"/>
               </a:ext>
             </a:extLst>
@@ -30923,7 +31026,7 @@
 </p:sld>
 </file>
 
-<file path=ppt/slides/slide55.xml><?xml version="1.0" encoding="utf-8"?>
+<file path=ppt/slides/slide56.xml><?xml version="1.0" encoding="utf-8"?>
 <p:sld xmlns:a="http://schemas.openxmlformats.org/drawingml/2006/main" xmlns:r="http://schemas.openxmlformats.org/officeDocument/2006/relationships" xmlns:p="http://schemas.openxmlformats.org/presentationml/2006/main">
   <p:cSld>
     <p:spTree>
@@ -31460,135 +31563,6 @@
 </p:sld>
 </file>
 
-<file path=ppt/slides/slide56.xml><?xml version="1.0" encoding="utf-8"?>
-<p:sld xmlns:a="http://schemas.openxmlformats.org/drawingml/2006/main" xmlns:r="http://schemas.openxmlformats.org/officeDocument/2006/relationships" xmlns:p="http://schemas.openxmlformats.org/presentationml/2006/main">
-  <p:cSld>
-    <p:spTree>
-      <p:nvGrpSpPr>
-        <p:cNvPr id="1" name=""/>
-        <p:cNvGrpSpPr/>
-        <p:nvPr/>
-      </p:nvGrpSpPr>
-      <p:grpSpPr>
-        <a:xfrm>
-          <a:off x="0" y="0"/>
-          <a:ext cx="0" cy="0"/>
-          <a:chOff x="0" y="0"/>
-          <a:chExt cx="0" cy="0"/>
-        </a:xfrm>
-      </p:grpSpPr>
-      <p:sp>
-        <p:nvSpPr>
-          <p:cNvPr id="2" name="標題 1">
-            <a:extLst>
-              <a:ext uri="{FF2B5EF4-FFF2-40B4-BE49-F238E27FC236}">
-                <a16:creationId xmlns:a16="http://schemas.microsoft.com/office/drawing/2014/main" id="{E32E6CD8-2503-30B7-A4F8-AE84BE484917}"/>
-              </a:ext>
-            </a:extLst>
-          </p:cNvPr>
-          <p:cNvSpPr>
-            <a:spLocks noGrp="1"/>
-          </p:cNvSpPr>
-          <p:nvPr>
-            <p:ph type="title"/>
-          </p:nvPr>
-        </p:nvSpPr>
-        <p:spPr/>
-        <p:txBody>
-          <a:bodyPr/>
-          <a:lstStyle/>
-          <a:p>
-            <a:pPr algn="ctr"/>
-            <a:r>
-              <a:rPr lang="en-US" altLang="zh-TW" dirty="0"/>
-              <a:t>AGC flow</a:t>
-            </a:r>
-            <a:r>
-              <a:rPr lang="zh-TW" altLang="en-US" dirty="0"/>
-              <a:t>架構過程</a:t>
-            </a:r>
-          </a:p>
-        </p:txBody>
-      </p:sp>
-      <p:sp>
-        <p:nvSpPr>
-          <p:cNvPr id="3" name="內容版面配置區 2">
-            <a:extLst>
-              <a:ext uri="{FF2B5EF4-FFF2-40B4-BE49-F238E27FC236}">
-                <a16:creationId xmlns:a16="http://schemas.microsoft.com/office/drawing/2014/main" id="{ED8640AC-FE27-0D8C-6B75-7018404197B3}"/>
-              </a:ext>
-            </a:extLst>
-          </p:cNvPr>
-          <p:cNvSpPr>
-            <a:spLocks noGrp="1"/>
-          </p:cNvSpPr>
-          <p:nvPr>
-            <p:ph idx="1"/>
-          </p:nvPr>
-        </p:nvSpPr>
-        <p:spPr/>
-        <p:txBody>
-          <a:bodyPr/>
-          <a:lstStyle/>
-          <a:p>
-            <a:pPr marL="514350" indent="-514350">
-              <a:buAutoNum type="arabicPeriod"/>
-            </a:pPr>
-            <a:r>
-              <a:rPr lang="zh-TW" altLang="en-US" dirty="0"/>
-              <a:t>前期</a:t>
-            </a:r>
-            <a:r>
-              <a:rPr lang="en-US" altLang="zh-TW" dirty="0"/>
-              <a:t>ISSUE</a:t>
-            </a:r>
-          </a:p>
-          <a:p>
-            <a:pPr marL="514350" indent="-514350">
-              <a:buAutoNum type="arabicPeriod"/>
-            </a:pPr>
-            <a:endParaRPr lang="en-US" altLang="zh-TW" dirty="0"/>
-          </a:p>
-          <a:p>
-            <a:pPr marL="514350" indent="-514350">
-              <a:buAutoNum type="arabicPeriod"/>
-            </a:pPr>
-            <a:r>
-              <a:rPr lang="zh-TW" altLang="en-US" dirty="0"/>
-              <a:t>中後期統計</a:t>
-            </a:r>
-            <a:endParaRPr lang="en-US" altLang="zh-TW" dirty="0"/>
-          </a:p>
-          <a:p>
-            <a:pPr marL="514350" indent="-514350">
-              <a:buAutoNum type="arabicPeriod"/>
-            </a:pPr>
-            <a:endParaRPr lang="en-US" altLang="zh-TW" dirty="0"/>
-          </a:p>
-          <a:p>
-            <a:pPr marL="514350" indent="-514350">
-              <a:buAutoNum type="arabicPeriod"/>
-            </a:pPr>
-            <a:r>
-              <a:rPr lang="zh-TW" altLang="en-US" dirty="0"/>
-              <a:t>後期完工</a:t>
-            </a:r>
-          </a:p>
-        </p:txBody>
-      </p:sp>
-    </p:spTree>
-    <p:extLst>
-      <p:ext uri="{BB962C8B-B14F-4D97-AF65-F5344CB8AC3E}">
-        <p14:creationId xmlns:p14="http://schemas.microsoft.com/office/powerpoint/2010/main" val="3478487214"/>
-      </p:ext>
-    </p:extLst>
-  </p:cSld>
-  <p:clrMapOvr>
-    <a:masterClrMapping/>
-  </p:clrMapOvr>
-</p:sld>
-</file>
-
 <file path=ppt/slides/slide57.xml><?xml version="1.0" encoding="utf-8"?>
 <p:sld xmlns:a="http://schemas.openxmlformats.org/drawingml/2006/main" xmlns:r="http://schemas.openxmlformats.org/officeDocument/2006/relationships" xmlns:p="http://schemas.openxmlformats.org/presentationml/2006/main">
   <p:cSld>
@@ -31611,7 +31585,7 @@
           <p:cNvPr id="2" name="標題 1">
             <a:extLst>
               <a:ext uri="{FF2B5EF4-FFF2-40B4-BE49-F238E27FC236}">
-                <a16:creationId xmlns:a16="http://schemas.microsoft.com/office/drawing/2014/main" id="{3A28C725-6131-003C-3B09-A135BB92DB74}"/>
+                <a16:creationId xmlns:a16="http://schemas.microsoft.com/office/drawing/2014/main" id="{E32E6CD8-2503-30B7-A4F8-AE84BE484917}"/>
               </a:ext>
             </a:extLst>
           </p:cNvPr>
@@ -31627,7 +31601,15 @@
           <a:bodyPr/>
           <a:lstStyle/>
           <a:p>
-            <a:endParaRPr lang="zh-TW" altLang="en-US"/>
+            <a:pPr algn="ctr"/>
+            <a:r>
+              <a:rPr lang="en-US" altLang="zh-TW" dirty="0"/>
+              <a:t>AGC flow</a:t>
+            </a:r>
+            <a:r>
+              <a:rPr lang="zh-TW" altLang="en-US" dirty="0"/>
+              <a:t>架構過程</a:t>
+            </a:r>
           </a:p>
         </p:txBody>
       </p:sp>
@@ -31636,7 +31618,7 @@
           <p:cNvPr id="3" name="內容版面配置區 2">
             <a:extLst>
               <a:ext uri="{FF2B5EF4-FFF2-40B4-BE49-F238E27FC236}">
-                <a16:creationId xmlns:a16="http://schemas.microsoft.com/office/drawing/2014/main" id="{5818DC31-9BA2-F239-57B3-E888E732592C}"/>
+                <a16:creationId xmlns:a16="http://schemas.microsoft.com/office/drawing/2014/main" id="{ED8640AC-FE27-0D8C-6B75-7018404197B3}"/>
               </a:ext>
             </a:extLst>
           </p:cNvPr>
@@ -31652,17 +31634,47 @@
           <a:bodyPr/>
           <a:lstStyle/>
           <a:p>
-            <a:r>
-              <a:rPr lang="zh-TW" altLang="en-US" dirty="0"/>
-              <a:t>為何要取</a:t>
-            </a:r>
-            <a:r>
-              <a:rPr lang="en-US" altLang="zh-TW" dirty="0"/>
-              <a:t>4T</a:t>
-            </a:r>
-            <a:r>
-              <a:rPr lang="zh-TW" altLang="en-US" dirty="0"/>
-              <a:t>來做的原因</a:t>
+            <a:pPr marL="514350" indent="-514350">
+              <a:buAutoNum type="arabicPeriod"/>
+            </a:pPr>
+            <a:r>
+              <a:rPr lang="zh-TW" altLang="en-US" dirty="0"/>
+              <a:t>前期</a:t>
+            </a:r>
+            <a:r>
+              <a:rPr lang="en-US" altLang="zh-TW" dirty="0"/>
+              <a:t>ISSUE</a:t>
+            </a:r>
+          </a:p>
+          <a:p>
+            <a:pPr marL="514350" indent="-514350">
+              <a:buAutoNum type="arabicPeriod"/>
+            </a:pPr>
+            <a:endParaRPr lang="en-US" altLang="zh-TW" dirty="0"/>
+          </a:p>
+          <a:p>
+            <a:pPr marL="514350" indent="-514350">
+              <a:buAutoNum type="arabicPeriod"/>
+            </a:pPr>
+            <a:r>
+              <a:rPr lang="zh-TW" altLang="en-US" dirty="0"/>
+              <a:t>中後期統計</a:t>
+            </a:r>
+            <a:endParaRPr lang="en-US" altLang="zh-TW" dirty="0"/>
+          </a:p>
+          <a:p>
+            <a:pPr marL="514350" indent="-514350">
+              <a:buAutoNum type="arabicPeriod"/>
+            </a:pPr>
+            <a:endParaRPr lang="en-US" altLang="zh-TW" dirty="0"/>
+          </a:p>
+          <a:p>
+            <a:pPr marL="514350" indent="-514350">
+              <a:buAutoNum type="arabicPeriod"/>
+            </a:pPr>
+            <a:r>
+              <a:rPr lang="zh-TW" altLang="en-US" dirty="0"/>
+              <a:t>後期完工</a:t>
             </a:r>
           </a:p>
         </p:txBody>
@@ -31670,7 +31682,7 @@
     </p:spTree>
     <p:extLst>
       <p:ext uri="{BB962C8B-B14F-4D97-AF65-F5344CB8AC3E}">
-        <p14:creationId xmlns:p14="http://schemas.microsoft.com/office/powerpoint/2010/main" val="147892164"/>
+        <p14:creationId xmlns:p14="http://schemas.microsoft.com/office/powerpoint/2010/main" val="3478487214"/>
       </p:ext>
     </p:extLst>
   </p:cSld>
@@ -31702,7 +31714,7 @@
           <p:cNvPr id="2" name="標題 1">
             <a:extLst>
               <a:ext uri="{FF2B5EF4-FFF2-40B4-BE49-F238E27FC236}">
-                <a16:creationId xmlns:a16="http://schemas.microsoft.com/office/drawing/2014/main" id="{75A8CDCF-D217-9237-F0F3-F03F7A3BC82D}"/>
+                <a16:creationId xmlns:a16="http://schemas.microsoft.com/office/drawing/2014/main" id="{3A28C725-6131-003C-3B09-A135BB92DB74}"/>
               </a:ext>
             </a:extLst>
           </p:cNvPr>
@@ -31718,7 +31730,7 @@
           <a:bodyPr/>
           <a:lstStyle/>
           <a:p>
-            <a:endParaRPr lang="zh-TW" altLang="en-US" dirty="0"/>
+            <a:endParaRPr lang="zh-TW" altLang="en-US"/>
           </a:p>
         </p:txBody>
       </p:sp>
@@ -31727,7 +31739,7 @@
           <p:cNvPr id="3" name="內容版面配置區 2">
             <a:extLst>
               <a:ext uri="{FF2B5EF4-FFF2-40B4-BE49-F238E27FC236}">
-                <a16:creationId xmlns:a16="http://schemas.microsoft.com/office/drawing/2014/main" id="{A5250B66-E56F-5AAD-0B99-C4E8E1B221C2}"/>
+                <a16:creationId xmlns:a16="http://schemas.microsoft.com/office/drawing/2014/main" id="{5818DC31-9BA2-F239-57B3-E888E732592C}"/>
               </a:ext>
             </a:extLst>
           </p:cNvPr>
@@ -31743,14 +31755,25 @@
           <a:bodyPr/>
           <a:lstStyle/>
           <a:p>
-            <a:endParaRPr lang="zh-TW" altLang="en-US"/>
+            <a:r>
+              <a:rPr lang="zh-TW" altLang="en-US" dirty="0"/>
+              <a:t>為何要取</a:t>
+            </a:r>
+            <a:r>
+              <a:rPr lang="en-US" altLang="zh-TW" dirty="0"/>
+              <a:t>4T</a:t>
+            </a:r>
+            <a:r>
+              <a:rPr lang="zh-TW" altLang="en-US" dirty="0"/>
+              <a:t>來做的原因</a:t>
+            </a:r>
           </a:p>
         </p:txBody>
       </p:sp>
     </p:spTree>
     <p:extLst>
       <p:ext uri="{BB962C8B-B14F-4D97-AF65-F5344CB8AC3E}">
-        <p14:creationId xmlns:p14="http://schemas.microsoft.com/office/powerpoint/2010/main" val="2364024188"/>
+        <p14:creationId xmlns:p14="http://schemas.microsoft.com/office/powerpoint/2010/main" val="147892164"/>
       </p:ext>
     </p:extLst>
   </p:cSld>
@@ -31782,7 +31805,7 @@
           <p:cNvPr id="2" name="標題 1">
             <a:extLst>
               <a:ext uri="{FF2B5EF4-FFF2-40B4-BE49-F238E27FC236}">
-                <a16:creationId xmlns:a16="http://schemas.microsoft.com/office/drawing/2014/main" id="{02C3FE11-1F15-4971-95B5-34F7811B7E8A}"/>
+                <a16:creationId xmlns:a16="http://schemas.microsoft.com/office/drawing/2014/main" id="{75A8CDCF-D217-9237-F0F3-F03F7A3BC82D}"/>
               </a:ext>
             </a:extLst>
           </p:cNvPr>
@@ -31798,19 +31821,6 @@
           <a:bodyPr/>
           <a:lstStyle/>
           <a:p>
-            <a:pPr algn="ctr"/>
-            <a:r>
-              <a:rPr lang="en-US" altLang="zh-TW" dirty="0"/>
-              <a:t>Color </a:t>
-            </a:r>
-            <a:r>
-              <a:rPr lang="en-US" altLang="zh-TW" dirty="0" err="1"/>
-              <a:t>Pikcing</a:t>
-            </a:r>
-            <a:r>
-              <a:rPr lang="en-US" altLang="zh-TW" dirty="0"/>
-              <a:t> Project</a:t>
-            </a:r>
             <a:endParaRPr lang="zh-TW" altLang="en-US" dirty="0"/>
           </a:p>
         </p:txBody>
@@ -31820,7 +31830,7 @@
           <p:cNvPr id="3" name="內容版面配置區 2">
             <a:extLst>
               <a:ext uri="{FF2B5EF4-FFF2-40B4-BE49-F238E27FC236}">
-                <a16:creationId xmlns:a16="http://schemas.microsoft.com/office/drawing/2014/main" id="{5C2571F1-765B-42C3-8AAC-2A8441E0FBA0}"/>
+                <a16:creationId xmlns:a16="http://schemas.microsoft.com/office/drawing/2014/main" id="{A5250B66-E56F-5AAD-0B99-C4E8E1B221C2}"/>
               </a:ext>
             </a:extLst>
           </p:cNvPr>
@@ -31836,74 +31846,14 @@
           <a:bodyPr/>
           <a:lstStyle/>
           <a:p>
-            <a:pPr marL="457200" lvl="1" indent="0">
-              <a:lnSpc>
-                <a:spcPct val="150000"/>
-              </a:lnSpc>
-              <a:buNone/>
-            </a:pPr>
-            <a:r>
-              <a:rPr lang="zh-TW" altLang="en-US" sz="2800" dirty="0">
-                <a:solidFill>
-                  <a:srgbClr val="FF0000"/>
-                </a:solidFill>
-              </a:rPr>
-              <a:t>目的</a:t>
-            </a:r>
-            <a:r>
-              <a:rPr lang="zh-TW" altLang="en-US" dirty="0"/>
-              <a:t> </a:t>
-            </a:r>
-            <a:r>
-              <a:rPr lang="en-US" altLang="zh-TW" dirty="0"/>
-              <a:t>:</a:t>
-            </a:r>
-            <a:r>
-              <a:rPr lang="zh-TW" altLang="en-US" dirty="0"/>
-              <a:t>  按壓</a:t>
-            </a:r>
-            <a:r>
-              <a:rPr lang="en-US" altLang="zh-TW" dirty="0"/>
-              <a:t>Color Sensor</a:t>
-            </a:r>
-            <a:r>
-              <a:rPr lang="zh-TW" altLang="en-US" dirty="0"/>
-              <a:t>選擇顏色、並透過筆在</a:t>
-            </a:r>
-            <a:r>
-              <a:rPr lang="en-US" altLang="zh-TW" dirty="0"/>
-              <a:t>Host</a:t>
-            </a:r>
-            <a:r>
-              <a:rPr lang="zh-TW" altLang="en-US" dirty="0"/>
-              <a:t>上畫出對應的顏色</a:t>
-            </a:r>
-            <a:endParaRPr lang="en-US" altLang="zh-TW" dirty="0"/>
-          </a:p>
-          <a:p>
-            <a:pPr marL="457200" lvl="1" indent="0">
-              <a:lnSpc>
-                <a:spcPct val="150000"/>
-              </a:lnSpc>
-              <a:buNone/>
-            </a:pPr>
-            <a:endParaRPr lang="en-US" altLang="zh-TW" dirty="0"/>
-          </a:p>
-          <a:p>
-            <a:pPr marL="457200" lvl="1" indent="0">
-              <a:lnSpc>
-                <a:spcPct val="150000"/>
-              </a:lnSpc>
-              <a:buNone/>
-            </a:pPr>
-            <a:endParaRPr lang="en-US" altLang="zh-TW" dirty="0"/>
+            <a:endParaRPr lang="zh-TW" altLang="en-US"/>
           </a:p>
         </p:txBody>
       </p:sp>
     </p:spTree>
     <p:extLst>
       <p:ext uri="{BB962C8B-B14F-4D97-AF65-F5344CB8AC3E}">
-        <p14:creationId xmlns:p14="http://schemas.microsoft.com/office/powerpoint/2010/main" val="263751651"/>
+        <p14:creationId xmlns:p14="http://schemas.microsoft.com/office/powerpoint/2010/main" val="2364024188"/>
       </p:ext>
     </p:extLst>
   </p:cSld>
@@ -32030,7 +31980,7 @@
           <p:cNvPr id="2" name="標題 1">
             <a:extLst>
               <a:ext uri="{FF2B5EF4-FFF2-40B4-BE49-F238E27FC236}">
-                <a16:creationId xmlns:a16="http://schemas.microsoft.com/office/drawing/2014/main" id="{36663CA0-2783-4A34-8C5A-24686BD0A02B}"/>
+                <a16:creationId xmlns:a16="http://schemas.microsoft.com/office/drawing/2014/main" id="{02C3FE11-1F15-4971-95B5-34F7811B7E8A}"/>
               </a:ext>
             </a:extLst>
           </p:cNvPr>
@@ -32048,9 +31998,18 @@
           <a:p>
             <a:pPr algn="ctr"/>
             <a:r>
-              <a:rPr lang="zh-TW" altLang="en-US" dirty="0"/>
-              <a:t>主要遇到的問題</a:t>
-            </a:r>
+              <a:rPr lang="en-US" altLang="zh-TW" dirty="0"/>
+              <a:t>Color </a:t>
+            </a:r>
+            <a:r>
+              <a:rPr lang="en-US" altLang="zh-TW" dirty="0" err="1"/>
+              <a:t>Pikcing</a:t>
+            </a:r>
+            <a:r>
+              <a:rPr lang="en-US" altLang="zh-TW" dirty="0"/>
+              <a:t> Project</a:t>
+            </a:r>
+            <a:endParaRPr lang="zh-TW" altLang="en-US" dirty="0"/>
           </a:p>
         </p:txBody>
       </p:sp>
@@ -32059,7 +32018,7 @@
           <p:cNvPr id="3" name="內容版面配置區 2">
             <a:extLst>
               <a:ext uri="{FF2B5EF4-FFF2-40B4-BE49-F238E27FC236}">
-                <a16:creationId xmlns:a16="http://schemas.microsoft.com/office/drawing/2014/main" id="{4EB3A3B7-3819-4E07-A5DF-C15C993A0B95}"/>
+                <a16:creationId xmlns:a16="http://schemas.microsoft.com/office/drawing/2014/main" id="{5C2571F1-765B-42C3-8AAC-2A8441E0FBA0}"/>
               </a:ext>
             </a:extLst>
           </p:cNvPr>
@@ -32075,144 +32034,66 @@
           <a:bodyPr/>
           <a:lstStyle/>
           <a:p>
-            <a:pPr marL="0" indent="0">
+            <a:pPr marL="457200" lvl="1" indent="0">
+              <a:lnSpc>
+                <a:spcPct val="150000"/>
+              </a:lnSpc>
               <a:buNone/>
             </a:pPr>
             <a:r>
-              <a:rPr lang="zh-TW" altLang="en-US" dirty="0">
+              <a:rPr lang="zh-TW" altLang="en-US" sz="2800" dirty="0">
                 <a:solidFill>
-                  <a:schemeClr val="accent1"/>
+                  <a:srgbClr val="FF0000"/>
                 </a:solidFill>
               </a:rPr>
-              <a:t>問題</a:t>
-            </a:r>
-            <a:endParaRPr lang="en-US" altLang="zh-TW" dirty="0">
-              <a:solidFill>
-                <a:schemeClr val="accent1"/>
-              </a:solidFill>
-            </a:endParaRPr>
-          </a:p>
-          <a:p>
-            <a:pPr marL="514350" indent="-514350">
-              <a:buAutoNum type="arabicPeriod"/>
+              <a:t>目的</a:t>
+            </a:r>
+            <a:r>
+              <a:rPr lang="zh-TW" altLang="en-US" dirty="0"/>
+              <a:t> </a:t>
+            </a:r>
+            <a:r>
+              <a:rPr lang="en-US" altLang="zh-TW" dirty="0"/>
+              <a:t>:</a:t>
+            </a:r>
+            <a:r>
+              <a:rPr lang="zh-TW" altLang="en-US" dirty="0"/>
+              <a:t>  按壓</a:t>
+            </a:r>
+            <a:r>
+              <a:rPr lang="en-US" altLang="zh-TW" dirty="0"/>
+              <a:t>Color Sensor</a:t>
+            </a:r>
+            <a:r>
+              <a:rPr lang="zh-TW" altLang="en-US" dirty="0"/>
+              <a:t>選擇顏色、並透過筆在</a:t>
+            </a:r>
+            <a:r>
+              <a:rPr lang="en-US" altLang="zh-TW" dirty="0"/>
+              <a:t>Host</a:t>
+            </a:r>
+            <a:r>
+              <a:rPr lang="zh-TW" altLang="en-US" dirty="0"/>
+              <a:t>上畫出對應的顏色</a:t>
+            </a:r>
+            <a:endParaRPr lang="en-US" altLang="zh-TW" dirty="0"/>
+          </a:p>
+          <a:p>
+            <a:pPr marL="457200" lvl="1" indent="0">
+              <a:lnSpc>
+                <a:spcPct val="150000"/>
+              </a:lnSpc>
+              <a:buNone/>
             </a:pPr>
             <a:endParaRPr lang="en-US" altLang="zh-TW" dirty="0"/>
           </a:p>
           <a:p>
-            <a:pPr marL="514350" indent="-514350">
-              <a:buAutoNum type="arabicPeriod"/>
-            </a:pPr>
-            <a:r>
-              <a:rPr lang="zh-TW" altLang="en-US" sz="2400" dirty="0">
-                <a:hlinkClick r:id="rId3" action="ppaction://hlinksldjump"/>
-              </a:rPr>
-              <a:t>傳輸問題 </a:t>
-            </a:r>
-            <a:r>
-              <a:rPr lang="en-US" altLang="zh-TW" sz="2400" dirty="0"/>
-              <a:t>:</a:t>
-            </a:r>
-            <a:r>
-              <a:rPr lang="zh-TW" altLang="en-US" sz="2400" dirty="0"/>
-              <a:t> </a:t>
-            </a:r>
-            <a:endParaRPr lang="en-US" altLang="zh-TW" sz="2400" dirty="0"/>
-          </a:p>
-          <a:p>
             <a:pPr marL="457200" lvl="1" indent="0">
+              <a:lnSpc>
+                <a:spcPct val="150000"/>
+              </a:lnSpc>
               <a:buNone/>
             </a:pPr>
-            <a:r>
-              <a:rPr lang="en-US" altLang="zh-TW" sz="2000" dirty="0"/>
-              <a:t>1.  Set UART</a:t>
-            </a:r>
-            <a:r>
-              <a:rPr lang="zh-TW" altLang="en-US" sz="2000" dirty="0"/>
-              <a:t> </a:t>
-            </a:r>
-            <a:r>
-              <a:rPr lang="en-US" altLang="zh-TW" sz="2000" dirty="0"/>
-              <a:t>RX</a:t>
-            </a:r>
-            <a:r>
-              <a:rPr lang="zh-TW" altLang="en-US" sz="2000" dirty="0"/>
-              <a:t> </a:t>
-            </a:r>
-            <a:r>
-              <a:rPr lang="en-US" altLang="zh-TW" sz="2000" dirty="0"/>
-              <a:t>Setting </a:t>
-            </a:r>
-            <a:r>
-              <a:rPr lang="zh-TW" altLang="en-US" sz="2000" dirty="0"/>
-              <a:t>以及 </a:t>
-            </a:r>
-            <a:r>
-              <a:rPr lang="en-US" altLang="zh-TW" sz="2000" dirty="0"/>
-              <a:t>Flow </a:t>
-            </a:r>
-            <a:r>
-              <a:rPr lang="zh-TW" altLang="en-US" sz="2000" dirty="0"/>
-              <a:t>規劃</a:t>
-            </a:r>
-            <a:endParaRPr lang="en-US" altLang="zh-TW" sz="2000" dirty="0"/>
-          </a:p>
-          <a:p>
-            <a:pPr marL="0" indent="0">
-              <a:buNone/>
-            </a:pPr>
-            <a:endParaRPr lang="en-US" altLang="zh-TW" sz="2400" dirty="0"/>
-          </a:p>
-          <a:p>
-            <a:pPr marL="457200" indent="-457200">
-              <a:buAutoNum type="arabicPeriod" startAt="2"/>
-            </a:pPr>
-            <a:r>
-              <a:rPr lang="zh-TW" altLang="en-US" sz="2400" dirty="0">
-                <a:hlinkClick r:id="rId4" action="ppaction://hlinksldjump"/>
-              </a:rPr>
-              <a:t>最接近顏色</a:t>
-            </a:r>
-            <a:r>
-              <a:rPr lang="en-US" altLang="zh-TW" sz="2400" dirty="0"/>
-              <a:t>:</a:t>
-            </a:r>
-          </a:p>
-          <a:p>
-            <a:pPr marL="914400" lvl="1" indent="-457200">
-              <a:buAutoNum type="arabicPeriod" startAt="2"/>
-            </a:pPr>
-            <a:r>
-              <a:rPr lang="zh-TW" altLang="en-US" sz="2000" dirty="0"/>
-              <a:t>筆的</a:t>
-            </a:r>
-            <a:r>
-              <a:rPr lang="en-US" altLang="zh-TW" sz="2000" dirty="0" err="1"/>
-              <a:t>Protocal</a:t>
-            </a:r>
-            <a:r>
-              <a:rPr lang="en-US" altLang="zh-TW" sz="2000" dirty="0"/>
-              <a:t> </a:t>
-            </a:r>
-            <a:r>
-              <a:rPr lang="zh-TW" altLang="en-US" sz="2000" dirty="0"/>
-              <a:t>定義的顏色只佔</a:t>
-            </a:r>
-            <a:r>
-              <a:rPr lang="en-US" altLang="zh-TW" sz="2000" dirty="0"/>
-              <a:t>RGB</a:t>
-            </a:r>
-            <a:r>
-              <a:rPr lang="zh-TW" altLang="en-US" sz="2000" dirty="0"/>
-              <a:t>裡面</a:t>
-            </a:r>
-            <a:r>
-              <a:rPr lang="en-US" altLang="zh-TW" sz="2000" dirty="0"/>
-              <a:t>200</a:t>
-            </a:r>
-            <a:r>
-              <a:rPr lang="zh-TW" altLang="en-US" sz="2000" dirty="0"/>
-              <a:t>多個</a:t>
-            </a:r>
             <a:endParaRPr lang="en-US" altLang="zh-TW" dirty="0"/>
           </a:p>
         </p:txBody>
@@ -32220,7 +32101,7 @@
     </p:spTree>
     <p:extLst>
       <p:ext uri="{BB962C8B-B14F-4D97-AF65-F5344CB8AC3E}">
-        <p14:creationId xmlns:p14="http://schemas.microsoft.com/office/powerpoint/2010/main" val="2576856385"/>
+        <p14:creationId xmlns:p14="http://schemas.microsoft.com/office/powerpoint/2010/main" val="263751651"/>
       </p:ext>
     </p:extLst>
   </p:cSld>
@@ -32252,7 +32133,7 @@
           <p:cNvPr id="2" name="標題 1">
             <a:extLst>
               <a:ext uri="{FF2B5EF4-FFF2-40B4-BE49-F238E27FC236}">
-                <a16:creationId xmlns:a16="http://schemas.microsoft.com/office/drawing/2014/main" id="{FEDEBC06-C75E-5899-979E-C29912B4A68E}"/>
+                <a16:creationId xmlns:a16="http://schemas.microsoft.com/office/drawing/2014/main" id="{36663CA0-2783-4A34-8C5A-24686BD0A02B}"/>
               </a:ext>
             </a:extLst>
           </p:cNvPr>
@@ -32270,10 +32151,9 @@
           <a:p>
             <a:pPr algn="ctr"/>
             <a:r>
-              <a:rPr lang="en-US" altLang="zh-TW" dirty="0"/>
-              <a:t>UART RX Setting</a:t>
-            </a:r>
-            <a:endParaRPr lang="zh-TW" altLang="en-US" dirty="0"/>
+              <a:rPr lang="zh-TW" altLang="en-US" dirty="0"/>
+              <a:t>主要遇到的問題</a:t>
+            </a:r>
           </a:p>
         </p:txBody>
       </p:sp>
@@ -32282,7 +32162,7 @@
           <p:cNvPr id="3" name="內容版面配置區 2">
             <a:extLst>
               <a:ext uri="{FF2B5EF4-FFF2-40B4-BE49-F238E27FC236}">
-                <a16:creationId xmlns:a16="http://schemas.microsoft.com/office/drawing/2014/main" id="{D33F5725-65BC-FF79-0EEB-A34DF7904932}"/>
+                <a16:creationId xmlns:a16="http://schemas.microsoft.com/office/drawing/2014/main" id="{4EB3A3B7-3819-4E07-A5DF-C15C993A0B95}"/>
               </a:ext>
             </a:extLst>
           </p:cNvPr>
@@ -32295,79 +32175,155 @@
         </p:nvSpPr>
         <p:spPr/>
         <p:txBody>
-          <a:bodyPr>
-            <a:normAutofit/>
-          </a:bodyPr>
-          <a:lstStyle/>
+          <a:bodyPr/>
+          <a:lstStyle/>
+          <a:p>
+            <a:pPr marL="0" indent="0">
+              <a:buNone/>
+            </a:pPr>
+            <a:r>
+              <a:rPr lang="zh-TW" altLang="en-US" dirty="0">
+                <a:solidFill>
+                  <a:schemeClr val="accent1"/>
+                </a:solidFill>
+              </a:rPr>
+              <a:t>問題</a:t>
+            </a:r>
+            <a:endParaRPr lang="en-US" altLang="zh-TW" dirty="0">
+              <a:solidFill>
+                <a:schemeClr val="accent1"/>
+              </a:solidFill>
+            </a:endParaRPr>
+          </a:p>
           <a:p>
             <a:pPr marL="514350" indent="-514350">
               <a:buAutoNum type="arabicPeriod"/>
             </a:pPr>
-            <a:r>
-              <a:rPr lang="en-US" altLang="zh-TW" sz="2000" dirty="0"/>
-              <a:t>UART</a:t>
-            </a:r>
-            <a:r>
-              <a:rPr lang="zh-TW" altLang="en-US" sz="2000" dirty="0"/>
-              <a:t> </a:t>
-            </a:r>
-            <a:r>
-              <a:rPr lang="en-US" altLang="zh-TW" sz="2000" dirty="0"/>
-              <a:t>RX</a:t>
-            </a:r>
-            <a:r>
-              <a:rPr lang="zh-TW" altLang="en-US" sz="2000" dirty="0"/>
-              <a:t> 使用</a:t>
-            </a:r>
-            <a:r>
-              <a:rPr lang="en-US" altLang="zh-TW" sz="2000" dirty="0"/>
-              <a:t>FIFO</a:t>
-            </a:r>
-            <a:r>
-              <a:rPr lang="zh-TW" altLang="en-US" sz="2000" dirty="0"/>
-              <a:t> 架構、這個</a:t>
-            </a:r>
-            <a:r>
-              <a:rPr lang="en-US" altLang="zh-TW" sz="2000" dirty="0"/>
-              <a:t>FIFO</a:t>
-            </a:r>
-            <a:r>
-              <a:rPr lang="zh-TW" altLang="en-US" sz="2000" dirty="0"/>
-              <a:t>架構是被封裝過。</a:t>
-            </a:r>
-            <a:endParaRPr lang="en-US" altLang="zh-TW" sz="2000" dirty="0"/>
+            <a:endParaRPr lang="en-US" altLang="zh-TW" dirty="0"/>
           </a:p>
           <a:p>
             <a:pPr marL="514350" indent="-514350">
               <a:buAutoNum type="arabicPeriod"/>
             </a:pPr>
+            <a:r>
+              <a:rPr lang="zh-TW" altLang="en-US" sz="2400" dirty="0">
+                <a:hlinkClick r:id="rId3" action="ppaction://hlinksldjump"/>
+              </a:rPr>
+              <a:t>傳輸問題 </a:t>
+            </a:r>
+            <a:r>
+              <a:rPr lang="en-US" altLang="zh-TW" sz="2400" dirty="0"/>
+              <a:t>:</a:t>
+            </a:r>
+            <a:r>
+              <a:rPr lang="zh-TW" altLang="en-US" sz="2400" dirty="0"/>
+              <a:t> </a:t>
+            </a:r>
+            <a:endParaRPr lang="en-US" altLang="zh-TW" sz="2400" dirty="0"/>
+          </a:p>
+          <a:p>
+            <a:pPr marL="457200" lvl="1" indent="0">
+              <a:buNone/>
+            </a:pPr>
+            <a:r>
+              <a:rPr lang="en-US" altLang="zh-TW" sz="2000" dirty="0"/>
+              <a:t>1.  Set UART</a:t>
+            </a:r>
+            <a:r>
+              <a:rPr lang="zh-TW" altLang="en-US" sz="2000" dirty="0"/>
+              <a:t> </a:t>
+            </a:r>
+            <a:r>
+              <a:rPr lang="en-US" altLang="zh-TW" sz="2000" dirty="0"/>
+              <a:t>RX</a:t>
+            </a:r>
+            <a:r>
+              <a:rPr lang="zh-TW" altLang="en-US" sz="2000" dirty="0"/>
+              <a:t> </a:t>
+            </a:r>
+            <a:r>
+              <a:rPr lang="en-US" altLang="zh-TW" sz="2000" dirty="0"/>
+              <a:t>Setting </a:t>
+            </a:r>
+            <a:r>
+              <a:rPr lang="zh-TW" altLang="en-US" sz="2000" dirty="0"/>
+              <a:t>以及 </a:t>
+            </a:r>
+            <a:r>
+              <a:rPr lang="en-US" altLang="zh-TW" sz="2000" dirty="0"/>
+              <a:t>Flow </a:t>
+            </a:r>
+            <a:r>
+              <a:rPr lang="zh-TW" altLang="en-US" sz="2000" dirty="0"/>
+              <a:t>規劃</a:t>
+            </a:r>
             <a:endParaRPr lang="en-US" altLang="zh-TW" sz="2000" dirty="0"/>
           </a:p>
           <a:p>
-            <a:pPr marL="514350" indent="-514350">
-              <a:buAutoNum type="arabicPeriod"/>
+            <a:pPr marL="0" indent="0">
+              <a:buNone/>
             </a:pPr>
-            <a:endParaRPr lang="en-US" altLang="zh-TW" sz="2000" dirty="0"/>
-          </a:p>
-          <a:p>
-            <a:pPr marL="514350" indent="-514350">
-              <a:buAutoNum type="arabicPeriod"/>
+            <a:endParaRPr lang="en-US" altLang="zh-TW" sz="2400" dirty="0"/>
+          </a:p>
+          <a:p>
+            <a:pPr marL="457200" indent="-457200">
+              <a:buAutoNum type="arabicPeriod" startAt="2"/>
             </a:pPr>
             <a:r>
+              <a:rPr lang="zh-TW" altLang="en-US" sz="2400" dirty="0">
+                <a:hlinkClick r:id="rId4" action="ppaction://hlinksldjump"/>
+              </a:rPr>
+              <a:t>最接近顏色</a:t>
+            </a:r>
+            <a:r>
+              <a:rPr lang="en-US" altLang="zh-TW" sz="2400" dirty="0"/>
+              <a:t>:</a:t>
+            </a:r>
+          </a:p>
+          <a:p>
+            <a:pPr marL="914400" lvl="1" indent="-457200">
+              <a:buAutoNum type="arabicPeriod" startAt="2"/>
+            </a:pPr>
+            <a:r>
+              <a:rPr lang="zh-TW" altLang="en-US" sz="2000" dirty="0"/>
+              <a:t>筆的</a:t>
+            </a:r>
+            <a:r>
+              <a:rPr lang="en-US" altLang="zh-TW" sz="2000" dirty="0" err="1"/>
+              <a:t>Protocal</a:t>
+            </a:r>
+            <a:r>
               <a:rPr lang="en-US" altLang="zh-TW" sz="2000" dirty="0"/>
-              <a:t>UART RX</a:t>
+              <a:t> </a:t>
             </a:r>
             <a:r>
               <a:rPr lang="zh-TW" altLang="en-US" sz="2000" dirty="0"/>
-              <a:t> 中斷硬體設計</a:t>
-            </a:r>
+              <a:t>定義的顏色只佔</a:t>
+            </a:r>
+            <a:r>
+              <a:rPr lang="en-US" altLang="zh-TW" sz="2000" dirty="0"/>
+              <a:t>RGB</a:t>
+            </a:r>
+            <a:r>
+              <a:rPr lang="zh-TW" altLang="en-US" sz="2000" dirty="0"/>
+              <a:t>裡面</a:t>
+            </a:r>
+            <a:r>
+              <a:rPr lang="en-US" altLang="zh-TW" sz="2000" dirty="0"/>
+              <a:t>200</a:t>
+            </a:r>
+            <a:r>
+              <a:rPr lang="zh-TW" altLang="en-US" sz="2000" dirty="0"/>
+              <a:t>多個</a:t>
+            </a:r>
+            <a:endParaRPr lang="en-US" altLang="zh-TW" dirty="0"/>
           </a:p>
         </p:txBody>
       </p:sp>
     </p:spTree>
     <p:extLst>
       <p:ext uri="{BB962C8B-B14F-4D97-AF65-F5344CB8AC3E}">
-        <p14:creationId xmlns:p14="http://schemas.microsoft.com/office/powerpoint/2010/main" val="3743749783"/>
+        <p14:creationId xmlns:p14="http://schemas.microsoft.com/office/powerpoint/2010/main" val="2576856385"/>
       </p:ext>
     </p:extLst>
   </p:cSld>
@@ -32447,16 +32403,12 @@
           </a:bodyPr>
           <a:lstStyle/>
           <a:p>
-            <a:pPr marL="0" indent="0">
-              <a:buNone/>
+            <a:pPr marL="514350" indent="-514350">
+              <a:buAutoNum type="arabicPeriod"/>
             </a:pPr>
             <a:r>
-              <a:rPr lang="zh-TW" altLang="en-US" sz="2000" dirty="0"/>
-              <a:t>總結 </a:t>
-            </a:r>
-            <a:r>
               <a:rPr lang="en-US" altLang="zh-TW" sz="2000" dirty="0"/>
-              <a:t>:</a:t>
+              <a:t>UART</a:t>
             </a:r>
             <a:r>
               <a:rPr lang="zh-TW" altLang="en-US" sz="2000" dirty="0"/>
@@ -32464,44 +32416,61 @@
             </a:r>
             <a:r>
               <a:rPr lang="en-US" altLang="zh-TW" sz="2000" dirty="0"/>
-              <a:t> </a:t>
+              <a:t>RX</a:t>
             </a:r>
             <a:r>
               <a:rPr lang="zh-TW" altLang="en-US" sz="2000" dirty="0"/>
-              <a:t>由於使用情況是使用者隨時可能會去觸動後發</a:t>
+              <a:t> 使用</a:t>
             </a:r>
             <a:r>
               <a:rPr lang="en-US" altLang="zh-TW" sz="2000" dirty="0"/>
-              <a:t>Sensor</a:t>
+              <a:t>FIFO</a:t>
             </a:r>
             <a:r>
               <a:rPr lang="zh-TW" altLang="en-US" sz="2000" dirty="0"/>
-              <a:t>、筆本身還要</a:t>
+              <a:t> 架構、這個</a:t>
             </a:r>
             <a:r>
               <a:rPr lang="en-US" altLang="zh-TW" sz="2000" dirty="0"/>
-              <a:t>Decode </a:t>
+              <a:t>FIFO</a:t>
             </a:r>
             <a:r>
               <a:rPr lang="zh-TW" altLang="en-US" sz="2000" dirty="0"/>
-              <a:t>訊號，因此中斷是最佳方法，</a:t>
-            </a:r>
+              <a:t>架構是被封裝過。</a:t>
+            </a:r>
+            <a:endParaRPr lang="en-US" altLang="zh-TW" sz="2000" dirty="0"/>
+          </a:p>
+          <a:p>
+            <a:pPr marL="514350" indent="-514350">
+              <a:buAutoNum type="arabicPeriod"/>
+            </a:pPr>
+            <a:endParaRPr lang="en-US" altLang="zh-TW" sz="2000" dirty="0"/>
+          </a:p>
+          <a:p>
+            <a:pPr marL="514350" indent="-514350">
+              <a:buAutoNum type="arabicPeriod"/>
+            </a:pPr>
+            <a:endParaRPr lang="en-US" altLang="zh-TW" sz="2000" dirty="0"/>
+          </a:p>
+          <a:p>
+            <a:pPr marL="514350" indent="-514350">
+              <a:buAutoNum type="arabicPeriod"/>
+            </a:pPr>
             <a:r>
               <a:rPr lang="en-US" altLang="zh-TW" sz="2000" dirty="0"/>
-              <a:t>Polling </a:t>
+              <a:t>UART RX</a:t>
             </a:r>
             <a:r>
               <a:rPr lang="zh-TW" altLang="en-US" sz="2000" dirty="0"/>
-              <a:t>去偵測就不是好方法並且耗電</a:t>
-            </a:r>
-            <a:endParaRPr lang="en-US" altLang="zh-TW" sz="2000" dirty="0"/>
+              <a:t> 中斷硬體設計</a:t>
+            </a:r>
           </a:p>
         </p:txBody>
       </p:sp>
     </p:spTree>
     <p:extLst>
       <p:ext uri="{BB962C8B-B14F-4D97-AF65-F5344CB8AC3E}">
-        <p14:creationId xmlns:p14="http://schemas.microsoft.com/office/powerpoint/2010/main" val="1764172780"/>
+        <p14:creationId xmlns:p14="http://schemas.microsoft.com/office/powerpoint/2010/main" val="3743749783"/>
       </p:ext>
     </p:extLst>
   </p:cSld>
@@ -32533,7 +32502,7 @@
           <p:cNvPr id="2" name="標題 1">
             <a:extLst>
               <a:ext uri="{FF2B5EF4-FFF2-40B4-BE49-F238E27FC236}">
-                <a16:creationId xmlns:a16="http://schemas.microsoft.com/office/drawing/2014/main" id="{DCAF803D-3CAB-3E11-8A90-4D5310A3A5EA}"/>
+                <a16:creationId xmlns:a16="http://schemas.microsoft.com/office/drawing/2014/main" id="{FEDEBC06-C75E-5899-979E-C29912B4A68E}"/>
               </a:ext>
             </a:extLst>
           </p:cNvPr>
@@ -32563,7 +32532,7 @@
           <p:cNvPr id="3" name="內容版面配置區 2">
             <a:extLst>
               <a:ext uri="{FF2B5EF4-FFF2-40B4-BE49-F238E27FC236}">
-                <a16:creationId xmlns:a16="http://schemas.microsoft.com/office/drawing/2014/main" id="{3B1B8A68-518A-9A03-2325-0016A63D6547}"/>
+                <a16:creationId xmlns:a16="http://schemas.microsoft.com/office/drawing/2014/main" id="{D33F5725-65BC-FF79-0EEB-A34DF7904932}"/>
               </a:ext>
             </a:extLst>
           </p:cNvPr>
@@ -32576,151 +32545,66 @@
         </p:nvSpPr>
         <p:spPr/>
         <p:txBody>
-          <a:bodyPr/>
+          <a:bodyPr>
+            <a:normAutofit/>
+          </a:bodyPr>
           <a:lstStyle/>
           <a:p>
             <a:pPr marL="0" indent="0">
               <a:buNone/>
             </a:pPr>
             <a:r>
-              <a:rPr lang="zh-TW" altLang="en-US" dirty="0">
-                <a:solidFill>
-                  <a:schemeClr val="accent1"/>
-                </a:solidFill>
-              </a:rPr>
-              <a:t>過程中遇到最大問題 </a:t>
-            </a:r>
-            <a:r>
-              <a:rPr lang="en-US" altLang="zh-TW" dirty="0">
-                <a:solidFill>
-                  <a:schemeClr val="accent1"/>
-                </a:solidFill>
-              </a:rPr>
-              <a:t>: </a:t>
-            </a:r>
-          </a:p>
-          <a:p>
-            <a:pPr marL="0" indent="0">
-              <a:buNone/>
-            </a:pPr>
-            <a:r>
-              <a:rPr lang="zh-TW" altLang="en-US" sz="2400" dirty="0"/>
-              <a:t>收完</a:t>
-            </a:r>
-            <a:r>
-              <a:rPr lang="en-US" altLang="zh-TW" sz="2400" dirty="0"/>
-              <a:t>Sensor Data</a:t>
-            </a:r>
-            <a:r>
-              <a:rPr lang="zh-TW" altLang="en-US" sz="2400" dirty="0"/>
-              <a:t>後，顯示資料卻有漏東漏西</a:t>
-            </a:r>
-            <a:endParaRPr lang="en-US" altLang="zh-TW" sz="2400" dirty="0"/>
-          </a:p>
-          <a:p>
-            <a:pPr marL="0" indent="0">
-              <a:buNone/>
-            </a:pPr>
-            <a:r>
-              <a:rPr lang="en-US" altLang="zh-TW" sz="2400" dirty="0"/>
-              <a:t>Source</a:t>
-            </a:r>
-          </a:p>
-          <a:p>
-            <a:pPr marL="0" indent="0">
-              <a:buNone/>
-            </a:pPr>
-            <a:r>
-              <a:rPr lang="en-US" altLang="zh-TW" sz="2400" dirty="0"/>
-              <a:t>1 . </a:t>
-            </a:r>
-            <a:r>
-              <a:rPr lang="zh-TW" altLang="en-US" sz="2400" dirty="0"/>
-              <a:t> 硬體觸發設定 </a:t>
-            </a:r>
-            <a:r>
-              <a:rPr lang="en-US" altLang="zh-TW" sz="2400" dirty="0"/>
-              <a:t>: 4Bytes -&gt; 1Bytes</a:t>
-            </a:r>
-          </a:p>
-          <a:p>
-            <a:pPr marL="0" indent="0">
-              <a:buNone/>
-            </a:pPr>
-            <a:r>
-              <a:rPr lang="en-US" altLang="zh-TW" sz="2400" dirty="0"/>
-              <a:t>2. </a:t>
-            </a:r>
-            <a:r>
-              <a:rPr lang="zh-TW" altLang="en-US" sz="2400" dirty="0"/>
+              <a:rPr lang="zh-TW" altLang="en-US" sz="2000" dirty="0"/>
+              <a:t>總結 </a:t>
+            </a:r>
+            <a:r>
+              <a:rPr lang="en-US" altLang="zh-TW" sz="2000" dirty="0"/>
+              <a:t>:</a:t>
+            </a:r>
+            <a:r>
+              <a:rPr lang="zh-TW" altLang="en-US" sz="2000" dirty="0"/>
               <a:t> </a:t>
             </a:r>
             <a:r>
-              <a:rPr lang="zh-TW" altLang="en-US" sz="2400" dirty="0">
-                <a:solidFill>
-                  <a:srgbClr val="FF0000"/>
-                </a:solidFill>
-              </a:rPr>
-              <a:t>解除中斷</a:t>
-            </a:r>
-            <a:r>
-              <a:rPr lang="en-US" altLang="zh-TW" sz="2400" dirty="0">
-                <a:solidFill>
-                  <a:srgbClr val="FF0000"/>
-                </a:solidFill>
-              </a:rPr>
-              <a:t>Event </a:t>
-            </a:r>
-            <a:r>
-              <a:rPr lang="en-US" altLang="zh-TW" sz="2400" dirty="0" err="1">
-                <a:solidFill>
-                  <a:srgbClr val="FF0000"/>
-                </a:solidFill>
-              </a:rPr>
-              <a:t>regestier</a:t>
-            </a:r>
-            <a:r>
-              <a:rPr lang="zh-TW" altLang="en-US" sz="2400" dirty="0">
-                <a:solidFill>
-                  <a:srgbClr val="FF0000"/>
-                </a:solidFill>
-              </a:rPr>
-              <a:t>在</a:t>
-            </a:r>
-            <a:r>
-              <a:rPr lang="en-US" altLang="zh-TW" sz="2400" dirty="0">
-                <a:solidFill>
-                  <a:srgbClr val="FF0000"/>
-                </a:solidFill>
-              </a:rPr>
-              <a:t>Code</a:t>
-            </a:r>
-            <a:r>
-              <a:rPr lang="zh-TW" altLang="en-US" sz="2400" dirty="0">
-                <a:solidFill>
-                  <a:srgbClr val="FF0000"/>
-                </a:solidFill>
-              </a:rPr>
-              <a:t>中的位置</a:t>
-            </a:r>
-            <a:endParaRPr lang="en-US" altLang="zh-TW" sz="2400" dirty="0">
-              <a:solidFill>
-                <a:srgbClr val="FF0000"/>
-              </a:solidFill>
-            </a:endParaRPr>
-          </a:p>
-          <a:p>
-            <a:pPr marL="0" indent="0">
-              <a:buNone/>
-            </a:pPr>
-            <a:endParaRPr lang="zh-TW" altLang="en-US" dirty="0"/>
+              <a:rPr lang="en-US" altLang="zh-TW" sz="2000" dirty="0"/>
+              <a:t> </a:t>
+            </a:r>
+            <a:r>
+              <a:rPr lang="zh-TW" altLang="en-US" sz="2000" dirty="0"/>
+              <a:t>由於使用情況是使用者隨時可能會去觸動後發</a:t>
+            </a:r>
+            <a:r>
+              <a:rPr lang="en-US" altLang="zh-TW" sz="2000" dirty="0"/>
+              <a:t>Sensor</a:t>
+            </a:r>
+            <a:r>
+              <a:rPr lang="zh-TW" altLang="en-US" sz="2000" dirty="0"/>
+              <a:t>、筆本身還要</a:t>
+            </a:r>
+            <a:r>
+              <a:rPr lang="en-US" altLang="zh-TW" sz="2000" dirty="0"/>
+              <a:t>Decode </a:t>
+            </a:r>
+            <a:r>
+              <a:rPr lang="zh-TW" altLang="en-US" sz="2000" dirty="0"/>
+              <a:t>訊號，因此中斷是最佳方法，</a:t>
+            </a:r>
+            <a:r>
+              <a:rPr lang="en-US" altLang="zh-TW" sz="2000" dirty="0"/>
+              <a:t>Polling </a:t>
+            </a:r>
+            <a:r>
+              <a:rPr lang="zh-TW" altLang="en-US" sz="2000" dirty="0"/>
+              <a:t>去偵測就不是好方法並且耗電</a:t>
+            </a:r>
+            <a:endParaRPr lang="en-US" altLang="zh-TW" sz="2000" dirty="0"/>
           </a:p>
         </p:txBody>
       </p:sp>
     </p:spTree>
     <p:extLst>
       <p:ext uri="{BB962C8B-B14F-4D97-AF65-F5344CB8AC3E}">
-        <p14:creationId xmlns:p14="http://schemas.microsoft.com/office/powerpoint/2010/main" val="719165155"/>
+        <p14:creationId xmlns:p14="http://schemas.microsoft.com/office/powerpoint/2010/main" val="1764172780"/>
       </p:ext>
     </p:extLst>
   </p:cSld>
@@ -32752,7 +32636,7 @@
           <p:cNvPr id="2" name="標題 1">
             <a:extLst>
               <a:ext uri="{FF2B5EF4-FFF2-40B4-BE49-F238E27FC236}">
-                <a16:creationId xmlns:a16="http://schemas.microsoft.com/office/drawing/2014/main" id="{A90C3E7E-AE4E-452E-A66F-A6DA326A606E}"/>
+                <a16:creationId xmlns:a16="http://schemas.microsoft.com/office/drawing/2014/main" id="{DCAF803D-3CAB-3E11-8A90-4D5310A3A5EA}"/>
               </a:ext>
             </a:extLst>
           </p:cNvPr>
@@ -32770,8 +32654,8 @@
           <a:p>
             <a:pPr algn="ctr"/>
             <a:r>
-              <a:rPr lang="zh-TW" altLang="en-US" sz="4400" dirty="0"/>
-              <a:t>最接近顏色</a:t>
+              <a:rPr lang="en-US" altLang="zh-TW" dirty="0"/>
+              <a:t>UART RX Setting</a:t>
             </a:r>
             <a:endParaRPr lang="zh-TW" altLang="en-US" dirty="0"/>
           </a:p>
@@ -32782,7 +32666,7 @@
           <p:cNvPr id="3" name="內容版面配置區 2">
             <a:extLst>
               <a:ext uri="{FF2B5EF4-FFF2-40B4-BE49-F238E27FC236}">
-                <a16:creationId xmlns:a16="http://schemas.microsoft.com/office/drawing/2014/main" id="{2270879B-7395-4917-86B4-47F549C5A985}"/>
+                <a16:creationId xmlns:a16="http://schemas.microsoft.com/office/drawing/2014/main" id="{3B1B8A68-518A-9A03-2325-0016A63D6547}"/>
               </a:ext>
             </a:extLst>
           </p:cNvPr>
@@ -32802,89 +32686,144 @@
               <a:buNone/>
             </a:pPr>
             <a:r>
-              <a:rPr lang="en-US" altLang="zh-TW" dirty="0"/>
-              <a:t>Root Cause :</a:t>
-            </a:r>
-          </a:p>
-          <a:p>
-            <a:pPr marL="514350" indent="-514350">
-              <a:buAutoNum type="arabicPeriod"/>
-            </a:pPr>
-            <a:r>
-              <a:rPr lang="en-US" altLang="zh-TW" dirty="0"/>
-              <a:t>Sensor </a:t>
-            </a:r>
-            <a:r>
-              <a:rPr lang="zh-TW" altLang="en-US" dirty="0"/>
-              <a:t>傳輸的顏色，並不一定落在</a:t>
-            </a:r>
-            <a:r>
-              <a:rPr lang="en-US" altLang="zh-TW" dirty="0"/>
-              <a:t>USI</a:t>
-            </a:r>
-            <a:r>
-              <a:rPr lang="zh-TW" altLang="en-US" dirty="0"/>
-              <a:t>所定義的顏色，因此需要找到最接近的顏色。</a:t>
-            </a:r>
-            <a:endParaRPr lang="en-US" altLang="zh-TW" dirty="0"/>
-          </a:p>
-          <a:p>
-            <a:pPr marL="514350" indent="-514350">
-              <a:buAutoNum type="arabicPeriod"/>
-            </a:pPr>
-            <a:endParaRPr lang="en-US" altLang="zh-TW" dirty="0"/>
+              <a:rPr lang="zh-TW" altLang="en-US" dirty="0">
+                <a:solidFill>
+                  <a:schemeClr val="accent1"/>
+                </a:solidFill>
+              </a:rPr>
+              <a:t>過程中遇到最大問題 </a:t>
+            </a:r>
+            <a:r>
+              <a:rPr lang="en-US" altLang="zh-TW" dirty="0">
+                <a:solidFill>
+                  <a:schemeClr val="accent1"/>
+                </a:solidFill>
+              </a:rPr>
+              <a:t>: </a:t>
+            </a:r>
           </a:p>
           <a:p>
             <a:pPr marL="0" indent="0">
               <a:buNone/>
             </a:pPr>
             <a:r>
-              <a:rPr lang="en-US" altLang="zh-TW" dirty="0"/>
-              <a:t>Solve :</a:t>
-            </a:r>
+              <a:rPr lang="zh-TW" altLang="en-US" sz="2400" dirty="0"/>
+              <a:t>收完</a:t>
+            </a:r>
+            <a:r>
+              <a:rPr lang="en-US" altLang="zh-TW" sz="2400" dirty="0"/>
+              <a:t>Sensor Data</a:t>
+            </a:r>
+            <a:r>
+              <a:rPr lang="zh-TW" altLang="en-US" sz="2400" dirty="0"/>
+              <a:t>後，顯示資料卻有漏東漏西</a:t>
+            </a:r>
+            <a:endParaRPr lang="en-US" altLang="zh-TW" sz="2400" dirty="0"/>
           </a:p>
           <a:p>
             <a:pPr marL="0" indent="0">
               <a:buNone/>
             </a:pPr>
             <a:r>
-              <a:rPr lang="en-US" altLang="zh-TW" dirty="0"/>
-              <a:t>	1. </a:t>
-            </a:r>
-            <a:r>
-              <a:rPr lang="zh-TW" altLang="en-US" dirty="0"/>
-              <a:t>顏色距離定義</a:t>
-            </a:r>
-            <a:endParaRPr lang="en-US" altLang="zh-TW" dirty="0"/>
+              <a:rPr lang="en-US" altLang="zh-TW" sz="2400" dirty="0"/>
+              <a:t>Source</a:t>
+            </a:r>
           </a:p>
           <a:p>
             <a:pPr marL="0" indent="0">
               <a:buNone/>
             </a:pPr>
             <a:r>
-              <a:rPr lang="en-US" altLang="zh-TW" dirty="0"/>
-              <a:t>	2.  </a:t>
-            </a:r>
-            <a:r>
-              <a:rPr lang="zh-TW" altLang="en-US" dirty="0"/>
-              <a:t>使用</a:t>
-            </a:r>
-            <a:r>
-              <a:rPr lang="en-US" altLang="zh-TW" dirty="0" err="1"/>
-              <a:t>matlab</a:t>
-            </a:r>
-            <a:r>
-              <a:rPr lang="zh-TW" altLang="en-US" dirty="0"/>
-              <a:t>來加速驗證速度</a:t>
-            </a:r>
-            <a:endParaRPr lang="en-US" altLang="zh-TW" dirty="0"/>
+              <a:rPr lang="en-US" altLang="zh-TW" sz="2400" dirty="0"/>
+              <a:t>1 . </a:t>
+            </a:r>
+            <a:r>
+              <a:rPr lang="zh-TW" altLang="en-US" sz="2400" dirty="0"/>
+              <a:t> 硬體觸發設定 </a:t>
+            </a:r>
+            <a:r>
+              <a:rPr lang="en-US" altLang="zh-TW" sz="2400" dirty="0"/>
+              <a:t>: 4Bytes -&gt; 1Bytes</a:t>
+            </a:r>
+          </a:p>
+          <a:p>
+            <a:pPr marL="0" indent="0">
+              <a:buNone/>
+            </a:pPr>
+            <a:r>
+              <a:rPr lang="en-US" altLang="zh-TW" sz="2400" dirty="0"/>
+              <a:t>2. </a:t>
+            </a:r>
+            <a:r>
+              <a:rPr lang="zh-TW" altLang="en-US" sz="2400" dirty="0"/>
+              <a:t> </a:t>
+            </a:r>
+            <a:r>
+              <a:rPr lang="zh-TW" altLang="en-US" sz="2400" dirty="0">
+                <a:solidFill>
+                  <a:srgbClr val="FF0000"/>
+                </a:solidFill>
+              </a:rPr>
+              <a:t>解除中斷</a:t>
+            </a:r>
+            <a:r>
+              <a:rPr lang="en-US" altLang="zh-TW" sz="2400" dirty="0">
+                <a:solidFill>
+                  <a:srgbClr val="FF0000"/>
+                </a:solidFill>
+              </a:rPr>
+              <a:t>Event </a:t>
+            </a:r>
+            <a:r>
+              <a:rPr lang="en-US" altLang="zh-TW" sz="2400" dirty="0" err="1">
+                <a:solidFill>
+                  <a:srgbClr val="FF0000"/>
+                </a:solidFill>
+              </a:rPr>
+              <a:t>regestier</a:t>
+            </a:r>
+            <a:r>
+              <a:rPr lang="zh-TW" altLang="en-US" sz="2400" dirty="0">
+                <a:solidFill>
+                  <a:srgbClr val="FF0000"/>
+                </a:solidFill>
+              </a:rPr>
+              <a:t>在</a:t>
+            </a:r>
+            <a:r>
+              <a:rPr lang="en-US" altLang="zh-TW" sz="2400" dirty="0">
+                <a:solidFill>
+                  <a:srgbClr val="FF0000"/>
+                </a:solidFill>
+              </a:rPr>
+              <a:t>Code</a:t>
+            </a:r>
+            <a:r>
+              <a:rPr lang="zh-TW" altLang="en-US" sz="2400" dirty="0">
+                <a:solidFill>
+                  <a:srgbClr val="FF0000"/>
+                </a:solidFill>
+              </a:rPr>
+              <a:t>中的位置</a:t>
+            </a:r>
+            <a:endParaRPr lang="en-US" altLang="zh-TW" sz="2400" dirty="0">
+              <a:solidFill>
+                <a:srgbClr val="FF0000"/>
+              </a:solidFill>
+            </a:endParaRPr>
+          </a:p>
+          <a:p>
+            <a:pPr marL="0" indent="0">
+              <a:buNone/>
+            </a:pPr>
+            <a:endParaRPr lang="zh-TW" altLang="en-US" dirty="0"/>
           </a:p>
         </p:txBody>
       </p:sp>
     </p:spTree>
     <p:extLst>
       <p:ext uri="{BB962C8B-B14F-4D97-AF65-F5344CB8AC3E}">
-        <p14:creationId xmlns:p14="http://schemas.microsoft.com/office/powerpoint/2010/main" val="2172983373"/>
+        <p14:creationId xmlns:p14="http://schemas.microsoft.com/office/powerpoint/2010/main" val="719165155"/>
       </p:ext>
     </p:extLst>
   </p:cSld>
@@ -32916,7 +32855,7 @@
           <p:cNvPr id="2" name="標題 1">
             <a:extLst>
               <a:ext uri="{FF2B5EF4-FFF2-40B4-BE49-F238E27FC236}">
-                <a16:creationId xmlns:a16="http://schemas.microsoft.com/office/drawing/2014/main" id="{77C37F21-5DBA-B401-7D71-7CFB5E6E6C5D}"/>
+                <a16:creationId xmlns:a16="http://schemas.microsoft.com/office/drawing/2014/main" id="{A90C3E7E-AE4E-452E-A66F-A6DA326A606E}"/>
               </a:ext>
             </a:extLst>
           </p:cNvPr>
@@ -32934,21 +32873,10 @@
           <a:p>
             <a:pPr algn="ctr"/>
             <a:r>
-              <a:rPr lang="zh-TW" altLang="en-US" dirty="0"/>
-              <a:t> </a:t>
-            </a:r>
-            <a:r>
-              <a:rPr lang="en-US" altLang="zh-TW" dirty="0" err="1"/>
-              <a:t>Matlab</a:t>
-            </a:r>
-            <a:r>
-              <a:rPr lang="en-US" altLang="zh-TW" dirty="0"/>
-              <a:t> </a:t>
-            </a:r>
-            <a:r>
-              <a:rPr lang="zh-TW" altLang="en-US" dirty="0"/>
-              <a:t>驗證</a:t>
-            </a:r>
+              <a:rPr lang="zh-TW" altLang="en-US" sz="4400" dirty="0"/>
+              <a:t>最接近顏色</a:t>
+            </a:r>
+            <a:endParaRPr lang="zh-TW" altLang="en-US" dirty="0"/>
           </a:p>
         </p:txBody>
       </p:sp>
@@ -32957,7 +32885,7 @@
           <p:cNvPr id="3" name="內容版面配置區 2">
             <a:extLst>
               <a:ext uri="{FF2B5EF4-FFF2-40B4-BE49-F238E27FC236}">
-                <a16:creationId xmlns:a16="http://schemas.microsoft.com/office/drawing/2014/main" id="{534E79D0-3692-7581-7815-5DEF93BC5DAC}"/>
+                <a16:creationId xmlns:a16="http://schemas.microsoft.com/office/drawing/2014/main" id="{2270879B-7395-4917-86B4-47F549C5A985}"/>
               </a:ext>
             </a:extLst>
           </p:cNvPr>
@@ -32978,27 +32906,88 @@
             </a:pPr>
             <a:r>
               <a:rPr lang="en-US" altLang="zh-TW" dirty="0"/>
-              <a:t>Use </a:t>
+              <a:t>Root Cause :</a:t>
+            </a:r>
+          </a:p>
+          <a:p>
+            <a:pPr marL="514350" indent="-514350">
+              <a:buAutoNum type="arabicPeriod"/>
+            </a:pPr>
+            <a:r>
+              <a:rPr lang="en-US" altLang="zh-TW" dirty="0"/>
+              <a:t>Sensor </a:t>
+            </a:r>
+            <a:r>
+              <a:rPr lang="zh-TW" altLang="en-US" dirty="0"/>
+              <a:t>傳輸的顏色，並不一定落在</a:t>
+            </a:r>
+            <a:r>
+              <a:rPr lang="en-US" altLang="zh-TW" dirty="0"/>
+              <a:t>USI</a:t>
+            </a:r>
+            <a:r>
+              <a:rPr lang="zh-TW" altLang="en-US" dirty="0"/>
+              <a:t>所定義的顏色，因此需要找到最接近的顏色。</a:t>
+            </a:r>
+            <a:endParaRPr lang="en-US" altLang="zh-TW" dirty="0"/>
+          </a:p>
+          <a:p>
+            <a:pPr marL="514350" indent="-514350">
+              <a:buAutoNum type="arabicPeriod"/>
+            </a:pPr>
+            <a:endParaRPr lang="en-US" altLang="zh-TW" dirty="0"/>
+          </a:p>
+          <a:p>
+            <a:pPr marL="0" indent="0">
+              <a:buNone/>
+            </a:pPr>
+            <a:r>
+              <a:rPr lang="en-US" altLang="zh-TW" dirty="0"/>
+              <a:t>Solve :</a:t>
+            </a:r>
+          </a:p>
+          <a:p>
+            <a:pPr marL="0" indent="0">
+              <a:buNone/>
+            </a:pPr>
+            <a:r>
+              <a:rPr lang="en-US" altLang="zh-TW" dirty="0"/>
+              <a:t>	1. </a:t>
+            </a:r>
+            <a:r>
+              <a:rPr lang="zh-TW" altLang="en-US" dirty="0"/>
+              <a:t>顏色距離定義</a:t>
+            </a:r>
+            <a:endParaRPr lang="en-US" altLang="zh-TW" dirty="0"/>
+          </a:p>
+          <a:p>
+            <a:pPr marL="0" indent="0">
+              <a:buNone/>
+            </a:pPr>
+            <a:r>
+              <a:rPr lang="en-US" altLang="zh-TW" dirty="0"/>
+              <a:t>	2.  </a:t>
+            </a:r>
+            <a:r>
+              <a:rPr lang="zh-TW" altLang="en-US" dirty="0"/>
+              <a:t>使用</a:t>
             </a:r>
             <a:r>
               <a:rPr lang="en-US" altLang="zh-TW" dirty="0" err="1"/>
-              <a:t>Matalb</a:t>
-            </a:r>
-            <a:r>
-              <a:rPr lang="en-US" altLang="zh-TW" dirty="0"/>
-              <a:t> APP</a:t>
-            </a:r>
-            <a:r>
-              <a:rPr lang="zh-TW" altLang="en-US" dirty="0"/>
-              <a:t> 寫的</a:t>
-            </a:r>
+              <a:t>matlab</a:t>
+            </a:r>
+            <a:r>
+              <a:rPr lang="zh-TW" altLang="en-US" dirty="0"/>
+              <a:t>來加速驗證速度</a:t>
+            </a:r>
+            <a:endParaRPr lang="en-US" altLang="zh-TW" dirty="0"/>
           </a:p>
         </p:txBody>
       </p:sp>
     </p:spTree>
     <p:extLst>
       <p:ext uri="{BB962C8B-B14F-4D97-AF65-F5344CB8AC3E}">
-        <p14:creationId xmlns:p14="http://schemas.microsoft.com/office/powerpoint/2010/main" val="3411917283"/>
+        <p14:creationId xmlns:p14="http://schemas.microsoft.com/office/powerpoint/2010/main" val="2172983373"/>
       </p:ext>
     </p:extLst>
   </p:cSld>
@@ -33030,7 +33019,7 @@
           <p:cNvPr id="2" name="標題 1">
             <a:extLst>
               <a:ext uri="{FF2B5EF4-FFF2-40B4-BE49-F238E27FC236}">
-                <a16:creationId xmlns:a16="http://schemas.microsoft.com/office/drawing/2014/main" id="{F0C4E827-8FA5-D200-CB63-931E7FB72A01}"/>
+                <a16:creationId xmlns:a16="http://schemas.microsoft.com/office/drawing/2014/main" id="{77C37F21-5DBA-B401-7D71-7CFB5E6E6C5D}"/>
               </a:ext>
             </a:extLst>
           </p:cNvPr>
@@ -33046,7 +33035,23 @@
           <a:bodyPr/>
           <a:lstStyle/>
           <a:p>
-            <a:endParaRPr lang="zh-TW" altLang="en-US" dirty="0"/>
+            <a:pPr algn="ctr"/>
+            <a:r>
+              <a:rPr lang="zh-TW" altLang="en-US" dirty="0"/>
+              <a:t> </a:t>
+            </a:r>
+            <a:r>
+              <a:rPr lang="en-US" altLang="zh-TW" dirty="0" err="1"/>
+              <a:t>Matlab</a:t>
+            </a:r>
+            <a:r>
+              <a:rPr lang="en-US" altLang="zh-TW" dirty="0"/>
+              <a:t> </a:t>
+            </a:r>
+            <a:r>
+              <a:rPr lang="zh-TW" altLang="en-US" dirty="0"/>
+              <a:t>驗證</a:t>
+            </a:r>
           </a:p>
         </p:txBody>
       </p:sp>
@@ -33055,7 +33060,7 @@
           <p:cNvPr id="3" name="內容版面配置區 2">
             <a:extLst>
               <a:ext uri="{FF2B5EF4-FFF2-40B4-BE49-F238E27FC236}">
-                <a16:creationId xmlns:a16="http://schemas.microsoft.com/office/drawing/2014/main" id="{3DEDB90D-322B-3E70-CB9B-BCCD6F0A04A3}"/>
+                <a16:creationId xmlns:a16="http://schemas.microsoft.com/office/drawing/2014/main" id="{534E79D0-3692-7581-7815-5DEF93BC5DAC}"/>
               </a:ext>
             </a:extLst>
           </p:cNvPr>
@@ -33071,117 +33076,24 @@
           <a:bodyPr/>
           <a:lstStyle/>
           <a:p>
-            <a:pPr marL="514350" indent="-514350">
-              <a:buAutoNum type="arabicPeriod"/>
+            <a:pPr marL="0" indent="0">
+              <a:buNone/>
             </a:pPr>
             <a:r>
               <a:rPr lang="en-US" altLang="zh-TW" dirty="0"/>
-              <a:t>Intel USI2.0 </a:t>
-            </a:r>
-            <a:r>
-              <a:rPr lang="zh-TW" altLang="en-US" dirty="0"/>
-              <a:t>測項 </a:t>
-            </a:r>
-            <a:r>
-              <a:rPr lang="en-US" altLang="zh-TW" dirty="0"/>
-              <a:t>Total 57</a:t>
-            </a:r>
-          </a:p>
-          <a:p>
-            <a:pPr marL="514350" indent="-514350">
-              <a:buAutoNum type="arabicPeriod"/>
-            </a:pPr>
-            <a:endParaRPr lang="en-US" altLang="zh-TW" dirty="0"/>
-          </a:p>
-          <a:p>
-            <a:pPr marL="514350" indent="-514350">
-              <a:buAutoNum type="arabicPeriod"/>
-            </a:pPr>
+              <a:t>Use </a:t>
+            </a:r>
             <a:r>
               <a:rPr lang="en-US" altLang="zh-TW" dirty="0" err="1"/>
-              <a:t>Novatek</a:t>
-            </a:r>
-            <a:r>
-              <a:rPr lang="en-US" altLang="zh-TW" dirty="0"/>
-              <a:t> AVL</a:t>
-            </a:r>
-            <a:r>
-              <a:rPr lang="zh-TW" altLang="en-US" dirty="0"/>
-              <a:t>測項</a:t>
-            </a:r>
-            <a:r>
-              <a:rPr lang="en-US" altLang="zh-TW" dirty="0"/>
-              <a:t>Pass</a:t>
-            </a:r>
-          </a:p>
-          <a:p>
-            <a:pPr marL="514350" indent="-514350">
-              <a:buAutoNum type="arabicPeriod"/>
-            </a:pPr>
-            <a:endParaRPr lang="en-US" altLang="zh-TW" dirty="0"/>
-          </a:p>
-          <a:p>
-            <a:pPr marL="514350" indent="-514350">
-              <a:buAutoNum type="arabicPeriod"/>
-            </a:pPr>
-            <a:r>
-              <a:rPr lang="en-US" altLang="zh-TW" dirty="0"/>
-              <a:t>Noise </a:t>
-            </a:r>
-            <a:r>
-              <a:rPr lang="zh-TW" altLang="en-US" dirty="0"/>
-              <a:t>處理 </a:t>
-            </a:r>
-            <a:r>
-              <a:rPr lang="en-US" altLang="zh-TW" dirty="0"/>
-              <a:t>:</a:t>
-            </a:r>
-            <a:r>
-              <a:rPr lang="zh-TW" altLang="en-US" dirty="0"/>
-              <a:t> </a:t>
-            </a:r>
-            <a:r>
-              <a:rPr lang="en-US" altLang="zh-TW" dirty="0"/>
-              <a:t>Palm</a:t>
-            </a:r>
-            <a:r>
-              <a:rPr lang="zh-TW" altLang="en-US" dirty="0"/>
-              <a:t>、邊邊角落、</a:t>
-            </a:r>
-            <a:r>
-              <a:rPr lang="en-US" altLang="zh-TW" dirty="0"/>
-              <a:t>T5</a:t>
-            </a:r>
-            <a:r>
-              <a:rPr lang="zh-TW" altLang="en-US" dirty="0"/>
-              <a:t>、</a:t>
-            </a:r>
-            <a:r>
-              <a:rPr lang="en-US" altLang="zh-TW" dirty="0"/>
-              <a:t>CS</a:t>
-            </a:r>
-          </a:p>
-          <a:p>
-            <a:pPr marL="514350" indent="-514350">
-              <a:buAutoNum type="arabicPeriod"/>
-            </a:pPr>
-            <a:endParaRPr lang="en-US" altLang="zh-TW" dirty="0"/>
-          </a:p>
-          <a:p>
-            <a:pPr marL="514350" indent="-514350">
-              <a:buAutoNum type="arabicPeriod"/>
-            </a:pPr>
-            <a:r>
-              <a:rPr lang="en-US" altLang="zh-TW" dirty="0" err="1"/>
-              <a:t>Agc</a:t>
-            </a:r>
-            <a:r>
-              <a:rPr lang="en-US" altLang="zh-TW" dirty="0"/>
-              <a:t> Flow </a:t>
-            </a:r>
-            <a:r>
-              <a:rPr lang="zh-TW" altLang="en-US" dirty="0"/>
-              <a:t>架構</a:t>
+              <a:t>Matalb</a:t>
+            </a:r>
+            <a:r>
+              <a:rPr lang="en-US" altLang="zh-TW" dirty="0"/>
+              <a:t> APP</a:t>
+            </a:r>
+            <a:r>
+              <a:rPr lang="zh-TW" altLang="en-US" dirty="0"/>
+              <a:t> 寫的</a:t>
             </a:r>
           </a:p>
         </p:txBody>
@@ -33189,7 +33101,7 @@
     </p:spTree>
     <p:extLst>
       <p:ext uri="{BB962C8B-B14F-4D97-AF65-F5344CB8AC3E}">
-        <p14:creationId xmlns:p14="http://schemas.microsoft.com/office/powerpoint/2010/main" val="3116768302"/>
+        <p14:creationId xmlns:p14="http://schemas.microsoft.com/office/powerpoint/2010/main" val="3411917283"/>
       </p:ext>
     </p:extLst>
   </p:cSld>
@@ -33221,6 +33133,197 @@
           <p:cNvPr id="2" name="標題 1">
             <a:extLst>
               <a:ext uri="{FF2B5EF4-FFF2-40B4-BE49-F238E27FC236}">
+                <a16:creationId xmlns:a16="http://schemas.microsoft.com/office/drawing/2014/main" id="{F0C4E827-8FA5-D200-CB63-931E7FB72A01}"/>
+              </a:ext>
+            </a:extLst>
+          </p:cNvPr>
+          <p:cNvSpPr>
+            <a:spLocks noGrp="1"/>
+          </p:cNvSpPr>
+          <p:nvPr>
+            <p:ph type="title"/>
+          </p:nvPr>
+        </p:nvSpPr>
+        <p:spPr/>
+        <p:txBody>
+          <a:bodyPr/>
+          <a:lstStyle/>
+          <a:p>
+            <a:endParaRPr lang="zh-TW" altLang="en-US" dirty="0"/>
+          </a:p>
+        </p:txBody>
+      </p:sp>
+      <p:sp>
+        <p:nvSpPr>
+          <p:cNvPr id="3" name="內容版面配置區 2">
+            <a:extLst>
+              <a:ext uri="{FF2B5EF4-FFF2-40B4-BE49-F238E27FC236}">
+                <a16:creationId xmlns:a16="http://schemas.microsoft.com/office/drawing/2014/main" id="{3DEDB90D-322B-3E70-CB9B-BCCD6F0A04A3}"/>
+              </a:ext>
+            </a:extLst>
+          </p:cNvPr>
+          <p:cNvSpPr>
+            <a:spLocks noGrp="1"/>
+          </p:cNvSpPr>
+          <p:nvPr>
+            <p:ph idx="1"/>
+          </p:nvPr>
+        </p:nvSpPr>
+        <p:spPr/>
+        <p:txBody>
+          <a:bodyPr/>
+          <a:lstStyle/>
+          <a:p>
+            <a:pPr marL="514350" indent="-514350">
+              <a:buAutoNum type="arabicPeriod"/>
+            </a:pPr>
+            <a:r>
+              <a:rPr lang="en-US" altLang="zh-TW" dirty="0"/>
+              <a:t>Intel USI2.0 </a:t>
+            </a:r>
+            <a:r>
+              <a:rPr lang="zh-TW" altLang="en-US" dirty="0"/>
+              <a:t>測項 </a:t>
+            </a:r>
+            <a:r>
+              <a:rPr lang="en-US" altLang="zh-TW" dirty="0"/>
+              <a:t>Total 57</a:t>
+            </a:r>
+          </a:p>
+          <a:p>
+            <a:pPr marL="514350" indent="-514350">
+              <a:buAutoNum type="arabicPeriod"/>
+            </a:pPr>
+            <a:endParaRPr lang="en-US" altLang="zh-TW" dirty="0"/>
+          </a:p>
+          <a:p>
+            <a:pPr marL="514350" indent="-514350">
+              <a:buAutoNum type="arabicPeriod"/>
+            </a:pPr>
+            <a:r>
+              <a:rPr lang="en-US" altLang="zh-TW" dirty="0" err="1"/>
+              <a:t>Novatek</a:t>
+            </a:r>
+            <a:r>
+              <a:rPr lang="en-US" altLang="zh-TW" dirty="0"/>
+              <a:t> AVL</a:t>
+            </a:r>
+            <a:r>
+              <a:rPr lang="zh-TW" altLang="en-US" dirty="0"/>
+              <a:t>測項</a:t>
+            </a:r>
+            <a:r>
+              <a:rPr lang="en-US" altLang="zh-TW" dirty="0"/>
+              <a:t>Pass</a:t>
+            </a:r>
+          </a:p>
+          <a:p>
+            <a:pPr marL="514350" indent="-514350">
+              <a:buAutoNum type="arabicPeriod"/>
+            </a:pPr>
+            <a:endParaRPr lang="en-US" altLang="zh-TW" dirty="0"/>
+          </a:p>
+          <a:p>
+            <a:pPr marL="514350" indent="-514350">
+              <a:buAutoNum type="arabicPeriod"/>
+            </a:pPr>
+            <a:r>
+              <a:rPr lang="en-US" altLang="zh-TW" dirty="0"/>
+              <a:t>Noise </a:t>
+            </a:r>
+            <a:r>
+              <a:rPr lang="zh-TW" altLang="en-US" dirty="0"/>
+              <a:t>處理 </a:t>
+            </a:r>
+            <a:r>
+              <a:rPr lang="en-US" altLang="zh-TW" dirty="0"/>
+              <a:t>:</a:t>
+            </a:r>
+            <a:r>
+              <a:rPr lang="zh-TW" altLang="en-US" dirty="0"/>
+              <a:t> </a:t>
+            </a:r>
+            <a:r>
+              <a:rPr lang="en-US" altLang="zh-TW" dirty="0"/>
+              <a:t>Palm</a:t>
+            </a:r>
+            <a:r>
+              <a:rPr lang="zh-TW" altLang="en-US" dirty="0"/>
+              <a:t>、邊邊角落、</a:t>
+            </a:r>
+            <a:r>
+              <a:rPr lang="en-US" altLang="zh-TW" dirty="0"/>
+              <a:t>T5</a:t>
+            </a:r>
+            <a:r>
+              <a:rPr lang="zh-TW" altLang="en-US" dirty="0"/>
+              <a:t>、</a:t>
+            </a:r>
+            <a:r>
+              <a:rPr lang="en-US" altLang="zh-TW" dirty="0"/>
+              <a:t>CS</a:t>
+            </a:r>
+          </a:p>
+          <a:p>
+            <a:pPr marL="514350" indent="-514350">
+              <a:buAutoNum type="arabicPeriod"/>
+            </a:pPr>
+            <a:endParaRPr lang="en-US" altLang="zh-TW" dirty="0"/>
+          </a:p>
+          <a:p>
+            <a:pPr marL="514350" indent="-514350">
+              <a:buAutoNum type="arabicPeriod"/>
+            </a:pPr>
+            <a:r>
+              <a:rPr lang="en-US" altLang="zh-TW" dirty="0" err="1"/>
+              <a:t>Agc</a:t>
+            </a:r>
+            <a:r>
+              <a:rPr lang="en-US" altLang="zh-TW" dirty="0"/>
+              <a:t> Flow </a:t>
+            </a:r>
+            <a:r>
+              <a:rPr lang="zh-TW" altLang="en-US" dirty="0"/>
+              <a:t>架構</a:t>
+            </a:r>
+          </a:p>
+        </p:txBody>
+      </p:sp>
+    </p:spTree>
+    <p:extLst>
+      <p:ext uri="{BB962C8B-B14F-4D97-AF65-F5344CB8AC3E}">
+        <p14:creationId xmlns:p14="http://schemas.microsoft.com/office/powerpoint/2010/main" val="3116768302"/>
+      </p:ext>
+    </p:extLst>
+  </p:cSld>
+  <p:clrMapOvr>
+    <a:masterClrMapping/>
+  </p:clrMapOvr>
+</p:sld>
+</file>
+
+<file path=ppt/slides/slide68.xml><?xml version="1.0" encoding="utf-8"?>
+<p:sld xmlns:a="http://schemas.openxmlformats.org/drawingml/2006/main" xmlns:r="http://schemas.openxmlformats.org/officeDocument/2006/relationships" xmlns:p="http://schemas.openxmlformats.org/presentationml/2006/main">
+  <p:cSld>
+    <p:spTree>
+      <p:nvGrpSpPr>
+        <p:cNvPr id="1" name=""/>
+        <p:cNvGrpSpPr/>
+        <p:nvPr/>
+      </p:nvGrpSpPr>
+      <p:grpSpPr>
+        <a:xfrm>
+          <a:off x="0" y="0"/>
+          <a:ext cx="0" cy="0"/>
+          <a:chOff x="0" y="0"/>
+          <a:chExt cx="0" cy="0"/>
+        </a:xfrm>
+      </p:grpSpPr>
+      <p:sp>
+        <p:nvSpPr>
+          <p:cNvPr id="2" name="標題 1">
+            <a:extLst>
+              <a:ext uri="{FF2B5EF4-FFF2-40B4-BE49-F238E27FC236}">
                 <a16:creationId xmlns:a16="http://schemas.microsoft.com/office/drawing/2014/main" id="{0AD59BC0-0510-6326-DD50-2DF0BA6A3F5B}"/>
               </a:ext>
             </a:extLst>
@@ -33299,7 +33402,7 @@
 </p:sld>
 </file>
 
-<file path=ppt/slides/slide68.xml><?xml version="1.0" encoding="utf-8"?>
+<file path=ppt/slides/slide69.xml><?xml version="1.0" encoding="utf-8"?>
 <p:sld xmlns:a="http://schemas.openxmlformats.org/drawingml/2006/main" xmlns:r="http://schemas.openxmlformats.org/officeDocument/2006/relationships" xmlns:p="http://schemas.openxmlformats.org/presentationml/2006/main">
   <p:cSld>
     <p:spTree>

</xml_diff>